<commit_message>
added more results to ppt
</commit_message>
<xml_diff>
--- a/job_results.pptx
+++ b/job_results.pptx
@@ -5,15 +5,17 @@
     <p:sldMasterId id="2147483648" r:id="rId1"/>
   </p:sldMasterIdLst>
   <p:notesMasterIdLst>
-    <p:notesMasterId r:id="rId8"/>
+    <p:notesMasterId r:id="rId10"/>
   </p:notesMasterIdLst>
   <p:sldIdLst>
     <p:sldId id="256" r:id="rId2"/>
-    <p:sldId id="258" r:id="rId3"/>
-    <p:sldId id="259" r:id="rId4"/>
-    <p:sldId id="261" r:id="rId5"/>
-    <p:sldId id="263" r:id="rId6"/>
-    <p:sldId id="262" r:id="rId7"/>
+    <p:sldId id="264" r:id="rId3"/>
+    <p:sldId id="261" r:id="rId4"/>
+    <p:sldId id="262" r:id="rId5"/>
+    <p:sldId id="258" r:id="rId6"/>
+    <p:sldId id="259" r:id="rId7"/>
+    <p:sldId id="263" r:id="rId8"/>
+    <p:sldId id="265" r:id="rId9"/>
   </p:sldIdLst>
   <p:sldSz cx="12192000" cy="6858000"/>
   <p:notesSz cx="6858000" cy="9144000"/>
@@ -118,6 +120,476 @@
     </p:ext>
   </p:extLst>
 </p:presentation>
+</file>
+
+<file path=ppt/changesInfos/changesInfo1.xml><?xml version="1.0" encoding="utf-8"?>
+<pc:chgInfo xmlns:a="http://schemas.openxmlformats.org/drawingml/2006/main" xmlns:r="http://schemas.openxmlformats.org/officeDocument/2006/relationships" xmlns:ac="http://schemas.microsoft.com/office/drawing/2013/main/command" xmlns:pc="http://schemas.microsoft.com/office/powerpoint/2013/main/command">
+  <pc:docChgLst>
+    <pc:chgData name="Zhao Xiong" userId="5eba49e5-2895-4cd9-83e8-b3064fe76704" providerId="ADAL" clId="{B606E7B2-EFF5-418A-8639-9F7537C4DA50}"/>
+    <pc:docChg chg="undo custSel addSld modSld sldOrd">
+      <pc:chgData name="Zhao Xiong" userId="5eba49e5-2895-4cd9-83e8-b3064fe76704" providerId="ADAL" clId="{B606E7B2-EFF5-418A-8639-9F7537C4DA50}" dt="2022-05-10T18:20:39.587" v="1051" actId="5793"/>
+      <pc:docMkLst>
+        <pc:docMk/>
+      </pc:docMkLst>
+      <pc:sldChg chg="addSp delSp modSp">
+        <pc:chgData name="Zhao Xiong" userId="5eba49e5-2895-4cd9-83e8-b3064fe76704" providerId="ADAL" clId="{B606E7B2-EFF5-418A-8639-9F7537C4DA50}" dt="2022-05-10T17:33:22.904" v="209" actId="1076"/>
+        <pc:sldMkLst>
+          <pc:docMk/>
+          <pc:sldMk cId="3836033697" sldId="256"/>
+        </pc:sldMkLst>
+        <pc:spChg chg="mod">
+          <ac:chgData name="Zhao Xiong" userId="5eba49e5-2895-4cd9-83e8-b3064fe76704" providerId="ADAL" clId="{B606E7B2-EFF5-418A-8639-9F7537C4DA50}" dt="2022-05-10T17:33:22.904" v="209" actId="1076"/>
+          <ac:spMkLst>
+            <pc:docMk/>
+            <pc:sldMk cId="3836033697" sldId="256"/>
+            <ac:spMk id="6" creationId="{0522ED13-840A-4F15-A694-AE724D6E50DE}"/>
+          </ac:spMkLst>
+        </pc:spChg>
+        <pc:spChg chg="mod">
+          <ac:chgData name="Zhao Xiong" userId="5eba49e5-2895-4cd9-83e8-b3064fe76704" providerId="ADAL" clId="{B606E7B2-EFF5-418A-8639-9F7537C4DA50}" dt="2022-05-10T17:33:22.904" v="209" actId="1076"/>
+          <ac:spMkLst>
+            <pc:docMk/>
+            <pc:sldMk cId="3836033697" sldId="256"/>
+            <ac:spMk id="7" creationId="{0F33CCD0-B12E-490C-BB93-EBD7D24EDE48}"/>
+          </ac:spMkLst>
+        </pc:spChg>
+        <pc:spChg chg="add del mod">
+          <ac:chgData name="Zhao Xiong" userId="5eba49e5-2895-4cd9-83e8-b3064fe76704" providerId="ADAL" clId="{B606E7B2-EFF5-418A-8639-9F7537C4DA50}" dt="2022-05-10T16:41:57.044" v="159" actId="478"/>
+          <ac:spMkLst>
+            <pc:docMk/>
+            <pc:sldMk cId="3836033697" sldId="256"/>
+            <ac:spMk id="8" creationId="{733D912C-E11C-4ECB-A4C1-64211ADCDFFC}"/>
+          </ac:spMkLst>
+        </pc:spChg>
+        <pc:spChg chg="del mod">
+          <ac:chgData name="Zhao Xiong" userId="5eba49e5-2895-4cd9-83e8-b3064fe76704" providerId="ADAL" clId="{B606E7B2-EFF5-418A-8639-9F7537C4DA50}" dt="2022-05-10T16:41:57.044" v="159" actId="478"/>
+          <ac:spMkLst>
+            <pc:docMk/>
+            <pc:sldMk cId="3836033697" sldId="256"/>
+            <ac:spMk id="9" creationId="{57DEF2AA-1C12-4E98-A08B-699818FD3644}"/>
+          </ac:spMkLst>
+        </pc:spChg>
+        <pc:picChg chg="del mod">
+          <ac:chgData name="Zhao Xiong" userId="5eba49e5-2895-4cd9-83e8-b3064fe76704" providerId="ADAL" clId="{B606E7B2-EFF5-418A-8639-9F7537C4DA50}" dt="2022-05-10T16:41:55.362" v="157" actId="478"/>
+          <ac:picMkLst>
+            <pc:docMk/>
+            <pc:sldMk cId="3836033697" sldId="256"/>
+            <ac:picMk id="2" creationId="{70816EDE-D611-4381-B7DC-709C40686CC1}"/>
+          </ac:picMkLst>
+        </pc:picChg>
+        <pc:picChg chg="mod">
+          <ac:chgData name="Zhao Xiong" userId="5eba49e5-2895-4cd9-83e8-b3064fe76704" providerId="ADAL" clId="{B606E7B2-EFF5-418A-8639-9F7537C4DA50}" dt="2022-05-10T17:33:14.361" v="208" actId="1076"/>
+          <ac:picMkLst>
+            <pc:docMk/>
+            <pc:sldMk cId="3836033697" sldId="256"/>
+            <ac:picMk id="3" creationId="{66541562-2018-4AB9-A5A2-FCC3B9EB57AF}"/>
+          </ac:picMkLst>
+        </pc:picChg>
+        <pc:picChg chg="add del mod">
+          <ac:chgData name="Zhao Xiong" userId="5eba49e5-2895-4cd9-83e8-b3064fe76704" providerId="ADAL" clId="{B606E7B2-EFF5-418A-8639-9F7537C4DA50}" dt="2022-05-10T16:41:55.642" v="158" actId="478"/>
+          <ac:picMkLst>
+            <pc:docMk/>
+            <pc:sldMk cId="3836033697" sldId="256"/>
+            <ac:picMk id="4" creationId="{C91C42C4-1A90-4654-B272-1E1EE06DA2B4}"/>
+          </ac:picMkLst>
+        </pc:picChg>
+      </pc:sldChg>
+      <pc:sldChg chg="ord">
+        <pc:chgData name="Zhao Xiong" userId="5eba49e5-2895-4cd9-83e8-b3064fe76704" providerId="ADAL" clId="{B606E7B2-EFF5-418A-8639-9F7537C4DA50}" dt="2022-05-10T17:33:27.372" v="210"/>
+        <pc:sldMkLst>
+          <pc:docMk/>
+          <pc:sldMk cId="4028263462" sldId="258"/>
+        </pc:sldMkLst>
+      </pc:sldChg>
+      <pc:sldChg chg="ord">
+        <pc:chgData name="Zhao Xiong" userId="5eba49e5-2895-4cd9-83e8-b3064fe76704" providerId="ADAL" clId="{B606E7B2-EFF5-418A-8639-9F7537C4DA50}" dt="2022-05-10T17:33:27.372" v="210"/>
+        <pc:sldMkLst>
+          <pc:docMk/>
+          <pc:sldMk cId="1511892141" sldId="259"/>
+        </pc:sldMkLst>
+      </pc:sldChg>
+      <pc:sldChg chg="addSp delSp modSp">
+        <pc:chgData name="Zhao Xiong" userId="5eba49e5-2895-4cd9-83e8-b3064fe76704" providerId="ADAL" clId="{B606E7B2-EFF5-418A-8639-9F7537C4DA50}" dt="2022-05-10T17:47:16.344" v="477" actId="478"/>
+        <pc:sldMkLst>
+          <pc:docMk/>
+          <pc:sldMk cId="437272149" sldId="261"/>
+        </pc:sldMkLst>
+        <pc:spChg chg="mod">
+          <ac:chgData name="Zhao Xiong" userId="5eba49e5-2895-4cd9-83e8-b3064fe76704" providerId="ADAL" clId="{B606E7B2-EFF5-418A-8639-9F7537C4DA50}" dt="2022-05-10T16:47:30.532" v="167" actId="1076"/>
+          <ac:spMkLst>
+            <pc:docMk/>
+            <pc:sldMk cId="437272149" sldId="261"/>
+            <ac:spMk id="12" creationId="{4548F36B-678E-47C5-91AE-286503C037C9}"/>
+          </ac:spMkLst>
+        </pc:spChg>
+        <pc:picChg chg="add mod">
+          <ac:chgData name="Zhao Xiong" userId="5eba49e5-2895-4cd9-83e8-b3064fe76704" providerId="ADAL" clId="{B606E7B2-EFF5-418A-8639-9F7537C4DA50}" dt="2022-05-10T17:10:16.585" v="170" actId="1076"/>
+          <ac:picMkLst>
+            <pc:docMk/>
+            <pc:sldMk cId="437272149" sldId="261"/>
+            <ac:picMk id="2" creationId="{8CAD5C9B-6066-4623-BEC1-4D995F4A70E8}"/>
+          </ac:picMkLst>
+        </pc:picChg>
+        <pc:picChg chg="add del">
+          <ac:chgData name="Zhao Xiong" userId="5eba49e5-2895-4cd9-83e8-b3064fe76704" providerId="ADAL" clId="{B606E7B2-EFF5-418A-8639-9F7537C4DA50}" dt="2022-05-10T17:10:34.709" v="172"/>
+          <ac:picMkLst>
+            <pc:docMk/>
+            <pc:sldMk cId="437272149" sldId="261"/>
+            <ac:picMk id="3" creationId="{6E2C825B-7D26-42C9-BDF4-6BB5CEB7A588}"/>
+          </ac:picMkLst>
+        </pc:picChg>
+        <pc:picChg chg="add del">
+          <ac:chgData name="Zhao Xiong" userId="5eba49e5-2895-4cd9-83e8-b3064fe76704" providerId="ADAL" clId="{B606E7B2-EFF5-418A-8639-9F7537C4DA50}" dt="2022-05-10T16:39:46.521" v="109"/>
+          <ac:picMkLst>
+            <pc:docMk/>
+            <pc:sldMk cId="437272149" sldId="261"/>
+            <ac:picMk id="3" creationId="{D2C788AE-68AF-4A10-A92D-CC515EA17ACD}"/>
+          </ac:picMkLst>
+        </pc:picChg>
+        <pc:picChg chg="mod">
+          <ac:chgData name="Zhao Xiong" userId="5eba49e5-2895-4cd9-83e8-b3064fe76704" providerId="ADAL" clId="{B606E7B2-EFF5-418A-8639-9F7537C4DA50}" dt="2022-05-10T16:47:33.473" v="168" actId="1076"/>
+          <ac:picMkLst>
+            <pc:docMk/>
+            <pc:sldMk cId="437272149" sldId="261"/>
+            <ac:picMk id="4" creationId="{5FBB0C58-6A68-4223-B003-39934B994C1A}"/>
+          </ac:picMkLst>
+        </pc:picChg>
+        <pc:picChg chg="mod">
+          <ac:chgData name="Zhao Xiong" userId="5eba49e5-2895-4cd9-83e8-b3064fe76704" providerId="ADAL" clId="{B606E7B2-EFF5-418A-8639-9F7537C4DA50}" dt="2022-05-10T17:22:26.851" v="188" actId="1076"/>
+          <ac:picMkLst>
+            <pc:docMk/>
+            <pc:sldMk cId="437272149" sldId="261"/>
+            <ac:picMk id="5" creationId="{88DC834C-44DD-436C-8CCC-AD149AC5AD7A}"/>
+          </ac:picMkLst>
+        </pc:picChg>
+        <pc:picChg chg="mod modCrop">
+          <ac:chgData name="Zhao Xiong" userId="5eba49e5-2895-4cd9-83e8-b3064fe76704" providerId="ADAL" clId="{B606E7B2-EFF5-418A-8639-9F7537C4DA50}" dt="2022-05-10T17:10:16.585" v="170" actId="1076"/>
+          <ac:picMkLst>
+            <pc:docMk/>
+            <pc:sldMk cId="437272149" sldId="261"/>
+            <ac:picMk id="6" creationId="{92CA5A2C-2A9E-4C6C-8CFA-588C2CB7DF67}"/>
+          </ac:picMkLst>
+        </pc:picChg>
+        <pc:picChg chg="mod">
+          <ac:chgData name="Zhao Xiong" userId="5eba49e5-2895-4cd9-83e8-b3064fe76704" providerId="ADAL" clId="{B606E7B2-EFF5-418A-8639-9F7537C4DA50}" dt="2022-05-10T17:10:16.585" v="170" actId="1076"/>
+          <ac:picMkLst>
+            <pc:docMk/>
+            <pc:sldMk cId="437272149" sldId="261"/>
+            <ac:picMk id="7" creationId="{D6206348-472E-4BF2-8580-7C55643F1BFE}"/>
+          </ac:picMkLst>
+        </pc:picChg>
+        <pc:picChg chg="add del">
+          <ac:chgData name="Zhao Xiong" userId="5eba49e5-2895-4cd9-83e8-b3064fe76704" providerId="ADAL" clId="{B606E7B2-EFF5-418A-8639-9F7537C4DA50}" dt="2022-05-10T16:39:50.420" v="111"/>
+          <ac:picMkLst>
+            <pc:docMk/>
+            <pc:sldMk cId="437272149" sldId="261"/>
+            <ac:picMk id="8" creationId="{44123335-1248-4583-88F3-8B2219C660C5}"/>
+          </ac:picMkLst>
+        </pc:picChg>
+        <pc:picChg chg="add del mod">
+          <ac:chgData name="Zhao Xiong" userId="5eba49e5-2895-4cd9-83e8-b3064fe76704" providerId="ADAL" clId="{B606E7B2-EFF5-418A-8639-9F7537C4DA50}" dt="2022-05-10T17:47:16.344" v="477" actId="478"/>
+          <ac:picMkLst>
+            <pc:docMk/>
+            <pc:sldMk cId="437272149" sldId="261"/>
+            <ac:picMk id="8" creationId="{E32D9821-0E02-4500-93AB-2ADDF81034FF}"/>
+          </ac:picMkLst>
+        </pc:picChg>
+        <pc:picChg chg="mod">
+          <ac:chgData name="Zhao Xiong" userId="5eba49e5-2895-4cd9-83e8-b3064fe76704" providerId="ADAL" clId="{B606E7B2-EFF5-418A-8639-9F7537C4DA50}" dt="2022-05-10T16:47:33.473" v="168" actId="1076"/>
+          <ac:picMkLst>
+            <pc:docMk/>
+            <pc:sldMk cId="437272149" sldId="261"/>
+            <ac:picMk id="14" creationId="{698C36F5-A06C-4A52-B19C-2A3E678AB3E7}"/>
+          </ac:picMkLst>
+        </pc:picChg>
+      </pc:sldChg>
+      <pc:sldChg chg="addSp delSp modSp">
+        <pc:chgData name="Zhao Xiong" userId="5eba49e5-2895-4cd9-83e8-b3064fe76704" providerId="ADAL" clId="{B606E7B2-EFF5-418A-8639-9F7537C4DA50}" dt="2022-05-10T17:47:50.921" v="478" actId="14100"/>
+        <pc:sldMkLst>
+          <pc:docMk/>
+          <pc:sldMk cId="1920508232" sldId="262"/>
+        </pc:sldMkLst>
+        <pc:picChg chg="mod">
+          <ac:chgData name="Zhao Xiong" userId="5eba49e5-2895-4cd9-83e8-b3064fe76704" providerId="ADAL" clId="{B606E7B2-EFF5-418A-8639-9F7537C4DA50}" dt="2022-05-10T17:46:45.477" v="474" actId="1038"/>
+          <ac:picMkLst>
+            <pc:docMk/>
+            <pc:sldMk cId="1920508232" sldId="262"/>
+            <ac:picMk id="2" creationId="{FD4B9965-2B8C-4A28-8D4C-DAE9DF88450A}"/>
+          </ac:picMkLst>
+        </pc:picChg>
+        <pc:picChg chg="add mod">
+          <ac:chgData name="Zhao Xiong" userId="5eba49e5-2895-4cd9-83e8-b3064fe76704" providerId="ADAL" clId="{B606E7B2-EFF5-418A-8639-9F7537C4DA50}" dt="2022-05-10T17:46:45.477" v="474" actId="1038"/>
+          <ac:picMkLst>
+            <pc:docMk/>
+            <pc:sldMk cId="1920508232" sldId="262"/>
+            <ac:picMk id="3" creationId="{9CD36BFD-C338-4C51-816E-58CA5BA5D4C8}"/>
+          </ac:picMkLst>
+        </pc:picChg>
+        <pc:picChg chg="add del mod">
+          <ac:chgData name="Zhao Xiong" userId="5eba49e5-2895-4cd9-83e8-b3064fe76704" providerId="ADAL" clId="{B606E7B2-EFF5-418A-8639-9F7537C4DA50}" dt="2022-05-10T16:25:41.325" v="79" actId="478"/>
+          <ac:picMkLst>
+            <pc:docMk/>
+            <pc:sldMk cId="1920508232" sldId="262"/>
+            <ac:picMk id="3" creationId="{BFEC332F-7C45-437A-A997-C337A2FBA103}"/>
+          </ac:picMkLst>
+        </pc:picChg>
+        <pc:picChg chg="add del mod">
+          <ac:chgData name="Zhao Xiong" userId="5eba49e5-2895-4cd9-83e8-b3064fe76704" providerId="ADAL" clId="{B606E7B2-EFF5-418A-8639-9F7537C4DA50}" dt="2022-05-10T16:14:59.084" v="7" actId="478"/>
+          <ac:picMkLst>
+            <pc:docMk/>
+            <pc:sldMk cId="1920508232" sldId="262"/>
+            <ac:picMk id="5" creationId="{1C935304-C3EC-40CF-9266-FF1C752F122F}"/>
+          </ac:picMkLst>
+        </pc:picChg>
+        <pc:picChg chg="add del mod">
+          <ac:chgData name="Zhao Xiong" userId="5eba49e5-2895-4cd9-83e8-b3064fe76704" providerId="ADAL" clId="{B606E7B2-EFF5-418A-8639-9F7537C4DA50}" dt="2022-05-10T17:46:28.780" v="456" actId="478"/>
+          <ac:picMkLst>
+            <pc:docMk/>
+            <pc:sldMk cId="1920508232" sldId="262"/>
+            <ac:picMk id="5" creationId="{217DE62C-ED25-440F-BB9E-C0CD6BBFF301}"/>
+          </ac:picMkLst>
+        </pc:picChg>
+        <pc:picChg chg="add del mod">
+          <ac:chgData name="Zhao Xiong" userId="5eba49e5-2895-4cd9-83e8-b3064fe76704" providerId="ADAL" clId="{B606E7B2-EFF5-418A-8639-9F7537C4DA50}" dt="2022-05-10T16:24:31.856" v="74" actId="478"/>
+          <ac:picMkLst>
+            <pc:docMk/>
+            <pc:sldMk cId="1920508232" sldId="262"/>
+            <ac:picMk id="6" creationId="{01A1D53C-FB19-4260-A9A2-759A07C869B0}"/>
+          </ac:picMkLst>
+        </pc:picChg>
+        <pc:picChg chg="add mod">
+          <ac:chgData name="Zhao Xiong" userId="5eba49e5-2895-4cd9-83e8-b3064fe76704" providerId="ADAL" clId="{B606E7B2-EFF5-418A-8639-9F7537C4DA50}" dt="2022-05-10T17:46:40.481" v="461" actId="14100"/>
+          <ac:picMkLst>
+            <pc:docMk/>
+            <pc:sldMk cId="1920508232" sldId="262"/>
+            <ac:picMk id="6" creationId="{537EC218-CBE3-4119-BF6B-54BB7C56C594}"/>
+          </ac:picMkLst>
+        </pc:picChg>
+        <pc:picChg chg="add mod">
+          <ac:chgData name="Zhao Xiong" userId="5eba49e5-2895-4cd9-83e8-b3064fe76704" providerId="ADAL" clId="{B606E7B2-EFF5-418A-8639-9F7537C4DA50}" dt="2022-05-10T16:18:27.779" v="68" actId="1036"/>
+          <ac:picMkLst>
+            <pc:docMk/>
+            <pc:sldMk cId="1920508232" sldId="262"/>
+            <ac:picMk id="7" creationId="{9A5BDDF7-7C18-474A-BA19-312A5AD8E659}"/>
+          </ac:picMkLst>
+        </pc:picChg>
+        <pc:picChg chg="add mod">
+          <ac:chgData name="Zhao Xiong" userId="5eba49e5-2895-4cd9-83e8-b3064fe76704" providerId="ADAL" clId="{B606E7B2-EFF5-418A-8639-9F7537C4DA50}" dt="2022-05-10T17:47:50.921" v="478" actId="14100"/>
+          <ac:picMkLst>
+            <pc:docMk/>
+            <pc:sldMk cId="1920508232" sldId="262"/>
+            <ac:picMk id="8" creationId="{959F5EC5-53F6-4F6A-B348-BEEFFD3957D1}"/>
+          </ac:picMkLst>
+        </pc:picChg>
+        <pc:picChg chg="add mod">
+          <ac:chgData name="Zhao Xiong" userId="5eba49e5-2895-4cd9-83e8-b3064fe76704" providerId="ADAL" clId="{B606E7B2-EFF5-418A-8639-9F7537C4DA50}" dt="2022-05-10T16:25:55.818" v="85" actId="14100"/>
+          <ac:picMkLst>
+            <pc:docMk/>
+            <pc:sldMk cId="1920508232" sldId="262"/>
+            <ac:picMk id="9" creationId="{611A8E4F-F107-49CB-A86C-3CE576B6594E}"/>
+          </ac:picMkLst>
+        </pc:picChg>
+        <pc:picChg chg="mod">
+          <ac:chgData name="Zhao Xiong" userId="5eba49e5-2895-4cd9-83e8-b3064fe76704" providerId="ADAL" clId="{B606E7B2-EFF5-418A-8639-9F7537C4DA50}" dt="2022-05-10T16:17:08.514" v="61" actId="1036"/>
+          <ac:picMkLst>
+            <pc:docMk/>
+            <pc:sldMk cId="1920508232" sldId="262"/>
+            <ac:picMk id="10" creationId="{56915DDB-28FE-4C98-A988-52AAB828CD0E}"/>
+          </ac:picMkLst>
+        </pc:picChg>
+        <pc:picChg chg="mod">
+          <ac:chgData name="Zhao Xiong" userId="5eba49e5-2895-4cd9-83e8-b3064fe76704" providerId="ADAL" clId="{B606E7B2-EFF5-418A-8639-9F7537C4DA50}" dt="2022-05-10T17:46:45.477" v="474" actId="1038"/>
+          <ac:picMkLst>
+            <pc:docMk/>
+            <pc:sldMk cId="1920508232" sldId="262"/>
+            <ac:picMk id="11" creationId="{E9018FE1-13A1-41CA-A09A-8CB1803AE66F}"/>
+          </ac:picMkLst>
+        </pc:picChg>
+        <pc:picChg chg="add mod">
+          <ac:chgData name="Zhao Xiong" userId="5eba49e5-2895-4cd9-83e8-b3064fe76704" providerId="ADAL" clId="{B606E7B2-EFF5-418A-8639-9F7537C4DA50}" dt="2022-05-10T17:46:45.477" v="474" actId="1038"/>
+          <ac:picMkLst>
+            <pc:docMk/>
+            <pc:sldMk cId="1920508232" sldId="262"/>
+            <ac:picMk id="12" creationId="{8C9FBEA2-1726-40D3-953F-668829D2E228}"/>
+          </ac:picMkLst>
+        </pc:picChg>
+        <pc:picChg chg="add mod">
+          <ac:chgData name="Zhao Xiong" userId="5eba49e5-2895-4cd9-83e8-b3064fe76704" providerId="ADAL" clId="{B606E7B2-EFF5-418A-8639-9F7537C4DA50}" dt="2022-05-10T17:46:45.477" v="474" actId="1038"/>
+          <ac:picMkLst>
+            <pc:docMk/>
+            <pc:sldMk cId="1920508232" sldId="262"/>
+            <ac:picMk id="13" creationId="{D5BF4313-5326-4470-804E-1A4974D361E1}"/>
+          </ac:picMkLst>
+        </pc:picChg>
+        <pc:picChg chg="add mod">
+          <ac:chgData name="Zhao Xiong" userId="5eba49e5-2895-4cd9-83e8-b3064fe76704" providerId="ADAL" clId="{B606E7B2-EFF5-418A-8639-9F7537C4DA50}" dt="2022-05-10T17:46:42.527" v="463" actId="571"/>
+          <ac:picMkLst>
+            <pc:docMk/>
+            <pc:sldMk cId="1920508232" sldId="262"/>
+            <ac:picMk id="14" creationId="{569AE1AC-7928-49D1-A87B-4BF7FFD9695F}"/>
+          </ac:picMkLst>
+        </pc:picChg>
+        <pc:picChg chg="add mod">
+          <ac:chgData name="Zhao Xiong" userId="5eba49e5-2895-4cd9-83e8-b3064fe76704" providerId="ADAL" clId="{B606E7B2-EFF5-418A-8639-9F7537C4DA50}" dt="2022-05-10T17:46:42.527" v="463" actId="571"/>
+          <ac:picMkLst>
+            <pc:docMk/>
+            <pc:sldMk cId="1920508232" sldId="262"/>
+            <ac:picMk id="15" creationId="{1F9C80BB-AFE7-44D9-9E86-51C35E5BC7C2}"/>
+          </ac:picMkLst>
+        </pc:picChg>
+        <pc:picChg chg="add mod">
+          <ac:chgData name="Zhao Xiong" userId="5eba49e5-2895-4cd9-83e8-b3064fe76704" providerId="ADAL" clId="{B606E7B2-EFF5-418A-8639-9F7537C4DA50}" dt="2022-05-10T17:46:42.527" v="463" actId="571"/>
+          <ac:picMkLst>
+            <pc:docMk/>
+            <pc:sldMk cId="1920508232" sldId="262"/>
+            <ac:picMk id="16" creationId="{29CAD821-3F36-44FA-B8FD-9C9DB4AA13A6}"/>
+          </ac:picMkLst>
+        </pc:picChg>
+      </pc:sldChg>
+      <pc:sldChg chg="ord">
+        <pc:chgData name="Zhao Xiong" userId="5eba49e5-2895-4cd9-83e8-b3064fe76704" providerId="ADAL" clId="{B606E7B2-EFF5-418A-8639-9F7537C4DA50}" dt="2022-05-10T16:47:53.079" v="169"/>
+        <pc:sldMkLst>
+          <pc:docMk/>
+          <pc:sldMk cId="65343148" sldId="263"/>
+        </pc:sldMkLst>
+      </pc:sldChg>
+      <pc:sldChg chg="addSp delSp modSp add">
+        <pc:chgData name="Zhao Xiong" userId="5eba49e5-2895-4cd9-83e8-b3064fe76704" providerId="ADAL" clId="{B606E7B2-EFF5-418A-8639-9F7537C4DA50}" dt="2022-05-10T17:44:23.224" v="451" actId="1037"/>
+        <pc:sldMkLst>
+          <pc:docMk/>
+          <pc:sldMk cId="4234346216" sldId="264"/>
+        </pc:sldMkLst>
+        <pc:spChg chg="del">
+          <ac:chgData name="Zhao Xiong" userId="5eba49e5-2895-4cd9-83e8-b3064fe76704" providerId="ADAL" clId="{B606E7B2-EFF5-418A-8639-9F7537C4DA50}" dt="2022-05-10T16:41:28.174" v="147" actId="478"/>
+          <ac:spMkLst>
+            <pc:docMk/>
+            <pc:sldMk cId="4234346216" sldId="264"/>
+            <ac:spMk id="6" creationId="{0522ED13-840A-4F15-A694-AE724D6E50DE}"/>
+          </ac:spMkLst>
+        </pc:spChg>
+        <pc:spChg chg="mod">
+          <ac:chgData name="Zhao Xiong" userId="5eba49e5-2895-4cd9-83e8-b3064fe76704" providerId="ADAL" clId="{B606E7B2-EFF5-418A-8639-9F7537C4DA50}" dt="2022-05-10T17:44:14.056" v="433" actId="20577"/>
+          <ac:spMkLst>
+            <pc:docMk/>
+            <pc:sldMk cId="4234346216" sldId="264"/>
+            <ac:spMk id="7" creationId="{0F33CCD0-B12E-490C-BB93-EBD7D24EDE48}"/>
+          </ac:spMkLst>
+        </pc:spChg>
+        <pc:spChg chg="mod">
+          <ac:chgData name="Zhao Xiong" userId="5eba49e5-2895-4cd9-83e8-b3064fe76704" providerId="ADAL" clId="{B606E7B2-EFF5-418A-8639-9F7537C4DA50}" dt="2022-05-10T17:44:23.224" v="451" actId="1037"/>
+          <ac:spMkLst>
+            <pc:docMk/>
+            <pc:sldMk cId="4234346216" sldId="264"/>
+            <ac:spMk id="8" creationId="{733D912C-E11C-4ECB-A4C1-64211ADCDFFC}"/>
+          </ac:spMkLst>
+        </pc:spChg>
+        <pc:spChg chg="mod">
+          <ac:chgData name="Zhao Xiong" userId="5eba49e5-2895-4cd9-83e8-b3064fe76704" providerId="ADAL" clId="{B606E7B2-EFF5-418A-8639-9F7537C4DA50}" dt="2022-05-10T17:44:05.889" v="415" actId="1076"/>
+          <ac:spMkLst>
+            <pc:docMk/>
+            <pc:sldMk cId="4234346216" sldId="264"/>
+            <ac:spMk id="9" creationId="{57DEF2AA-1C12-4E98-A08B-699818FD3644}"/>
+          </ac:spMkLst>
+        </pc:spChg>
+        <pc:spChg chg="add mod">
+          <ac:chgData name="Zhao Xiong" userId="5eba49e5-2895-4cd9-83e8-b3064fe76704" providerId="ADAL" clId="{B606E7B2-EFF5-418A-8639-9F7537C4DA50}" dt="2022-05-10T17:44:05.889" v="415" actId="1076"/>
+          <ac:spMkLst>
+            <pc:docMk/>
+            <pc:sldMk cId="4234346216" sldId="264"/>
+            <ac:spMk id="10" creationId="{A3FA2DF3-A9CD-4AEE-A909-C632486E585B}"/>
+          </ac:spMkLst>
+        </pc:spChg>
+        <pc:spChg chg="add mod">
+          <ac:chgData name="Zhao Xiong" userId="5eba49e5-2895-4cd9-83e8-b3064fe76704" providerId="ADAL" clId="{B606E7B2-EFF5-418A-8639-9F7537C4DA50}" dt="2022-05-10T17:44:05.889" v="415" actId="1076"/>
+          <ac:spMkLst>
+            <pc:docMk/>
+            <pc:sldMk cId="4234346216" sldId="264"/>
+            <ac:spMk id="11" creationId="{4A362668-D9C9-4ED0-A99E-D8EDFA58C845}"/>
+          </ac:spMkLst>
+        </pc:spChg>
+        <pc:spChg chg="add mod">
+          <ac:chgData name="Zhao Xiong" userId="5eba49e5-2895-4cd9-83e8-b3064fe76704" providerId="ADAL" clId="{B606E7B2-EFF5-418A-8639-9F7537C4DA50}" dt="2022-05-10T17:44:05.889" v="415" actId="1076"/>
+          <ac:spMkLst>
+            <pc:docMk/>
+            <pc:sldMk cId="4234346216" sldId="264"/>
+            <ac:spMk id="12" creationId="{2A0533B2-B75F-4BD3-83B6-402337A5AABD}"/>
+          </ac:spMkLst>
+        </pc:spChg>
+        <pc:spChg chg="add mod">
+          <ac:chgData name="Zhao Xiong" userId="5eba49e5-2895-4cd9-83e8-b3064fe76704" providerId="ADAL" clId="{B606E7B2-EFF5-418A-8639-9F7537C4DA50}" dt="2022-05-10T17:44:05.889" v="415" actId="1076"/>
+          <ac:spMkLst>
+            <pc:docMk/>
+            <pc:sldMk cId="4234346216" sldId="264"/>
+            <ac:spMk id="13" creationId="{4EEECA04-5A1D-4294-ADD4-6F2DC3FCBA65}"/>
+          </ac:spMkLst>
+        </pc:spChg>
+        <pc:picChg chg="mod">
+          <ac:chgData name="Zhao Xiong" userId="5eba49e5-2895-4cd9-83e8-b3064fe76704" providerId="ADAL" clId="{B606E7B2-EFF5-418A-8639-9F7537C4DA50}" dt="2022-05-10T17:44:05.889" v="415" actId="1076"/>
+          <ac:picMkLst>
+            <pc:docMk/>
+            <pc:sldMk cId="4234346216" sldId="264"/>
+            <ac:picMk id="2" creationId="{70816EDE-D611-4381-B7DC-709C40686CC1}"/>
+          </ac:picMkLst>
+        </pc:picChg>
+        <pc:picChg chg="mod modCrop">
+          <ac:chgData name="Zhao Xiong" userId="5eba49e5-2895-4cd9-83e8-b3064fe76704" providerId="ADAL" clId="{B606E7B2-EFF5-418A-8639-9F7537C4DA50}" dt="2022-05-10T17:44:05.889" v="415" actId="1076"/>
+          <ac:picMkLst>
+            <pc:docMk/>
+            <pc:sldMk cId="4234346216" sldId="264"/>
+            <ac:picMk id="3" creationId="{66541562-2018-4AB9-A5A2-FCC3B9EB57AF}"/>
+          </ac:picMkLst>
+        </pc:picChg>
+        <pc:picChg chg="mod">
+          <ac:chgData name="Zhao Xiong" userId="5eba49e5-2895-4cd9-83e8-b3064fe76704" providerId="ADAL" clId="{B606E7B2-EFF5-418A-8639-9F7537C4DA50}" dt="2022-05-10T17:44:23.224" v="451" actId="1037"/>
+          <ac:picMkLst>
+            <pc:docMk/>
+            <pc:sldMk cId="4234346216" sldId="264"/>
+            <ac:picMk id="4" creationId="{C91C42C4-1A90-4654-B272-1E1EE06DA2B4}"/>
+          </ac:picMkLst>
+        </pc:picChg>
+        <pc:picChg chg="add mod">
+          <ac:chgData name="Zhao Xiong" userId="5eba49e5-2895-4cd9-83e8-b3064fe76704" providerId="ADAL" clId="{B606E7B2-EFF5-418A-8639-9F7537C4DA50}" dt="2022-05-10T17:44:05.889" v="415" actId="1076"/>
+          <ac:picMkLst>
+            <pc:docMk/>
+            <pc:sldMk cId="4234346216" sldId="264"/>
+            <ac:picMk id="5" creationId="{33E26E9D-11BD-46B8-A2C6-4ECB6E0ECE9C}"/>
+          </ac:picMkLst>
+        </pc:picChg>
+        <pc:picChg chg="add mod ord modCrop">
+          <ac:chgData name="Zhao Xiong" userId="5eba49e5-2895-4cd9-83e8-b3064fe76704" providerId="ADAL" clId="{B606E7B2-EFF5-418A-8639-9F7537C4DA50}" dt="2022-05-10T17:44:05.889" v="415" actId="1076"/>
+          <ac:picMkLst>
+            <pc:docMk/>
+            <pc:sldMk cId="4234346216" sldId="264"/>
+            <ac:picMk id="14" creationId="{3DA7F854-AAAB-4B56-9326-1B55C404579F}"/>
+          </ac:picMkLst>
+        </pc:picChg>
+      </pc:sldChg>
+      <pc:sldChg chg="modSp add">
+        <pc:chgData name="Zhao Xiong" userId="5eba49e5-2895-4cd9-83e8-b3064fe76704" providerId="ADAL" clId="{B606E7B2-EFF5-418A-8639-9F7537C4DA50}" dt="2022-05-10T18:20:39.587" v="1051" actId="5793"/>
+        <pc:sldMkLst>
+          <pc:docMk/>
+          <pc:sldMk cId="1955196879" sldId="265"/>
+        </pc:sldMkLst>
+        <pc:spChg chg="mod">
+          <ac:chgData name="Zhao Xiong" userId="5eba49e5-2895-4cd9-83e8-b3064fe76704" providerId="ADAL" clId="{B606E7B2-EFF5-418A-8639-9F7537C4DA50}" dt="2022-05-10T17:34:11.746" v="218" actId="20577"/>
+          <ac:spMkLst>
+            <pc:docMk/>
+            <pc:sldMk cId="1955196879" sldId="265"/>
+            <ac:spMk id="2" creationId="{692C2D3A-B5C9-4E13-9714-BC54302DA6B6}"/>
+          </ac:spMkLst>
+        </pc:spChg>
+        <pc:spChg chg="mod">
+          <ac:chgData name="Zhao Xiong" userId="5eba49e5-2895-4cd9-83e8-b3064fe76704" providerId="ADAL" clId="{B606E7B2-EFF5-418A-8639-9F7537C4DA50}" dt="2022-05-10T18:20:39.587" v="1051" actId="5793"/>
+          <ac:spMkLst>
+            <pc:docMk/>
+            <pc:sldMk cId="1955196879" sldId="265"/>
+            <ac:spMk id="3" creationId="{B9A7E7A7-1393-483D-AE1C-C96BE6B86BF7}"/>
+          </ac:spMkLst>
+        </pc:spChg>
+      </pc:sldChg>
+    </pc:docChg>
+  </pc:docChgLst>
+</pc:chgInfo>
 </file>
 
 <file path=ppt/notesMasters/notesMaster1.xml><?xml version="1.0" encoding="utf-8"?>
@@ -3727,8 +4199,8 @@
         </p:blipFill>
         <p:spPr>
           <a:xfrm>
-            <a:off x="253150" y="0"/>
-            <a:ext cx="7660627" cy="6858000"/>
+            <a:off x="705912" y="0"/>
+            <a:ext cx="7309388" cy="6858000"/>
           </a:xfrm>
           <a:prstGeom prst="rect">
             <a:avLst/>
@@ -3749,7 +4221,7 @@
         </p:nvSpPr>
         <p:spPr>
           <a:xfrm>
-            <a:off x="-91440" y="1022985"/>
+            <a:off x="39760" y="1022985"/>
             <a:ext cx="721672" cy="276999"/>
           </a:xfrm>
           <a:prstGeom prst="rect">
@@ -3793,7 +4265,7 @@
         </p:nvSpPr>
         <p:spPr>
           <a:xfrm>
-            <a:off x="-68413" y="4527232"/>
+            <a:off x="62787" y="4527232"/>
             <a:ext cx="643125" cy="276999"/>
           </a:xfrm>
           <a:prstGeom prst="rect">
@@ -3820,72 +4292,6 @@
                 <a:srgbClr val="FF0000"/>
               </a:solidFill>
             </a:endParaRPr>
-          </a:p>
-        </p:txBody>
-      </p:sp>
-      <p:pic>
-        <p:nvPicPr>
-          <p:cNvPr id="2" name="Picture 1">
-            <a:extLst>
-              <a:ext uri="{FF2B5EF4-FFF2-40B4-BE49-F238E27FC236}">
-                <a16:creationId xmlns:a16="http://schemas.microsoft.com/office/drawing/2014/main" id="{70816EDE-D611-4381-B7DC-709C40686CC1}"/>
-              </a:ext>
-            </a:extLst>
-          </p:cNvPr>
-          <p:cNvPicPr>
-            <a:picLocks noChangeAspect="1"/>
-          </p:cNvPicPr>
-          <p:nvPr/>
-        </p:nvPicPr>
-        <p:blipFill>
-          <a:blip r:embed="rId3"/>
-          <a:stretch>
-            <a:fillRect/>
-          </a:stretch>
-        </p:blipFill>
-        <p:spPr>
-          <a:xfrm>
-            <a:off x="7913777" y="3543300"/>
-            <a:ext cx="2326427" cy="3208020"/>
-          </a:xfrm>
-          <a:prstGeom prst="rect">
-            <a:avLst/>
-          </a:prstGeom>
-        </p:spPr>
-      </p:pic>
-      <p:sp>
-        <p:nvSpPr>
-          <p:cNvPr id="9" name="TextBox 8">
-            <a:extLst>
-              <a:ext uri="{FF2B5EF4-FFF2-40B4-BE49-F238E27FC236}">
-                <a16:creationId xmlns:a16="http://schemas.microsoft.com/office/drawing/2014/main" id="{57DEF2AA-1C12-4E98-A08B-699818FD3644}"/>
-              </a:ext>
-            </a:extLst>
-          </p:cNvPr>
-          <p:cNvSpPr txBox="1"/>
-          <p:nvPr/>
-        </p:nvSpPr>
-        <p:spPr>
-          <a:xfrm>
-            <a:off x="8740187" y="6689020"/>
-            <a:ext cx="965329" cy="215444"/>
-          </a:xfrm>
-          <a:prstGeom prst="rect">
-            <a:avLst/>
-          </a:prstGeom>
-          <a:noFill/>
-        </p:spPr>
-        <p:txBody>
-          <a:bodyPr wrap="none" rtlCol="0">
-            <a:spAutoFit/>
-          </a:bodyPr>
-          <a:lstStyle/>
-          <a:p>
-            <a:r>
-              <a:rPr lang="en-NZ" sz="800" b="1" dirty="0"/>
-              <a:t>4900 rows (17.5%)</a:t>
-            </a:r>
-            <a:endParaRPr lang="en-GB" sz="800" b="1" dirty="0"/>
           </a:p>
         </p:txBody>
       </p:sp>
@@ -3921,10 +4327,112 @@
       </p:grpSpPr>
       <p:pic>
         <p:nvPicPr>
-          <p:cNvPr id="5" name="Picture 4">
-            <a:extLst>
-              <a:ext uri="{FF2B5EF4-FFF2-40B4-BE49-F238E27FC236}">
-                <a16:creationId xmlns:a16="http://schemas.microsoft.com/office/drawing/2014/main" id="{57F5CD76-A121-47E7-8D5C-78EB781D67BC}"/>
+          <p:cNvPr id="14" name="Picture 13">
+            <a:extLst>
+              <a:ext uri="{FF2B5EF4-FFF2-40B4-BE49-F238E27FC236}">
+                <a16:creationId xmlns:a16="http://schemas.microsoft.com/office/drawing/2014/main" id="{3DA7F854-AAAB-4B56-9326-1B55C404579F}"/>
+              </a:ext>
+            </a:extLst>
+          </p:cNvPr>
+          <p:cNvPicPr>
+            <a:picLocks noChangeAspect="1"/>
+          </p:cNvPicPr>
+          <p:nvPr/>
+        </p:nvPicPr>
+        <p:blipFill rotWithShape="1">
+          <a:blip r:embed="rId2"/>
+          <a:srcRect l="67159" t="51425"/>
+          <a:stretch/>
+        </p:blipFill>
+        <p:spPr>
+          <a:xfrm>
+            <a:off x="9646293" y="240915"/>
+            <a:ext cx="2488707" cy="3331280"/>
+          </a:xfrm>
+          <a:prstGeom prst="rect">
+            <a:avLst/>
+          </a:prstGeom>
+        </p:spPr>
+      </p:pic>
+      <p:pic>
+        <p:nvPicPr>
+          <p:cNvPr id="3" name="Picture 2">
+            <a:extLst>
+              <a:ext uri="{FF2B5EF4-FFF2-40B4-BE49-F238E27FC236}">
+                <a16:creationId xmlns:a16="http://schemas.microsoft.com/office/drawing/2014/main" id="{66541562-2018-4AB9-A5A2-FCC3B9EB57AF}"/>
+              </a:ext>
+            </a:extLst>
+          </p:cNvPr>
+          <p:cNvPicPr>
+            <a:picLocks noChangeAspect="1"/>
+          </p:cNvPicPr>
+          <p:nvPr/>
+        </p:nvPicPr>
+        <p:blipFill rotWithShape="1">
+          <a:blip r:embed="rId2"/>
+          <a:srcRect t="51425" r="33459"/>
+          <a:stretch/>
+        </p:blipFill>
+        <p:spPr>
+          <a:xfrm>
+            <a:off x="20852" y="276999"/>
+            <a:ext cx="4938029" cy="3331280"/>
+          </a:xfrm>
+          <a:prstGeom prst="rect">
+            <a:avLst/>
+          </a:prstGeom>
+        </p:spPr>
+      </p:pic>
+      <p:sp>
+        <p:nvSpPr>
+          <p:cNvPr id="7" name="TextBox 6">
+            <a:extLst>
+              <a:ext uri="{FF2B5EF4-FFF2-40B4-BE49-F238E27FC236}">
+                <a16:creationId xmlns:a16="http://schemas.microsoft.com/office/drawing/2014/main" id="{0F33CCD0-B12E-490C-BB93-EBD7D24EDE48}"/>
+              </a:ext>
+            </a:extLst>
+          </p:cNvPr>
+          <p:cNvSpPr txBox="1"/>
+          <p:nvPr/>
+        </p:nvSpPr>
+        <p:spPr>
+          <a:xfrm>
+            <a:off x="-41303" y="-12833"/>
+            <a:ext cx="1191224" cy="276999"/>
+          </a:xfrm>
+          <a:prstGeom prst="rect">
+            <a:avLst/>
+          </a:prstGeom>
+          <a:noFill/>
+        </p:spPr>
+        <p:txBody>
+          <a:bodyPr wrap="none" rtlCol="0">
+            <a:spAutoFit/>
+          </a:bodyPr>
+          <a:lstStyle/>
+          <a:p>
+            <a:r>
+              <a:rPr lang="en-NZ" sz="1200" b="1" dirty="0">
+                <a:solidFill>
+                  <a:srgbClr val="FF0000"/>
+                </a:solidFill>
+              </a:rPr>
+              <a:t>Target: &gt;140/80</a:t>
+            </a:r>
+            <a:endParaRPr lang="en-GB" sz="1200" b="1" dirty="0">
+              <a:solidFill>
+                <a:srgbClr val="FF0000"/>
+              </a:solidFill>
+            </a:endParaRPr>
+          </a:p>
+        </p:txBody>
+      </p:sp>
+      <p:pic>
+        <p:nvPicPr>
+          <p:cNvPr id="2" name="Picture 1">
+            <a:extLst>
+              <a:ext uri="{FF2B5EF4-FFF2-40B4-BE49-F238E27FC236}">
+                <a16:creationId xmlns:a16="http://schemas.microsoft.com/office/drawing/2014/main" id="{70816EDE-D611-4381-B7DC-709C40686CC1}"/>
               </a:ext>
             </a:extLst>
           </p:cNvPr>
@@ -3934,21 +4442,15 @@
           <p:nvPr/>
         </p:nvPicPr>
         <p:blipFill>
-          <a:blip r:embed="rId2">
-            <a:extLst>
-              <a:ext uri="{28A0092B-C50C-407E-A947-70E740481C1C}">
-                <a14:useLocalDpi xmlns:a14="http://schemas.microsoft.com/office/drawing/2010/main" val="0"/>
-              </a:ext>
-            </a:extLst>
-          </a:blip>
+          <a:blip r:embed="rId3"/>
           <a:stretch>
             <a:fillRect/>
           </a:stretch>
         </p:blipFill>
         <p:spPr>
           <a:xfrm>
-            <a:off x="0" y="369332"/>
-            <a:ext cx="12192000" cy="6510995"/>
+            <a:off x="4958881" y="264166"/>
+            <a:ext cx="2326427" cy="3208020"/>
           </a:xfrm>
           <a:prstGeom prst="rect">
             <a:avLst/>
@@ -3957,10 +4459,10 @@
       </p:pic>
       <p:sp>
         <p:nvSpPr>
-          <p:cNvPr id="6" name="TextBox 5">
-            <a:extLst>
-              <a:ext uri="{FF2B5EF4-FFF2-40B4-BE49-F238E27FC236}">
-                <a16:creationId xmlns:a16="http://schemas.microsoft.com/office/drawing/2014/main" id="{979AE2EC-4AA9-4D1C-9817-4D0290540D4D}"/>
+          <p:cNvPr id="9" name="TextBox 8">
+            <a:extLst>
+              <a:ext uri="{FF2B5EF4-FFF2-40B4-BE49-F238E27FC236}">
+                <a16:creationId xmlns:a16="http://schemas.microsoft.com/office/drawing/2014/main" id="{57DEF2AA-1C12-4E98-A08B-699818FD3644}"/>
               </a:ext>
             </a:extLst>
           </p:cNvPr>
@@ -3969,8 +4471,8 @@
         </p:nvSpPr>
         <p:spPr>
           <a:xfrm>
-            <a:off x="0" y="-9525"/>
-            <a:ext cx="7275589" cy="369332"/>
+            <a:off x="5651164" y="3401008"/>
+            <a:ext cx="1754042" cy="276999"/>
           </a:xfrm>
           <a:prstGeom prst="rect">
             <a:avLst/>
@@ -3984,17 +4486,266 @@
           <a:lstStyle/>
           <a:p>
             <a:r>
-              <a:rPr lang="en-NZ" b="1" dirty="0"/>
-              <a:t>All 10 combination of 10% subset runs</a:t>
-            </a:r>
-            <a:endParaRPr lang="en-GB" b="1" dirty="0"/>
+              <a:rPr lang="en-NZ" sz="1200" b="1" dirty="0"/>
+              <a:t>4900 rows (17.5%)</a:t>
+            </a:r>
+            <a:endParaRPr lang="en-GB" sz="1200" b="1" dirty="0"/>
+          </a:p>
+        </p:txBody>
+      </p:sp>
+      <p:pic>
+        <p:nvPicPr>
+          <p:cNvPr id="4" name="Picture 3">
+            <a:extLst>
+              <a:ext uri="{FF2B5EF4-FFF2-40B4-BE49-F238E27FC236}">
+                <a16:creationId xmlns:a16="http://schemas.microsoft.com/office/drawing/2014/main" id="{C91C42C4-1A90-4654-B272-1E1EE06DA2B4}"/>
+              </a:ext>
+            </a:extLst>
+          </p:cNvPr>
+          <p:cNvPicPr>
+            <a:picLocks noChangeAspect="1"/>
+          </p:cNvPicPr>
+          <p:nvPr/>
+        </p:nvPicPr>
+        <p:blipFill>
+          <a:blip r:embed="rId4"/>
+          <a:stretch>
+            <a:fillRect/>
+          </a:stretch>
+        </p:blipFill>
+        <p:spPr>
+          <a:xfrm>
+            <a:off x="1398352" y="3737498"/>
+            <a:ext cx="2249976" cy="2983245"/>
+          </a:xfrm>
+          <a:prstGeom prst="rect">
+            <a:avLst/>
+          </a:prstGeom>
+        </p:spPr>
+      </p:pic>
+      <p:sp>
+        <p:nvSpPr>
+          <p:cNvPr id="8" name="TextBox 7">
+            <a:extLst>
+              <a:ext uri="{FF2B5EF4-FFF2-40B4-BE49-F238E27FC236}">
+                <a16:creationId xmlns:a16="http://schemas.microsoft.com/office/drawing/2014/main" id="{733D912C-E11C-4ECB-A4C1-64211ADCDFFC}"/>
+              </a:ext>
+            </a:extLst>
+          </p:cNvPr>
+          <p:cNvSpPr txBox="1"/>
+          <p:nvPr/>
+        </p:nvSpPr>
+        <p:spPr>
+          <a:xfrm>
+            <a:off x="2066445" y="6663562"/>
+            <a:ext cx="1754042" cy="276999"/>
+          </a:xfrm>
+          <a:prstGeom prst="rect">
+            <a:avLst/>
+          </a:prstGeom>
+          <a:noFill/>
+        </p:spPr>
+        <p:txBody>
+          <a:bodyPr wrap="square" rtlCol="0">
+            <a:spAutoFit/>
+          </a:bodyPr>
+          <a:lstStyle/>
+          <a:p>
+            <a:r>
+              <a:rPr lang="en-NZ" sz="1200" b="1" dirty="0"/>
+              <a:t>9300 rows (33.3%)</a:t>
+            </a:r>
+            <a:endParaRPr lang="en-GB" sz="1200" b="1" dirty="0"/>
+          </a:p>
+        </p:txBody>
+      </p:sp>
+      <p:pic>
+        <p:nvPicPr>
+          <p:cNvPr id="5" name="Picture 4">
+            <a:extLst>
+              <a:ext uri="{FF2B5EF4-FFF2-40B4-BE49-F238E27FC236}">
+                <a16:creationId xmlns:a16="http://schemas.microsoft.com/office/drawing/2014/main" id="{33E26E9D-11BD-46B8-A2C6-4ECB6E0ECE9C}"/>
+              </a:ext>
+            </a:extLst>
+          </p:cNvPr>
+          <p:cNvPicPr>
+            <a:picLocks noChangeAspect="1"/>
+          </p:cNvPicPr>
+          <p:nvPr/>
+        </p:nvPicPr>
+        <p:blipFill>
+          <a:blip r:embed="rId5"/>
+          <a:stretch>
+            <a:fillRect/>
+          </a:stretch>
+        </p:blipFill>
+        <p:spPr>
+          <a:xfrm>
+            <a:off x="7405206" y="269433"/>
+            <a:ext cx="2242384" cy="3150838"/>
+          </a:xfrm>
+          <a:prstGeom prst="rect">
+            <a:avLst/>
+          </a:prstGeom>
+        </p:spPr>
+      </p:pic>
+      <p:sp>
+        <p:nvSpPr>
+          <p:cNvPr id="10" name="TextBox 9">
+            <a:extLst>
+              <a:ext uri="{FF2B5EF4-FFF2-40B4-BE49-F238E27FC236}">
+                <a16:creationId xmlns:a16="http://schemas.microsoft.com/office/drawing/2014/main" id="{A3FA2DF3-A9CD-4AEE-A909-C632486E585B}"/>
+              </a:ext>
+            </a:extLst>
+          </p:cNvPr>
+          <p:cNvSpPr txBox="1"/>
+          <p:nvPr/>
+        </p:nvSpPr>
+        <p:spPr>
+          <a:xfrm>
+            <a:off x="7955703" y="3420270"/>
+            <a:ext cx="1754042" cy="276999"/>
+          </a:xfrm>
+          <a:prstGeom prst="rect">
+            <a:avLst/>
+          </a:prstGeom>
+          <a:noFill/>
+        </p:spPr>
+        <p:txBody>
+          <a:bodyPr wrap="square" rtlCol="0">
+            <a:spAutoFit/>
+          </a:bodyPr>
+          <a:lstStyle/>
+          <a:p>
+            <a:r>
+              <a:rPr lang="en-NZ" sz="1200" b="1" dirty="0"/>
+              <a:t>3500 rows (12.5%)</a:t>
+            </a:r>
+            <a:endParaRPr lang="en-GB" sz="1200" b="1" dirty="0"/>
+          </a:p>
+        </p:txBody>
+      </p:sp>
+      <p:sp>
+        <p:nvSpPr>
+          <p:cNvPr id="11" name="TextBox 10">
+            <a:extLst>
+              <a:ext uri="{FF2B5EF4-FFF2-40B4-BE49-F238E27FC236}">
+                <a16:creationId xmlns:a16="http://schemas.microsoft.com/office/drawing/2014/main" id="{4A362668-D9C9-4ED0-A99E-D8EDFA58C845}"/>
+              </a:ext>
+            </a:extLst>
+          </p:cNvPr>
+          <p:cNvSpPr txBox="1"/>
+          <p:nvPr/>
+        </p:nvSpPr>
+        <p:spPr>
+          <a:xfrm>
+            <a:off x="10327442" y="3475903"/>
+            <a:ext cx="1249619" cy="184666"/>
+          </a:xfrm>
+          <a:prstGeom prst="rect">
+            <a:avLst/>
+          </a:prstGeom>
+          <a:solidFill>
+            <a:schemeClr val="bg1"/>
+          </a:solidFill>
+        </p:spPr>
+        <p:txBody>
+          <a:bodyPr wrap="square" lIns="0" tIns="0" rIns="0" bIns="0" rtlCol="0">
+            <a:spAutoFit/>
+          </a:bodyPr>
+          <a:lstStyle/>
+          <a:p>
+            <a:pPr algn="ctr"/>
+            <a:r>
+              <a:rPr lang="en-NZ" sz="1200" b="1" dirty="0"/>
+              <a:t>2800 rows (10%)</a:t>
+            </a:r>
+            <a:endParaRPr lang="en-GB" sz="1200" b="1" dirty="0"/>
+          </a:p>
+        </p:txBody>
+      </p:sp>
+      <p:sp>
+        <p:nvSpPr>
+          <p:cNvPr id="12" name="TextBox 11">
+            <a:extLst>
+              <a:ext uri="{FF2B5EF4-FFF2-40B4-BE49-F238E27FC236}">
+                <a16:creationId xmlns:a16="http://schemas.microsoft.com/office/drawing/2014/main" id="{2A0533B2-B75F-4BD3-83B6-402337A5AABD}"/>
+              </a:ext>
+            </a:extLst>
+          </p:cNvPr>
+          <p:cNvSpPr txBox="1"/>
+          <p:nvPr/>
+        </p:nvSpPr>
+        <p:spPr>
+          <a:xfrm>
+            <a:off x="3249912" y="3499738"/>
+            <a:ext cx="1249619" cy="184666"/>
+          </a:xfrm>
+          <a:prstGeom prst="rect">
+            <a:avLst/>
+          </a:prstGeom>
+          <a:solidFill>
+            <a:schemeClr val="bg1"/>
+          </a:solidFill>
+        </p:spPr>
+        <p:txBody>
+          <a:bodyPr wrap="square" lIns="0" tIns="0" rIns="0" bIns="0" rtlCol="0">
+            <a:spAutoFit/>
+          </a:bodyPr>
+          <a:lstStyle/>
+          <a:p>
+            <a:pPr algn="ctr"/>
+            <a:r>
+              <a:rPr lang="en-NZ" sz="1200" b="1" dirty="0"/>
+              <a:t>7000 rows (25%)</a:t>
+            </a:r>
+            <a:endParaRPr lang="en-GB" sz="1200" b="1" dirty="0"/>
+          </a:p>
+        </p:txBody>
+      </p:sp>
+      <p:sp>
+        <p:nvSpPr>
+          <p:cNvPr id="13" name="TextBox 12">
+            <a:extLst>
+              <a:ext uri="{FF2B5EF4-FFF2-40B4-BE49-F238E27FC236}">
+                <a16:creationId xmlns:a16="http://schemas.microsoft.com/office/drawing/2014/main" id="{4EEECA04-5A1D-4294-ADD4-6F2DC3FCBA65}"/>
+              </a:ext>
+            </a:extLst>
+          </p:cNvPr>
+          <p:cNvSpPr txBox="1"/>
+          <p:nvPr/>
+        </p:nvSpPr>
+        <p:spPr>
+          <a:xfrm>
+            <a:off x="647200" y="3472186"/>
+            <a:ext cx="1249619" cy="184666"/>
+          </a:xfrm>
+          <a:prstGeom prst="rect">
+            <a:avLst/>
+          </a:prstGeom>
+          <a:solidFill>
+            <a:schemeClr val="bg1"/>
+          </a:solidFill>
+        </p:spPr>
+        <p:txBody>
+          <a:bodyPr wrap="square" lIns="0" tIns="0" rIns="0" bIns="0" rtlCol="0">
+            <a:spAutoFit/>
+          </a:bodyPr>
+          <a:lstStyle/>
+          <a:p>
+            <a:pPr algn="ctr"/>
+            <a:r>
+              <a:rPr lang="en-NZ" sz="1200" b="1" dirty="0"/>
+              <a:t>28000 rows (100%)</a:t>
+            </a:r>
+            <a:endParaRPr lang="en-GB" sz="1200" b="1" dirty="0"/>
           </a:p>
         </p:txBody>
       </p:sp>
     </p:spTree>
     <p:extLst>
       <p:ext uri="{BB962C8B-B14F-4D97-AF65-F5344CB8AC3E}">
-        <p14:creationId xmlns:p14="http://schemas.microsoft.com/office/powerpoint/2010/main" val="4028263462"/>
+        <p14:creationId xmlns:p14="http://schemas.microsoft.com/office/powerpoint/2010/main" val="4234346216"/>
       </p:ext>
     </p:extLst>
   </p:cSld>
@@ -4021,12 +4772,77 @@
           <a:chExt cx="0" cy="0"/>
         </a:xfrm>
       </p:grpSpPr>
+      <p:sp>
+        <p:nvSpPr>
+          <p:cNvPr id="12" name="TextBox 11">
+            <a:extLst>
+              <a:ext uri="{FF2B5EF4-FFF2-40B4-BE49-F238E27FC236}">
+                <a16:creationId xmlns:a16="http://schemas.microsoft.com/office/drawing/2014/main" id="{4548F36B-678E-47C5-91AE-286503C037C9}"/>
+              </a:ext>
+            </a:extLst>
+          </p:cNvPr>
+          <p:cNvSpPr txBox="1"/>
+          <p:nvPr/>
+        </p:nvSpPr>
+        <p:spPr>
+          <a:xfrm>
+            <a:off x="0" y="0"/>
+            <a:ext cx="10571201" cy="369332"/>
+          </a:xfrm>
+          <a:prstGeom prst="rect">
+            <a:avLst/>
+          </a:prstGeom>
+          <a:noFill/>
+        </p:spPr>
+        <p:txBody>
+          <a:bodyPr wrap="square" rtlCol="0">
+            <a:spAutoFit/>
+          </a:bodyPr>
+          <a:lstStyle/>
+          <a:p>
+            <a:r>
+              <a:rPr lang="en-NZ" b="1" dirty="0"/>
+              <a:t>Runs when changing the number of variables (columns) inputted into the model with different subsets (rows)</a:t>
+            </a:r>
+            <a:endParaRPr lang="en-GB" b="1" dirty="0"/>
+          </a:p>
+        </p:txBody>
+      </p:sp>
       <p:pic>
         <p:nvPicPr>
-          <p:cNvPr id="7" name="Picture 6">
-            <a:extLst>
-              <a:ext uri="{FF2B5EF4-FFF2-40B4-BE49-F238E27FC236}">
-                <a16:creationId xmlns:a16="http://schemas.microsoft.com/office/drawing/2014/main" id="{2EB162D9-0AF6-4EEC-9470-3D283E1A30A7}"/>
+          <p:cNvPr id="14" name="Picture 13">
+            <a:extLst>
+              <a:ext uri="{FF2B5EF4-FFF2-40B4-BE49-F238E27FC236}">
+                <a16:creationId xmlns:a16="http://schemas.microsoft.com/office/drawing/2014/main" id="{698C36F5-A06C-4A52-B19C-2A3E678AB3E7}"/>
+              </a:ext>
+            </a:extLst>
+          </p:cNvPr>
+          <p:cNvPicPr>
+            <a:picLocks noChangeAspect="1"/>
+          </p:cNvPicPr>
+          <p:nvPr/>
+        </p:nvPicPr>
+        <p:blipFill rotWithShape="1">
+          <a:blip r:embed="rId2"/>
+          <a:srcRect r="2712"/>
+          <a:stretch/>
+        </p:blipFill>
+        <p:spPr>
+          <a:xfrm>
+            <a:off x="221942" y="519343"/>
+            <a:ext cx="6012180" cy="6116715"/>
+          </a:xfrm>
+          <a:prstGeom prst="rect">
+            <a:avLst/>
+          </a:prstGeom>
+        </p:spPr>
+      </p:pic>
+      <p:pic>
+        <p:nvPicPr>
+          <p:cNvPr id="4" name="Picture 3">
+            <a:extLst>
+              <a:ext uri="{FF2B5EF4-FFF2-40B4-BE49-F238E27FC236}">
+                <a16:creationId xmlns:a16="http://schemas.microsoft.com/office/drawing/2014/main" id="{5FBB0C58-6A68-4223-B003-39934B994C1A}"/>
               </a:ext>
             </a:extLst>
           </p:cNvPr>
@@ -4036,67 +4852,144 @@
           <p:nvPr/>
         </p:nvPicPr>
         <p:blipFill>
-          <a:blip r:embed="rId2">
-            <a:extLst>
-              <a:ext uri="{28A0092B-C50C-407E-A947-70E740481C1C}">
-                <a14:useLocalDpi xmlns:a14="http://schemas.microsoft.com/office/drawing/2010/main" val="0"/>
-              </a:ext>
-            </a:extLst>
-          </a:blip>
+          <a:blip r:embed="rId3"/>
           <a:stretch>
             <a:fillRect/>
           </a:stretch>
         </p:blipFill>
         <p:spPr>
           <a:xfrm>
-            <a:off x="0" y="485730"/>
-            <a:ext cx="12192000" cy="5886540"/>
+            <a:off x="221942" y="3684323"/>
+            <a:ext cx="2019300" cy="2951735"/>
           </a:xfrm>
           <a:prstGeom prst="rect">
             <a:avLst/>
           </a:prstGeom>
         </p:spPr>
       </p:pic>
-      <p:sp>
-        <p:nvSpPr>
-          <p:cNvPr id="8" name="TextBox 7">
-            <a:extLst>
-              <a:ext uri="{FF2B5EF4-FFF2-40B4-BE49-F238E27FC236}">
-                <a16:creationId xmlns:a16="http://schemas.microsoft.com/office/drawing/2014/main" id="{835291A4-5C31-468E-853D-5CC31B696586}"/>
-              </a:ext>
-            </a:extLst>
-          </p:cNvPr>
-          <p:cNvSpPr txBox="1"/>
+      <p:pic>
+        <p:nvPicPr>
+          <p:cNvPr id="5" name="Picture 4">
+            <a:extLst>
+              <a:ext uri="{FF2B5EF4-FFF2-40B4-BE49-F238E27FC236}">
+                <a16:creationId xmlns:a16="http://schemas.microsoft.com/office/drawing/2014/main" id="{88DC834C-44DD-436C-8CCC-AD149AC5AD7A}"/>
+              </a:ext>
+            </a:extLst>
+          </p:cNvPr>
+          <p:cNvPicPr>
+            <a:picLocks noChangeAspect="1"/>
+          </p:cNvPicPr>
           <p:nvPr/>
-        </p:nvSpPr>
-        <p:spPr>
-          <a:xfrm>
-            <a:off x="0" y="-9525"/>
-            <a:ext cx="7275589" cy="369332"/>
+        </p:nvPicPr>
+        <p:blipFill>
+          <a:blip r:embed="rId4"/>
+          <a:stretch>
+            <a:fillRect/>
+          </a:stretch>
+        </p:blipFill>
+        <p:spPr>
+          <a:xfrm>
+            <a:off x="2241242" y="3711343"/>
+            <a:ext cx="1935480" cy="2840895"/>
           </a:xfrm>
           <a:prstGeom prst="rect">
             <a:avLst/>
           </a:prstGeom>
-          <a:noFill/>
-        </p:spPr>
-        <p:txBody>
-          <a:bodyPr wrap="square" rtlCol="0">
-            <a:spAutoFit/>
-          </a:bodyPr>
-          <a:lstStyle/>
-          <a:p>
-            <a:r>
-              <a:rPr lang="en-NZ" b="1" dirty="0"/>
-              <a:t>All 10 combination of 10% subset runs – variable weighting distribution</a:t>
-            </a:r>
-            <a:endParaRPr lang="en-GB" b="1" dirty="0"/>
-          </a:p>
-        </p:txBody>
-      </p:sp>
+        </p:spPr>
+      </p:pic>
+      <p:pic>
+        <p:nvPicPr>
+          <p:cNvPr id="6" name="Picture 5">
+            <a:extLst>
+              <a:ext uri="{FF2B5EF4-FFF2-40B4-BE49-F238E27FC236}">
+                <a16:creationId xmlns:a16="http://schemas.microsoft.com/office/drawing/2014/main" id="{92CA5A2C-2A9E-4C6C-8CFA-588C2CB7DF67}"/>
+              </a:ext>
+            </a:extLst>
+          </p:cNvPr>
+          <p:cNvPicPr>
+            <a:picLocks noChangeAspect="1"/>
+          </p:cNvPicPr>
+          <p:nvPr/>
+        </p:nvPicPr>
+        <p:blipFill rotWithShape="1">
+          <a:blip r:embed="rId5"/>
+          <a:srcRect t="16750" r="52170"/>
+          <a:stretch/>
+        </p:blipFill>
+        <p:spPr>
+          <a:xfrm>
+            <a:off x="8156717" y="3327204"/>
+            <a:ext cx="3268846" cy="436547"/>
+          </a:xfrm>
+          <a:prstGeom prst="rect">
+            <a:avLst/>
+          </a:prstGeom>
+        </p:spPr>
+      </p:pic>
+      <p:pic>
+        <p:nvPicPr>
+          <p:cNvPr id="7" name="Picture 6">
+            <a:extLst>
+              <a:ext uri="{FF2B5EF4-FFF2-40B4-BE49-F238E27FC236}">
+                <a16:creationId xmlns:a16="http://schemas.microsoft.com/office/drawing/2014/main" id="{D6206348-472E-4BF2-8580-7C55643F1BFE}"/>
+              </a:ext>
+            </a:extLst>
+          </p:cNvPr>
+          <p:cNvPicPr>
+            <a:picLocks noChangeAspect="1"/>
+          </p:cNvPicPr>
+          <p:nvPr/>
+        </p:nvPicPr>
+        <p:blipFill>
+          <a:blip r:embed="rId6"/>
+          <a:stretch>
+            <a:fillRect/>
+          </a:stretch>
+        </p:blipFill>
+        <p:spPr>
+          <a:xfrm>
+            <a:off x="7523626" y="3745995"/>
+            <a:ext cx="2006988" cy="2890063"/>
+          </a:xfrm>
+          <a:prstGeom prst="rect">
+            <a:avLst/>
+          </a:prstGeom>
+        </p:spPr>
+      </p:pic>
+      <p:pic>
+        <p:nvPicPr>
+          <p:cNvPr id="2" name="Picture 1">
+            <a:extLst>
+              <a:ext uri="{FF2B5EF4-FFF2-40B4-BE49-F238E27FC236}">
+                <a16:creationId xmlns:a16="http://schemas.microsoft.com/office/drawing/2014/main" id="{8CAD5C9B-6066-4623-BEC1-4D995F4A70E8}"/>
+              </a:ext>
+            </a:extLst>
+          </p:cNvPr>
+          <p:cNvPicPr>
+            <a:picLocks noChangeAspect="1"/>
+          </p:cNvPicPr>
+          <p:nvPr/>
+        </p:nvPicPr>
+        <p:blipFill>
+          <a:blip r:embed="rId7"/>
+          <a:stretch>
+            <a:fillRect/>
+          </a:stretch>
+        </p:blipFill>
+        <p:spPr>
+          <a:xfrm>
+            <a:off x="9675531" y="3745995"/>
+            <a:ext cx="1975223" cy="2890062"/>
+          </a:xfrm>
+          <a:prstGeom prst="rect">
+            <a:avLst/>
+          </a:prstGeom>
+        </p:spPr>
+      </p:pic>
     </p:spTree>
     <p:extLst>
       <p:ext uri="{BB962C8B-B14F-4D97-AF65-F5344CB8AC3E}">
-        <p14:creationId xmlns:p14="http://schemas.microsoft.com/office/powerpoint/2010/main" val="1511892141"/>
+        <p14:creationId xmlns:p14="http://schemas.microsoft.com/office/powerpoint/2010/main" val="437272149"/>
       </p:ext>
     </p:extLst>
   </p:cSld>
@@ -4125,10 +5018,10 @@
       </p:grpSpPr>
       <p:sp>
         <p:nvSpPr>
-          <p:cNvPr id="12" name="TextBox 11">
-            <a:extLst>
-              <a:ext uri="{FF2B5EF4-FFF2-40B4-BE49-F238E27FC236}">
-                <a16:creationId xmlns:a16="http://schemas.microsoft.com/office/drawing/2014/main" id="{4548F36B-678E-47C5-91AE-286503C037C9}"/>
+          <p:cNvPr id="4" name="TextBox 3">
+            <a:extLst>
+              <a:ext uri="{FF2B5EF4-FFF2-40B4-BE49-F238E27FC236}">
+                <a16:creationId xmlns:a16="http://schemas.microsoft.com/office/drawing/2014/main" id="{64241607-64F3-4737-969B-89D2D3FAEEAD}"/>
               </a:ext>
             </a:extLst>
           </p:cNvPr>
@@ -4138,7 +5031,7 @@
         <p:spPr>
           <a:xfrm>
             <a:off x="0" y="0"/>
-            <a:ext cx="10571201" cy="369332"/>
+            <a:ext cx="12191999" cy="461665"/>
           </a:xfrm>
           <a:prstGeom prst="rect">
             <a:avLst/>
@@ -4152,19 +5045,19 @@
           <a:lstStyle/>
           <a:p>
             <a:r>
-              <a:rPr lang="en-NZ" b="1" dirty="0"/>
-              <a:t>Runs when changing the number of variables (columns) inputted into the model with different subsets (rows)</a:t>
-            </a:r>
-            <a:endParaRPr lang="en-GB" b="1" dirty="0"/>
+              <a:rPr lang="en-NZ" sz="2400" b="1" dirty="0"/>
+              <a:t>Distribution of values in distance matrix used for MST/shortest path trajectory calculation</a:t>
+            </a:r>
+            <a:endParaRPr lang="en-GB" sz="2400" b="1" dirty="0"/>
           </a:p>
         </p:txBody>
       </p:sp>
       <p:pic>
         <p:nvPicPr>
-          <p:cNvPr id="14" name="Picture 13">
-            <a:extLst>
-              <a:ext uri="{FF2B5EF4-FFF2-40B4-BE49-F238E27FC236}">
-                <a16:creationId xmlns:a16="http://schemas.microsoft.com/office/drawing/2014/main" id="{698C36F5-A06C-4A52-B19C-2A3E678AB3E7}"/>
+          <p:cNvPr id="10" name="Picture 9">
+            <a:extLst>
+              <a:ext uri="{FF2B5EF4-FFF2-40B4-BE49-F238E27FC236}">
+                <a16:creationId xmlns:a16="http://schemas.microsoft.com/office/drawing/2014/main" id="{56915DDB-28FE-4C98-A988-52AAB828CD0E}"/>
               </a:ext>
             </a:extLst>
           </p:cNvPr>
@@ -4173,15 +5066,16 @@
           </p:cNvPicPr>
           <p:nvPr/>
         </p:nvPicPr>
-        <p:blipFill rotWithShape="1">
+        <p:blipFill>
           <a:blip r:embed="rId2"/>
-          <a:srcRect r="2712"/>
-          <a:stretch/>
+          <a:stretch>
+            <a:fillRect/>
+          </a:stretch>
         </p:blipFill>
         <p:spPr>
           <a:xfrm>
-            <a:off x="0" y="741285"/>
-            <a:ext cx="6012180" cy="6116715"/>
+            <a:off x="88324" y="474186"/>
+            <a:ext cx="2207780" cy="2017214"/>
           </a:xfrm>
           <a:prstGeom prst="rect">
             <a:avLst/>
@@ -4190,10 +5084,10 @@
       </p:pic>
       <p:pic>
         <p:nvPicPr>
-          <p:cNvPr id="4" name="Picture 3">
-            <a:extLst>
-              <a:ext uri="{FF2B5EF4-FFF2-40B4-BE49-F238E27FC236}">
-                <a16:creationId xmlns:a16="http://schemas.microsoft.com/office/drawing/2014/main" id="{5FBB0C58-6A68-4223-B003-39934B994C1A}"/>
+          <p:cNvPr id="11" name="Picture 10">
+            <a:extLst>
+              <a:ext uri="{FF2B5EF4-FFF2-40B4-BE49-F238E27FC236}">
+                <a16:creationId xmlns:a16="http://schemas.microsoft.com/office/drawing/2014/main" id="{E9018FE1-13A1-41CA-A09A-8CB1803AE66F}"/>
               </a:ext>
             </a:extLst>
           </p:cNvPr>
@@ -4210,8 +5104,8 @@
         </p:blipFill>
         <p:spPr>
           <a:xfrm>
-            <a:off x="0" y="3906265"/>
-            <a:ext cx="2019300" cy="2951735"/>
+            <a:off x="7005227" y="461665"/>
+            <a:ext cx="2388936" cy="2017214"/>
           </a:xfrm>
           <a:prstGeom prst="rect">
             <a:avLst/>
@@ -4220,10 +5114,10 @@
       </p:pic>
       <p:pic>
         <p:nvPicPr>
-          <p:cNvPr id="5" name="Picture 4">
-            <a:extLst>
-              <a:ext uri="{FF2B5EF4-FFF2-40B4-BE49-F238E27FC236}">
-                <a16:creationId xmlns:a16="http://schemas.microsoft.com/office/drawing/2014/main" id="{88DC834C-44DD-436C-8CCC-AD149AC5AD7A}"/>
+          <p:cNvPr id="2" name="Picture 1">
+            <a:extLst>
+              <a:ext uri="{FF2B5EF4-FFF2-40B4-BE49-F238E27FC236}">
+                <a16:creationId xmlns:a16="http://schemas.microsoft.com/office/drawing/2014/main" id="{FD4B9965-2B8C-4A28-8D4C-DAE9DF88450A}"/>
               </a:ext>
             </a:extLst>
           </p:cNvPr>
@@ -4240,8 +5134,8 @@
         </p:blipFill>
         <p:spPr>
           <a:xfrm>
-            <a:off x="2019300" y="3933285"/>
-            <a:ext cx="1935480" cy="2840895"/>
+            <a:off x="4657565" y="461665"/>
+            <a:ext cx="2347662" cy="2017214"/>
           </a:xfrm>
           <a:prstGeom prst="rect">
             <a:avLst/>
@@ -4250,10 +5144,10 @@
       </p:pic>
       <p:pic>
         <p:nvPicPr>
-          <p:cNvPr id="6" name="Picture 5">
-            <a:extLst>
-              <a:ext uri="{FF2B5EF4-FFF2-40B4-BE49-F238E27FC236}">
-                <a16:creationId xmlns:a16="http://schemas.microsoft.com/office/drawing/2014/main" id="{92CA5A2C-2A9E-4C6C-8CFA-588C2CB7DF67}"/>
+          <p:cNvPr id="7" name="Picture 6">
+            <a:extLst>
+              <a:ext uri="{FF2B5EF4-FFF2-40B4-BE49-F238E27FC236}">
+                <a16:creationId xmlns:a16="http://schemas.microsoft.com/office/drawing/2014/main" id="{9A5BDDF7-7C18-474A-BA19-312A5AD8E659}"/>
               </a:ext>
             </a:extLst>
           </p:cNvPr>
@@ -4262,15 +5156,16 @@
           </p:cNvPicPr>
           <p:nvPr/>
         </p:nvPicPr>
-        <p:blipFill rotWithShape="1">
+        <p:blipFill>
           <a:blip r:embed="rId5"/>
-          <a:srcRect t="16750" r="19730"/>
-          <a:stretch/>
+          <a:stretch>
+            <a:fillRect/>
+          </a:stretch>
         </p:blipFill>
         <p:spPr>
           <a:xfrm>
-            <a:off x="7251193" y="2035515"/>
-            <a:ext cx="4306824" cy="342727"/>
+            <a:off x="96315" y="4822413"/>
+            <a:ext cx="2199789" cy="2039290"/>
           </a:xfrm>
           <a:prstGeom prst="rect">
             <a:avLst/>
@@ -4279,10 +5174,10 @@
       </p:pic>
       <p:pic>
         <p:nvPicPr>
-          <p:cNvPr id="7" name="Picture 6">
-            <a:extLst>
-              <a:ext uri="{FF2B5EF4-FFF2-40B4-BE49-F238E27FC236}">
-                <a16:creationId xmlns:a16="http://schemas.microsoft.com/office/drawing/2014/main" id="{D6206348-472E-4BF2-8580-7C55643F1BFE}"/>
+          <p:cNvPr id="8" name="Picture 7">
+            <a:extLst>
+              <a:ext uri="{FF2B5EF4-FFF2-40B4-BE49-F238E27FC236}">
+                <a16:creationId xmlns:a16="http://schemas.microsoft.com/office/drawing/2014/main" id="{959F5EC5-53F6-4F6A-B348-BEEFFD3957D1}"/>
               </a:ext>
             </a:extLst>
           </p:cNvPr>
@@ -4299,8 +5194,158 @@
         </p:blipFill>
         <p:spPr>
           <a:xfrm>
-            <a:off x="6484938" y="2378242"/>
-            <a:ext cx="2006988" cy="2890063"/>
+            <a:off x="7005228" y="2642229"/>
+            <a:ext cx="2275895" cy="2062046"/>
+          </a:xfrm>
+          <a:prstGeom prst="rect">
+            <a:avLst/>
+          </a:prstGeom>
+        </p:spPr>
+      </p:pic>
+      <p:pic>
+        <p:nvPicPr>
+          <p:cNvPr id="9" name="Picture 8">
+            <a:extLst>
+              <a:ext uri="{FF2B5EF4-FFF2-40B4-BE49-F238E27FC236}">
+                <a16:creationId xmlns:a16="http://schemas.microsoft.com/office/drawing/2014/main" id="{611A8E4F-F107-49CB-A86C-3CE576B6594E}"/>
+              </a:ext>
+            </a:extLst>
+          </p:cNvPr>
+          <p:cNvPicPr>
+            <a:picLocks noChangeAspect="1"/>
+          </p:cNvPicPr>
+          <p:nvPr/>
+        </p:nvPicPr>
+        <p:blipFill>
+          <a:blip r:embed="rId7"/>
+          <a:stretch>
+            <a:fillRect/>
+          </a:stretch>
+        </p:blipFill>
+        <p:spPr>
+          <a:xfrm>
+            <a:off x="88324" y="2699580"/>
+            <a:ext cx="2199789" cy="2017215"/>
+          </a:xfrm>
+          <a:prstGeom prst="rect">
+            <a:avLst/>
+          </a:prstGeom>
+        </p:spPr>
+      </p:pic>
+      <p:pic>
+        <p:nvPicPr>
+          <p:cNvPr id="12" name="Picture 11">
+            <a:extLst>
+              <a:ext uri="{FF2B5EF4-FFF2-40B4-BE49-F238E27FC236}">
+                <a16:creationId xmlns:a16="http://schemas.microsoft.com/office/drawing/2014/main" id="{8C9FBEA2-1726-40D3-953F-668829D2E228}"/>
+              </a:ext>
+            </a:extLst>
+          </p:cNvPr>
+          <p:cNvPicPr>
+            <a:picLocks noChangeAspect="1"/>
+          </p:cNvPicPr>
+          <p:nvPr/>
+        </p:nvPicPr>
+        <p:blipFill>
+          <a:blip r:embed="rId8"/>
+          <a:stretch>
+            <a:fillRect/>
+          </a:stretch>
+        </p:blipFill>
+        <p:spPr>
+          <a:xfrm>
+            <a:off x="7005227" y="4801834"/>
+            <a:ext cx="2199789" cy="2043645"/>
+          </a:xfrm>
+          <a:prstGeom prst="rect">
+            <a:avLst/>
+          </a:prstGeom>
+        </p:spPr>
+      </p:pic>
+      <p:pic>
+        <p:nvPicPr>
+          <p:cNvPr id="13" name="Picture 12">
+            <a:extLst>
+              <a:ext uri="{FF2B5EF4-FFF2-40B4-BE49-F238E27FC236}">
+                <a16:creationId xmlns:a16="http://schemas.microsoft.com/office/drawing/2014/main" id="{D5BF4313-5326-4470-804E-1A4974D361E1}"/>
+              </a:ext>
+            </a:extLst>
+          </p:cNvPr>
+          <p:cNvPicPr>
+            <a:picLocks noChangeAspect="1"/>
+          </p:cNvPicPr>
+          <p:nvPr/>
+        </p:nvPicPr>
+        <p:blipFill>
+          <a:blip r:embed="rId9"/>
+          <a:stretch>
+            <a:fillRect/>
+          </a:stretch>
+        </p:blipFill>
+        <p:spPr>
+          <a:xfrm>
+            <a:off x="9394163" y="455404"/>
+            <a:ext cx="2202478" cy="2029735"/>
+          </a:xfrm>
+          <a:prstGeom prst="rect">
+            <a:avLst/>
+          </a:prstGeom>
+        </p:spPr>
+      </p:pic>
+      <p:pic>
+        <p:nvPicPr>
+          <p:cNvPr id="3" name="Picture 2">
+            <a:extLst>
+              <a:ext uri="{FF2B5EF4-FFF2-40B4-BE49-F238E27FC236}">
+                <a16:creationId xmlns:a16="http://schemas.microsoft.com/office/drawing/2014/main" id="{9CD36BFD-C338-4C51-816E-58CA5BA5D4C8}"/>
+              </a:ext>
+            </a:extLst>
+          </p:cNvPr>
+          <p:cNvPicPr>
+            <a:picLocks noChangeAspect="1"/>
+          </p:cNvPicPr>
+          <p:nvPr/>
+        </p:nvPicPr>
+        <p:blipFill>
+          <a:blip r:embed="rId10"/>
+          <a:stretch>
+            <a:fillRect/>
+          </a:stretch>
+        </p:blipFill>
+        <p:spPr>
+          <a:xfrm>
+            <a:off x="4657565" y="2642228"/>
+            <a:ext cx="2347662" cy="2106876"/>
+          </a:xfrm>
+          <a:prstGeom prst="rect">
+            <a:avLst/>
+          </a:prstGeom>
+        </p:spPr>
+      </p:pic>
+      <p:pic>
+        <p:nvPicPr>
+          <p:cNvPr id="6" name="Picture 5">
+            <a:extLst>
+              <a:ext uri="{FF2B5EF4-FFF2-40B4-BE49-F238E27FC236}">
+                <a16:creationId xmlns:a16="http://schemas.microsoft.com/office/drawing/2014/main" id="{537EC218-CBE3-4119-BF6B-54BB7C56C594}"/>
+              </a:ext>
+            </a:extLst>
+          </p:cNvPr>
+          <p:cNvPicPr>
+            <a:picLocks noChangeAspect="1"/>
+          </p:cNvPicPr>
+          <p:nvPr/>
+        </p:nvPicPr>
+        <p:blipFill>
+          <a:blip r:embed="rId11"/>
+          <a:stretch>
+            <a:fillRect/>
+          </a:stretch>
+        </p:blipFill>
+        <p:spPr>
+          <a:xfrm>
+            <a:off x="2350232" y="454822"/>
+            <a:ext cx="2388936" cy="2067735"/>
           </a:xfrm>
           <a:prstGeom prst="rect">
             <a:avLst/>
@@ -4310,7 +5355,7 @@
     </p:spTree>
     <p:extLst>
       <p:ext uri="{BB962C8B-B14F-4D97-AF65-F5344CB8AC3E}">
-        <p14:creationId xmlns:p14="http://schemas.microsoft.com/office/powerpoint/2010/main" val="437272149"/>
+        <p14:creationId xmlns:p14="http://schemas.microsoft.com/office/powerpoint/2010/main" val="1920508232"/>
       </p:ext>
     </p:extLst>
   </p:cSld>
@@ -4342,7 +5387,7 @@
           <p:cNvPr id="5" name="Picture 4">
             <a:extLst>
               <a:ext uri="{FF2B5EF4-FFF2-40B4-BE49-F238E27FC236}">
-                <a16:creationId xmlns:a16="http://schemas.microsoft.com/office/drawing/2014/main" id="{A2D96899-916E-4667-967A-53C75DE0B124}"/>
+                <a16:creationId xmlns:a16="http://schemas.microsoft.com/office/drawing/2014/main" id="{57F5CD76-A121-47E7-8D5C-78EB781D67BC}"/>
               </a:ext>
             </a:extLst>
           </p:cNvPr>
@@ -4365,8 +5410,8 @@
         </p:blipFill>
         <p:spPr>
           <a:xfrm>
-            <a:off x="799707" y="2129363"/>
-            <a:ext cx="10097909" cy="3648584"/>
+            <a:off x="0" y="369332"/>
+            <a:ext cx="12192000" cy="6510995"/>
           </a:xfrm>
           <a:prstGeom prst="rect">
             <a:avLst/>
@@ -4378,7 +5423,7 @@
           <p:cNvPr id="6" name="TextBox 5">
             <a:extLst>
               <a:ext uri="{FF2B5EF4-FFF2-40B4-BE49-F238E27FC236}">
-                <a16:creationId xmlns:a16="http://schemas.microsoft.com/office/drawing/2014/main" id="{7A53C59A-1A95-4FC7-AB43-C7A259FFA6C7}"/>
+                <a16:creationId xmlns:a16="http://schemas.microsoft.com/office/drawing/2014/main" id="{979AE2EC-4AA9-4D1C-9817-4D0290540D4D}"/>
               </a:ext>
             </a:extLst>
           </p:cNvPr>
@@ -4387,8 +5432,8 @@
         </p:nvSpPr>
         <p:spPr>
           <a:xfrm>
-            <a:off x="213989" y="493362"/>
-            <a:ext cx="10571201" cy="369332"/>
+            <a:off x="0" y="-9525"/>
+            <a:ext cx="7275589" cy="369332"/>
           </a:xfrm>
           <a:prstGeom prst="rect">
             <a:avLst/>
@@ -4403,15 +5448,7 @@
           <a:p>
             <a:r>
               <a:rPr lang="en-NZ" b="1" dirty="0"/>
-              <a:t>Runs on subsets of dataset (rows) when only using blood pressure (</a:t>
-            </a:r>
-            <a:r>
-              <a:rPr lang="en-NZ" b="1" dirty="0" err="1"/>
-              <a:t>dia</a:t>
-            </a:r>
-            <a:r>
-              <a:rPr lang="en-NZ" b="1" dirty="0"/>
-              <a:t> &amp; sys) as inputs into the model</a:t>
+              <a:t>All 10 combination of 10% subset runs</a:t>
             </a:r>
             <a:endParaRPr lang="en-GB" b="1" dirty="0"/>
           </a:p>
@@ -4420,7 +5457,7 @@
     </p:spTree>
     <p:extLst>
       <p:ext uri="{BB962C8B-B14F-4D97-AF65-F5344CB8AC3E}">
-        <p14:creationId xmlns:p14="http://schemas.microsoft.com/office/powerpoint/2010/main" val="65343148"/>
+        <p14:creationId xmlns:p14="http://schemas.microsoft.com/office/powerpoint/2010/main" val="4028263462"/>
       </p:ext>
     </p:extLst>
   </p:cSld>
@@ -4447,48 +5484,12 @@
           <a:chExt cx="0" cy="0"/>
         </a:xfrm>
       </p:grpSpPr>
-      <p:sp>
-        <p:nvSpPr>
-          <p:cNvPr id="4" name="TextBox 3">
-            <a:extLst>
-              <a:ext uri="{FF2B5EF4-FFF2-40B4-BE49-F238E27FC236}">
-                <a16:creationId xmlns:a16="http://schemas.microsoft.com/office/drawing/2014/main" id="{64241607-64F3-4737-969B-89D2D3FAEEAD}"/>
-              </a:ext>
-            </a:extLst>
-          </p:cNvPr>
-          <p:cNvSpPr txBox="1"/>
-          <p:nvPr/>
-        </p:nvSpPr>
-        <p:spPr>
-          <a:xfrm>
-            <a:off x="0" y="0"/>
-            <a:ext cx="12191999" cy="461665"/>
-          </a:xfrm>
-          <a:prstGeom prst="rect">
-            <a:avLst/>
-          </a:prstGeom>
-          <a:noFill/>
-        </p:spPr>
-        <p:txBody>
-          <a:bodyPr wrap="square" rtlCol="0">
-            <a:spAutoFit/>
-          </a:bodyPr>
-          <a:lstStyle/>
-          <a:p>
-            <a:r>
-              <a:rPr lang="en-NZ" sz="2400" b="1" dirty="0"/>
-              <a:t>Distribution of values in distance matrix used for MST/shortest path trajectory calculation</a:t>
-            </a:r>
-            <a:endParaRPr lang="en-GB" sz="2400" b="1" dirty="0"/>
-          </a:p>
-        </p:txBody>
-      </p:sp>
       <p:pic>
         <p:nvPicPr>
-          <p:cNvPr id="10" name="Picture 9">
-            <a:extLst>
-              <a:ext uri="{FF2B5EF4-FFF2-40B4-BE49-F238E27FC236}">
-                <a16:creationId xmlns:a16="http://schemas.microsoft.com/office/drawing/2014/main" id="{56915DDB-28FE-4C98-A988-52AAB828CD0E}"/>
+          <p:cNvPr id="7" name="Picture 6">
+            <a:extLst>
+              <a:ext uri="{FF2B5EF4-FFF2-40B4-BE49-F238E27FC236}">
+                <a16:creationId xmlns:a16="http://schemas.microsoft.com/office/drawing/2014/main" id="{2EB162D9-0AF6-4EEC-9470-3D283E1A30A7}"/>
               </a:ext>
             </a:extLst>
           </p:cNvPr>
@@ -4498,27 +5499,99 @@
           <p:nvPr/>
         </p:nvPicPr>
         <p:blipFill>
-          <a:blip r:embed="rId2"/>
+          <a:blip r:embed="rId2">
+            <a:extLst>
+              <a:ext uri="{28A0092B-C50C-407E-A947-70E740481C1C}">
+                <a14:useLocalDpi xmlns:a14="http://schemas.microsoft.com/office/drawing/2010/main" val="0"/>
+              </a:ext>
+            </a:extLst>
+          </a:blip>
           <a:stretch>
             <a:fillRect/>
           </a:stretch>
         </p:blipFill>
         <p:spPr>
           <a:xfrm>
-            <a:off x="170770" y="1018295"/>
-            <a:ext cx="2822326" cy="2578715"/>
+            <a:off x="0" y="485730"/>
+            <a:ext cx="12192000" cy="5886540"/>
           </a:xfrm>
           <a:prstGeom prst="rect">
             <a:avLst/>
           </a:prstGeom>
         </p:spPr>
       </p:pic>
+      <p:sp>
+        <p:nvSpPr>
+          <p:cNvPr id="8" name="TextBox 7">
+            <a:extLst>
+              <a:ext uri="{FF2B5EF4-FFF2-40B4-BE49-F238E27FC236}">
+                <a16:creationId xmlns:a16="http://schemas.microsoft.com/office/drawing/2014/main" id="{835291A4-5C31-468E-853D-5CC31B696586}"/>
+              </a:ext>
+            </a:extLst>
+          </p:cNvPr>
+          <p:cNvSpPr txBox="1"/>
+          <p:nvPr/>
+        </p:nvSpPr>
+        <p:spPr>
+          <a:xfrm>
+            <a:off x="0" y="-9525"/>
+            <a:ext cx="7275589" cy="369332"/>
+          </a:xfrm>
+          <a:prstGeom prst="rect">
+            <a:avLst/>
+          </a:prstGeom>
+          <a:noFill/>
+        </p:spPr>
+        <p:txBody>
+          <a:bodyPr wrap="square" rtlCol="0">
+            <a:spAutoFit/>
+          </a:bodyPr>
+          <a:lstStyle/>
+          <a:p>
+            <a:r>
+              <a:rPr lang="en-NZ" b="1" dirty="0"/>
+              <a:t>All 10 combination of 10% subset runs – variable weighting distribution</a:t>
+            </a:r>
+            <a:endParaRPr lang="en-GB" b="1" dirty="0"/>
+          </a:p>
+        </p:txBody>
+      </p:sp>
+    </p:spTree>
+    <p:extLst>
+      <p:ext uri="{BB962C8B-B14F-4D97-AF65-F5344CB8AC3E}">
+        <p14:creationId xmlns:p14="http://schemas.microsoft.com/office/powerpoint/2010/main" val="1511892141"/>
+      </p:ext>
+    </p:extLst>
+  </p:cSld>
+  <p:clrMapOvr>
+    <a:masterClrMapping/>
+  </p:clrMapOvr>
+</p:sld>
+</file>
+
+<file path=ppt/slides/slide7.xml><?xml version="1.0" encoding="utf-8"?>
+<p:sld xmlns:a="http://schemas.openxmlformats.org/drawingml/2006/main" xmlns:r="http://schemas.openxmlformats.org/officeDocument/2006/relationships" xmlns:p="http://schemas.openxmlformats.org/presentationml/2006/main">
+  <p:cSld>
+    <p:spTree>
+      <p:nvGrpSpPr>
+        <p:cNvPr id="1" name=""/>
+        <p:cNvGrpSpPr/>
+        <p:nvPr/>
+      </p:nvGrpSpPr>
+      <p:grpSpPr>
+        <a:xfrm>
+          <a:off x="0" y="0"/>
+          <a:ext cx="0" cy="0"/>
+          <a:chOff x="0" y="0"/>
+          <a:chExt cx="0" cy="0"/>
+        </a:xfrm>
+      </p:grpSpPr>
       <p:pic>
         <p:nvPicPr>
-          <p:cNvPr id="11" name="Picture 10">
-            <a:extLst>
-              <a:ext uri="{FF2B5EF4-FFF2-40B4-BE49-F238E27FC236}">
-                <a16:creationId xmlns:a16="http://schemas.microsoft.com/office/drawing/2014/main" id="{E9018FE1-13A1-41CA-A09A-8CB1803AE66F}"/>
+          <p:cNvPr id="5" name="Picture 4">
+            <a:extLst>
+              <a:ext uri="{FF2B5EF4-FFF2-40B4-BE49-F238E27FC236}">
+                <a16:creationId xmlns:a16="http://schemas.microsoft.com/office/drawing/2014/main" id="{A2D96899-916E-4667-967A-53C75DE0B124}"/>
               </a:ext>
             </a:extLst>
           </p:cNvPr>
@@ -4528,55 +5601,182 @@
           <p:nvPr/>
         </p:nvPicPr>
         <p:blipFill>
-          <a:blip r:embed="rId3"/>
+          <a:blip r:embed="rId2">
+            <a:extLst>
+              <a:ext uri="{28A0092B-C50C-407E-A947-70E740481C1C}">
+                <a14:useLocalDpi xmlns:a14="http://schemas.microsoft.com/office/drawing/2010/main" val="0"/>
+              </a:ext>
+            </a:extLst>
+          </a:blip>
           <a:stretch>
             <a:fillRect/>
           </a:stretch>
         </p:blipFill>
         <p:spPr>
           <a:xfrm>
-            <a:off x="6111239" y="1018294"/>
-            <a:ext cx="3053908" cy="2578715"/>
+            <a:off x="799707" y="2129363"/>
+            <a:ext cx="10097909" cy="3648584"/>
           </a:xfrm>
           <a:prstGeom prst="rect">
             <a:avLst/>
           </a:prstGeom>
         </p:spPr>
       </p:pic>
-      <p:pic>
-        <p:nvPicPr>
-          <p:cNvPr id="2" name="Picture 1">
-            <a:extLst>
-              <a:ext uri="{FF2B5EF4-FFF2-40B4-BE49-F238E27FC236}">
-                <a16:creationId xmlns:a16="http://schemas.microsoft.com/office/drawing/2014/main" id="{FD4B9965-2B8C-4A28-8D4C-DAE9DF88450A}"/>
-              </a:ext>
-            </a:extLst>
-          </p:cNvPr>
-          <p:cNvPicPr>
-            <a:picLocks noChangeAspect="1"/>
-          </p:cNvPicPr>
+      <p:sp>
+        <p:nvSpPr>
+          <p:cNvPr id="6" name="TextBox 5">
+            <a:extLst>
+              <a:ext uri="{FF2B5EF4-FFF2-40B4-BE49-F238E27FC236}">
+                <a16:creationId xmlns:a16="http://schemas.microsoft.com/office/drawing/2014/main" id="{7A53C59A-1A95-4FC7-AB43-C7A259FFA6C7}"/>
+              </a:ext>
+            </a:extLst>
+          </p:cNvPr>
+          <p:cNvSpPr txBox="1"/>
           <p:nvPr/>
-        </p:nvPicPr>
-        <p:blipFill>
-          <a:blip r:embed="rId4"/>
-          <a:stretch>
-            <a:fillRect/>
-          </a:stretch>
-        </p:blipFill>
-        <p:spPr>
-          <a:xfrm>
-            <a:off x="2993096" y="1018295"/>
-            <a:ext cx="3001145" cy="2578715"/>
+        </p:nvSpPr>
+        <p:spPr>
+          <a:xfrm>
+            <a:off x="213989" y="493362"/>
+            <a:ext cx="10571201" cy="369332"/>
           </a:xfrm>
           <a:prstGeom prst="rect">
             <a:avLst/>
           </a:prstGeom>
-        </p:spPr>
-      </p:pic>
+          <a:noFill/>
+        </p:spPr>
+        <p:txBody>
+          <a:bodyPr wrap="square" rtlCol="0">
+            <a:spAutoFit/>
+          </a:bodyPr>
+          <a:lstStyle/>
+          <a:p>
+            <a:r>
+              <a:rPr lang="en-NZ" b="1" dirty="0"/>
+              <a:t>Runs on subsets of dataset (rows) when only using blood pressure (</a:t>
+            </a:r>
+            <a:r>
+              <a:rPr lang="en-NZ" b="1" dirty="0" err="1"/>
+              <a:t>dia</a:t>
+            </a:r>
+            <a:r>
+              <a:rPr lang="en-NZ" b="1" dirty="0"/>
+              <a:t> &amp; sys) as inputs into the model</a:t>
+            </a:r>
+            <a:endParaRPr lang="en-GB" b="1" dirty="0"/>
+          </a:p>
+        </p:txBody>
+      </p:sp>
     </p:spTree>
     <p:extLst>
       <p:ext uri="{BB962C8B-B14F-4D97-AF65-F5344CB8AC3E}">
-        <p14:creationId xmlns:p14="http://schemas.microsoft.com/office/powerpoint/2010/main" val="1920508232"/>
+        <p14:creationId xmlns:p14="http://schemas.microsoft.com/office/powerpoint/2010/main" val="65343148"/>
+      </p:ext>
+    </p:extLst>
+  </p:cSld>
+  <p:clrMapOvr>
+    <a:masterClrMapping/>
+  </p:clrMapOvr>
+</p:sld>
+</file>
+
+<file path=ppt/slides/slide8.xml><?xml version="1.0" encoding="utf-8"?>
+<p:sld xmlns:a="http://schemas.openxmlformats.org/drawingml/2006/main" xmlns:r="http://schemas.openxmlformats.org/officeDocument/2006/relationships" xmlns:p="http://schemas.openxmlformats.org/presentationml/2006/main">
+  <p:cSld>
+    <p:spTree>
+      <p:nvGrpSpPr>
+        <p:cNvPr id="1" name=""/>
+        <p:cNvGrpSpPr/>
+        <p:nvPr/>
+      </p:nvGrpSpPr>
+      <p:grpSpPr>
+        <a:xfrm>
+          <a:off x="0" y="0"/>
+          <a:ext cx="0" cy="0"/>
+          <a:chOff x="0" y="0"/>
+          <a:chExt cx="0" cy="0"/>
+        </a:xfrm>
+      </p:grpSpPr>
+      <p:sp>
+        <p:nvSpPr>
+          <p:cNvPr id="2" name="Title 1">
+            <a:extLst>
+              <a:ext uri="{FF2B5EF4-FFF2-40B4-BE49-F238E27FC236}">
+                <a16:creationId xmlns:a16="http://schemas.microsoft.com/office/drawing/2014/main" id="{692C2D3A-B5C9-4E13-9714-BC54302DA6B6}"/>
+              </a:ext>
+            </a:extLst>
+          </p:cNvPr>
+          <p:cNvSpPr>
+            <a:spLocks noGrp="1"/>
+          </p:cNvSpPr>
+          <p:nvPr>
+            <p:ph type="title"/>
+          </p:nvPr>
+        </p:nvSpPr>
+        <p:spPr/>
+        <p:txBody>
+          <a:bodyPr/>
+          <a:lstStyle/>
+          <a:p>
+            <a:r>
+              <a:rPr lang="en-NZ" dirty="0"/>
+              <a:t>Summary</a:t>
+            </a:r>
+            <a:endParaRPr lang="en-GB" dirty="0"/>
+          </a:p>
+        </p:txBody>
+      </p:sp>
+      <p:sp>
+        <p:nvSpPr>
+          <p:cNvPr id="3" name="Content Placeholder 2">
+            <a:extLst>
+              <a:ext uri="{FF2B5EF4-FFF2-40B4-BE49-F238E27FC236}">
+                <a16:creationId xmlns:a16="http://schemas.microsoft.com/office/drawing/2014/main" id="{B9A7E7A7-1393-483D-AE1C-C96BE6B86BF7}"/>
+              </a:ext>
+            </a:extLst>
+          </p:cNvPr>
+          <p:cNvSpPr>
+            <a:spLocks noGrp="1"/>
+          </p:cNvSpPr>
+          <p:nvPr>
+            <p:ph idx="1"/>
+          </p:nvPr>
+        </p:nvSpPr>
+        <p:spPr/>
+        <p:txBody>
+          <a:bodyPr/>
+          <a:lstStyle/>
+          <a:p>
+            <a:r>
+              <a:rPr lang="en-NZ" dirty="0"/>
+              <a:t>More rows cause distance of principle components of samples to diverge more, such that you have more extreme values in the distance matrix with the mean being smaller and smaller</a:t>
+            </a:r>
+          </a:p>
+          <a:p>
+            <a:r>
+              <a:rPr lang="en-NZ" dirty="0"/>
+              <a:t>Less columns causes better separation between groups as more degrees of freedom</a:t>
+            </a:r>
+          </a:p>
+          <a:p>
+            <a:r>
+              <a:rPr lang="en-NZ" dirty="0"/>
+              <a:t>Under ideal conditions, a focused subset of columns MAY produce a good model (as shown when BP was the only column used for prediction, the row </a:t>
+            </a:r>
+            <a:r>
+              <a:rPr lang="en-NZ"/>
+              <a:t>issue disappears)</a:t>
+            </a:r>
+            <a:endParaRPr lang="en-NZ" dirty="0"/>
+          </a:p>
+          <a:p>
+            <a:endParaRPr lang="en-GB" dirty="0"/>
+          </a:p>
+        </p:txBody>
+      </p:sp>
+    </p:spTree>
+    <p:extLst>
+      <p:ext uri="{BB962C8B-B14F-4D97-AF65-F5344CB8AC3E}">
+        <p14:creationId xmlns:p14="http://schemas.microsoft.com/office/powerpoint/2010/main" val="1955196879"/>
       </p:ext>
     </p:extLst>
   </p:cSld>

</xml_diff>

<commit_message>
added another plot for 50% data run distance matrix distributions
</commit_message>
<xml_diff>
--- a/job_results.pptx
+++ b/job_results.pptx
@@ -127,7 +127,7 @@
   <pc:docChgLst>
     <pc:chgData name="Zhao Xiong" userId="5eba49e5-2895-4cd9-83e8-b3064fe76704" providerId="ADAL" clId="{B606E7B2-EFF5-418A-8639-9F7537C4DA50}"/>
     <pc:docChg chg="undo custSel addSld modSld sldOrd">
-      <pc:chgData name="Zhao Xiong" userId="5eba49e5-2895-4cd9-83e8-b3064fe76704" providerId="ADAL" clId="{B606E7B2-EFF5-418A-8639-9F7537C4DA50}" dt="2022-05-10T18:20:39.587" v="1051" actId="5793"/>
+      <pc:chgData name="Zhao Xiong" userId="5eba49e5-2895-4cd9-83e8-b3064fe76704" providerId="ADAL" clId="{B606E7B2-EFF5-418A-8639-9F7537C4DA50}" dt="2022-05-11T11:33:36.591" v="1059" actId="1076"/>
       <pc:docMkLst>
         <pc:docMk/>
       </pc:docMkLst>
@@ -304,7 +304,7 @@
         </pc:picChg>
       </pc:sldChg>
       <pc:sldChg chg="addSp delSp modSp">
-        <pc:chgData name="Zhao Xiong" userId="5eba49e5-2895-4cd9-83e8-b3064fe76704" providerId="ADAL" clId="{B606E7B2-EFF5-418A-8639-9F7537C4DA50}" dt="2022-05-10T17:47:50.921" v="478" actId="14100"/>
+        <pc:chgData name="Zhao Xiong" userId="5eba49e5-2895-4cd9-83e8-b3064fe76704" providerId="ADAL" clId="{B606E7B2-EFF5-418A-8639-9F7537C4DA50}" dt="2022-05-11T11:33:36.591" v="1059" actId="1076"/>
         <pc:sldMkLst>
           <pc:docMk/>
           <pc:sldMk cId="1920508232" sldId="262"/>
@@ -347,6 +347,14 @@
             <pc:docMk/>
             <pc:sldMk cId="1920508232" sldId="262"/>
             <ac:picMk id="5" creationId="{217DE62C-ED25-440F-BB9E-C0CD6BBFF301}"/>
+          </ac:picMkLst>
+        </pc:picChg>
+        <pc:picChg chg="add del">
+          <ac:chgData name="Zhao Xiong" userId="5eba49e5-2895-4cd9-83e8-b3064fe76704" providerId="ADAL" clId="{B606E7B2-EFF5-418A-8639-9F7537C4DA50}" dt="2022-05-11T11:33:08.901" v="1053"/>
+          <ac:picMkLst>
+            <pc:docMk/>
+            <pc:sldMk cId="1920508232" sldId="262"/>
+            <ac:picMk id="5" creationId="{C7963388-940F-4BD8-9D83-99A90CAD9FC5}"/>
           </ac:picMkLst>
         </pc:picChg>
         <pc:picChg chg="add del mod">
@@ -427,6 +435,14 @@
             <pc:docMk/>
             <pc:sldMk cId="1920508232" sldId="262"/>
             <ac:picMk id="14" creationId="{569AE1AC-7928-49D1-A87B-4BF7FFD9695F}"/>
+          </ac:picMkLst>
+        </pc:picChg>
+        <pc:picChg chg="add mod">
+          <ac:chgData name="Zhao Xiong" userId="5eba49e5-2895-4cd9-83e8-b3064fe76704" providerId="ADAL" clId="{B606E7B2-EFF5-418A-8639-9F7537C4DA50}" dt="2022-05-11T11:33:36.591" v="1059" actId="1076"/>
+          <ac:picMkLst>
+            <pc:docMk/>
+            <pc:sldMk cId="1920508232" sldId="262"/>
+            <ac:picMk id="14" creationId="{BD5631CF-4953-406C-A917-70A8BD9C693C}"/>
           </ac:picMkLst>
         </pc:picChg>
         <pc:picChg chg="add mod">
@@ -674,7 +690,7 @@
           <a:p>
             <a:fld id="{3F756EDF-0C8E-4F27-B2A4-7BBF4F0FD9CE}" type="datetimeFigureOut">
               <a:rPr lang="en-GB" smtClean="0"/>
-              <a:t>10/05/2022</a:t>
+              <a:t>11/05/2022</a:t>
             </a:fld>
             <a:endParaRPr lang="en-GB"/>
           </a:p>
@@ -1091,7 +1107,7 @@
           <a:p>
             <a:fld id="{B1B6DC73-6F54-48A7-AC0A-0EE4EE00B05A}" type="datetimeFigureOut">
               <a:rPr lang="en-GB" smtClean="0"/>
-              <a:t>10/05/2022</a:t>
+              <a:t>11/05/2022</a:t>
             </a:fld>
             <a:endParaRPr lang="en-GB"/>
           </a:p>
@@ -1291,7 +1307,7 @@
           <a:p>
             <a:fld id="{B1B6DC73-6F54-48A7-AC0A-0EE4EE00B05A}" type="datetimeFigureOut">
               <a:rPr lang="en-GB" smtClean="0"/>
-              <a:t>10/05/2022</a:t>
+              <a:t>11/05/2022</a:t>
             </a:fld>
             <a:endParaRPr lang="en-GB"/>
           </a:p>
@@ -1501,7 +1517,7 @@
           <a:p>
             <a:fld id="{B1B6DC73-6F54-48A7-AC0A-0EE4EE00B05A}" type="datetimeFigureOut">
               <a:rPr lang="en-GB" smtClean="0"/>
-              <a:t>10/05/2022</a:t>
+              <a:t>11/05/2022</a:t>
             </a:fld>
             <a:endParaRPr lang="en-GB"/>
           </a:p>
@@ -1701,7 +1717,7 @@
           <a:p>
             <a:fld id="{B1B6DC73-6F54-48A7-AC0A-0EE4EE00B05A}" type="datetimeFigureOut">
               <a:rPr lang="en-GB" smtClean="0"/>
-              <a:t>10/05/2022</a:t>
+              <a:t>11/05/2022</a:t>
             </a:fld>
             <a:endParaRPr lang="en-GB"/>
           </a:p>
@@ -1977,7 +1993,7 @@
           <a:p>
             <a:fld id="{B1B6DC73-6F54-48A7-AC0A-0EE4EE00B05A}" type="datetimeFigureOut">
               <a:rPr lang="en-GB" smtClean="0"/>
-              <a:t>10/05/2022</a:t>
+              <a:t>11/05/2022</a:t>
             </a:fld>
             <a:endParaRPr lang="en-GB"/>
           </a:p>
@@ -2245,7 +2261,7 @@
           <a:p>
             <a:fld id="{B1B6DC73-6F54-48A7-AC0A-0EE4EE00B05A}" type="datetimeFigureOut">
               <a:rPr lang="en-GB" smtClean="0"/>
-              <a:t>10/05/2022</a:t>
+              <a:t>11/05/2022</a:t>
             </a:fld>
             <a:endParaRPr lang="en-GB"/>
           </a:p>
@@ -2660,7 +2676,7 @@
           <a:p>
             <a:fld id="{B1B6DC73-6F54-48A7-AC0A-0EE4EE00B05A}" type="datetimeFigureOut">
               <a:rPr lang="en-GB" smtClean="0"/>
-              <a:t>10/05/2022</a:t>
+              <a:t>11/05/2022</a:t>
             </a:fld>
             <a:endParaRPr lang="en-GB"/>
           </a:p>
@@ -2802,7 +2818,7 @@
           <a:p>
             <a:fld id="{B1B6DC73-6F54-48A7-AC0A-0EE4EE00B05A}" type="datetimeFigureOut">
               <a:rPr lang="en-GB" smtClean="0"/>
-              <a:t>10/05/2022</a:t>
+              <a:t>11/05/2022</a:t>
             </a:fld>
             <a:endParaRPr lang="en-GB"/>
           </a:p>
@@ -2915,7 +2931,7 @@
           <a:p>
             <a:fld id="{B1B6DC73-6F54-48A7-AC0A-0EE4EE00B05A}" type="datetimeFigureOut">
               <a:rPr lang="en-GB" smtClean="0"/>
-              <a:t>10/05/2022</a:t>
+              <a:t>11/05/2022</a:t>
             </a:fld>
             <a:endParaRPr lang="en-GB"/>
           </a:p>
@@ -3228,7 +3244,7 @@
           <a:p>
             <a:fld id="{B1B6DC73-6F54-48A7-AC0A-0EE4EE00B05A}" type="datetimeFigureOut">
               <a:rPr lang="en-GB" smtClean="0"/>
-              <a:t>10/05/2022</a:t>
+              <a:t>11/05/2022</a:t>
             </a:fld>
             <a:endParaRPr lang="en-GB"/>
           </a:p>
@@ -3517,7 +3533,7 @@
           <a:p>
             <a:fld id="{B1B6DC73-6F54-48A7-AC0A-0EE4EE00B05A}" type="datetimeFigureOut">
               <a:rPr lang="en-GB" smtClean="0"/>
-              <a:t>10/05/2022</a:t>
+              <a:t>11/05/2022</a:t>
             </a:fld>
             <a:endParaRPr lang="en-GB"/>
           </a:p>
@@ -3760,7 +3776,7 @@
           <a:p>
             <a:fld id="{B1B6DC73-6F54-48A7-AC0A-0EE4EE00B05A}" type="datetimeFigureOut">
               <a:rPr lang="en-GB" smtClean="0"/>
-              <a:t>10/05/2022</a:t>
+              <a:t>11/05/2022</a:t>
             </a:fld>
             <a:endParaRPr lang="en-GB"/>
           </a:p>
@@ -5346,6 +5362,36 @@
           <a:xfrm>
             <a:off x="2350232" y="454822"/>
             <a:ext cx="2388936" cy="2067735"/>
+          </a:xfrm>
+          <a:prstGeom prst="rect">
+            <a:avLst/>
+          </a:prstGeom>
+        </p:spPr>
+      </p:pic>
+      <p:pic>
+        <p:nvPicPr>
+          <p:cNvPr id="14" name="Picture 13">
+            <a:extLst>
+              <a:ext uri="{FF2B5EF4-FFF2-40B4-BE49-F238E27FC236}">
+                <a16:creationId xmlns:a16="http://schemas.microsoft.com/office/drawing/2014/main" id="{BD5631CF-4953-406C-A917-70A8BD9C693C}"/>
+              </a:ext>
+            </a:extLst>
+          </p:cNvPr>
+          <p:cNvPicPr>
+            <a:picLocks noChangeAspect="1"/>
+          </p:cNvPicPr>
+          <p:nvPr/>
+        </p:nvPicPr>
+        <p:blipFill>
+          <a:blip r:embed="rId12"/>
+          <a:stretch>
+            <a:fillRect/>
+          </a:stretch>
+        </p:blipFill>
+        <p:spPr>
+          <a:xfrm>
+            <a:off x="11783099" y="429610"/>
+            <a:ext cx="2472715" cy="2049269"/>
           </a:xfrm>
           <a:prstGeom prst="rect">
             <a:avLst/>

</xml_diff>

<commit_message>
added initial implementation of adjusted cPC space, with updated output visualizations
</commit_message>
<xml_diff>
--- a/job_results.pptx
+++ b/job_results.pptx
@@ -12,10 +12,10 @@
     <p:sldId id="264" r:id="rId3"/>
     <p:sldId id="261" r:id="rId4"/>
     <p:sldId id="262" r:id="rId5"/>
-    <p:sldId id="258" r:id="rId6"/>
-    <p:sldId id="259" r:id="rId7"/>
-    <p:sldId id="263" r:id="rId8"/>
-    <p:sldId id="265" r:id="rId9"/>
+    <p:sldId id="266" r:id="rId6"/>
+    <p:sldId id="258" r:id="rId7"/>
+    <p:sldId id="259" r:id="rId8"/>
+    <p:sldId id="263" r:id="rId9"/>
   </p:sldIdLst>
   <p:sldSz cx="12192000" cy="6858000"/>
   <p:notesSz cx="6858000" cy="9144000"/>
@@ -126,8 +126,8 @@
 <pc:chgInfo xmlns:a="http://schemas.openxmlformats.org/drawingml/2006/main" xmlns:r="http://schemas.openxmlformats.org/officeDocument/2006/relationships" xmlns:ac="http://schemas.microsoft.com/office/drawing/2013/main/command" xmlns:pc="http://schemas.microsoft.com/office/powerpoint/2013/main/command">
   <pc:docChgLst>
     <pc:chgData name="Zhao Xiong" userId="5eba49e5-2895-4cd9-83e8-b3064fe76704" providerId="ADAL" clId="{B606E7B2-EFF5-418A-8639-9F7537C4DA50}"/>
-    <pc:docChg chg="undo custSel addSld modSld sldOrd">
-      <pc:chgData name="Zhao Xiong" userId="5eba49e5-2895-4cd9-83e8-b3064fe76704" providerId="ADAL" clId="{B606E7B2-EFF5-418A-8639-9F7537C4DA50}" dt="2022-05-11T11:33:36.591" v="1059" actId="1076"/>
+    <pc:docChg chg="undo custSel addSld delSld modSld sldOrd">
+      <pc:chgData name="Zhao Xiong" userId="5eba49e5-2895-4cd9-83e8-b3064fe76704" providerId="ADAL" clId="{B606E7B2-EFF5-418A-8639-9F7537C4DA50}" dt="2022-05-14T12:32:07.169" v="2133" actId="2696"/>
       <pc:docMkLst>
         <pc:docMk/>
       </pc:docMkLst>
@@ -304,7 +304,7 @@
         </pc:picChg>
       </pc:sldChg>
       <pc:sldChg chg="addSp delSp modSp">
-        <pc:chgData name="Zhao Xiong" userId="5eba49e5-2895-4cd9-83e8-b3064fe76704" providerId="ADAL" clId="{B606E7B2-EFF5-418A-8639-9F7537C4DA50}" dt="2022-05-11T11:33:36.591" v="1059" actId="1076"/>
+        <pc:chgData name="Zhao Xiong" userId="5eba49e5-2895-4cd9-83e8-b3064fe76704" providerId="ADAL" clId="{B606E7B2-EFF5-418A-8639-9F7537C4DA50}" dt="2022-05-14T12:30:44.928" v="2132" actId="1076"/>
         <pc:sldMkLst>
           <pc:docMk/>
           <pc:sldMk cId="1920508232" sldId="262"/>
@@ -357,6 +357,14 @@
             <ac:picMk id="5" creationId="{C7963388-940F-4BD8-9D83-99A90CAD9FC5}"/>
           </ac:picMkLst>
         </pc:picChg>
+        <pc:picChg chg="add mod">
+          <ac:chgData name="Zhao Xiong" userId="5eba49e5-2895-4cd9-83e8-b3064fe76704" providerId="ADAL" clId="{B606E7B2-EFF5-418A-8639-9F7537C4DA50}" dt="2022-05-14T12:30:44.928" v="2132" actId="1076"/>
+          <ac:picMkLst>
+            <pc:docMk/>
+            <pc:sldMk cId="1920508232" sldId="262"/>
+            <ac:picMk id="5" creationId="{F3A28C97-FC86-4392-9192-A00393915C9E}"/>
+          </ac:picMkLst>
+        </pc:picChg>
         <pc:picChg chg="add del mod">
           <ac:chgData name="Zhao Xiong" userId="5eba49e5-2895-4cd9-83e8-b3064fe76704" providerId="ADAL" clId="{B606E7B2-EFF5-418A-8639-9F7537C4DA50}" dt="2022-05-10T16:24:31.856" v="74" actId="478"/>
           <ac:picMkLst>
@@ -437,8 +445,8 @@
             <ac:picMk id="14" creationId="{569AE1AC-7928-49D1-A87B-4BF7FFD9695F}"/>
           </ac:picMkLst>
         </pc:picChg>
-        <pc:picChg chg="add mod">
-          <ac:chgData name="Zhao Xiong" userId="5eba49e5-2895-4cd9-83e8-b3064fe76704" providerId="ADAL" clId="{B606E7B2-EFF5-418A-8639-9F7537C4DA50}" dt="2022-05-11T11:33:36.591" v="1059" actId="1076"/>
+        <pc:picChg chg="add del mod">
+          <ac:chgData name="Zhao Xiong" userId="5eba49e5-2895-4cd9-83e8-b3064fe76704" providerId="ADAL" clId="{B606E7B2-EFF5-418A-8639-9F7537C4DA50}" dt="2022-05-14T12:30:35.945" v="2127" actId="478"/>
           <ac:picMkLst>
             <pc:docMk/>
             <pc:sldMk cId="1920508232" sldId="262"/>
@@ -580,8 +588,8 @@
           </ac:picMkLst>
         </pc:picChg>
       </pc:sldChg>
-      <pc:sldChg chg="modSp add">
-        <pc:chgData name="Zhao Xiong" userId="5eba49e5-2895-4cd9-83e8-b3064fe76704" providerId="ADAL" clId="{B606E7B2-EFF5-418A-8639-9F7537C4DA50}" dt="2022-05-10T18:20:39.587" v="1051" actId="5793"/>
+      <pc:sldChg chg="modSp add del">
+        <pc:chgData name="Zhao Xiong" userId="5eba49e5-2895-4cd9-83e8-b3064fe76704" providerId="ADAL" clId="{B606E7B2-EFF5-418A-8639-9F7537C4DA50}" dt="2022-05-14T12:32:07.169" v="2133" actId="2696"/>
         <pc:sldMkLst>
           <pc:docMk/>
           <pc:sldMk cId="1955196879" sldId="265"/>
@@ -602,6 +610,189 @@
             <ac:spMk id="3" creationId="{B9A7E7A7-1393-483D-AE1C-C96BE6B86BF7}"/>
           </ac:spMkLst>
         </pc:spChg>
+      </pc:sldChg>
+      <pc:sldChg chg="addSp delSp modSp add ord">
+        <pc:chgData name="Zhao Xiong" userId="5eba49e5-2895-4cd9-83e8-b3064fe76704" providerId="ADAL" clId="{B606E7B2-EFF5-418A-8639-9F7537C4DA50}" dt="2022-05-14T12:30:03.514" v="2124" actId="20577"/>
+        <pc:sldMkLst>
+          <pc:docMk/>
+          <pc:sldMk cId="3573502216" sldId="266"/>
+        </pc:sldMkLst>
+        <pc:spChg chg="del">
+          <ac:chgData name="Zhao Xiong" userId="5eba49e5-2895-4cd9-83e8-b3064fe76704" providerId="ADAL" clId="{B606E7B2-EFF5-418A-8639-9F7537C4DA50}" dt="2022-05-13T17:02:10.961" v="1061" actId="478"/>
+          <ac:spMkLst>
+            <pc:docMk/>
+            <pc:sldMk cId="3573502216" sldId="266"/>
+            <ac:spMk id="2" creationId="{5A1A0AD0-0933-4BE3-B183-265F11CC1C3A}"/>
+          </ac:spMkLst>
+        </pc:spChg>
+        <pc:spChg chg="del">
+          <ac:chgData name="Zhao Xiong" userId="5eba49e5-2895-4cd9-83e8-b3064fe76704" providerId="ADAL" clId="{B606E7B2-EFF5-418A-8639-9F7537C4DA50}" dt="2022-05-13T17:02:10.961" v="1061" actId="478"/>
+          <ac:spMkLst>
+            <pc:docMk/>
+            <pc:sldMk cId="3573502216" sldId="266"/>
+            <ac:spMk id="3" creationId="{91DDAA6B-CD10-425E-96F3-C58E10D15A3A}"/>
+          </ac:spMkLst>
+        </pc:spChg>
+        <pc:spChg chg="add mod">
+          <ac:chgData name="Zhao Xiong" userId="5eba49e5-2895-4cd9-83e8-b3064fe76704" providerId="ADAL" clId="{B606E7B2-EFF5-418A-8639-9F7537C4DA50}" dt="2022-05-13T17:32:57.042" v="1621" actId="20577"/>
+          <ac:spMkLst>
+            <pc:docMk/>
+            <pc:sldMk cId="3573502216" sldId="266"/>
+            <ac:spMk id="6" creationId="{108BEBBF-0CC4-49CA-B7B2-9D4B22059FB3}"/>
+          </ac:spMkLst>
+        </pc:spChg>
+        <pc:spChg chg="add mod">
+          <ac:chgData name="Zhao Xiong" userId="5eba49e5-2895-4cd9-83e8-b3064fe76704" providerId="ADAL" clId="{B606E7B2-EFF5-418A-8639-9F7537C4DA50}" dt="2022-05-13T17:41:24.128" v="1632" actId="20577"/>
+          <ac:spMkLst>
+            <pc:docMk/>
+            <pc:sldMk cId="3573502216" sldId="266"/>
+            <ac:spMk id="8" creationId="{846D2B52-EEE0-4075-A79B-6528659C5996}"/>
+          </ac:spMkLst>
+        </pc:spChg>
+        <pc:spChg chg="add mod">
+          <ac:chgData name="Zhao Xiong" userId="5eba49e5-2895-4cd9-83e8-b3064fe76704" providerId="ADAL" clId="{B606E7B2-EFF5-418A-8639-9F7537C4DA50}" dt="2022-05-14T12:25:23.689" v="2096" actId="20577"/>
+          <ac:spMkLst>
+            <pc:docMk/>
+            <pc:sldMk cId="3573502216" sldId="266"/>
+            <ac:spMk id="9" creationId="{159ECB6D-8197-42C9-9B08-115C0CB6E983}"/>
+          </ac:spMkLst>
+        </pc:spChg>
+        <pc:spChg chg="add mod">
+          <ac:chgData name="Zhao Xiong" userId="5eba49e5-2895-4cd9-83e8-b3064fe76704" providerId="ADAL" clId="{B606E7B2-EFF5-418A-8639-9F7537C4DA50}" dt="2022-05-13T17:41:28.543" v="1638" actId="20577"/>
+          <ac:spMkLst>
+            <pc:docMk/>
+            <pc:sldMk cId="3573502216" sldId="266"/>
+            <ac:spMk id="10" creationId="{D67F0F88-F469-4158-8F13-A89F610E665A}"/>
+          </ac:spMkLst>
+        </pc:spChg>
+        <pc:spChg chg="add mod">
+          <ac:chgData name="Zhao Xiong" userId="5eba49e5-2895-4cd9-83e8-b3064fe76704" providerId="ADAL" clId="{B606E7B2-EFF5-418A-8639-9F7537C4DA50}" dt="2022-05-13T17:42:02.129" v="1705" actId="20577"/>
+          <ac:spMkLst>
+            <pc:docMk/>
+            <pc:sldMk cId="3573502216" sldId="266"/>
+            <ac:spMk id="11" creationId="{8DF388B5-B151-430B-A09E-940AEAB6AF19}"/>
+          </ac:spMkLst>
+        </pc:spChg>
+        <pc:spChg chg="add mod">
+          <ac:chgData name="Zhao Xiong" userId="5eba49e5-2895-4cd9-83e8-b3064fe76704" providerId="ADAL" clId="{B606E7B2-EFF5-418A-8639-9F7537C4DA50}" dt="2022-05-14T12:30:03.514" v="2124" actId="20577"/>
+          <ac:spMkLst>
+            <pc:docMk/>
+            <pc:sldMk cId="3573502216" sldId="266"/>
+            <ac:spMk id="12" creationId="{E23BCCE6-D4B3-49A4-8702-D3E432463990}"/>
+          </ac:spMkLst>
+        </pc:spChg>
+        <pc:picChg chg="add mod modCrop">
+          <ac:chgData name="Zhao Xiong" userId="5eba49e5-2895-4cd9-83e8-b3064fe76704" providerId="ADAL" clId="{B606E7B2-EFF5-418A-8639-9F7537C4DA50}" dt="2022-05-13T17:31:41.971" v="1556" actId="732"/>
+          <ac:picMkLst>
+            <pc:docMk/>
+            <pc:sldMk cId="3573502216" sldId="266"/>
+            <ac:picMk id="2" creationId="{0FA7BFA3-93B6-4DD8-BF5C-5441A83F4695}"/>
+          </ac:picMkLst>
+        </pc:picChg>
+        <pc:picChg chg="add del">
+          <ac:chgData name="Zhao Xiong" userId="5eba49e5-2895-4cd9-83e8-b3064fe76704" providerId="ADAL" clId="{B606E7B2-EFF5-418A-8639-9F7537C4DA50}" dt="2022-05-14T12:20:19.552" v="2020"/>
+          <ac:picMkLst>
+            <pc:docMk/>
+            <pc:sldMk cId="3573502216" sldId="266"/>
+            <ac:picMk id="3" creationId="{16554430-F3A3-46ED-9C1D-B879CBEE9C07}"/>
+          </ac:picMkLst>
+        </pc:picChg>
+        <pc:picChg chg="add del">
+          <ac:chgData name="Zhao Xiong" userId="5eba49e5-2895-4cd9-83e8-b3064fe76704" providerId="ADAL" clId="{B606E7B2-EFF5-418A-8639-9F7537C4DA50}" dt="2022-05-13T17:40:50.577" v="1623"/>
+          <ac:picMkLst>
+            <pc:docMk/>
+            <pc:sldMk cId="3573502216" sldId="266"/>
+            <ac:picMk id="3" creationId="{C9C80766-72D3-4981-9F12-0C016D8BFCFC}"/>
+          </ac:picMkLst>
+        </pc:picChg>
+        <pc:picChg chg="add del mod">
+          <ac:chgData name="Zhao Xiong" userId="5eba49e5-2895-4cd9-83e8-b3064fe76704" providerId="ADAL" clId="{B606E7B2-EFF5-418A-8639-9F7537C4DA50}" dt="2022-05-14T12:27:35.676" v="2102" actId="478"/>
+          <ac:picMkLst>
+            <pc:docMk/>
+            <pc:sldMk cId="3573502216" sldId="266"/>
+            <ac:picMk id="4" creationId="{03656E57-750F-46C7-9E27-4534EBF96CE6}"/>
+          </ac:picMkLst>
+        </pc:picChg>
+        <pc:picChg chg="add mod modCrop">
+          <ac:chgData name="Zhao Xiong" userId="5eba49e5-2895-4cd9-83e8-b3064fe76704" providerId="ADAL" clId="{B606E7B2-EFF5-418A-8639-9F7537C4DA50}" dt="2022-05-13T17:31:33.414" v="1554" actId="1076"/>
+          <ac:picMkLst>
+            <pc:docMk/>
+            <pc:sldMk cId="3573502216" sldId="266"/>
+            <ac:picMk id="5" creationId="{2BAC2202-805B-4DC3-A3C7-C9CC97599E10}"/>
+          </ac:picMkLst>
+        </pc:picChg>
+        <pc:picChg chg="add del mod modCrop">
+          <ac:chgData name="Zhao Xiong" userId="5eba49e5-2895-4cd9-83e8-b3064fe76704" providerId="ADAL" clId="{B606E7B2-EFF5-418A-8639-9F7537C4DA50}" dt="2022-05-14T12:22:44.489" v="2037"/>
+          <ac:picMkLst>
+            <pc:docMk/>
+            <pc:sldMk cId="3573502216" sldId="266"/>
+            <ac:picMk id="7" creationId="{85AC18EF-9BD3-4B29-B5D3-5DF7B0768D36}"/>
+          </ac:picMkLst>
+        </pc:picChg>
+        <pc:picChg chg="add del mod modCrop">
+          <ac:chgData name="Zhao Xiong" userId="5eba49e5-2895-4cd9-83e8-b3064fe76704" providerId="ADAL" clId="{B606E7B2-EFF5-418A-8639-9F7537C4DA50}" dt="2022-05-14T12:21:09.458" v="2030"/>
+          <ac:picMkLst>
+            <pc:docMk/>
+            <pc:sldMk cId="3573502216" sldId="266"/>
+            <ac:picMk id="13" creationId="{D06D610B-990A-402C-BDE9-E566E6CD15A6}"/>
+          </ac:picMkLst>
+        </pc:picChg>
+        <pc:picChg chg="add del mod">
+          <ac:chgData name="Zhao Xiong" userId="5eba49e5-2895-4cd9-83e8-b3064fe76704" providerId="ADAL" clId="{B606E7B2-EFF5-418A-8639-9F7537C4DA50}" dt="2022-05-14T12:25:01.468" v="2069" actId="478"/>
+          <ac:picMkLst>
+            <pc:docMk/>
+            <pc:sldMk cId="3573502216" sldId="266"/>
+            <ac:picMk id="14" creationId="{584998C0-510B-45E5-B3FA-06A0982D2942}"/>
+          </ac:picMkLst>
+        </pc:picChg>
+        <pc:picChg chg="add mod">
+          <ac:chgData name="Zhao Xiong" userId="5eba49e5-2895-4cd9-83e8-b3064fe76704" providerId="ADAL" clId="{B606E7B2-EFF5-418A-8639-9F7537C4DA50}" dt="2022-05-14T12:25:11.215" v="2073" actId="14100"/>
+          <ac:picMkLst>
+            <pc:docMk/>
+            <pc:sldMk cId="3573502216" sldId="266"/>
+            <ac:picMk id="15" creationId="{D8C13DE0-0AB8-4F7C-89AB-3778BEAD9361}"/>
+          </ac:picMkLst>
+        </pc:picChg>
+        <pc:picChg chg="add del">
+          <ac:chgData name="Zhao Xiong" userId="5eba49e5-2895-4cd9-83e8-b3064fe76704" providerId="ADAL" clId="{B606E7B2-EFF5-418A-8639-9F7537C4DA50}" dt="2022-05-14T12:27:21.850" v="2098"/>
+          <ac:picMkLst>
+            <pc:docMk/>
+            <pc:sldMk cId="3573502216" sldId="266"/>
+            <ac:picMk id="16" creationId="{05D7D7B9-1E35-47BA-8567-EDBC90911A8A}"/>
+          </ac:picMkLst>
+        </pc:picChg>
+        <pc:picChg chg="add del mod">
+          <ac:chgData name="Zhao Xiong" userId="5eba49e5-2895-4cd9-83e8-b3064fe76704" providerId="ADAL" clId="{B606E7B2-EFF5-418A-8639-9F7537C4DA50}" dt="2022-05-14T12:27:50.711" v="2108" actId="478"/>
+          <ac:picMkLst>
+            <pc:docMk/>
+            <pc:sldMk cId="3573502216" sldId="266"/>
+            <ac:picMk id="18" creationId="{D13D6711-C16E-439D-B6F2-7A540070DBF8}"/>
+          </ac:picMkLst>
+        </pc:picChg>
+        <pc:picChg chg="add mod">
+          <ac:chgData name="Zhao Xiong" userId="5eba49e5-2895-4cd9-83e8-b3064fe76704" providerId="ADAL" clId="{B606E7B2-EFF5-418A-8639-9F7537C4DA50}" dt="2022-05-14T12:27:59.671" v="2111" actId="14100"/>
+          <ac:picMkLst>
+            <pc:docMk/>
+            <pc:sldMk cId="3573502216" sldId="266"/>
+            <ac:picMk id="19" creationId="{F6139D21-7BD8-451D-8A9D-88C6155831EF}"/>
+          </ac:picMkLst>
+        </pc:picChg>
+        <pc:cxnChg chg="add del mod">
+          <ac:chgData name="Zhao Xiong" userId="5eba49e5-2895-4cd9-83e8-b3064fe76704" providerId="ADAL" clId="{B606E7B2-EFF5-418A-8639-9F7537C4DA50}" dt="2022-05-13T17:43:30.705" v="2015" actId="11529"/>
+          <ac:cxnSpMkLst>
+            <pc:docMk/>
+            <pc:sldMk cId="3573502216" sldId="266"/>
+            <ac:cxnSpMk id="14" creationId="{6D15C196-F685-4A1D-9C0B-281C53C181D0}"/>
+          </ac:cxnSpMkLst>
+        </pc:cxnChg>
+        <pc:cxnChg chg="add mod">
+          <ac:chgData name="Zhao Xiong" userId="5eba49e5-2895-4cd9-83e8-b3064fe76704" providerId="ADAL" clId="{B606E7B2-EFF5-418A-8639-9F7537C4DA50}" dt="2022-05-14T12:25:21.818" v="2085" actId="20577"/>
+          <ac:cxnSpMkLst>
+            <pc:docMk/>
+            <pc:sldMk cId="3573502216" sldId="266"/>
+            <ac:cxnSpMk id="17" creationId="{2943542E-98E6-4223-8034-821A97495596}"/>
+          </ac:cxnSpMkLst>
+        </pc:cxnChg>
       </pc:sldChg>
     </pc:docChg>
   </pc:docChgLst>
@@ -690,7 +881,7 @@
           <a:p>
             <a:fld id="{3F756EDF-0C8E-4F27-B2A4-7BBF4F0FD9CE}" type="datetimeFigureOut">
               <a:rPr lang="en-GB" smtClean="0"/>
-              <a:t>11/05/2022</a:t>
+              <a:t>14/05/2022</a:t>
             </a:fld>
             <a:endParaRPr lang="en-GB"/>
           </a:p>
@@ -1107,7 +1298,7 @@
           <a:p>
             <a:fld id="{B1B6DC73-6F54-48A7-AC0A-0EE4EE00B05A}" type="datetimeFigureOut">
               <a:rPr lang="en-GB" smtClean="0"/>
-              <a:t>11/05/2022</a:t>
+              <a:t>14/05/2022</a:t>
             </a:fld>
             <a:endParaRPr lang="en-GB"/>
           </a:p>
@@ -1307,7 +1498,7 @@
           <a:p>
             <a:fld id="{B1B6DC73-6F54-48A7-AC0A-0EE4EE00B05A}" type="datetimeFigureOut">
               <a:rPr lang="en-GB" smtClean="0"/>
-              <a:t>11/05/2022</a:t>
+              <a:t>14/05/2022</a:t>
             </a:fld>
             <a:endParaRPr lang="en-GB"/>
           </a:p>
@@ -1517,7 +1708,7 @@
           <a:p>
             <a:fld id="{B1B6DC73-6F54-48A7-AC0A-0EE4EE00B05A}" type="datetimeFigureOut">
               <a:rPr lang="en-GB" smtClean="0"/>
-              <a:t>11/05/2022</a:t>
+              <a:t>14/05/2022</a:t>
             </a:fld>
             <a:endParaRPr lang="en-GB"/>
           </a:p>
@@ -1717,7 +1908,7 @@
           <a:p>
             <a:fld id="{B1B6DC73-6F54-48A7-AC0A-0EE4EE00B05A}" type="datetimeFigureOut">
               <a:rPr lang="en-GB" smtClean="0"/>
-              <a:t>11/05/2022</a:t>
+              <a:t>14/05/2022</a:t>
             </a:fld>
             <a:endParaRPr lang="en-GB"/>
           </a:p>
@@ -1993,7 +2184,7 @@
           <a:p>
             <a:fld id="{B1B6DC73-6F54-48A7-AC0A-0EE4EE00B05A}" type="datetimeFigureOut">
               <a:rPr lang="en-GB" smtClean="0"/>
-              <a:t>11/05/2022</a:t>
+              <a:t>14/05/2022</a:t>
             </a:fld>
             <a:endParaRPr lang="en-GB"/>
           </a:p>
@@ -2261,7 +2452,7 @@
           <a:p>
             <a:fld id="{B1B6DC73-6F54-48A7-AC0A-0EE4EE00B05A}" type="datetimeFigureOut">
               <a:rPr lang="en-GB" smtClean="0"/>
-              <a:t>11/05/2022</a:t>
+              <a:t>14/05/2022</a:t>
             </a:fld>
             <a:endParaRPr lang="en-GB"/>
           </a:p>
@@ -2676,7 +2867,7 @@
           <a:p>
             <a:fld id="{B1B6DC73-6F54-48A7-AC0A-0EE4EE00B05A}" type="datetimeFigureOut">
               <a:rPr lang="en-GB" smtClean="0"/>
-              <a:t>11/05/2022</a:t>
+              <a:t>14/05/2022</a:t>
             </a:fld>
             <a:endParaRPr lang="en-GB"/>
           </a:p>
@@ -2818,7 +3009,7 @@
           <a:p>
             <a:fld id="{B1B6DC73-6F54-48A7-AC0A-0EE4EE00B05A}" type="datetimeFigureOut">
               <a:rPr lang="en-GB" smtClean="0"/>
-              <a:t>11/05/2022</a:t>
+              <a:t>14/05/2022</a:t>
             </a:fld>
             <a:endParaRPr lang="en-GB"/>
           </a:p>
@@ -2931,7 +3122,7 @@
           <a:p>
             <a:fld id="{B1B6DC73-6F54-48A7-AC0A-0EE4EE00B05A}" type="datetimeFigureOut">
               <a:rPr lang="en-GB" smtClean="0"/>
-              <a:t>11/05/2022</a:t>
+              <a:t>14/05/2022</a:t>
             </a:fld>
             <a:endParaRPr lang="en-GB"/>
           </a:p>
@@ -3244,7 +3435,7 @@
           <a:p>
             <a:fld id="{B1B6DC73-6F54-48A7-AC0A-0EE4EE00B05A}" type="datetimeFigureOut">
               <a:rPr lang="en-GB" smtClean="0"/>
-              <a:t>11/05/2022</a:t>
+              <a:t>14/05/2022</a:t>
             </a:fld>
             <a:endParaRPr lang="en-GB"/>
           </a:p>
@@ -3533,7 +3724,7 @@
           <a:p>
             <a:fld id="{B1B6DC73-6F54-48A7-AC0A-0EE4EE00B05A}" type="datetimeFigureOut">
               <a:rPr lang="en-GB" smtClean="0"/>
-              <a:t>11/05/2022</a:t>
+              <a:t>14/05/2022</a:t>
             </a:fld>
             <a:endParaRPr lang="en-GB"/>
           </a:p>
@@ -3776,7 +3967,7 @@
           <a:p>
             <a:fld id="{B1B6DC73-6F54-48A7-AC0A-0EE4EE00B05A}" type="datetimeFigureOut">
               <a:rPr lang="en-GB" smtClean="0"/>
-              <a:t>11/05/2022</a:t>
+              <a:t>14/05/2022</a:t>
             </a:fld>
             <a:endParaRPr lang="en-GB"/>
           </a:p>
@@ -5370,10 +5561,10 @@
       </p:pic>
       <p:pic>
         <p:nvPicPr>
-          <p:cNvPr id="14" name="Picture 13">
-            <a:extLst>
-              <a:ext uri="{FF2B5EF4-FFF2-40B4-BE49-F238E27FC236}">
-                <a16:creationId xmlns:a16="http://schemas.microsoft.com/office/drawing/2014/main" id="{BD5631CF-4953-406C-A917-70A8BD9C693C}"/>
+          <p:cNvPr id="5" name="Picture 4">
+            <a:extLst>
+              <a:ext uri="{FF2B5EF4-FFF2-40B4-BE49-F238E27FC236}">
+                <a16:creationId xmlns:a16="http://schemas.microsoft.com/office/drawing/2014/main" id="{F3A28C97-FC86-4392-9192-A00393915C9E}"/>
               </a:ext>
             </a:extLst>
           </p:cNvPr>
@@ -5390,8 +5581,8 @@
         </p:blipFill>
         <p:spPr>
           <a:xfrm>
-            <a:off x="11783099" y="429610"/>
-            <a:ext cx="2472715" cy="2049269"/>
+            <a:off x="11660222" y="454822"/>
+            <a:ext cx="2436331" cy="2017214"/>
           </a:xfrm>
           <a:prstGeom prst="rect">
             <a:avLst/>
@@ -5433,7 +5624,78 @@
           <p:cNvPr id="5" name="Picture 4">
             <a:extLst>
               <a:ext uri="{FF2B5EF4-FFF2-40B4-BE49-F238E27FC236}">
-                <a16:creationId xmlns:a16="http://schemas.microsoft.com/office/drawing/2014/main" id="{57F5CD76-A121-47E7-8D5C-78EB781D67BC}"/>
+                <a16:creationId xmlns:a16="http://schemas.microsoft.com/office/drawing/2014/main" id="{2BAC2202-805B-4DC3-A3C7-C9CC97599E10}"/>
+              </a:ext>
+            </a:extLst>
+          </p:cNvPr>
+          <p:cNvPicPr>
+            <a:picLocks noChangeAspect="1"/>
+          </p:cNvPicPr>
+          <p:nvPr/>
+        </p:nvPicPr>
+        <p:blipFill rotWithShape="1">
+          <a:blip r:embed="rId2">
+            <a:extLst>
+              <a:ext uri="{28A0092B-C50C-407E-A947-70E740481C1C}">
+                <a14:useLocalDpi xmlns:a14="http://schemas.microsoft.com/office/drawing/2010/main" val="0"/>
+              </a:ext>
+            </a:extLst>
+          </a:blip>
+          <a:srcRect r="54446"/>
+          <a:stretch/>
+        </p:blipFill>
+        <p:spPr>
+          <a:xfrm>
+            <a:off x="76201" y="1140496"/>
+            <a:ext cx="2982682" cy="3890687"/>
+          </a:xfrm>
+          <a:prstGeom prst="rect">
+            <a:avLst/>
+          </a:prstGeom>
+        </p:spPr>
+      </p:pic>
+      <p:sp>
+        <p:nvSpPr>
+          <p:cNvPr id="6" name="TextBox 5">
+            <a:extLst>
+              <a:ext uri="{FF2B5EF4-FFF2-40B4-BE49-F238E27FC236}">
+                <a16:creationId xmlns:a16="http://schemas.microsoft.com/office/drawing/2014/main" id="{108BEBBF-0CC4-49CA-B7B2-9D4B22059FB3}"/>
+              </a:ext>
+            </a:extLst>
+          </p:cNvPr>
+          <p:cNvSpPr txBox="1"/>
+          <p:nvPr/>
+        </p:nvSpPr>
+        <p:spPr>
+          <a:xfrm>
+            <a:off x="213989" y="493362"/>
+            <a:ext cx="10571201" cy="369332"/>
+          </a:xfrm>
+          <a:prstGeom prst="rect">
+            <a:avLst/>
+          </a:prstGeom>
+          <a:noFill/>
+        </p:spPr>
+        <p:txBody>
+          <a:bodyPr wrap="square" rtlCol="0">
+            <a:spAutoFit/>
+          </a:bodyPr>
+          <a:lstStyle/>
+          <a:p>
+            <a:r>
+              <a:rPr lang="en-NZ" b="1" dirty="0"/>
+              <a:t>Handling abnormally high distance values in distance matrix (test on 20% subset ~5600 rows)</a:t>
+            </a:r>
+            <a:endParaRPr lang="en-GB" b="1" dirty="0"/>
+          </a:p>
+        </p:txBody>
+      </p:sp>
+      <p:pic>
+        <p:nvPicPr>
+          <p:cNvPr id="2" name="Picture 1">
+            <a:extLst>
+              <a:ext uri="{FF2B5EF4-FFF2-40B4-BE49-F238E27FC236}">
+                <a16:creationId xmlns:a16="http://schemas.microsoft.com/office/drawing/2014/main" id="{0FA7BFA3-93B6-4DD8-BF5C-5441A83F4695}"/>
               </a:ext>
             </a:extLst>
           </p:cNvPr>
@@ -5443,21 +5705,15 @@
           <p:nvPr/>
         </p:nvPicPr>
         <p:blipFill>
-          <a:blip r:embed="rId2">
-            <a:extLst>
-              <a:ext uri="{28A0092B-C50C-407E-A947-70E740481C1C}">
-                <a14:useLocalDpi xmlns:a14="http://schemas.microsoft.com/office/drawing/2010/main" val="0"/>
-              </a:ext>
-            </a:extLst>
-          </a:blip>
+          <a:blip r:embed="rId3"/>
           <a:stretch>
             <a:fillRect/>
           </a:stretch>
         </p:blipFill>
         <p:spPr>
           <a:xfrm>
-            <a:off x="0" y="369332"/>
-            <a:ext cx="12192000" cy="6510995"/>
+            <a:off x="6041565" y="1140496"/>
+            <a:ext cx="2873800" cy="3841079"/>
           </a:xfrm>
           <a:prstGeom prst="rect">
             <a:avLst/>
@@ -5466,10 +5722,10 @@
       </p:pic>
       <p:sp>
         <p:nvSpPr>
-          <p:cNvPr id="6" name="TextBox 5">
-            <a:extLst>
-              <a:ext uri="{FF2B5EF4-FFF2-40B4-BE49-F238E27FC236}">
-                <a16:creationId xmlns:a16="http://schemas.microsoft.com/office/drawing/2014/main" id="{979AE2EC-4AA9-4D1C-9817-4D0290540D4D}"/>
+          <p:cNvPr id="8" name="TextBox 7">
+            <a:extLst>
+              <a:ext uri="{FF2B5EF4-FFF2-40B4-BE49-F238E27FC236}">
+                <a16:creationId xmlns:a16="http://schemas.microsoft.com/office/drawing/2014/main" id="{846D2B52-EEE0-4075-A79B-6528659C5996}"/>
               </a:ext>
             </a:extLst>
           </p:cNvPr>
@@ -5478,32 +5734,335 @@
         </p:nvSpPr>
         <p:spPr>
           <a:xfrm>
-            <a:off x="0" y="-9525"/>
-            <a:ext cx="7275589" cy="369332"/>
+            <a:off x="234218" y="4981575"/>
+            <a:ext cx="2099408" cy="369332"/>
           </a:xfrm>
           <a:prstGeom prst="rect">
             <a:avLst/>
           </a:prstGeom>
-          <a:noFill/>
-        </p:spPr>
-        <p:txBody>
-          <a:bodyPr wrap="square" rtlCol="0">
+          <a:solidFill>
+            <a:schemeClr val="bg1"/>
+          </a:solidFill>
+        </p:spPr>
+        <p:txBody>
+          <a:bodyPr wrap="square" lIns="0" tIns="0" rIns="0" bIns="0" rtlCol="0">
             <a:spAutoFit/>
           </a:bodyPr>
           <a:lstStyle/>
           <a:p>
-            <a:r>
-              <a:rPr lang="en-NZ" b="1" dirty="0"/>
-              <a:t>All 10 combination of 10% subset runs</a:t>
-            </a:r>
-            <a:endParaRPr lang="en-GB" b="1" dirty="0"/>
-          </a:p>
-        </p:txBody>
-      </p:sp>
+            <a:pPr algn="ctr"/>
+            <a:r>
+              <a:rPr lang="en-NZ" sz="1200" b="1" dirty="0"/>
+              <a:t>1) Original </a:t>
+            </a:r>
+          </a:p>
+          <a:p>
+            <a:pPr algn="ctr"/>
+            <a:r>
+              <a:rPr lang="en-NZ" sz="1200" b="1" dirty="0"/>
+              <a:t>(Minimum Spanning Tree)</a:t>
+            </a:r>
+            <a:endParaRPr lang="en-GB" sz="1200" b="1" dirty="0"/>
+          </a:p>
+        </p:txBody>
+      </p:sp>
+      <p:sp>
+        <p:nvSpPr>
+          <p:cNvPr id="9" name="TextBox 8">
+            <a:extLst>
+              <a:ext uri="{FF2B5EF4-FFF2-40B4-BE49-F238E27FC236}">
+                <a16:creationId xmlns:a16="http://schemas.microsoft.com/office/drawing/2014/main" id="{159ECB6D-8197-42C9-9B08-115C0CB6E983}"/>
+              </a:ext>
+            </a:extLst>
+          </p:cNvPr>
+          <p:cNvSpPr txBox="1"/>
+          <p:nvPr/>
+        </p:nvSpPr>
+        <p:spPr>
+          <a:xfrm>
+            <a:off x="3275407" y="4981575"/>
+            <a:ext cx="1982394" cy="553998"/>
+          </a:xfrm>
+          <a:prstGeom prst="rect">
+            <a:avLst/>
+          </a:prstGeom>
+          <a:solidFill>
+            <a:schemeClr val="bg1"/>
+          </a:solidFill>
+        </p:spPr>
+        <p:txBody>
+          <a:bodyPr wrap="square" lIns="0" tIns="0" rIns="0" bIns="0" rtlCol="0">
+            <a:spAutoFit/>
+          </a:bodyPr>
+          <a:lstStyle/>
+          <a:p>
+            <a:pPr algn="ctr"/>
+            <a:r>
+              <a:rPr lang="en-NZ" sz="1200" b="1" dirty="0"/>
+              <a:t>2) Filter out large values in </a:t>
+            </a:r>
+            <a:r>
+              <a:rPr lang="en-NZ" sz="1200" b="1" dirty="0" err="1"/>
+              <a:t>cPC</a:t>
+            </a:r>
+            <a:r>
+              <a:rPr lang="en-NZ" sz="1200" b="1" dirty="0"/>
+              <a:t> space (set values above 3sd as the median)</a:t>
+            </a:r>
+            <a:endParaRPr lang="en-GB" sz="1200" b="1" dirty="0"/>
+          </a:p>
+        </p:txBody>
+      </p:sp>
+      <p:sp>
+        <p:nvSpPr>
+          <p:cNvPr id="10" name="TextBox 9">
+            <a:extLst>
+              <a:ext uri="{FF2B5EF4-FFF2-40B4-BE49-F238E27FC236}">
+                <a16:creationId xmlns:a16="http://schemas.microsoft.com/office/drawing/2014/main" id="{D67F0F88-F469-4158-8F13-A89F610E665A}"/>
+              </a:ext>
+            </a:extLst>
+          </p:cNvPr>
+          <p:cNvSpPr txBox="1"/>
+          <p:nvPr/>
+        </p:nvSpPr>
+        <p:spPr>
+          <a:xfrm>
+            <a:off x="6135621" y="4981575"/>
+            <a:ext cx="2227330" cy="369332"/>
+          </a:xfrm>
+          <a:prstGeom prst="rect">
+            <a:avLst/>
+          </a:prstGeom>
+          <a:solidFill>
+            <a:schemeClr val="bg1"/>
+          </a:solidFill>
+        </p:spPr>
+        <p:txBody>
+          <a:bodyPr wrap="square" lIns="0" tIns="0" rIns="0" bIns="0" rtlCol="0">
+            <a:spAutoFit/>
+          </a:bodyPr>
+          <a:lstStyle/>
+          <a:p>
+            <a:pPr algn="ctr"/>
+            <a:r>
+              <a:rPr lang="en-NZ" sz="1200" b="1" dirty="0"/>
+              <a:t>3) Shortest Path Tree Instead of Minimum Spanning Tree</a:t>
+            </a:r>
+            <a:endParaRPr lang="en-GB" sz="1200" b="1" dirty="0"/>
+          </a:p>
+        </p:txBody>
+      </p:sp>
+      <p:sp>
+        <p:nvSpPr>
+          <p:cNvPr id="11" name="TextBox 10">
+            <a:extLst>
+              <a:ext uri="{FF2B5EF4-FFF2-40B4-BE49-F238E27FC236}">
+                <a16:creationId xmlns:a16="http://schemas.microsoft.com/office/drawing/2014/main" id="{8DF388B5-B151-430B-A09E-940AEAB6AF19}"/>
+              </a:ext>
+            </a:extLst>
+          </p:cNvPr>
+          <p:cNvSpPr txBox="1"/>
+          <p:nvPr/>
+        </p:nvSpPr>
+        <p:spPr>
+          <a:xfrm>
+            <a:off x="9540280" y="4981575"/>
+            <a:ext cx="1356320" cy="369332"/>
+          </a:xfrm>
+          <a:prstGeom prst="rect">
+            <a:avLst/>
+          </a:prstGeom>
+          <a:solidFill>
+            <a:schemeClr val="bg1"/>
+          </a:solidFill>
+        </p:spPr>
+        <p:txBody>
+          <a:bodyPr wrap="square" lIns="0" tIns="0" rIns="0" bIns="0" rtlCol="0">
+            <a:spAutoFit/>
+          </a:bodyPr>
+          <a:lstStyle/>
+          <a:p>
+            <a:pPr algn="ctr"/>
+            <a:r>
+              <a:rPr lang="en-NZ" sz="1200" b="1" dirty="0"/>
+              <a:t>4) #2 (filter) + #3 (use shortest path tree)</a:t>
+            </a:r>
+            <a:endParaRPr lang="en-GB" sz="1200" b="1" dirty="0"/>
+          </a:p>
+        </p:txBody>
+      </p:sp>
+      <p:sp>
+        <p:nvSpPr>
+          <p:cNvPr id="12" name="TextBox 11">
+            <a:extLst>
+              <a:ext uri="{FF2B5EF4-FFF2-40B4-BE49-F238E27FC236}">
+                <a16:creationId xmlns:a16="http://schemas.microsoft.com/office/drawing/2014/main" id="{E23BCCE6-D4B3-49A4-8702-D3E432463990}"/>
+              </a:ext>
+            </a:extLst>
+          </p:cNvPr>
+          <p:cNvSpPr txBox="1"/>
+          <p:nvPr/>
+        </p:nvSpPr>
+        <p:spPr>
+          <a:xfrm>
+            <a:off x="4690862" y="5810640"/>
+            <a:ext cx="4849418" cy="553998"/>
+          </a:xfrm>
+          <a:prstGeom prst="rect">
+            <a:avLst/>
+          </a:prstGeom>
+          <a:solidFill>
+            <a:schemeClr val="bg1"/>
+          </a:solidFill>
+        </p:spPr>
+        <p:txBody>
+          <a:bodyPr wrap="square" lIns="0" tIns="0" rIns="0" bIns="0" rtlCol="0">
+            <a:spAutoFit/>
+          </a:bodyPr>
+          <a:lstStyle/>
+          <a:p>
+            <a:r>
+              <a:rPr lang="en-NZ" sz="1200" dirty="0">
+                <a:solidFill>
+                  <a:srgbClr val="FF0000"/>
+                </a:solidFill>
+              </a:rPr>
+              <a:t>Note that #2 is currently flawed as we cannot just reassign these abnormally large values in </a:t>
+            </a:r>
+            <a:r>
+              <a:rPr lang="en-NZ" sz="1200" dirty="0" err="1">
+                <a:solidFill>
+                  <a:srgbClr val="FF0000"/>
+                </a:solidFill>
+              </a:rPr>
+              <a:t>cPC</a:t>
+            </a:r>
+            <a:r>
+              <a:rPr lang="en-NZ" sz="1200" dirty="0">
+                <a:solidFill>
+                  <a:srgbClr val="FF0000"/>
+                </a:solidFill>
+              </a:rPr>
+              <a:t> space with the median, they should be instead replaced somehow by their next closest node ….</a:t>
+            </a:r>
+            <a:endParaRPr lang="en-GB" sz="1200" dirty="0">
+              <a:solidFill>
+                <a:srgbClr val="FF0000"/>
+              </a:solidFill>
+            </a:endParaRPr>
+          </a:p>
+        </p:txBody>
+      </p:sp>
+      <p:cxnSp>
+        <p:nvCxnSpPr>
+          <p:cNvPr id="17" name="Connector: Elbow 16">
+            <a:extLst>
+              <a:ext uri="{FF2B5EF4-FFF2-40B4-BE49-F238E27FC236}">
+                <a16:creationId xmlns:a16="http://schemas.microsoft.com/office/drawing/2014/main" id="{2943542E-98E6-4223-8034-821A97495596}"/>
+              </a:ext>
+            </a:extLst>
+          </p:cNvPr>
+          <p:cNvCxnSpPr>
+            <a:cxnSpLocks/>
+            <a:stCxn id="12" idx="1"/>
+            <a:endCxn id="9" idx="2"/>
+          </p:cNvCxnSpPr>
+          <p:nvPr/>
+        </p:nvCxnSpPr>
+        <p:spPr>
+          <a:xfrm rot="10800000">
+            <a:off x="4266604" y="5535573"/>
+            <a:ext cx="424258" cy="552066"/>
+          </a:xfrm>
+          <a:prstGeom prst="bentConnector2">
+            <a:avLst/>
+          </a:prstGeom>
+          <a:ln>
+            <a:solidFill>
+              <a:srgbClr val="FF0000"/>
+            </a:solidFill>
+            <a:tailEnd type="triangle"/>
+          </a:ln>
+        </p:spPr>
+        <p:style>
+          <a:lnRef idx="1">
+            <a:schemeClr val="accent1"/>
+          </a:lnRef>
+          <a:fillRef idx="0">
+            <a:schemeClr val="accent1"/>
+          </a:fillRef>
+          <a:effectRef idx="0">
+            <a:schemeClr val="accent1"/>
+          </a:effectRef>
+          <a:fontRef idx="minor">
+            <a:schemeClr val="tx1"/>
+          </a:fontRef>
+        </p:style>
+      </p:cxnSp>
+      <p:pic>
+        <p:nvPicPr>
+          <p:cNvPr id="15" name="Picture 14">
+            <a:extLst>
+              <a:ext uri="{FF2B5EF4-FFF2-40B4-BE49-F238E27FC236}">
+                <a16:creationId xmlns:a16="http://schemas.microsoft.com/office/drawing/2014/main" id="{D8C13DE0-0AB8-4F7C-89AB-3778BEAD9361}"/>
+              </a:ext>
+            </a:extLst>
+          </p:cNvPr>
+          <p:cNvPicPr>
+            <a:picLocks noChangeAspect="1"/>
+          </p:cNvPicPr>
+          <p:nvPr/>
+        </p:nvPicPr>
+        <p:blipFill>
+          <a:blip r:embed="rId4"/>
+          <a:stretch>
+            <a:fillRect/>
+          </a:stretch>
+        </p:blipFill>
+        <p:spPr>
+          <a:xfrm>
+            <a:off x="3058883" y="1140496"/>
+            <a:ext cx="2873800" cy="3841079"/>
+          </a:xfrm>
+          <a:prstGeom prst="rect">
+            <a:avLst/>
+          </a:prstGeom>
+        </p:spPr>
+      </p:pic>
+      <p:pic>
+        <p:nvPicPr>
+          <p:cNvPr id="19" name="Picture 18">
+            <a:extLst>
+              <a:ext uri="{FF2B5EF4-FFF2-40B4-BE49-F238E27FC236}">
+                <a16:creationId xmlns:a16="http://schemas.microsoft.com/office/drawing/2014/main" id="{F6139D21-7BD8-451D-8A9D-88C6155831EF}"/>
+              </a:ext>
+            </a:extLst>
+          </p:cNvPr>
+          <p:cNvPicPr>
+            <a:picLocks noChangeAspect="1"/>
+          </p:cNvPicPr>
+          <p:nvPr/>
+        </p:nvPicPr>
+        <p:blipFill>
+          <a:blip r:embed="rId5"/>
+          <a:stretch>
+            <a:fillRect/>
+          </a:stretch>
+        </p:blipFill>
+        <p:spPr>
+          <a:xfrm>
+            <a:off x="9009422" y="1144938"/>
+            <a:ext cx="2873800" cy="3836637"/>
+          </a:xfrm>
+          <a:prstGeom prst="rect">
+            <a:avLst/>
+          </a:prstGeom>
+        </p:spPr>
+      </p:pic>
     </p:spTree>
     <p:extLst>
       <p:ext uri="{BB962C8B-B14F-4D97-AF65-F5344CB8AC3E}">
-        <p14:creationId xmlns:p14="http://schemas.microsoft.com/office/powerpoint/2010/main" val="4028263462"/>
+        <p14:creationId xmlns:p14="http://schemas.microsoft.com/office/powerpoint/2010/main" val="3573502216"/>
       </p:ext>
     </p:extLst>
   </p:cSld>
@@ -5532,10 +6091,10 @@
       </p:grpSpPr>
       <p:pic>
         <p:nvPicPr>
-          <p:cNvPr id="7" name="Picture 6">
-            <a:extLst>
-              <a:ext uri="{FF2B5EF4-FFF2-40B4-BE49-F238E27FC236}">
-                <a16:creationId xmlns:a16="http://schemas.microsoft.com/office/drawing/2014/main" id="{2EB162D9-0AF6-4EEC-9470-3D283E1A30A7}"/>
+          <p:cNvPr id="5" name="Picture 4">
+            <a:extLst>
+              <a:ext uri="{FF2B5EF4-FFF2-40B4-BE49-F238E27FC236}">
+                <a16:creationId xmlns:a16="http://schemas.microsoft.com/office/drawing/2014/main" id="{57F5CD76-A121-47E7-8D5C-78EB781D67BC}"/>
               </a:ext>
             </a:extLst>
           </p:cNvPr>
@@ -5558,8 +6117,8 @@
         </p:blipFill>
         <p:spPr>
           <a:xfrm>
-            <a:off x="0" y="485730"/>
-            <a:ext cx="12192000" cy="5886540"/>
+            <a:off x="0" y="369332"/>
+            <a:ext cx="12192000" cy="6510995"/>
           </a:xfrm>
           <a:prstGeom prst="rect">
             <a:avLst/>
@@ -5568,10 +6127,10 @@
       </p:pic>
       <p:sp>
         <p:nvSpPr>
-          <p:cNvPr id="8" name="TextBox 7">
-            <a:extLst>
-              <a:ext uri="{FF2B5EF4-FFF2-40B4-BE49-F238E27FC236}">
-                <a16:creationId xmlns:a16="http://schemas.microsoft.com/office/drawing/2014/main" id="{835291A4-5C31-468E-853D-5CC31B696586}"/>
+          <p:cNvPr id="6" name="TextBox 5">
+            <a:extLst>
+              <a:ext uri="{FF2B5EF4-FFF2-40B4-BE49-F238E27FC236}">
+                <a16:creationId xmlns:a16="http://schemas.microsoft.com/office/drawing/2014/main" id="{979AE2EC-4AA9-4D1C-9817-4D0290540D4D}"/>
               </a:ext>
             </a:extLst>
           </p:cNvPr>
@@ -5596,7 +6155,7 @@
           <a:p>
             <a:r>
               <a:rPr lang="en-NZ" b="1" dirty="0"/>
-              <a:t>All 10 combination of 10% subset runs – variable weighting distribution</a:t>
+              <a:t>All 10 combination of 10% subset runs</a:t>
             </a:r>
             <a:endParaRPr lang="en-GB" b="1" dirty="0"/>
           </a:p>
@@ -5605,7 +6164,7 @@
     </p:spTree>
     <p:extLst>
       <p:ext uri="{BB962C8B-B14F-4D97-AF65-F5344CB8AC3E}">
-        <p14:creationId xmlns:p14="http://schemas.microsoft.com/office/powerpoint/2010/main" val="1511892141"/>
+        <p14:creationId xmlns:p14="http://schemas.microsoft.com/office/powerpoint/2010/main" val="4028263462"/>
       </p:ext>
     </p:extLst>
   </p:cSld>
@@ -5634,10 +6193,10 @@
       </p:grpSpPr>
       <p:pic>
         <p:nvPicPr>
-          <p:cNvPr id="5" name="Picture 4">
-            <a:extLst>
-              <a:ext uri="{FF2B5EF4-FFF2-40B4-BE49-F238E27FC236}">
-                <a16:creationId xmlns:a16="http://schemas.microsoft.com/office/drawing/2014/main" id="{A2D96899-916E-4667-967A-53C75DE0B124}"/>
+          <p:cNvPr id="7" name="Picture 6">
+            <a:extLst>
+              <a:ext uri="{FF2B5EF4-FFF2-40B4-BE49-F238E27FC236}">
+                <a16:creationId xmlns:a16="http://schemas.microsoft.com/office/drawing/2014/main" id="{2EB162D9-0AF6-4EEC-9470-3D283E1A30A7}"/>
               </a:ext>
             </a:extLst>
           </p:cNvPr>
@@ -5660,8 +6219,8 @@
         </p:blipFill>
         <p:spPr>
           <a:xfrm>
-            <a:off x="799707" y="2129363"/>
-            <a:ext cx="10097909" cy="3648584"/>
+            <a:off x="0" y="485730"/>
+            <a:ext cx="12192000" cy="5886540"/>
           </a:xfrm>
           <a:prstGeom prst="rect">
             <a:avLst/>
@@ -5670,10 +6229,10 @@
       </p:pic>
       <p:sp>
         <p:nvSpPr>
-          <p:cNvPr id="6" name="TextBox 5">
-            <a:extLst>
-              <a:ext uri="{FF2B5EF4-FFF2-40B4-BE49-F238E27FC236}">
-                <a16:creationId xmlns:a16="http://schemas.microsoft.com/office/drawing/2014/main" id="{7A53C59A-1A95-4FC7-AB43-C7A259FFA6C7}"/>
+          <p:cNvPr id="8" name="TextBox 7">
+            <a:extLst>
+              <a:ext uri="{FF2B5EF4-FFF2-40B4-BE49-F238E27FC236}">
+                <a16:creationId xmlns:a16="http://schemas.microsoft.com/office/drawing/2014/main" id="{835291A4-5C31-468E-853D-5CC31B696586}"/>
               </a:ext>
             </a:extLst>
           </p:cNvPr>
@@ -5682,8 +6241,8 @@
         </p:nvSpPr>
         <p:spPr>
           <a:xfrm>
-            <a:off x="213989" y="493362"/>
-            <a:ext cx="10571201" cy="369332"/>
+            <a:off x="0" y="-9525"/>
+            <a:ext cx="7275589" cy="369332"/>
           </a:xfrm>
           <a:prstGeom prst="rect">
             <a:avLst/>
@@ -5698,15 +6257,7 @@
           <a:p>
             <a:r>
               <a:rPr lang="en-NZ" b="1" dirty="0"/>
-              <a:t>Runs on subsets of dataset (rows) when only using blood pressure (</a:t>
-            </a:r>
-            <a:r>
-              <a:rPr lang="en-NZ" b="1" dirty="0" err="1"/>
-              <a:t>dia</a:t>
-            </a:r>
-            <a:r>
-              <a:rPr lang="en-NZ" b="1" dirty="0"/>
-              <a:t> &amp; sys) as inputs into the model</a:t>
+              <a:t>All 10 combination of 10% subset runs – variable weighting distribution</a:t>
             </a:r>
             <a:endParaRPr lang="en-GB" b="1" dirty="0"/>
           </a:p>
@@ -5715,7 +6266,7 @@
     </p:spTree>
     <p:extLst>
       <p:ext uri="{BB962C8B-B14F-4D97-AF65-F5344CB8AC3E}">
-        <p14:creationId xmlns:p14="http://schemas.microsoft.com/office/powerpoint/2010/main" val="65343148"/>
+        <p14:creationId xmlns:p14="http://schemas.microsoft.com/office/powerpoint/2010/main" val="1511892141"/>
       </p:ext>
     </p:extLst>
   </p:cSld>
@@ -5742,87 +6293,90 @@
           <a:chExt cx="0" cy="0"/>
         </a:xfrm>
       </p:grpSpPr>
-      <p:sp>
-        <p:nvSpPr>
-          <p:cNvPr id="2" name="Title 1">
-            <a:extLst>
-              <a:ext uri="{FF2B5EF4-FFF2-40B4-BE49-F238E27FC236}">
-                <a16:creationId xmlns:a16="http://schemas.microsoft.com/office/drawing/2014/main" id="{692C2D3A-B5C9-4E13-9714-BC54302DA6B6}"/>
-              </a:ext>
-            </a:extLst>
-          </p:cNvPr>
-          <p:cNvSpPr>
-            <a:spLocks noGrp="1"/>
-          </p:cNvSpPr>
-          <p:nvPr>
-            <p:ph type="title"/>
-          </p:nvPr>
-        </p:nvSpPr>
-        <p:spPr/>
-        <p:txBody>
-          <a:bodyPr/>
+      <p:pic>
+        <p:nvPicPr>
+          <p:cNvPr id="5" name="Picture 4">
+            <a:extLst>
+              <a:ext uri="{FF2B5EF4-FFF2-40B4-BE49-F238E27FC236}">
+                <a16:creationId xmlns:a16="http://schemas.microsoft.com/office/drawing/2014/main" id="{A2D96899-916E-4667-967A-53C75DE0B124}"/>
+              </a:ext>
+            </a:extLst>
+          </p:cNvPr>
+          <p:cNvPicPr>
+            <a:picLocks noChangeAspect="1"/>
+          </p:cNvPicPr>
+          <p:nvPr/>
+        </p:nvPicPr>
+        <p:blipFill>
+          <a:blip r:embed="rId2">
+            <a:extLst>
+              <a:ext uri="{28A0092B-C50C-407E-A947-70E740481C1C}">
+                <a14:useLocalDpi xmlns:a14="http://schemas.microsoft.com/office/drawing/2010/main" val="0"/>
+              </a:ext>
+            </a:extLst>
+          </a:blip>
+          <a:stretch>
+            <a:fillRect/>
+          </a:stretch>
+        </p:blipFill>
+        <p:spPr>
+          <a:xfrm>
+            <a:off x="799707" y="2129363"/>
+            <a:ext cx="10097909" cy="3648584"/>
+          </a:xfrm>
+          <a:prstGeom prst="rect">
+            <a:avLst/>
+          </a:prstGeom>
+        </p:spPr>
+      </p:pic>
+      <p:sp>
+        <p:nvSpPr>
+          <p:cNvPr id="6" name="TextBox 5">
+            <a:extLst>
+              <a:ext uri="{FF2B5EF4-FFF2-40B4-BE49-F238E27FC236}">
+                <a16:creationId xmlns:a16="http://schemas.microsoft.com/office/drawing/2014/main" id="{7A53C59A-1A95-4FC7-AB43-C7A259FFA6C7}"/>
+              </a:ext>
+            </a:extLst>
+          </p:cNvPr>
+          <p:cNvSpPr txBox="1"/>
+          <p:nvPr/>
+        </p:nvSpPr>
+        <p:spPr>
+          <a:xfrm>
+            <a:off x="213989" y="493362"/>
+            <a:ext cx="10571201" cy="369332"/>
+          </a:xfrm>
+          <a:prstGeom prst="rect">
+            <a:avLst/>
+          </a:prstGeom>
+          <a:noFill/>
+        </p:spPr>
+        <p:txBody>
+          <a:bodyPr wrap="square" rtlCol="0">
+            <a:spAutoFit/>
+          </a:bodyPr>
           <a:lstStyle/>
           <a:p>
             <a:r>
-              <a:rPr lang="en-NZ" dirty="0"/>
-              <a:t>Summary</a:t>
-            </a:r>
-            <a:endParaRPr lang="en-GB" dirty="0"/>
-          </a:p>
-        </p:txBody>
-      </p:sp>
-      <p:sp>
-        <p:nvSpPr>
-          <p:cNvPr id="3" name="Content Placeholder 2">
-            <a:extLst>
-              <a:ext uri="{FF2B5EF4-FFF2-40B4-BE49-F238E27FC236}">
-                <a16:creationId xmlns:a16="http://schemas.microsoft.com/office/drawing/2014/main" id="{B9A7E7A7-1393-483D-AE1C-C96BE6B86BF7}"/>
-              </a:ext>
-            </a:extLst>
-          </p:cNvPr>
-          <p:cNvSpPr>
-            <a:spLocks noGrp="1"/>
-          </p:cNvSpPr>
-          <p:nvPr>
-            <p:ph idx="1"/>
-          </p:nvPr>
-        </p:nvSpPr>
-        <p:spPr/>
-        <p:txBody>
-          <a:bodyPr/>
-          <a:lstStyle/>
-          <a:p>
-            <a:r>
-              <a:rPr lang="en-NZ" dirty="0"/>
-              <a:t>More rows cause distance of principle components of samples to diverge more, such that you have more extreme values in the distance matrix with the mean being smaller and smaller</a:t>
-            </a:r>
-          </a:p>
-          <a:p>
-            <a:r>
-              <a:rPr lang="en-NZ" dirty="0"/>
-              <a:t>Less columns causes better separation between groups as more degrees of freedom</a:t>
-            </a:r>
-          </a:p>
-          <a:p>
-            <a:r>
-              <a:rPr lang="en-NZ" dirty="0"/>
-              <a:t>Under ideal conditions, a focused subset of columns MAY produce a good model (as shown when BP was the only column used for prediction, the row </a:t>
-            </a:r>
-            <a:r>
-              <a:rPr lang="en-NZ"/>
-              <a:t>issue disappears)</a:t>
-            </a:r>
-            <a:endParaRPr lang="en-NZ" dirty="0"/>
-          </a:p>
-          <a:p>
-            <a:endParaRPr lang="en-GB" dirty="0"/>
+              <a:rPr lang="en-NZ" b="1" dirty="0"/>
+              <a:t>Runs on subsets of dataset (rows) when only using blood pressure (</a:t>
+            </a:r>
+            <a:r>
+              <a:rPr lang="en-NZ" b="1" dirty="0" err="1"/>
+              <a:t>dia</a:t>
+            </a:r>
+            <a:r>
+              <a:rPr lang="en-NZ" b="1" dirty="0"/>
+              <a:t> &amp; sys) as inputs into the model</a:t>
+            </a:r>
+            <a:endParaRPr lang="en-GB" b="1" dirty="0"/>
           </a:p>
         </p:txBody>
       </p:sp>
     </p:spTree>
     <p:extLst>
       <p:ext uri="{BB962C8B-B14F-4D97-AF65-F5344CB8AC3E}">
-        <p14:creationId xmlns:p14="http://schemas.microsoft.com/office/powerpoint/2010/main" val="1955196879"/>
+        <p14:creationId xmlns:p14="http://schemas.microsoft.com/office/powerpoint/2010/main" val="65343148"/>
       </p:ext>
     </p:extLst>
   </p:cSld>

</xml_diff>

<commit_message>
append some more results to the ppt
</commit_message>
<xml_diff>
--- a/job_results.pptx
+++ b/job_results.pptx
@@ -127,7 +127,7 @@
   <pc:docChgLst>
     <pc:chgData name="Zhao Xiong" userId="5eba49e5-2895-4cd9-83e8-b3064fe76704" providerId="ADAL" clId="{B606E7B2-EFF5-418A-8639-9F7537C4DA50}"/>
     <pc:docChg chg="undo custSel addSld delSld modSld sldOrd">
-      <pc:chgData name="Zhao Xiong" userId="5eba49e5-2895-4cd9-83e8-b3064fe76704" providerId="ADAL" clId="{B606E7B2-EFF5-418A-8639-9F7537C4DA50}" dt="2022-05-14T12:32:07.169" v="2133" actId="2696"/>
+      <pc:chgData name="Zhao Xiong" userId="5eba49e5-2895-4cd9-83e8-b3064fe76704" providerId="ADAL" clId="{B606E7B2-EFF5-418A-8639-9F7537C4DA50}" dt="2022-05-14T12:58:26.397" v="2148" actId="20577"/>
       <pc:docMkLst>
         <pc:docMk/>
       </pc:docMkLst>
@@ -304,13 +304,13 @@
         </pc:picChg>
       </pc:sldChg>
       <pc:sldChg chg="addSp delSp modSp">
-        <pc:chgData name="Zhao Xiong" userId="5eba49e5-2895-4cd9-83e8-b3064fe76704" providerId="ADAL" clId="{B606E7B2-EFF5-418A-8639-9F7537C4DA50}" dt="2022-05-14T12:30:44.928" v="2132" actId="1076"/>
+        <pc:chgData name="Zhao Xiong" userId="5eba49e5-2895-4cd9-83e8-b3064fe76704" providerId="ADAL" clId="{B606E7B2-EFF5-418A-8639-9F7537C4DA50}" dt="2022-05-14T12:52:27.926" v="2135" actId="1076"/>
         <pc:sldMkLst>
           <pc:docMk/>
           <pc:sldMk cId="1920508232" sldId="262"/>
         </pc:sldMkLst>
         <pc:picChg chg="mod">
-          <ac:chgData name="Zhao Xiong" userId="5eba49e5-2895-4cd9-83e8-b3064fe76704" providerId="ADAL" clId="{B606E7B2-EFF5-418A-8639-9F7537C4DA50}" dt="2022-05-10T17:46:45.477" v="474" actId="1038"/>
+          <ac:chgData name="Zhao Xiong" userId="5eba49e5-2895-4cd9-83e8-b3064fe76704" providerId="ADAL" clId="{B606E7B2-EFF5-418A-8639-9F7537C4DA50}" dt="2022-05-14T12:52:27.926" v="2135" actId="1076"/>
           <ac:picMkLst>
             <pc:docMk/>
             <pc:sldMk cId="1920508232" sldId="262"/>
@@ -318,7 +318,7 @@
           </ac:picMkLst>
         </pc:picChg>
         <pc:picChg chg="add mod">
-          <ac:chgData name="Zhao Xiong" userId="5eba49e5-2895-4cd9-83e8-b3064fe76704" providerId="ADAL" clId="{B606E7B2-EFF5-418A-8639-9F7537C4DA50}" dt="2022-05-10T17:46:45.477" v="474" actId="1038"/>
+          <ac:chgData name="Zhao Xiong" userId="5eba49e5-2895-4cd9-83e8-b3064fe76704" providerId="ADAL" clId="{B606E7B2-EFF5-418A-8639-9F7537C4DA50}" dt="2022-05-14T12:52:27.926" v="2135" actId="1076"/>
           <ac:picMkLst>
             <pc:docMk/>
             <pc:sldMk cId="1920508232" sldId="262"/>
@@ -358,7 +358,7 @@
           </ac:picMkLst>
         </pc:picChg>
         <pc:picChg chg="add mod">
-          <ac:chgData name="Zhao Xiong" userId="5eba49e5-2895-4cd9-83e8-b3064fe76704" providerId="ADAL" clId="{B606E7B2-EFF5-418A-8639-9F7537C4DA50}" dt="2022-05-14T12:30:44.928" v="2132" actId="1076"/>
+          <ac:chgData name="Zhao Xiong" userId="5eba49e5-2895-4cd9-83e8-b3064fe76704" providerId="ADAL" clId="{B606E7B2-EFF5-418A-8639-9F7537C4DA50}" dt="2022-05-14T12:52:27.926" v="2135" actId="1076"/>
           <ac:picMkLst>
             <pc:docMk/>
             <pc:sldMk cId="1920508232" sldId="262"/>
@@ -373,8 +373,8 @@
             <ac:picMk id="6" creationId="{01A1D53C-FB19-4260-A9A2-759A07C869B0}"/>
           </ac:picMkLst>
         </pc:picChg>
-        <pc:picChg chg="add mod">
-          <ac:chgData name="Zhao Xiong" userId="5eba49e5-2895-4cd9-83e8-b3064fe76704" providerId="ADAL" clId="{B606E7B2-EFF5-418A-8639-9F7537C4DA50}" dt="2022-05-10T17:46:40.481" v="461" actId="14100"/>
+        <pc:picChg chg="add del mod">
+          <ac:chgData name="Zhao Xiong" userId="5eba49e5-2895-4cd9-83e8-b3064fe76704" providerId="ADAL" clId="{B606E7B2-EFF5-418A-8639-9F7537C4DA50}" dt="2022-05-14T12:52:20.907" v="2134" actId="478"/>
           <ac:picMkLst>
             <pc:docMk/>
             <pc:sldMk cId="1920508232" sldId="262"/>
@@ -390,7 +390,7 @@
           </ac:picMkLst>
         </pc:picChg>
         <pc:picChg chg="add mod">
-          <ac:chgData name="Zhao Xiong" userId="5eba49e5-2895-4cd9-83e8-b3064fe76704" providerId="ADAL" clId="{B606E7B2-EFF5-418A-8639-9F7537C4DA50}" dt="2022-05-10T17:47:50.921" v="478" actId="14100"/>
+          <ac:chgData name="Zhao Xiong" userId="5eba49e5-2895-4cd9-83e8-b3064fe76704" providerId="ADAL" clId="{B606E7B2-EFF5-418A-8639-9F7537C4DA50}" dt="2022-05-14T12:52:27.926" v="2135" actId="1076"/>
           <ac:picMkLst>
             <pc:docMk/>
             <pc:sldMk cId="1920508232" sldId="262"/>
@@ -414,7 +414,7 @@
           </ac:picMkLst>
         </pc:picChg>
         <pc:picChg chg="mod">
-          <ac:chgData name="Zhao Xiong" userId="5eba49e5-2895-4cd9-83e8-b3064fe76704" providerId="ADAL" clId="{B606E7B2-EFF5-418A-8639-9F7537C4DA50}" dt="2022-05-10T17:46:45.477" v="474" actId="1038"/>
+          <ac:chgData name="Zhao Xiong" userId="5eba49e5-2895-4cd9-83e8-b3064fe76704" providerId="ADAL" clId="{B606E7B2-EFF5-418A-8639-9F7537C4DA50}" dt="2022-05-14T12:52:27.926" v="2135" actId="1076"/>
           <ac:picMkLst>
             <pc:docMk/>
             <pc:sldMk cId="1920508232" sldId="262"/>
@@ -422,7 +422,7 @@
           </ac:picMkLst>
         </pc:picChg>
         <pc:picChg chg="add mod">
-          <ac:chgData name="Zhao Xiong" userId="5eba49e5-2895-4cd9-83e8-b3064fe76704" providerId="ADAL" clId="{B606E7B2-EFF5-418A-8639-9F7537C4DA50}" dt="2022-05-10T17:46:45.477" v="474" actId="1038"/>
+          <ac:chgData name="Zhao Xiong" userId="5eba49e5-2895-4cd9-83e8-b3064fe76704" providerId="ADAL" clId="{B606E7B2-EFF5-418A-8639-9F7537C4DA50}" dt="2022-05-14T12:52:27.926" v="2135" actId="1076"/>
           <ac:picMkLst>
             <pc:docMk/>
             <pc:sldMk cId="1920508232" sldId="262"/>
@@ -430,7 +430,7 @@
           </ac:picMkLst>
         </pc:picChg>
         <pc:picChg chg="add mod">
-          <ac:chgData name="Zhao Xiong" userId="5eba49e5-2895-4cd9-83e8-b3064fe76704" providerId="ADAL" clId="{B606E7B2-EFF5-418A-8639-9F7537C4DA50}" dt="2022-05-10T17:46:45.477" v="474" actId="1038"/>
+          <ac:chgData name="Zhao Xiong" userId="5eba49e5-2895-4cd9-83e8-b3064fe76704" providerId="ADAL" clId="{B606E7B2-EFF5-418A-8639-9F7537C4DA50}" dt="2022-05-14T12:52:27.926" v="2135" actId="1076"/>
           <ac:picMkLst>
             <pc:docMk/>
             <pc:sldMk cId="1920508232" sldId="262"/>
@@ -612,7 +612,7 @@
         </pc:spChg>
       </pc:sldChg>
       <pc:sldChg chg="addSp delSp modSp add ord">
-        <pc:chgData name="Zhao Xiong" userId="5eba49e5-2895-4cd9-83e8-b3064fe76704" providerId="ADAL" clId="{B606E7B2-EFF5-418A-8639-9F7537C4DA50}" dt="2022-05-14T12:30:03.514" v="2124" actId="20577"/>
+        <pc:chgData name="Zhao Xiong" userId="5eba49e5-2895-4cd9-83e8-b3064fe76704" providerId="ADAL" clId="{B606E7B2-EFF5-418A-8639-9F7537C4DA50}" dt="2022-05-14T12:58:26.397" v="2148" actId="20577"/>
         <pc:sldMkLst>
           <pc:docMk/>
           <pc:sldMk cId="3573502216" sldId="266"/>
@@ -674,7 +674,7 @@
           </ac:spMkLst>
         </pc:spChg>
         <pc:spChg chg="add mod">
-          <ac:chgData name="Zhao Xiong" userId="5eba49e5-2895-4cd9-83e8-b3064fe76704" providerId="ADAL" clId="{B606E7B2-EFF5-418A-8639-9F7537C4DA50}" dt="2022-05-14T12:30:03.514" v="2124" actId="20577"/>
+          <ac:chgData name="Zhao Xiong" userId="5eba49e5-2895-4cd9-83e8-b3064fe76704" providerId="ADAL" clId="{B606E7B2-EFF5-418A-8639-9F7537C4DA50}" dt="2022-05-14T12:58:26.397" v="2148" actId="20577"/>
           <ac:spMkLst>
             <pc:docMk/>
             <pc:sldMk cId="3573502216" sldId="266"/>
@@ -5311,7 +5311,7 @@
         </p:blipFill>
         <p:spPr>
           <a:xfrm>
-            <a:off x="7005227" y="461665"/>
+            <a:off x="4635775" y="461578"/>
             <a:ext cx="2388936" cy="2017214"/>
           </a:xfrm>
           <a:prstGeom prst="rect">
@@ -5341,7 +5341,7 @@
         </p:blipFill>
         <p:spPr>
           <a:xfrm>
-            <a:off x="4657565" y="461665"/>
+            <a:off x="2288113" y="461578"/>
             <a:ext cx="2347662" cy="2017214"/>
           </a:xfrm>
           <a:prstGeom prst="rect">
@@ -5401,7 +5401,7 @@
         </p:blipFill>
         <p:spPr>
           <a:xfrm>
-            <a:off x="7005228" y="2642229"/>
+            <a:off x="4635776" y="2642142"/>
             <a:ext cx="2275895" cy="2062046"/>
           </a:xfrm>
           <a:prstGeom prst="rect">
@@ -5461,7 +5461,7 @@
         </p:blipFill>
         <p:spPr>
           <a:xfrm>
-            <a:off x="7005227" y="4801834"/>
+            <a:off x="4635775" y="4801747"/>
             <a:ext cx="2199789" cy="2043645"/>
           </a:xfrm>
           <a:prstGeom prst="rect">
@@ -5491,7 +5491,7 @@
         </p:blipFill>
         <p:spPr>
           <a:xfrm>
-            <a:off x="9394163" y="455404"/>
+            <a:off x="7024711" y="455317"/>
             <a:ext cx="2202478" cy="2029735"/>
           </a:xfrm>
           <a:prstGeom prst="rect">
@@ -5521,7 +5521,7 @@
         </p:blipFill>
         <p:spPr>
           <a:xfrm>
-            <a:off x="4657565" y="2642228"/>
+            <a:off x="2288113" y="2642141"/>
             <a:ext cx="2347662" cy="2106876"/>
           </a:xfrm>
           <a:prstGeom prst="rect">
@@ -5531,10 +5531,10 @@
       </p:pic>
       <p:pic>
         <p:nvPicPr>
-          <p:cNvPr id="6" name="Picture 5">
-            <a:extLst>
-              <a:ext uri="{FF2B5EF4-FFF2-40B4-BE49-F238E27FC236}">
-                <a16:creationId xmlns:a16="http://schemas.microsoft.com/office/drawing/2014/main" id="{537EC218-CBE3-4119-BF6B-54BB7C56C594}"/>
+          <p:cNvPr id="5" name="Picture 4">
+            <a:extLst>
+              <a:ext uri="{FF2B5EF4-FFF2-40B4-BE49-F238E27FC236}">
+                <a16:creationId xmlns:a16="http://schemas.microsoft.com/office/drawing/2014/main" id="{F3A28C97-FC86-4392-9192-A00393915C9E}"/>
               </a:ext>
             </a:extLst>
           </p:cNvPr>
@@ -5551,37 +5551,7 @@
         </p:blipFill>
         <p:spPr>
           <a:xfrm>
-            <a:off x="2350232" y="454822"/>
-            <a:ext cx="2388936" cy="2067735"/>
-          </a:xfrm>
-          <a:prstGeom prst="rect">
-            <a:avLst/>
-          </a:prstGeom>
-        </p:spPr>
-      </p:pic>
-      <p:pic>
-        <p:nvPicPr>
-          <p:cNvPr id="5" name="Picture 4">
-            <a:extLst>
-              <a:ext uri="{FF2B5EF4-FFF2-40B4-BE49-F238E27FC236}">
-                <a16:creationId xmlns:a16="http://schemas.microsoft.com/office/drawing/2014/main" id="{F3A28C97-FC86-4392-9192-A00393915C9E}"/>
-              </a:ext>
-            </a:extLst>
-          </p:cNvPr>
-          <p:cNvPicPr>
-            <a:picLocks noChangeAspect="1"/>
-          </p:cNvPicPr>
-          <p:nvPr/>
-        </p:nvPicPr>
-        <p:blipFill>
-          <a:blip r:embed="rId12"/>
-          <a:stretch>
-            <a:fillRect/>
-          </a:stretch>
-        </p:blipFill>
-        <p:spPr>
-          <a:xfrm>
-            <a:off x="11660222" y="454822"/>
+            <a:off x="9290770" y="454735"/>
             <a:ext cx="2436331" cy="2017214"/>
           </a:xfrm>
           <a:prstGeom prst="rect">
@@ -5943,7 +5913,23 @@
                   <a:srgbClr val="FF0000"/>
                 </a:solidFill>
               </a:rPr>
-              <a:t> space with the median, they should be instead replaced somehow by their next closest node ….</a:t>
+              <a:t> space with the median </a:t>
+            </a:r>
+            <a:r>
+              <a:rPr lang="en-NZ" sz="1200">
+                <a:solidFill>
+                  <a:srgbClr val="FF0000"/>
+                </a:solidFill>
+              </a:rPr>
+              <a:t>(around 0), </a:t>
+            </a:r>
+            <a:r>
+              <a:rPr lang="en-NZ" sz="1200" dirty="0">
+                <a:solidFill>
+                  <a:srgbClr val="FF0000"/>
+                </a:solidFill>
+              </a:rPr>
+              <a:t>they should be instead replaced somehow by their next closest node ….</a:t>
             </a:r>
             <a:endParaRPr lang="en-GB" sz="1200" dirty="0">
               <a:solidFill>

</xml_diff>

<commit_message>
added plots of each cPC distribution in ppt
</commit_message>
<xml_diff>
--- a/job_results.pptx
+++ b/job_results.pptx
@@ -5,17 +5,18 @@
     <p:sldMasterId id="2147483648" r:id="rId1"/>
   </p:sldMasterIdLst>
   <p:notesMasterIdLst>
-    <p:notesMasterId r:id="rId10"/>
+    <p:notesMasterId r:id="rId11"/>
   </p:notesMasterIdLst>
   <p:sldIdLst>
     <p:sldId id="256" r:id="rId2"/>
     <p:sldId id="264" r:id="rId3"/>
     <p:sldId id="261" r:id="rId4"/>
     <p:sldId id="262" r:id="rId5"/>
-    <p:sldId id="266" r:id="rId6"/>
-    <p:sldId id="258" r:id="rId7"/>
-    <p:sldId id="259" r:id="rId8"/>
-    <p:sldId id="263" r:id="rId9"/>
+    <p:sldId id="267" r:id="rId6"/>
+    <p:sldId id="266" r:id="rId7"/>
+    <p:sldId id="258" r:id="rId8"/>
+    <p:sldId id="259" r:id="rId9"/>
+    <p:sldId id="263" r:id="rId10"/>
   </p:sldIdLst>
   <p:sldSz cx="12192000" cy="6858000"/>
   <p:notesSz cx="6858000" cy="9144000"/>
@@ -127,7 +128,7 @@
   <pc:docChgLst>
     <pc:chgData name="Zhao Xiong" userId="5eba49e5-2895-4cd9-83e8-b3064fe76704" providerId="ADAL" clId="{B606E7B2-EFF5-418A-8639-9F7537C4DA50}"/>
     <pc:docChg chg="undo custSel addSld delSld modSld sldOrd">
-      <pc:chgData name="Zhao Xiong" userId="5eba49e5-2895-4cd9-83e8-b3064fe76704" providerId="ADAL" clId="{B606E7B2-EFF5-418A-8639-9F7537C4DA50}" dt="2022-05-14T12:58:26.397" v="2148" actId="20577"/>
+      <pc:chgData name="Zhao Xiong" userId="5eba49e5-2895-4cd9-83e8-b3064fe76704" providerId="ADAL" clId="{B606E7B2-EFF5-418A-8639-9F7537C4DA50}" dt="2022-05-14T13:33:11.349" v="2286" actId="1076"/>
       <pc:docMkLst>
         <pc:docMk/>
       </pc:docMkLst>
@@ -793,6 +794,101 @@
             <ac:cxnSpMk id="17" creationId="{2943542E-98E6-4223-8034-821A97495596}"/>
           </ac:cxnSpMkLst>
         </pc:cxnChg>
+      </pc:sldChg>
+      <pc:sldChg chg="addSp delSp modSp add">
+        <pc:chgData name="Zhao Xiong" userId="5eba49e5-2895-4cd9-83e8-b3064fe76704" providerId="ADAL" clId="{B606E7B2-EFF5-418A-8639-9F7537C4DA50}" dt="2022-05-14T13:33:11.349" v="2286" actId="1076"/>
+        <pc:sldMkLst>
+          <pc:docMk/>
+          <pc:sldMk cId="3970877698" sldId="267"/>
+        </pc:sldMkLst>
+        <pc:spChg chg="del">
+          <ac:chgData name="Zhao Xiong" userId="5eba49e5-2895-4cd9-83e8-b3064fe76704" providerId="ADAL" clId="{B606E7B2-EFF5-418A-8639-9F7537C4DA50}" dt="2022-05-14T13:30:48.120" v="2150" actId="478"/>
+          <ac:spMkLst>
+            <pc:docMk/>
+            <pc:sldMk cId="3970877698" sldId="267"/>
+            <ac:spMk id="2" creationId="{CA25B33B-FBDB-428B-8EA5-25B21C4F0BC9}"/>
+          </ac:spMkLst>
+        </pc:spChg>
+        <pc:spChg chg="del">
+          <ac:chgData name="Zhao Xiong" userId="5eba49e5-2895-4cd9-83e8-b3064fe76704" providerId="ADAL" clId="{B606E7B2-EFF5-418A-8639-9F7537C4DA50}" dt="2022-05-14T13:30:48.120" v="2150" actId="478"/>
+          <ac:spMkLst>
+            <pc:docMk/>
+            <pc:sldMk cId="3970877698" sldId="267"/>
+            <ac:spMk id="3" creationId="{B89420B0-8395-4872-ADBB-A01C2601BD64}"/>
+          </ac:spMkLst>
+        </pc:spChg>
+        <pc:spChg chg="add mod">
+          <ac:chgData name="Zhao Xiong" userId="5eba49e5-2895-4cd9-83e8-b3064fe76704" providerId="ADAL" clId="{B606E7B2-EFF5-418A-8639-9F7537C4DA50}" dt="2022-05-14T13:31:21.045" v="2262" actId="1035"/>
+          <ac:spMkLst>
+            <pc:docMk/>
+            <pc:sldMk cId="3970877698" sldId="267"/>
+            <ac:spMk id="5" creationId="{C0EDD6DF-DB99-4EE6-A5BF-CE0D62FBE84E}"/>
+          </ac:spMkLst>
+        </pc:spChg>
+        <pc:spChg chg="add mod">
+          <ac:chgData name="Zhao Xiong" userId="5eba49e5-2895-4cd9-83e8-b3064fe76704" providerId="ADAL" clId="{B606E7B2-EFF5-418A-8639-9F7537C4DA50}" dt="2022-05-14T13:32:13.341" v="2274" actId="1076"/>
+          <ac:spMkLst>
+            <pc:docMk/>
+            <pc:sldMk cId="3970877698" sldId="267"/>
+            <ac:spMk id="6" creationId="{8ED56D22-F48A-4D08-AFF1-AE04223BE525}"/>
+          </ac:spMkLst>
+        </pc:spChg>
+        <pc:spChg chg="add mod">
+          <ac:chgData name="Zhao Xiong" userId="5eba49e5-2895-4cd9-83e8-b3064fe76704" providerId="ADAL" clId="{B606E7B2-EFF5-418A-8639-9F7537C4DA50}" dt="2022-05-14T13:32:15.573" v="2276" actId="1076"/>
+          <ac:spMkLst>
+            <pc:docMk/>
+            <pc:sldMk cId="3970877698" sldId="267"/>
+            <ac:spMk id="7" creationId="{155A5477-F770-451F-A7B9-33D0DC1C4357}"/>
+          </ac:spMkLst>
+        </pc:spChg>
+        <pc:spChg chg="add mod">
+          <ac:chgData name="Zhao Xiong" userId="5eba49e5-2895-4cd9-83e8-b3064fe76704" providerId="ADAL" clId="{B606E7B2-EFF5-418A-8639-9F7537C4DA50}" dt="2022-05-14T13:32:19.254" v="2278" actId="1076"/>
+          <ac:spMkLst>
+            <pc:docMk/>
+            <pc:sldMk cId="3970877698" sldId="267"/>
+            <ac:spMk id="8" creationId="{0B0C6169-EA49-4595-A2A8-9AB41A086630}"/>
+          </ac:spMkLst>
+        </pc:spChg>
+        <pc:spChg chg="add mod">
+          <ac:chgData name="Zhao Xiong" userId="5eba49e5-2895-4cd9-83e8-b3064fe76704" providerId="ADAL" clId="{B606E7B2-EFF5-418A-8639-9F7537C4DA50}" dt="2022-05-14T13:32:23.061" v="2280" actId="1076"/>
+          <ac:spMkLst>
+            <pc:docMk/>
+            <pc:sldMk cId="3970877698" sldId="267"/>
+            <ac:spMk id="9" creationId="{5534C4E7-B50E-4489-8898-D83C0DA96F97}"/>
+          </ac:spMkLst>
+        </pc:spChg>
+        <pc:spChg chg="add mod">
+          <ac:chgData name="Zhao Xiong" userId="5eba49e5-2895-4cd9-83e8-b3064fe76704" providerId="ADAL" clId="{B606E7B2-EFF5-418A-8639-9F7537C4DA50}" dt="2022-05-14T13:32:37.901" v="2282" actId="1076"/>
+          <ac:spMkLst>
+            <pc:docMk/>
+            <pc:sldMk cId="3970877698" sldId="267"/>
+            <ac:spMk id="10" creationId="{0DDA503C-FD9C-496B-9188-01B1F5D36071}"/>
+          </ac:spMkLst>
+        </pc:spChg>
+        <pc:spChg chg="add mod">
+          <ac:chgData name="Zhao Xiong" userId="5eba49e5-2895-4cd9-83e8-b3064fe76704" providerId="ADAL" clId="{B606E7B2-EFF5-418A-8639-9F7537C4DA50}" dt="2022-05-14T13:32:44.077" v="2284" actId="1076"/>
+          <ac:spMkLst>
+            <pc:docMk/>
+            <pc:sldMk cId="3970877698" sldId="267"/>
+            <ac:spMk id="11" creationId="{5CC7CFA0-EA41-46AE-9483-414E021ED28C}"/>
+          </ac:spMkLst>
+        </pc:spChg>
+        <pc:spChg chg="add mod">
+          <ac:chgData name="Zhao Xiong" userId="5eba49e5-2895-4cd9-83e8-b3064fe76704" providerId="ADAL" clId="{B606E7B2-EFF5-418A-8639-9F7537C4DA50}" dt="2022-05-14T13:33:11.349" v="2286" actId="1076"/>
+          <ac:spMkLst>
+            <pc:docMk/>
+            <pc:sldMk cId="3970877698" sldId="267"/>
+            <ac:spMk id="12" creationId="{8E3EF513-AD3B-4458-99AE-5488173F9B26}"/>
+          </ac:spMkLst>
+        </pc:spChg>
+        <pc:picChg chg="add mod">
+          <ac:chgData name="Zhao Xiong" userId="5eba49e5-2895-4cd9-83e8-b3064fe76704" providerId="ADAL" clId="{B606E7B2-EFF5-418A-8639-9F7537C4DA50}" dt="2022-05-14T13:30:50.230" v="2152" actId="1076"/>
+          <ac:picMkLst>
+            <pc:docMk/>
+            <pc:sldMk cId="3970877698" sldId="267"/>
+            <ac:picMk id="4" creationId="{63EBF888-F686-4865-8199-EA554F7C97B8}"/>
+          </ac:picMkLst>
+        </pc:picChg>
       </pc:sldChg>
     </pc:docChg>
   </pc:docChgLst>
@@ -5591,81 +5687,10 @@
       </p:grpSpPr>
       <p:pic>
         <p:nvPicPr>
-          <p:cNvPr id="5" name="Picture 4">
-            <a:extLst>
-              <a:ext uri="{FF2B5EF4-FFF2-40B4-BE49-F238E27FC236}">
-                <a16:creationId xmlns:a16="http://schemas.microsoft.com/office/drawing/2014/main" id="{2BAC2202-805B-4DC3-A3C7-C9CC97599E10}"/>
-              </a:ext>
-            </a:extLst>
-          </p:cNvPr>
-          <p:cNvPicPr>
-            <a:picLocks noChangeAspect="1"/>
-          </p:cNvPicPr>
-          <p:nvPr/>
-        </p:nvPicPr>
-        <p:blipFill rotWithShape="1">
-          <a:blip r:embed="rId2">
-            <a:extLst>
-              <a:ext uri="{28A0092B-C50C-407E-A947-70E740481C1C}">
-                <a14:useLocalDpi xmlns:a14="http://schemas.microsoft.com/office/drawing/2010/main" val="0"/>
-              </a:ext>
-            </a:extLst>
-          </a:blip>
-          <a:srcRect r="54446"/>
-          <a:stretch/>
-        </p:blipFill>
-        <p:spPr>
-          <a:xfrm>
-            <a:off x="76201" y="1140496"/>
-            <a:ext cx="2982682" cy="3890687"/>
-          </a:xfrm>
-          <a:prstGeom prst="rect">
-            <a:avLst/>
-          </a:prstGeom>
-        </p:spPr>
-      </p:pic>
-      <p:sp>
-        <p:nvSpPr>
-          <p:cNvPr id="6" name="TextBox 5">
-            <a:extLst>
-              <a:ext uri="{FF2B5EF4-FFF2-40B4-BE49-F238E27FC236}">
-                <a16:creationId xmlns:a16="http://schemas.microsoft.com/office/drawing/2014/main" id="{108BEBBF-0CC4-49CA-B7B2-9D4B22059FB3}"/>
-              </a:ext>
-            </a:extLst>
-          </p:cNvPr>
-          <p:cNvSpPr txBox="1"/>
-          <p:nvPr/>
-        </p:nvSpPr>
-        <p:spPr>
-          <a:xfrm>
-            <a:off x="213989" y="493362"/>
-            <a:ext cx="10571201" cy="369332"/>
-          </a:xfrm>
-          <a:prstGeom prst="rect">
-            <a:avLst/>
-          </a:prstGeom>
-          <a:noFill/>
-        </p:spPr>
-        <p:txBody>
-          <a:bodyPr wrap="square" rtlCol="0">
-            <a:spAutoFit/>
-          </a:bodyPr>
-          <a:lstStyle/>
-          <a:p>
-            <a:r>
-              <a:rPr lang="en-NZ" b="1" dirty="0"/>
-              <a:t>Handling abnormally high distance values in distance matrix (test on 20% subset ~5600 rows)</a:t>
-            </a:r>
-            <a:endParaRPr lang="en-GB" b="1" dirty="0"/>
-          </a:p>
-        </p:txBody>
-      </p:sp>
-      <p:pic>
-        <p:nvPicPr>
-          <p:cNvPr id="2" name="Picture 1">
-            <a:extLst>
-              <a:ext uri="{FF2B5EF4-FFF2-40B4-BE49-F238E27FC236}">
-                <a16:creationId xmlns:a16="http://schemas.microsoft.com/office/drawing/2014/main" id="{0FA7BFA3-93B6-4DD8-BF5C-5441A83F4695}"/>
+          <p:cNvPr id="4" name="Picture 3">
+            <a:extLst>
+              <a:ext uri="{FF2B5EF4-FFF2-40B4-BE49-F238E27FC236}">
+                <a16:creationId xmlns:a16="http://schemas.microsoft.com/office/drawing/2014/main" id="{63EBF888-F686-4865-8199-EA554F7C97B8}"/>
               </a:ext>
             </a:extLst>
           </p:cNvPr>
@@ -5675,15 +5700,15 @@
           <p:nvPr/>
         </p:nvPicPr>
         <p:blipFill>
-          <a:blip r:embed="rId3"/>
+          <a:blip r:embed="rId2"/>
           <a:stretch>
             <a:fillRect/>
           </a:stretch>
         </p:blipFill>
         <p:spPr>
           <a:xfrm>
-            <a:off x="6041565" y="1140496"/>
-            <a:ext cx="2873800" cy="3841079"/>
+            <a:off x="0" y="455497"/>
+            <a:ext cx="12192000" cy="6402503"/>
           </a:xfrm>
           <a:prstGeom prst="rect">
             <a:avLst/>
@@ -5692,10 +5717,10 @@
       </p:pic>
       <p:sp>
         <p:nvSpPr>
-          <p:cNvPr id="8" name="TextBox 7">
-            <a:extLst>
-              <a:ext uri="{FF2B5EF4-FFF2-40B4-BE49-F238E27FC236}">
-                <a16:creationId xmlns:a16="http://schemas.microsoft.com/office/drawing/2014/main" id="{846D2B52-EEE0-4075-A79B-6528659C5996}"/>
+          <p:cNvPr id="5" name="TextBox 4">
+            <a:extLst>
+              <a:ext uri="{FF2B5EF4-FFF2-40B4-BE49-F238E27FC236}">
+                <a16:creationId xmlns:a16="http://schemas.microsoft.com/office/drawing/2014/main" id="{C0EDD6DF-DB99-4EE6-A5BF-CE0D62FBE84E}"/>
               </a:ext>
             </a:extLst>
           </p:cNvPr>
@@ -5704,44 +5729,34 @@
         </p:nvSpPr>
         <p:spPr>
           <a:xfrm>
-            <a:off x="234218" y="4981575"/>
-            <a:ext cx="2099408" cy="369332"/>
+            <a:off x="0" y="-29260"/>
+            <a:ext cx="12191999" cy="461665"/>
           </a:xfrm>
           <a:prstGeom prst="rect">
             <a:avLst/>
           </a:prstGeom>
-          <a:solidFill>
-            <a:schemeClr val="bg1"/>
-          </a:solidFill>
-        </p:spPr>
-        <p:txBody>
-          <a:bodyPr wrap="square" lIns="0" tIns="0" rIns="0" bIns="0" rtlCol="0">
+          <a:noFill/>
+        </p:spPr>
+        <p:txBody>
+          <a:bodyPr wrap="square" rtlCol="0">
             <a:spAutoFit/>
           </a:bodyPr>
           <a:lstStyle/>
           <a:p>
-            <a:pPr algn="ctr"/>
-            <a:r>
-              <a:rPr lang="en-NZ" sz="1200" b="1" dirty="0"/>
-              <a:t>1) Original </a:t>
-            </a:r>
-          </a:p>
-          <a:p>
-            <a:pPr algn="ctr"/>
-            <a:r>
-              <a:rPr lang="en-NZ" sz="1200" b="1" dirty="0"/>
-              <a:t>(Minimum Spanning Tree)</a:t>
-            </a:r>
-            <a:endParaRPr lang="en-GB" sz="1200" b="1" dirty="0"/>
-          </a:p>
-        </p:txBody>
-      </p:sp>
-      <p:sp>
-        <p:nvSpPr>
-          <p:cNvPr id="9" name="TextBox 8">
-            <a:extLst>
-              <a:ext uri="{FF2B5EF4-FFF2-40B4-BE49-F238E27FC236}">
-                <a16:creationId xmlns:a16="http://schemas.microsoft.com/office/drawing/2014/main" id="{159ECB6D-8197-42C9-9B08-115C0CB6E983}"/>
+            <a:r>
+              <a:rPr lang="en-NZ" sz="2400" b="1" dirty="0"/>
+              <a:t>Distribution of Values for each contrastive principle component in a 20% subset run</a:t>
+            </a:r>
+            <a:endParaRPr lang="en-GB" sz="2400" b="1" dirty="0"/>
+          </a:p>
+        </p:txBody>
+      </p:sp>
+      <p:sp>
+        <p:nvSpPr>
+          <p:cNvPr id="6" name="TextBox 5">
+            <a:extLst>
+              <a:ext uri="{FF2B5EF4-FFF2-40B4-BE49-F238E27FC236}">
+                <a16:creationId xmlns:a16="http://schemas.microsoft.com/office/drawing/2014/main" id="{8ED56D22-F48A-4D08-AFF1-AE04223BE525}"/>
               </a:ext>
             </a:extLst>
           </p:cNvPr>
@@ -5750,188 +5765,205 @@
         </p:nvSpPr>
         <p:spPr>
           <a:xfrm>
-            <a:off x="3275407" y="4981575"/>
-            <a:ext cx="1982394" cy="553998"/>
+            <a:off x="5494020" y="1264920"/>
+            <a:ext cx="439544" cy="707886"/>
           </a:xfrm>
           <a:prstGeom prst="rect">
             <a:avLst/>
           </a:prstGeom>
-          <a:solidFill>
-            <a:schemeClr val="bg1"/>
-          </a:solidFill>
-        </p:spPr>
-        <p:txBody>
-          <a:bodyPr wrap="square" lIns="0" tIns="0" rIns="0" bIns="0" rtlCol="0">
+          <a:noFill/>
+        </p:spPr>
+        <p:txBody>
+          <a:bodyPr wrap="none" rtlCol="0">
             <a:spAutoFit/>
           </a:bodyPr>
           <a:lstStyle/>
           <a:p>
-            <a:pPr algn="ctr"/>
-            <a:r>
-              <a:rPr lang="en-NZ" sz="1200" b="1" dirty="0"/>
-              <a:t>2) Filter out large values in </a:t>
-            </a:r>
-            <a:r>
-              <a:rPr lang="en-NZ" sz="1200" b="1" dirty="0" err="1"/>
-              <a:t>cPC</a:t>
-            </a:r>
-            <a:r>
-              <a:rPr lang="en-NZ" sz="1200" b="1" dirty="0"/>
-              <a:t> space (set values above 3sd as the median)</a:t>
-            </a:r>
-            <a:endParaRPr lang="en-GB" sz="1200" b="1" dirty="0"/>
-          </a:p>
-        </p:txBody>
-      </p:sp>
-      <p:sp>
-        <p:nvSpPr>
-          <p:cNvPr id="10" name="TextBox 9">
-            <a:extLst>
-              <a:ext uri="{FF2B5EF4-FFF2-40B4-BE49-F238E27FC236}">
-                <a16:creationId xmlns:a16="http://schemas.microsoft.com/office/drawing/2014/main" id="{D67F0F88-F469-4158-8F13-A89F610E665A}"/>
-              </a:ext>
-            </a:extLst>
-          </p:cNvPr>
-          <p:cNvSpPr txBox="1"/>
-          <p:nvPr/>
-        </p:nvSpPr>
-        <p:spPr>
-          <a:xfrm>
-            <a:off x="6135621" y="4981575"/>
-            <a:ext cx="2227330" cy="369332"/>
-          </a:xfrm>
-          <a:prstGeom prst="rect">
-            <a:avLst/>
-          </a:prstGeom>
-          <a:solidFill>
-            <a:schemeClr val="bg1"/>
-          </a:solidFill>
-        </p:spPr>
-        <p:txBody>
-          <a:bodyPr wrap="square" lIns="0" tIns="0" rIns="0" bIns="0" rtlCol="0">
-            <a:spAutoFit/>
-          </a:bodyPr>
-          <a:lstStyle/>
-          <a:p>
-            <a:pPr algn="ctr"/>
-            <a:r>
-              <a:rPr lang="en-NZ" sz="1200" b="1" dirty="0"/>
-              <a:t>3) Shortest Path Tree Instead of Minimum Spanning Tree</a:t>
-            </a:r>
-            <a:endParaRPr lang="en-GB" sz="1200" b="1" dirty="0"/>
-          </a:p>
-        </p:txBody>
-      </p:sp>
-      <p:sp>
-        <p:nvSpPr>
-          <p:cNvPr id="11" name="TextBox 10">
-            <a:extLst>
-              <a:ext uri="{FF2B5EF4-FFF2-40B4-BE49-F238E27FC236}">
-                <a16:creationId xmlns:a16="http://schemas.microsoft.com/office/drawing/2014/main" id="{8DF388B5-B151-430B-A09E-940AEAB6AF19}"/>
-              </a:ext>
-            </a:extLst>
-          </p:cNvPr>
-          <p:cNvSpPr txBox="1"/>
-          <p:nvPr/>
-        </p:nvSpPr>
-        <p:spPr>
-          <a:xfrm>
-            <a:off x="9540280" y="4981575"/>
-            <a:ext cx="1356320" cy="369332"/>
-          </a:xfrm>
-          <a:prstGeom prst="rect">
-            <a:avLst/>
-          </a:prstGeom>
-          <a:solidFill>
-            <a:schemeClr val="bg1"/>
-          </a:solidFill>
-        </p:spPr>
-        <p:txBody>
-          <a:bodyPr wrap="square" lIns="0" tIns="0" rIns="0" bIns="0" rtlCol="0">
-            <a:spAutoFit/>
-          </a:bodyPr>
-          <a:lstStyle/>
-          <a:p>
-            <a:pPr algn="ctr"/>
-            <a:r>
-              <a:rPr lang="en-NZ" sz="1200" b="1" dirty="0"/>
-              <a:t>4) #2 (filter) + #3 (use shortest path tree)</a:t>
-            </a:r>
-            <a:endParaRPr lang="en-GB" sz="1200" b="1" dirty="0"/>
-          </a:p>
-        </p:txBody>
-      </p:sp>
-      <p:sp>
-        <p:nvSpPr>
-          <p:cNvPr id="12" name="TextBox 11">
-            <a:extLst>
-              <a:ext uri="{FF2B5EF4-FFF2-40B4-BE49-F238E27FC236}">
-                <a16:creationId xmlns:a16="http://schemas.microsoft.com/office/drawing/2014/main" id="{E23BCCE6-D4B3-49A4-8702-D3E432463990}"/>
-              </a:ext>
-            </a:extLst>
-          </p:cNvPr>
-          <p:cNvSpPr txBox="1"/>
-          <p:nvPr/>
-        </p:nvSpPr>
-        <p:spPr>
-          <a:xfrm>
-            <a:off x="4690862" y="5810640"/>
-            <a:ext cx="4849418" cy="553998"/>
-          </a:xfrm>
-          <a:prstGeom prst="rect">
-            <a:avLst/>
-          </a:prstGeom>
-          <a:solidFill>
-            <a:schemeClr val="bg1"/>
-          </a:solidFill>
-        </p:spPr>
-        <p:txBody>
-          <a:bodyPr wrap="square" lIns="0" tIns="0" rIns="0" bIns="0" rtlCol="0">
-            <a:spAutoFit/>
-          </a:bodyPr>
-          <a:lstStyle/>
-          <a:p>
-            <a:r>
-              <a:rPr lang="en-NZ" sz="1200" dirty="0">
+            <a:r>
+              <a:rPr lang="en-NZ" sz="4000" b="1" dirty="0">
                 <a:solidFill>
                   <a:srgbClr val="FF0000"/>
                 </a:solidFill>
               </a:rPr>
-              <a:t>Note that #2 is currently flawed as we cannot just reassign these abnormally large values in </a:t>
-            </a:r>
-            <a:r>
-              <a:rPr lang="en-NZ" sz="1200" dirty="0" err="1">
+              <a:t>*</a:t>
+            </a:r>
+            <a:endParaRPr lang="en-GB" sz="4000" b="1" dirty="0">
+              <a:solidFill>
+                <a:srgbClr val="FF0000"/>
+              </a:solidFill>
+            </a:endParaRPr>
+          </a:p>
+        </p:txBody>
+      </p:sp>
+      <p:sp>
+        <p:nvSpPr>
+          <p:cNvPr id="7" name="TextBox 6">
+            <a:extLst>
+              <a:ext uri="{FF2B5EF4-FFF2-40B4-BE49-F238E27FC236}">
+                <a16:creationId xmlns:a16="http://schemas.microsoft.com/office/drawing/2014/main" id="{155A5477-F770-451F-A7B9-33D0DC1C4357}"/>
+              </a:ext>
+            </a:extLst>
+          </p:cNvPr>
+          <p:cNvSpPr txBox="1"/>
+          <p:nvPr/>
+        </p:nvSpPr>
+        <p:spPr>
+          <a:xfrm>
+            <a:off x="8008620" y="1264920"/>
+            <a:ext cx="439544" cy="707886"/>
+          </a:xfrm>
+          <a:prstGeom prst="rect">
+            <a:avLst/>
+          </a:prstGeom>
+          <a:noFill/>
+        </p:spPr>
+        <p:txBody>
+          <a:bodyPr wrap="none" rtlCol="0">
+            <a:spAutoFit/>
+          </a:bodyPr>
+          <a:lstStyle/>
+          <a:p>
+            <a:r>
+              <a:rPr lang="en-NZ" sz="4000" b="1" dirty="0">
                 <a:solidFill>
                   <a:srgbClr val="FF0000"/>
                 </a:solidFill>
               </a:rPr>
-              <a:t>cPC</a:t>
-            </a:r>
-            <a:r>
-              <a:rPr lang="en-NZ" sz="1200" dirty="0">
+              <a:t>*</a:t>
+            </a:r>
+            <a:endParaRPr lang="en-GB" sz="4000" b="1" dirty="0">
+              <a:solidFill>
+                <a:srgbClr val="FF0000"/>
+              </a:solidFill>
+            </a:endParaRPr>
+          </a:p>
+        </p:txBody>
+      </p:sp>
+      <p:sp>
+        <p:nvSpPr>
+          <p:cNvPr id="8" name="TextBox 7">
+            <a:extLst>
+              <a:ext uri="{FF2B5EF4-FFF2-40B4-BE49-F238E27FC236}">
+                <a16:creationId xmlns:a16="http://schemas.microsoft.com/office/drawing/2014/main" id="{0B0C6169-EA49-4595-A2A8-9AB41A086630}"/>
+              </a:ext>
+            </a:extLst>
+          </p:cNvPr>
+          <p:cNvSpPr txBox="1"/>
+          <p:nvPr/>
+        </p:nvSpPr>
+        <p:spPr>
+          <a:xfrm>
+            <a:off x="9067800" y="3302805"/>
+            <a:ext cx="439544" cy="707886"/>
+          </a:xfrm>
+          <a:prstGeom prst="rect">
+            <a:avLst/>
+          </a:prstGeom>
+          <a:noFill/>
+        </p:spPr>
+        <p:txBody>
+          <a:bodyPr wrap="none" rtlCol="0">
+            <a:spAutoFit/>
+          </a:bodyPr>
+          <a:lstStyle/>
+          <a:p>
+            <a:r>
+              <a:rPr lang="en-NZ" sz="4000" b="1" dirty="0">
                 <a:solidFill>
                   <a:srgbClr val="FF0000"/>
                 </a:solidFill>
               </a:rPr>
-              <a:t> space with the median </a:t>
-            </a:r>
-            <a:r>
-              <a:rPr lang="en-NZ" sz="1200">
+              <a:t>*</a:t>
+            </a:r>
+            <a:endParaRPr lang="en-GB" sz="4000" b="1" dirty="0">
+              <a:solidFill>
+                <a:srgbClr val="FF0000"/>
+              </a:solidFill>
+            </a:endParaRPr>
+          </a:p>
+        </p:txBody>
+      </p:sp>
+      <p:sp>
+        <p:nvSpPr>
+          <p:cNvPr id="9" name="TextBox 8">
+            <a:extLst>
+              <a:ext uri="{FF2B5EF4-FFF2-40B4-BE49-F238E27FC236}">
+                <a16:creationId xmlns:a16="http://schemas.microsoft.com/office/drawing/2014/main" id="{5534C4E7-B50E-4489-8898-D83C0DA96F97}"/>
+              </a:ext>
+            </a:extLst>
+          </p:cNvPr>
+          <p:cNvSpPr txBox="1"/>
+          <p:nvPr/>
+        </p:nvSpPr>
+        <p:spPr>
+          <a:xfrm>
+            <a:off x="4094356" y="3371385"/>
+            <a:ext cx="439544" cy="707886"/>
+          </a:xfrm>
+          <a:prstGeom prst="rect">
+            <a:avLst/>
+          </a:prstGeom>
+          <a:noFill/>
+        </p:spPr>
+        <p:txBody>
+          <a:bodyPr wrap="none" rtlCol="0">
+            <a:spAutoFit/>
+          </a:bodyPr>
+          <a:lstStyle/>
+          <a:p>
+            <a:r>
+              <a:rPr lang="en-NZ" sz="4000" b="1" dirty="0">
                 <a:solidFill>
                   <a:srgbClr val="FF0000"/>
                 </a:solidFill>
               </a:rPr>
-              <a:t>(around 0), </a:t>
-            </a:r>
-            <a:r>
-              <a:rPr lang="en-NZ" sz="1200" dirty="0">
+              <a:t>*</a:t>
+            </a:r>
+            <a:endParaRPr lang="en-GB" sz="4000" b="1" dirty="0">
+              <a:solidFill>
+                <a:srgbClr val="FF0000"/>
+              </a:solidFill>
+            </a:endParaRPr>
+          </a:p>
+        </p:txBody>
+      </p:sp>
+      <p:sp>
+        <p:nvSpPr>
+          <p:cNvPr id="10" name="TextBox 9">
+            <a:extLst>
+              <a:ext uri="{FF2B5EF4-FFF2-40B4-BE49-F238E27FC236}">
+                <a16:creationId xmlns:a16="http://schemas.microsoft.com/office/drawing/2014/main" id="{0DDA503C-FD9C-496B-9188-01B1F5D36071}"/>
+              </a:ext>
+            </a:extLst>
+          </p:cNvPr>
+          <p:cNvSpPr txBox="1"/>
+          <p:nvPr/>
+        </p:nvSpPr>
+        <p:spPr>
+          <a:xfrm>
+            <a:off x="10190356" y="1264920"/>
+            <a:ext cx="439544" cy="707886"/>
+          </a:xfrm>
+          <a:prstGeom prst="rect">
+            <a:avLst/>
+          </a:prstGeom>
+          <a:noFill/>
+        </p:spPr>
+        <p:txBody>
+          <a:bodyPr wrap="none" rtlCol="0">
+            <a:spAutoFit/>
+          </a:bodyPr>
+          <a:lstStyle/>
+          <a:p>
+            <a:r>
+              <a:rPr lang="en-NZ" sz="4000" b="1" dirty="0">
                 <a:solidFill>
                   <a:srgbClr val="FF0000"/>
                 </a:solidFill>
               </a:rPr>
-              <a:t>they should be instead replaced somehow by their next closest node ….</a:t>
-            </a:r>
-            <a:endParaRPr lang="en-GB" sz="1200" dirty="0">
+              <a:t>*</a:t>
+            </a:r>
+            <a:endParaRPr lang="en-GB" sz="4000" b="1" dirty="0">
               <a:solidFill>
                 <a:srgbClr val="FF0000"/>
               </a:solidFill>
@@ -5939,116 +5971,98 @@
           </a:p>
         </p:txBody>
       </p:sp>
-      <p:cxnSp>
-        <p:nvCxnSpPr>
-          <p:cNvPr id="17" name="Connector: Elbow 16">
-            <a:extLst>
-              <a:ext uri="{FF2B5EF4-FFF2-40B4-BE49-F238E27FC236}">
-                <a16:creationId xmlns:a16="http://schemas.microsoft.com/office/drawing/2014/main" id="{2943542E-98E6-4223-8034-821A97495596}"/>
-              </a:ext>
-            </a:extLst>
-          </p:cNvPr>
-          <p:cNvCxnSpPr>
-            <a:cxnSpLocks/>
-            <a:stCxn id="12" idx="1"/>
-            <a:endCxn id="9" idx="2"/>
-          </p:cNvCxnSpPr>
+      <p:sp>
+        <p:nvSpPr>
+          <p:cNvPr id="11" name="TextBox 10">
+            <a:extLst>
+              <a:ext uri="{FF2B5EF4-FFF2-40B4-BE49-F238E27FC236}">
+                <a16:creationId xmlns:a16="http://schemas.microsoft.com/office/drawing/2014/main" id="{5CC7CFA0-EA41-46AE-9483-414E021ED28C}"/>
+              </a:ext>
+            </a:extLst>
+          </p:cNvPr>
+          <p:cNvSpPr txBox="1"/>
           <p:nvPr/>
-        </p:nvCxnSpPr>
-        <p:spPr>
-          <a:xfrm rot="10800000">
-            <a:off x="4266604" y="5535573"/>
-            <a:ext cx="424258" cy="552066"/>
-          </a:xfrm>
-          <a:prstGeom prst="bentConnector2">
-            <a:avLst/>
-          </a:prstGeom>
-          <a:ln>
-            <a:solidFill>
-              <a:srgbClr val="FF0000"/>
-            </a:solidFill>
-            <a:tailEnd type="triangle"/>
-          </a:ln>
-        </p:spPr>
-        <p:style>
-          <a:lnRef idx="1">
-            <a:schemeClr val="accent1"/>
-          </a:lnRef>
-          <a:fillRef idx="0">
-            <a:schemeClr val="accent1"/>
-          </a:fillRef>
-          <a:effectRef idx="0">
-            <a:schemeClr val="accent1"/>
-          </a:effectRef>
-          <a:fontRef idx="minor">
-            <a:schemeClr val="tx1"/>
-          </a:fontRef>
-        </p:style>
-      </p:cxnSp>
-      <p:pic>
-        <p:nvPicPr>
-          <p:cNvPr id="15" name="Picture 14">
-            <a:extLst>
-              <a:ext uri="{FF2B5EF4-FFF2-40B4-BE49-F238E27FC236}">
-                <a16:creationId xmlns:a16="http://schemas.microsoft.com/office/drawing/2014/main" id="{D8C13DE0-0AB8-4F7C-89AB-3778BEAD9361}"/>
-              </a:ext>
-            </a:extLst>
-          </p:cNvPr>
-          <p:cNvPicPr>
-            <a:picLocks noChangeAspect="1"/>
-          </p:cNvPicPr>
-          <p:nvPr/>
-        </p:nvPicPr>
-        <p:blipFill>
-          <a:blip r:embed="rId4"/>
-          <a:stretch>
-            <a:fillRect/>
-          </a:stretch>
-        </p:blipFill>
-        <p:spPr>
-          <a:xfrm>
-            <a:off x="3058883" y="1140496"/>
-            <a:ext cx="2873800" cy="3841079"/>
+        </p:nvSpPr>
+        <p:spPr>
+          <a:xfrm>
+            <a:off x="5436684" y="3371385"/>
+            <a:ext cx="439544" cy="707886"/>
           </a:xfrm>
           <a:prstGeom prst="rect">
             <a:avLst/>
           </a:prstGeom>
-        </p:spPr>
-      </p:pic>
-      <p:pic>
-        <p:nvPicPr>
-          <p:cNvPr id="19" name="Picture 18">
-            <a:extLst>
-              <a:ext uri="{FF2B5EF4-FFF2-40B4-BE49-F238E27FC236}">
-                <a16:creationId xmlns:a16="http://schemas.microsoft.com/office/drawing/2014/main" id="{F6139D21-7BD8-451D-8A9D-88C6155831EF}"/>
-              </a:ext>
-            </a:extLst>
-          </p:cNvPr>
-          <p:cNvPicPr>
-            <a:picLocks noChangeAspect="1"/>
-          </p:cNvPicPr>
+          <a:noFill/>
+        </p:spPr>
+        <p:txBody>
+          <a:bodyPr wrap="none" rtlCol="0">
+            <a:spAutoFit/>
+          </a:bodyPr>
+          <a:lstStyle/>
+          <a:p>
+            <a:r>
+              <a:rPr lang="en-NZ" sz="4000" b="1" dirty="0">
+                <a:solidFill>
+                  <a:srgbClr val="FF0000"/>
+                </a:solidFill>
+              </a:rPr>
+              <a:t>*</a:t>
+            </a:r>
+            <a:endParaRPr lang="en-GB" sz="4000" b="1" dirty="0">
+              <a:solidFill>
+                <a:srgbClr val="FF0000"/>
+              </a:solidFill>
+            </a:endParaRPr>
+          </a:p>
+        </p:txBody>
+      </p:sp>
+      <p:sp>
+        <p:nvSpPr>
+          <p:cNvPr id="12" name="TextBox 11">
+            <a:extLst>
+              <a:ext uri="{FF2B5EF4-FFF2-40B4-BE49-F238E27FC236}">
+                <a16:creationId xmlns:a16="http://schemas.microsoft.com/office/drawing/2014/main" id="{8E3EF513-AD3B-4458-99AE-5488173F9B26}"/>
+              </a:ext>
+            </a:extLst>
+          </p:cNvPr>
+          <p:cNvSpPr txBox="1"/>
           <p:nvPr/>
-        </p:nvPicPr>
-        <p:blipFill>
-          <a:blip r:embed="rId5"/>
-          <a:stretch>
-            <a:fillRect/>
-          </a:stretch>
-        </p:blipFill>
-        <p:spPr>
-          <a:xfrm>
-            <a:off x="9009422" y="1144938"/>
-            <a:ext cx="2873800" cy="3836637"/>
+        </p:nvSpPr>
+        <p:spPr>
+          <a:xfrm>
+            <a:off x="1752600" y="1264920"/>
+            <a:ext cx="439544" cy="707886"/>
           </a:xfrm>
           <a:prstGeom prst="rect">
             <a:avLst/>
           </a:prstGeom>
-        </p:spPr>
-      </p:pic>
+          <a:noFill/>
+        </p:spPr>
+        <p:txBody>
+          <a:bodyPr wrap="none" rtlCol="0">
+            <a:spAutoFit/>
+          </a:bodyPr>
+          <a:lstStyle/>
+          <a:p>
+            <a:r>
+              <a:rPr lang="en-NZ" sz="4000" b="1" dirty="0">
+                <a:solidFill>
+                  <a:srgbClr val="FF0000"/>
+                </a:solidFill>
+              </a:rPr>
+              <a:t>*</a:t>
+            </a:r>
+            <a:endParaRPr lang="en-GB" sz="4000" b="1" dirty="0">
+              <a:solidFill>
+                <a:srgbClr val="FF0000"/>
+              </a:solidFill>
+            </a:endParaRPr>
+          </a:p>
+        </p:txBody>
+      </p:sp>
     </p:spTree>
     <p:extLst>
       <p:ext uri="{BB962C8B-B14F-4D97-AF65-F5344CB8AC3E}">
-        <p14:creationId xmlns:p14="http://schemas.microsoft.com/office/powerpoint/2010/main" val="3573502216"/>
+        <p14:creationId xmlns:p14="http://schemas.microsoft.com/office/powerpoint/2010/main" val="3970877698"/>
       </p:ext>
     </p:extLst>
   </p:cSld>
@@ -6080,7 +6094,78 @@
           <p:cNvPr id="5" name="Picture 4">
             <a:extLst>
               <a:ext uri="{FF2B5EF4-FFF2-40B4-BE49-F238E27FC236}">
-                <a16:creationId xmlns:a16="http://schemas.microsoft.com/office/drawing/2014/main" id="{57F5CD76-A121-47E7-8D5C-78EB781D67BC}"/>
+                <a16:creationId xmlns:a16="http://schemas.microsoft.com/office/drawing/2014/main" id="{2BAC2202-805B-4DC3-A3C7-C9CC97599E10}"/>
+              </a:ext>
+            </a:extLst>
+          </p:cNvPr>
+          <p:cNvPicPr>
+            <a:picLocks noChangeAspect="1"/>
+          </p:cNvPicPr>
+          <p:nvPr/>
+        </p:nvPicPr>
+        <p:blipFill rotWithShape="1">
+          <a:blip r:embed="rId2">
+            <a:extLst>
+              <a:ext uri="{28A0092B-C50C-407E-A947-70E740481C1C}">
+                <a14:useLocalDpi xmlns:a14="http://schemas.microsoft.com/office/drawing/2010/main" val="0"/>
+              </a:ext>
+            </a:extLst>
+          </a:blip>
+          <a:srcRect r="54446"/>
+          <a:stretch/>
+        </p:blipFill>
+        <p:spPr>
+          <a:xfrm>
+            <a:off x="76201" y="1140496"/>
+            <a:ext cx="2982682" cy="3890687"/>
+          </a:xfrm>
+          <a:prstGeom prst="rect">
+            <a:avLst/>
+          </a:prstGeom>
+        </p:spPr>
+      </p:pic>
+      <p:sp>
+        <p:nvSpPr>
+          <p:cNvPr id="6" name="TextBox 5">
+            <a:extLst>
+              <a:ext uri="{FF2B5EF4-FFF2-40B4-BE49-F238E27FC236}">
+                <a16:creationId xmlns:a16="http://schemas.microsoft.com/office/drawing/2014/main" id="{108BEBBF-0CC4-49CA-B7B2-9D4B22059FB3}"/>
+              </a:ext>
+            </a:extLst>
+          </p:cNvPr>
+          <p:cNvSpPr txBox="1"/>
+          <p:nvPr/>
+        </p:nvSpPr>
+        <p:spPr>
+          <a:xfrm>
+            <a:off x="213989" y="493362"/>
+            <a:ext cx="10571201" cy="369332"/>
+          </a:xfrm>
+          <a:prstGeom prst="rect">
+            <a:avLst/>
+          </a:prstGeom>
+          <a:noFill/>
+        </p:spPr>
+        <p:txBody>
+          <a:bodyPr wrap="square" rtlCol="0">
+            <a:spAutoFit/>
+          </a:bodyPr>
+          <a:lstStyle/>
+          <a:p>
+            <a:r>
+              <a:rPr lang="en-NZ" b="1" dirty="0"/>
+              <a:t>Handling abnormally high distance values in distance matrix (test on 20% subset ~5600 rows)</a:t>
+            </a:r>
+            <a:endParaRPr lang="en-GB" b="1" dirty="0"/>
+          </a:p>
+        </p:txBody>
+      </p:sp>
+      <p:pic>
+        <p:nvPicPr>
+          <p:cNvPr id="2" name="Picture 1">
+            <a:extLst>
+              <a:ext uri="{FF2B5EF4-FFF2-40B4-BE49-F238E27FC236}">
+                <a16:creationId xmlns:a16="http://schemas.microsoft.com/office/drawing/2014/main" id="{0FA7BFA3-93B6-4DD8-BF5C-5441A83F4695}"/>
               </a:ext>
             </a:extLst>
           </p:cNvPr>
@@ -6090,21 +6175,15 @@
           <p:nvPr/>
         </p:nvPicPr>
         <p:blipFill>
-          <a:blip r:embed="rId2">
-            <a:extLst>
-              <a:ext uri="{28A0092B-C50C-407E-A947-70E740481C1C}">
-                <a14:useLocalDpi xmlns:a14="http://schemas.microsoft.com/office/drawing/2010/main" val="0"/>
-              </a:ext>
-            </a:extLst>
-          </a:blip>
+          <a:blip r:embed="rId3"/>
           <a:stretch>
             <a:fillRect/>
           </a:stretch>
         </p:blipFill>
         <p:spPr>
           <a:xfrm>
-            <a:off x="0" y="369332"/>
-            <a:ext cx="12192000" cy="6510995"/>
+            <a:off x="6041565" y="1140496"/>
+            <a:ext cx="2873800" cy="3841079"/>
           </a:xfrm>
           <a:prstGeom prst="rect">
             <a:avLst/>
@@ -6113,10 +6192,10 @@
       </p:pic>
       <p:sp>
         <p:nvSpPr>
-          <p:cNvPr id="6" name="TextBox 5">
-            <a:extLst>
-              <a:ext uri="{FF2B5EF4-FFF2-40B4-BE49-F238E27FC236}">
-                <a16:creationId xmlns:a16="http://schemas.microsoft.com/office/drawing/2014/main" id="{979AE2EC-4AA9-4D1C-9817-4D0290540D4D}"/>
+          <p:cNvPr id="8" name="TextBox 7">
+            <a:extLst>
+              <a:ext uri="{FF2B5EF4-FFF2-40B4-BE49-F238E27FC236}">
+                <a16:creationId xmlns:a16="http://schemas.microsoft.com/office/drawing/2014/main" id="{846D2B52-EEE0-4075-A79B-6528659C5996}"/>
               </a:ext>
             </a:extLst>
           </p:cNvPr>
@@ -6125,32 +6204,351 @@
         </p:nvSpPr>
         <p:spPr>
           <a:xfrm>
-            <a:off x="0" y="-9525"/>
-            <a:ext cx="7275589" cy="369332"/>
+            <a:off x="234218" y="4981575"/>
+            <a:ext cx="2099408" cy="369332"/>
           </a:xfrm>
           <a:prstGeom prst="rect">
             <a:avLst/>
           </a:prstGeom>
-          <a:noFill/>
-        </p:spPr>
-        <p:txBody>
-          <a:bodyPr wrap="square" rtlCol="0">
+          <a:solidFill>
+            <a:schemeClr val="bg1"/>
+          </a:solidFill>
+        </p:spPr>
+        <p:txBody>
+          <a:bodyPr wrap="square" lIns="0" tIns="0" rIns="0" bIns="0" rtlCol="0">
             <a:spAutoFit/>
           </a:bodyPr>
           <a:lstStyle/>
           <a:p>
-            <a:r>
-              <a:rPr lang="en-NZ" b="1" dirty="0"/>
-              <a:t>All 10 combination of 10% subset runs</a:t>
-            </a:r>
-            <a:endParaRPr lang="en-GB" b="1" dirty="0"/>
-          </a:p>
-        </p:txBody>
-      </p:sp>
+            <a:pPr algn="ctr"/>
+            <a:r>
+              <a:rPr lang="en-NZ" sz="1200" b="1" dirty="0"/>
+              <a:t>1) Original </a:t>
+            </a:r>
+          </a:p>
+          <a:p>
+            <a:pPr algn="ctr"/>
+            <a:r>
+              <a:rPr lang="en-NZ" sz="1200" b="1" dirty="0"/>
+              <a:t>(Minimum Spanning Tree)</a:t>
+            </a:r>
+            <a:endParaRPr lang="en-GB" sz="1200" b="1" dirty="0"/>
+          </a:p>
+        </p:txBody>
+      </p:sp>
+      <p:sp>
+        <p:nvSpPr>
+          <p:cNvPr id="9" name="TextBox 8">
+            <a:extLst>
+              <a:ext uri="{FF2B5EF4-FFF2-40B4-BE49-F238E27FC236}">
+                <a16:creationId xmlns:a16="http://schemas.microsoft.com/office/drawing/2014/main" id="{159ECB6D-8197-42C9-9B08-115C0CB6E983}"/>
+              </a:ext>
+            </a:extLst>
+          </p:cNvPr>
+          <p:cNvSpPr txBox="1"/>
+          <p:nvPr/>
+        </p:nvSpPr>
+        <p:spPr>
+          <a:xfrm>
+            <a:off x="3275407" y="4981575"/>
+            <a:ext cx="1982394" cy="553998"/>
+          </a:xfrm>
+          <a:prstGeom prst="rect">
+            <a:avLst/>
+          </a:prstGeom>
+          <a:solidFill>
+            <a:schemeClr val="bg1"/>
+          </a:solidFill>
+        </p:spPr>
+        <p:txBody>
+          <a:bodyPr wrap="square" lIns="0" tIns="0" rIns="0" bIns="0" rtlCol="0">
+            <a:spAutoFit/>
+          </a:bodyPr>
+          <a:lstStyle/>
+          <a:p>
+            <a:pPr algn="ctr"/>
+            <a:r>
+              <a:rPr lang="en-NZ" sz="1200" b="1" dirty="0"/>
+              <a:t>2) Filter out large values in </a:t>
+            </a:r>
+            <a:r>
+              <a:rPr lang="en-NZ" sz="1200" b="1" dirty="0" err="1"/>
+              <a:t>cPC</a:t>
+            </a:r>
+            <a:r>
+              <a:rPr lang="en-NZ" sz="1200" b="1" dirty="0"/>
+              <a:t> space (set values above 3sd as the median)</a:t>
+            </a:r>
+            <a:endParaRPr lang="en-GB" sz="1200" b="1" dirty="0"/>
+          </a:p>
+        </p:txBody>
+      </p:sp>
+      <p:sp>
+        <p:nvSpPr>
+          <p:cNvPr id="10" name="TextBox 9">
+            <a:extLst>
+              <a:ext uri="{FF2B5EF4-FFF2-40B4-BE49-F238E27FC236}">
+                <a16:creationId xmlns:a16="http://schemas.microsoft.com/office/drawing/2014/main" id="{D67F0F88-F469-4158-8F13-A89F610E665A}"/>
+              </a:ext>
+            </a:extLst>
+          </p:cNvPr>
+          <p:cNvSpPr txBox="1"/>
+          <p:nvPr/>
+        </p:nvSpPr>
+        <p:spPr>
+          <a:xfrm>
+            <a:off x="6135621" y="4981575"/>
+            <a:ext cx="2227330" cy="369332"/>
+          </a:xfrm>
+          <a:prstGeom prst="rect">
+            <a:avLst/>
+          </a:prstGeom>
+          <a:solidFill>
+            <a:schemeClr val="bg1"/>
+          </a:solidFill>
+        </p:spPr>
+        <p:txBody>
+          <a:bodyPr wrap="square" lIns="0" tIns="0" rIns="0" bIns="0" rtlCol="0">
+            <a:spAutoFit/>
+          </a:bodyPr>
+          <a:lstStyle/>
+          <a:p>
+            <a:pPr algn="ctr"/>
+            <a:r>
+              <a:rPr lang="en-NZ" sz="1200" b="1" dirty="0"/>
+              <a:t>3) Shortest Path Tree Instead of Minimum Spanning Tree</a:t>
+            </a:r>
+            <a:endParaRPr lang="en-GB" sz="1200" b="1" dirty="0"/>
+          </a:p>
+        </p:txBody>
+      </p:sp>
+      <p:sp>
+        <p:nvSpPr>
+          <p:cNvPr id="11" name="TextBox 10">
+            <a:extLst>
+              <a:ext uri="{FF2B5EF4-FFF2-40B4-BE49-F238E27FC236}">
+                <a16:creationId xmlns:a16="http://schemas.microsoft.com/office/drawing/2014/main" id="{8DF388B5-B151-430B-A09E-940AEAB6AF19}"/>
+              </a:ext>
+            </a:extLst>
+          </p:cNvPr>
+          <p:cNvSpPr txBox="1"/>
+          <p:nvPr/>
+        </p:nvSpPr>
+        <p:spPr>
+          <a:xfrm>
+            <a:off x="9540280" y="4981575"/>
+            <a:ext cx="1356320" cy="369332"/>
+          </a:xfrm>
+          <a:prstGeom prst="rect">
+            <a:avLst/>
+          </a:prstGeom>
+          <a:solidFill>
+            <a:schemeClr val="bg1"/>
+          </a:solidFill>
+        </p:spPr>
+        <p:txBody>
+          <a:bodyPr wrap="square" lIns="0" tIns="0" rIns="0" bIns="0" rtlCol="0">
+            <a:spAutoFit/>
+          </a:bodyPr>
+          <a:lstStyle/>
+          <a:p>
+            <a:pPr algn="ctr"/>
+            <a:r>
+              <a:rPr lang="en-NZ" sz="1200" b="1" dirty="0"/>
+              <a:t>4) #2 (filter) + #3 (use shortest path tree)</a:t>
+            </a:r>
+            <a:endParaRPr lang="en-GB" sz="1200" b="1" dirty="0"/>
+          </a:p>
+        </p:txBody>
+      </p:sp>
+      <p:sp>
+        <p:nvSpPr>
+          <p:cNvPr id="12" name="TextBox 11">
+            <a:extLst>
+              <a:ext uri="{FF2B5EF4-FFF2-40B4-BE49-F238E27FC236}">
+                <a16:creationId xmlns:a16="http://schemas.microsoft.com/office/drawing/2014/main" id="{E23BCCE6-D4B3-49A4-8702-D3E432463990}"/>
+              </a:ext>
+            </a:extLst>
+          </p:cNvPr>
+          <p:cNvSpPr txBox="1"/>
+          <p:nvPr/>
+        </p:nvSpPr>
+        <p:spPr>
+          <a:xfrm>
+            <a:off x="4690862" y="5810640"/>
+            <a:ext cx="4849418" cy="553998"/>
+          </a:xfrm>
+          <a:prstGeom prst="rect">
+            <a:avLst/>
+          </a:prstGeom>
+          <a:solidFill>
+            <a:schemeClr val="bg1"/>
+          </a:solidFill>
+        </p:spPr>
+        <p:txBody>
+          <a:bodyPr wrap="square" lIns="0" tIns="0" rIns="0" bIns="0" rtlCol="0">
+            <a:spAutoFit/>
+          </a:bodyPr>
+          <a:lstStyle/>
+          <a:p>
+            <a:r>
+              <a:rPr lang="en-NZ" sz="1200" dirty="0">
+                <a:solidFill>
+                  <a:srgbClr val="FF0000"/>
+                </a:solidFill>
+              </a:rPr>
+              <a:t>Note that #2 is currently flawed as we cannot just reassign these abnormally large values in </a:t>
+            </a:r>
+            <a:r>
+              <a:rPr lang="en-NZ" sz="1200" dirty="0" err="1">
+                <a:solidFill>
+                  <a:srgbClr val="FF0000"/>
+                </a:solidFill>
+              </a:rPr>
+              <a:t>cPC</a:t>
+            </a:r>
+            <a:r>
+              <a:rPr lang="en-NZ" sz="1200" dirty="0">
+                <a:solidFill>
+                  <a:srgbClr val="FF0000"/>
+                </a:solidFill>
+              </a:rPr>
+              <a:t> space with the median </a:t>
+            </a:r>
+            <a:r>
+              <a:rPr lang="en-NZ" sz="1200">
+                <a:solidFill>
+                  <a:srgbClr val="FF0000"/>
+                </a:solidFill>
+              </a:rPr>
+              <a:t>(around 0), </a:t>
+            </a:r>
+            <a:r>
+              <a:rPr lang="en-NZ" sz="1200" dirty="0">
+                <a:solidFill>
+                  <a:srgbClr val="FF0000"/>
+                </a:solidFill>
+              </a:rPr>
+              <a:t>they should be instead replaced somehow by their next closest node ….</a:t>
+            </a:r>
+            <a:endParaRPr lang="en-GB" sz="1200" dirty="0">
+              <a:solidFill>
+                <a:srgbClr val="FF0000"/>
+              </a:solidFill>
+            </a:endParaRPr>
+          </a:p>
+        </p:txBody>
+      </p:sp>
+      <p:cxnSp>
+        <p:nvCxnSpPr>
+          <p:cNvPr id="17" name="Connector: Elbow 16">
+            <a:extLst>
+              <a:ext uri="{FF2B5EF4-FFF2-40B4-BE49-F238E27FC236}">
+                <a16:creationId xmlns:a16="http://schemas.microsoft.com/office/drawing/2014/main" id="{2943542E-98E6-4223-8034-821A97495596}"/>
+              </a:ext>
+            </a:extLst>
+          </p:cNvPr>
+          <p:cNvCxnSpPr>
+            <a:cxnSpLocks/>
+            <a:stCxn id="12" idx="1"/>
+            <a:endCxn id="9" idx="2"/>
+          </p:cNvCxnSpPr>
+          <p:nvPr/>
+        </p:nvCxnSpPr>
+        <p:spPr>
+          <a:xfrm rot="10800000">
+            <a:off x="4266604" y="5535573"/>
+            <a:ext cx="424258" cy="552066"/>
+          </a:xfrm>
+          <a:prstGeom prst="bentConnector2">
+            <a:avLst/>
+          </a:prstGeom>
+          <a:ln>
+            <a:solidFill>
+              <a:srgbClr val="FF0000"/>
+            </a:solidFill>
+            <a:tailEnd type="triangle"/>
+          </a:ln>
+        </p:spPr>
+        <p:style>
+          <a:lnRef idx="1">
+            <a:schemeClr val="accent1"/>
+          </a:lnRef>
+          <a:fillRef idx="0">
+            <a:schemeClr val="accent1"/>
+          </a:fillRef>
+          <a:effectRef idx="0">
+            <a:schemeClr val="accent1"/>
+          </a:effectRef>
+          <a:fontRef idx="minor">
+            <a:schemeClr val="tx1"/>
+          </a:fontRef>
+        </p:style>
+      </p:cxnSp>
+      <p:pic>
+        <p:nvPicPr>
+          <p:cNvPr id="15" name="Picture 14">
+            <a:extLst>
+              <a:ext uri="{FF2B5EF4-FFF2-40B4-BE49-F238E27FC236}">
+                <a16:creationId xmlns:a16="http://schemas.microsoft.com/office/drawing/2014/main" id="{D8C13DE0-0AB8-4F7C-89AB-3778BEAD9361}"/>
+              </a:ext>
+            </a:extLst>
+          </p:cNvPr>
+          <p:cNvPicPr>
+            <a:picLocks noChangeAspect="1"/>
+          </p:cNvPicPr>
+          <p:nvPr/>
+        </p:nvPicPr>
+        <p:blipFill>
+          <a:blip r:embed="rId4"/>
+          <a:stretch>
+            <a:fillRect/>
+          </a:stretch>
+        </p:blipFill>
+        <p:spPr>
+          <a:xfrm>
+            <a:off x="3058883" y="1140496"/>
+            <a:ext cx="2873800" cy="3841079"/>
+          </a:xfrm>
+          <a:prstGeom prst="rect">
+            <a:avLst/>
+          </a:prstGeom>
+        </p:spPr>
+      </p:pic>
+      <p:pic>
+        <p:nvPicPr>
+          <p:cNvPr id="19" name="Picture 18">
+            <a:extLst>
+              <a:ext uri="{FF2B5EF4-FFF2-40B4-BE49-F238E27FC236}">
+                <a16:creationId xmlns:a16="http://schemas.microsoft.com/office/drawing/2014/main" id="{F6139D21-7BD8-451D-8A9D-88C6155831EF}"/>
+              </a:ext>
+            </a:extLst>
+          </p:cNvPr>
+          <p:cNvPicPr>
+            <a:picLocks noChangeAspect="1"/>
+          </p:cNvPicPr>
+          <p:nvPr/>
+        </p:nvPicPr>
+        <p:blipFill>
+          <a:blip r:embed="rId5"/>
+          <a:stretch>
+            <a:fillRect/>
+          </a:stretch>
+        </p:blipFill>
+        <p:spPr>
+          <a:xfrm>
+            <a:off x="9009422" y="1144938"/>
+            <a:ext cx="2873800" cy="3836637"/>
+          </a:xfrm>
+          <a:prstGeom prst="rect">
+            <a:avLst/>
+          </a:prstGeom>
+        </p:spPr>
+      </p:pic>
     </p:spTree>
     <p:extLst>
       <p:ext uri="{BB962C8B-B14F-4D97-AF65-F5344CB8AC3E}">
-        <p14:creationId xmlns:p14="http://schemas.microsoft.com/office/powerpoint/2010/main" val="4028263462"/>
+        <p14:creationId xmlns:p14="http://schemas.microsoft.com/office/powerpoint/2010/main" val="3573502216"/>
       </p:ext>
     </p:extLst>
   </p:cSld>
@@ -6179,6 +6577,108 @@
       </p:grpSpPr>
       <p:pic>
         <p:nvPicPr>
+          <p:cNvPr id="5" name="Picture 4">
+            <a:extLst>
+              <a:ext uri="{FF2B5EF4-FFF2-40B4-BE49-F238E27FC236}">
+                <a16:creationId xmlns:a16="http://schemas.microsoft.com/office/drawing/2014/main" id="{57F5CD76-A121-47E7-8D5C-78EB781D67BC}"/>
+              </a:ext>
+            </a:extLst>
+          </p:cNvPr>
+          <p:cNvPicPr>
+            <a:picLocks noChangeAspect="1"/>
+          </p:cNvPicPr>
+          <p:nvPr/>
+        </p:nvPicPr>
+        <p:blipFill>
+          <a:blip r:embed="rId2">
+            <a:extLst>
+              <a:ext uri="{28A0092B-C50C-407E-A947-70E740481C1C}">
+                <a14:useLocalDpi xmlns:a14="http://schemas.microsoft.com/office/drawing/2010/main" val="0"/>
+              </a:ext>
+            </a:extLst>
+          </a:blip>
+          <a:stretch>
+            <a:fillRect/>
+          </a:stretch>
+        </p:blipFill>
+        <p:spPr>
+          <a:xfrm>
+            <a:off x="0" y="369332"/>
+            <a:ext cx="12192000" cy="6510995"/>
+          </a:xfrm>
+          <a:prstGeom prst="rect">
+            <a:avLst/>
+          </a:prstGeom>
+        </p:spPr>
+      </p:pic>
+      <p:sp>
+        <p:nvSpPr>
+          <p:cNvPr id="6" name="TextBox 5">
+            <a:extLst>
+              <a:ext uri="{FF2B5EF4-FFF2-40B4-BE49-F238E27FC236}">
+                <a16:creationId xmlns:a16="http://schemas.microsoft.com/office/drawing/2014/main" id="{979AE2EC-4AA9-4D1C-9817-4D0290540D4D}"/>
+              </a:ext>
+            </a:extLst>
+          </p:cNvPr>
+          <p:cNvSpPr txBox="1"/>
+          <p:nvPr/>
+        </p:nvSpPr>
+        <p:spPr>
+          <a:xfrm>
+            <a:off x="0" y="-9525"/>
+            <a:ext cx="7275589" cy="369332"/>
+          </a:xfrm>
+          <a:prstGeom prst="rect">
+            <a:avLst/>
+          </a:prstGeom>
+          <a:noFill/>
+        </p:spPr>
+        <p:txBody>
+          <a:bodyPr wrap="square" rtlCol="0">
+            <a:spAutoFit/>
+          </a:bodyPr>
+          <a:lstStyle/>
+          <a:p>
+            <a:r>
+              <a:rPr lang="en-NZ" b="1" dirty="0"/>
+              <a:t>All 10 combination of 10% subset runs</a:t>
+            </a:r>
+            <a:endParaRPr lang="en-GB" b="1" dirty="0"/>
+          </a:p>
+        </p:txBody>
+      </p:sp>
+    </p:spTree>
+    <p:extLst>
+      <p:ext uri="{BB962C8B-B14F-4D97-AF65-F5344CB8AC3E}">
+        <p14:creationId xmlns:p14="http://schemas.microsoft.com/office/powerpoint/2010/main" val="4028263462"/>
+      </p:ext>
+    </p:extLst>
+  </p:cSld>
+  <p:clrMapOvr>
+    <a:masterClrMapping/>
+  </p:clrMapOvr>
+</p:sld>
+</file>
+
+<file path=ppt/slides/slide8.xml><?xml version="1.0" encoding="utf-8"?>
+<p:sld xmlns:a="http://schemas.openxmlformats.org/drawingml/2006/main" xmlns:r="http://schemas.openxmlformats.org/officeDocument/2006/relationships" xmlns:p="http://schemas.openxmlformats.org/presentationml/2006/main">
+  <p:cSld>
+    <p:spTree>
+      <p:nvGrpSpPr>
+        <p:cNvPr id="1" name=""/>
+        <p:cNvGrpSpPr/>
+        <p:nvPr/>
+      </p:nvGrpSpPr>
+      <p:grpSpPr>
+        <a:xfrm>
+          <a:off x="0" y="0"/>
+          <a:ext cx="0" cy="0"/>
+          <a:chOff x="0" y="0"/>
+          <a:chExt cx="0" cy="0"/>
+        </a:xfrm>
+      </p:grpSpPr>
+      <p:pic>
+        <p:nvPicPr>
           <p:cNvPr id="7" name="Picture 6">
             <a:extLst>
               <a:ext uri="{FF2B5EF4-FFF2-40B4-BE49-F238E27FC236}">
@@ -6262,7 +6762,7 @@
 </p:sld>
 </file>
 
-<file path=ppt/slides/slide8.xml><?xml version="1.0" encoding="utf-8"?>
+<file path=ppt/slides/slide9.xml><?xml version="1.0" encoding="utf-8"?>
 <p:sld xmlns:a="http://schemas.openxmlformats.org/drawingml/2006/main" xmlns:r="http://schemas.openxmlformats.org/officeDocument/2006/relationships" xmlns:p="http://schemas.openxmlformats.org/presentationml/2006/main">
   <p:cSld>
     <p:spTree>

</xml_diff>

<commit_message>
tried another way of filtering cPCs
</commit_message>
<xml_diff>
--- a/job_results.pptx
+++ b/job_results.pptx
@@ -5,18 +5,19 @@
     <p:sldMasterId id="2147483648" r:id="rId1"/>
   </p:sldMasterIdLst>
   <p:notesMasterIdLst>
-    <p:notesMasterId r:id="rId11"/>
+    <p:notesMasterId r:id="rId12"/>
   </p:notesMasterIdLst>
   <p:sldIdLst>
     <p:sldId id="256" r:id="rId2"/>
     <p:sldId id="264" r:id="rId3"/>
     <p:sldId id="261" r:id="rId4"/>
-    <p:sldId id="262" r:id="rId5"/>
-    <p:sldId id="267" r:id="rId6"/>
-    <p:sldId id="266" r:id="rId7"/>
-    <p:sldId id="258" r:id="rId8"/>
-    <p:sldId id="259" r:id="rId9"/>
-    <p:sldId id="263" r:id="rId10"/>
+    <p:sldId id="268" r:id="rId5"/>
+    <p:sldId id="262" r:id="rId6"/>
+    <p:sldId id="267" r:id="rId7"/>
+    <p:sldId id="266" r:id="rId8"/>
+    <p:sldId id="258" r:id="rId9"/>
+    <p:sldId id="259" r:id="rId10"/>
+    <p:sldId id="263" r:id="rId11"/>
   </p:sldIdLst>
   <p:sldSz cx="12192000" cy="6858000"/>
   <p:notesSz cx="6858000" cy="9144000"/>
@@ -128,7 +129,7 @@
   <pc:docChgLst>
     <pc:chgData name="Zhao Xiong" userId="5eba49e5-2895-4cd9-83e8-b3064fe76704" providerId="ADAL" clId="{B606E7B2-EFF5-418A-8639-9F7537C4DA50}"/>
     <pc:docChg chg="undo custSel addSld delSld modSld sldOrd">
-      <pc:chgData name="Zhao Xiong" userId="5eba49e5-2895-4cd9-83e8-b3064fe76704" providerId="ADAL" clId="{B606E7B2-EFF5-418A-8639-9F7537C4DA50}" dt="2022-05-14T13:33:11.349" v="2286" actId="1076"/>
+      <pc:chgData name="Zhao Xiong" userId="5eba49e5-2895-4cd9-83e8-b3064fe76704" providerId="ADAL" clId="{B606E7B2-EFF5-418A-8639-9F7537C4DA50}" dt="2022-05-15T15:20:27.411" v="2732" actId="1076"/>
       <pc:docMkLst>
         <pc:docMk/>
       </pc:docMkLst>
@@ -305,7 +306,7 @@
         </pc:picChg>
       </pc:sldChg>
       <pc:sldChg chg="addSp delSp modSp">
-        <pc:chgData name="Zhao Xiong" userId="5eba49e5-2895-4cd9-83e8-b3064fe76704" providerId="ADAL" clId="{B606E7B2-EFF5-418A-8639-9F7537C4DA50}" dt="2022-05-14T12:52:27.926" v="2135" actId="1076"/>
+        <pc:chgData name="Zhao Xiong" userId="5eba49e5-2895-4cd9-83e8-b3064fe76704" providerId="ADAL" clId="{B606E7B2-EFF5-418A-8639-9F7537C4DA50}" dt="2022-05-15T14:49:45.204" v="2295"/>
         <pc:sldMkLst>
           <pc:docMk/>
           <pc:sldMk cId="1920508232" sldId="262"/>
@@ -380,6 +381,14 @@
             <pc:docMk/>
             <pc:sldMk cId="1920508232" sldId="262"/>
             <ac:picMk id="6" creationId="{537EC218-CBE3-4119-BF6B-54BB7C56C594}"/>
+          </ac:picMkLst>
+        </pc:picChg>
+        <pc:picChg chg="add del mod">
+          <ac:chgData name="Zhao Xiong" userId="5eba49e5-2895-4cd9-83e8-b3064fe76704" providerId="ADAL" clId="{B606E7B2-EFF5-418A-8639-9F7537C4DA50}" dt="2022-05-15T14:49:45.204" v="2295"/>
+          <ac:picMkLst>
+            <pc:docMk/>
+            <pc:sldMk cId="1920508232" sldId="262"/>
+            <ac:picMk id="6" creationId="{86B93A38-7E8D-43AC-A5EF-F6E0EB938AA3}"/>
           </ac:picMkLst>
         </pc:picChg>
         <pc:picChg chg="add mod">
@@ -796,7 +805,7 @@
         </pc:cxnChg>
       </pc:sldChg>
       <pc:sldChg chg="addSp delSp modSp add">
-        <pc:chgData name="Zhao Xiong" userId="5eba49e5-2895-4cd9-83e8-b3064fe76704" providerId="ADAL" clId="{B606E7B2-EFF5-418A-8639-9F7537C4DA50}" dt="2022-05-14T13:33:11.349" v="2286" actId="1076"/>
+        <pc:chgData name="Zhao Xiong" userId="5eba49e5-2895-4cd9-83e8-b3064fe76704" providerId="ADAL" clId="{B606E7B2-EFF5-418A-8639-9F7537C4DA50}" dt="2022-05-15T14:50:01.158" v="2297" actId="478"/>
         <pc:sldMkLst>
           <pc:docMk/>
           <pc:sldMk cId="3970877698" sldId="267"/>
@@ -825,56 +834,56 @@
             <ac:spMk id="5" creationId="{C0EDD6DF-DB99-4EE6-A5BF-CE0D62FBE84E}"/>
           </ac:spMkLst>
         </pc:spChg>
-        <pc:spChg chg="add mod">
-          <ac:chgData name="Zhao Xiong" userId="5eba49e5-2895-4cd9-83e8-b3064fe76704" providerId="ADAL" clId="{B606E7B2-EFF5-418A-8639-9F7537C4DA50}" dt="2022-05-14T13:32:13.341" v="2274" actId="1076"/>
+        <pc:spChg chg="add del mod">
+          <ac:chgData name="Zhao Xiong" userId="5eba49e5-2895-4cd9-83e8-b3064fe76704" providerId="ADAL" clId="{B606E7B2-EFF5-418A-8639-9F7537C4DA50}" dt="2022-05-15T14:49:59.592" v="2296" actId="478"/>
           <ac:spMkLst>
             <pc:docMk/>
             <pc:sldMk cId="3970877698" sldId="267"/>
             <ac:spMk id="6" creationId="{8ED56D22-F48A-4D08-AFF1-AE04223BE525}"/>
           </ac:spMkLst>
         </pc:spChg>
-        <pc:spChg chg="add mod">
-          <ac:chgData name="Zhao Xiong" userId="5eba49e5-2895-4cd9-83e8-b3064fe76704" providerId="ADAL" clId="{B606E7B2-EFF5-418A-8639-9F7537C4DA50}" dt="2022-05-14T13:32:15.573" v="2276" actId="1076"/>
+        <pc:spChg chg="add del mod">
+          <ac:chgData name="Zhao Xiong" userId="5eba49e5-2895-4cd9-83e8-b3064fe76704" providerId="ADAL" clId="{B606E7B2-EFF5-418A-8639-9F7537C4DA50}" dt="2022-05-15T14:49:59.592" v="2296" actId="478"/>
           <ac:spMkLst>
             <pc:docMk/>
             <pc:sldMk cId="3970877698" sldId="267"/>
             <ac:spMk id="7" creationId="{155A5477-F770-451F-A7B9-33D0DC1C4357}"/>
           </ac:spMkLst>
         </pc:spChg>
-        <pc:spChg chg="add mod">
-          <ac:chgData name="Zhao Xiong" userId="5eba49e5-2895-4cd9-83e8-b3064fe76704" providerId="ADAL" clId="{B606E7B2-EFF5-418A-8639-9F7537C4DA50}" dt="2022-05-14T13:32:19.254" v="2278" actId="1076"/>
+        <pc:spChg chg="add del mod">
+          <ac:chgData name="Zhao Xiong" userId="5eba49e5-2895-4cd9-83e8-b3064fe76704" providerId="ADAL" clId="{B606E7B2-EFF5-418A-8639-9F7537C4DA50}" dt="2022-05-15T14:50:01.158" v="2297" actId="478"/>
           <ac:spMkLst>
             <pc:docMk/>
             <pc:sldMk cId="3970877698" sldId="267"/>
             <ac:spMk id="8" creationId="{0B0C6169-EA49-4595-A2A8-9AB41A086630}"/>
           </ac:spMkLst>
         </pc:spChg>
-        <pc:spChg chg="add mod">
-          <ac:chgData name="Zhao Xiong" userId="5eba49e5-2895-4cd9-83e8-b3064fe76704" providerId="ADAL" clId="{B606E7B2-EFF5-418A-8639-9F7537C4DA50}" dt="2022-05-14T13:32:23.061" v="2280" actId="1076"/>
+        <pc:spChg chg="add del mod">
+          <ac:chgData name="Zhao Xiong" userId="5eba49e5-2895-4cd9-83e8-b3064fe76704" providerId="ADAL" clId="{B606E7B2-EFF5-418A-8639-9F7537C4DA50}" dt="2022-05-15T14:50:01.158" v="2297" actId="478"/>
           <ac:spMkLst>
             <pc:docMk/>
             <pc:sldMk cId="3970877698" sldId="267"/>
             <ac:spMk id="9" creationId="{5534C4E7-B50E-4489-8898-D83C0DA96F97}"/>
           </ac:spMkLst>
         </pc:spChg>
-        <pc:spChg chg="add mod">
-          <ac:chgData name="Zhao Xiong" userId="5eba49e5-2895-4cd9-83e8-b3064fe76704" providerId="ADAL" clId="{B606E7B2-EFF5-418A-8639-9F7537C4DA50}" dt="2022-05-14T13:32:37.901" v="2282" actId="1076"/>
+        <pc:spChg chg="add del mod">
+          <ac:chgData name="Zhao Xiong" userId="5eba49e5-2895-4cd9-83e8-b3064fe76704" providerId="ADAL" clId="{B606E7B2-EFF5-418A-8639-9F7537C4DA50}" dt="2022-05-15T14:49:59.592" v="2296" actId="478"/>
           <ac:spMkLst>
             <pc:docMk/>
             <pc:sldMk cId="3970877698" sldId="267"/>
             <ac:spMk id="10" creationId="{0DDA503C-FD9C-496B-9188-01B1F5D36071}"/>
           </ac:spMkLst>
         </pc:spChg>
-        <pc:spChg chg="add mod">
-          <ac:chgData name="Zhao Xiong" userId="5eba49e5-2895-4cd9-83e8-b3064fe76704" providerId="ADAL" clId="{B606E7B2-EFF5-418A-8639-9F7537C4DA50}" dt="2022-05-14T13:32:44.077" v="2284" actId="1076"/>
+        <pc:spChg chg="add del mod">
+          <ac:chgData name="Zhao Xiong" userId="5eba49e5-2895-4cd9-83e8-b3064fe76704" providerId="ADAL" clId="{B606E7B2-EFF5-418A-8639-9F7537C4DA50}" dt="2022-05-15T14:50:01.158" v="2297" actId="478"/>
           <ac:spMkLst>
             <pc:docMk/>
             <pc:sldMk cId="3970877698" sldId="267"/>
             <ac:spMk id="11" creationId="{5CC7CFA0-EA41-46AE-9483-414E021ED28C}"/>
           </ac:spMkLst>
         </pc:spChg>
-        <pc:spChg chg="add mod">
-          <ac:chgData name="Zhao Xiong" userId="5eba49e5-2895-4cd9-83e8-b3064fe76704" providerId="ADAL" clId="{B606E7B2-EFF5-418A-8639-9F7537C4DA50}" dt="2022-05-14T13:33:11.349" v="2286" actId="1076"/>
+        <pc:spChg chg="add del mod">
+          <ac:chgData name="Zhao Xiong" userId="5eba49e5-2895-4cd9-83e8-b3064fe76704" providerId="ADAL" clId="{B606E7B2-EFF5-418A-8639-9F7537C4DA50}" dt="2022-05-15T14:49:59.592" v="2296" actId="478"/>
           <ac:spMkLst>
             <pc:docMk/>
             <pc:sldMk cId="3970877698" sldId="267"/>
@@ -887,6 +896,141 @@
             <pc:docMk/>
             <pc:sldMk cId="3970877698" sldId="267"/>
             <ac:picMk id="4" creationId="{63EBF888-F686-4865-8199-EA554F7C97B8}"/>
+          </ac:picMkLst>
+        </pc:picChg>
+      </pc:sldChg>
+      <pc:sldChg chg="addSp delSp modSp add ord">
+        <pc:chgData name="Zhao Xiong" userId="5eba49e5-2895-4cd9-83e8-b3064fe76704" providerId="ADAL" clId="{B606E7B2-EFF5-418A-8639-9F7537C4DA50}" dt="2022-05-15T15:20:27.411" v="2732" actId="1076"/>
+        <pc:sldMkLst>
+          <pc:docMk/>
+          <pc:sldMk cId="221610829" sldId="268"/>
+        </pc:sldMkLst>
+        <pc:spChg chg="add mod">
+          <ac:chgData name="Zhao Xiong" userId="5eba49e5-2895-4cd9-83e8-b3064fe76704" providerId="ADAL" clId="{B606E7B2-EFF5-418A-8639-9F7537C4DA50}" dt="2022-05-15T15:17:44.699" v="2605" actId="14100"/>
+          <ac:spMkLst>
+            <pc:docMk/>
+            <pc:sldMk cId="221610829" sldId="268"/>
+            <ac:spMk id="2" creationId="{4FA38430-C661-469D-A875-A97B85EF0108}"/>
+          </ac:spMkLst>
+        </pc:spChg>
+        <pc:spChg chg="del">
+          <ac:chgData name="Zhao Xiong" userId="5eba49e5-2895-4cd9-83e8-b3064fe76704" providerId="ADAL" clId="{B606E7B2-EFF5-418A-8639-9F7537C4DA50}" dt="2022-05-15T14:50:07.796" v="2299" actId="478"/>
+          <ac:spMkLst>
+            <pc:docMk/>
+            <pc:sldMk cId="221610829" sldId="268"/>
+            <ac:spMk id="2" creationId="{9F4F22EA-6918-4763-8814-16EC163A6342}"/>
+          </ac:spMkLst>
+        </pc:spChg>
+        <pc:spChg chg="del">
+          <ac:chgData name="Zhao Xiong" userId="5eba49e5-2895-4cd9-83e8-b3064fe76704" providerId="ADAL" clId="{B606E7B2-EFF5-418A-8639-9F7537C4DA50}" dt="2022-05-15T14:50:07.796" v="2299" actId="478"/>
+          <ac:spMkLst>
+            <pc:docMk/>
+            <pc:sldMk cId="221610829" sldId="268"/>
+            <ac:spMk id="3" creationId="{1F74BC5C-5551-47F7-9BB1-D495398B4AD6}"/>
+          </ac:spMkLst>
+        </pc:spChg>
+        <pc:spChg chg="add mod">
+          <ac:chgData name="Zhao Xiong" userId="5eba49e5-2895-4cd9-83e8-b3064fe76704" providerId="ADAL" clId="{B606E7B2-EFF5-418A-8639-9F7537C4DA50}" dt="2022-05-15T14:50:44.314" v="2333" actId="20577"/>
+          <ac:spMkLst>
+            <pc:docMk/>
+            <pc:sldMk cId="221610829" sldId="268"/>
+            <ac:spMk id="6" creationId="{09A37398-FF2B-41CE-B849-656CF6CEB5A3}"/>
+          </ac:spMkLst>
+        </pc:spChg>
+        <pc:spChg chg="add mod">
+          <ac:chgData name="Zhao Xiong" userId="5eba49e5-2895-4cd9-83e8-b3064fe76704" providerId="ADAL" clId="{B606E7B2-EFF5-418A-8639-9F7537C4DA50}" dt="2022-05-15T14:54:44.422" v="2417" actId="1035"/>
+          <ac:spMkLst>
+            <pc:docMk/>
+            <pc:sldMk cId="221610829" sldId="268"/>
+            <ac:spMk id="8" creationId="{1A251C52-BFFE-4FE8-9507-DB35A04DBC41}"/>
+          </ac:spMkLst>
+        </pc:spChg>
+        <pc:spChg chg="add del">
+          <ac:chgData name="Zhao Xiong" userId="5eba49e5-2895-4cd9-83e8-b3064fe76704" providerId="ADAL" clId="{B606E7B2-EFF5-418A-8639-9F7537C4DA50}" dt="2022-05-15T14:53:05.894" v="2364"/>
+          <ac:spMkLst>
+            <pc:docMk/>
+            <pc:sldMk cId="221610829" sldId="268"/>
+            <ac:spMk id="9" creationId="{B2DA0E47-C695-4703-A3FF-D6DDAEC0B2A4}"/>
+          </ac:spMkLst>
+        </pc:spChg>
+        <pc:spChg chg="add mod ord topLvl">
+          <ac:chgData name="Zhao Xiong" userId="5eba49e5-2895-4cd9-83e8-b3064fe76704" providerId="ADAL" clId="{B606E7B2-EFF5-418A-8639-9F7537C4DA50}" dt="2022-05-15T15:18:49.054" v="2669" actId="165"/>
+          <ac:spMkLst>
+            <pc:docMk/>
+            <pc:sldMk cId="221610829" sldId="268"/>
+            <ac:spMk id="10" creationId="{DDA621AB-9B5F-4284-BD84-3F8B49CE23BE}"/>
+          </ac:spMkLst>
+        </pc:spChg>
+        <pc:spChg chg="add mod">
+          <ac:chgData name="Zhao Xiong" userId="5eba49e5-2895-4cd9-83e8-b3064fe76704" providerId="ADAL" clId="{B606E7B2-EFF5-418A-8639-9F7537C4DA50}" dt="2022-05-15T15:20:27.411" v="2732" actId="1076"/>
+          <ac:spMkLst>
+            <pc:docMk/>
+            <pc:sldMk cId="221610829" sldId="268"/>
+            <ac:spMk id="12" creationId="{A2B091DF-81CE-4F5A-BD60-8AD8060EA935}"/>
+          </ac:spMkLst>
+        </pc:spChg>
+        <pc:spChg chg="add mod topLvl">
+          <ac:chgData name="Zhao Xiong" userId="5eba49e5-2895-4cd9-83e8-b3064fe76704" providerId="ADAL" clId="{B606E7B2-EFF5-418A-8639-9F7537C4DA50}" dt="2022-05-15T15:18:49.054" v="2669" actId="165"/>
+          <ac:spMkLst>
+            <pc:docMk/>
+            <pc:sldMk cId="221610829" sldId="268"/>
+            <ac:spMk id="13" creationId="{716538C7-DC98-4F9A-82C7-6B6F291D6FFE}"/>
+          </ac:spMkLst>
+        </pc:spChg>
+        <pc:spChg chg="add mod">
+          <ac:chgData name="Zhao Xiong" userId="5eba49e5-2895-4cd9-83e8-b3064fe76704" providerId="ADAL" clId="{B606E7B2-EFF5-418A-8639-9F7537C4DA50}" dt="2022-05-15T15:20:27.411" v="2732" actId="1076"/>
+          <ac:spMkLst>
+            <pc:docMk/>
+            <pc:sldMk cId="221610829" sldId="268"/>
+            <ac:spMk id="14" creationId="{682EE569-28BD-4248-92F6-BC623AFC5665}"/>
+          </ac:spMkLst>
+        </pc:spChg>
+        <pc:grpChg chg="add del mod">
+          <ac:chgData name="Zhao Xiong" userId="5eba49e5-2895-4cd9-83e8-b3064fe76704" providerId="ADAL" clId="{B606E7B2-EFF5-418A-8639-9F7537C4DA50}" dt="2022-05-15T15:18:49.054" v="2669" actId="165"/>
+          <ac:grpSpMkLst>
+            <pc:docMk/>
+            <pc:sldMk cId="221610829" sldId="268"/>
+            <ac:grpSpMk id="3" creationId="{37423755-F047-43B6-A4E9-C95E638CB304}"/>
+          </ac:grpSpMkLst>
+        </pc:grpChg>
+        <pc:picChg chg="add mod">
+          <ac:chgData name="Zhao Xiong" userId="5eba49e5-2895-4cd9-83e8-b3064fe76704" providerId="ADAL" clId="{B606E7B2-EFF5-418A-8639-9F7537C4DA50}" dt="2022-05-15T15:20:27.411" v="2732" actId="1076"/>
+          <ac:picMkLst>
+            <pc:docMk/>
+            <pc:sldMk cId="221610829" sldId="268"/>
+            <ac:picMk id="3" creationId="{68056FC4-197A-4ECF-857D-F4394AD3C9A6}"/>
+          </ac:picMkLst>
+        </pc:picChg>
+        <pc:picChg chg="add mod">
+          <ac:chgData name="Zhao Xiong" userId="5eba49e5-2895-4cd9-83e8-b3064fe76704" providerId="ADAL" clId="{B606E7B2-EFF5-418A-8639-9F7537C4DA50}" dt="2022-05-15T14:54:44.422" v="2417" actId="1035"/>
+          <ac:picMkLst>
+            <pc:docMk/>
+            <pc:sldMk cId="221610829" sldId="268"/>
+            <ac:picMk id="4" creationId="{0840E561-2EBE-49D1-8A7A-FA10ED8C52E9}"/>
+          </ac:picMkLst>
+        </pc:picChg>
+        <pc:picChg chg="add mod modCrop">
+          <ac:chgData name="Zhao Xiong" userId="5eba49e5-2895-4cd9-83e8-b3064fe76704" providerId="ADAL" clId="{B606E7B2-EFF5-418A-8639-9F7537C4DA50}" dt="2022-05-15T15:20:27.411" v="2732" actId="1076"/>
+          <ac:picMkLst>
+            <pc:docMk/>
+            <pc:sldMk cId="221610829" sldId="268"/>
+            <ac:picMk id="5" creationId="{ECA4371F-5518-4112-9682-6654193D2059}"/>
+          </ac:picMkLst>
+        </pc:picChg>
+        <pc:picChg chg="add del mod">
+          <ac:chgData name="Zhao Xiong" userId="5eba49e5-2895-4cd9-83e8-b3064fe76704" providerId="ADAL" clId="{B606E7B2-EFF5-418A-8639-9F7537C4DA50}" dt="2022-05-15T14:54:27.364" v="2378" actId="478"/>
+          <ac:picMkLst>
+            <pc:docMk/>
+            <pc:sldMk cId="221610829" sldId="268"/>
+            <ac:picMk id="7" creationId="{2D2FD089-3AED-481A-89A6-EFD0DFFF9C14}"/>
+          </ac:picMkLst>
+        </pc:picChg>
+        <pc:picChg chg="add mod topLvl">
+          <ac:chgData name="Zhao Xiong" userId="5eba49e5-2895-4cd9-83e8-b3064fe76704" providerId="ADAL" clId="{B606E7B2-EFF5-418A-8639-9F7537C4DA50}" dt="2022-05-15T15:18:49.054" v="2669" actId="165"/>
+          <ac:picMkLst>
+            <pc:docMk/>
+            <pc:sldMk cId="221610829" sldId="268"/>
+            <ac:picMk id="11" creationId="{9ED66866-A176-4422-9B01-D106D6AC139A}"/>
           </ac:picMkLst>
         </pc:picChg>
       </pc:sldChg>
@@ -977,7 +1121,7 @@
           <a:p>
             <a:fld id="{3F756EDF-0C8E-4F27-B2A4-7BBF4F0FD9CE}" type="datetimeFigureOut">
               <a:rPr lang="en-GB" smtClean="0"/>
-              <a:t>14/05/2022</a:t>
+              <a:t>15/05/2022</a:t>
             </a:fld>
             <a:endParaRPr lang="en-GB"/>
           </a:p>
@@ -1394,7 +1538,7 @@
           <a:p>
             <a:fld id="{B1B6DC73-6F54-48A7-AC0A-0EE4EE00B05A}" type="datetimeFigureOut">
               <a:rPr lang="en-GB" smtClean="0"/>
-              <a:t>14/05/2022</a:t>
+              <a:t>15/05/2022</a:t>
             </a:fld>
             <a:endParaRPr lang="en-GB"/>
           </a:p>
@@ -1594,7 +1738,7 @@
           <a:p>
             <a:fld id="{B1B6DC73-6F54-48A7-AC0A-0EE4EE00B05A}" type="datetimeFigureOut">
               <a:rPr lang="en-GB" smtClean="0"/>
-              <a:t>14/05/2022</a:t>
+              <a:t>15/05/2022</a:t>
             </a:fld>
             <a:endParaRPr lang="en-GB"/>
           </a:p>
@@ -1804,7 +1948,7 @@
           <a:p>
             <a:fld id="{B1B6DC73-6F54-48A7-AC0A-0EE4EE00B05A}" type="datetimeFigureOut">
               <a:rPr lang="en-GB" smtClean="0"/>
-              <a:t>14/05/2022</a:t>
+              <a:t>15/05/2022</a:t>
             </a:fld>
             <a:endParaRPr lang="en-GB"/>
           </a:p>
@@ -2004,7 +2148,7 @@
           <a:p>
             <a:fld id="{B1B6DC73-6F54-48A7-AC0A-0EE4EE00B05A}" type="datetimeFigureOut">
               <a:rPr lang="en-GB" smtClean="0"/>
-              <a:t>14/05/2022</a:t>
+              <a:t>15/05/2022</a:t>
             </a:fld>
             <a:endParaRPr lang="en-GB"/>
           </a:p>
@@ -2280,7 +2424,7 @@
           <a:p>
             <a:fld id="{B1B6DC73-6F54-48A7-AC0A-0EE4EE00B05A}" type="datetimeFigureOut">
               <a:rPr lang="en-GB" smtClean="0"/>
-              <a:t>14/05/2022</a:t>
+              <a:t>15/05/2022</a:t>
             </a:fld>
             <a:endParaRPr lang="en-GB"/>
           </a:p>
@@ -2548,7 +2692,7 @@
           <a:p>
             <a:fld id="{B1B6DC73-6F54-48A7-AC0A-0EE4EE00B05A}" type="datetimeFigureOut">
               <a:rPr lang="en-GB" smtClean="0"/>
-              <a:t>14/05/2022</a:t>
+              <a:t>15/05/2022</a:t>
             </a:fld>
             <a:endParaRPr lang="en-GB"/>
           </a:p>
@@ -2963,7 +3107,7 @@
           <a:p>
             <a:fld id="{B1B6DC73-6F54-48A7-AC0A-0EE4EE00B05A}" type="datetimeFigureOut">
               <a:rPr lang="en-GB" smtClean="0"/>
-              <a:t>14/05/2022</a:t>
+              <a:t>15/05/2022</a:t>
             </a:fld>
             <a:endParaRPr lang="en-GB"/>
           </a:p>
@@ -3105,7 +3249,7 @@
           <a:p>
             <a:fld id="{B1B6DC73-6F54-48A7-AC0A-0EE4EE00B05A}" type="datetimeFigureOut">
               <a:rPr lang="en-GB" smtClean="0"/>
-              <a:t>14/05/2022</a:t>
+              <a:t>15/05/2022</a:t>
             </a:fld>
             <a:endParaRPr lang="en-GB"/>
           </a:p>
@@ -3218,7 +3362,7 @@
           <a:p>
             <a:fld id="{B1B6DC73-6F54-48A7-AC0A-0EE4EE00B05A}" type="datetimeFigureOut">
               <a:rPr lang="en-GB" smtClean="0"/>
-              <a:t>14/05/2022</a:t>
+              <a:t>15/05/2022</a:t>
             </a:fld>
             <a:endParaRPr lang="en-GB"/>
           </a:p>
@@ -3531,7 +3675,7 @@
           <a:p>
             <a:fld id="{B1B6DC73-6F54-48A7-AC0A-0EE4EE00B05A}" type="datetimeFigureOut">
               <a:rPr lang="en-GB" smtClean="0"/>
-              <a:t>14/05/2022</a:t>
+              <a:t>15/05/2022</a:t>
             </a:fld>
             <a:endParaRPr lang="en-GB"/>
           </a:p>
@@ -3820,7 +3964,7 @@
           <a:p>
             <a:fld id="{B1B6DC73-6F54-48A7-AC0A-0EE4EE00B05A}" type="datetimeFigureOut">
               <a:rPr lang="en-GB" smtClean="0"/>
-              <a:t>14/05/2022</a:t>
+              <a:t>15/05/2022</a:t>
             </a:fld>
             <a:endParaRPr lang="en-GB"/>
           </a:p>
@@ -4063,7 +4207,7 @@
           <a:p>
             <a:fld id="{B1B6DC73-6F54-48A7-AC0A-0EE4EE00B05A}" type="datetimeFigureOut">
               <a:rPr lang="en-GB" smtClean="0"/>
-              <a:t>14/05/2022</a:t>
+              <a:t>15/05/2022</a:t>
             </a:fld>
             <a:endParaRPr lang="en-GB"/>
           </a:p>
@@ -4611,6 +4755,116 @@
 </p:sld>
 </file>
 
+<file path=ppt/slides/slide10.xml><?xml version="1.0" encoding="utf-8"?>
+<p:sld xmlns:a="http://schemas.openxmlformats.org/drawingml/2006/main" xmlns:r="http://schemas.openxmlformats.org/officeDocument/2006/relationships" xmlns:p="http://schemas.openxmlformats.org/presentationml/2006/main">
+  <p:cSld>
+    <p:spTree>
+      <p:nvGrpSpPr>
+        <p:cNvPr id="1" name=""/>
+        <p:cNvGrpSpPr/>
+        <p:nvPr/>
+      </p:nvGrpSpPr>
+      <p:grpSpPr>
+        <a:xfrm>
+          <a:off x="0" y="0"/>
+          <a:ext cx="0" cy="0"/>
+          <a:chOff x="0" y="0"/>
+          <a:chExt cx="0" cy="0"/>
+        </a:xfrm>
+      </p:grpSpPr>
+      <p:pic>
+        <p:nvPicPr>
+          <p:cNvPr id="5" name="Picture 4">
+            <a:extLst>
+              <a:ext uri="{FF2B5EF4-FFF2-40B4-BE49-F238E27FC236}">
+                <a16:creationId xmlns:a16="http://schemas.microsoft.com/office/drawing/2014/main" id="{A2D96899-916E-4667-967A-53C75DE0B124}"/>
+              </a:ext>
+            </a:extLst>
+          </p:cNvPr>
+          <p:cNvPicPr>
+            <a:picLocks noChangeAspect="1"/>
+          </p:cNvPicPr>
+          <p:nvPr/>
+        </p:nvPicPr>
+        <p:blipFill>
+          <a:blip r:embed="rId2">
+            <a:extLst>
+              <a:ext uri="{28A0092B-C50C-407E-A947-70E740481C1C}">
+                <a14:useLocalDpi xmlns:a14="http://schemas.microsoft.com/office/drawing/2010/main" val="0"/>
+              </a:ext>
+            </a:extLst>
+          </a:blip>
+          <a:stretch>
+            <a:fillRect/>
+          </a:stretch>
+        </p:blipFill>
+        <p:spPr>
+          <a:xfrm>
+            <a:off x="799707" y="2129363"/>
+            <a:ext cx="10097909" cy="3648584"/>
+          </a:xfrm>
+          <a:prstGeom prst="rect">
+            <a:avLst/>
+          </a:prstGeom>
+        </p:spPr>
+      </p:pic>
+      <p:sp>
+        <p:nvSpPr>
+          <p:cNvPr id="6" name="TextBox 5">
+            <a:extLst>
+              <a:ext uri="{FF2B5EF4-FFF2-40B4-BE49-F238E27FC236}">
+                <a16:creationId xmlns:a16="http://schemas.microsoft.com/office/drawing/2014/main" id="{7A53C59A-1A95-4FC7-AB43-C7A259FFA6C7}"/>
+              </a:ext>
+            </a:extLst>
+          </p:cNvPr>
+          <p:cNvSpPr txBox="1"/>
+          <p:nvPr/>
+        </p:nvSpPr>
+        <p:spPr>
+          <a:xfrm>
+            <a:off x="213989" y="493362"/>
+            <a:ext cx="10571201" cy="369332"/>
+          </a:xfrm>
+          <a:prstGeom prst="rect">
+            <a:avLst/>
+          </a:prstGeom>
+          <a:noFill/>
+        </p:spPr>
+        <p:txBody>
+          <a:bodyPr wrap="square" rtlCol="0">
+            <a:spAutoFit/>
+          </a:bodyPr>
+          <a:lstStyle/>
+          <a:p>
+            <a:r>
+              <a:rPr lang="en-NZ" b="1" dirty="0"/>
+              <a:t>Runs on subsets of dataset (rows) when only using blood pressure (</a:t>
+            </a:r>
+            <a:r>
+              <a:rPr lang="en-NZ" b="1" dirty="0" err="1"/>
+              <a:t>dia</a:t>
+            </a:r>
+            <a:r>
+              <a:rPr lang="en-NZ" b="1" dirty="0"/>
+              <a:t> &amp; sys) as inputs into the model</a:t>
+            </a:r>
+            <a:endParaRPr lang="en-GB" b="1" dirty="0"/>
+          </a:p>
+        </p:txBody>
+      </p:sp>
+    </p:spTree>
+    <p:extLst>
+      <p:ext uri="{BB962C8B-B14F-4D97-AF65-F5344CB8AC3E}">
+        <p14:creationId xmlns:p14="http://schemas.microsoft.com/office/powerpoint/2010/main" val="65343148"/>
+      </p:ext>
+    </p:extLst>
+  </p:cSld>
+  <p:clrMapOvr>
+    <a:masterClrMapping/>
+  </p:clrMapOvr>
+</p:sld>
+</file>
+
 <file path=ppt/slides/slide2.xml><?xml version="1.0" encoding="utf-8"?>
 <p:sld xmlns:a="http://schemas.openxmlformats.org/drawingml/2006/main" xmlns:r="http://schemas.openxmlformats.org/officeDocument/2006/relationships" xmlns:p="http://schemas.openxmlformats.org/presentationml/2006/main">
   <p:cSld>
@@ -5319,48 +5573,12 @@
           <a:chExt cx="0" cy="0"/>
         </a:xfrm>
       </p:grpSpPr>
-      <p:sp>
-        <p:nvSpPr>
-          <p:cNvPr id="4" name="TextBox 3">
-            <a:extLst>
-              <a:ext uri="{FF2B5EF4-FFF2-40B4-BE49-F238E27FC236}">
-                <a16:creationId xmlns:a16="http://schemas.microsoft.com/office/drawing/2014/main" id="{64241607-64F3-4737-969B-89D2D3FAEEAD}"/>
-              </a:ext>
-            </a:extLst>
-          </p:cNvPr>
-          <p:cNvSpPr txBox="1"/>
-          <p:nvPr/>
-        </p:nvSpPr>
-        <p:spPr>
-          <a:xfrm>
-            <a:off x="0" y="0"/>
-            <a:ext cx="12191999" cy="461665"/>
-          </a:xfrm>
-          <a:prstGeom prst="rect">
-            <a:avLst/>
-          </a:prstGeom>
-          <a:noFill/>
-        </p:spPr>
-        <p:txBody>
-          <a:bodyPr wrap="square" rtlCol="0">
-            <a:spAutoFit/>
-          </a:bodyPr>
-          <a:lstStyle/>
-          <a:p>
-            <a:r>
-              <a:rPr lang="en-NZ" sz="2400" b="1" dirty="0"/>
-              <a:t>Distribution of values in distance matrix used for MST/shortest path trajectory calculation</a:t>
-            </a:r>
-            <a:endParaRPr lang="en-GB" sz="2400" b="1" dirty="0"/>
-          </a:p>
-        </p:txBody>
-      </p:sp>
       <p:pic>
         <p:nvPicPr>
-          <p:cNvPr id="10" name="Picture 9">
-            <a:extLst>
-              <a:ext uri="{FF2B5EF4-FFF2-40B4-BE49-F238E27FC236}">
-                <a16:creationId xmlns:a16="http://schemas.microsoft.com/office/drawing/2014/main" id="{56915DDB-28FE-4C98-A988-52AAB828CD0E}"/>
+          <p:cNvPr id="4" name="Picture 3">
+            <a:extLst>
+              <a:ext uri="{FF2B5EF4-FFF2-40B4-BE49-F238E27FC236}">
+                <a16:creationId xmlns:a16="http://schemas.microsoft.com/office/drawing/2014/main" id="{0840E561-2EBE-49D1-8A7A-FA10ED8C52E9}"/>
               </a:ext>
             </a:extLst>
           </p:cNvPr>
@@ -5377,8 +5595,8 @@
         </p:blipFill>
         <p:spPr>
           <a:xfrm>
-            <a:off x="88324" y="474186"/>
-            <a:ext cx="2207780" cy="2017214"/>
+            <a:off x="113371" y="631091"/>
+            <a:ext cx="2942249" cy="2442737"/>
           </a:xfrm>
           <a:prstGeom prst="rect">
             <a:avLst/>
@@ -5387,10 +5605,10 @@
       </p:pic>
       <p:pic>
         <p:nvPicPr>
-          <p:cNvPr id="11" name="Picture 10">
-            <a:extLst>
-              <a:ext uri="{FF2B5EF4-FFF2-40B4-BE49-F238E27FC236}">
-                <a16:creationId xmlns:a16="http://schemas.microsoft.com/office/drawing/2014/main" id="{E9018FE1-13A1-41CA-A09A-8CB1803AE66F}"/>
+          <p:cNvPr id="5" name="Picture 4">
+            <a:extLst>
+              <a:ext uri="{FF2B5EF4-FFF2-40B4-BE49-F238E27FC236}">
+                <a16:creationId xmlns:a16="http://schemas.microsoft.com/office/drawing/2014/main" id="{ECA4371F-5518-4112-9682-6654193D2059}"/>
               </a:ext>
             </a:extLst>
           </p:cNvPr>
@@ -5399,28 +5617,205 @@
           </p:cNvPicPr>
           <p:nvPr/>
         </p:nvPicPr>
-        <p:blipFill>
+        <p:blipFill rotWithShape="1">
           <a:blip r:embed="rId3"/>
-          <a:stretch>
-            <a:fillRect/>
-          </a:stretch>
+          <a:srcRect t="4139" r="25208"/>
+          <a:stretch/>
         </p:blipFill>
         <p:spPr>
           <a:xfrm>
-            <a:off x="4635775" y="461578"/>
-            <a:ext cx="2388936" cy="2017214"/>
+            <a:off x="7317690" y="436713"/>
+            <a:ext cx="2371191" cy="3631017"/>
           </a:xfrm>
           <a:prstGeom prst="rect">
             <a:avLst/>
           </a:prstGeom>
         </p:spPr>
       </p:pic>
+      <p:sp>
+        <p:nvSpPr>
+          <p:cNvPr id="6" name="TextBox 5">
+            <a:extLst>
+              <a:ext uri="{FF2B5EF4-FFF2-40B4-BE49-F238E27FC236}">
+                <a16:creationId xmlns:a16="http://schemas.microsoft.com/office/drawing/2014/main" id="{09A37398-FF2B-41CE-B849-656CF6CEB5A3}"/>
+              </a:ext>
+            </a:extLst>
+          </p:cNvPr>
+          <p:cNvSpPr txBox="1"/>
+          <p:nvPr/>
+        </p:nvSpPr>
+        <p:spPr>
+          <a:xfrm>
+            <a:off x="0" y="0"/>
+            <a:ext cx="12191999" cy="461665"/>
+          </a:xfrm>
+          <a:prstGeom prst="rect">
+            <a:avLst/>
+          </a:prstGeom>
+          <a:noFill/>
+        </p:spPr>
+        <p:txBody>
+          <a:bodyPr wrap="square" rtlCol="0">
+            <a:spAutoFit/>
+          </a:bodyPr>
+          <a:lstStyle/>
+          <a:p>
+            <a:r>
+              <a:rPr lang="en-NZ" sz="2400" b="1" dirty="0"/>
+              <a:t>Distribution of values in </a:t>
+            </a:r>
+            <a:r>
+              <a:rPr lang="en-NZ" sz="2400" b="1" dirty="0" err="1"/>
+              <a:t>cPC</a:t>
+            </a:r>
+            <a:r>
+              <a:rPr lang="en-NZ" sz="2400" b="1" dirty="0"/>
+              <a:t> and results</a:t>
+            </a:r>
+            <a:endParaRPr lang="en-GB" sz="2400" b="1" dirty="0"/>
+          </a:p>
+        </p:txBody>
+      </p:sp>
+      <p:sp>
+        <p:nvSpPr>
+          <p:cNvPr id="8" name="TextBox 7">
+            <a:extLst>
+              <a:ext uri="{FF2B5EF4-FFF2-40B4-BE49-F238E27FC236}">
+                <a16:creationId xmlns:a16="http://schemas.microsoft.com/office/drawing/2014/main" id="{1A251C52-BFFE-4FE8-9507-DB35A04DBC41}"/>
+              </a:ext>
+            </a:extLst>
+          </p:cNvPr>
+          <p:cNvSpPr txBox="1"/>
+          <p:nvPr/>
+        </p:nvSpPr>
+        <p:spPr>
+          <a:xfrm>
+            <a:off x="113370" y="446425"/>
+            <a:ext cx="2942249" cy="184666"/>
+          </a:xfrm>
+          <a:prstGeom prst="rect">
+            <a:avLst/>
+          </a:prstGeom>
+          <a:noFill/>
+        </p:spPr>
+        <p:txBody>
+          <a:bodyPr wrap="square" lIns="0" tIns="0" rIns="0" bIns="0" rtlCol="0">
+            <a:spAutoFit/>
+          </a:bodyPr>
+          <a:lstStyle/>
+          <a:p>
+            <a:pPr algn="ctr"/>
+            <a:r>
+              <a:rPr lang="en-NZ" sz="1200" b="1" dirty="0"/>
+              <a:t>Raw values</a:t>
+            </a:r>
+            <a:endParaRPr lang="en-GB" sz="1200" b="1" dirty="0"/>
+          </a:p>
+        </p:txBody>
+      </p:sp>
+      <p:sp>
+        <p:nvSpPr>
+          <p:cNvPr id="12" name="TextBox 11">
+            <a:extLst>
+              <a:ext uri="{FF2B5EF4-FFF2-40B4-BE49-F238E27FC236}">
+                <a16:creationId xmlns:a16="http://schemas.microsoft.com/office/drawing/2014/main" id="{A2B091DF-81CE-4F5A-BD60-8AD8060EA935}"/>
+              </a:ext>
+            </a:extLst>
+          </p:cNvPr>
+          <p:cNvSpPr txBox="1"/>
+          <p:nvPr/>
+        </p:nvSpPr>
+        <p:spPr>
+          <a:xfrm>
+            <a:off x="7317689" y="76787"/>
+            <a:ext cx="2371192" cy="369332"/>
+          </a:xfrm>
+          <a:prstGeom prst="rect">
+            <a:avLst/>
+          </a:prstGeom>
+          <a:noFill/>
+        </p:spPr>
+        <p:txBody>
+          <a:bodyPr wrap="square" lIns="0" tIns="0" rIns="0" bIns="0" rtlCol="0">
+            <a:spAutoFit/>
+          </a:bodyPr>
+          <a:lstStyle/>
+          <a:p>
+            <a:pPr algn="ctr"/>
+            <a:r>
+              <a:rPr lang="en-NZ" sz="1200" b="1" dirty="0"/>
+              <a:t>Filter out </a:t>
+            </a:r>
+            <a:r>
+              <a:rPr lang="en-NZ" sz="1200" b="1" dirty="0" err="1"/>
+              <a:t>cPCs</a:t>
+            </a:r>
+            <a:r>
+              <a:rPr lang="en-NZ" sz="1200" b="1" dirty="0"/>
+              <a:t> outside of 3 standard deviations</a:t>
+            </a:r>
+            <a:endParaRPr lang="en-GB" sz="1200" b="1" dirty="0"/>
+          </a:p>
+        </p:txBody>
+      </p:sp>
+      <p:sp>
+        <p:nvSpPr>
+          <p:cNvPr id="2" name="Rectangle 1">
+            <a:extLst>
+              <a:ext uri="{FF2B5EF4-FFF2-40B4-BE49-F238E27FC236}">
+                <a16:creationId xmlns:a16="http://schemas.microsoft.com/office/drawing/2014/main" id="{4FA38430-C661-469D-A875-A97B85EF0108}"/>
+              </a:ext>
+            </a:extLst>
+          </p:cNvPr>
+          <p:cNvSpPr/>
+          <p:nvPr/>
+        </p:nvSpPr>
+        <p:spPr>
+          <a:xfrm>
+            <a:off x="1340644" y="1022350"/>
+            <a:ext cx="178594" cy="1915185"/>
+          </a:xfrm>
+          <a:prstGeom prst="rect">
+            <a:avLst/>
+          </a:prstGeom>
+          <a:noFill/>
+          <a:ln w="19050">
+            <a:solidFill>
+              <a:srgbClr val="FF0000"/>
+            </a:solidFill>
+          </a:ln>
+        </p:spPr>
+        <p:style>
+          <a:lnRef idx="2">
+            <a:schemeClr val="accent1">
+              <a:shade val="50000"/>
+            </a:schemeClr>
+          </a:lnRef>
+          <a:fillRef idx="1">
+            <a:schemeClr val="accent1"/>
+          </a:fillRef>
+          <a:effectRef idx="0">
+            <a:schemeClr val="accent1"/>
+          </a:effectRef>
+          <a:fontRef idx="minor">
+            <a:schemeClr val="lt1"/>
+          </a:fontRef>
+        </p:style>
+        <p:txBody>
+          <a:bodyPr rtlCol="0" anchor="ctr"/>
+          <a:lstStyle/>
+          <a:p>
+            <a:pPr algn="ctr"/>
+            <a:endParaRPr lang="en-GB" dirty="0"/>
+          </a:p>
+        </p:txBody>
+      </p:sp>
       <p:pic>
         <p:nvPicPr>
-          <p:cNvPr id="2" name="Picture 1">
-            <a:extLst>
-              <a:ext uri="{FF2B5EF4-FFF2-40B4-BE49-F238E27FC236}">
-                <a16:creationId xmlns:a16="http://schemas.microsoft.com/office/drawing/2014/main" id="{FD4B9965-2B8C-4A28-8D4C-DAE9DF88450A}"/>
+          <p:cNvPr id="11" name="Picture 10">
+            <a:extLst>
+              <a:ext uri="{FF2B5EF4-FFF2-40B4-BE49-F238E27FC236}">
+                <a16:creationId xmlns:a16="http://schemas.microsoft.com/office/drawing/2014/main" id="{9ED66866-A176-4422-9B01-D106D6AC139A}"/>
               </a:ext>
             </a:extLst>
           </p:cNvPr>
@@ -5437,20 +5832,117 @@
         </p:blipFill>
         <p:spPr>
           <a:xfrm>
-            <a:off x="2288113" y="461578"/>
-            <a:ext cx="2347662" cy="2017214"/>
+            <a:off x="378113" y="3158310"/>
+            <a:ext cx="2288800" cy="2050499"/>
           </a:xfrm>
           <a:prstGeom prst="rect">
             <a:avLst/>
           </a:prstGeom>
         </p:spPr>
       </p:pic>
+      <p:sp>
+        <p:nvSpPr>
+          <p:cNvPr id="13" name="Rectangle 12">
+            <a:extLst>
+              <a:ext uri="{FF2B5EF4-FFF2-40B4-BE49-F238E27FC236}">
+                <a16:creationId xmlns:a16="http://schemas.microsoft.com/office/drawing/2014/main" id="{716538C7-DC98-4F9A-82C7-6B6F291D6FFE}"/>
+              </a:ext>
+            </a:extLst>
+          </p:cNvPr>
+          <p:cNvSpPr/>
+          <p:nvPr/>
+        </p:nvSpPr>
+        <p:spPr>
+          <a:xfrm>
+            <a:off x="371562" y="3133633"/>
+            <a:ext cx="2295350" cy="2075176"/>
+          </a:xfrm>
+          <a:prstGeom prst="rect">
+            <a:avLst/>
+          </a:prstGeom>
+          <a:noFill/>
+          <a:ln w="38100">
+            <a:solidFill>
+              <a:srgbClr val="FF0000"/>
+            </a:solidFill>
+          </a:ln>
+        </p:spPr>
+        <p:style>
+          <a:lnRef idx="2">
+            <a:schemeClr val="accent1">
+              <a:shade val="50000"/>
+            </a:schemeClr>
+          </a:lnRef>
+          <a:fillRef idx="1">
+            <a:schemeClr val="accent1"/>
+          </a:fillRef>
+          <a:effectRef idx="0">
+            <a:schemeClr val="accent1"/>
+          </a:effectRef>
+          <a:fontRef idx="minor">
+            <a:schemeClr val="lt1"/>
+          </a:fontRef>
+        </p:style>
+        <p:txBody>
+          <a:bodyPr rtlCol="0" anchor="ctr"/>
+          <a:lstStyle/>
+          <a:p>
+            <a:pPr algn="ctr"/>
+            <a:endParaRPr lang="en-GB" dirty="0"/>
+          </a:p>
+        </p:txBody>
+      </p:sp>
+      <p:sp>
+        <p:nvSpPr>
+          <p:cNvPr id="10" name="TextBox 9">
+            <a:extLst>
+              <a:ext uri="{FF2B5EF4-FFF2-40B4-BE49-F238E27FC236}">
+                <a16:creationId xmlns:a16="http://schemas.microsoft.com/office/drawing/2014/main" id="{DDA621AB-9B5F-4284-BD84-3F8B49CE23BE}"/>
+              </a:ext>
+            </a:extLst>
+          </p:cNvPr>
+          <p:cNvSpPr txBox="1"/>
+          <p:nvPr/>
+        </p:nvSpPr>
+        <p:spPr>
+          <a:xfrm>
+            <a:off x="378113" y="3212981"/>
+            <a:ext cx="2288800" cy="215480"/>
+          </a:xfrm>
+          <a:prstGeom prst="rect">
+            <a:avLst/>
+          </a:prstGeom>
+          <a:noFill/>
+        </p:spPr>
+        <p:txBody>
+          <a:bodyPr wrap="square" lIns="0" tIns="0" rIns="0" bIns="0" rtlCol="0">
+            <a:spAutoFit/>
+          </a:bodyPr>
+          <a:lstStyle/>
+          <a:p>
+            <a:pPr algn="ctr"/>
+            <a:r>
+              <a:rPr lang="en-NZ" b="1" dirty="0">
+                <a:solidFill>
+                  <a:srgbClr val="FF0000"/>
+                </a:solidFill>
+              </a:rPr>
+              <a:t>Zoomed in</a:t>
+            </a:r>
+            <a:endParaRPr lang="en-GB" b="1" dirty="0">
+              <a:solidFill>
+                <a:srgbClr val="FF0000"/>
+              </a:solidFill>
+            </a:endParaRPr>
+          </a:p>
+        </p:txBody>
+      </p:sp>
       <p:pic>
         <p:nvPicPr>
-          <p:cNvPr id="7" name="Picture 6">
-            <a:extLst>
-              <a:ext uri="{FF2B5EF4-FFF2-40B4-BE49-F238E27FC236}">
-                <a16:creationId xmlns:a16="http://schemas.microsoft.com/office/drawing/2014/main" id="{9A5BDDF7-7C18-474A-BA19-312A5AD8E659}"/>
+          <p:cNvPr id="3" name="Picture 2">
+            <a:extLst>
+              <a:ext uri="{FF2B5EF4-FFF2-40B4-BE49-F238E27FC236}">
+                <a16:creationId xmlns:a16="http://schemas.microsoft.com/office/drawing/2014/main" id="{68056FC4-197A-4ECF-857D-F4394AD3C9A6}"/>
               </a:ext>
             </a:extLst>
           </p:cNvPr>
@@ -5467,198 +5959,63 @@
         </p:blipFill>
         <p:spPr>
           <a:xfrm>
-            <a:off x="96315" y="4822413"/>
-            <a:ext cx="2199789" cy="2039290"/>
+            <a:off x="9738709" y="446425"/>
+            <a:ext cx="2339920" cy="3621304"/>
           </a:xfrm>
           <a:prstGeom prst="rect">
             <a:avLst/>
           </a:prstGeom>
         </p:spPr>
       </p:pic>
-      <p:pic>
-        <p:nvPicPr>
-          <p:cNvPr id="8" name="Picture 7">
-            <a:extLst>
-              <a:ext uri="{FF2B5EF4-FFF2-40B4-BE49-F238E27FC236}">
-                <a16:creationId xmlns:a16="http://schemas.microsoft.com/office/drawing/2014/main" id="{959F5EC5-53F6-4F6A-B348-BEEFFD3957D1}"/>
-              </a:ext>
-            </a:extLst>
-          </p:cNvPr>
-          <p:cNvPicPr>
-            <a:picLocks noChangeAspect="1"/>
-          </p:cNvPicPr>
+      <p:sp>
+        <p:nvSpPr>
+          <p:cNvPr id="14" name="TextBox 13">
+            <a:extLst>
+              <a:ext uri="{FF2B5EF4-FFF2-40B4-BE49-F238E27FC236}">
+                <a16:creationId xmlns:a16="http://schemas.microsoft.com/office/drawing/2014/main" id="{682EE569-28BD-4248-92F6-BC623AFC5665}"/>
+              </a:ext>
+            </a:extLst>
+          </p:cNvPr>
+          <p:cNvSpPr txBox="1"/>
           <p:nvPr/>
-        </p:nvPicPr>
-        <p:blipFill>
-          <a:blip r:embed="rId6"/>
-          <a:stretch>
-            <a:fillRect/>
-          </a:stretch>
-        </p:blipFill>
-        <p:spPr>
-          <a:xfrm>
-            <a:off x="4635776" y="2642142"/>
-            <a:ext cx="2275895" cy="2062046"/>
+        </p:nvSpPr>
+        <p:spPr>
+          <a:xfrm>
+            <a:off x="9707437" y="115754"/>
+            <a:ext cx="2371192" cy="369332"/>
           </a:xfrm>
           <a:prstGeom prst="rect">
             <a:avLst/>
           </a:prstGeom>
-        </p:spPr>
-      </p:pic>
-      <p:pic>
-        <p:nvPicPr>
-          <p:cNvPr id="9" name="Picture 8">
-            <a:extLst>
-              <a:ext uri="{FF2B5EF4-FFF2-40B4-BE49-F238E27FC236}">
-                <a16:creationId xmlns:a16="http://schemas.microsoft.com/office/drawing/2014/main" id="{611A8E4F-F107-49CB-A86C-3CE576B6594E}"/>
-              </a:ext>
-            </a:extLst>
-          </p:cNvPr>
-          <p:cNvPicPr>
-            <a:picLocks noChangeAspect="1"/>
-          </p:cNvPicPr>
-          <p:nvPr/>
-        </p:nvPicPr>
-        <p:blipFill>
-          <a:blip r:embed="rId7"/>
-          <a:stretch>
-            <a:fillRect/>
-          </a:stretch>
-        </p:blipFill>
-        <p:spPr>
-          <a:xfrm>
-            <a:off x="88324" y="2699580"/>
-            <a:ext cx="2199789" cy="2017215"/>
-          </a:xfrm>
-          <a:prstGeom prst="rect">
-            <a:avLst/>
-          </a:prstGeom>
-        </p:spPr>
-      </p:pic>
-      <p:pic>
-        <p:nvPicPr>
-          <p:cNvPr id="12" name="Picture 11">
-            <a:extLst>
-              <a:ext uri="{FF2B5EF4-FFF2-40B4-BE49-F238E27FC236}">
-                <a16:creationId xmlns:a16="http://schemas.microsoft.com/office/drawing/2014/main" id="{8C9FBEA2-1726-40D3-953F-668829D2E228}"/>
-              </a:ext>
-            </a:extLst>
-          </p:cNvPr>
-          <p:cNvPicPr>
-            <a:picLocks noChangeAspect="1"/>
-          </p:cNvPicPr>
-          <p:nvPr/>
-        </p:nvPicPr>
-        <p:blipFill>
-          <a:blip r:embed="rId8"/>
-          <a:stretch>
-            <a:fillRect/>
-          </a:stretch>
-        </p:blipFill>
-        <p:spPr>
-          <a:xfrm>
-            <a:off x="4635775" y="4801747"/>
-            <a:ext cx="2199789" cy="2043645"/>
-          </a:xfrm>
-          <a:prstGeom prst="rect">
-            <a:avLst/>
-          </a:prstGeom>
-        </p:spPr>
-      </p:pic>
-      <p:pic>
-        <p:nvPicPr>
-          <p:cNvPr id="13" name="Picture 12">
-            <a:extLst>
-              <a:ext uri="{FF2B5EF4-FFF2-40B4-BE49-F238E27FC236}">
-                <a16:creationId xmlns:a16="http://schemas.microsoft.com/office/drawing/2014/main" id="{D5BF4313-5326-4470-804E-1A4974D361E1}"/>
-              </a:ext>
-            </a:extLst>
-          </p:cNvPr>
-          <p:cNvPicPr>
-            <a:picLocks noChangeAspect="1"/>
-          </p:cNvPicPr>
-          <p:nvPr/>
-        </p:nvPicPr>
-        <p:blipFill>
-          <a:blip r:embed="rId9"/>
-          <a:stretch>
-            <a:fillRect/>
-          </a:stretch>
-        </p:blipFill>
-        <p:spPr>
-          <a:xfrm>
-            <a:off x="7024711" y="455317"/>
-            <a:ext cx="2202478" cy="2029735"/>
-          </a:xfrm>
-          <a:prstGeom prst="rect">
-            <a:avLst/>
-          </a:prstGeom>
-        </p:spPr>
-      </p:pic>
-      <p:pic>
-        <p:nvPicPr>
-          <p:cNvPr id="3" name="Picture 2">
-            <a:extLst>
-              <a:ext uri="{FF2B5EF4-FFF2-40B4-BE49-F238E27FC236}">
-                <a16:creationId xmlns:a16="http://schemas.microsoft.com/office/drawing/2014/main" id="{9CD36BFD-C338-4C51-816E-58CA5BA5D4C8}"/>
-              </a:ext>
-            </a:extLst>
-          </p:cNvPr>
-          <p:cNvPicPr>
-            <a:picLocks noChangeAspect="1"/>
-          </p:cNvPicPr>
-          <p:nvPr/>
-        </p:nvPicPr>
-        <p:blipFill>
-          <a:blip r:embed="rId10"/>
-          <a:stretch>
-            <a:fillRect/>
-          </a:stretch>
-        </p:blipFill>
-        <p:spPr>
-          <a:xfrm>
-            <a:off x="2288113" y="2642141"/>
-            <a:ext cx="2347662" cy="2106876"/>
-          </a:xfrm>
-          <a:prstGeom prst="rect">
-            <a:avLst/>
-          </a:prstGeom>
-        </p:spPr>
-      </p:pic>
-      <p:pic>
-        <p:nvPicPr>
-          <p:cNvPr id="5" name="Picture 4">
-            <a:extLst>
-              <a:ext uri="{FF2B5EF4-FFF2-40B4-BE49-F238E27FC236}">
-                <a16:creationId xmlns:a16="http://schemas.microsoft.com/office/drawing/2014/main" id="{F3A28C97-FC86-4392-9192-A00393915C9E}"/>
-              </a:ext>
-            </a:extLst>
-          </p:cNvPr>
-          <p:cNvPicPr>
-            <a:picLocks noChangeAspect="1"/>
-          </p:cNvPicPr>
-          <p:nvPr/>
-        </p:nvPicPr>
-        <p:blipFill>
-          <a:blip r:embed="rId11"/>
-          <a:stretch>
-            <a:fillRect/>
-          </a:stretch>
-        </p:blipFill>
-        <p:spPr>
-          <a:xfrm>
-            <a:off x="9290770" y="454735"/>
-            <a:ext cx="2436331" cy="2017214"/>
-          </a:xfrm>
-          <a:prstGeom prst="rect">
-            <a:avLst/>
-          </a:prstGeom>
-        </p:spPr>
-      </p:pic>
+          <a:noFill/>
+        </p:spPr>
+        <p:txBody>
+          <a:bodyPr wrap="square" lIns="0" tIns="0" rIns="0" bIns="0" rtlCol="0">
+            <a:spAutoFit/>
+          </a:bodyPr>
+          <a:lstStyle/>
+          <a:p>
+            <a:pPr algn="ctr"/>
+            <a:r>
+              <a:rPr lang="en-NZ" sz="1200" b="1" dirty="0"/>
+              <a:t>Filter out </a:t>
+            </a:r>
+            <a:r>
+              <a:rPr lang="en-NZ" sz="1200" b="1" dirty="0" err="1"/>
+              <a:t>cPCs</a:t>
+            </a:r>
+            <a:r>
+              <a:rPr lang="en-NZ" sz="1200" b="1" dirty="0"/>
+              <a:t> outside of 1 standard deviations</a:t>
+            </a:r>
+            <a:endParaRPr lang="en-GB" sz="1200" b="1" dirty="0"/>
+          </a:p>
+        </p:txBody>
+      </p:sp>
     </p:spTree>
     <p:extLst>
       <p:ext uri="{BB962C8B-B14F-4D97-AF65-F5344CB8AC3E}">
-        <p14:creationId xmlns:p14="http://schemas.microsoft.com/office/powerpoint/2010/main" val="1920508232"/>
+        <p14:creationId xmlns:p14="http://schemas.microsoft.com/office/powerpoint/2010/main" val="221610829"/>
       </p:ext>
     </p:extLst>
   </p:cSld>
@@ -5685,12 +6042,48 @@
           <a:chExt cx="0" cy="0"/>
         </a:xfrm>
       </p:grpSpPr>
+      <p:sp>
+        <p:nvSpPr>
+          <p:cNvPr id="4" name="TextBox 3">
+            <a:extLst>
+              <a:ext uri="{FF2B5EF4-FFF2-40B4-BE49-F238E27FC236}">
+                <a16:creationId xmlns:a16="http://schemas.microsoft.com/office/drawing/2014/main" id="{64241607-64F3-4737-969B-89D2D3FAEEAD}"/>
+              </a:ext>
+            </a:extLst>
+          </p:cNvPr>
+          <p:cNvSpPr txBox="1"/>
+          <p:nvPr/>
+        </p:nvSpPr>
+        <p:spPr>
+          <a:xfrm>
+            <a:off x="0" y="0"/>
+            <a:ext cx="12191999" cy="461665"/>
+          </a:xfrm>
+          <a:prstGeom prst="rect">
+            <a:avLst/>
+          </a:prstGeom>
+          <a:noFill/>
+        </p:spPr>
+        <p:txBody>
+          <a:bodyPr wrap="square" rtlCol="0">
+            <a:spAutoFit/>
+          </a:bodyPr>
+          <a:lstStyle/>
+          <a:p>
+            <a:r>
+              <a:rPr lang="en-NZ" sz="2400" b="1" dirty="0"/>
+              <a:t>Distribution of values in distance matrix used for MST/shortest path trajectory calculation</a:t>
+            </a:r>
+            <a:endParaRPr lang="en-GB" sz="2400" b="1" dirty="0"/>
+          </a:p>
+        </p:txBody>
+      </p:sp>
       <p:pic>
         <p:nvPicPr>
-          <p:cNvPr id="4" name="Picture 3">
-            <a:extLst>
-              <a:ext uri="{FF2B5EF4-FFF2-40B4-BE49-F238E27FC236}">
-                <a16:creationId xmlns:a16="http://schemas.microsoft.com/office/drawing/2014/main" id="{63EBF888-F686-4865-8199-EA554F7C97B8}"/>
+          <p:cNvPr id="10" name="Picture 9">
+            <a:extLst>
+              <a:ext uri="{FF2B5EF4-FFF2-40B4-BE49-F238E27FC236}">
+                <a16:creationId xmlns:a16="http://schemas.microsoft.com/office/drawing/2014/main" id="{56915DDB-28FE-4C98-A988-52AAB828CD0E}"/>
               </a:ext>
             </a:extLst>
           </p:cNvPr>
@@ -5707,362 +6100,288 @@
         </p:blipFill>
         <p:spPr>
           <a:xfrm>
-            <a:off x="0" y="455497"/>
-            <a:ext cx="12192000" cy="6402503"/>
+            <a:off x="88324" y="474186"/>
+            <a:ext cx="2207780" cy="2017214"/>
           </a:xfrm>
           <a:prstGeom prst="rect">
             <a:avLst/>
           </a:prstGeom>
         </p:spPr>
       </p:pic>
-      <p:sp>
-        <p:nvSpPr>
-          <p:cNvPr id="5" name="TextBox 4">
-            <a:extLst>
-              <a:ext uri="{FF2B5EF4-FFF2-40B4-BE49-F238E27FC236}">
-                <a16:creationId xmlns:a16="http://schemas.microsoft.com/office/drawing/2014/main" id="{C0EDD6DF-DB99-4EE6-A5BF-CE0D62FBE84E}"/>
-              </a:ext>
-            </a:extLst>
-          </p:cNvPr>
-          <p:cNvSpPr txBox="1"/>
+      <p:pic>
+        <p:nvPicPr>
+          <p:cNvPr id="11" name="Picture 10">
+            <a:extLst>
+              <a:ext uri="{FF2B5EF4-FFF2-40B4-BE49-F238E27FC236}">
+                <a16:creationId xmlns:a16="http://schemas.microsoft.com/office/drawing/2014/main" id="{E9018FE1-13A1-41CA-A09A-8CB1803AE66F}"/>
+              </a:ext>
+            </a:extLst>
+          </p:cNvPr>
+          <p:cNvPicPr>
+            <a:picLocks noChangeAspect="1"/>
+          </p:cNvPicPr>
           <p:nvPr/>
-        </p:nvSpPr>
-        <p:spPr>
-          <a:xfrm>
-            <a:off x="0" y="-29260"/>
-            <a:ext cx="12191999" cy="461665"/>
+        </p:nvPicPr>
+        <p:blipFill>
+          <a:blip r:embed="rId3"/>
+          <a:stretch>
+            <a:fillRect/>
+          </a:stretch>
+        </p:blipFill>
+        <p:spPr>
+          <a:xfrm>
+            <a:off x="4635775" y="461578"/>
+            <a:ext cx="2388936" cy="2017214"/>
           </a:xfrm>
           <a:prstGeom prst="rect">
             <a:avLst/>
           </a:prstGeom>
-          <a:noFill/>
-        </p:spPr>
-        <p:txBody>
-          <a:bodyPr wrap="square" rtlCol="0">
-            <a:spAutoFit/>
-          </a:bodyPr>
-          <a:lstStyle/>
-          <a:p>
-            <a:r>
-              <a:rPr lang="en-NZ" sz="2400" b="1" dirty="0"/>
-              <a:t>Distribution of Values for each contrastive principle component in a 20% subset run</a:t>
-            </a:r>
-            <a:endParaRPr lang="en-GB" sz="2400" b="1" dirty="0"/>
-          </a:p>
-        </p:txBody>
-      </p:sp>
-      <p:sp>
-        <p:nvSpPr>
-          <p:cNvPr id="6" name="TextBox 5">
-            <a:extLst>
-              <a:ext uri="{FF2B5EF4-FFF2-40B4-BE49-F238E27FC236}">
-                <a16:creationId xmlns:a16="http://schemas.microsoft.com/office/drawing/2014/main" id="{8ED56D22-F48A-4D08-AFF1-AE04223BE525}"/>
-              </a:ext>
-            </a:extLst>
-          </p:cNvPr>
-          <p:cNvSpPr txBox="1"/>
+        </p:spPr>
+      </p:pic>
+      <p:pic>
+        <p:nvPicPr>
+          <p:cNvPr id="2" name="Picture 1">
+            <a:extLst>
+              <a:ext uri="{FF2B5EF4-FFF2-40B4-BE49-F238E27FC236}">
+                <a16:creationId xmlns:a16="http://schemas.microsoft.com/office/drawing/2014/main" id="{FD4B9965-2B8C-4A28-8D4C-DAE9DF88450A}"/>
+              </a:ext>
+            </a:extLst>
+          </p:cNvPr>
+          <p:cNvPicPr>
+            <a:picLocks noChangeAspect="1"/>
+          </p:cNvPicPr>
           <p:nvPr/>
-        </p:nvSpPr>
-        <p:spPr>
-          <a:xfrm>
-            <a:off x="5494020" y="1264920"/>
-            <a:ext cx="439544" cy="707886"/>
+        </p:nvPicPr>
+        <p:blipFill>
+          <a:blip r:embed="rId4"/>
+          <a:stretch>
+            <a:fillRect/>
+          </a:stretch>
+        </p:blipFill>
+        <p:spPr>
+          <a:xfrm>
+            <a:off x="2288113" y="461578"/>
+            <a:ext cx="2347662" cy="2017214"/>
           </a:xfrm>
           <a:prstGeom prst="rect">
             <a:avLst/>
           </a:prstGeom>
-          <a:noFill/>
-        </p:spPr>
-        <p:txBody>
-          <a:bodyPr wrap="none" rtlCol="0">
-            <a:spAutoFit/>
-          </a:bodyPr>
-          <a:lstStyle/>
-          <a:p>
-            <a:r>
-              <a:rPr lang="en-NZ" sz="4000" b="1" dirty="0">
-                <a:solidFill>
-                  <a:srgbClr val="FF0000"/>
-                </a:solidFill>
-              </a:rPr>
-              <a:t>*</a:t>
-            </a:r>
-            <a:endParaRPr lang="en-GB" sz="4000" b="1" dirty="0">
-              <a:solidFill>
-                <a:srgbClr val="FF0000"/>
-              </a:solidFill>
-            </a:endParaRPr>
-          </a:p>
-        </p:txBody>
-      </p:sp>
-      <p:sp>
-        <p:nvSpPr>
-          <p:cNvPr id="7" name="TextBox 6">
-            <a:extLst>
-              <a:ext uri="{FF2B5EF4-FFF2-40B4-BE49-F238E27FC236}">
-                <a16:creationId xmlns:a16="http://schemas.microsoft.com/office/drawing/2014/main" id="{155A5477-F770-451F-A7B9-33D0DC1C4357}"/>
-              </a:ext>
-            </a:extLst>
-          </p:cNvPr>
-          <p:cNvSpPr txBox="1"/>
+        </p:spPr>
+      </p:pic>
+      <p:pic>
+        <p:nvPicPr>
+          <p:cNvPr id="7" name="Picture 6">
+            <a:extLst>
+              <a:ext uri="{FF2B5EF4-FFF2-40B4-BE49-F238E27FC236}">
+                <a16:creationId xmlns:a16="http://schemas.microsoft.com/office/drawing/2014/main" id="{9A5BDDF7-7C18-474A-BA19-312A5AD8E659}"/>
+              </a:ext>
+            </a:extLst>
+          </p:cNvPr>
+          <p:cNvPicPr>
+            <a:picLocks noChangeAspect="1"/>
+          </p:cNvPicPr>
           <p:nvPr/>
-        </p:nvSpPr>
-        <p:spPr>
-          <a:xfrm>
-            <a:off x="8008620" y="1264920"/>
-            <a:ext cx="439544" cy="707886"/>
+        </p:nvPicPr>
+        <p:blipFill>
+          <a:blip r:embed="rId5"/>
+          <a:stretch>
+            <a:fillRect/>
+          </a:stretch>
+        </p:blipFill>
+        <p:spPr>
+          <a:xfrm>
+            <a:off x="96315" y="4822413"/>
+            <a:ext cx="2199789" cy="2039290"/>
           </a:xfrm>
           <a:prstGeom prst="rect">
             <a:avLst/>
           </a:prstGeom>
-          <a:noFill/>
-        </p:spPr>
-        <p:txBody>
-          <a:bodyPr wrap="none" rtlCol="0">
-            <a:spAutoFit/>
-          </a:bodyPr>
-          <a:lstStyle/>
-          <a:p>
-            <a:r>
-              <a:rPr lang="en-NZ" sz="4000" b="1" dirty="0">
-                <a:solidFill>
-                  <a:srgbClr val="FF0000"/>
-                </a:solidFill>
-              </a:rPr>
-              <a:t>*</a:t>
-            </a:r>
-            <a:endParaRPr lang="en-GB" sz="4000" b="1" dirty="0">
-              <a:solidFill>
-                <a:srgbClr val="FF0000"/>
-              </a:solidFill>
-            </a:endParaRPr>
-          </a:p>
-        </p:txBody>
-      </p:sp>
-      <p:sp>
-        <p:nvSpPr>
-          <p:cNvPr id="8" name="TextBox 7">
-            <a:extLst>
-              <a:ext uri="{FF2B5EF4-FFF2-40B4-BE49-F238E27FC236}">
-                <a16:creationId xmlns:a16="http://schemas.microsoft.com/office/drawing/2014/main" id="{0B0C6169-EA49-4595-A2A8-9AB41A086630}"/>
-              </a:ext>
-            </a:extLst>
-          </p:cNvPr>
-          <p:cNvSpPr txBox="1"/>
+        </p:spPr>
+      </p:pic>
+      <p:pic>
+        <p:nvPicPr>
+          <p:cNvPr id="8" name="Picture 7">
+            <a:extLst>
+              <a:ext uri="{FF2B5EF4-FFF2-40B4-BE49-F238E27FC236}">
+                <a16:creationId xmlns:a16="http://schemas.microsoft.com/office/drawing/2014/main" id="{959F5EC5-53F6-4F6A-B348-BEEFFD3957D1}"/>
+              </a:ext>
+            </a:extLst>
+          </p:cNvPr>
+          <p:cNvPicPr>
+            <a:picLocks noChangeAspect="1"/>
+          </p:cNvPicPr>
           <p:nvPr/>
-        </p:nvSpPr>
-        <p:spPr>
-          <a:xfrm>
-            <a:off x="9067800" y="3302805"/>
-            <a:ext cx="439544" cy="707886"/>
+        </p:nvPicPr>
+        <p:blipFill>
+          <a:blip r:embed="rId6"/>
+          <a:stretch>
+            <a:fillRect/>
+          </a:stretch>
+        </p:blipFill>
+        <p:spPr>
+          <a:xfrm>
+            <a:off x="4635776" y="2642142"/>
+            <a:ext cx="2275895" cy="2062046"/>
           </a:xfrm>
           <a:prstGeom prst="rect">
             <a:avLst/>
           </a:prstGeom>
-          <a:noFill/>
-        </p:spPr>
-        <p:txBody>
-          <a:bodyPr wrap="none" rtlCol="0">
-            <a:spAutoFit/>
-          </a:bodyPr>
-          <a:lstStyle/>
-          <a:p>
-            <a:r>
-              <a:rPr lang="en-NZ" sz="4000" b="1" dirty="0">
-                <a:solidFill>
-                  <a:srgbClr val="FF0000"/>
-                </a:solidFill>
-              </a:rPr>
-              <a:t>*</a:t>
-            </a:r>
-            <a:endParaRPr lang="en-GB" sz="4000" b="1" dirty="0">
-              <a:solidFill>
-                <a:srgbClr val="FF0000"/>
-              </a:solidFill>
-            </a:endParaRPr>
-          </a:p>
-        </p:txBody>
-      </p:sp>
-      <p:sp>
-        <p:nvSpPr>
-          <p:cNvPr id="9" name="TextBox 8">
-            <a:extLst>
-              <a:ext uri="{FF2B5EF4-FFF2-40B4-BE49-F238E27FC236}">
-                <a16:creationId xmlns:a16="http://schemas.microsoft.com/office/drawing/2014/main" id="{5534C4E7-B50E-4489-8898-D83C0DA96F97}"/>
-              </a:ext>
-            </a:extLst>
-          </p:cNvPr>
-          <p:cNvSpPr txBox="1"/>
+        </p:spPr>
+      </p:pic>
+      <p:pic>
+        <p:nvPicPr>
+          <p:cNvPr id="9" name="Picture 8">
+            <a:extLst>
+              <a:ext uri="{FF2B5EF4-FFF2-40B4-BE49-F238E27FC236}">
+                <a16:creationId xmlns:a16="http://schemas.microsoft.com/office/drawing/2014/main" id="{611A8E4F-F107-49CB-A86C-3CE576B6594E}"/>
+              </a:ext>
+            </a:extLst>
+          </p:cNvPr>
+          <p:cNvPicPr>
+            <a:picLocks noChangeAspect="1"/>
+          </p:cNvPicPr>
           <p:nvPr/>
-        </p:nvSpPr>
-        <p:spPr>
-          <a:xfrm>
-            <a:off x="4094356" y="3371385"/>
-            <a:ext cx="439544" cy="707886"/>
+        </p:nvPicPr>
+        <p:blipFill>
+          <a:blip r:embed="rId7"/>
+          <a:stretch>
+            <a:fillRect/>
+          </a:stretch>
+        </p:blipFill>
+        <p:spPr>
+          <a:xfrm>
+            <a:off x="88324" y="2699580"/>
+            <a:ext cx="2199789" cy="2017215"/>
           </a:xfrm>
           <a:prstGeom prst="rect">
             <a:avLst/>
           </a:prstGeom>
-          <a:noFill/>
-        </p:spPr>
-        <p:txBody>
-          <a:bodyPr wrap="none" rtlCol="0">
-            <a:spAutoFit/>
-          </a:bodyPr>
-          <a:lstStyle/>
-          <a:p>
-            <a:r>
-              <a:rPr lang="en-NZ" sz="4000" b="1" dirty="0">
-                <a:solidFill>
-                  <a:srgbClr val="FF0000"/>
-                </a:solidFill>
-              </a:rPr>
-              <a:t>*</a:t>
-            </a:r>
-            <a:endParaRPr lang="en-GB" sz="4000" b="1" dirty="0">
-              <a:solidFill>
-                <a:srgbClr val="FF0000"/>
-              </a:solidFill>
-            </a:endParaRPr>
-          </a:p>
-        </p:txBody>
-      </p:sp>
-      <p:sp>
-        <p:nvSpPr>
-          <p:cNvPr id="10" name="TextBox 9">
-            <a:extLst>
-              <a:ext uri="{FF2B5EF4-FFF2-40B4-BE49-F238E27FC236}">
-                <a16:creationId xmlns:a16="http://schemas.microsoft.com/office/drawing/2014/main" id="{0DDA503C-FD9C-496B-9188-01B1F5D36071}"/>
-              </a:ext>
-            </a:extLst>
-          </p:cNvPr>
-          <p:cNvSpPr txBox="1"/>
+        </p:spPr>
+      </p:pic>
+      <p:pic>
+        <p:nvPicPr>
+          <p:cNvPr id="12" name="Picture 11">
+            <a:extLst>
+              <a:ext uri="{FF2B5EF4-FFF2-40B4-BE49-F238E27FC236}">
+                <a16:creationId xmlns:a16="http://schemas.microsoft.com/office/drawing/2014/main" id="{8C9FBEA2-1726-40D3-953F-668829D2E228}"/>
+              </a:ext>
+            </a:extLst>
+          </p:cNvPr>
+          <p:cNvPicPr>
+            <a:picLocks noChangeAspect="1"/>
+          </p:cNvPicPr>
           <p:nvPr/>
-        </p:nvSpPr>
-        <p:spPr>
-          <a:xfrm>
-            <a:off x="10190356" y="1264920"/>
-            <a:ext cx="439544" cy="707886"/>
+        </p:nvPicPr>
+        <p:blipFill>
+          <a:blip r:embed="rId8"/>
+          <a:stretch>
+            <a:fillRect/>
+          </a:stretch>
+        </p:blipFill>
+        <p:spPr>
+          <a:xfrm>
+            <a:off x="4635775" y="4801747"/>
+            <a:ext cx="2199789" cy="2043645"/>
           </a:xfrm>
           <a:prstGeom prst="rect">
             <a:avLst/>
           </a:prstGeom>
-          <a:noFill/>
-        </p:spPr>
-        <p:txBody>
-          <a:bodyPr wrap="none" rtlCol="0">
-            <a:spAutoFit/>
-          </a:bodyPr>
-          <a:lstStyle/>
-          <a:p>
-            <a:r>
-              <a:rPr lang="en-NZ" sz="4000" b="1" dirty="0">
-                <a:solidFill>
-                  <a:srgbClr val="FF0000"/>
-                </a:solidFill>
-              </a:rPr>
-              <a:t>*</a:t>
-            </a:r>
-            <a:endParaRPr lang="en-GB" sz="4000" b="1" dirty="0">
-              <a:solidFill>
-                <a:srgbClr val="FF0000"/>
-              </a:solidFill>
-            </a:endParaRPr>
-          </a:p>
-        </p:txBody>
-      </p:sp>
-      <p:sp>
-        <p:nvSpPr>
-          <p:cNvPr id="11" name="TextBox 10">
-            <a:extLst>
-              <a:ext uri="{FF2B5EF4-FFF2-40B4-BE49-F238E27FC236}">
-                <a16:creationId xmlns:a16="http://schemas.microsoft.com/office/drawing/2014/main" id="{5CC7CFA0-EA41-46AE-9483-414E021ED28C}"/>
-              </a:ext>
-            </a:extLst>
-          </p:cNvPr>
-          <p:cNvSpPr txBox="1"/>
+        </p:spPr>
+      </p:pic>
+      <p:pic>
+        <p:nvPicPr>
+          <p:cNvPr id="13" name="Picture 12">
+            <a:extLst>
+              <a:ext uri="{FF2B5EF4-FFF2-40B4-BE49-F238E27FC236}">
+                <a16:creationId xmlns:a16="http://schemas.microsoft.com/office/drawing/2014/main" id="{D5BF4313-5326-4470-804E-1A4974D361E1}"/>
+              </a:ext>
+            </a:extLst>
+          </p:cNvPr>
+          <p:cNvPicPr>
+            <a:picLocks noChangeAspect="1"/>
+          </p:cNvPicPr>
           <p:nvPr/>
-        </p:nvSpPr>
-        <p:spPr>
-          <a:xfrm>
-            <a:off x="5436684" y="3371385"/>
-            <a:ext cx="439544" cy="707886"/>
+        </p:nvPicPr>
+        <p:blipFill>
+          <a:blip r:embed="rId9"/>
+          <a:stretch>
+            <a:fillRect/>
+          </a:stretch>
+        </p:blipFill>
+        <p:spPr>
+          <a:xfrm>
+            <a:off x="7024711" y="455317"/>
+            <a:ext cx="2202478" cy="2029735"/>
           </a:xfrm>
           <a:prstGeom prst="rect">
             <a:avLst/>
           </a:prstGeom>
-          <a:noFill/>
-        </p:spPr>
-        <p:txBody>
-          <a:bodyPr wrap="none" rtlCol="0">
-            <a:spAutoFit/>
-          </a:bodyPr>
-          <a:lstStyle/>
-          <a:p>
-            <a:r>
-              <a:rPr lang="en-NZ" sz="4000" b="1" dirty="0">
-                <a:solidFill>
-                  <a:srgbClr val="FF0000"/>
-                </a:solidFill>
-              </a:rPr>
-              <a:t>*</a:t>
-            </a:r>
-            <a:endParaRPr lang="en-GB" sz="4000" b="1" dirty="0">
-              <a:solidFill>
-                <a:srgbClr val="FF0000"/>
-              </a:solidFill>
-            </a:endParaRPr>
-          </a:p>
-        </p:txBody>
-      </p:sp>
-      <p:sp>
-        <p:nvSpPr>
-          <p:cNvPr id="12" name="TextBox 11">
-            <a:extLst>
-              <a:ext uri="{FF2B5EF4-FFF2-40B4-BE49-F238E27FC236}">
-                <a16:creationId xmlns:a16="http://schemas.microsoft.com/office/drawing/2014/main" id="{8E3EF513-AD3B-4458-99AE-5488173F9B26}"/>
-              </a:ext>
-            </a:extLst>
-          </p:cNvPr>
-          <p:cNvSpPr txBox="1"/>
+        </p:spPr>
+      </p:pic>
+      <p:pic>
+        <p:nvPicPr>
+          <p:cNvPr id="3" name="Picture 2">
+            <a:extLst>
+              <a:ext uri="{FF2B5EF4-FFF2-40B4-BE49-F238E27FC236}">
+                <a16:creationId xmlns:a16="http://schemas.microsoft.com/office/drawing/2014/main" id="{9CD36BFD-C338-4C51-816E-58CA5BA5D4C8}"/>
+              </a:ext>
+            </a:extLst>
+          </p:cNvPr>
+          <p:cNvPicPr>
+            <a:picLocks noChangeAspect="1"/>
+          </p:cNvPicPr>
           <p:nvPr/>
-        </p:nvSpPr>
-        <p:spPr>
-          <a:xfrm>
-            <a:off x="1752600" y="1264920"/>
-            <a:ext cx="439544" cy="707886"/>
+        </p:nvPicPr>
+        <p:blipFill>
+          <a:blip r:embed="rId10"/>
+          <a:stretch>
+            <a:fillRect/>
+          </a:stretch>
+        </p:blipFill>
+        <p:spPr>
+          <a:xfrm>
+            <a:off x="2288113" y="2642141"/>
+            <a:ext cx="2347662" cy="2106876"/>
           </a:xfrm>
           <a:prstGeom prst="rect">
             <a:avLst/>
           </a:prstGeom>
-          <a:noFill/>
-        </p:spPr>
-        <p:txBody>
-          <a:bodyPr wrap="none" rtlCol="0">
-            <a:spAutoFit/>
-          </a:bodyPr>
-          <a:lstStyle/>
-          <a:p>
-            <a:r>
-              <a:rPr lang="en-NZ" sz="4000" b="1" dirty="0">
-                <a:solidFill>
-                  <a:srgbClr val="FF0000"/>
-                </a:solidFill>
-              </a:rPr>
-              <a:t>*</a:t>
-            </a:r>
-            <a:endParaRPr lang="en-GB" sz="4000" b="1" dirty="0">
-              <a:solidFill>
-                <a:srgbClr val="FF0000"/>
-              </a:solidFill>
-            </a:endParaRPr>
-          </a:p>
-        </p:txBody>
-      </p:sp>
+        </p:spPr>
+      </p:pic>
+      <p:pic>
+        <p:nvPicPr>
+          <p:cNvPr id="5" name="Picture 4">
+            <a:extLst>
+              <a:ext uri="{FF2B5EF4-FFF2-40B4-BE49-F238E27FC236}">
+                <a16:creationId xmlns:a16="http://schemas.microsoft.com/office/drawing/2014/main" id="{F3A28C97-FC86-4392-9192-A00393915C9E}"/>
+              </a:ext>
+            </a:extLst>
+          </p:cNvPr>
+          <p:cNvPicPr>
+            <a:picLocks noChangeAspect="1"/>
+          </p:cNvPicPr>
+          <p:nvPr/>
+        </p:nvPicPr>
+        <p:blipFill>
+          <a:blip r:embed="rId11"/>
+          <a:stretch>
+            <a:fillRect/>
+          </a:stretch>
+        </p:blipFill>
+        <p:spPr>
+          <a:xfrm>
+            <a:off x="9290770" y="454735"/>
+            <a:ext cx="2436331" cy="2017214"/>
+          </a:xfrm>
+          <a:prstGeom prst="rect">
+            <a:avLst/>
+          </a:prstGeom>
+        </p:spPr>
+      </p:pic>
     </p:spTree>
     <p:extLst>
       <p:ext uri="{BB962C8B-B14F-4D97-AF65-F5344CB8AC3E}">
-        <p14:creationId xmlns:p14="http://schemas.microsoft.com/office/powerpoint/2010/main" val="3970877698"/>
+        <p14:creationId xmlns:p14="http://schemas.microsoft.com/office/powerpoint/2010/main" val="1920508232"/>
       </p:ext>
     </p:extLst>
   </p:cSld>
@@ -6091,81 +6410,10 @@
       </p:grpSpPr>
       <p:pic>
         <p:nvPicPr>
-          <p:cNvPr id="5" name="Picture 4">
-            <a:extLst>
-              <a:ext uri="{FF2B5EF4-FFF2-40B4-BE49-F238E27FC236}">
-                <a16:creationId xmlns:a16="http://schemas.microsoft.com/office/drawing/2014/main" id="{2BAC2202-805B-4DC3-A3C7-C9CC97599E10}"/>
-              </a:ext>
-            </a:extLst>
-          </p:cNvPr>
-          <p:cNvPicPr>
-            <a:picLocks noChangeAspect="1"/>
-          </p:cNvPicPr>
-          <p:nvPr/>
-        </p:nvPicPr>
-        <p:blipFill rotWithShape="1">
-          <a:blip r:embed="rId2">
-            <a:extLst>
-              <a:ext uri="{28A0092B-C50C-407E-A947-70E740481C1C}">
-                <a14:useLocalDpi xmlns:a14="http://schemas.microsoft.com/office/drawing/2010/main" val="0"/>
-              </a:ext>
-            </a:extLst>
-          </a:blip>
-          <a:srcRect r="54446"/>
-          <a:stretch/>
-        </p:blipFill>
-        <p:spPr>
-          <a:xfrm>
-            <a:off x="76201" y="1140496"/>
-            <a:ext cx="2982682" cy="3890687"/>
-          </a:xfrm>
-          <a:prstGeom prst="rect">
-            <a:avLst/>
-          </a:prstGeom>
-        </p:spPr>
-      </p:pic>
-      <p:sp>
-        <p:nvSpPr>
-          <p:cNvPr id="6" name="TextBox 5">
-            <a:extLst>
-              <a:ext uri="{FF2B5EF4-FFF2-40B4-BE49-F238E27FC236}">
-                <a16:creationId xmlns:a16="http://schemas.microsoft.com/office/drawing/2014/main" id="{108BEBBF-0CC4-49CA-B7B2-9D4B22059FB3}"/>
-              </a:ext>
-            </a:extLst>
-          </p:cNvPr>
-          <p:cNvSpPr txBox="1"/>
-          <p:nvPr/>
-        </p:nvSpPr>
-        <p:spPr>
-          <a:xfrm>
-            <a:off x="213989" y="493362"/>
-            <a:ext cx="10571201" cy="369332"/>
-          </a:xfrm>
-          <a:prstGeom prst="rect">
-            <a:avLst/>
-          </a:prstGeom>
-          <a:noFill/>
-        </p:spPr>
-        <p:txBody>
-          <a:bodyPr wrap="square" rtlCol="0">
-            <a:spAutoFit/>
-          </a:bodyPr>
-          <a:lstStyle/>
-          <a:p>
-            <a:r>
-              <a:rPr lang="en-NZ" b="1" dirty="0"/>
-              <a:t>Handling abnormally high distance values in distance matrix (test on 20% subset ~5600 rows)</a:t>
-            </a:r>
-            <a:endParaRPr lang="en-GB" b="1" dirty="0"/>
-          </a:p>
-        </p:txBody>
-      </p:sp>
-      <p:pic>
-        <p:nvPicPr>
-          <p:cNvPr id="2" name="Picture 1">
-            <a:extLst>
-              <a:ext uri="{FF2B5EF4-FFF2-40B4-BE49-F238E27FC236}">
-                <a16:creationId xmlns:a16="http://schemas.microsoft.com/office/drawing/2014/main" id="{0FA7BFA3-93B6-4DD8-BF5C-5441A83F4695}"/>
+          <p:cNvPr id="4" name="Picture 3">
+            <a:extLst>
+              <a:ext uri="{FF2B5EF4-FFF2-40B4-BE49-F238E27FC236}">
+                <a16:creationId xmlns:a16="http://schemas.microsoft.com/office/drawing/2014/main" id="{63EBF888-F686-4865-8199-EA554F7C97B8}"/>
               </a:ext>
             </a:extLst>
           </p:cNvPr>
@@ -6175,15 +6423,15 @@
           <p:nvPr/>
         </p:nvPicPr>
         <p:blipFill>
-          <a:blip r:embed="rId3"/>
+          <a:blip r:embed="rId2"/>
           <a:stretch>
             <a:fillRect/>
           </a:stretch>
         </p:blipFill>
         <p:spPr>
           <a:xfrm>
-            <a:off x="6041565" y="1140496"/>
-            <a:ext cx="2873800" cy="3841079"/>
+            <a:off x="0" y="455497"/>
+            <a:ext cx="12192000" cy="6402503"/>
           </a:xfrm>
           <a:prstGeom prst="rect">
             <a:avLst/>
@@ -6192,10 +6440,10 @@
       </p:pic>
       <p:sp>
         <p:nvSpPr>
-          <p:cNvPr id="8" name="TextBox 7">
-            <a:extLst>
-              <a:ext uri="{FF2B5EF4-FFF2-40B4-BE49-F238E27FC236}">
-                <a16:creationId xmlns:a16="http://schemas.microsoft.com/office/drawing/2014/main" id="{846D2B52-EEE0-4075-A79B-6528659C5996}"/>
+          <p:cNvPr id="5" name="TextBox 4">
+            <a:extLst>
+              <a:ext uri="{FF2B5EF4-FFF2-40B4-BE49-F238E27FC236}">
+                <a16:creationId xmlns:a16="http://schemas.microsoft.com/office/drawing/2014/main" id="{C0EDD6DF-DB99-4EE6-A5BF-CE0D62FBE84E}"/>
               </a:ext>
             </a:extLst>
           </p:cNvPr>
@@ -6204,351 +6452,32 @@
         </p:nvSpPr>
         <p:spPr>
           <a:xfrm>
-            <a:off x="234218" y="4981575"/>
-            <a:ext cx="2099408" cy="369332"/>
+            <a:off x="0" y="-29260"/>
+            <a:ext cx="12191999" cy="461665"/>
           </a:xfrm>
           <a:prstGeom prst="rect">
             <a:avLst/>
           </a:prstGeom>
-          <a:solidFill>
-            <a:schemeClr val="bg1"/>
-          </a:solidFill>
-        </p:spPr>
-        <p:txBody>
-          <a:bodyPr wrap="square" lIns="0" tIns="0" rIns="0" bIns="0" rtlCol="0">
+          <a:noFill/>
+        </p:spPr>
+        <p:txBody>
+          <a:bodyPr wrap="square" rtlCol="0">
             <a:spAutoFit/>
           </a:bodyPr>
           <a:lstStyle/>
           <a:p>
-            <a:pPr algn="ctr"/>
-            <a:r>
-              <a:rPr lang="en-NZ" sz="1200" b="1" dirty="0"/>
-              <a:t>1) Original </a:t>
-            </a:r>
-          </a:p>
-          <a:p>
-            <a:pPr algn="ctr"/>
-            <a:r>
-              <a:rPr lang="en-NZ" sz="1200" b="1" dirty="0"/>
-              <a:t>(Minimum Spanning Tree)</a:t>
-            </a:r>
-            <a:endParaRPr lang="en-GB" sz="1200" b="1" dirty="0"/>
-          </a:p>
-        </p:txBody>
-      </p:sp>
-      <p:sp>
-        <p:nvSpPr>
-          <p:cNvPr id="9" name="TextBox 8">
-            <a:extLst>
-              <a:ext uri="{FF2B5EF4-FFF2-40B4-BE49-F238E27FC236}">
-                <a16:creationId xmlns:a16="http://schemas.microsoft.com/office/drawing/2014/main" id="{159ECB6D-8197-42C9-9B08-115C0CB6E983}"/>
-              </a:ext>
-            </a:extLst>
-          </p:cNvPr>
-          <p:cNvSpPr txBox="1"/>
-          <p:nvPr/>
-        </p:nvSpPr>
-        <p:spPr>
-          <a:xfrm>
-            <a:off x="3275407" y="4981575"/>
-            <a:ext cx="1982394" cy="553998"/>
-          </a:xfrm>
-          <a:prstGeom prst="rect">
-            <a:avLst/>
-          </a:prstGeom>
-          <a:solidFill>
-            <a:schemeClr val="bg1"/>
-          </a:solidFill>
-        </p:spPr>
-        <p:txBody>
-          <a:bodyPr wrap="square" lIns="0" tIns="0" rIns="0" bIns="0" rtlCol="0">
-            <a:spAutoFit/>
-          </a:bodyPr>
-          <a:lstStyle/>
-          <a:p>
-            <a:pPr algn="ctr"/>
-            <a:r>
-              <a:rPr lang="en-NZ" sz="1200" b="1" dirty="0"/>
-              <a:t>2) Filter out large values in </a:t>
-            </a:r>
-            <a:r>
-              <a:rPr lang="en-NZ" sz="1200" b="1" dirty="0" err="1"/>
-              <a:t>cPC</a:t>
-            </a:r>
-            <a:r>
-              <a:rPr lang="en-NZ" sz="1200" b="1" dirty="0"/>
-              <a:t> space (set values above 3sd as the median)</a:t>
-            </a:r>
-            <a:endParaRPr lang="en-GB" sz="1200" b="1" dirty="0"/>
-          </a:p>
-        </p:txBody>
-      </p:sp>
-      <p:sp>
-        <p:nvSpPr>
-          <p:cNvPr id="10" name="TextBox 9">
-            <a:extLst>
-              <a:ext uri="{FF2B5EF4-FFF2-40B4-BE49-F238E27FC236}">
-                <a16:creationId xmlns:a16="http://schemas.microsoft.com/office/drawing/2014/main" id="{D67F0F88-F469-4158-8F13-A89F610E665A}"/>
-              </a:ext>
-            </a:extLst>
-          </p:cNvPr>
-          <p:cNvSpPr txBox="1"/>
-          <p:nvPr/>
-        </p:nvSpPr>
-        <p:spPr>
-          <a:xfrm>
-            <a:off x="6135621" y="4981575"/>
-            <a:ext cx="2227330" cy="369332"/>
-          </a:xfrm>
-          <a:prstGeom prst="rect">
-            <a:avLst/>
-          </a:prstGeom>
-          <a:solidFill>
-            <a:schemeClr val="bg1"/>
-          </a:solidFill>
-        </p:spPr>
-        <p:txBody>
-          <a:bodyPr wrap="square" lIns="0" tIns="0" rIns="0" bIns="0" rtlCol="0">
-            <a:spAutoFit/>
-          </a:bodyPr>
-          <a:lstStyle/>
-          <a:p>
-            <a:pPr algn="ctr"/>
-            <a:r>
-              <a:rPr lang="en-NZ" sz="1200" b="1" dirty="0"/>
-              <a:t>3) Shortest Path Tree Instead of Minimum Spanning Tree</a:t>
-            </a:r>
-            <a:endParaRPr lang="en-GB" sz="1200" b="1" dirty="0"/>
-          </a:p>
-        </p:txBody>
-      </p:sp>
-      <p:sp>
-        <p:nvSpPr>
-          <p:cNvPr id="11" name="TextBox 10">
-            <a:extLst>
-              <a:ext uri="{FF2B5EF4-FFF2-40B4-BE49-F238E27FC236}">
-                <a16:creationId xmlns:a16="http://schemas.microsoft.com/office/drawing/2014/main" id="{8DF388B5-B151-430B-A09E-940AEAB6AF19}"/>
-              </a:ext>
-            </a:extLst>
-          </p:cNvPr>
-          <p:cNvSpPr txBox="1"/>
-          <p:nvPr/>
-        </p:nvSpPr>
-        <p:spPr>
-          <a:xfrm>
-            <a:off x="9540280" y="4981575"/>
-            <a:ext cx="1356320" cy="369332"/>
-          </a:xfrm>
-          <a:prstGeom prst="rect">
-            <a:avLst/>
-          </a:prstGeom>
-          <a:solidFill>
-            <a:schemeClr val="bg1"/>
-          </a:solidFill>
-        </p:spPr>
-        <p:txBody>
-          <a:bodyPr wrap="square" lIns="0" tIns="0" rIns="0" bIns="0" rtlCol="0">
-            <a:spAutoFit/>
-          </a:bodyPr>
-          <a:lstStyle/>
-          <a:p>
-            <a:pPr algn="ctr"/>
-            <a:r>
-              <a:rPr lang="en-NZ" sz="1200" b="1" dirty="0"/>
-              <a:t>4) #2 (filter) + #3 (use shortest path tree)</a:t>
-            </a:r>
-            <a:endParaRPr lang="en-GB" sz="1200" b="1" dirty="0"/>
-          </a:p>
-        </p:txBody>
-      </p:sp>
-      <p:sp>
-        <p:nvSpPr>
-          <p:cNvPr id="12" name="TextBox 11">
-            <a:extLst>
-              <a:ext uri="{FF2B5EF4-FFF2-40B4-BE49-F238E27FC236}">
-                <a16:creationId xmlns:a16="http://schemas.microsoft.com/office/drawing/2014/main" id="{E23BCCE6-D4B3-49A4-8702-D3E432463990}"/>
-              </a:ext>
-            </a:extLst>
-          </p:cNvPr>
-          <p:cNvSpPr txBox="1"/>
-          <p:nvPr/>
-        </p:nvSpPr>
-        <p:spPr>
-          <a:xfrm>
-            <a:off x="4690862" y="5810640"/>
-            <a:ext cx="4849418" cy="553998"/>
-          </a:xfrm>
-          <a:prstGeom prst="rect">
-            <a:avLst/>
-          </a:prstGeom>
-          <a:solidFill>
-            <a:schemeClr val="bg1"/>
-          </a:solidFill>
-        </p:spPr>
-        <p:txBody>
-          <a:bodyPr wrap="square" lIns="0" tIns="0" rIns="0" bIns="0" rtlCol="0">
-            <a:spAutoFit/>
-          </a:bodyPr>
-          <a:lstStyle/>
-          <a:p>
-            <a:r>
-              <a:rPr lang="en-NZ" sz="1200" dirty="0">
-                <a:solidFill>
-                  <a:srgbClr val="FF0000"/>
-                </a:solidFill>
-              </a:rPr>
-              <a:t>Note that #2 is currently flawed as we cannot just reassign these abnormally large values in </a:t>
-            </a:r>
-            <a:r>
-              <a:rPr lang="en-NZ" sz="1200" dirty="0" err="1">
-                <a:solidFill>
-                  <a:srgbClr val="FF0000"/>
-                </a:solidFill>
-              </a:rPr>
-              <a:t>cPC</a:t>
-            </a:r>
-            <a:r>
-              <a:rPr lang="en-NZ" sz="1200" dirty="0">
-                <a:solidFill>
-                  <a:srgbClr val="FF0000"/>
-                </a:solidFill>
-              </a:rPr>
-              <a:t> space with the median </a:t>
-            </a:r>
-            <a:r>
-              <a:rPr lang="en-NZ" sz="1200">
-                <a:solidFill>
-                  <a:srgbClr val="FF0000"/>
-                </a:solidFill>
-              </a:rPr>
-              <a:t>(around 0), </a:t>
-            </a:r>
-            <a:r>
-              <a:rPr lang="en-NZ" sz="1200" dirty="0">
-                <a:solidFill>
-                  <a:srgbClr val="FF0000"/>
-                </a:solidFill>
-              </a:rPr>
-              <a:t>they should be instead replaced somehow by their next closest node ….</a:t>
-            </a:r>
-            <a:endParaRPr lang="en-GB" sz="1200" dirty="0">
-              <a:solidFill>
-                <a:srgbClr val="FF0000"/>
-              </a:solidFill>
-            </a:endParaRPr>
-          </a:p>
-        </p:txBody>
-      </p:sp>
-      <p:cxnSp>
-        <p:nvCxnSpPr>
-          <p:cNvPr id="17" name="Connector: Elbow 16">
-            <a:extLst>
-              <a:ext uri="{FF2B5EF4-FFF2-40B4-BE49-F238E27FC236}">
-                <a16:creationId xmlns:a16="http://schemas.microsoft.com/office/drawing/2014/main" id="{2943542E-98E6-4223-8034-821A97495596}"/>
-              </a:ext>
-            </a:extLst>
-          </p:cNvPr>
-          <p:cNvCxnSpPr>
-            <a:cxnSpLocks/>
-            <a:stCxn id="12" idx="1"/>
-            <a:endCxn id="9" idx="2"/>
-          </p:cNvCxnSpPr>
-          <p:nvPr/>
-        </p:nvCxnSpPr>
-        <p:spPr>
-          <a:xfrm rot="10800000">
-            <a:off x="4266604" y="5535573"/>
-            <a:ext cx="424258" cy="552066"/>
-          </a:xfrm>
-          <a:prstGeom prst="bentConnector2">
-            <a:avLst/>
-          </a:prstGeom>
-          <a:ln>
-            <a:solidFill>
-              <a:srgbClr val="FF0000"/>
-            </a:solidFill>
-            <a:tailEnd type="triangle"/>
-          </a:ln>
-        </p:spPr>
-        <p:style>
-          <a:lnRef idx="1">
-            <a:schemeClr val="accent1"/>
-          </a:lnRef>
-          <a:fillRef idx="0">
-            <a:schemeClr val="accent1"/>
-          </a:fillRef>
-          <a:effectRef idx="0">
-            <a:schemeClr val="accent1"/>
-          </a:effectRef>
-          <a:fontRef idx="minor">
-            <a:schemeClr val="tx1"/>
-          </a:fontRef>
-        </p:style>
-      </p:cxnSp>
-      <p:pic>
-        <p:nvPicPr>
-          <p:cNvPr id="15" name="Picture 14">
-            <a:extLst>
-              <a:ext uri="{FF2B5EF4-FFF2-40B4-BE49-F238E27FC236}">
-                <a16:creationId xmlns:a16="http://schemas.microsoft.com/office/drawing/2014/main" id="{D8C13DE0-0AB8-4F7C-89AB-3778BEAD9361}"/>
-              </a:ext>
-            </a:extLst>
-          </p:cNvPr>
-          <p:cNvPicPr>
-            <a:picLocks noChangeAspect="1"/>
-          </p:cNvPicPr>
-          <p:nvPr/>
-        </p:nvPicPr>
-        <p:blipFill>
-          <a:blip r:embed="rId4"/>
-          <a:stretch>
-            <a:fillRect/>
-          </a:stretch>
-        </p:blipFill>
-        <p:spPr>
-          <a:xfrm>
-            <a:off x="3058883" y="1140496"/>
-            <a:ext cx="2873800" cy="3841079"/>
-          </a:xfrm>
-          <a:prstGeom prst="rect">
-            <a:avLst/>
-          </a:prstGeom>
-        </p:spPr>
-      </p:pic>
-      <p:pic>
-        <p:nvPicPr>
-          <p:cNvPr id="19" name="Picture 18">
-            <a:extLst>
-              <a:ext uri="{FF2B5EF4-FFF2-40B4-BE49-F238E27FC236}">
-                <a16:creationId xmlns:a16="http://schemas.microsoft.com/office/drawing/2014/main" id="{F6139D21-7BD8-451D-8A9D-88C6155831EF}"/>
-              </a:ext>
-            </a:extLst>
-          </p:cNvPr>
-          <p:cNvPicPr>
-            <a:picLocks noChangeAspect="1"/>
-          </p:cNvPicPr>
-          <p:nvPr/>
-        </p:nvPicPr>
-        <p:blipFill>
-          <a:blip r:embed="rId5"/>
-          <a:stretch>
-            <a:fillRect/>
-          </a:stretch>
-        </p:blipFill>
-        <p:spPr>
-          <a:xfrm>
-            <a:off x="9009422" y="1144938"/>
-            <a:ext cx="2873800" cy="3836637"/>
-          </a:xfrm>
-          <a:prstGeom prst="rect">
-            <a:avLst/>
-          </a:prstGeom>
-        </p:spPr>
-      </p:pic>
+            <a:r>
+              <a:rPr lang="en-NZ" sz="2400" b="1" dirty="0"/>
+              <a:t>Distribution of Values for each contrastive principle component in a 20% subset run</a:t>
+            </a:r>
+            <a:endParaRPr lang="en-GB" sz="2400" b="1" dirty="0"/>
+          </a:p>
+        </p:txBody>
+      </p:sp>
     </p:spTree>
     <p:extLst>
       <p:ext uri="{BB962C8B-B14F-4D97-AF65-F5344CB8AC3E}">
-        <p14:creationId xmlns:p14="http://schemas.microsoft.com/office/powerpoint/2010/main" val="3573502216"/>
+        <p14:creationId xmlns:p14="http://schemas.microsoft.com/office/powerpoint/2010/main" val="3970877698"/>
       </p:ext>
     </p:extLst>
   </p:cSld>
@@ -6580,7 +6509,78 @@
           <p:cNvPr id="5" name="Picture 4">
             <a:extLst>
               <a:ext uri="{FF2B5EF4-FFF2-40B4-BE49-F238E27FC236}">
-                <a16:creationId xmlns:a16="http://schemas.microsoft.com/office/drawing/2014/main" id="{57F5CD76-A121-47E7-8D5C-78EB781D67BC}"/>
+                <a16:creationId xmlns:a16="http://schemas.microsoft.com/office/drawing/2014/main" id="{2BAC2202-805B-4DC3-A3C7-C9CC97599E10}"/>
+              </a:ext>
+            </a:extLst>
+          </p:cNvPr>
+          <p:cNvPicPr>
+            <a:picLocks noChangeAspect="1"/>
+          </p:cNvPicPr>
+          <p:nvPr/>
+        </p:nvPicPr>
+        <p:blipFill rotWithShape="1">
+          <a:blip r:embed="rId2">
+            <a:extLst>
+              <a:ext uri="{28A0092B-C50C-407E-A947-70E740481C1C}">
+                <a14:useLocalDpi xmlns:a14="http://schemas.microsoft.com/office/drawing/2010/main" val="0"/>
+              </a:ext>
+            </a:extLst>
+          </a:blip>
+          <a:srcRect r="54446"/>
+          <a:stretch/>
+        </p:blipFill>
+        <p:spPr>
+          <a:xfrm>
+            <a:off x="76201" y="1140496"/>
+            <a:ext cx="2982682" cy="3890687"/>
+          </a:xfrm>
+          <a:prstGeom prst="rect">
+            <a:avLst/>
+          </a:prstGeom>
+        </p:spPr>
+      </p:pic>
+      <p:sp>
+        <p:nvSpPr>
+          <p:cNvPr id="6" name="TextBox 5">
+            <a:extLst>
+              <a:ext uri="{FF2B5EF4-FFF2-40B4-BE49-F238E27FC236}">
+                <a16:creationId xmlns:a16="http://schemas.microsoft.com/office/drawing/2014/main" id="{108BEBBF-0CC4-49CA-B7B2-9D4B22059FB3}"/>
+              </a:ext>
+            </a:extLst>
+          </p:cNvPr>
+          <p:cNvSpPr txBox="1"/>
+          <p:nvPr/>
+        </p:nvSpPr>
+        <p:spPr>
+          <a:xfrm>
+            <a:off x="213989" y="493362"/>
+            <a:ext cx="10571201" cy="369332"/>
+          </a:xfrm>
+          <a:prstGeom prst="rect">
+            <a:avLst/>
+          </a:prstGeom>
+          <a:noFill/>
+        </p:spPr>
+        <p:txBody>
+          <a:bodyPr wrap="square" rtlCol="0">
+            <a:spAutoFit/>
+          </a:bodyPr>
+          <a:lstStyle/>
+          <a:p>
+            <a:r>
+              <a:rPr lang="en-NZ" b="1" dirty="0"/>
+              <a:t>Handling abnormally high distance values in distance matrix (test on 20% subset ~5600 rows)</a:t>
+            </a:r>
+            <a:endParaRPr lang="en-GB" b="1" dirty="0"/>
+          </a:p>
+        </p:txBody>
+      </p:sp>
+      <p:pic>
+        <p:nvPicPr>
+          <p:cNvPr id="2" name="Picture 1">
+            <a:extLst>
+              <a:ext uri="{FF2B5EF4-FFF2-40B4-BE49-F238E27FC236}">
+                <a16:creationId xmlns:a16="http://schemas.microsoft.com/office/drawing/2014/main" id="{0FA7BFA3-93B6-4DD8-BF5C-5441A83F4695}"/>
               </a:ext>
             </a:extLst>
           </p:cNvPr>
@@ -6590,21 +6590,15 @@
           <p:nvPr/>
         </p:nvPicPr>
         <p:blipFill>
-          <a:blip r:embed="rId2">
-            <a:extLst>
-              <a:ext uri="{28A0092B-C50C-407E-A947-70E740481C1C}">
-                <a14:useLocalDpi xmlns:a14="http://schemas.microsoft.com/office/drawing/2010/main" val="0"/>
-              </a:ext>
-            </a:extLst>
-          </a:blip>
+          <a:blip r:embed="rId3"/>
           <a:stretch>
             <a:fillRect/>
           </a:stretch>
         </p:blipFill>
         <p:spPr>
           <a:xfrm>
-            <a:off x="0" y="369332"/>
-            <a:ext cx="12192000" cy="6510995"/>
+            <a:off x="6041565" y="1140496"/>
+            <a:ext cx="2873800" cy="3841079"/>
           </a:xfrm>
           <a:prstGeom prst="rect">
             <a:avLst/>
@@ -6613,10 +6607,10 @@
       </p:pic>
       <p:sp>
         <p:nvSpPr>
-          <p:cNvPr id="6" name="TextBox 5">
-            <a:extLst>
-              <a:ext uri="{FF2B5EF4-FFF2-40B4-BE49-F238E27FC236}">
-                <a16:creationId xmlns:a16="http://schemas.microsoft.com/office/drawing/2014/main" id="{979AE2EC-4AA9-4D1C-9817-4D0290540D4D}"/>
+          <p:cNvPr id="8" name="TextBox 7">
+            <a:extLst>
+              <a:ext uri="{FF2B5EF4-FFF2-40B4-BE49-F238E27FC236}">
+                <a16:creationId xmlns:a16="http://schemas.microsoft.com/office/drawing/2014/main" id="{846D2B52-EEE0-4075-A79B-6528659C5996}"/>
               </a:ext>
             </a:extLst>
           </p:cNvPr>
@@ -6625,32 +6619,351 @@
         </p:nvSpPr>
         <p:spPr>
           <a:xfrm>
-            <a:off x="0" y="-9525"/>
-            <a:ext cx="7275589" cy="369332"/>
+            <a:off x="234218" y="4981575"/>
+            <a:ext cx="2099408" cy="369332"/>
           </a:xfrm>
           <a:prstGeom prst="rect">
             <a:avLst/>
           </a:prstGeom>
-          <a:noFill/>
-        </p:spPr>
-        <p:txBody>
-          <a:bodyPr wrap="square" rtlCol="0">
+          <a:solidFill>
+            <a:schemeClr val="bg1"/>
+          </a:solidFill>
+        </p:spPr>
+        <p:txBody>
+          <a:bodyPr wrap="square" lIns="0" tIns="0" rIns="0" bIns="0" rtlCol="0">
             <a:spAutoFit/>
           </a:bodyPr>
           <a:lstStyle/>
           <a:p>
-            <a:r>
-              <a:rPr lang="en-NZ" b="1" dirty="0"/>
-              <a:t>All 10 combination of 10% subset runs</a:t>
-            </a:r>
-            <a:endParaRPr lang="en-GB" b="1" dirty="0"/>
-          </a:p>
-        </p:txBody>
-      </p:sp>
+            <a:pPr algn="ctr"/>
+            <a:r>
+              <a:rPr lang="en-NZ" sz="1200" b="1" dirty="0"/>
+              <a:t>1) Original </a:t>
+            </a:r>
+          </a:p>
+          <a:p>
+            <a:pPr algn="ctr"/>
+            <a:r>
+              <a:rPr lang="en-NZ" sz="1200" b="1" dirty="0"/>
+              <a:t>(Minimum Spanning Tree)</a:t>
+            </a:r>
+            <a:endParaRPr lang="en-GB" sz="1200" b="1" dirty="0"/>
+          </a:p>
+        </p:txBody>
+      </p:sp>
+      <p:sp>
+        <p:nvSpPr>
+          <p:cNvPr id="9" name="TextBox 8">
+            <a:extLst>
+              <a:ext uri="{FF2B5EF4-FFF2-40B4-BE49-F238E27FC236}">
+                <a16:creationId xmlns:a16="http://schemas.microsoft.com/office/drawing/2014/main" id="{159ECB6D-8197-42C9-9B08-115C0CB6E983}"/>
+              </a:ext>
+            </a:extLst>
+          </p:cNvPr>
+          <p:cNvSpPr txBox="1"/>
+          <p:nvPr/>
+        </p:nvSpPr>
+        <p:spPr>
+          <a:xfrm>
+            <a:off x="3275407" y="4981575"/>
+            <a:ext cx="1982394" cy="553998"/>
+          </a:xfrm>
+          <a:prstGeom prst="rect">
+            <a:avLst/>
+          </a:prstGeom>
+          <a:solidFill>
+            <a:schemeClr val="bg1"/>
+          </a:solidFill>
+        </p:spPr>
+        <p:txBody>
+          <a:bodyPr wrap="square" lIns="0" tIns="0" rIns="0" bIns="0" rtlCol="0">
+            <a:spAutoFit/>
+          </a:bodyPr>
+          <a:lstStyle/>
+          <a:p>
+            <a:pPr algn="ctr"/>
+            <a:r>
+              <a:rPr lang="en-NZ" sz="1200" b="1" dirty="0"/>
+              <a:t>2) Filter out large values in </a:t>
+            </a:r>
+            <a:r>
+              <a:rPr lang="en-NZ" sz="1200" b="1" dirty="0" err="1"/>
+              <a:t>cPC</a:t>
+            </a:r>
+            <a:r>
+              <a:rPr lang="en-NZ" sz="1200" b="1" dirty="0"/>
+              <a:t> space (set values above 3sd as the median)</a:t>
+            </a:r>
+            <a:endParaRPr lang="en-GB" sz="1200" b="1" dirty="0"/>
+          </a:p>
+        </p:txBody>
+      </p:sp>
+      <p:sp>
+        <p:nvSpPr>
+          <p:cNvPr id="10" name="TextBox 9">
+            <a:extLst>
+              <a:ext uri="{FF2B5EF4-FFF2-40B4-BE49-F238E27FC236}">
+                <a16:creationId xmlns:a16="http://schemas.microsoft.com/office/drawing/2014/main" id="{D67F0F88-F469-4158-8F13-A89F610E665A}"/>
+              </a:ext>
+            </a:extLst>
+          </p:cNvPr>
+          <p:cNvSpPr txBox="1"/>
+          <p:nvPr/>
+        </p:nvSpPr>
+        <p:spPr>
+          <a:xfrm>
+            <a:off x="6135621" y="4981575"/>
+            <a:ext cx="2227330" cy="369332"/>
+          </a:xfrm>
+          <a:prstGeom prst="rect">
+            <a:avLst/>
+          </a:prstGeom>
+          <a:solidFill>
+            <a:schemeClr val="bg1"/>
+          </a:solidFill>
+        </p:spPr>
+        <p:txBody>
+          <a:bodyPr wrap="square" lIns="0" tIns="0" rIns="0" bIns="0" rtlCol="0">
+            <a:spAutoFit/>
+          </a:bodyPr>
+          <a:lstStyle/>
+          <a:p>
+            <a:pPr algn="ctr"/>
+            <a:r>
+              <a:rPr lang="en-NZ" sz="1200" b="1" dirty="0"/>
+              <a:t>3) Shortest Path Tree Instead of Minimum Spanning Tree</a:t>
+            </a:r>
+            <a:endParaRPr lang="en-GB" sz="1200" b="1" dirty="0"/>
+          </a:p>
+        </p:txBody>
+      </p:sp>
+      <p:sp>
+        <p:nvSpPr>
+          <p:cNvPr id="11" name="TextBox 10">
+            <a:extLst>
+              <a:ext uri="{FF2B5EF4-FFF2-40B4-BE49-F238E27FC236}">
+                <a16:creationId xmlns:a16="http://schemas.microsoft.com/office/drawing/2014/main" id="{8DF388B5-B151-430B-A09E-940AEAB6AF19}"/>
+              </a:ext>
+            </a:extLst>
+          </p:cNvPr>
+          <p:cNvSpPr txBox="1"/>
+          <p:nvPr/>
+        </p:nvSpPr>
+        <p:spPr>
+          <a:xfrm>
+            <a:off x="9540280" y="4981575"/>
+            <a:ext cx="1356320" cy="369332"/>
+          </a:xfrm>
+          <a:prstGeom prst="rect">
+            <a:avLst/>
+          </a:prstGeom>
+          <a:solidFill>
+            <a:schemeClr val="bg1"/>
+          </a:solidFill>
+        </p:spPr>
+        <p:txBody>
+          <a:bodyPr wrap="square" lIns="0" tIns="0" rIns="0" bIns="0" rtlCol="0">
+            <a:spAutoFit/>
+          </a:bodyPr>
+          <a:lstStyle/>
+          <a:p>
+            <a:pPr algn="ctr"/>
+            <a:r>
+              <a:rPr lang="en-NZ" sz="1200" b="1" dirty="0"/>
+              <a:t>4) #2 (filter) + #3 (use shortest path tree)</a:t>
+            </a:r>
+            <a:endParaRPr lang="en-GB" sz="1200" b="1" dirty="0"/>
+          </a:p>
+        </p:txBody>
+      </p:sp>
+      <p:sp>
+        <p:nvSpPr>
+          <p:cNvPr id="12" name="TextBox 11">
+            <a:extLst>
+              <a:ext uri="{FF2B5EF4-FFF2-40B4-BE49-F238E27FC236}">
+                <a16:creationId xmlns:a16="http://schemas.microsoft.com/office/drawing/2014/main" id="{E23BCCE6-D4B3-49A4-8702-D3E432463990}"/>
+              </a:ext>
+            </a:extLst>
+          </p:cNvPr>
+          <p:cNvSpPr txBox="1"/>
+          <p:nvPr/>
+        </p:nvSpPr>
+        <p:spPr>
+          <a:xfrm>
+            <a:off x="4690862" y="5810640"/>
+            <a:ext cx="4849418" cy="553998"/>
+          </a:xfrm>
+          <a:prstGeom prst="rect">
+            <a:avLst/>
+          </a:prstGeom>
+          <a:solidFill>
+            <a:schemeClr val="bg1"/>
+          </a:solidFill>
+        </p:spPr>
+        <p:txBody>
+          <a:bodyPr wrap="square" lIns="0" tIns="0" rIns="0" bIns="0" rtlCol="0">
+            <a:spAutoFit/>
+          </a:bodyPr>
+          <a:lstStyle/>
+          <a:p>
+            <a:r>
+              <a:rPr lang="en-NZ" sz="1200" dirty="0">
+                <a:solidFill>
+                  <a:srgbClr val="FF0000"/>
+                </a:solidFill>
+              </a:rPr>
+              <a:t>Note that #2 is currently flawed as we cannot just reassign these abnormally large values in </a:t>
+            </a:r>
+            <a:r>
+              <a:rPr lang="en-NZ" sz="1200" dirty="0" err="1">
+                <a:solidFill>
+                  <a:srgbClr val="FF0000"/>
+                </a:solidFill>
+              </a:rPr>
+              <a:t>cPC</a:t>
+            </a:r>
+            <a:r>
+              <a:rPr lang="en-NZ" sz="1200" dirty="0">
+                <a:solidFill>
+                  <a:srgbClr val="FF0000"/>
+                </a:solidFill>
+              </a:rPr>
+              <a:t> space with the median </a:t>
+            </a:r>
+            <a:r>
+              <a:rPr lang="en-NZ" sz="1200">
+                <a:solidFill>
+                  <a:srgbClr val="FF0000"/>
+                </a:solidFill>
+              </a:rPr>
+              <a:t>(around 0), </a:t>
+            </a:r>
+            <a:r>
+              <a:rPr lang="en-NZ" sz="1200" dirty="0">
+                <a:solidFill>
+                  <a:srgbClr val="FF0000"/>
+                </a:solidFill>
+              </a:rPr>
+              <a:t>they should be instead replaced somehow by their next closest node ….</a:t>
+            </a:r>
+            <a:endParaRPr lang="en-GB" sz="1200" dirty="0">
+              <a:solidFill>
+                <a:srgbClr val="FF0000"/>
+              </a:solidFill>
+            </a:endParaRPr>
+          </a:p>
+        </p:txBody>
+      </p:sp>
+      <p:cxnSp>
+        <p:nvCxnSpPr>
+          <p:cNvPr id="17" name="Connector: Elbow 16">
+            <a:extLst>
+              <a:ext uri="{FF2B5EF4-FFF2-40B4-BE49-F238E27FC236}">
+                <a16:creationId xmlns:a16="http://schemas.microsoft.com/office/drawing/2014/main" id="{2943542E-98E6-4223-8034-821A97495596}"/>
+              </a:ext>
+            </a:extLst>
+          </p:cNvPr>
+          <p:cNvCxnSpPr>
+            <a:cxnSpLocks/>
+            <a:stCxn id="12" idx="1"/>
+            <a:endCxn id="9" idx="2"/>
+          </p:cNvCxnSpPr>
+          <p:nvPr/>
+        </p:nvCxnSpPr>
+        <p:spPr>
+          <a:xfrm rot="10800000">
+            <a:off x="4266604" y="5535573"/>
+            <a:ext cx="424258" cy="552066"/>
+          </a:xfrm>
+          <a:prstGeom prst="bentConnector2">
+            <a:avLst/>
+          </a:prstGeom>
+          <a:ln>
+            <a:solidFill>
+              <a:srgbClr val="FF0000"/>
+            </a:solidFill>
+            <a:tailEnd type="triangle"/>
+          </a:ln>
+        </p:spPr>
+        <p:style>
+          <a:lnRef idx="1">
+            <a:schemeClr val="accent1"/>
+          </a:lnRef>
+          <a:fillRef idx="0">
+            <a:schemeClr val="accent1"/>
+          </a:fillRef>
+          <a:effectRef idx="0">
+            <a:schemeClr val="accent1"/>
+          </a:effectRef>
+          <a:fontRef idx="minor">
+            <a:schemeClr val="tx1"/>
+          </a:fontRef>
+        </p:style>
+      </p:cxnSp>
+      <p:pic>
+        <p:nvPicPr>
+          <p:cNvPr id="15" name="Picture 14">
+            <a:extLst>
+              <a:ext uri="{FF2B5EF4-FFF2-40B4-BE49-F238E27FC236}">
+                <a16:creationId xmlns:a16="http://schemas.microsoft.com/office/drawing/2014/main" id="{D8C13DE0-0AB8-4F7C-89AB-3778BEAD9361}"/>
+              </a:ext>
+            </a:extLst>
+          </p:cNvPr>
+          <p:cNvPicPr>
+            <a:picLocks noChangeAspect="1"/>
+          </p:cNvPicPr>
+          <p:nvPr/>
+        </p:nvPicPr>
+        <p:blipFill>
+          <a:blip r:embed="rId4"/>
+          <a:stretch>
+            <a:fillRect/>
+          </a:stretch>
+        </p:blipFill>
+        <p:spPr>
+          <a:xfrm>
+            <a:off x="3058883" y="1140496"/>
+            <a:ext cx="2873800" cy="3841079"/>
+          </a:xfrm>
+          <a:prstGeom prst="rect">
+            <a:avLst/>
+          </a:prstGeom>
+        </p:spPr>
+      </p:pic>
+      <p:pic>
+        <p:nvPicPr>
+          <p:cNvPr id="19" name="Picture 18">
+            <a:extLst>
+              <a:ext uri="{FF2B5EF4-FFF2-40B4-BE49-F238E27FC236}">
+                <a16:creationId xmlns:a16="http://schemas.microsoft.com/office/drawing/2014/main" id="{F6139D21-7BD8-451D-8A9D-88C6155831EF}"/>
+              </a:ext>
+            </a:extLst>
+          </p:cNvPr>
+          <p:cNvPicPr>
+            <a:picLocks noChangeAspect="1"/>
+          </p:cNvPicPr>
+          <p:nvPr/>
+        </p:nvPicPr>
+        <p:blipFill>
+          <a:blip r:embed="rId5"/>
+          <a:stretch>
+            <a:fillRect/>
+          </a:stretch>
+        </p:blipFill>
+        <p:spPr>
+          <a:xfrm>
+            <a:off x="9009422" y="1144938"/>
+            <a:ext cx="2873800" cy="3836637"/>
+          </a:xfrm>
+          <a:prstGeom prst="rect">
+            <a:avLst/>
+          </a:prstGeom>
+        </p:spPr>
+      </p:pic>
     </p:spTree>
     <p:extLst>
       <p:ext uri="{BB962C8B-B14F-4D97-AF65-F5344CB8AC3E}">
-        <p14:creationId xmlns:p14="http://schemas.microsoft.com/office/powerpoint/2010/main" val="4028263462"/>
+        <p14:creationId xmlns:p14="http://schemas.microsoft.com/office/powerpoint/2010/main" val="3573502216"/>
       </p:ext>
     </p:extLst>
   </p:cSld>
@@ -6679,10 +6992,10 @@
       </p:grpSpPr>
       <p:pic>
         <p:nvPicPr>
-          <p:cNvPr id="7" name="Picture 6">
-            <a:extLst>
-              <a:ext uri="{FF2B5EF4-FFF2-40B4-BE49-F238E27FC236}">
-                <a16:creationId xmlns:a16="http://schemas.microsoft.com/office/drawing/2014/main" id="{2EB162D9-0AF6-4EEC-9470-3D283E1A30A7}"/>
+          <p:cNvPr id="5" name="Picture 4">
+            <a:extLst>
+              <a:ext uri="{FF2B5EF4-FFF2-40B4-BE49-F238E27FC236}">
+                <a16:creationId xmlns:a16="http://schemas.microsoft.com/office/drawing/2014/main" id="{57F5CD76-A121-47E7-8D5C-78EB781D67BC}"/>
               </a:ext>
             </a:extLst>
           </p:cNvPr>
@@ -6705,8 +7018,8 @@
         </p:blipFill>
         <p:spPr>
           <a:xfrm>
-            <a:off x="0" y="485730"/>
-            <a:ext cx="12192000" cy="5886540"/>
+            <a:off x="0" y="369332"/>
+            <a:ext cx="12192000" cy="6510995"/>
           </a:xfrm>
           <a:prstGeom prst="rect">
             <a:avLst/>
@@ -6715,10 +7028,10 @@
       </p:pic>
       <p:sp>
         <p:nvSpPr>
-          <p:cNvPr id="8" name="TextBox 7">
-            <a:extLst>
-              <a:ext uri="{FF2B5EF4-FFF2-40B4-BE49-F238E27FC236}">
-                <a16:creationId xmlns:a16="http://schemas.microsoft.com/office/drawing/2014/main" id="{835291A4-5C31-468E-853D-5CC31B696586}"/>
+          <p:cNvPr id="6" name="TextBox 5">
+            <a:extLst>
+              <a:ext uri="{FF2B5EF4-FFF2-40B4-BE49-F238E27FC236}">
+                <a16:creationId xmlns:a16="http://schemas.microsoft.com/office/drawing/2014/main" id="{979AE2EC-4AA9-4D1C-9817-4D0290540D4D}"/>
               </a:ext>
             </a:extLst>
           </p:cNvPr>
@@ -6743,7 +7056,7 @@
           <a:p>
             <a:r>
               <a:rPr lang="en-NZ" b="1" dirty="0"/>
-              <a:t>All 10 combination of 10% subset runs – variable weighting distribution</a:t>
+              <a:t>All 10 combination of 10% subset runs</a:t>
             </a:r>
             <a:endParaRPr lang="en-GB" b="1" dirty="0"/>
           </a:p>
@@ -6752,7 +7065,7 @@
     </p:spTree>
     <p:extLst>
       <p:ext uri="{BB962C8B-B14F-4D97-AF65-F5344CB8AC3E}">
-        <p14:creationId xmlns:p14="http://schemas.microsoft.com/office/powerpoint/2010/main" val="1511892141"/>
+        <p14:creationId xmlns:p14="http://schemas.microsoft.com/office/powerpoint/2010/main" val="4028263462"/>
       </p:ext>
     </p:extLst>
   </p:cSld>
@@ -6781,10 +7094,10 @@
       </p:grpSpPr>
       <p:pic>
         <p:nvPicPr>
-          <p:cNvPr id="5" name="Picture 4">
-            <a:extLst>
-              <a:ext uri="{FF2B5EF4-FFF2-40B4-BE49-F238E27FC236}">
-                <a16:creationId xmlns:a16="http://schemas.microsoft.com/office/drawing/2014/main" id="{A2D96899-916E-4667-967A-53C75DE0B124}"/>
+          <p:cNvPr id="7" name="Picture 6">
+            <a:extLst>
+              <a:ext uri="{FF2B5EF4-FFF2-40B4-BE49-F238E27FC236}">
+                <a16:creationId xmlns:a16="http://schemas.microsoft.com/office/drawing/2014/main" id="{2EB162D9-0AF6-4EEC-9470-3D283E1A30A7}"/>
               </a:ext>
             </a:extLst>
           </p:cNvPr>
@@ -6807,8 +7120,8 @@
         </p:blipFill>
         <p:spPr>
           <a:xfrm>
-            <a:off x="799707" y="2129363"/>
-            <a:ext cx="10097909" cy="3648584"/>
+            <a:off x="0" y="485730"/>
+            <a:ext cx="12192000" cy="5886540"/>
           </a:xfrm>
           <a:prstGeom prst="rect">
             <a:avLst/>
@@ -6817,10 +7130,10 @@
       </p:pic>
       <p:sp>
         <p:nvSpPr>
-          <p:cNvPr id="6" name="TextBox 5">
-            <a:extLst>
-              <a:ext uri="{FF2B5EF4-FFF2-40B4-BE49-F238E27FC236}">
-                <a16:creationId xmlns:a16="http://schemas.microsoft.com/office/drawing/2014/main" id="{7A53C59A-1A95-4FC7-AB43-C7A259FFA6C7}"/>
+          <p:cNvPr id="8" name="TextBox 7">
+            <a:extLst>
+              <a:ext uri="{FF2B5EF4-FFF2-40B4-BE49-F238E27FC236}">
+                <a16:creationId xmlns:a16="http://schemas.microsoft.com/office/drawing/2014/main" id="{835291A4-5C31-468E-853D-5CC31B696586}"/>
               </a:ext>
             </a:extLst>
           </p:cNvPr>
@@ -6829,8 +7142,8 @@
         </p:nvSpPr>
         <p:spPr>
           <a:xfrm>
-            <a:off x="213989" y="493362"/>
-            <a:ext cx="10571201" cy="369332"/>
+            <a:off x="0" y="-9525"/>
+            <a:ext cx="7275589" cy="369332"/>
           </a:xfrm>
           <a:prstGeom prst="rect">
             <a:avLst/>
@@ -6845,15 +7158,7 @@
           <a:p>
             <a:r>
               <a:rPr lang="en-NZ" b="1" dirty="0"/>
-              <a:t>Runs on subsets of dataset (rows) when only using blood pressure (</a:t>
-            </a:r>
-            <a:r>
-              <a:rPr lang="en-NZ" b="1" dirty="0" err="1"/>
-              <a:t>dia</a:t>
-            </a:r>
-            <a:r>
-              <a:rPr lang="en-NZ" b="1" dirty="0"/>
-              <a:t> &amp; sys) as inputs into the model</a:t>
+              <a:t>All 10 combination of 10% subset runs – variable weighting distribution</a:t>
             </a:r>
             <a:endParaRPr lang="en-GB" b="1" dirty="0"/>
           </a:p>
@@ -6862,7 +7167,7 @@
     </p:spTree>
     <p:extLst>
       <p:ext uri="{BB962C8B-B14F-4D97-AF65-F5344CB8AC3E}">
-        <p14:creationId xmlns:p14="http://schemas.microsoft.com/office/powerpoint/2010/main" val="65343148"/>
+        <p14:creationId xmlns:p14="http://schemas.microsoft.com/office/powerpoint/2010/main" val="1511892141"/>
       </p:ext>
     </p:extLst>
   </p:cSld>

</xml_diff>

<commit_message>
adjusted normalization for each principle component individually
</commit_message>
<xml_diff>
--- a/job_results.pptx
+++ b/job_results.pptx
@@ -5,7 +5,7 @@
     <p:sldMasterId id="2147483648" r:id="rId1"/>
   </p:sldMasterIdLst>
   <p:notesMasterIdLst>
-    <p:notesMasterId r:id="rId12"/>
+    <p:notesMasterId r:id="rId13"/>
   </p:notesMasterIdLst>
   <p:sldIdLst>
     <p:sldId id="256" r:id="rId2"/>
@@ -18,6 +18,7 @@
     <p:sldId id="258" r:id="rId9"/>
     <p:sldId id="259" r:id="rId10"/>
     <p:sldId id="263" r:id="rId11"/>
+    <p:sldId id="269" r:id="rId12"/>
   </p:sldIdLst>
   <p:sldSz cx="12192000" cy="6858000"/>
   <p:notesSz cx="6858000" cy="9144000"/>
@@ -129,7 +130,7 @@
   <pc:docChgLst>
     <pc:chgData name="Zhao Xiong" userId="5eba49e5-2895-4cd9-83e8-b3064fe76704" providerId="ADAL" clId="{B606E7B2-EFF5-418A-8639-9F7537C4DA50}"/>
     <pc:docChg chg="undo custSel addSld delSld modSld sldOrd">
-      <pc:chgData name="Zhao Xiong" userId="5eba49e5-2895-4cd9-83e8-b3064fe76704" providerId="ADAL" clId="{B606E7B2-EFF5-418A-8639-9F7537C4DA50}" dt="2022-05-15T15:20:27.411" v="2732" actId="1076"/>
+      <pc:chgData name="Zhao Xiong" userId="5eba49e5-2895-4cd9-83e8-b3064fe76704" providerId="ADAL" clId="{B606E7B2-EFF5-418A-8639-9F7537C4DA50}" dt="2022-05-15T15:46:07.387" v="2736"/>
       <pc:docMkLst>
         <pc:docMk/>
       </pc:docMkLst>
@@ -804,8 +805,8 @@
           </ac:cxnSpMkLst>
         </pc:cxnChg>
       </pc:sldChg>
-      <pc:sldChg chg="addSp delSp modSp add">
-        <pc:chgData name="Zhao Xiong" userId="5eba49e5-2895-4cd9-83e8-b3064fe76704" providerId="ADAL" clId="{B606E7B2-EFF5-418A-8639-9F7537C4DA50}" dt="2022-05-15T14:50:01.158" v="2297" actId="478"/>
+      <pc:sldChg chg="addSp delSp modSp add ord">
+        <pc:chgData name="Zhao Xiong" userId="5eba49e5-2895-4cd9-83e8-b3064fe76704" providerId="ADAL" clId="{B606E7B2-EFF5-418A-8639-9F7537C4DA50}" dt="2022-05-15T15:46:07.387" v="2736"/>
         <pc:sldMkLst>
           <pc:docMk/>
           <pc:sldMk cId="3970877698" sldId="267"/>
@@ -1033,6 +1034,29 @@
             <ac:picMk id="11" creationId="{9ED66866-A176-4422-9B01-D106D6AC139A}"/>
           </ac:picMkLst>
         </pc:picChg>
+      </pc:sldChg>
+      <pc:sldChg chg="delSp add">
+        <pc:chgData name="Zhao Xiong" userId="5eba49e5-2895-4cd9-83e8-b3064fe76704" providerId="ADAL" clId="{B606E7B2-EFF5-418A-8639-9F7537C4DA50}" dt="2022-05-15T15:45:59.988" v="2735"/>
+        <pc:sldMkLst>
+          <pc:docMk/>
+          <pc:sldMk cId="4125219743" sldId="269"/>
+        </pc:sldMkLst>
+        <pc:spChg chg="del">
+          <ac:chgData name="Zhao Xiong" userId="5eba49e5-2895-4cd9-83e8-b3064fe76704" providerId="ADAL" clId="{B606E7B2-EFF5-418A-8639-9F7537C4DA50}" dt="2022-05-15T15:45:59.988" v="2735"/>
+          <ac:spMkLst>
+            <pc:docMk/>
+            <pc:sldMk cId="4125219743" sldId="269"/>
+            <ac:spMk id="2" creationId="{9D5A5D3E-2905-4E7B-B75D-2512F1933F81}"/>
+          </ac:spMkLst>
+        </pc:spChg>
+        <pc:spChg chg="del">
+          <ac:chgData name="Zhao Xiong" userId="5eba49e5-2895-4cd9-83e8-b3064fe76704" providerId="ADAL" clId="{B606E7B2-EFF5-418A-8639-9F7537C4DA50}" dt="2022-05-15T15:45:59.988" v="2735"/>
+          <ac:spMkLst>
+            <pc:docMk/>
+            <pc:sldMk cId="4125219743" sldId="269"/>
+            <ac:spMk id="3" creationId="{648F4AF5-D816-44AD-B8B5-DDA25EC6A4B7}"/>
+          </ac:spMkLst>
+        </pc:spChg>
       </pc:sldChg>
     </pc:docChg>
   </pc:docChgLst>
@@ -4856,6 +4880,36 @@
     <p:extLst>
       <p:ext uri="{BB962C8B-B14F-4D97-AF65-F5344CB8AC3E}">
         <p14:creationId xmlns:p14="http://schemas.microsoft.com/office/powerpoint/2010/main" val="65343148"/>
+      </p:ext>
+    </p:extLst>
+  </p:cSld>
+  <p:clrMapOvr>
+    <a:masterClrMapping/>
+  </p:clrMapOvr>
+</p:sld>
+</file>
+
+<file path=ppt/slides/slide11.xml><?xml version="1.0" encoding="utf-8"?>
+<p:sld xmlns:a="http://schemas.openxmlformats.org/drawingml/2006/main" xmlns:r="http://schemas.openxmlformats.org/officeDocument/2006/relationships" xmlns:p="http://schemas.openxmlformats.org/presentationml/2006/main">
+  <p:cSld>
+    <p:spTree>
+      <p:nvGrpSpPr>
+        <p:cNvPr id="1" name=""/>
+        <p:cNvGrpSpPr/>
+        <p:nvPr/>
+      </p:nvGrpSpPr>
+      <p:grpSpPr>
+        <a:xfrm>
+          <a:off x="0" y="0"/>
+          <a:ext cx="0" cy="0"/>
+          <a:chOff x="0" y="0"/>
+          <a:chExt cx="0" cy="0"/>
+        </a:xfrm>
+      </p:grpSpPr>
+    </p:spTree>
+    <p:extLst>
+      <p:ext uri="{BB962C8B-B14F-4D97-AF65-F5344CB8AC3E}">
+        <p14:creationId xmlns:p14="http://schemas.microsoft.com/office/powerpoint/2010/main" val="4125219743"/>
       </p:ext>
     </p:extLst>
   </p:cSld>

</xml_diff>

<commit_message>
changed alpha value and added additional intermediate variable to observe
</commit_message>
<xml_diff>
--- a/job_results.pptx
+++ b/job_results.pptx
@@ -131,7 +131,7 @@
   <pc:docChgLst>
     <pc:chgData name="Zhao Xiong" userId="5eba49e5-2895-4cd9-83e8-b3064fe76704" providerId="ADAL" clId="{B606E7B2-EFF5-418A-8639-9F7537C4DA50}"/>
     <pc:docChg chg="undo custSel addSld delSld modSld sldOrd">
-      <pc:chgData name="Zhao Xiong" userId="5eba49e5-2895-4cd9-83e8-b3064fe76704" providerId="ADAL" clId="{B606E7B2-EFF5-418A-8639-9F7537C4DA50}" dt="2022-05-16T15:54:42.705" v="2917" actId="20577"/>
+      <pc:chgData name="Zhao Xiong" userId="5eba49e5-2895-4cd9-83e8-b3064fe76704" providerId="ADAL" clId="{B606E7B2-EFF5-418A-8639-9F7537C4DA50}" dt="2022-05-16T16:44:54.579" v="3115" actId="20577"/>
       <pc:docMkLst>
         <pc:docMk/>
       </pc:docMkLst>
@@ -601,7 +601,7 @@
         </pc:picChg>
       </pc:sldChg>
       <pc:sldChg chg="addSp delSp modSp add ord">
-        <pc:chgData name="Zhao Xiong" userId="5eba49e5-2895-4cd9-83e8-b3064fe76704" providerId="ADAL" clId="{B606E7B2-EFF5-418A-8639-9F7537C4DA50}" dt="2022-05-14T12:58:26.397" v="2148" actId="20577"/>
+        <pc:chgData name="Zhao Xiong" userId="5eba49e5-2895-4cd9-83e8-b3064fe76704" providerId="ADAL" clId="{B606E7B2-EFF5-418A-8639-9F7537C4DA50}" dt="2022-05-16T16:42:49.097" v="2918" actId="1076"/>
         <pc:sldMkLst>
           <pc:docMk/>
           <pc:sldMk cId="3573502216" sldId="266"/>
@@ -663,7 +663,7 @@
           </ac:spMkLst>
         </pc:spChg>
         <pc:spChg chg="add mod">
-          <ac:chgData name="Zhao Xiong" userId="5eba49e5-2895-4cd9-83e8-b3064fe76704" providerId="ADAL" clId="{B606E7B2-EFF5-418A-8639-9F7537C4DA50}" dt="2022-05-14T12:58:26.397" v="2148" actId="20577"/>
+          <ac:chgData name="Zhao Xiong" userId="5eba49e5-2895-4cd9-83e8-b3064fe76704" providerId="ADAL" clId="{B606E7B2-EFF5-418A-8639-9F7537C4DA50}" dt="2022-05-16T16:42:49.097" v="2918" actId="1076"/>
           <ac:spMkLst>
             <pc:docMk/>
             <pc:sldMk cId="3573502216" sldId="266"/>
@@ -775,7 +775,7 @@
           </ac:cxnSpMkLst>
         </pc:cxnChg>
         <pc:cxnChg chg="add mod">
-          <ac:chgData name="Zhao Xiong" userId="5eba49e5-2895-4cd9-83e8-b3064fe76704" providerId="ADAL" clId="{B606E7B2-EFF5-418A-8639-9F7537C4DA50}" dt="2022-05-14T12:25:21.818" v="2085" actId="20577"/>
+          <ac:chgData name="Zhao Xiong" userId="5eba49e5-2895-4cd9-83e8-b3064fe76704" providerId="ADAL" clId="{B606E7B2-EFF5-418A-8639-9F7537C4DA50}" dt="2022-05-16T16:42:49.097" v="2918" actId="1076"/>
           <ac:cxnSpMkLst>
             <pc:docMk/>
             <pc:sldMk cId="3573502216" sldId="266"/>
@@ -1037,7 +1037,7 @@
         </pc:spChg>
       </pc:sldChg>
       <pc:sldChg chg="addSp delSp modSp add">
-        <pc:chgData name="Zhao Xiong" userId="5eba49e5-2895-4cd9-83e8-b3064fe76704" providerId="ADAL" clId="{B606E7B2-EFF5-418A-8639-9F7537C4DA50}" dt="2022-05-16T15:54:42.705" v="2917" actId="20577"/>
+        <pc:chgData name="Zhao Xiong" userId="5eba49e5-2895-4cd9-83e8-b3064fe76704" providerId="ADAL" clId="{B606E7B2-EFF5-418A-8639-9F7537C4DA50}" dt="2022-05-16T16:44:54.579" v="3115" actId="20577"/>
         <pc:sldMkLst>
           <pc:docMk/>
           <pc:sldMk cId="1698151061" sldId="270"/>
@@ -1059,7 +1059,7 @@
           </ac:spMkLst>
         </pc:spChg>
         <pc:spChg chg="add mod">
-          <ac:chgData name="Zhao Xiong" userId="5eba49e5-2895-4cd9-83e8-b3064fe76704" providerId="ADAL" clId="{B606E7B2-EFF5-418A-8639-9F7537C4DA50}" dt="2022-05-16T15:54:20.107" v="2896" actId="403"/>
+          <ac:chgData name="Zhao Xiong" userId="5eba49e5-2895-4cd9-83e8-b3064fe76704" providerId="ADAL" clId="{B606E7B2-EFF5-418A-8639-9F7537C4DA50}" dt="2022-05-16T16:44:54.579" v="3115" actId="20577"/>
           <ac:spMkLst>
             <pc:docMk/>
             <pc:sldMk cId="1698151061" sldId="270"/>
@@ -1075,7 +1075,7 @@
           </ac:spMkLst>
         </pc:spChg>
         <pc:spChg chg="add mod">
-          <ac:chgData name="Zhao Xiong" userId="5eba49e5-2895-4cd9-83e8-b3064fe76704" providerId="ADAL" clId="{B606E7B2-EFF5-418A-8639-9F7537C4DA50}" dt="2022-05-16T15:54:23.560" v="2897" actId="1076"/>
+          <ac:chgData name="Zhao Xiong" userId="5eba49e5-2895-4cd9-83e8-b3064fe76704" providerId="ADAL" clId="{B606E7B2-EFF5-418A-8639-9F7537C4DA50}" dt="2022-05-16T16:44:49.697" v="3105" actId="1076"/>
           <ac:spMkLst>
             <pc:docMk/>
             <pc:sldMk cId="1698151061" sldId="270"/>
@@ -1083,7 +1083,7 @@
           </ac:spMkLst>
         </pc:spChg>
         <pc:spChg chg="add mod">
-          <ac:chgData name="Zhao Xiong" userId="5eba49e5-2895-4cd9-83e8-b3064fe76704" providerId="ADAL" clId="{B606E7B2-EFF5-418A-8639-9F7537C4DA50}" dt="2022-05-16T15:54:23.560" v="2897" actId="1076"/>
+          <ac:chgData name="Zhao Xiong" userId="5eba49e5-2895-4cd9-83e8-b3064fe76704" providerId="ADAL" clId="{B606E7B2-EFF5-418A-8639-9F7537C4DA50}" dt="2022-05-16T16:44:49.697" v="3105" actId="1076"/>
           <ac:spMkLst>
             <pc:docMk/>
             <pc:sldMk cId="1698151061" sldId="270"/>
@@ -1091,15 +1091,23 @@
           </ac:spMkLst>
         </pc:spChg>
         <pc:spChg chg="add mod">
-          <ac:chgData name="Zhao Xiong" userId="5eba49e5-2895-4cd9-83e8-b3064fe76704" providerId="ADAL" clId="{B606E7B2-EFF5-418A-8639-9F7537C4DA50}" dt="2022-05-16T15:54:42.705" v="2917" actId="20577"/>
+          <ac:chgData name="Zhao Xiong" userId="5eba49e5-2895-4cd9-83e8-b3064fe76704" providerId="ADAL" clId="{B606E7B2-EFF5-418A-8639-9F7537C4DA50}" dt="2022-05-16T16:44:49.697" v="3105" actId="1076"/>
           <ac:spMkLst>
             <pc:docMk/>
             <pc:sldMk cId="1698151061" sldId="270"/>
             <ac:spMk id="10" creationId="{AB9D12DE-A411-4F59-A4DF-839C93E6D061}"/>
           </ac:spMkLst>
         </pc:spChg>
+        <pc:spChg chg="add mod">
+          <ac:chgData name="Zhao Xiong" userId="5eba49e5-2895-4cd9-83e8-b3064fe76704" providerId="ADAL" clId="{B606E7B2-EFF5-418A-8639-9F7537C4DA50}" dt="2022-05-16T16:44:49.697" v="3105" actId="1076"/>
+          <ac:spMkLst>
+            <pc:docMk/>
+            <pc:sldMk cId="1698151061" sldId="270"/>
+            <ac:spMk id="11" creationId="{60D07C7C-7298-4369-A2A4-84175236B79F}"/>
+          </ac:spMkLst>
+        </pc:spChg>
         <pc:picChg chg="add mod">
-          <ac:chgData name="Zhao Xiong" userId="5eba49e5-2895-4cd9-83e8-b3064fe76704" providerId="ADAL" clId="{B606E7B2-EFF5-418A-8639-9F7537C4DA50}" dt="2022-05-16T15:54:23.560" v="2897" actId="1076"/>
+          <ac:chgData name="Zhao Xiong" userId="5eba49e5-2895-4cd9-83e8-b3064fe76704" providerId="ADAL" clId="{B606E7B2-EFF5-418A-8639-9F7537C4DA50}" dt="2022-05-16T16:44:49.697" v="3105" actId="1076"/>
           <ac:picMkLst>
             <pc:docMk/>
             <pc:sldMk cId="1698151061" sldId="270"/>
@@ -1107,7 +1115,7 @@
           </ac:picMkLst>
         </pc:picChg>
         <pc:picChg chg="add mod">
-          <ac:chgData name="Zhao Xiong" userId="5eba49e5-2895-4cd9-83e8-b3064fe76704" providerId="ADAL" clId="{B606E7B2-EFF5-418A-8639-9F7537C4DA50}" dt="2022-05-16T15:54:23.560" v="2897" actId="1076"/>
+          <ac:chgData name="Zhao Xiong" userId="5eba49e5-2895-4cd9-83e8-b3064fe76704" providerId="ADAL" clId="{B606E7B2-EFF5-418A-8639-9F7537C4DA50}" dt="2022-05-16T16:44:49.697" v="3105" actId="1076"/>
           <ac:picMkLst>
             <pc:docMk/>
             <pc:sldMk cId="1698151061" sldId="270"/>
@@ -6698,7 +6706,7 @@
         </p:blipFill>
         <p:spPr>
           <a:xfrm>
-            <a:off x="296652" y="946411"/>
+            <a:off x="106457" y="734270"/>
             <a:ext cx="3200846" cy="2694730"/>
           </a:xfrm>
           <a:prstGeom prst="rect">
@@ -6728,7 +6736,7 @@
         </p:blipFill>
         <p:spPr>
           <a:xfrm>
-            <a:off x="3578028" y="946411"/>
+            <a:off x="3387833" y="734270"/>
             <a:ext cx="3239260" cy="2694730"/>
           </a:xfrm>
           <a:prstGeom prst="rect">
@@ -6769,8 +6777,8 @@
               <a:t>Boxcox</a:t>
             </a:r>
             <a:r>
-              <a:rPr lang="en-NZ" sz="2800" b="1" dirty="0"/>
-              <a:t> Induced Depression</a:t>
+              <a:rPr lang="en-NZ" sz="2800" b="1"/>
+              <a:t> Problems</a:t>
             </a:r>
             <a:endParaRPr lang="en-GB" sz="2800" b="1" dirty="0"/>
           </a:p>
@@ -6790,7 +6798,7 @@
         </p:nvSpPr>
         <p:spPr>
           <a:xfrm>
-            <a:off x="425951" y="761745"/>
+            <a:off x="235756" y="549604"/>
             <a:ext cx="2942249" cy="184666"/>
           </a:xfrm>
           <a:prstGeom prst="rect">
@@ -6827,7 +6835,7 @@
         </p:nvSpPr>
         <p:spPr>
           <a:xfrm>
-            <a:off x="3726534" y="761745"/>
+            <a:off x="3536339" y="549604"/>
             <a:ext cx="2942249" cy="184666"/>
           </a:xfrm>
           <a:prstGeom prst="rect">
@@ -6872,7 +6880,7 @@
         </p:nvSpPr>
         <p:spPr>
           <a:xfrm>
-            <a:off x="3807199" y="1888930"/>
+            <a:off x="3617004" y="1676789"/>
             <a:ext cx="2288800" cy="276999"/>
           </a:xfrm>
           <a:prstGeom prst="rect">
@@ -6903,6 +6911,185 @@
           </a:p>
         </p:txBody>
       </p:sp>
+      <mc:AlternateContent xmlns:mc="http://schemas.openxmlformats.org/markup-compatibility/2006">
+        <mc:Choice xmlns:a14="http://schemas.microsoft.com/office/drawing/2010/main" Requires="a14">
+          <p:sp>
+            <p:nvSpPr>
+              <p:cNvPr id="11" name="TextBox 10">
+                <a:extLst>
+                  <a:ext uri="{FF2B5EF4-FFF2-40B4-BE49-F238E27FC236}">
+                    <a16:creationId xmlns:a16="http://schemas.microsoft.com/office/drawing/2014/main" id="{60D07C7C-7298-4369-A2A4-84175236B79F}"/>
+                  </a:ext>
+                </a:extLst>
+              </p:cNvPr>
+              <p:cNvSpPr txBox="1"/>
+              <p:nvPr/>
+            </p:nvSpPr>
+            <p:spPr>
+              <a:xfrm>
+                <a:off x="6804955" y="1041991"/>
+                <a:ext cx="5049448" cy="1039644"/>
+              </a:xfrm>
+              <a:prstGeom prst="rect">
+                <a:avLst/>
+              </a:prstGeom>
+              <a:solidFill>
+                <a:schemeClr val="bg1"/>
+              </a:solidFill>
+            </p:spPr>
+            <p:txBody>
+              <a:bodyPr wrap="square" lIns="0" tIns="0" rIns="0" bIns="0" rtlCol="0">
+                <a:spAutoFit/>
+              </a:bodyPr>
+              <a:lstStyle/>
+              <a:p>
+                <a:r>
+                  <a:rPr lang="en-GB" dirty="0"/>
+                  <a:t>Boxcox:</a:t>
+                </a:r>
+                <a14:m>
+                  <m:oMath xmlns:m="http://schemas.openxmlformats.org/officeDocument/2006/math">
+                    <m:r>
+                      <a:rPr lang="en-GB" i="1" dirty="0" smtClean="0">
+                        <a:latin typeface="Cambria Math" panose="02040503050406030204" pitchFamily="18" charset="0"/>
+                      </a:rPr>
+                      <m:t> </m:t>
+                    </m:r>
+                    <m:r>
+                      <a:rPr lang="en-GB" i="1" dirty="0" smtClean="0">
+                        <a:latin typeface="Cambria Math" panose="02040503050406030204" pitchFamily="18" charset="0"/>
+                      </a:rPr>
+                      <m:t>𝑇</m:t>
+                    </m:r>
+                    <m:d>
+                      <m:dPr>
+                        <m:ctrlPr>
+                          <a:rPr lang="en-GB" i="1" dirty="0">
+                            <a:latin typeface="Cambria Math" panose="02040503050406030204" pitchFamily="18" charset="0"/>
+                          </a:rPr>
+                        </m:ctrlPr>
+                      </m:dPr>
+                      <m:e>
+                        <m:r>
+                          <a:rPr lang="en-GB" i="1" dirty="0">
+                            <a:latin typeface="Cambria Math" panose="02040503050406030204" pitchFamily="18" charset="0"/>
+                          </a:rPr>
+                          <m:t>𝑋</m:t>
+                        </m:r>
+                      </m:e>
+                    </m:d>
+                    <m:r>
+                      <a:rPr lang="en-GB" i="1" dirty="0">
+                        <a:latin typeface="Cambria Math" panose="02040503050406030204" pitchFamily="18" charset="0"/>
+                      </a:rPr>
+                      <m:t>=</m:t>
+                    </m:r>
+                    <m:f>
+                      <m:fPr>
+                        <m:ctrlPr>
+                          <a:rPr lang="el-GR" i="1" dirty="0">
+                            <a:latin typeface="Cambria Math" panose="02040503050406030204" pitchFamily="18" charset="0"/>
+                          </a:rPr>
+                        </m:ctrlPr>
+                      </m:fPr>
+                      <m:num>
+                        <m:r>
+                          <a:rPr lang="en-GB" i="1" dirty="0">
+                            <a:latin typeface="Cambria Math" panose="02040503050406030204" pitchFamily="18" charset="0"/>
+                          </a:rPr>
+                          <m:t>𝑋</m:t>
+                        </m:r>
+                        <m:r>
+                          <a:rPr lang="el-GR" i="1" baseline="30000" dirty="0">
+                            <a:latin typeface="Cambria Math" panose="02040503050406030204" pitchFamily="18" charset="0"/>
+                          </a:rPr>
+                          <m:t>𝜆</m:t>
+                        </m:r>
+                        <m:r>
+                          <a:rPr lang="el-GR" i="1" dirty="0">
+                            <a:latin typeface="Cambria Math" panose="02040503050406030204" pitchFamily="18" charset="0"/>
+                          </a:rPr>
+                          <m:t>−1</m:t>
+                        </m:r>
+                      </m:num>
+                      <m:den>
+                        <m:r>
+                          <a:rPr lang="el-GR" i="1" dirty="0">
+                            <a:latin typeface="Cambria Math" panose="02040503050406030204" pitchFamily="18" charset="0"/>
+                          </a:rPr>
+                          <m:t>𝜆</m:t>
+                        </m:r>
+                      </m:den>
+                    </m:f>
+                  </m:oMath>
+                </a14:m>
+                <a:endParaRPr lang="en-NZ" dirty="0"/>
+              </a:p>
+              <a:p>
+                <a:endParaRPr lang="en-NZ" dirty="0"/>
+              </a:p>
+              <a:p>
+                <a:r>
+                  <a:rPr lang="en-NZ" sz="1200" dirty="0"/>
+                  <a:t>When lambda is very small (i.e. 0.01), it can cause these massive negative values</a:t>
+                </a:r>
+                <a:br>
+                  <a:rPr lang="el-GR" sz="1200" dirty="0"/>
+                </a:br>
+                <a:endParaRPr lang="en-GB" sz="1200" dirty="0">
+                  <a:solidFill>
+                    <a:srgbClr val="FF0000"/>
+                  </a:solidFill>
+                </a:endParaRPr>
+              </a:p>
+            </p:txBody>
+          </p:sp>
+        </mc:Choice>
+        <mc:Fallback>
+          <p:sp>
+            <p:nvSpPr>
+              <p:cNvPr id="11" name="TextBox 10">
+                <a:extLst>
+                  <a:ext uri="{FF2B5EF4-FFF2-40B4-BE49-F238E27FC236}">
+                    <a16:creationId xmlns:a16="http://schemas.microsoft.com/office/drawing/2014/main" id="{60D07C7C-7298-4369-A2A4-84175236B79F}"/>
+                  </a:ext>
+                </a:extLst>
+              </p:cNvPr>
+              <p:cNvSpPr txBox="1">
+                <a:spLocks noRot="1" noChangeAspect="1" noMove="1" noResize="1" noEditPoints="1" noAdjustHandles="1" noChangeArrowheads="1" noChangeShapeType="1" noTextEdit="1"/>
+              </p:cNvSpPr>
+              <p:nvPr/>
+            </p:nvSpPr>
+            <p:spPr>
+              <a:xfrm>
+                <a:off x="6804955" y="1041991"/>
+                <a:ext cx="5049448" cy="1039644"/>
+              </a:xfrm>
+              <a:prstGeom prst="rect">
+                <a:avLst/>
+              </a:prstGeom>
+              <a:blipFill>
+                <a:blip r:embed="rId4"/>
+                <a:stretch>
+                  <a:fillRect l="-2774" t="-2941" r="-241"/>
+                </a:stretch>
+              </a:blipFill>
+            </p:spPr>
+            <p:txBody>
+              <a:bodyPr/>
+              <a:lstStyle/>
+              <a:p>
+                <a:r>
+                  <a:rPr lang="en-GB">
+                    <a:noFill/>
+                  </a:rPr>
+                  <a:t> </a:t>
+                </a:r>
+              </a:p>
+            </p:txBody>
+          </p:sp>
+        </mc:Fallback>
+      </mc:AlternateContent>
     </p:spTree>
     <p:extLst>
       <p:ext uri="{BB962C8B-B14F-4D97-AF65-F5344CB8AC3E}">
@@ -7219,7 +7406,7 @@
         </p:nvSpPr>
         <p:spPr>
           <a:xfrm>
-            <a:off x="4690862" y="5810640"/>
+            <a:off x="4690862" y="5834957"/>
             <a:ext cx="4849418" cy="553998"/>
           </a:xfrm>
           <a:prstGeom prst="rect">
@@ -7257,23 +7444,7 @@
                   <a:srgbClr val="FF0000"/>
                 </a:solidFill>
               </a:rPr>
-              <a:t> space with the median </a:t>
-            </a:r>
-            <a:r>
-              <a:rPr lang="en-NZ" sz="1200">
-                <a:solidFill>
-                  <a:srgbClr val="FF0000"/>
-                </a:solidFill>
-              </a:rPr>
-              <a:t>(around 0), </a:t>
-            </a:r>
-            <a:r>
-              <a:rPr lang="en-NZ" sz="1200" dirty="0">
-                <a:solidFill>
-                  <a:srgbClr val="FF0000"/>
-                </a:solidFill>
-              </a:rPr>
-              <a:t>they should be instead replaced somehow by their next closest node ….</a:t>
+              <a:t> space with the median (around 0), they should be instead replaced somehow by their next closest node ….</a:t>
             </a:r>
             <a:endParaRPr lang="en-GB" sz="1200" dirty="0">
               <a:solidFill>
@@ -7301,8 +7472,8 @@
         </p:nvCxnSpPr>
         <p:spPr>
           <a:xfrm rot="10800000">
-            <a:off x="4266604" y="5535573"/>
-            <a:ext cx="424258" cy="552066"/>
+            <a:off x="4266604" y="5535574"/>
+            <a:ext cx="424258" cy="576383"/>
           </a:xfrm>
           <a:prstGeom prst="bentConnector2">
             <a:avLst/>

</xml_diff>

<commit_message>
added new plot for trying to solve cov and eig issue
</commit_message>
<xml_diff>
--- a/job_results.pptx
+++ b/job_results.pptx
@@ -5,7 +5,7 @@
     <p:sldMasterId id="2147483648" r:id="rId1"/>
   </p:sldMasterIdLst>
   <p:notesMasterIdLst>
-    <p:notesMasterId r:id="rId14"/>
+    <p:notesMasterId r:id="rId15"/>
   </p:notesMasterIdLst>
   <p:sldIdLst>
     <p:sldId id="256" r:id="rId2"/>
@@ -15,11 +15,12 @@
     <p:sldId id="262" r:id="rId6"/>
     <p:sldId id="267" r:id="rId7"/>
     <p:sldId id="270" r:id="rId8"/>
-    <p:sldId id="266" r:id="rId9"/>
-    <p:sldId id="258" r:id="rId10"/>
-    <p:sldId id="259" r:id="rId11"/>
-    <p:sldId id="263" r:id="rId12"/>
-    <p:sldId id="269" r:id="rId13"/>
+    <p:sldId id="271" r:id="rId9"/>
+    <p:sldId id="266" r:id="rId10"/>
+    <p:sldId id="258" r:id="rId11"/>
+    <p:sldId id="259" r:id="rId12"/>
+    <p:sldId id="263" r:id="rId13"/>
+    <p:sldId id="269" r:id="rId14"/>
   </p:sldIdLst>
   <p:sldSz cx="12192000" cy="6858000"/>
   <p:notesSz cx="6858000" cy="9144000"/>
@@ -129,6 +130,62 @@
 <file path=ppt/changesInfos/changesInfo1.xml><?xml version="1.0" encoding="utf-8"?>
 <pc:chgInfo xmlns:a="http://schemas.openxmlformats.org/drawingml/2006/main" xmlns:r="http://schemas.openxmlformats.org/officeDocument/2006/relationships" xmlns:ac="http://schemas.microsoft.com/office/drawing/2013/main/command" xmlns:pc="http://schemas.microsoft.com/office/powerpoint/2013/main/command">
   <pc:docChgLst>
+    <pc:chgData name="zhaohan" userId="95e304e8ede71739" providerId="LiveId" clId="{F0AA0078-E316-4B79-8CAD-B209D3227CD1}"/>
+    <pc:docChg chg="custSel addSld modSld">
+      <pc:chgData name="zhaohan" userId="95e304e8ede71739" providerId="LiveId" clId="{F0AA0078-E316-4B79-8CAD-B209D3227CD1}" dt="2022-05-17T22:34:20.464" v="213" actId="1076"/>
+      <pc:docMkLst>
+        <pc:docMk/>
+      </pc:docMkLst>
+      <pc:sldChg chg="addSp delSp modSp new mod">
+        <pc:chgData name="zhaohan" userId="95e304e8ede71739" providerId="LiveId" clId="{F0AA0078-E316-4B79-8CAD-B209D3227CD1}" dt="2022-05-17T22:34:20.464" v="213" actId="1076"/>
+        <pc:sldMkLst>
+          <pc:docMk/>
+          <pc:sldMk cId="422068206" sldId="271"/>
+        </pc:sldMkLst>
+        <pc:spChg chg="del">
+          <ac:chgData name="zhaohan" userId="95e304e8ede71739" providerId="LiveId" clId="{F0AA0078-E316-4B79-8CAD-B209D3227CD1}" dt="2022-05-17T22:33:05.655" v="1" actId="21"/>
+          <ac:spMkLst>
+            <pc:docMk/>
+            <pc:sldMk cId="422068206" sldId="271"/>
+            <ac:spMk id="2" creationId="{1E510259-68B6-2155-0462-62ED20177541}"/>
+          </ac:spMkLst>
+        </pc:spChg>
+        <pc:spChg chg="del">
+          <ac:chgData name="zhaohan" userId="95e304e8ede71739" providerId="LiveId" clId="{F0AA0078-E316-4B79-8CAD-B209D3227CD1}" dt="2022-05-17T22:33:05.655" v="1" actId="21"/>
+          <ac:spMkLst>
+            <pc:docMk/>
+            <pc:sldMk cId="422068206" sldId="271"/>
+            <ac:spMk id="3" creationId="{2A6D91BC-AA18-42E5-57D8-4997946A277D}"/>
+          </ac:spMkLst>
+        </pc:spChg>
+        <pc:spChg chg="add mod">
+          <ac:chgData name="zhaohan" userId="95e304e8ede71739" providerId="LiveId" clId="{F0AA0078-E316-4B79-8CAD-B209D3227CD1}" dt="2022-05-17T22:33:36.771" v="77" actId="20577"/>
+          <ac:spMkLst>
+            <pc:docMk/>
+            <pc:sldMk cId="422068206" sldId="271"/>
+            <ac:spMk id="5" creationId="{17129CD8-805D-49B6-06EF-80386E45E842}"/>
+          </ac:spMkLst>
+        </pc:spChg>
+        <pc:spChg chg="add mod">
+          <ac:chgData name="zhaohan" userId="95e304e8ede71739" providerId="LiveId" clId="{F0AA0078-E316-4B79-8CAD-B209D3227CD1}" dt="2022-05-17T22:34:20.464" v="213" actId="1076"/>
+          <ac:spMkLst>
+            <pc:docMk/>
+            <pc:sldMk cId="422068206" sldId="271"/>
+            <ac:spMk id="6" creationId="{9FAEEF44-D8A9-5807-B422-79C3A5FCA991}"/>
+          </ac:spMkLst>
+        </pc:spChg>
+        <pc:graphicFrameChg chg="add mod">
+          <ac:chgData name="zhaohan" userId="95e304e8ede71739" providerId="LiveId" clId="{F0AA0078-E316-4B79-8CAD-B209D3227CD1}" dt="2022-05-17T22:34:20.464" v="213" actId="1076"/>
+          <ac:graphicFrameMkLst>
+            <pc:docMk/>
+            <pc:sldMk cId="422068206" sldId="271"/>
+            <ac:graphicFrameMk id="4" creationId="{B517FD2F-15C3-57A6-7F67-DB1A71BA2BC3}"/>
+          </ac:graphicFrameMkLst>
+        </pc:graphicFrameChg>
+      </pc:sldChg>
+    </pc:docChg>
+  </pc:docChgLst>
+  <pc:docChgLst>
     <pc:chgData name="Zhao Xiong" userId="5eba49e5-2895-4cd9-83e8-b3064fe76704" providerId="ADAL" clId="{B606E7B2-EFF5-418A-8639-9F7537C4DA50}"/>
     <pc:docChg chg="undo custSel addSld delSld modSld sldOrd">
       <pc:chgData name="Zhao Xiong" userId="5eba49e5-2895-4cd9-83e8-b3064fe76704" providerId="ADAL" clId="{B606E7B2-EFF5-418A-8639-9F7537C4DA50}" dt="2022-05-16T16:44:54.579" v="3115" actId="20577"/>
@@ -1210,7 +1267,7 @@
           <a:p>
             <a:fld id="{3F756EDF-0C8E-4F27-B2A4-7BBF4F0FD9CE}" type="datetimeFigureOut">
               <a:rPr lang="en-GB" smtClean="0"/>
-              <a:t>16/05/2022</a:t>
+              <a:t>17/05/2022</a:t>
             </a:fld>
             <a:endParaRPr lang="en-GB"/>
           </a:p>
@@ -1627,7 +1684,7 @@
           <a:p>
             <a:fld id="{B1B6DC73-6F54-48A7-AC0A-0EE4EE00B05A}" type="datetimeFigureOut">
               <a:rPr lang="en-GB" smtClean="0"/>
-              <a:t>16/05/2022</a:t>
+              <a:t>17/05/2022</a:t>
             </a:fld>
             <a:endParaRPr lang="en-GB"/>
           </a:p>
@@ -1827,7 +1884,7 @@
           <a:p>
             <a:fld id="{B1B6DC73-6F54-48A7-AC0A-0EE4EE00B05A}" type="datetimeFigureOut">
               <a:rPr lang="en-GB" smtClean="0"/>
-              <a:t>16/05/2022</a:t>
+              <a:t>17/05/2022</a:t>
             </a:fld>
             <a:endParaRPr lang="en-GB"/>
           </a:p>
@@ -2037,7 +2094,7 @@
           <a:p>
             <a:fld id="{B1B6DC73-6F54-48A7-AC0A-0EE4EE00B05A}" type="datetimeFigureOut">
               <a:rPr lang="en-GB" smtClean="0"/>
-              <a:t>16/05/2022</a:t>
+              <a:t>17/05/2022</a:t>
             </a:fld>
             <a:endParaRPr lang="en-GB"/>
           </a:p>
@@ -2237,7 +2294,7 @@
           <a:p>
             <a:fld id="{B1B6DC73-6F54-48A7-AC0A-0EE4EE00B05A}" type="datetimeFigureOut">
               <a:rPr lang="en-GB" smtClean="0"/>
-              <a:t>16/05/2022</a:t>
+              <a:t>17/05/2022</a:t>
             </a:fld>
             <a:endParaRPr lang="en-GB"/>
           </a:p>
@@ -2513,7 +2570,7 @@
           <a:p>
             <a:fld id="{B1B6DC73-6F54-48A7-AC0A-0EE4EE00B05A}" type="datetimeFigureOut">
               <a:rPr lang="en-GB" smtClean="0"/>
-              <a:t>16/05/2022</a:t>
+              <a:t>17/05/2022</a:t>
             </a:fld>
             <a:endParaRPr lang="en-GB"/>
           </a:p>
@@ -2781,7 +2838,7 @@
           <a:p>
             <a:fld id="{B1B6DC73-6F54-48A7-AC0A-0EE4EE00B05A}" type="datetimeFigureOut">
               <a:rPr lang="en-GB" smtClean="0"/>
-              <a:t>16/05/2022</a:t>
+              <a:t>17/05/2022</a:t>
             </a:fld>
             <a:endParaRPr lang="en-GB"/>
           </a:p>
@@ -3196,7 +3253,7 @@
           <a:p>
             <a:fld id="{B1B6DC73-6F54-48A7-AC0A-0EE4EE00B05A}" type="datetimeFigureOut">
               <a:rPr lang="en-GB" smtClean="0"/>
-              <a:t>16/05/2022</a:t>
+              <a:t>17/05/2022</a:t>
             </a:fld>
             <a:endParaRPr lang="en-GB"/>
           </a:p>
@@ -3338,7 +3395,7 @@
           <a:p>
             <a:fld id="{B1B6DC73-6F54-48A7-AC0A-0EE4EE00B05A}" type="datetimeFigureOut">
               <a:rPr lang="en-GB" smtClean="0"/>
-              <a:t>16/05/2022</a:t>
+              <a:t>17/05/2022</a:t>
             </a:fld>
             <a:endParaRPr lang="en-GB"/>
           </a:p>
@@ -3451,7 +3508,7 @@
           <a:p>
             <a:fld id="{B1B6DC73-6F54-48A7-AC0A-0EE4EE00B05A}" type="datetimeFigureOut">
               <a:rPr lang="en-GB" smtClean="0"/>
-              <a:t>16/05/2022</a:t>
+              <a:t>17/05/2022</a:t>
             </a:fld>
             <a:endParaRPr lang="en-GB"/>
           </a:p>
@@ -3764,7 +3821,7 @@
           <a:p>
             <a:fld id="{B1B6DC73-6F54-48A7-AC0A-0EE4EE00B05A}" type="datetimeFigureOut">
               <a:rPr lang="en-GB" smtClean="0"/>
-              <a:t>16/05/2022</a:t>
+              <a:t>17/05/2022</a:t>
             </a:fld>
             <a:endParaRPr lang="en-GB"/>
           </a:p>
@@ -4053,7 +4110,7 @@
           <a:p>
             <a:fld id="{B1B6DC73-6F54-48A7-AC0A-0EE4EE00B05A}" type="datetimeFigureOut">
               <a:rPr lang="en-GB" smtClean="0"/>
-              <a:t>16/05/2022</a:t>
+              <a:t>17/05/2022</a:t>
             </a:fld>
             <a:endParaRPr lang="en-GB"/>
           </a:p>
@@ -4296,7 +4353,7 @@
           <a:p>
             <a:fld id="{B1B6DC73-6F54-48A7-AC0A-0EE4EE00B05A}" type="datetimeFigureOut">
               <a:rPr lang="en-GB" smtClean="0"/>
-              <a:t>16/05/2022</a:t>
+              <a:t>17/05/2022</a:t>
             </a:fld>
             <a:endParaRPr lang="en-GB"/>
           </a:p>
@@ -4863,10 +4920,10 @@
       </p:grpSpPr>
       <p:pic>
         <p:nvPicPr>
-          <p:cNvPr id="7" name="Picture 6">
-            <a:extLst>
-              <a:ext uri="{FF2B5EF4-FFF2-40B4-BE49-F238E27FC236}">
-                <a16:creationId xmlns:a16="http://schemas.microsoft.com/office/drawing/2014/main" id="{2EB162D9-0AF6-4EEC-9470-3D283E1A30A7}"/>
+          <p:cNvPr id="5" name="Picture 4">
+            <a:extLst>
+              <a:ext uri="{FF2B5EF4-FFF2-40B4-BE49-F238E27FC236}">
+                <a16:creationId xmlns:a16="http://schemas.microsoft.com/office/drawing/2014/main" id="{57F5CD76-A121-47E7-8D5C-78EB781D67BC}"/>
               </a:ext>
             </a:extLst>
           </p:cNvPr>
@@ -4889,8 +4946,8 @@
         </p:blipFill>
         <p:spPr>
           <a:xfrm>
-            <a:off x="0" y="485730"/>
-            <a:ext cx="12192000" cy="5886540"/>
+            <a:off x="0" y="369332"/>
+            <a:ext cx="12192000" cy="6510995"/>
           </a:xfrm>
           <a:prstGeom prst="rect">
             <a:avLst/>
@@ -4899,10 +4956,10 @@
       </p:pic>
       <p:sp>
         <p:nvSpPr>
-          <p:cNvPr id="8" name="TextBox 7">
-            <a:extLst>
-              <a:ext uri="{FF2B5EF4-FFF2-40B4-BE49-F238E27FC236}">
-                <a16:creationId xmlns:a16="http://schemas.microsoft.com/office/drawing/2014/main" id="{835291A4-5C31-468E-853D-5CC31B696586}"/>
+          <p:cNvPr id="6" name="TextBox 5">
+            <a:extLst>
+              <a:ext uri="{FF2B5EF4-FFF2-40B4-BE49-F238E27FC236}">
+                <a16:creationId xmlns:a16="http://schemas.microsoft.com/office/drawing/2014/main" id="{979AE2EC-4AA9-4D1C-9817-4D0290540D4D}"/>
               </a:ext>
             </a:extLst>
           </p:cNvPr>
@@ -4927,7 +4984,7 @@
           <a:p>
             <a:r>
               <a:rPr lang="en-NZ" b="1" dirty="0"/>
-              <a:t>All 10 combination of 10% subset runs – variable weighting distribution</a:t>
+              <a:t>All 10 combination of 10% subset runs</a:t>
             </a:r>
             <a:endParaRPr lang="en-GB" b="1" dirty="0"/>
           </a:p>
@@ -4936,7 +4993,7 @@
     </p:spTree>
     <p:extLst>
       <p:ext uri="{BB962C8B-B14F-4D97-AF65-F5344CB8AC3E}">
-        <p14:creationId xmlns:p14="http://schemas.microsoft.com/office/powerpoint/2010/main" val="1511892141"/>
+        <p14:creationId xmlns:p14="http://schemas.microsoft.com/office/powerpoint/2010/main" val="4028263462"/>
       </p:ext>
     </p:extLst>
   </p:cSld>
@@ -4965,6 +5022,108 @@
       </p:grpSpPr>
       <p:pic>
         <p:nvPicPr>
+          <p:cNvPr id="7" name="Picture 6">
+            <a:extLst>
+              <a:ext uri="{FF2B5EF4-FFF2-40B4-BE49-F238E27FC236}">
+                <a16:creationId xmlns:a16="http://schemas.microsoft.com/office/drawing/2014/main" id="{2EB162D9-0AF6-4EEC-9470-3D283E1A30A7}"/>
+              </a:ext>
+            </a:extLst>
+          </p:cNvPr>
+          <p:cNvPicPr>
+            <a:picLocks noChangeAspect="1"/>
+          </p:cNvPicPr>
+          <p:nvPr/>
+        </p:nvPicPr>
+        <p:blipFill>
+          <a:blip r:embed="rId2">
+            <a:extLst>
+              <a:ext uri="{28A0092B-C50C-407E-A947-70E740481C1C}">
+                <a14:useLocalDpi xmlns:a14="http://schemas.microsoft.com/office/drawing/2010/main" val="0"/>
+              </a:ext>
+            </a:extLst>
+          </a:blip>
+          <a:stretch>
+            <a:fillRect/>
+          </a:stretch>
+        </p:blipFill>
+        <p:spPr>
+          <a:xfrm>
+            <a:off x="0" y="485730"/>
+            <a:ext cx="12192000" cy="5886540"/>
+          </a:xfrm>
+          <a:prstGeom prst="rect">
+            <a:avLst/>
+          </a:prstGeom>
+        </p:spPr>
+      </p:pic>
+      <p:sp>
+        <p:nvSpPr>
+          <p:cNvPr id="8" name="TextBox 7">
+            <a:extLst>
+              <a:ext uri="{FF2B5EF4-FFF2-40B4-BE49-F238E27FC236}">
+                <a16:creationId xmlns:a16="http://schemas.microsoft.com/office/drawing/2014/main" id="{835291A4-5C31-468E-853D-5CC31B696586}"/>
+              </a:ext>
+            </a:extLst>
+          </p:cNvPr>
+          <p:cNvSpPr txBox="1"/>
+          <p:nvPr/>
+        </p:nvSpPr>
+        <p:spPr>
+          <a:xfrm>
+            <a:off x="0" y="-9525"/>
+            <a:ext cx="7275589" cy="369332"/>
+          </a:xfrm>
+          <a:prstGeom prst="rect">
+            <a:avLst/>
+          </a:prstGeom>
+          <a:noFill/>
+        </p:spPr>
+        <p:txBody>
+          <a:bodyPr wrap="square" rtlCol="0">
+            <a:spAutoFit/>
+          </a:bodyPr>
+          <a:lstStyle/>
+          <a:p>
+            <a:r>
+              <a:rPr lang="en-NZ" b="1" dirty="0"/>
+              <a:t>All 10 combination of 10% subset runs – variable weighting distribution</a:t>
+            </a:r>
+            <a:endParaRPr lang="en-GB" b="1" dirty="0"/>
+          </a:p>
+        </p:txBody>
+      </p:sp>
+    </p:spTree>
+    <p:extLst>
+      <p:ext uri="{BB962C8B-B14F-4D97-AF65-F5344CB8AC3E}">
+        <p14:creationId xmlns:p14="http://schemas.microsoft.com/office/powerpoint/2010/main" val="1511892141"/>
+      </p:ext>
+    </p:extLst>
+  </p:cSld>
+  <p:clrMapOvr>
+    <a:masterClrMapping/>
+  </p:clrMapOvr>
+</p:sld>
+</file>
+
+<file path=ppt/slides/slide12.xml><?xml version="1.0" encoding="utf-8"?>
+<p:sld xmlns:a="http://schemas.openxmlformats.org/drawingml/2006/main" xmlns:r="http://schemas.openxmlformats.org/officeDocument/2006/relationships" xmlns:p="http://schemas.openxmlformats.org/presentationml/2006/main">
+  <p:cSld>
+    <p:spTree>
+      <p:nvGrpSpPr>
+        <p:cNvPr id="1" name=""/>
+        <p:cNvGrpSpPr/>
+        <p:nvPr/>
+      </p:nvGrpSpPr>
+      <p:grpSpPr>
+        <a:xfrm>
+          <a:off x="0" y="0"/>
+          <a:ext cx="0" cy="0"/>
+          <a:chOff x="0" y="0"/>
+          <a:chExt cx="0" cy="0"/>
+        </a:xfrm>
+      </p:grpSpPr>
+      <p:pic>
+        <p:nvPicPr>
           <p:cNvPr id="5" name="Picture 4">
             <a:extLst>
               <a:ext uri="{FF2B5EF4-FFF2-40B4-BE49-F238E27FC236}">
@@ -5056,7 +5215,7 @@
 </p:sld>
 </file>
 
-<file path=ppt/slides/slide12.xml><?xml version="1.0" encoding="utf-8"?>
+<file path=ppt/slides/slide13.xml><?xml version="1.0" encoding="utf-8"?>
 <p:sld xmlns:a="http://schemas.openxmlformats.org/drawingml/2006/main" xmlns:r="http://schemas.openxmlformats.org/officeDocument/2006/relationships" xmlns:p="http://schemas.openxmlformats.org/presentationml/2006/main">
   <p:cSld>
     <p:spTree>
@@ -6777,7 +6936,7 @@
               <a:t>Boxcox</a:t>
             </a:r>
             <a:r>
-              <a:rPr lang="en-NZ" sz="2800" b="1"/>
+              <a:rPr lang="en-NZ" sz="2800" b="1" dirty="0"/>
               <a:t> Problems</a:t>
             </a:r>
             <a:endParaRPr lang="en-GB" sz="2800" b="1" dirty="0"/>
@@ -6911,8 +7070,8 @@
           </a:p>
         </p:txBody>
       </p:sp>
-      <mc:AlternateContent xmlns:mc="http://schemas.openxmlformats.org/markup-compatibility/2006">
-        <mc:Choice xmlns:a14="http://schemas.microsoft.com/office/drawing/2010/main" Requires="a14">
+      <mc:AlternateContent xmlns:mc="http://schemas.openxmlformats.org/markup-compatibility/2006" xmlns:a14="http://schemas.microsoft.com/office/drawing/2010/main">
+        <mc:Choice Requires="a14">
           <p:sp>
             <p:nvSpPr>
               <p:cNvPr id="11" name="TextBox 10">
@@ -7045,7 +7204,7 @@
             </p:txBody>
           </p:sp>
         </mc:Choice>
-        <mc:Fallback>
+        <mc:Fallback xmlns="">
           <p:sp>
             <p:nvSpPr>
               <p:cNvPr id="11" name="TextBox 10">
@@ -7120,47 +7279,81 @@
           <a:chExt cx="0" cy="0"/>
         </a:xfrm>
       </p:grpSpPr>
-      <p:pic>
-        <p:nvPicPr>
-          <p:cNvPr id="5" name="Picture 4">
-            <a:extLst>
-              <a:ext uri="{FF2B5EF4-FFF2-40B4-BE49-F238E27FC236}">
-                <a16:creationId xmlns:a16="http://schemas.microsoft.com/office/drawing/2014/main" id="{2BAC2202-805B-4DC3-A3C7-C9CC97599E10}"/>
-              </a:ext>
-            </a:extLst>
-          </p:cNvPr>
-          <p:cNvPicPr>
-            <a:picLocks noChangeAspect="1"/>
-          </p:cNvPicPr>
-          <p:nvPr/>
-        </p:nvPicPr>
-        <p:blipFill rotWithShape="1">
-          <a:blip r:embed="rId2">
-            <a:extLst>
-              <a:ext uri="{28A0092B-C50C-407E-A947-70E740481C1C}">
-                <a14:useLocalDpi xmlns:a14="http://schemas.microsoft.com/office/drawing/2010/main" val="0"/>
-              </a:ext>
-            </a:extLst>
-          </a:blip>
-          <a:srcRect r="54446"/>
-          <a:stretch/>
-        </p:blipFill>
-        <p:spPr>
-          <a:xfrm>
-            <a:off x="76201" y="1140496"/>
-            <a:ext cx="2982682" cy="3890687"/>
-          </a:xfrm>
-          <a:prstGeom prst="rect">
-            <a:avLst/>
-          </a:prstGeom>
-        </p:spPr>
-      </p:pic>
-      <p:sp>
-        <p:nvSpPr>
-          <p:cNvPr id="6" name="TextBox 5">
-            <a:extLst>
-              <a:ext uri="{FF2B5EF4-FFF2-40B4-BE49-F238E27FC236}">
-                <a16:creationId xmlns:a16="http://schemas.microsoft.com/office/drawing/2014/main" id="{108BEBBF-0CC4-49CA-B7B2-9D4B22059FB3}"/>
+      <p:graphicFrame>
+        <p:nvGraphicFramePr>
+          <p:cNvPr id="4" name="Object 3">
+            <a:extLst>
+              <a:ext uri="{FF2B5EF4-FFF2-40B4-BE49-F238E27FC236}">
+                <a16:creationId xmlns:a16="http://schemas.microsoft.com/office/drawing/2014/main" id="{B517FD2F-15C3-57A6-7F67-DB1A71BA2BC3}"/>
+              </a:ext>
+            </a:extLst>
+          </p:cNvPr>
+          <p:cNvGraphicFramePr>
+            <a:graphicFrameLocks noChangeAspect="1"/>
+          </p:cNvGraphicFramePr>
+          <p:nvPr>
+            <p:extLst>
+              <p:ext uri="{D42A27DB-BD31-4B8C-83A1-F6EECF244321}">
+                <p14:modId xmlns:p14="http://schemas.microsoft.com/office/powerpoint/2010/main" val="3403498713"/>
+              </p:ext>
+            </p:extLst>
+          </p:nvPr>
+        </p:nvGraphicFramePr>
+        <p:xfrm>
+          <a:off x="207961" y="1062424"/>
+          <a:ext cx="2613393" cy="4162160"/>
+        </p:xfrm>
+        <a:graphic>
+          <a:graphicData uri="http://schemas.openxmlformats.org/presentationml/2006/ole">
+            <mc:AlternateContent xmlns:mc="http://schemas.openxmlformats.org/markup-compatibility/2006">
+              <mc:Choice xmlns:v="urn:schemas-microsoft-com:vml" Requires="v">
+                <p:oleObj name="Bitmap Image" r:id="rId2" imgW="3444120" imgH="5486400" progId="Paint.Picture">
+                  <p:embed/>
+                </p:oleObj>
+              </mc:Choice>
+              <mc:Fallback>
+                <p:oleObj name="Bitmap Image" r:id="rId2" imgW="3444120" imgH="5486400" progId="Paint.Picture">
+                  <p:embed/>
+                  <p:pic>
+                    <p:nvPicPr>
+                      <p:cNvPr id="4" name="Object 3">
+                        <a:extLst>
+                          <a:ext uri="{FF2B5EF4-FFF2-40B4-BE49-F238E27FC236}">
+                            <a16:creationId xmlns:a16="http://schemas.microsoft.com/office/drawing/2014/main" id="{B517FD2F-15C3-57A6-7F67-DB1A71BA2BC3}"/>
+                          </a:ext>
+                        </a:extLst>
+                      </p:cNvPr>
+                      <p:cNvPicPr/>
+                      <p:nvPr/>
+                    </p:nvPicPr>
+                    <p:blipFill>
+                      <a:blip r:embed="rId3"/>
+                      <a:stretch>
+                        <a:fillRect/>
+                      </a:stretch>
+                    </p:blipFill>
+                    <p:spPr>
+                      <a:xfrm>
+                        <a:off x="207961" y="1062424"/>
+                        <a:ext cx="2613393" cy="4162160"/>
+                      </a:xfrm>
+                      <a:prstGeom prst="rect">
+                        <a:avLst/>
+                      </a:prstGeom>
+                    </p:spPr>
+                  </p:pic>
+                </p:oleObj>
+              </mc:Fallback>
+            </mc:AlternateContent>
+          </a:graphicData>
+        </a:graphic>
+      </p:graphicFrame>
+      <p:sp>
+        <p:nvSpPr>
+          <p:cNvPr id="5" name="TextBox 4">
+            <a:extLst>
+              <a:ext uri="{FF2B5EF4-FFF2-40B4-BE49-F238E27FC236}">
+                <a16:creationId xmlns:a16="http://schemas.microsoft.com/office/drawing/2014/main" id="{17129CD8-805D-49B6-06EF-80386E45E842}"/>
               </a:ext>
             </a:extLst>
           </p:cNvPr>
@@ -7169,8 +7362,8 @@
         </p:nvSpPr>
         <p:spPr>
           <a:xfrm>
-            <a:off x="213989" y="493362"/>
-            <a:ext cx="10571201" cy="369332"/>
+            <a:off x="0" y="0"/>
+            <a:ext cx="12191999" cy="523220"/>
           </a:xfrm>
           <a:prstGeom prst="rect">
             <a:avLst/>
@@ -7184,66 +7377,34 @@
           <a:lstStyle/>
           <a:p>
             <a:r>
-              <a:rPr lang="en-NZ" b="1" dirty="0"/>
-              <a:t>Handling abnormally high distance values in distance matrix (test on 20% subset ~5600 rows)</a:t>
-            </a:r>
-            <a:endParaRPr lang="en-GB" b="1" dirty="0"/>
-          </a:p>
-        </p:txBody>
-      </p:sp>
-      <p:pic>
-        <p:nvPicPr>
-          <p:cNvPr id="2" name="Picture 1">
-            <a:extLst>
-              <a:ext uri="{FF2B5EF4-FFF2-40B4-BE49-F238E27FC236}">
-                <a16:creationId xmlns:a16="http://schemas.microsoft.com/office/drawing/2014/main" id="{0FA7BFA3-93B6-4DD8-BF5C-5441A83F4695}"/>
-              </a:ext>
-            </a:extLst>
-          </p:cNvPr>
-          <p:cNvPicPr>
-            <a:picLocks noChangeAspect="1"/>
-          </p:cNvPicPr>
+              <a:rPr lang="en-NZ" sz="2800" b="1" dirty="0"/>
+              <a:t>Issues with covariance matrix and eigen decomposition</a:t>
+            </a:r>
+            <a:endParaRPr lang="en-GB" sz="2800" b="1" dirty="0"/>
+          </a:p>
+        </p:txBody>
+      </p:sp>
+      <p:sp>
+        <p:nvSpPr>
+          <p:cNvPr id="6" name="TextBox 5">
+            <a:extLst>
+              <a:ext uri="{FF2B5EF4-FFF2-40B4-BE49-F238E27FC236}">
+                <a16:creationId xmlns:a16="http://schemas.microsoft.com/office/drawing/2014/main" id="{9FAEEF44-D8A9-5807-B422-79C3A5FCA991}"/>
+              </a:ext>
+            </a:extLst>
+          </p:cNvPr>
+          <p:cNvSpPr txBox="1"/>
           <p:nvPr/>
-        </p:nvPicPr>
-        <p:blipFill>
-          <a:blip r:embed="rId3"/>
-          <a:stretch>
-            <a:fillRect/>
-          </a:stretch>
-        </p:blipFill>
-        <p:spPr>
-          <a:xfrm>
-            <a:off x="6041565" y="1140496"/>
-            <a:ext cx="2873800" cy="3841079"/>
+        </p:nvSpPr>
+        <p:spPr>
+          <a:xfrm>
+            <a:off x="207961" y="698010"/>
+            <a:ext cx="2613392" cy="369332"/>
           </a:xfrm>
           <a:prstGeom prst="rect">
             <a:avLst/>
           </a:prstGeom>
-        </p:spPr>
-      </p:pic>
-      <p:sp>
-        <p:nvSpPr>
-          <p:cNvPr id="8" name="TextBox 7">
-            <a:extLst>
-              <a:ext uri="{FF2B5EF4-FFF2-40B4-BE49-F238E27FC236}">
-                <a16:creationId xmlns:a16="http://schemas.microsoft.com/office/drawing/2014/main" id="{846D2B52-EEE0-4075-A79B-6528659C5996}"/>
-              </a:ext>
-            </a:extLst>
-          </p:cNvPr>
-          <p:cNvSpPr txBox="1"/>
-          <p:nvPr/>
-        </p:nvSpPr>
-        <p:spPr>
-          <a:xfrm>
-            <a:off x="234218" y="4981575"/>
-            <a:ext cx="2099408" cy="369332"/>
-          </a:xfrm>
-          <a:prstGeom prst="rect">
-            <a:avLst/>
-          </a:prstGeom>
-          <a:solidFill>
-            <a:schemeClr val="bg1"/>
-          </a:solidFill>
+          <a:noFill/>
         </p:spPr>
         <p:txBody>
           <a:bodyPr wrap="square" lIns="0" tIns="0" rIns="0" bIns="0" rtlCol="0">
@@ -7254,316 +7415,16 @@
             <a:pPr algn="ctr"/>
             <a:r>
               <a:rPr lang="en-NZ" sz="1200" b="1" dirty="0"/>
-              <a:t>1) Original </a:t>
-            </a:r>
-          </a:p>
-          <a:p>
-            <a:pPr algn="ctr"/>
-            <a:r>
-              <a:rPr lang="en-NZ" sz="1200" b="1" dirty="0"/>
-              <a:t>(Minimum Spanning Tree)</a:t>
+              <a:t>Limited range for alpha to avoid large outliers seen at larger alphas</a:t>
             </a:r>
             <a:endParaRPr lang="en-GB" sz="1200" b="1" dirty="0"/>
           </a:p>
         </p:txBody>
       </p:sp>
-      <p:sp>
-        <p:nvSpPr>
-          <p:cNvPr id="9" name="TextBox 8">
-            <a:extLst>
-              <a:ext uri="{FF2B5EF4-FFF2-40B4-BE49-F238E27FC236}">
-                <a16:creationId xmlns:a16="http://schemas.microsoft.com/office/drawing/2014/main" id="{159ECB6D-8197-42C9-9B08-115C0CB6E983}"/>
-              </a:ext>
-            </a:extLst>
-          </p:cNvPr>
-          <p:cNvSpPr txBox="1"/>
-          <p:nvPr/>
-        </p:nvSpPr>
-        <p:spPr>
-          <a:xfrm>
-            <a:off x="3275407" y="4981575"/>
-            <a:ext cx="1982394" cy="553998"/>
-          </a:xfrm>
-          <a:prstGeom prst="rect">
-            <a:avLst/>
-          </a:prstGeom>
-          <a:solidFill>
-            <a:schemeClr val="bg1"/>
-          </a:solidFill>
-        </p:spPr>
-        <p:txBody>
-          <a:bodyPr wrap="square" lIns="0" tIns="0" rIns="0" bIns="0" rtlCol="0">
-            <a:spAutoFit/>
-          </a:bodyPr>
-          <a:lstStyle/>
-          <a:p>
-            <a:pPr algn="ctr"/>
-            <a:r>
-              <a:rPr lang="en-NZ" sz="1200" b="1" dirty="0"/>
-              <a:t>2) Filter out large values in </a:t>
-            </a:r>
-            <a:r>
-              <a:rPr lang="en-NZ" sz="1200" b="1" dirty="0" err="1"/>
-              <a:t>cPC</a:t>
-            </a:r>
-            <a:r>
-              <a:rPr lang="en-NZ" sz="1200" b="1" dirty="0"/>
-              <a:t> space (set values above 3sd as the median)</a:t>
-            </a:r>
-            <a:endParaRPr lang="en-GB" sz="1200" b="1" dirty="0"/>
-          </a:p>
-        </p:txBody>
-      </p:sp>
-      <p:sp>
-        <p:nvSpPr>
-          <p:cNvPr id="10" name="TextBox 9">
-            <a:extLst>
-              <a:ext uri="{FF2B5EF4-FFF2-40B4-BE49-F238E27FC236}">
-                <a16:creationId xmlns:a16="http://schemas.microsoft.com/office/drawing/2014/main" id="{D67F0F88-F469-4158-8F13-A89F610E665A}"/>
-              </a:ext>
-            </a:extLst>
-          </p:cNvPr>
-          <p:cNvSpPr txBox="1"/>
-          <p:nvPr/>
-        </p:nvSpPr>
-        <p:spPr>
-          <a:xfrm>
-            <a:off x="6135621" y="4981575"/>
-            <a:ext cx="2227330" cy="369332"/>
-          </a:xfrm>
-          <a:prstGeom prst="rect">
-            <a:avLst/>
-          </a:prstGeom>
-          <a:solidFill>
-            <a:schemeClr val="bg1"/>
-          </a:solidFill>
-        </p:spPr>
-        <p:txBody>
-          <a:bodyPr wrap="square" lIns="0" tIns="0" rIns="0" bIns="0" rtlCol="0">
-            <a:spAutoFit/>
-          </a:bodyPr>
-          <a:lstStyle/>
-          <a:p>
-            <a:pPr algn="ctr"/>
-            <a:r>
-              <a:rPr lang="en-NZ" sz="1200" b="1" dirty="0"/>
-              <a:t>3) Shortest Path Tree Instead of Minimum Spanning Tree</a:t>
-            </a:r>
-            <a:endParaRPr lang="en-GB" sz="1200" b="1" dirty="0"/>
-          </a:p>
-        </p:txBody>
-      </p:sp>
-      <p:sp>
-        <p:nvSpPr>
-          <p:cNvPr id="11" name="TextBox 10">
-            <a:extLst>
-              <a:ext uri="{FF2B5EF4-FFF2-40B4-BE49-F238E27FC236}">
-                <a16:creationId xmlns:a16="http://schemas.microsoft.com/office/drawing/2014/main" id="{8DF388B5-B151-430B-A09E-940AEAB6AF19}"/>
-              </a:ext>
-            </a:extLst>
-          </p:cNvPr>
-          <p:cNvSpPr txBox="1"/>
-          <p:nvPr/>
-        </p:nvSpPr>
-        <p:spPr>
-          <a:xfrm>
-            <a:off x="9540280" y="4981575"/>
-            <a:ext cx="1356320" cy="369332"/>
-          </a:xfrm>
-          <a:prstGeom prst="rect">
-            <a:avLst/>
-          </a:prstGeom>
-          <a:solidFill>
-            <a:schemeClr val="bg1"/>
-          </a:solidFill>
-        </p:spPr>
-        <p:txBody>
-          <a:bodyPr wrap="square" lIns="0" tIns="0" rIns="0" bIns="0" rtlCol="0">
-            <a:spAutoFit/>
-          </a:bodyPr>
-          <a:lstStyle/>
-          <a:p>
-            <a:pPr algn="ctr"/>
-            <a:r>
-              <a:rPr lang="en-NZ" sz="1200" b="1" dirty="0"/>
-              <a:t>4) #2 (filter) + #3 (use shortest path tree)</a:t>
-            </a:r>
-            <a:endParaRPr lang="en-GB" sz="1200" b="1" dirty="0"/>
-          </a:p>
-        </p:txBody>
-      </p:sp>
-      <p:sp>
-        <p:nvSpPr>
-          <p:cNvPr id="12" name="TextBox 11">
-            <a:extLst>
-              <a:ext uri="{FF2B5EF4-FFF2-40B4-BE49-F238E27FC236}">
-                <a16:creationId xmlns:a16="http://schemas.microsoft.com/office/drawing/2014/main" id="{E23BCCE6-D4B3-49A4-8702-D3E432463990}"/>
-              </a:ext>
-            </a:extLst>
-          </p:cNvPr>
-          <p:cNvSpPr txBox="1"/>
-          <p:nvPr/>
-        </p:nvSpPr>
-        <p:spPr>
-          <a:xfrm>
-            <a:off x="4690862" y="5834957"/>
-            <a:ext cx="4849418" cy="553998"/>
-          </a:xfrm>
-          <a:prstGeom prst="rect">
-            <a:avLst/>
-          </a:prstGeom>
-          <a:solidFill>
-            <a:schemeClr val="bg1"/>
-          </a:solidFill>
-        </p:spPr>
-        <p:txBody>
-          <a:bodyPr wrap="square" lIns="0" tIns="0" rIns="0" bIns="0" rtlCol="0">
-            <a:spAutoFit/>
-          </a:bodyPr>
-          <a:lstStyle/>
-          <a:p>
-            <a:r>
-              <a:rPr lang="en-NZ" sz="1200" dirty="0">
-                <a:solidFill>
-                  <a:srgbClr val="FF0000"/>
-                </a:solidFill>
-              </a:rPr>
-              <a:t>Note that #2 is currently flawed as we cannot just reassign these abnormally large values in </a:t>
-            </a:r>
-            <a:r>
-              <a:rPr lang="en-NZ" sz="1200" dirty="0" err="1">
-                <a:solidFill>
-                  <a:srgbClr val="FF0000"/>
-                </a:solidFill>
-              </a:rPr>
-              <a:t>cPC</a:t>
-            </a:r>
-            <a:r>
-              <a:rPr lang="en-NZ" sz="1200" dirty="0">
-                <a:solidFill>
-                  <a:srgbClr val="FF0000"/>
-                </a:solidFill>
-              </a:rPr>
-              <a:t> space with the median (around 0), they should be instead replaced somehow by their next closest node ….</a:t>
-            </a:r>
-            <a:endParaRPr lang="en-GB" sz="1200" dirty="0">
-              <a:solidFill>
-                <a:srgbClr val="FF0000"/>
-              </a:solidFill>
-            </a:endParaRPr>
-          </a:p>
-        </p:txBody>
-      </p:sp>
-      <p:cxnSp>
-        <p:nvCxnSpPr>
-          <p:cNvPr id="17" name="Connector: Elbow 16">
-            <a:extLst>
-              <a:ext uri="{FF2B5EF4-FFF2-40B4-BE49-F238E27FC236}">
-                <a16:creationId xmlns:a16="http://schemas.microsoft.com/office/drawing/2014/main" id="{2943542E-98E6-4223-8034-821A97495596}"/>
-              </a:ext>
-            </a:extLst>
-          </p:cNvPr>
-          <p:cNvCxnSpPr>
-            <a:cxnSpLocks/>
-            <a:stCxn id="12" idx="1"/>
-            <a:endCxn id="9" idx="2"/>
-          </p:cNvCxnSpPr>
-          <p:nvPr/>
-        </p:nvCxnSpPr>
-        <p:spPr>
-          <a:xfrm rot="10800000">
-            <a:off x="4266604" y="5535574"/>
-            <a:ext cx="424258" cy="576383"/>
-          </a:xfrm>
-          <a:prstGeom prst="bentConnector2">
-            <a:avLst/>
-          </a:prstGeom>
-          <a:ln>
-            <a:solidFill>
-              <a:srgbClr val="FF0000"/>
-            </a:solidFill>
-            <a:tailEnd type="triangle"/>
-          </a:ln>
-        </p:spPr>
-        <p:style>
-          <a:lnRef idx="1">
-            <a:schemeClr val="accent1"/>
-          </a:lnRef>
-          <a:fillRef idx="0">
-            <a:schemeClr val="accent1"/>
-          </a:fillRef>
-          <a:effectRef idx="0">
-            <a:schemeClr val="accent1"/>
-          </a:effectRef>
-          <a:fontRef idx="minor">
-            <a:schemeClr val="tx1"/>
-          </a:fontRef>
-        </p:style>
-      </p:cxnSp>
-      <p:pic>
-        <p:nvPicPr>
-          <p:cNvPr id="15" name="Picture 14">
-            <a:extLst>
-              <a:ext uri="{FF2B5EF4-FFF2-40B4-BE49-F238E27FC236}">
-                <a16:creationId xmlns:a16="http://schemas.microsoft.com/office/drawing/2014/main" id="{D8C13DE0-0AB8-4F7C-89AB-3778BEAD9361}"/>
-              </a:ext>
-            </a:extLst>
-          </p:cNvPr>
-          <p:cNvPicPr>
-            <a:picLocks noChangeAspect="1"/>
-          </p:cNvPicPr>
-          <p:nvPr/>
-        </p:nvPicPr>
-        <p:blipFill>
-          <a:blip r:embed="rId4"/>
-          <a:stretch>
-            <a:fillRect/>
-          </a:stretch>
-        </p:blipFill>
-        <p:spPr>
-          <a:xfrm>
-            <a:off x="3058883" y="1140496"/>
-            <a:ext cx="2873800" cy="3841079"/>
-          </a:xfrm>
-          <a:prstGeom prst="rect">
-            <a:avLst/>
-          </a:prstGeom>
-        </p:spPr>
-      </p:pic>
-      <p:pic>
-        <p:nvPicPr>
-          <p:cNvPr id="19" name="Picture 18">
-            <a:extLst>
-              <a:ext uri="{FF2B5EF4-FFF2-40B4-BE49-F238E27FC236}">
-                <a16:creationId xmlns:a16="http://schemas.microsoft.com/office/drawing/2014/main" id="{F6139D21-7BD8-451D-8A9D-88C6155831EF}"/>
-              </a:ext>
-            </a:extLst>
-          </p:cNvPr>
-          <p:cNvPicPr>
-            <a:picLocks noChangeAspect="1"/>
-          </p:cNvPicPr>
-          <p:nvPr/>
-        </p:nvPicPr>
-        <p:blipFill>
-          <a:blip r:embed="rId5"/>
-          <a:stretch>
-            <a:fillRect/>
-          </a:stretch>
-        </p:blipFill>
-        <p:spPr>
-          <a:xfrm>
-            <a:off x="9009422" y="1144938"/>
-            <a:ext cx="2873800" cy="3836637"/>
-          </a:xfrm>
-          <a:prstGeom prst="rect">
-            <a:avLst/>
-          </a:prstGeom>
-        </p:spPr>
-      </p:pic>
     </p:spTree>
     <p:extLst>
       <p:ext uri="{BB962C8B-B14F-4D97-AF65-F5344CB8AC3E}">
-        <p14:creationId xmlns:p14="http://schemas.microsoft.com/office/powerpoint/2010/main" val="3573502216"/>
+        <p14:creationId xmlns:p14="http://schemas.microsoft.com/office/powerpoint/2010/main" val="422068206"/>
       </p:ext>
     </p:extLst>
   </p:cSld>
@@ -7595,7 +7456,78 @@
           <p:cNvPr id="5" name="Picture 4">
             <a:extLst>
               <a:ext uri="{FF2B5EF4-FFF2-40B4-BE49-F238E27FC236}">
-                <a16:creationId xmlns:a16="http://schemas.microsoft.com/office/drawing/2014/main" id="{57F5CD76-A121-47E7-8D5C-78EB781D67BC}"/>
+                <a16:creationId xmlns:a16="http://schemas.microsoft.com/office/drawing/2014/main" id="{2BAC2202-805B-4DC3-A3C7-C9CC97599E10}"/>
+              </a:ext>
+            </a:extLst>
+          </p:cNvPr>
+          <p:cNvPicPr>
+            <a:picLocks noChangeAspect="1"/>
+          </p:cNvPicPr>
+          <p:nvPr/>
+        </p:nvPicPr>
+        <p:blipFill rotWithShape="1">
+          <a:blip r:embed="rId2">
+            <a:extLst>
+              <a:ext uri="{28A0092B-C50C-407E-A947-70E740481C1C}">
+                <a14:useLocalDpi xmlns:a14="http://schemas.microsoft.com/office/drawing/2010/main" val="0"/>
+              </a:ext>
+            </a:extLst>
+          </a:blip>
+          <a:srcRect r="54446"/>
+          <a:stretch/>
+        </p:blipFill>
+        <p:spPr>
+          <a:xfrm>
+            <a:off x="76201" y="1140496"/>
+            <a:ext cx="2982682" cy="3890687"/>
+          </a:xfrm>
+          <a:prstGeom prst="rect">
+            <a:avLst/>
+          </a:prstGeom>
+        </p:spPr>
+      </p:pic>
+      <p:sp>
+        <p:nvSpPr>
+          <p:cNvPr id="6" name="TextBox 5">
+            <a:extLst>
+              <a:ext uri="{FF2B5EF4-FFF2-40B4-BE49-F238E27FC236}">
+                <a16:creationId xmlns:a16="http://schemas.microsoft.com/office/drawing/2014/main" id="{108BEBBF-0CC4-49CA-B7B2-9D4B22059FB3}"/>
+              </a:ext>
+            </a:extLst>
+          </p:cNvPr>
+          <p:cNvSpPr txBox="1"/>
+          <p:nvPr/>
+        </p:nvSpPr>
+        <p:spPr>
+          <a:xfrm>
+            <a:off x="213989" y="493362"/>
+            <a:ext cx="10571201" cy="369332"/>
+          </a:xfrm>
+          <a:prstGeom prst="rect">
+            <a:avLst/>
+          </a:prstGeom>
+          <a:noFill/>
+        </p:spPr>
+        <p:txBody>
+          <a:bodyPr wrap="square" rtlCol="0">
+            <a:spAutoFit/>
+          </a:bodyPr>
+          <a:lstStyle/>
+          <a:p>
+            <a:r>
+              <a:rPr lang="en-NZ" b="1" dirty="0"/>
+              <a:t>Handling abnormally high distance values in distance matrix (test on 20% subset ~5600 rows)</a:t>
+            </a:r>
+            <a:endParaRPr lang="en-GB" b="1" dirty="0"/>
+          </a:p>
+        </p:txBody>
+      </p:sp>
+      <p:pic>
+        <p:nvPicPr>
+          <p:cNvPr id="2" name="Picture 1">
+            <a:extLst>
+              <a:ext uri="{FF2B5EF4-FFF2-40B4-BE49-F238E27FC236}">
+                <a16:creationId xmlns:a16="http://schemas.microsoft.com/office/drawing/2014/main" id="{0FA7BFA3-93B6-4DD8-BF5C-5441A83F4695}"/>
               </a:ext>
             </a:extLst>
           </p:cNvPr>
@@ -7605,21 +7537,15 @@
           <p:nvPr/>
         </p:nvPicPr>
         <p:blipFill>
-          <a:blip r:embed="rId2">
-            <a:extLst>
-              <a:ext uri="{28A0092B-C50C-407E-A947-70E740481C1C}">
-                <a14:useLocalDpi xmlns:a14="http://schemas.microsoft.com/office/drawing/2010/main" val="0"/>
-              </a:ext>
-            </a:extLst>
-          </a:blip>
+          <a:blip r:embed="rId3"/>
           <a:stretch>
             <a:fillRect/>
           </a:stretch>
         </p:blipFill>
         <p:spPr>
           <a:xfrm>
-            <a:off x="0" y="369332"/>
-            <a:ext cx="12192000" cy="6510995"/>
+            <a:off x="6041565" y="1140496"/>
+            <a:ext cx="2873800" cy="3841079"/>
           </a:xfrm>
           <a:prstGeom prst="rect">
             <a:avLst/>
@@ -7628,10 +7554,10 @@
       </p:pic>
       <p:sp>
         <p:nvSpPr>
-          <p:cNvPr id="6" name="TextBox 5">
-            <a:extLst>
-              <a:ext uri="{FF2B5EF4-FFF2-40B4-BE49-F238E27FC236}">
-                <a16:creationId xmlns:a16="http://schemas.microsoft.com/office/drawing/2014/main" id="{979AE2EC-4AA9-4D1C-9817-4D0290540D4D}"/>
+          <p:cNvPr id="8" name="TextBox 7">
+            <a:extLst>
+              <a:ext uri="{FF2B5EF4-FFF2-40B4-BE49-F238E27FC236}">
+                <a16:creationId xmlns:a16="http://schemas.microsoft.com/office/drawing/2014/main" id="{846D2B52-EEE0-4075-A79B-6528659C5996}"/>
               </a:ext>
             </a:extLst>
           </p:cNvPr>
@@ -7640,32 +7566,335 @@
         </p:nvSpPr>
         <p:spPr>
           <a:xfrm>
-            <a:off x="0" y="-9525"/>
-            <a:ext cx="7275589" cy="369332"/>
+            <a:off x="234218" y="4981575"/>
+            <a:ext cx="2099408" cy="369332"/>
           </a:xfrm>
           <a:prstGeom prst="rect">
             <a:avLst/>
           </a:prstGeom>
-          <a:noFill/>
-        </p:spPr>
-        <p:txBody>
-          <a:bodyPr wrap="square" rtlCol="0">
+          <a:solidFill>
+            <a:schemeClr val="bg1"/>
+          </a:solidFill>
+        </p:spPr>
+        <p:txBody>
+          <a:bodyPr wrap="square" lIns="0" tIns="0" rIns="0" bIns="0" rtlCol="0">
             <a:spAutoFit/>
           </a:bodyPr>
           <a:lstStyle/>
           <a:p>
-            <a:r>
-              <a:rPr lang="en-NZ" b="1" dirty="0"/>
-              <a:t>All 10 combination of 10% subset runs</a:t>
-            </a:r>
-            <a:endParaRPr lang="en-GB" b="1" dirty="0"/>
-          </a:p>
-        </p:txBody>
-      </p:sp>
+            <a:pPr algn="ctr"/>
+            <a:r>
+              <a:rPr lang="en-NZ" sz="1200" b="1" dirty="0"/>
+              <a:t>1) Original </a:t>
+            </a:r>
+          </a:p>
+          <a:p>
+            <a:pPr algn="ctr"/>
+            <a:r>
+              <a:rPr lang="en-NZ" sz="1200" b="1" dirty="0"/>
+              <a:t>(Minimum Spanning Tree)</a:t>
+            </a:r>
+            <a:endParaRPr lang="en-GB" sz="1200" b="1" dirty="0"/>
+          </a:p>
+        </p:txBody>
+      </p:sp>
+      <p:sp>
+        <p:nvSpPr>
+          <p:cNvPr id="9" name="TextBox 8">
+            <a:extLst>
+              <a:ext uri="{FF2B5EF4-FFF2-40B4-BE49-F238E27FC236}">
+                <a16:creationId xmlns:a16="http://schemas.microsoft.com/office/drawing/2014/main" id="{159ECB6D-8197-42C9-9B08-115C0CB6E983}"/>
+              </a:ext>
+            </a:extLst>
+          </p:cNvPr>
+          <p:cNvSpPr txBox="1"/>
+          <p:nvPr/>
+        </p:nvSpPr>
+        <p:spPr>
+          <a:xfrm>
+            <a:off x="3275407" y="4981575"/>
+            <a:ext cx="1982394" cy="553998"/>
+          </a:xfrm>
+          <a:prstGeom prst="rect">
+            <a:avLst/>
+          </a:prstGeom>
+          <a:solidFill>
+            <a:schemeClr val="bg1"/>
+          </a:solidFill>
+        </p:spPr>
+        <p:txBody>
+          <a:bodyPr wrap="square" lIns="0" tIns="0" rIns="0" bIns="0" rtlCol="0">
+            <a:spAutoFit/>
+          </a:bodyPr>
+          <a:lstStyle/>
+          <a:p>
+            <a:pPr algn="ctr"/>
+            <a:r>
+              <a:rPr lang="en-NZ" sz="1200" b="1" dirty="0"/>
+              <a:t>2) Filter out large values in </a:t>
+            </a:r>
+            <a:r>
+              <a:rPr lang="en-NZ" sz="1200" b="1" dirty="0" err="1"/>
+              <a:t>cPC</a:t>
+            </a:r>
+            <a:r>
+              <a:rPr lang="en-NZ" sz="1200" b="1" dirty="0"/>
+              <a:t> space (set values above 3sd as the median)</a:t>
+            </a:r>
+            <a:endParaRPr lang="en-GB" sz="1200" b="1" dirty="0"/>
+          </a:p>
+        </p:txBody>
+      </p:sp>
+      <p:sp>
+        <p:nvSpPr>
+          <p:cNvPr id="10" name="TextBox 9">
+            <a:extLst>
+              <a:ext uri="{FF2B5EF4-FFF2-40B4-BE49-F238E27FC236}">
+                <a16:creationId xmlns:a16="http://schemas.microsoft.com/office/drawing/2014/main" id="{D67F0F88-F469-4158-8F13-A89F610E665A}"/>
+              </a:ext>
+            </a:extLst>
+          </p:cNvPr>
+          <p:cNvSpPr txBox="1"/>
+          <p:nvPr/>
+        </p:nvSpPr>
+        <p:spPr>
+          <a:xfrm>
+            <a:off x="6135621" y="4981575"/>
+            <a:ext cx="2227330" cy="369332"/>
+          </a:xfrm>
+          <a:prstGeom prst="rect">
+            <a:avLst/>
+          </a:prstGeom>
+          <a:solidFill>
+            <a:schemeClr val="bg1"/>
+          </a:solidFill>
+        </p:spPr>
+        <p:txBody>
+          <a:bodyPr wrap="square" lIns="0" tIns="0" rIns="0" bIns="0" rtlCol="0">
+            <a:spAutoFit/>
+          </a:bodyPr>
+          <a:lstStyle/>
+          <a:p>
+            <a:pPr algn="ctr"/>
+            <a:r>
+              <a:rPr lang="en-NZ" sz="1200" b="1" dirty="0"/>
+              <a:t>3) Shortest Path Tree Instead of Minimum Spanning Tree</a:t>
+            </a:r>
+            <a:endParaRPr lang="en-GB" sz="1200" b="1" dirty="0"/>
+          </a:p>
+        </p:txBody>
+      </p:sp>
+      <p:sp>
+        <p:nvSpPr>
+          <p:cNvPr id="11" name="TextBox 10">
+            <a:extLst>
+              <a:ext uri="{FF2B5EF4-FFF2-40B4-BE49-F238E27FC236}">
+                <a16:creationId xmlns:a16="http://schemas.microsoft.com/office/drawing/2014/main" id="{8DF388B5-B151-430B-A09E-940AEAB6AF19}"/>
+              </a:ext>
+            </a:extLst>
+          </p:cNvPr>
+          <p:cNvSpPr txBox="1"/>
+          <p:nvPr/>
+        </p:nvSpPr>
+        <p:spPr>
+          <a:xfrm>
+            <a:off x="9540280" y="4981575"/>
+            <a:ext cx="1356320" cy="369332"/>
+          </a:xfrm>
+          <a:prstGeom prst="rect">
+            <a:avLst/>
+          </a:prstGeom>
+          <a:solidFill>
+            <a:schemeClr val="bg1"/>
+          </a:solidFill>
+        </p:spPr>
+        <p:txBody>
+          <a:bodyPr wrap="square" lIns="0" tIns="0" rIns="0" bIns="0" rtlCol="0">
+            <a:spAutoFit/>
+          </a:bodyPr>
+          <a:lstStyle/>
+          <a:p>
+            <a:pPr algn="ctr"/>
+            <a:r>
+              <a:rPr lang="en-NZ" sz="1200" b="1" dirty="0"/>
+              <a:t>4) #2 (filter) + #3 (use shortest path tree)</a:t>
+            </a:r>
+            <a:endParaRPr lang="en-GB" sz="1200" b="1" dirty="0"/>
+          </a:p>
+        </p:txBody>
+      </p:sp>
+      <p:sp>
+        <p:nvSpPr>
+          <p:cNvPr id="12" name="TextBox 11">
+            <a:extLst>
+              <a:ext uri="{FF2B5EF4-FFF2-40B4-BE49-F238E27FC236}">
+                <a16:creationId xmlns:a16="http://schemas.microsoft.com/office/drawing/2014/main" id="{E23BCCE6-D4B3-49A4-8702-D3E432463990}"/>
+              </a:ext>
+            </a:extLst>
+          </p:cNvPr>
+          <p:cNvSpPr txBox="1"/>
+          <p:nvPr/>
+        </p:nvSpPr>
+        <p:spPr>
+          <a:xfrm>
+            <a:off x="4690862" y="5834957"/>
+            <a:ext cx="4849418" cy="553998"/>
+          </a:xfrm>
+          <a:prstGeom prst="rect">
+            <a:avLst/>
+          </a:prstGeom>
+          <a:solidFill>
+            <a:schemeClr val="bg1"/>
+          </a:solidFill>
+        </p:spPr>
+        <p:txBody>
+          <a:bodyPr wrap="square" lIns="0" tIns="0" rIns="0" bIns="0" rtlCol="0">
+            <a:spAutoFit/>
+          </a:bodyPr>
+          <a:lstStyle/>
+          <a:p>
+            <a:r>
+              <a:rPr lang="en-NZ" sz="1200" dirty="0">
+                <a:solidFill>
+                  <a:srgbClr val="FF0000"/>
+                </a:solidFill>
+              </a:rPr>
+              <a:t>Note that #2 is currently flawed as we cannot just reassign these abnormally large values in </a:t>
+            </a:r>
+            <a:r>
+              <a:rPr lang="en-NZ" sz="1200" dirty="0" err="1">
+                <a:solidFill>
+                  <a:srgbClr val="FF0000"/>
+                </a:solidFill>
+              </a:rPr>
+              <a:t>cPC</a:t>
+            </a:r>
+            <a:r>
+              <a:rPr lang="en-NZ" sz="1200" dirty="0">
+                <a:solidFill>
+                  <a:srgbClr val="FF0000"/>
+                </a:solidFill>
+              </a:rPr>
+              <a:t> space with the median (around 0), they should be instead replaced somehow by their next closest node ….</a:t>
+            </a:r>
+            <a:endParaRPr lang="en-GB" sz="1200" dirty="0">
+              <a:solidFill>
+                <a:srgbClr val="FF0000"/>
+              </a:solidFill>
+            </a:endParaRPr>
+          </a:p>
+        </p:txBody>
+      </p:sp>
+      <p:cxnSp>
+        <p:nvCxnSpPr>
+          <p:cNvPr id="17" name="Connector: Elbow 16">
+            <a:extLst>
+              <a:ext uri="{FF2B5EF4-FFF2-40B4-BE49-F238E27FC236}">
+                <a16:creationId xmlns:a16="http://schemas.microsoft.com/office/drawing/2014/main" id="{2943542E-98E6-4223-8034-821A97495596}"/>
+              </a:ext>
+            </a:extLst>
+          </p:cNvPr>
+          <p:cNvCxnSpPr>
+            <a:cxnSpLocks/>
+            <a:stCxn id="12" idx="1"/>
+            <a:endCxn id="9" idx="2"/>
+          </p:cNvCxnSpPr>
+          <p:nvPr/>
+        </p:nvCxnSpPr>
+        <p:spPr>
+          <a:xfrm rot="10800000">
+            <a:off x="4266604" y="5535574"/>
+            <a:ext cx="424258" cy="576383"/>
+          </a:xfrm>
+          <a:prstGeom prst="bentConnector2">
+            <a:avLst/>
+          </a:prstGeom>
+          <a:ln>
+            <a:solidFill>
+              <a:srgbClr val="FF0000"/>
+            </a:solidFill>
+            <a:tailEnd type="triangle"/>
+          </a:ln>
+        </p:spPr>
+        <p:style>
+          <a:lnRef idx="1">
+            <a:schemeClr val="accent1"/>
+          </a:lnRef>
+          <a:fillRef idx="0">
+            <a:schemeClr val="accent1"/>
+          </a:fillRef>
+          <a:effectRef idx="0">
+            <a:schemeClr val="accent1"/>
+          </a:effectRef>
+          <a:fontRef idx="minor">
+            <a:schemeClr val="tx1"/>
+          </a:fontRef>
+        </p:style>
+      </p:cxnSp>
+      <p:pic>
+        <p:nvPicPr>
+          <p:cNvPr id="15" name="Picture 14">
+            <a:extLst>
+              <a:ext uri="{FF2B5EF4-FFF2-40B4-BE49-F238E27FC236}">
+                <a16:creationId xmlns:a16="http://schemas.microsoft.com/office/drawing/2014/main" id="{D8C13DE0-0AB8-4F7C-89AB-3778BEAD9361}"/>
+              </a:ext>
+            </a:extLst>
+          </p:cNvPr>
+          <p:cNvPicPr>
+            <a:picLocks noChangeAspect="1"/>
+          </p:cNvPicPr>
+          <p:nvPr/>
+        </p:nvPicPr>
+        <p:blipFill>
+          <a:blip r:embed="rId4"/>
+          <a:stretch>
+            <a:fillRect/>
+          </a:stretch>
+        </p:blipFill>
+        <p:spPr>
+          <a:xfrm>
+            <a:off x="3058883" y="1140496"/>
+            <a:ext cx="2873800" cy="3841079"/>
+          </a:xfrm>
+          <a:prstGeom prst="rect">
+            <a:avLst/>
+          </a:prstGeom>
+        </p:spPr>
+      </p:pic>
+      <p:pic>
+        <p:nvPicPr>
+          <p:cNvPr id="19" name="Picture 18">
+            <a:extLst>
+              <a:ext uri="{FF2B5EF4-FFF2-40B4-BE49-F238E27FC236}">
+                <a16:creationId xmlns:a16="http://schemas.microsoft.com/office/drawing/2014/main" id="{F6139D21-7BD8-451D-8A9D-88C6155831EF}"/>
+              </a:ext>
+            </a:extLst>
+          </p:cNvPr>
+          <p:cNvPicPr>
+            <a:picLocks noChangeAspect="1"/>
+          </p:cNvPicPr>
+          <p:nvPr/>
+        </p:nvPicPr>
+        <p:blipFill>
+          <a:blip r:embed="rId5"/>
+          <a:stretch>
+            <a:fillRect/>
+          </a:stretch>
+        </p:blipFill>
+        <p:spPr>
+          <a:xfrm>
+            <a:off x="9009422" y="1144938"/>
+            <a:ext cx="2873800" cy="3836637"/>
+          </a:xfrm>
+          <a:prstGeom prst="rect">
+            <a:avLst/>
+          </a:prstGeom>
+        </p:spPr>
+      </p:pic>
     </p:spTree>
     <p:extLst>
       <p:ext uri="{BB962C8B-B14F-4D97-AF65-F5344CB8AC3E}">
-        <p14:creationId xmlns:p14="http://schemas.microsoft.com/office/powerpoint/2010/main" val="4028263462"/>
+        <p14:creationId xmlns:p14="http://schemas.microsoft.com/office/powerpoint/2010/main" val="3573502216"/>
       </p:ext>
     </p:extLst>
   </p:cSld>

</xml_diff>

<commit_message>
put more results from manipulating the eig matrices. currently there is actually bad seperation when using all the data
</commit_message>
<xml_diff>
--- a/job_results.pptx
+++ b/job_results.pptx
@@ -188,7 +188,7 @@
   <pc:docChgLst>
     <pc:chgData name="Zhao Xiong" userId="5eba49e5-2895-4cd9-83e8-b3064fe76704" providerId="ADAL" clId="{B606E7B2-EFF5-418A-8639-9F7537C4DA50}"/>
     <pc:docChg chg="undo custSel addSld delSld modSld sldOrd">
-      <pc:chgData name="Zhao Xiong" userId="5eba49e5-2895-4cd9-83e8-b3064fe76704" providerId="ADAL" clId="{B606E7B2-EFF5-418A-8639-9F7537C4DA50}" dt="2022-05-16T16:44:54.579" v="3115" actId="20577"/>
+      <pc:chgData name="Zhao Xiong" userId="5eba49e5-2895-4cd9-83e8-b3064fe76704" providerId="ADAL" clId="{B606E7B2-EFF5-418A-8639-9F7537C4DA50}" dt="2022-05-18T12:02:19.606" v="3231" actId="20577"/>
       <pc:docMkLst>
         <pc:docMk/>
       </pc:docMkLst>
@@ -547,7 +547,7 @@
         </pc:sldMkLst>
       </pc:sldChg>
       <pc:sldChg chg="addSp delSp modSp add">
-        <pc:chgData name="Zhao Xiong" userId="5eba49e5-2895-4cd9-83e8-b3064fe76704" providerId="ADAL" clId="{B606E7B2-EFF5-418A-8639-9F7537C4DA50}" dt="2022-05-10T17:44:23.224" v="451" actId="1037"/>
+        <pc:chgData name="Zhao Xiong" userId="5eba49e5-2895-4cd9-83e8-b3064fe76704" providerId="ADAL" clId="{B606E7B2-EFF5-418A-8639-9F7537C4DA50}" dt="2022-05-18T11:37:55.589" v="3188" actId="20577"/>
         <pc:sldMkLst>
           <pc:docMk/>
           <pc:sldMk cId="4234346216" sldId="264"/>
@@ -569,7 +569,7 @@
           </ac:spMkLst>
         </pc:spChg>
         <pc:spChg chg="mod">
-          <ac:chgData name="Zhao Xiong" userId="5eba49e5-2895-4cd9-83e8-b3064fe76704" providerId="ADAL" clId="{B606E7B2-EFF5-418A-8639-9F7537C4DA50}" dt="2022-05-10T17:44:23.224" v="451" actId="1037"/>
+          <ac:chgData name="Zhao Xiong" userId="5eba49e5-2895-4cd9-83e8-b3064fe76704" providerId="ADAL" clId="{B606E7B2-EFF5-418A-8639-9F7537C4DA50}" dt="2022-05-18T11:37:10.434" v="3181" actId="122"/>
           <ac:spMkLst>
             <pc:docMk/>
             <pc:sldMk cId="4234346216" sldId="264"/>
@@ -616,6 +616,14 @@
             <ac:spMk id="13" creationId="{4EEECA04-5A1D-4294-ADD4-6F2DC3FCBA65}"/>
           </ac:spMkLst>
         </pc:spChg>
+        <pc:spChg chg="add mod">
+          <ac:chgData name="Zhao Xiong" userId="5eba49e5-2895-4cd9-83e8-b3064fe76704" providerId="ADAL" clId="{B606E7B2-EFF5-418A-8639-9F7537C4DA50}" dt="2022-05-18T11:37:55.589" v="3188" actId="20577"/>
+          <ac:spMkLst>
+            <pc:docMk/>
+            <pc:sldMk cId="4234346216" sldId="264"/>
+            <ac:spMk id="16" creationId="{FA6A6EDC-288F-4994-8F74-53B5E843DB4E}"/>
+          </ac:spMkLst>
+        </pc:spChg>
         <pc:picChg chg="mod">
           <ac:chgData name="Zhao Xiong" userId="5eba49e5-2895-4cd9-83e8-b3064fe76704" providerId="ADAL" clId="{B606E7B2-EFF5-418A-8639-9F7537C4DA50}" dt="2022-05-10T17:44:05.889" v="415" actId="1076"/>
           <ac:picMkLst>
@@ -633,7 +641,7 @@
           </ac:picMkLst>
         </pc:picChg>
         <pc:picChg chg="mod">
-          <ac:chgData name="Zhao Xiong" userId="5eba49e5-2895-4cd9-83e8-b3064fe76704" providerId="ADAL" clId="{B606E7B2-EFF5-418A-8639-9F7537C4DA50}" dt="2022-05-10T17:44:23.224" v="451" actId="1037"/>
+          <ac:chgData name="Zhao Xiong" userId="5eba49e5-2895-4cd9-83e8-b3064fe76704" providerId="ADAL" clId="{B606E7B2-EFF5-418A-8639-9F7537C4DA50}" dt="2022-05-18T11:37:04.312" v="3178" actId="1076"/>
           <ac:picMkLst>
             <pc:docMk/>
             <pc:sldMk cId="4234346216" sldId="264"/>
@@ -654,6 +662,14 @@
             <pc:docMk/>
             <pc:sldMk cId="4234346216" sldId="264"/>
             <ac:picMk id="14" creationId="{3DA7F854-AAAB-4B56-9326-1B55C404579F}"/>
+          </ac:picMkLst>
+        </pc:picChg>
+        <pc:picChg chg="add mod modCrop">
+          <ac:chgData name="Zhao Xiong" userId="5eba49e5-2895-4cd9-83e8-b3064fe76704" providerId="ADAL" clId="{B606E7B2-EFF5-418A-8639-9F7537C4DA50}" dt="2022-05-18T11:37:33.808" v="3184" actId="14100"/>
+          <ac:picMkLst>
+            <pc:docMk/>
+            <pc:sldMk cId="4234346216" sldId="264"/>
+            <ac:picMk id="15" creationId="{90798553-75ED-46C4-8190-7CFC55BFCF2D}"/>
           </ac:picMkLst>
         </pc:picChg>
       </pc:sldChg>
@@ -1177,6 +1193,53 @@
             <pc:docMk/>
             <pc:sldMk cId="1698151061" sldId="270"/>
             <ac:picMk id="5" creationId="{90D69D8F-FC27-487B-9B60-8B118DBE2D2D}"/>
+          </ac:picMkLst>
+        </pc:picChg>
+      </pc:sldChg>
+      <pc:sldChg chg="addSp modSp">
+        <pc:chgData name="Zhao Xiong" userId="5eba49e5-2895-4cd9-83e8-b3064fe76704" providerId="ADAL" clId="{B606E7B2-EFF5-418A-8639-9F7537C4DA50}" dt="2022-05-18T12:02:19.606" v="3231" actId="20577"/>
+        <pc:sldMkLst>
+          <pc:docMk/>
+          <pc:sldMk cId="422068206" sldId="271"/>
+        </pc:sldMkLst>
+        <pc:spChg chg="mod">
+          <ac:chgData name="Zhao Xiong" userId="5eba49e5-2895-4cd9-83e8-b3064fe76704" providerId="ADAL" clId="{B606E7B2-EFF5-418A-8639-9F7537C4DA50}" dt="2022-05-18T12:01:48.895" v="3196" actId="14100"/>
+          <ac:spMkLst>
+            <pc:docMk/>
+            <pc:sldMk cId="422068206" sldId="271"/>
+            <ac:spMk id="6" creationId="{9FAEEF44-D8A9-5807-B422-79C3A5FCA991}"/>
+          </ac:spMkLst>
+        </pc:spChg>
+        <pc:spChg chg="add mod">
+          <ac:chgData name="Zhao Xiong" userId="5eba49e5-2895-4cd9-83e8-b3064fe76704" providerId="ADAL" clId="{B606E7B2-EFF5-418A-8639-9F7537C4DA50}" dt="2022-05-18T12:01:45.802" v="3195" actId="14100"/>
+          <ac:spMkLst>
+            <pc:docMk/>
+            <pc:sldMk cId="422068206" sldId="271"/>
+            <ac:spMk id="7" creationId="{832D9CAD-3125-40E1-A7E7-BECEFA7EE20C}"/>
+          </ac:spMkLst>
+        </pc:spChg>
+        <pc:spChg chg="add mod">
+          <ac:chgData name="Zhao Xiong" userId="5eba49e5-2895-4cd9-83e8-b3064fe76704" providerId="ADAL" clId="{B606E7B2-EFF5-418A-8639-9F7537C4DA50}" dt="2022-05-18T12:02:19.606" v="3231" actId="20577"/>
+          <ac:spMkLst>
+            <pc:docMk/>
+            <pc:sldMk cId="422068206" sldId="271"/>
+            <ac:spMk id="8" creationId="{05474BF1-933C-4AA3-A6C9-40414702FF7B}"/>
+          </ac:spMkLst>
+        </pc:spChg>
+        <pc:picChg chg="add mod">
+          <ac:chgData name="Zhao Xiong" userId="5eba49e5-2895-4cd9-83e8-b3064fe76704" providerId="ADAL" clId="{B606E7B2-EFF5-418A-8639-9F7537C4DA50}" dt="2022-05-18T12:01:40.295" v="3192" actId="14100"/>
+          <ac:picMkLst>
+            <pc:docMk/>
+            <pc:sldMk cId="422068206" sldId="271"/>
+            <ac:picMk id="2" creationId="{71895F8B-3DB7-4574-8C2C-89E8C6F8D4E5}"/>
+          </ac:picMkLst>
+        </pc:picChg>
+        <pc:picChg chg="add mod">
+          <ac:chgData name="Zhao Xiong" userId="5eba49e5-2895-4cd9-83e8-b3064fe76704" providerId="ADAL" clId="{B606E7B2-EFF5-418A-8639-9F7537C4DA50}" dt="2022-05-18T12:01:41.615" v="3193" actId="1076"/>
+          <ac:picMkLst>
+            <pc:docMk/>
+            <pc:sldMk cId="422068206" sldId="271"/>
+            <ac:picMk id="3" creationId="{FBEB2A93-79A4-4B47-9B31-444DA377E107}"/>
           </ac:picMkLst>
         </pc:picChg>
       </pc:sldChg>
@@ -1267,7 +1330,7 @@
           <a:p>
             <a:fld id="{3F756EDF-0C8E-4F27-B2A4-7BBF4F0FD9CE}" type="datetimeFigureOut">
               <a:rPr lang="en-GB" smtClean="0"/>
-              <a:t>17/05/2022</a:t>
+              <a:t>18/05/2022</a:t>
             </a:fld>
             <a:endParaRPr lang="en-GB"/>
           </a:p>
@@ -1684,7 +1747,7 @@
           <a:p>
             <a:fld id="{B1B6DC73-6F54-48A7-AC0A-0EE4EE00B05A}" type="datetimeFigureOut">
               <a:rPr lang="en-GB" smtClean="0"/>
-              <a:t>17/05/2022</a:t>
+              <a:t>18/05/2022</a:t>
             </a:fld>
             <a:endParaRPr lang="en-GB"/>
           </a:p>
@@ -1884,7 +1947,7 @@
           <a:p>
             <a:fld id="{B1B6DC73-6F54-48A7-AC0A-0EE4EE00B05A}" type="datetimeFigureOut">
               <a:rPr lang="en-GB" smtClean="0"/>
-              <a:t>17/05/2022</a:t>
+              <a:t>18/05/2022</a:t>
             </a:fld>
             <a:endParaRPr lang="en-GB"/>
           </a:p>
@@ -2094,7 +2157,7 @@
           <a:p>
             <a:fld id="{B1B6DC73-6F54-48A7-AC0A-0EE4EE00B05A}" type="datetimeFigureOut">
               <a:rPr lang="en-GB" smtClean="0"/>
-              <a:t>17/05/2022</a:t>
+              <a:t>18/05/2022</a:t>
             </a:fld>
             <a:endParaRPr lang="en-GB"/>
           </a:p>
@@ -2294,7 +2357,7 @@
           <a:p>
             <a:fld id="{B1B6DC73-6F54-48A7-AC0A-0EE4EE00B05A}" type="datetimeFigureOut">
               <a:rPr lang="en-GB" smtClean="0"/>
-              <a:t>17/05/2022</a:t>
+              <a:t>18/05/2022</a:t>
             </a:fld>
             <a:endParaRPr lang="en-GB"/>
           </a:p>
@@ -2570,7 +2633,7 @@
           <a:p>
             <a:fld id="{B1B6DC73-6F54-48A7-AC0A-0EE4EE00B05A}" type="datetimeFigureOut">
               <a:rPr lang="en-GB" smtClean="0"/>
-              <a:t>17/05/2022</a:t>
+              <a:t>18/05/2022</a:t>
             </a:fld>
             <a:endParaRPr lang="en-GB"/>
           </a:p>
@@ -2838,7 +2901,7 @@
           <a:p>
             <a:fld id="{B1B6DC73-6F54-48A7-AC0A-0EE4EE00B05A}" type="datetimeFigureOut">
               <a:rPr lang="en-GB" smtClean="0"/>
-              <a:t>17/05/2022</a:t>
+              <a:t>18/05/2022</a:t>
             </a:fld>
             <a:endParaRPr lang="en-GB"/>
           </a:p>
@@ -3253,7 +3316,7 @@
           <a:p>
             <a:fld id="{B1B6DC73-6F54-48A7-AC0A-0EE4EE00B05A}" type="datetimeFigureOut">
               <a:rPr lang="en-GB" smtClean="0"/>
-              <a:t>17/05/2022</a:t>
+              <a:t>18/05/2022</a:t>
             </a:fld>
             <a:endParaRPr lang="en-GB"/>
           </a:p>
@@ -3395,7 +3458,7 @@
           <a:p>
             <a:fld id="{B1B6DC73-6F54-48A7-AC0A-0EE4EE00B05A}" type="datetimeFigureOut">
               <a:rPr lang="en-GB" smtClean="0"/>
-              <a:t>17/05/2022</a:t>
+              <a:t>18/05/2022</a:t>
             </a:fld>
             <a:endParaRPr lang="en-GB"/>
           </a:p>
@@ -3508,7 +3571,7 @@
           <a:p>
             <a:fld id="{B1B6DC73-6F54-48A7-AC0A-0EE4EE00B05A}" type="datetimeFigureOut">
               <a:rPr lang="en-GB" smtClean="0"/>
-              <a:t>17/05/2022</a:t>
+              <a:t>18/05/2022</a:t>
             </a:fld>
             <a:endParaRPr lang="en-GB"/>
           </a:p>
@@ -3821,7 +3884,7 @@
           <a:p>
             <a:fld id="{B1B6DC73-6F54-48A7-AC0A-0EE4EE00B05A}" type="datetimeFigureOut">
               <a:rPr lang="en-GB" smtClean="0"/>
-              <a:t>17/05/2022</a:t>
+              <a:t>18/05/2022</a:t>
             </a:fld>
             <a:endParaRPr lang="en-GB"/>
           </a:p>
@@ -4110,7 +4173,7 @@
           <a:p>
             <a:fld id="{B1B6DC73-6F54-48A7-AC0A-0EE4EE00B05A}" type="datetimeFigureOut">
               <a:rPr lang="en-GB" smtClean="0"/>
-              <a:t>17/05/2022</a:t>
+              <a:t>18/05/2022</a:t>
             </a:fld>
             <a:endParaRPr lang="en-GB"/>
           </a:p>
@@ -4353,7 +4416,7 @@
           <a:p>
             <a:fld id="{B1B6DC73-6F54-48A7-AC0A-0EE4EE00B05A}" type="datetimeFigureOut">
               <a:rPr lang="en-GB" smtClean="0"/>
-              <a:t>17/05/2022</a:t>
+              <a:t>18/05/2022</a:t>
             </a:fld>
             <a:endParaRPr lang="en-GB"/>
           </a:p>
@@ -5452,8 +5515,8 @@
         </p:blipFill>
         <p:spPr>
           <a:xfrm>
-            <a:off x="1398352" y="3737498"/>
-            <a:ext cx="2249976" cy="2983245"/>
+            <a:off x="1502888" y="3728890"/>
+            <a:ext cx="1973955" cy="2983245"/>
           </a:xfrm>
           <a:prstGeom prst="rect">
             <a:avLst/>
@@ -5474,8 +5537,8 @@
         </p:nvSpPr>
         <p:spPr>
           <a:xfrm>
-            <a:off x="2066445" y="6663562"/>
-            <a:ext cx="1754042" cy="276999"/>
+            <a:off x="1711757" y="6663562"/>
+            <a:ext cx="1765086" cy="276999"/>
           </a:xfrm>
           <a:prstGeom prst="rect">
             <a:avLst/>
@@ -5488,6 +5551,7 @@
           </a:bodyPr>
           <a:lstStyle/>
           <a:p>
+            <a:pPr algn="ctr"/>
             <a:r>
               <a:rPr lang="en-NZ" sz="1200" b="1" dirty="0"/>
               <a:t>9300 rows (33.3%)</a:t>
@@ -5674,6 +5738,78 @@
             <a:r>
               <a:rPr lang="en-NZ" sz="1200" b="1" dirty="0"/>
               <a:t>28000 rows (100%)</a:t>
+            </a:r>
+            <a:endParaRPr lang="en-GB" sz="1200" b="1" dirty="0"/>
+          </a:p>
+        </p:txBody>
+      </p:sp>
+      <p:pic>
+        <p:nvPicPr>
+          <p:cNvPr id="15" name="Picture 14">
+            <a:extLst>
+              <a:ext uri="{FF2B5EF4-FFF2-40B4-BE49-F238E27FC236}">
+                <a16:creationId xmlns:a16="http://schemas.microsoft.com/office/drawing/2014/main" id="{90798553-75ED-46C4-8190-7CFC55BFCF2D}"/>
+              </a:ext>
+            </a:extLst>
+          </p:cNvPr>
+          <p:cNvPicPr>
+            <a:picLocks noChangeAspect="1"/>
+          </p:cNvPicPr>
+          <p:nvPr/>
+        </p:nvPicPr>
+        <p:blipFill rotWithShape="1">
+          <a:blip r:embed="rId6">
+            <a:extLst>
+              <a:ext uri="{28A0092B-C50C-407E-A947-70E740481C1C}">
+                <a14:useLocalDpi xmlns:a14="http://schemas.microsoft.com/office/drawing/2010/main" val="0"/>
+              </a:ext>
+            </a:extLst>
+          </a:blip>
+          <a:srcRect r="54446" b="5955"/>
+          <a:stretch/>
+        </p:blipFill>
+        <p:spPr>
+          <a:xfrm>
+            <a:off x="3874720" y="3728889"/>
+            <a:ext cx="2431837" cy="2983245"/>
+          </a:xfrm>
+          <a:prstGeom prst="rect">
+            <a:avLst/>
+          </a:prstGeom>
+        </p:spPr>
+      </p:pic>
+      <p:sp>
+        <p:nvSpPr>
+          <p:cNvPr id="16" name="TextBox 15">
+            <a:extLst>
+              <a:ext uri="{FF2B5EF4-FFF2-40B4-BE49-F238E27FC236}">
+                <a16:creationId xmlns:a16="http://schemas.microsoft.com/office/drawing/2014/main" id="{FA6A6EDC-288F-4994-8F74-53B5E843DB4E}"/>
+              </a:ext>
+            </a:extLst>
+          </p:cNvPr>
+          <p:cNvSpPr txBox="1"/>
+          <p:nvPr/>
+        </p:nvSpPr>
+        <p:spPr>
+          <a:xfrm>
+            <a:off x="4076338" y="6630144"/>
+            <a:ext cx="1765086" cy="276999"/>
+          </a:xfrm>
+          <a:prstGeom prst="rect">
+            <a:avLst/>
+          </a:prstGeom>
+          <a:noFill/>
+        </p:spPr>
+        <p:txBody>
+          <a:bodyPr wrap="square" rtlCol="0">
+            <a:spAutoFit/>
+          </a:bodyPr>
+          <a:lstStyle/>
+          <a:p>
+            <a:pPr algn="ctr"/>
+            <a:r>
+              <a:rPr lang="en-NZ" sz="1200" b="1" dirty="0"/>
+              <a:t>9300 rows (20%)</a:t>
             </a:r>
             <a:endParaRPr lang="en-GB" sz="1200" b="1" dirty="0"/>
           </a:p>
@@ -7307,12 +7443,12 @@
           <a:graphicData uri="http://schemas.openxmlformats.org/presentationml/2006/ole">
             <mc:AlternateContent xmlns:mc="http://schemas.openxmlformats.org/markup-compatibility/2006">
               <mc:Choice xmlns:v="urn:schemas-microsoft-com:vml" Requires="v">
-                <p:oleObj name="Bitmap Image" r:id="rId2" imgW="3444120" imgH="5486400" progId="Paint.Picture">
+                <p:oleObj spid="_x0000_s1026" name="Bitmap Image" r:id="rId3" imgW="3444120" imgH="5486400" progId="Paint.Picture">
                   <p:embed/>
                 </p:oleObj>
               </mc:Choice>
               <mc:Fallback>
-                <p:oleObj name="Bitmap Image" r:id="rId2" imgW="3444120" imgH="5486400" progId="Paint.Picture">
+                <p:oleObj name="Bitmap Image" r:id="rId3" imgW="3444120" imgH="5486400" progId="Paint.Picture">
                   <p:embed/>
                   <p:pic>
                     <p:nvPicPr>
@@ -7327,7 +7463,7 @@
                       <p:nvPr/>
                     </p:nvPicPr>
                     <p:blipFill>
-                      <a:blip r:embed="rId3"/>
+                      <a:blip r:embed="rId4"/>
                       <a:stretch>
                         <a:fillRect/>
                       </a:stretch>
@@ -7398,8 +7534,8 @@
         </p:nvSpPr>
         <p:spPr>
           <a:xfrm>
-            <a:off x="207961" y="698010"/>
-            <a:ext cx="2613392" cy="369332"/>
+            <a:off x="207960" y="698010"/>
+            <a:ext cx="2613393" cy="369332"/>
           </a:xfrm>
           <a:prstGeom prst="rect">
             <a:avLst/>
@@ -7416,6 +7552,144 @@
             <a:r>
               <a:rPr lang="en-NZ" sz="1200" b="1" dirty="0"/>
               <a:t>Limited range for alpha to avoid large outliers seen at larger alphas</a:t>
+            </a:r>
+            <a:endParaRPr lang="en-GB" sz="1200" b="1" dirty="0"/>
+          </a:p>
+        </p:txBody>
+      </p:sp>
+      <p:pic>
+        <p:nvPicPr>
+          <p:cNvPr id="2" name="Picture 1">
+            <a:extLst>
+              <a:ext uri="{FF2B5EF4-FFF2-40B4-BE49-F238E27FC236}">
+                <a16:creationId xmlns:a16="http://schemas.microsoft.com/office/drawing/2014/main" id="{71895F8B-3DB7-4574-8C2C-89E8C6F8D4E5}"/>
+              </a:ext>
+            </a:extLst>
+          </p:cNvPr>
+          <p:cNvPicPr>
+            <a:picLocks noChangeAspect="1"/>
+          </p:cNvPicPr>
+          <p:nvPr/>
+        </p:nvPicPr>
+        <p:blipFill>
+          <a:blip r:embed="rId5"/>
+          <a:stretch>
+            <a:fillRect/>
+          </a:stretch>
+        </p:blipFill>
+        <p:spPr>
+          <a:xfrm>
+            <a:off x="2934804" y="1062424"/>
+            <a:ext cx="2690585" cy="4162160"/>
+          </a:xfrm>
+          <a:prstGeom prst="rect">
+            <a:avLst/>
+          </a:prstGeom>
+        </p:spPr>
+      </p:pic>
+      <p:sp>
+        <p:nvSpPr>
+          <p:cNvPr id="7" name="TextBox 6">
+            <a:extLst>
+              <a:ext uri="{FF2B5EF4-FFF2-40B4-BE49-F238E27FC236}">
+                <a16:creationId xmlns:a16="http://schemas.microsoft.com/office/drawing/2014/main" id="{832D9CAD-3125-40E1-A7E7-BECEFA7EE20C}"/>
+              </a:ext>
+            </a:extLst>
+          </p:cNvPr>
+          <p:cNvSpPr txBox="1"/>
+          <p:nvPr/>
+        </p:nvSpPr>
+        <p:spPr>
+          <a:xfrm>
+            <a:off x="2934803" y="698010"/>
+            <a:ext cx="2690586" cy="369332"/>
+          </a:xfrm>
+          <a:prstGeom prst="rect">
+            <a:avLst/>
+          </a:prstGeom>
+          <a:noFill/>
+        </p:spPr>
+        <p:txBody>
+          <a:bodyPr wrap="square" lIns="0" tIns="0" rIns="0" bIns="0" rtlCol="0">
+            <a:spAutoFit/>
+          </a:bodyPr>
+          <a:lstStyle/>
+          <a:p>
+            <a:pPr algn="ctr"/>
+            <a:r>
+              <a:rPr lang="en-NZ" sz="1200" b="1" dirty="0"/>
+              <a:t>Filter out large values from eigen decomposition</a:t>
+            </a:r>
+            <a:endParaRPr lang="en-GB" sz="1200" b="1" dirty="0"/>
+          </a:p>
+        </p:txBody>
+      </p:sp>
+      <p:pic>
+        <p:nvPicPr>
+          <p:cNvPr id="3" name="Picture 2">
+            <a:extLst>
+              <a:ext uri="{FF2B5EF4-FFF2-40B4-BE49-F238E27FC236}">
+                <a16:creationId xmlns:a16="http://schemas.microsoft.com/office/drawing/2014/main" id="{FBEB2A93-79A4-4B47-9B31-444DA377E107}"/>
+              </a:ext>
+            </a:extLst>
+          </p:cNvPr>
+          <p:cNvPicPr>
+            <a:picLocks noChangeAspect="1"/>
+          </p:cNvPicPr>
+          <p:nvPr/>
+        </p:nvPicPr>
+        <p:blipFill>
+          <a:blip r:embed="rId6"/>
+          <a:stretch>
+            <a:fillRect/>
+          </a:stretch>
+        </p:blipFill>
+        <p:spPr>
+          <a:xfrm>
+            <a:off x="5738839" y="1062424"/>
+            <a:ext cx="2607330" cy="4162160"/>
+          </a:xfrm>
+          <a:prstGeom prst="rect">
+            <a:avLst/>
+          </a:prstGeom>
+        </p:spPr>
+      </p:pic>
+      <p:sp>
+        <p:nvSpPr>
+          <p:cNvPr id="8" name="TextBox 7">
+            <a:extLst>
+              <a:ext uri="{FF2B5EF4-FFF2-40B4-BE49-F238E27FC236}">
+                <a16:creationId xmlns:a16="http://schemas.microsoft.com/office/drawing/2014/main" id="{05474BF1-933C-4AA3-A6C9-40414702FF7B}"/>
+              </a:ext>
+            </a:extLst>
+          </p:cNvPr>
+          <p:cNvSpPr txBox="1"/>
+          <p:nvPr/>
+        </p:nvSpPr>
+        <p:spPr>
+          <a:xfrm>
+            <a:off x="5738838" y="698010"/>
+            <a:ext cx="2607331" cy="184666"/>
+          </a:xfrm>
+          <a:prstGeom prst="rect">
+            <a:avLst/>
+          </a:prstGeom>
+          <a:noFill/>
+        </p:spPr>
+        <p:txBody>
+          <a:bodyPr wrap="square" lIns="0" tIns="0" rIns="0" bIns="0" rtlCol="0">
+            <a:spAutoFit/>
+          </a:bodyPr>
+          <a:lstStyle/>
+          <a:p>
+            <a:pPr algn="ctr"/>
+            <a:r>
+              <a:rPr lang="en-NZ" sz="1200" b="1" dirty="0"/>
+              <a:t>Use shortest </a:t>
+            </a:r>
+            <a:r>
+              <a:rPr lang="en-NZ" sz="1200" b="1"/>
+              <a:t>path tree instead</a:t>
             </a:r>
             <a:endParaRPr lang="en-GB" sz="1200" b="1" dirty="0"/>
           </a:p>

</xml_diff>

<commit_message>
compare covariance matrices of 10% vs full data run
</commit_message>
<xml_diff>
--- a/job_results.pptx
+++ b/job_results.pptx
@@ -5,7 +5,7 @@
     <p:sldMasterId id="2147483648" r:id="rId1"/>
   </p:sldMasterIdLst>
   <p:notesMasterIdLst>
-    <p:notesMasterId r:id="rId15"/>
+    <p:notesMasterId r:id="rId16"/>
   </p:notesMasterIdLst>
   <p:sldIdLst>
     <p:sldId id="256" r:id="rId2"/>
@@ -16,11 +16,12 @@
     <p:sldId id="267" r:id="rId7"/>
     <p:sldId id="270" r:id="rId8"/>
     <p:sldId id="271" r:id="rId9"/>
-    <p:sldId id="266" r:id="rId10"/>
-    <p:sldId id="258" r:id="rId11"/>
-    <p:sldId id="259" r:id="rId12"/>
-    <p:sldId id="263" r:id="rId13"/>
-    <p:sldId id="269" r:id="rId14"/>
+    <p:sldId id="272" r:id="rId10"/>
+    <p:sldId id="266" r:id="rId11"/>
+    <p:sldId id="258" r:id="rId12"/>
+    <p:sldId id="259" r:id="rId13"/>
+    <p:sldId id="263" r:id="rId14"/>
+    <p:sldId id="269" r:id="rId15"/>
   </p:sldIdLst>
   <p:sldSz cx="12192000" cy="6858000"/>
   <p:notesSz cx="6858000" cy="9144000"/>
@@ -188,7 +189,7 @@
   <pc:docChgLst>
     <pc:chgData name="Zhao Xiong" userId="5eba49e5-2895-4cd9-83e8-b3064fe76704" providerId="ADAL" clId="{B606E7B2-EFF5-418A-8639-9F7537C4DA50}"/>
     <pc:docChg chg="undo custSel addSld delSld modSld sldOrd">
-      <pc:chgData name="Zhao Xiong" userId="5eba49e5-2895-4cd9-83e8-b3064fe76704" providerId="ADAL" clId="{B606E7B2-EFF5-418A-8639-9F7537C4DA50}" dt="2022-05-18T12:02:19.606" v="3231" actId="20577"/>
+      <pc:chgData name="Zhao Xiong" userId="5eba49e5-2895-4cd9-83e8-b3064fe76704" providerId="ADAL" clId="{B606E7B2-EFF5-418A-8639-9F7537C4DA50}" dt="2022-05-18T13:05:55.190" v="3341" actId="20577"/>
       <pc:docMkLst>
         <pc:docMk/>
       </pc:docMkLst>
@@ -1110,7 +1111,7 @@
         </pc:spChg>
       </pc:sldChg>
       <pc:sldChg chg="addSp delSp modSp add">
-        <pc:chgData name="Zhao Xiong" userId="5eba49e5-2895-4cd9-83e8-b3064fe76704" providerId="ADAL" clId="{B606E7B2-EFF5-418A-8639-9F7537C4DA50}" dt="2022-05-16T16:44:54.579" v="3115" actId="20577"/>
+        <pc:chgData name="Zhao Xiong" userId="5eba49e5-2895-4cd9-83e8-b3064fe76704" providerId="ADAL" clId="{B606E7B2-EFF5-418A-8639-9F7537C4DA50}" dt="2022-05-18T13:05:09.355" v="3233"/>
         <pc:sldMkLst>
           <pc:docMk/>
           <pc:sldMk cId="1698151061" sldId="270"/>
@@ -1179,6 +1180,14 @@
             <ac:spMk id="11" creationId="{60D07C7C-7298-4369-A2A4-84175236B79F}"/>
           </ac:spMkLst>
         </pc:spChg>
+        <pc:picChg chg="add del">
+          <ac:chgData name="Zhao Xiong" userId="5eba49e5-2895-4cd9-83e8-b3064fe76704" providerId="ADAL" clId="{B606E7B2-EFF5-418A-8639-9F7537C4DA50}" dt="2022-05-18T13:05:09.355" v="3233"/>
+          <ac:picMkLst>
+            <pc:docMk/>
+            <pc:sldMk cId="1698151061" sldId="270"/>
+            <ac:picMk id="2" creationId="{ADB13C92-DC08-45EF-AB5A-61F1B0C5FBDE}"/>
+          </ac:picMkLst>
+        </pc:picChg>
         <pc:picChg chg="add mod">
           <ac:chgData name="Zhao Xiong" userId="5eba49e5-2895-4cd9-83e8-b3064fe76704" providerId="ADAL" clId="{B606E7B2-EFF5-418A-8639-9F7537C4DA50}" dt="2022-05-16T16:44:49.697" v="3105" actId="1076"/>
           <ac:picMkLst>
@@ -1196,8 +1205,8 @@
           </ac:picMkLst>
         </pc:picChg>
       </pc:sldChg>
-      <pc:sldChg chg="addSp modSp">
-        <pc:chgData name="Zhao Xiong" userId="5eba49e5-2895-4cd9-83e8-b3064fe76704" providerId="ADAL" clId="{B606E7B2-EFF5-418A-8639-9F7537C4DA50}" dt="2022-05-18T12:02:19.606" v="3231" actId="20577"/>
+      <pc:sldChg chg="addSp delSp modSp">
+        <pc:chgData name="Zhao Xiong" userId="5eba49e5-2895-4cd9-83e8-b3064fe76704" providerId="ADAL" clId="{B606E7B2-EFF5-418A-8639-9F7537C4DA50}" dt="2022-05-18T13:05:13.189" v="3235"/>
         <pc:sldMkLst>
           <pc:docMk/>
           <pc:sldMk cId="422068206" sldId="271"/>
@@ -1240,6 +1249,61 @@
             <pc:docMk/>
             <pc:sldMk cId="422068206" sldId="271"/>
             <ac:picMk id="3" creationId="{FBEB2A93-79A4-4B47-9B31-444DA377E107}"/>
+          </ac:picMkLst>
+        </pc:picChg>
+        <pc:picChg chg="add del">
+          <ac:chgData name="Zhao Xiong" userId="5eba49e5-2895-4cd9-83e8-b3064fe76704" providerId="ADAL" clId="{B606E7B2-EFF5-418A-8639-9F7537C4DA50}" dt="2022-05-18T13:05:13.189" v="3235"/>
+          <ac:picMkLst>
+            <pc:docMk/>
+            <pc:sldMk cId="422068206" sldId="271"/>
+            <ac:picMk id="9" creationId="{3C249507-55BC-47E8-A4AA-64722CFDC657}"/>
+          </ac:picMkLst>
+        </pc:picChg>
+      </pc:sldChg>
+      <pc:sldChg chg="addSp delSp modSp add">
+        <pc:chgData name="Zhao Xiong" userId="5eba49e5-2895-4cd9-83e8-b3064fe76704" providerId="ADAL" clId="{B606E7B2-EFF5-418A-8639-9F7537C4DA50}" dt="2022-05-18T13:05:55.190" v="3341" actId="20577"/>
+        <pc:sldMkLst>
+          <pc:docMk/>
+          <pc:sldMk cId="3841447951" sldId="272"/>
+        </pc:sldMkLst>
+        <pc:spChg chg="del">
+          <ac:chgData name="Zhao Xiong" userId="5eba49e5-2895-4cd9-83e8-b3064fe76704" providerId="ADAL" clId="{B606E7B2-EFF5-418A-8639-9F7537C4DA50}" dt="2022-05-18T13:05:16.974" v="3239" actId="478"/>
+          <ac:spMkLst>
+            <pc:docMk/>
+            <pc:sldMk cId="3841447951" sldId="272"/>
+            <ac:spMk id="2" creationId="{FE6EEEB4-105E-4F90-9513-54649F013305}"/>
+          </ac:spMkLst>
+        </pc:spChg>
+        <pc:spChg chg="del">
+          <ac:chgData name="Zhao Xiong" userId="5eba49e5-2895-4cd9-83e8-b3064fe76704" providerId="ADAL" clId="{B606E7B2-EFF5-418A-8639-9F7537C4DA50}" dt="2022-05-18T13:05:17.814" v="3240" actId="478"/>
+          <ac:spMkLst>
+            <pc:docMk/>
+            <pc:sldMk cId="3841447951" sldId="272"/>
+            <ac:spMk id="3" creationId="{B50A2E20-B392-4F77-ABFB-0721EEC0CC79}"/>
+          </ac:spMkLst>
+        </pc:spChg>
+        <pc:spChg chg="add mod">
+          <ac:chgData name="Zhao Xiong" userId="5eba49e5-2895-4cd9-83e8-b3064fe76704" providerId="ADAL" clId="{B606E7B2-EFF5-418A-8639-9F7537C4DA50}" dt="2022-05-18T13:05:55.190" v="3341" actId="20577"/>
+          <ac:spMkLst>
+            <pc:docMk/>
+            <pc:sldMk cId="3841447951" sldId="272"/>
+            <ac:spMk id="6" creationId="{EEE3435B-843F-4AEE-80B3-F1F68C324391}"/>
+          </ac:spMkLst>
+        </pc:spChg>
+        <pc:picChg chg="add del">
+          <ac:chgData name="Zhao Xiong" userId="5eba49e5-2895-4cd9-83e8-b3064fe76704" providerId="ADAL" clId="{B606E7B2-EFF5-418A-8639-9F7537C4DA50}" dt="2022-05-18T13:05:15.560" v="3238"/>
+          <ac:picMkLst>
+            <pc:docMk/>
+            <pc:sldMk cId="3841447951" sldId="272"/>
+            <ac:picMk id="4" creationId="{239C159C-69D5-4817-8184-82B7A92D3945}"/>
+          </ac:picMkLst>
+        </pc:picChg>
+        <pc:picChg chg="add mod">
+          <ac:chgData name="Zhao Xiong" userId="5eba49e5-2895-4cd9-83e8-b3064fe76704" providerId="ADAL" clId="{B606E7B2-EFF5-418A-8639-9F7537C4DA50}" dt="2022-05-18T13:05:29.077" v="3246" actId="1076"/>
+          <ac:picMkLst>
+            <pc:docMk/>
+            <pc:sldMk cId="3841447951" sldId="272"/>
+            <ac:picMk id="5" creationId="{AFE9CAA6-BF7E-469A-A974-23ABAD91CE1F}"/>
           </ac:picMkLst>
         </pc:picChg>
       </pc:sldChg>
@@ -4986,7 +5050,78 @@
           <p:cNvPr id="5" name="Picture 4">
             <a:extLst>
               <a:ext uri="{FF2B5EF4-FFF2-40B4-BE49-F238E27FC236}">
-                <a16:creationId xmlns:a16="http://schemas.microsoft.com/office/drawing/2014/main" id="{57F5CD76-A121-47E7-8D5C-78EB781D67BC}"/>
+                <a16:creationId xmlns:a16="http://schemas.microsoft.com/office/drawing/2014/main" id="{2BAC2202-805B-4DC3-A3C7-C9CC97599E10}"/>
+              </a:ext>
+            </a:extLst>
+          </p:cNvPr>
+          <p:cNvPicPr>
+            <a:picLocks noChangeAspect="1"/>
+          </p:cNvPicPr>
+          <p:nvPr/>
+        </p:nvPicPr>
+        <p:blipFill rotWithShape="1">
+          <a:blip r:embed="rId2">
+            <a:extLst>
+              <a:ext uri="{28A0092B-C50C-407E-A947-70E740481C1C}">
+                <a14:useLocalDpi xmlns:a14="http://schemas.microsoft.com/office/drawing/2010/main" val="0"/>
+              </a:ext>
+            </a:extLst>
+          </a:blip>
+          <a:srcRect r="54446"/>
+          <a:stretch/>
+        </p:blipFill>
+        <p:spPr>
+          <a:xfrm>
+            <a:off x="76201" y="1140496"/>
+            <a:ext cx="2982682" cy="3890687"/>
+          </a:xfrm>
+          <a:prstGeom prst="rect">
+            <a:avLst/>
+          </a:prstGeom>
+        </p:spPr>
+      </p:pic>
+      <p:sp>
+        <p:nvSpPr>
+          <p:cNvPr id="6" name="TextBox 5">
+            <a:extLst>
+              <a:ext uri="{FF2B5EF4-FFF2-40B4-BE49-F238E27FC236}">
+                <a16:creationId xmlns:a16="http://schemas.microsoft.com/office/drawing/2014/main" id="{108BEBBF-0CC4-49CA-B7B2-9D4B22059FB3}"/>
+              </a:ext>
+            </a:extLst>
+          </p:cNvPr>
+          <p:cNvSpPr txBox="1"/>
+          <p:nvPr/>
+        </p:nvSpPr>
+        <p:spPr>
+          <a:xfrm>
+            <a:off x="213989" y="493362"/>
+            <a:ext cx="10571201" cy="369332"/>
+          </a:xfrm>
+          <a:prstGeom prst="rect">
+            <a:avLst/>
+          </a:prstGeom>
+          <a:noFill/>
+        </p:spPr>
+        <p:txBody>
+          <a:bodyPr wrap="square" rtlCol="0">
+            <a:spAutoFit/>
+          </a:bodyPr>
+          <a:lstStyle/>
+          <a:p>
+            <a:r>
+              <a:rPr lang="en-NZ" b="1" dirty="0"/>
+              <a:t>Handling abnormally high distance values in distance matrix (test on 20% subset ~5600 rows)</a:t>
+            </a:r>
+            <a:endParaRPr lang="en-GB" b="1" dirty="0"/>
+          </a:p>
+        </p:txBody>
+      </p:sp>
+      <p:pic>
+        <p:nvPicPr>
+          <p:cNvPr id="2" name="Picture 1">
+            <a:extLst>
+              <a:ext uri="{FF2B5EF4-FFF2-40B4-BE49-F238E27FC236}">
+                <a16:creationId xmlns:a16="http://schemas.microsoft.com/office/drawing/2014/main" id="{0FA7BFA3-93B6-4DD8-BF5C-5441A83F4695}"/>
               </a:ext>
             </a:extLst>
           </p:cNvPr>
@@ -4996,21 +5131,15 @@
           <p:nvPr/>
         </p:nvPicPr>
         <p:blipFill>
-          <a:blip r:embed="rId2">
-            <a:extLst>
-              <a:ext uri="{28A0092B-C50C-407E-A947-70E740481C1C}">
-                <a14:useLocalDpi xmlns:a14="http://schemas.microsoft.com/office/drawing/2010/main" val="0"/>
-              </a:ext>
-            </a:extLst>
-          </a:blip>
+          <a:blip r:embed="rId3"/>
           <a:stretch>
             <a:fillRect/>
           </a:stretch>
         </p:blipFill>
         <p:spPr>
           <a:xfrm>
-            <a:off x="0" y="369332"/>
-            <a:ext cx="12192000" cy="6510995"/>
+            <a:off x="6041565" y="1140496"/>
+            <a:ext cx="2873800" cy="3841079"/>
           </a:xfrm>
           <a:prstGeom prst="rect">
             <a:avLst/>
@@ -5019,10 +5148,10 @@
       </p:pic>
       <p:sp>
         <p:nvSpPr>
-          <p:cNvPr id="6" name="TextBox 5">
-            <a:extLst>
-              <a:ext uri="{FF2B5EF4-FFF2-40B4-BE49-F238E27FC236}">
-                <a16:creationId xmlns:a16="http://schemas.microsoft.com/office/drawing/2014/main" id="{979AE2EC-4AA9-4D1C-9817-4D0290540D4D}"/>
+          <p:cNvPr id="8" name="TextBox 7">
+            <a:extLst>
+              <a:ext uri="{FF2B5EF4-FFF2-40B4-BE49-F238E27FC236}">
+                <a16:creationId xmlns:a16="http://schemas.microsoft.com/office/drawing/2014/main" id="{846D2B52-EEE0-4075-A79B-6528659C5996}"/>
               </a:ext>
             </a:extLst>
           </p:cNvPr>
@@ -5031,32 +5160,335 @@
         </p:nvSpPr>
         <p:spPr>
           <a:xfrm>
-            <a:off x="0" y="-9525"/>
-            <a:ext cx="7275589" cy="369332"/>
+            <a:off x="234218" y="4981575"/>
+            <a:ext cx="2099408" cy="369332"/>
           </a:xfrm>
           <a:prstGeom prst="rect">
             <a:avLst/>
           </a:prstGeom>
-          <a:noFill/>
-        </p:spPr>
-        <p:txBody>
-          <a:bodyPr wrap="square" rtlCol="0">
+          <a:solidFill>
+            <a:schemeClr val="bg1"/>
+          </a:solidFill>
+        </p:spPr>
+        <p:txBody>
+          <a:bodyPr wrap="square" lIns="0" tIns="0" rIns="0" bIns="0" rtlCol="0">
             <a:spAutoFit/>
           </a:bodyPr>
           <a:lstStyle/>
           <a:p>
-            <a:r>
-              <a:rPr lang="en-NZ" b="1" dirty="0"/>
-              <a:t>All 10 combination of 10% subset runs</a:t>
-            </a:r>
-            <a:endParaRPr lang="en-GB" b="1" dirty="0"/>
-          </a:p>
-        </p:txBody>
-      </p:sp>
+            <a:pPr algn="ctr"/>
+            <a:r>
+              <a:rPr lang="en-NZ" sz="1200" b="1" dirty="0"/>
+              <a:t>1) Original </a:t>
+            </a:r>
+          </a:p>
+          <a:p>
+            <a:pPr algn="ctr"/>
+            <a:r>
+              <a:rPr lang="en-NZ" sz="1200" b="1" dirty="0"/>
+              <a:t>(Minimum Spanning Tree)</a:t>
+            </a:r>
+            <a:endParaRPr lang="en-GB" sz="1200" b="1" dirty="0"/>
+          </a:p>
+        </p:txBody>
+      </p:sp>
+      <p:sp>
+        <p:nvSpPr>
+          <p:cNvPr id="9" name="TextBox 8">
+            <a:extLst>
+              <a:ext uri="{FF2B5EF4-FFF2-40B4-BE49-F238E27FC236}">
+                <a16:creationId xmlns:a16="http://schemas.microsoft.com/office/drawing/2014/main" id="{159ECB6D-8197-42C9-9B08-115C0CB6E983}"/>
+              </a:ext>
+            </a:extLst>
+          </p:cNvPr>
+          <p:cNvSpPr txBox="1"/>
+          <p:nvPr/>
+        </p:nvSpPr>
+        <p:spPr>
+          <a:xfrm>
+            <a:off x="3275407" y="4981575"/>
+            <a:ext cx="1982394" cy="553998"/>
+          </a:xfrm>
+          <a:prstGeom prst="rect">
+            <a:avLst/>
+          </a:prstGeom>
+          <a:solidFill>
+            <a:schemeClr val="bg1"/>
+          </a:solidFill>
+        </p:spPr>
+        <p:txBody>
+          <a:bodyPr wrap="square" lIns="0" tIns="0" rIns="0" bIns="0" rtlCol="0">
+            <a:spAutoFit/>
+          </a:bodyPr>
+          <a:lstStyle/>
+          <a:p>
+            <a:pPr algn="ctr"/>
+            <a:r>
+              <a:rPr lang="en-NZ" sz="1200" b="1" dirty="0"/>
+              <a:t>2) Filter out large values in </a:t>
+            </a:r>
+            <a:r>
+              <a:rPr lang="en-NZ" sz="1200" b="1" dirty="0" err="1"/>
+              <a:t>cPC</a:t>
+            </a:r>
+            <a:r>
+              <a:rPr lang="en-NZ" sz="1200" b="1" dirty="0"/>
+              <a:t> space (set values above 3sd as the median)</a:t>
+            </a:r>
+            <a:endParaRPr lang="en-GB" sz="1200" b="1" dirty="0"/>
+          </a:p>
+        </p:txBody>
+      </p:sp>
+      <p:sp>
+        <p:nvSpPr>
+          <p:cNvPr id="10" name="TextBox 9">
+            <a:extLst>
+              <a:ext uri="{FF2B5EF4-FFF2-40B4-BE49-F238E27FC236}">
+                <a16:creationId xmlns:a16="http://schemas.microsoft.com/office/drawing/2014/main" id="{D67F0F88-F469-4158-8F13-A89F610E665A}"/>
+              </a:ext>
+            </a:extLst>
+          </p:cNvPr>
+          <p:cNvSpPr txBox="1"/>
+          <p:nvPr/>
+        </p:nvSpPr>
+        <p:spPr>
+          <a:xfrm>
+            <a:off x="6135621" y="4981575"/>
+            <a:ext cx="2227330" cy="369332"/>
+          </a:xfrm>
+          <a:prstGeom prst="rect">
+            <a:avLst/>
+          </a:prstGeom>
+          <a:solidFill>
+            <a:schemeClr val="bg1"/>
+          </a:solidFill>
+        </p:spPr>
+        <p:txBody>
+          <a:bodyPr wrap="square" lIns="0" tIns="0" rIns="0" bIns="0" rtlCol="0">
+            <a:spAutoFit/>
+          </a:bodyPr>
+          <a:lstStyle/>
+          <a:p>
+            <a:pPr algn="ctr"/>
+            <a:r>
+              <a:rPr lang="en-NZ" sz="1200" b="1" dirty="0"/>
+              <a:t>3) Shortest Path Tree Instead of Minimum Spanning Tree</a:t>
+            </a:r>
+            <a:endParaRPr lang="en-GB" sz="1200" b="1" dirty="0"/>
+          </a:p>
+        </p:txBody>
+      </p:sp>
+      <p:sp>
+        <p:nvSpPr>
+          <p:cNvPr id="11" name="TextBox 10">
+            <a:extLst>
+              <a:ext uri="{FF2B5EF4-FFF2-40B4-BE49-F238E27FC236}">
+                <a16:creationId xmlns:a16="http://schemas.microsoft.com/office/drawing/2014/main" id="{8DF388B5-B151-430B-A09E-940AEAB6AF19}"/>
+              </a:ext>
+            </a:extLst>
+          </p:cNvPr>
+          <p:cNvSpPr txBox="1"/>
+          <p:nvPr/>
+        </p:nvSpPr>
+        <p:spPr>
+          <a:xfrm>
+            <a:off x="9540280" y="4981575"/>
+            <a:ext cx="1356320" cy="369332"/>
+          </a:xfrm>
+          <a:prstGeom prst="rect">
+            <a:avLst/>
+          </a:prstGeom>
+          <a:solidFill>
+            <a:schemeClr val="bg1"/>
+          </a:solidFill>
+        </p:spPr>
+        <p:txBody>
+          <a:bodyPr wrap="square" lIns="0" tIns="0" rIns="0" bIns="0" rtlCol="0">
+            <a:spAutoFit/>
+          </a:bodyPr>
+          <a:lstStyle/>
+          <a:p>
+            <a:pPr algn="ctr"/>
+            <a:r>
+              <a:rPr lang="en-NZ" sz="1200" b="1" dirty="0"/>
+              <a:t>4) #2 (filter) + #3 (use shortest path tree)</a:t>
+            </a:r>
+            <a:endParaRPr lang="en-GB" sz="1200" b="1" dirty="0"/>
+          </a:p>
+        </p:txBody>
+      </p:sp>
+      <p:sp>
+        <p:nvSpPr>
+          <p:cNvPr id="12" name="TextBox 11">
+            <a:extLst>
+              <a:ext uri="{FF2B5EF4-FFF2-40B4-BE49-F238E27FC236}">
+                <a16:creationId xmlns:a16="http://schemas.microsoft.com/office/drawing/2014/main" id="{E23BCCE6-D4B3-49A4-8702-D3E432463990}"/>
+              </a:ext>
+            </a:extLst>
+          </p:cNvPr>
+          <p:cNvSpPr txBox="1"/>
+          <p:nvPr/>
+        </p:nvSpPr>
+        <p:spPr>
+          <a:xfrm>
+            <a:off x="4690862" y="5834957"/>
+            <a:ext cx="4849418" cy="553998"/>
+          </a:xfrm>
+          <a:prstGeom prst="rect">
+            <a:avLst/>
+          </a:prstGeom>
+          <a:solidFill>
+            <a:schemeClr val="bg1"/>
+          </a:solidFill>
+        </p:spPr>
+        <p:txBody>
+          <a:bodyPr wrap="square" lIns="0" tIns="0" rIns="0" bIns="0" rtlCol="0">
+            <a:spAutoFit/>
+          </a:bodyPr>
+          <a:lstStyle/>
+          <a:p>
+            <a:r>
+              <a:rPr lang="en-NZ" sz="1200" dirty="0">
+                <a:solidFill>
+                  <a:srgbClr val="FF0000"/>
+                </a:solidFill>
+              </a:rPr>
+              <a:t>Note that #2 is currently flawed as we cannot just reassign these abnormally large values in </a:t>
+            </a:r>
+            <a:r>
+              <a:rPr lang="en-NZ" sz="1200" dirty="0" err="1">
+                <a:solidFill>
+                  <a:srgbClr val="FF0000"/>
+                </a:solidFill>
+              </a:rPr>
+              <a:t>cPC</a:t>
+            </a:r>
+            <a:r>
+              <a:rPr lang="en-NZ" sz="1200" dirty="0">
+                <a:solidFill>
+                  <a:srgbClr val="FF0000"/>
+                </a:solidFill>
+              </a:rPr>
+              <a:t> space with the median (around 0), they should be instead replaced somehow by their next closest node ….</a:t>
+            </a:r>
+            <a:endParaRPr lang="en-GB" sz="1200" dirty="0">
+              <a:solidFill>
+                <a:srgbClr val="FF0000"/>
+              </a:solidFill>
+            </a:endParaRPr>
+          </a:p>
+        </p:txBody>
+      </p:sp>
+      <p:cxnSp>
+        <p:nvCxnSpPr>
+          <p:cNvPr id="17" name="Connector: Elbow 16">
+            <a:extLst>
+              <a:ext uri="{FF2B5EF4-FFF2-40B4-BE49-F238E27FC236}">
+                <a16:creationId xmlns:a16="http://schemas.microsoft.com/office/drawing/2014/main" id="{2943542E-98E6-4223-8034-821A97495596}"/>
+              </a:ext>
+            </a:extLst>
+          </p:cNvPr>
+          <p:cNvCxnSpPr>
+            <a:cxnSpLocks/>
+            <a:stCxn id="12" idx="1"/>
+            <a:endCxn id="9" idx="2"/>
+          </p:cNvCxnSpPr>
+          <p:nvPr/>
+        </p:nvCxnSpPr>
+        <p:spPr>
+          <a:xfrm rot="10800000">
+            <a:off x="4266604" y="5535574"/>
+            <a:ext cx="424258" cy="576383"/>
+          </a:xfrm>
+          <a:prstGeom prst="bentConnector2">
+            <a:avLst/>
+          </a:prstGeom>
+          <a:ln>
+            <a:solidFill>
+              <a:srgbClr val="FF0000"/>
+            </a:solidFill>
+            <a:tailEnd type="triangle"/>
+          </a:ln>
+        </p:spPr>
+        <p:style>
+          <a:lnRef idx="1">
+            <a:schemeClr val="accent1"/>
+          </a:lnRef>
+          <a:fillRef idx="0">
+            <a:schemeClr val="accent1"/>
+          </a:fillRef>
+          <a:effectRef idx="0">
+            <a:schemeClr val="accent1"/>
+          </a:effectRef>
+          <a:fontRef idx="minor">
+            <a:schemeClr val="tx1"/>
+          </a:fontRef>
+        </p:style>
+      </p:cxnSp>
+      <p:pic>
+        <p:nvPicPr>
+          <p:cNvPr id="15" name="Picture 14">
+            <a:extLst>
+              <a:ext uri="{FF2B5EF4-FFF2-40B4-BE49-F238E27FC236}">
+                <a16:creationId xmlns:a16="http://schemas.microsoft.com/office/drawing/2014/main" id="{D8C13DE0-0AB8-4F7C-89AB-3778BEAD9361}"/>
+              </a:ext>
+            </a:extLst>
+          </p:cNvPr>
+          <p:cNvPicPr>
+            <a:picLocks noChangeAspect="1"/>
+          </p:cNvPicPr>
+          <p:nvPr/>
+        </p:nvPicPr>
+        <p:blipFill>
+          <a:blip r:embed="rId4"/>
+          <a:stretch>
+            <a:fillRect/>
+          </a:stretch>
+        </p:blipFill>
+        <p:spPr>
+          <a:xfrm>
+            <a:off x="3058883" y="1140496"/>
+            <a:ext cx="2873800" cy="3841079"/>
+          </a:xfrm>
+          <a:prstGeom prst="rect">
+            <a:avLst/>
+          </a:prstGeom>
+        </p:spPr>
+      </p:pic>
+      <p:pic>
+        <p:nvPicPr>
+          <p:cNvPr id="19" name="Picture 18">
+            <a:extLst>
+              <a:ext uri="{FF2B5EF4-FFF2-40B4-BE49-F238E27FC236}">
+                <a16:creationId xmlns:a16="http://schemas.microsoft.com/office/drawing/2014/main" id="{F6139D21-7BD8-451D-8A9D-88C6155831EF}"/>
+              </a:ext>
+            </a:extLst>
+          </p:cNvPr>
+          <p:cNvPicPr>
+            <a:picLocks noChangeAspect="1"/>
+          </p:cNvPicPr>
+          <p:nvPr/>
+        </p:nvPicPr>
+        <p:blipFill>
+          <a:blip r:embed="rId5"/>
+          <a:stretch>
+            <a:fillRect/>
+          </a:stretch>
+        </p:blipFill>
+        <p:spPr>
+          <a:xfrm>
+            <a:off x="9009422" y="1144938"/>
+            <a:ext cx="2873800" cy="3836637"/>
+          </a:xfrm>
+          <a:prstGeom prst="rect">
+            <a:avLst/>
+          </a:prstGeom>
+        </p:spPr>
+      </p:pic>
     </p:spTree>
     <p:extLst>
       <p:ext uri="{BB962C8B-B14F-4D97-AF65-F5344CB8AC3E}">
-        <p14:creationId xmlns:p14="http://schemas.microsoft.com/office/powerpoint/2010/main" val="4028263462"/>
+        <p14:creationId xmlns:p14="http://schemas.microsoft.com/office/powerpoint/2010/main" val="3573502216"/>
       </p:ext>
     </p:extLst>
   </p:cSld>
@@ -5085,10 +5517,10 @@
       </p:grpSpPr>
       <p:pic>
         <p:nvPicPr>
-          <p:cNvPr id="7" name="Picture 6">
-            <a:extLst>
-              <a:ext uri="{FF2B5EF4-FFF2-40B4-BE49-F238E27FC236}">
-                <a16:creationId xmlns:a16="http://schemas.microsoft.com/office/drawing/2014/main" id="{2EB162D9-0AF6-4EEC-9470-3D283E1A30A7}"/>
+          <p:cNvPr id="5" name="Picture 4">
+            <a:extLst>
+              <a:ext uri="{FF2B5EF4-FFF2-40B4-BE49-F238E27FC236}">
+                <a16:creationId xmlns:a16="http://schemas.microsoft.com/office/drawing/2014/main" id="{57F5CD76-A121-47E7-8D5C-78EB781D67BC}"/>
               </a:ext>
             </a:extLst>
           </p:cNvPr>
@@ -5111,8 +5543,8 @@
         </p:blipFill>
         <p:spPr>
           <a:xfrm>
-            <a:off x="0" y="485730"/>
-            <a:ext cx="12192000" cy="5886540"/>
+            <a:off x="0" y="369332"/>
+            <a:ext cx="12192000" cy="6510995"/>
           </a:xfrm>
           <a:prstGeom prst="rect">
             <a:avLst/>
@@ -5121,10 +5553,10 @@
       </p:pic>
       <p:sp>
         <p:nvSpPr>
-          <p:cNvPr id="8" name="TextBox 7">
-            <a:extLst>
-              <a:ext uri="{FF2B5EF4-FFF2-40B4-BE49-F238E27FC236}">
-                <a16:creationId xmlns:a16="http://schemas.microsoft.com/office/drawing/2014/main" id="{835291A4-5C31-468E-853D-5CC31B696586}"/>
+          <p:cNvPr id="6" name="TextBox 5">
+            <a:extLst>
+              <a:ext uri="{FF2B5EF4-FFF2-40B4-BE49-F238E27FC236}">
+                <a16:creationId xmlns:a16="http://schemas.microsoft.com/office/drawing/2014/main" id="{979AE2EC-4AA9-4D1C-9817-4D0290540D4D}"/>
               </a:ext>
             </a:extLst>
           </p:cNvPr>
@@ -5149,7 +5581,7 @@
           <a:p>
             <a:r>
               <a:rPr lang="en-NZ" b="1" dirty="0"/>
-              <a:t>All 10 combination of 10% subset runs – variable weighting distribution</a:t>
+              <a:t>All 10 combination of 10% subset runs</a:t>
             </a:r>
             <a:endParaRPr lang="en-GB" b="1" dirty="0"/>
           </a:p>
@@ -5158,7 +5590,7 @@
     </p:spTree>
     <p:extLst>
       <p:ext uri="{BB962C8B-B14F-4D97-AF65-F5344CB8AC3E}">
-        <p14:creationId xmlns:p14="http://schemas.microsoft.com/office/powerpoint/2010/main" val="1511892141"/>
+        <p14:creationId xmlns:p14="http://schemas.microsoft.com/office/powerpoint/2010/main" val="4028263462"/>
       </p:ext>
     </p:extLst>
   </p:cSld>
@@ -5187,6 +5619,108 @@
       </p:grpSpPr>
       <p:pic>
         <p:nvPicPr>
+          <p:cNvPr id="7" name="Picture 6">
+            <a:extLst>
+              <a:ext uri="{FF2B5EF4-FFF2-40B4-BE49-F238E27FC236}">
+                <a16:creationId xmlns:a16="http://schemas.microsoft.com/office/drawing/2014/main" id="{2EB162D9-0AF6-4EEC-9470-3D283E1A30A7}"/>
+              </a:ext>
+            </a:extLst>
+          </p:cNvPr>
+          <p:cNvPicPr>
+            <a:picLocks noChangeAspect="1"/>
+          </p:cNvPicPr>
+          <p:nvPr/>
+        </p:nvPicPr>
+        <p:blipFill>
+          <a:blip r:embed="rId2">
+            <a:extLst>
+              <a:ext uri="{28A0092B-C50C-407E-A947-70E740481C1C}">
+                <a14:useLocalDpi xmlns:a14="http://schemas.microsoft.com/office/drawing/2010/main" val="0"/>
+              </a:ext>
+            </a:extLst>
+          </a:blip>
+          <a:stretch>
+            <a:fillRect/>
+          </a:stretch>
+        </p:blipFill>
+        <p:spPr>
+          <a:xfrm>
+            <a:off x="0" y="485730"/>
+            <a:ext cx="12192000" cy="5886540"/>
+          </a:xfrm>
+          <a:prstGeom prst="rect">
+            <a:avLst/>
+          </a:prstGeom>
+        </p:spPr>
+      </p:pic>
+      <p:sp>
+        <p:nvSpPr>
+          <p:cNvPr id="8" name="TextBox 7">
+            <a:extLst>
+              <a:ext uri="{FF2B5EF4-FFF2-40B4-BE49-F238E27FC236}">
+                <a16:creationId xmlns:a16="http://schemas.microsoft.com/office/drawing/2014/main" id="{835291A4-5C31-468E-853D-5CC31B696586}"/>
+              </a:ext>
+            </a:extLst>
+          </p:cNvPr>
+          <p:cNvSpPr txBox="1"/>
+          <p:nvPr/>
+        </p:nvSpPr>
+        <p:spPr>
+          <a:xfrm>
+            <a:off x="0" y="-9525"/>
+            <a:ext cx="7275589" cy="369332"/>
+          </a:xfrm>
+          <a:prstGeom prst="rect">
+            <a:avLst/>
+          </a:prstGeom>
+          <a:noFill/>
+        </p:spPr>
+        <p:txBody>
+          <a:bodyPr wrap="square" rtlCol="0">
+            <a:spAutoFit/>
+          </a:bodyPr>
+          <a:lstStyle/>
+          <a:p>
+            <a:r>
+              <a:rPr lang="en-NZ" b="1" dirty="0"/>
+              <a:t>All 10 combination of 10% subset runs – variable weighting distribution</a:t>
+            </a:r>
+            <a:endParaRPr lang="en-GB" b="1" dirty="0"/>
+          </a:p>
+        </p:txBody>
+      </p:sp>
+    </p:spTree>
+    <p:extLst>
+      <p:ext uri="{BB962C8B-B14F-4D97-AF65-F5344CB8AC3E}">
+        <p14:creationId xmlns:p14="http://schemas.microsoft.com/office/powerpoint/2010/main" val="1511892141"/>
+      </p:ext>
+    </p:extLst>
+  </p:cSld>
+  <p:clrMapOvr>
+    <a:masterClrMapping/>
+  </p:clrMapOvr>
+</p:sld>
+</file>
+
+<file path=ppt/slides/slide13.xml><?xml version="1.0" encoding="utf-8"?>
+<p:sld xmlns:a="http://schemas.openxmlformats.org/drawingml/2006/main" xmlns:r="http://schemas.openxmlformats.org/officeDocument/2006/relationships" xmlns:p="http://schemas.openxmlformats.org/presentationml/2006/main">
+  <p:cSld>
+    <p:spTree>
+      <p:nvGrpSpPr>
+        <p:cNvPr id="1" name=""/>
+        <p:cNvGrpSpPr/>
+        <p:nvPr/>
+      </p:nvGrpSpPr>
+      <p:grpSpPr>
+        <a:xfrm>
+          <a:off x="0" y="0"/>
+          <a:ext cx="0" cy="0"/>
+          <a:chOff x="0" y="0"/>
+          <a:chExt cx="0" cy="0"/>
+        </a:xfrm>
+      </p:grpSpPr>
+      <p:pic>
+        <p:nvPicPr>
           <p:cNvPr id="5" name="Picture 4">
             <a:extLst>
               <a:ext uri="{FF2B5EF4-FFF2-40B4-BE49-F238E27FC236}">
@@ -5278,7 +5812,7 @@
 </p:sld>
 </file>
 
-<file path=ppt/slides/slide13.xml><?xml version="1.0" encoding="utf-8"?>
+<file path=ppt/slides/slide14.xml><?xml version="1.0" encoding="utf-8"?>
 <p:sld xmlns:a="http://schemas.openxmlformats.org/drawingml/2006/main" xmlns:r="http://schemas.openxmlformats.org/officeDocument/2006/relationships" xmlns:p="http://schemas.openxmlformats.org/presentationml/2006/main">
   <p:cSld>
     <p:spTree>
@@ -7730,78 +8264,7 @@
           <p:cNvPr id="5" name="Picture 4">
             <a:extLst>
               <a:ext uri="{FF2B5EF4-FFF2-40B4-BE49-F238E27FC236}">
-                <a16:creationId xmlns:a16="http://schemas.microsoft.com/office/drawing/2014/main" id="{2BAC2202-805B-4DC3-A3C7-C9CC97599E10}"/>
-              </a:ext>
-            </a:extLst>
-          </p:cNvPr>
-          <p:cNvPicPr>
-            <a:picLocks noChangeAspect="1"/>
-          </p:cNvPicPr>
-          <p:nvPr/>
-        </p:nvPicPr>
-        <p:blipFill rotWithShape="1">
-          <a:blip r:embed="rId2">
-            <a:extLst>
-              <a:ext uri="{28A0092B-C50C-407E-A947-70E740481C1C}">
-                <a14:useLocalDpi xmlns:a14="http://schemas.microsoft.com/office/drawing/2010/main" val="0"/>
-              </a:ext>
-            </a:extLst>
-          </a:blip>
-          <a:srcRect r="54446"/>
-          <a:stretch/>
-        </p:blipFill>
-        <p:spPr>
-          <a:xfrm>
-            <a:off x="76201" y="1140496"/>
-            <a:ext cx="2982682" cy="3890687"/>
-          </a:xfrm>
-          <a:prstGeom prst="rect">
-            <a:avLst/>
-          </a:prstGeom>
-        </p:spPr>
-      </p:pic>
-      <p:sp>
-        <p:nvSpPr>
-          <p:cNvPr id="6" name="TextBox 5">
-            <a:extLst>
-              <a:ext uri="{FF2B5EF4-FFF2-40B4-BE49-F238E27FC236}">
-                <a16:creationId xmlns:a16="http://schemas.microsoft.com/office/drawing/2014/main" id="{108BEBBF-0CC4-49CA-B7B2-9D4B22059FB3}"/>
-              </a:ext>
-            </a:extLst>
-          </p:cNvPr>
-          <p:cNvSpPr txBox="1"/>
-          <p:nvPr/>
-        </p:nvSpPr>
-        <p:spPr>
-          <a:xfrm>
-            <a:off x="213989" y="493362"/>
-            <a:ext cx="10571201" cy="369332"/>
-          </a:xfrm>
-          <a:prstGeom prst="rect">
-            <a:avLst/>
-          </a:prstGeom>
-          <a:noFill/>
-        </p:spPr>
-        <p:txBody>
-          <a:bodyPr wrap="square" rtlCol="0">
-            <a:spAutoFit/>
-          </a:bodyPr>
-          <a:lstStyle/>
-          <a:p>
-            <a:r>
-              <a:rPr lang="en-NZ" b="1" dirty="0"/>
-              <a:t>Handling abnormally high distance values in distance matrix (test on 20% subset ~5600 rows)</a:t>
-            </a:r>
-            <a:endParaRPr lang="en-GB" b="1" dirty="0"/>
-          </a:p>
-        </p:txBody>
-      </p:sp>
-      <p:pic>
-        <p:nvPicPr>
-          <p:cNvPr id="2" name="Picture 1">
-            <a:extLst>
-              <a:ext uri="{FF2B5EF4-FFF2-40B4-BE49-F238E27FC236}">
-                <a16:creationId xmlns:a16="http://schemas.microsoft.com/office/drawing/2014/main" id="{0FA7BFA3-93B6-4DD8-BF5C-5441A83F4695}"/>
+                <a16:creationId xmlns:a16="http://schemas.microsoft.com/office/drawing/2014/main" id="{AFE9CAA6-BF7E-469A-A974-23ABAD91CE1F}"/>
               </a:ext>
             </a:extLst>
           </p:cNvPr>
@@ -7811,15 +8274,15 @@
           <p:nvPr/>
         </p:nvPicPr>
         <p:blipFill>
-          <a:blip r:embed="rId3"/>
+          <a:blip r:embed="rId2"/>
           <a:stretch>
             <a:fillRect/>
           </a:stretch>
         </p:blipFill>
         <p:spPr>
           <a:xfrm>
-            <a:off x="6041565" y="1140496"/>
-            <a:ext cx="2873800" cy="3841079"/>
+            <a:off x="1013460" y="783907"/>
+            <a:ext cx="9525000" cy="5953126"/>
           </a:xfrm>
           <a:prstGeom prst="rect">
             <a:avLst/>
@@ -7828,10 +8291,10 @@
       </p:pic>
       <p:sp>
         <p:nvSpPr>
-          <p:cNvPr id="8" name="TextBox 7">
-            <a:extLst>
-              <a:ext uri="{FF2B5EF4-FFF2-40B4-BE49-F238E27FC236}">
-                <a16:creationId xmlns:a16="http://schemas.microsoft.com/office/drawing/2014/main" id="{846D2B52-EEE0-4075-A79B-6528659C5996}"/>
+          <p:cNvPr id="6" name="TextBox 5">
+            <a:extLst>
+              <a:ext uri="{FF2B5EF4-FFF2-40B4-BE49-F238E27FC236}">
+                <a16:creationId xmlns:a16="http://schemas.microsoft.com/office/drawing/2014/main" id="{EEE3435B-843F-4AEE-80B3-F1F68C324391}"/>
               </a:ext>
             </a:extLst>
           </p:cNvPr>
@@ -7840,335 +8303,36 @@
         </p:nvSpPr>
         <p:spPr>
           <a:xfrm>
-            <a:off x="234218" y="4981575"/>
-            <a:ext cx="2099408" cy="369332"/>
+            <a:off x="0" y="0"/>
+            <a:ext cx="12191999" cy="523220"/>
           </a:xfrm>
           <a:prstGeom prst="rect">
             <a:avLst/>
           </a:prstGeom>
-          <a:solidFill>
-            <a:schemeClr val="bg1"/>
-          </a:solidFill>
-        </p:spPr>
-        <p:txBody>
-          <a:bodyPr wrap="square" lIns="0" tIns="0" rIns="0" bIns="0" rtlCol="0">
+          <a:noFill/>
+        </p:spPr>
+        <p:txBody>
+          <a:bodyPr wrap="square" rtlCol="0">
             <a:spAutoFit/>
           </a:bodyPr>
           <a:lstStyle/>
           <a:p>
-            <a:pPr algn="ctr"/>
-            <a:r>
-              <a:rPr lang="en-NZ" sz="1200" b="1" dirty="0"/>
-              <a:t>1) Original </a:t>
-            </a:r>
-          </a:p>
-          <a:p>
-            <a:pPr algn="ctr"/>
-            <a:r>
-              <a:rPr lang="en-NZ" sz="1200" b="1" dirty="0"/>
-              <a:t>(Minimum Spanning Tree)</a:t>
-            </a:r>
-            <a:endParaRPr lang="en-GB" sz="1200" b="1" dirty="0"/>
-          </a:p>
-        </p:txBody>
-      </p:sp>
-      <p:sp>
-        <p:nvSpPr>
-          <p:cNvPr id="9" name="TextBox 8">
-            <a:extLst>
-              <a:ext uri="{FF2B5EF4-FFF2-40B4-BE49-F238E27FC236}">
-                <a16:creationId xmlns:a16="http://schemas.microsoft.com/office/drawing/2014/main" id="{159ECB6D-8197-42C9-9B08-115C0CB6E983}"/>
-              </a:ext>
-            </a:extLst>
-          </p:cNvPr>
-          <p:cNvSpPr txBox="1"/>
-          <p:nvPr/>
-        </p:nvSpPr>
-        <p:spPr>
-          <a:xfrm>
-            <a:off x="3275407" y="4981575"/>
-            <a:ext cx="1982394" cy="553998"/>
-          </a:xfrm>
-          <a:prstGeom prst="rect">
-            <a:avLst/>
-          </a:prstGeom>
-          <a:solidFill>
-            <a:schemeClr val="bg1"/>
-          </a:solidFill>
-        </p:spPr>
-        <p:txBody>
-          <a:bodyPr wrap="square" lIns="0" tIns="0" rIns="0" bIns="0" rtlCol="0">
-            <a:spAutoFit/>
-          </a:bodyPr>
-          <a:lstStyle/>
-          <a:p>
-            <a:pPr algn="ctr"/>
-            <a:r>
-              <a:rPr lang="en-NZ" sz="1200" b="1" dirty="0"/>
-              <a:t>2) Filter out large values in </a:t>
-            </a:r>
-            <a:r>
-              <a:rPr lang="en-NZ" sz="1200" b="1" dirty="0" err="1"/>
-              <a:t>cPC</a:t>
-            </a:r>
-            <a:r>
-              <a:rPr lang="en-NZ" sz="1200" b="1" dirty="0"/>
-              <a:t> space (set values above 3sd as the median)</a:t>
-            </a:r>
-            <a:endParaRPr lang="en-GB" sz="1200" b="1" dirty="0"/>
-          </a:p>
-        </p:txBody>
-      </p:sp>
-      <p:sp>
-        <p:nvSpPr>
-          <p:cNvPr id="10" name="TextBox 9">
-            <a:extLst>
-              <a:ext uri="{FF2B5EF4-FFF2-40B4-BE49-F238E27FC236}">
-                <a16:creationId xmlns:a16="http://schemas.microsoft.com/office/drawing/2014/main" id="{D67F0F88-F469-4158-8F13-A89F610E665A}"/>
-              </a:ext>
-            </a:extLst>
-          </p:cNvPr>
-          <p:cNvSpPr txBox="1"/>
-          <p:nvPr/>
-        </p:nvSpPr>
-        <p:spPr>
-          <a:xfrm>
-            <a:off x="6135621" y="4981575"/>
-            <a:ext cx="2227330" cy="369332"/>
-          </a:xfrm>
-          <a:prstGeom prst="rect">
-            <a:avLst/>
-          </a:prstGeom>
-          <a:solidFill>
-            <a:schemeClr val="bg1"/>
-          </a:solidFill>
-        </p:spPr>
-        <p:txBody>
-          <a:bodyPr wrap="square" lIns="0" tIns="0" rIns="0" bIns="0" rtlCol="0">
-            <a:spAutoFit/>
-          </a:bodyPr>
-          <a:lstStyle/>
-          <a:p>
-            <a:pPr algn="ctr"/>
-            <a:r>
-              <a:rPr lang="en-NZ" sz="1200" b="1" dirty="0"/>
-              <a:t>3) Shortest Path Tree Instead of Minimum Spanning Tree</a:t>
-            </a:r>
-            <a:endParaRPr lang="en-GB" sz="1200" b="1" dirty="0"/>
-          </a:p>
-        </p:txBody>
-      </p:sp>
-      <p:sp>
-        <p:nvSpPr>
-          <p:cNvPr id="11" name="TextBox 10">
-            <a:extLst>
-              <a:ext uri="{FF2B5EF4-FFF2-40B4-BE49-F238E27FC236}">
-                <a16:creationId xmlns:a16="http://schemas.microsoft.com/office/drawing/2014/main" id="{8DF388B5-B151-430B-A09E-940AEAB6AF19}"/>
-              </a:ext>
-            </a:extLst>
-          </p:cNvPr>
-          <p:cNvSpPr txBox="1"/>
-          <p:nvPr/>
-        </p:nvSpPr>
-        <p:spPr>
-          <a:xfrm>
-            <a:off x="9540280" y="4981575"/>
-            <a:ext cx="1356320" cy="369332"/>
-          </a:xfrm>
-          <a:prstGeom prst="rect">
-            <a:avLst/>
-          </a:prstGeom>
-          <a:solidFill>
-            <a:schemeClr val="bg1"/>
-          </a:solidFill>
-        </p:spPr>
-        <p:txBody>
-          <a:bodyPr wrap="square" lIns="0" tIns="0" rIns="0" bIns="0" rtlCol="0">
-            <a:spAutoFit/>
-          </a:bodyPr>
-          <a:lstStyle/>
-          <a:p>
-            <a:pPr algn="ctr"/>
-            <a:r>
-              <a:rPr lang="en-NZ" sz="1200" b="1" dirty="0"/>
-              <a:t>4) #2 (filter) + #3 (use shortest path tree)</a:t>
-            </a:r>
-            <a:endParaRPr lang="en-GB" sz="1200" b="1" dirty="0"/>
-          </a:p>
-        </p:txBody>
-      </p:sp>
-      <p:sp>
-        <p:nvSpPr>
-          <p:cNvPr id="12" name="TextBox 11">
-            <a:extLst>
-              <a:ext uri="{FF2B5EF4-FFF2-40B4-BE49-F238E27FC236}">
-                <a16:creationId xmlns:a16="http://schemas.microsoft.com/office/drawing/2014/main" id="{E23BCCE6-D4B3-49A4-8702-D3E432463990}"/>
-              </a:ext>
-            </a:extLst>
-          </p:cNvPr>
-          <p:cNvSpPr txBox="1"/>
-          <p:nvPr/>
-        </p:nvSpPr>
-        <p:spPr>
-          <a:xfrm>
-            <a:off x="4690862" y="5834957"/>
-            <a:ext cx="4849418" cy="553998"/>
-          </a:xfrm>
-          <a:prstGeom prst="rect">
-            <a:avLst/>
-          </a:prstGeom>
-          <a:solidFill>
-            <a:schemeClr val="bg1"/>
-          </a:solidFill>
-        </p:spPr>
-        <p:txBody>
-          <a:bodyPr wrap="square" lIns="0" tIns="0" rIns="0" bIns="0" rtlCol="0">
-            <a:spAutoFit/>
-          </a:bodyPr>
-          <a:lstStyle/>
-          <a:p>
-            <a:r>
-              <a:rPr lang="en-NZ" sz="1200" dirty="0">
-                <a:solidFill>
-                  <a:srgbClr val="FF0000"/>
-                </a:solidFill>
-              </a:rPr>
-              <a:t>Note that #2 is currently flawed as we cannot just reassign these abnormally large values in </a:t>
-            </a:r>
-            <a:r>
-              <a:rPr lang="en-NZ" sz="1200" dirty="0" err="1">
-                <a:solidFill>
-                  <a:srgbClr val="FF0000"/>
-                </a:solidFill>
-              </a:rPr>
-              <a:t>cPC</a:t>
-            </a:r>
-            <a:r>
-              <a:rPr lang="en-NZ" sz="1200" dirty="0">
-                <a:solidFill>
-                  <a:srgbClr val="FF0000"/>
-                </a:solidFill>
-              </a:rPr>
-              <a:t> space with the median (around 0), they should be instead replaced somehow by their next closest node ….</a:t>
-            </a:r>
-            <a:endParaRPr lang="en-GB" sz="1200" dirty="0">
-              <a:solidFill>
-                <a:srgbClr val="FF0000"/>
-              </a:solidFill>
-            </a:endParaRPr>
-          </a:p>
-        </p:txBody>
-      </p:sp>
-      <p:cxnSp>
-        <p:nvCxnSpPr>
-          <p:cNvPr id="17" name="Connector: Elbow 16">
-            <a:extLst>
-              <a:ext uri="{FF2B5EF4-FFF2-40B4-BE49-F238E27FC236}">
-                <a16:creationId xmlns:a16="http://schemas.microsoft.com/office/drawing/2014/main" id="{2943542E-98E6-4223-8034-821A97495596}"/>
-              </a:ext>
-            </a:extLst>
-          </p:cNvPr>
-          <p:cNvCxnSpPr>
-            <a:cxnSpLocks/>
-            <a:stCxn id="12" idx="1"/>
-            <a:endCxn id="9" idx="2"/>
-          </p:cNvCxnSpPr>
-          <p:nvPr/>
-        </p:nvCxnSpPr>
-        <p:spPr>
-          <a:xfrm rot="10800000">
-            <a:off x="4266604" y="5535574"/>
-            <a:ext cx="424258" cy="576383"/>
-          </a:xfrm>
-          <a:prstGeom prst="bentConnector2">
-            <a:avLst/>
-          </a:prstGeom>
-          <a:ln>
-            <a:solidFill>
-              <a:srgbClr val="FF0000"/>
-            </a:solidFill>
-            <a:tailEnd type="triangle"/>
-          </a:ln>
-        </p:spPr>
-        <p:style>
-          <a:lnRef idx="1">
-            <a:schemeClr val="accent1"/>
-          </a:lnRef>
-          <a:fillRef idx="0">
-            <a:schemeClr val="accent1"/>
-          </a:fillRef>
-          <a:effectRef idx="0">
-            <a:schemeClr val="accent1"/>
-          </a:effectRef>
-          <a:fontRef idx="minor">
-            <a:schemeClr val="tx1"/>
-          </a:fontRef>
-        </p:style>
-      </p:cxnSp>
-      <p:pic>
-        <p:nvPicPr>
-          <p:cNvPr id="15" name="Picture 14">
-            <a:extLst>
-              <a:ext uri="{FF2B5EF4-FFF2-40B4-BE49-F238E27FC236}">
-                <a16:creationId xmlns:a16="http://schemas.microsoft.com/office/drawing/2014/main" id="{D8C13DE0-0AB8-4F7C-89AB-3778BEAD9361}"/>
-              </a:ext>
-            </a:extLst>
-          </p:cNvPr>
-          <p:cNvPicPr>
-            <a:picLocks noChangeAspect="1"/>
-          </p:cNvPicPr>
-          <p:nvPr/>
-        </p:nvPicPr>
-        <p:blipFill>
-          <a:blip r:embed="rId4"/>
-          <a:stretch>
-            <a:fillRect/>
-          </a:stretch>
-        </p:blipFill>
-        <p:spPr>
-          <a:xfrm>
-            <a:off x="3058883" y="1140496"/>
-            <a:ext cx="2873800" cy="3841079"/>
-          </a:xfrm>
-          <a:prstGeom prst="rect">
-            <a:avLst/>
-          </a:prstGeom>
-        </p:spPr>
-      </p:pic>
-      <p:pic>
-        <p:nvPicPr>
-          <p:cNvPr id="19" name="Picture 18">
-            <a:extLst>
-              <a:ext uri="{FF2B5EF4-FFF2-40B4-BE49-F238E27FC236}">
-                <a16:creationId xmlns:a16="http://schemas.microsoft.com/office/drawing/2014/main" id="{F6139D21-7BD8-451D-8A9D-88C6155831EF}"/>
-              </a:ext>
-            </a:extLst>
-          </p:cNvPr>
-          <p:cNvPicPr>
-            <a:picLocks noChangeAspect="1"/>
-          </p:cNvPicPr>
-          <p:nvPr/>
-        </p:nvPicPr>
-        <p:blipFill>
-          <a:blip r:embed="rId5"/>
-          <a:stretch>
-            <a:fillRect/>
-          </a:stretch>
-        </p:blipFill>
-        <p:spPr>
-          <a:xfrm>
-            <a:off x="9009422" y="1144938"/>
-            <a:ext cx="2873800" cy="3836637"/>
-          </a:xfrm>
-          <a:prstGeom prst="rect">
-            <a:avLst/>
-          </a:prstGeom>
-        </p:spPr>
-      </p:pic>
+            <a:r>
+              <a:rPr lang="en-NZ" sz="2800" b="1" dirty="0"/>
+              <a:t>Covariance of background for full data </a:t>
+            </a:r>
+            <a:r>
+              <a:rPr lang="en-NZ" sz="2800" b="1"/>
+              <a:t>(green) vs 10% data (red)</a:t>
+            </a:r>
+            <a:endParaRPr lang="en-GB" sz="2800" b="1" dirty="0"/>
+          </a:p>
+        </p:txBody>
+      </p:sp>
     </p:spTree>
     <p:extLst>
       <p:ext uri="{BB962C8B-B14F-4D97-AF65-F5344CB8AC3E}">
-        <p14:creationId xmlns:p14="http://schemas.microsoft.com/office/powerpoint/2010/main" val="3573502216"/>
+        <p14:creationId xmlns:p14="http://schemas.microsoft.com/office/powerpoint/2010/main" val="3841447951"/>
       </p:ext>
     </p:extLst>
   </p:cSld>

</xml_diff>

<commit_message>
added methods description of neuroPM box to ppt
</commit_message>
<xml_diff>
--- a/job_results.pptx
+++ b/job_results.pptx
@@ -5,7 +5,7 @@
     <p:sldMasterId id="2147483648" r:id="rId1"/>
   </p:sldMasterIdLst>
   <p:notesMasterIdLst>
-    <p:notesMasterId r:id="rId16"/>
+    <p:notesMasterId r:id="rId18"/>
   </p:notesMasterIdLst>
   <p:sldIdLst>
     <p:sldId id="256" r:id="rId2"/>
@@ -19,9 +19,11 @@
     <p:sldId id="272" r:id="rId10"/>
     <p:sldId id="266" r:id="rId11"/>
     <p:sldId id="258" r:id="rId12"/>
-    <p:sldId id="259" r:id="rId13"/>
-    <p:sldId id="263" r:id="rId14"/>
-    <p:sldId id="269" r:id="rId15"/>
+    <p:sldId id="273" r:id="rId13"/>
+    <p:sldId id="259" r:id="rId14"/>
+    <p:sldId id="263" r:id="rId15"/>
+    <p:sldId id="269" r:id="rId16"/>
+    <p:sldId id="274" r:id="rId17"/>
   </p:sldIdLst>
   <p:sldSz cx="12192000" cy="6858000"/>
   <p:notesSz cx="6858000" cy="9144000"/>
@@ -189,7 +191,7 @@
   <pc:docChgLst>
     <pc:chgData name="Zhao Xiong" userId="5eba49e5-2895-4cd9-83e8-b3064fe76704" providerId="ADAL" clId="{B606E7B2-EFF5-418A-8639-9F7537C4DA50}"/>
     <pc:docChg chg="undo custSel addSld delSld modSld sldOrd">
-      <pc:chgData name="Zhao Xiong" userId="5eba49e5-2895-4cd9-83e8-b3064fe76704" providerId="ADAL" clId="{B606E7B2-EFF5-418A-8639-9F7537C4DA50}" dt="2022-05-18T13:05:55.190" v="3341" actId="20577"/>
+      <pc:chgData name="Zhao Xiong" userId="5eba49e5-2895-4cd9-83e8-b3064fe76704" providerId="ADAL" clId="{B606E7B2-EFF5-418A-8639-9F7537C4DA50}" dt="2022-05-19T14:28:43.699" v="9049" actId="20577"/>
       <pc:docMkLst>
         <pc:docMk/>
       </pc:docMkLst>
@@ -1087,18 +1089,18 @@
           </ac:picMkLst>
         </pc:picChg>
       </pc:sldChg>
-      <pc:sldChg chg="delSp add">
-        <pc:chgData name="Zhao Xiong" userId="5eba49e5-2895-4cd9-83e8-b3064fe76704" providerId="ADAL" clId="{B606E7B2-EFF5-418A-8639-9F7537C4DA50}" dt="2022-05-15T15:45:59.988" v="2735"/>
+      <pc:sldChg chg="addSp delSp modSp add">
+        <pc:chgData name="Zhao Xiong" userId="5eba49e5-2895-4cd9-83e8-b3064fe76704" providerId="ADAL" clId="{B606E7B2-EFF5-418A-8639-9F7537C4DA50}" dt="2022-05-19T14:28:43.699" v="9049" actId="20577"/>
         <pc:sldMkLst>
           <pc:docMk/>
           <pc:sldMk cId="4125219743" sldId="269"/>
         </pc:sldMkLst>
-        <pc:spChg chg="del">
-          <ac:chgData name="Zhao Xiong" userId="5eba49e5-2895-4cd9-83e8-b3064fe76704" providerId="ADAL" clId="{B606E7B2-EFF5-418A-8639-9F7537C4DA50}" dt="2022-05-15T15:45:59.988" v="2735"/>
+        <pc:spChg chg="add mod">
+          <ac:chgData name="Zhao Xiong" userId="5eba49e5-2895-4cd9-83e8-b3064fe76704" providerId="ADAL" clId="{B606E7B2-EFF5-418A-8639-9F7537C4DA50}" dt="2022-05-19T14:03:42.476" v="7944" actId="403"/>
           <ac:spMkLst>
             <pc:docMk/>
             <pc:sldMk cId="4125219743" sldId="269"/>
-            <ac:spMk id="2" creationId="{9D5A5D3E-2905-4E7B-B75D-2512F1933F81}"/>
+            <ac:spMk id="2" creationId="{87137C21-2A3B-4D90-BB02-4D8AD3B6EB50}"/>
           </ac:spMkLst>
         </pc:spChg>
         <pc:spChg chg="del">
@@ -1106,9 +1108,57 @@
           <ac:spMkLst>
             <pc:docMk/>
             <pc:sldMk cId="4125219743" sldId="269"/>
+            <ac:spMk id="2" creationId="{9D5A5D3E-2905-4E7B-B75D-2512F1933F81}"/>
+          </ac:spMkLst>
+        </pc:spChg>
+        <pc:spChg chg="add mod">
+          <ac:chgData name="Zhao Xiong" userId="5eba49e5-2895-4cd9-83e8-b3064fe76704" providerId="ADAL" clId="{B606E7B2-EFF5-418A-8639-9F7537C4DA50}" dt="2022-05-19T14:28:29.191" v="9046"/>
+          <ac:spMkLst>
+            <pc:docMk/>
+            <pc:sldMk cId="4125219743" sldId="269"/>
+            <ac:spMk id="3" creationId="{471AD88B-3C30-441F-A347-3392F81E75A7}"/>
+          </ac:spMkLst>
+        </pc:spChg>
+        <pc:spChg chg="del">
+          <ac:chgData name="Zhao Xiong" userId="5eba49e5-2895-4cd9-83e8-b3064fe76704" providerId="ADAL" clId="{B606E7B2-EFF5-418A-8639-9F7537C4DA50}" dt="2022-05-15T15:45:59.988" v="2735"/>
+          <ac:spMkLst>
+            <pc:docMk/>
+            <pc:sldMk cId="4125219743" sldId="269"/>
             <ac:spMk id="3" creationId="{648F4AF5-D816-44AD-B8B5-DDA25EC6A4B7}"/>
           </ac:spMkLst>
         </pc:spChg>
+        <pc:spChg chg="add mod">
+          <ac:chgData name="Zhao Xiong" userId="5eba49e5-2895-4cd9-83e8-b3064fe76704" providerId="ADAL" clId="{B606E7B2-EFF5-418A-8639-9F7537C4DA50}" dt="2022-05-19T14:28:43.699" v="9049" actId="20577"/>
+          <ac:spMkLst>
+            <pc:docMk/>
+            <pc:sldMk cId="4125219743" sldId="269"/>
+            <ac:spMk id="5" creationId="{5949CE9D-48A9-4703-AAC2-3B8A09048459}"/>
+          </ac:spMkLst>
+        </pc:spChg>
+        <pc:spChg chg="add mod">
+          <ac:chgData name="Zhao Xiong" userId="5eba49e5-2895-4cd9-83e8-b3064fe76704" providerId="ADAL" clId="{B606E7B2-EFF5-418A-8639-9F7537C4DA50}" dt="2022-05-19T14:26:04.249" v="8909" actId="571"/>
+          <ac:spMkLst>
+            <pc:docMk/>
+            <pc:sldMk cId="4125219743" sldId="269"/>
+            <ac:spMk id="6" creationId="{C3C99A96-797C-4086-8A3E-ECDAAFCD2771}"/>
+          </ac:spMkLst>
+        </pc:spChg>
+        <pc:spChg chg="add mod">
+          <ac:chgData name="Zhao Xiong" userId="5eba49e5-2895-4cd9-83e8-b3064fe76704" providerId="ADAL" clId="{B606E7B2-EFF5-418A-8639-9F7537C4DA50}" dt="2022-05-19T14:26:04.249" v="8909" actId="571"/>
+          <ac:spMkLst>
+            <pc:docMk/>
+            <pc:sldMk cId="4125219743" sldId="269"/>
+            <ac:spMk id="7" creationId="{64C03EE0-4E38-4316-8026-FDCA6B8E8EAC}"/>
+          </ac:spMkLst>
+        </pc:spChg>
+        <pc:graphicFrameChg chg="add del">
+          <ac:chgData name="Zhao Xiong" userId="5eba49e5-2895-4cd9-83e8-b3064fe76704" providerId="ADAL" clId="{B606E7B2-EFF5-418A-8639-9F7537C4DA50}" dt="2022-05-19T13:31:57.414" v="6207"/>
+          <ac:graphicFrameMkLst>
+            <pc:docMk/>
+            <pc:sldMk cId="4125219743" sldId="269"/>
+            <ac:graphicFrameMk id="4" creationId="{265E4441-9C76-4E14-8151-5A154A27C361}"/>
+          </ac:graphicFrameMkLst>
+        </pc:graphicFrameChg>
       </pc:sldChg>
       <pc:sldChg chg="addSp delSp modSp add">
         <pc:chgData name="Zhao Xiong" userId="5eba49e5-2895-4cd9-83e8-b3064fe76704" providerId="ADAL" clId="{B606E7B2-EFF5-418A-8639-9F7537C4DA50}" dt="2022-05-18T13:05:09.355" v="3233"/>
@@ -1261,7 +1311,7 @@
         </pc:picChg>
       </pc:sldChg>
       <pc:sldChg chg="addSp delSp modSp add">
-        <pc:chgData name="Zhao Xiong" userId="5eba49e5-2895-4cd9-83e8-b3064fe76704" providerId="ADAL" clId="{B606E7B2-EFF5-418A-8639-9F7537C4DA50}" dt="2022-05-18T13:05:55.190" v="3341" actId="20577"/>
+        <pc:chgData name="Zhao Xiong" userId="5eba49e5-2895-4cd9-83e8-b3064fe76704" providerId="ADAL" clId="{B606E7B2-EFF5-418A-8639-9F7537C4DA50}" dt="2022-05-19T13:00:27.022" v="3342" actId="1076"/>
         <pc:sldMkLst>
           <pc:docMk/>
           <pc:sldMk cId="3841447951" sldId="272"/>
@@ -1299,13 +1349,51 @@
           </ac:picMkLst>
         </pc:picChg>
         <pc:picChg chg="add mod">
-          <ac:chgData name="Zhao Xiong" userId="5eba49e5-2895-4cd9-83e8-b3064fe76704" providerId="ADAL" clId="{B606E7B2-EFF5-418A-8639-9F7537C4DA50}" dt="2022-05-18T13:05:29.077" v="3246" actId="1076"/>
+          <ac:chgData name="Zhao Xiong" userId="5eba49e5-2895-4cd9-83e8-b3064fe76704" providerId="ADAL" clId="{B606E7B2-EFF5-418A-8639-9F7537C4DA50}" dt="2022-05-19T13:00:27.022" v="3342" actId="1076"/>
           <ac:picMkLst>
             <pc:docMk/>
             <pc:sldMk cId="3841447951" sldId="272"/>
             <ac:picMk id="5" creationId="{AFE9CAA6-BF7E-469A-A974-23ABAD91CE1F}"/>
           </ac:picMkLst>
         </pc:picChg>
+      </pc:sldChg>
+      <pc:sldChg chg="addSp delSp modSp add">
+        <pc:chgData name="Zhao Xiong" userId="5eba49e5-2895-4cd9-83e8-b3064fe76704" providerId="ADAL" clId="{B606E7B2-EFF5-418A-8639-9F7537C4DA50}" dt="2022-05-19T13:03:46.004" v="3345"/>
+        <pc:sldMkLst>
+          <pc:docMk/>
+          <pc:sldMk cId="4192141584" sldId="273"/>
+        </pc:sldMkLst>
+        <pc:spChg chg="del">
+          <ac:chgData name="Zhao Xiong" userId="5eba49e5-2895-4cd9-83e8-b3064fe76704" providerId="ADAL" clId="{B606E7B2-EFF5-418A-8639-9F7537C4DA50}" dt="2022-05-19T13:03:41.864" v="3344" actId="478"/>
+          <ac:spMkLst>
+            <pc:docMk/>
+            <pc:sldMk cId="4192141584" sldId="273"/>
+            <ac:spMk id="2" creationId="{C4D673FB-86F2-4721-8CF6-7CE16671C19E}"/>
+          </ac:spMkLst>
+        </pc:spChg>
+        <pc:spChg chg="del">
+          <ac:chgData name="Zhao Xiong" userId="5eba49e5-2895-4cd9-83e8-b3064fe76704" providerId="ADAL" clId="{B606E7B2-EFF5-418A-8639-9F7537C4DA50}" dt="2022-05-19T13:03:41.864" v="3344" actId="478"/>
+          <ac:spMkLst>
+            <pc:docMk/>
+            <pc:sldMk cId="4192141584" sldId="273"/>
+            <ac:spMk id="3" creationId="{D20CC676-CBE1-4278-B441-5D1F7A011236}"/>
+          </ac:spMkLst>
+        </pc:spChg>
+        <pc:picChg chg="add mod">
+          <ac:chgData name="Zhao Xiong" userId="5eba49e5-2895-4cd9-83e8-b3064fe76704" providerId="ADAL" clId="{B606E7B2-EFF5-418A-8639-9F7537C4DA50}" dt="2022-05-19T13:03:46.004" v="3345"/>
+          <ac:picMkLst>
+            <pc:docMk/>
+            <pc:sldMk cId="4192141584" sldId="273"/>
+            <ac:picMk id="5" creationId="{99E6A7F2-FA24-4958-B6F9-CF8435D036B2}"/>
+          </ac:picMkLst>
+        </pc:picChg>
+      </pc:sldChg>
+      <pc:sldChg chg="add">
+        <pc:chgData name="Zhao Xiong" userId="5eba49e5-2895-4cd9-83e8-b3064fe76704" providerId="ADAL" clId="{B606E7B2-EFF5-418A-8639-9F7537C4DA50}" dt="2022-05-19T13:05:43.771" v="3346"/>
+        <pc:sldMkLst>
+          <pc:docMk/>
+          <pc:sldMk cId="1647779813" sldId="274"/>
+        </pc:sldMkLst>
       </pc:sldChg>
     </pc:docChg>
   </pc:docChgLst>
@@ -1394,7 +1482,7 @@
           <a:p>
             <a:fld id="{3F756EDF-0C8E-4F27-B2A4-7BBF4F0FD9CE}" type="datetimeFigureOut">
               <a:rPr lang="en-GB" smtClean="0"/>
-              <a:t>18/05/2022</a:t>
+              <a:t>19/05/2022</a:t>
             </a:fld>
             <a:endParaRPr lang="en-GB"/>
           </a:p>
@@ -1811,7 +1899,7 @@
           <a:p>
             <a:fld id="{B1B6DC73-6F54-48A7-AC0A-0EE4EE00B05A}" type="datetimeFigureOut">
               <a:rPr lang="en-GB" smtClean="0"/>
-              <a:t>18/05/2022</a:t>
+              <a:t>19/05/2022</a:t>
             </a:fld>
             <a:endParaRPr lang="en-GB"/>
           </a:p>
@@ -2011,7 +2099,7 @@
           <a:p>
             <a:fld id="{B1B6DC73-6F54-48A7-AC0A-0EE4EE00B05A}" type="datetimeFigureOut">
               <a:rPr lang="en-GB" smtClean="0"/>
-              <a:t>18/05/2022</a:t>
+              <a:t>19/05/2022</a:t>
             </a:fld>
             <a:endParaRPr lang="en-GB"/>
           </a:p>
@@ -2221,7 +2309,7 @@
           <a:p>
             <a:fld id="{B1B6DC73-6F54-48A7-AC0A-0EE4EE00B05A}" type="datetimeFigureOut">
               <a:rPr lang="en-GB" smtClean="0"/>
-              <a:t>18/05/2022</a:t>
+              <a:t>19/05/2022</a:t>
             </a:fld>
             <a:endParaRPr lang="en-GB"/>
           </a:p>
@@ -2421,7 +2509,7 @@
           <a:p>
             <a:fld id="{B1B6DC73-6F54-48A7-AC0A-0EE4EE00B05A}" type="datetimeFigureOut">
               <a:rPr lang="en-GB" smtClean="0"/>
-              <a:t>18/05/2022</a:t>
+              <a:t>19/05/2022</a:t>
             </a:fld>
             <a:endParaRPr lang="en-GB"/>
           </a:p>
@@ -2697,7 +2785,7 @@
           <a:p>
             <a:fld id="{B1B6DC73-6F54-48A7-AC0A-0EE4EE00B05A}" type="datetimeFigureOut">
               <a:rPr lang="en-GB" smtClean="0"/>
-              <a:t>18/05/2022</a:t>
+              <a:t>19/05/2022</a:t>
             </a:fld>
             <a:endParaRPr lang="en-GB"/>
           </a:p>
@@ -2965,7 +3053,7 @@
           <a:p>
             <a:fld id="{B1B6DC73-6F54-48A7-AC0A-0EE4EE00B05A}" type="datetimeFigureOut">
               <a:rPr lang="en-GB" smtClean="0"/>
-              <a:t>18/05/2022</a:t>
+              <a:t>19/05/2022</a:t>
             </a:fld>
             <a:endParaRPr lang="en-GB"/>
           </a:p>
@@ -3380,7 +3468,7 @@
           <a:p>
             <a:fld id="{B1B6DC73-6F54-48A7-AC0A-0EE4EE00B05A}" type="datetimeFigureOut">
               <a:rPr lang="en-GB" smtClean="0"/>
-              <a:t>18/05/2022</a:t>
+              <a:t>19/05/2022</a:t>
             </a:fld>
             <a:endParaRPr lang="en-GB"/>
           </a:p>
@@ -3522,7 +3610,7 @@
           <a:p>
             <a:fld id="{B1B6DC73-6F54-48A7-AC0A-0EE4EE00B05A}" type="datetimeFigureOut">
               <a:rPr lang="en-GB" smtClean="0"/>
-              <a:t>18/05/2022</a:t>
+              <a:t>19/05/2022</a:t>
             </a:fld>
             <a:endParaRPr lang="en-GB"/>
           </a:p>
@@ -3635,7 +3723,7 @@
           <a:p>
             <a:fld id="{B1B6DC73-6F54-48A7-AC0A-0EE4EE00B05A}" type="datetimeFigureOut">
               <a:rPr lang="en-GB" smtClean="0"/>
-              <a:t>18/05/2022</a:t>
+              <a:t>19/05/2022</a:t>
             </a:fld>
             <a:endParaRPr lang="en-GB"/>
           </a:p>
@@ -3948,7 +4036,7 @@
           <a:p>
             <a:fld id="{B1B6DC73-6F54-48A7-AC0A-0EE4EE00B05A}" type="datetimeFigureOut">
               <a:rPr lang="en-GB" smtClean="0"/>
-              <a:t>18/05/2022</a:t>
+              <a:t>19/05/2022</a:t>
             </a:fld>
             <a:endParaRPr lang="en-GB"/>
           </a:p>
@@ -4237,7 +4325,7 @@
           <a:p>
             <a:fld id="{B1B6DC73-6F54-48A7-AC0A-0EE4EE00B05A}" type="datetimeFigureOut">
               <a:rPr lang="en-GB" smtClean="0"/>
-              <a:t>18/05/2022</a:t>
+              <a:t>19/05/2022</a:t>
             </a:fld>
             <a:endParaRPr lang="en-GB"/>
           </a:p>
@@ -4480,7 +4568,7 @@
           <a:p>
             <a:fld id="{B1B6DC73-6F54-48A7-AC0A-0EE4EE00B05A}" type="datetimeFigureOut">
               <a:rPr lang="en-GB" smtClean="0"/>
-              <a:t>18/05/2022</a:t>
+              <a:t>19/05/2022</a:t>
             </a:fld>
             <a:endParaRPr lang="en-GB"/>
           </a:p>
@@ -5619,10 +5707,10 @@
       </p:grpSpPr>
       <p:pic>
         <p:nvPicPr>
-          <p:cNvPr id="7" name="Picture 6">
-            <a:extLst>
-              <a:ext uri="{FF2B5EF4-FFF2-40B4-BE49-F238E27FC236}">
-                <a16:creationId xmlns:a16="http://schemas.microsoft.com/office/drawing/2014/main" id="{2EB162D9-0AF6-4EEC-9470-3D283E1A30A7}"/>
+          <p:cNvPr id="5" name="Picture 4">
+            <a:extLst>
+              <a:ext uri="{FF2B5EF4-FFF2-40B4-BE49-F238E27FC236}">
+                <a16:creationId xmlns:a16="http://schemas.microsoft.com/office/drawing/2014/main" id="{99E6A7F2-FA24-4958-B6F9-CF8435D036B2}"/>
               </a:ext>
             </a:extLst>
           </p:cNvPr>
@@ -5645,54 +5733,18 @@
         </p:blipFill>
         <p:spPr>
           <a:xfrm>
-            <a:off x="0" y="485730"/>
-            <a:ext cx="12192000" cy="5886540"/>
+            <a:off x="0" y="149021"/>
+            <a:ext cx="12192000" cy="6559958"/>
           </a:xfrm>
           <a:prstGeom prst="rect">
             <a:avLst/>
           </a:prstGeom>
         </p:spPr>
       </p:pic>
-      <p:sp>
-        <p:nvSpPr>
-          <p:cNvPr id="8" name="TextBox 7">
-            <a:extLst>
-              <a:ext uri="{FF2B5EF4-FFF2-40B4-BE49-F238E27FC236}">
-                <a16:creationId xmlns:a16="http://schemas.microsoft.com/office/drawing/2014/main" id="{835291A4-5C31-468E-853D-5CC31B696586}"/>
-              </a:ext>
-            </a:extLst>
-          </p:cNvPr>
-          <p:cNvSpPr txBox="1"/>
-          <p:nvPr/>
-        </p:nvSpPr>
-        <p:spPr>
-          <a:xfrm>
-            <a:off x="0" y="-9525"/>
-            <a:ext cx="7275589" cy="369332"/>
-          </a:xfrm>
-          <a:prstGeom prst="rect">
-            <a:avLst/>
-          </a:prstGeom>
-          <a:noFill/>
-        </p:spPr>
-        <p:txBody>
-          <a:bodyPr wrap="square" rtlCol="0">
-            <a:spAutoFit/>
-          </a:bodyPr>
-          <a:lstStyle/>
-          <a:p>
-            <a:r>
-              <a:rPr lang="en-NZ" b="1" dirty="0"/>
-              <a:t>All 10 combination of 10% subset runs – variable weighting distribution</a:t>
-            </a:r>
-            <a:endParaRPr lang="en-GB" b="1" dirty="0"/>
-          </a:p>
-        </p:txBody>
-      </p:sp>
     </p:spTree>
     <p:extLst>
       <p:ext uri="{BB962C8B-B14F-4D97-AF65-F5344CB8AC3E}">
-        <p14:creationId xmlns:p14="http://schemas.microsoft.com/office/powerpoint/2010/main" val="1511892141"/>
+        <p14:creationId xmlns:p14="http://schemas.microsoft.com/office/powerpoint/2010/main" val="4192141584"/>
       </p:ext>
     </p:extLst>
   </p:cSld>
@@ -5721,10 +5773,10 @@
       </p:grpSpPr>
       <p:pic>
         <p:nvPicPr>
-          <p:cNvPr id="5" name="Picture 4">
-            <a:extLst>
-              <a:ext uri="{FF2B5EF4-FFF2-40B4-BE49-F238E27FC236}">
-                <a16:creationId xmlns:a16="http://schemas.microsoft.com/office/drawing/2014/main" id="{A2D96899-916E-4667-967A-53C75DE0B124}"/>
+          <p:cNvPr id="7" name="Picture 6">
+            <a:extLst>
+              <a:ext uri="{FF2B5EF4-FFF2-40B4-BE49-F238E27FC236}">
+                <a16:creationId xmlns:a16="http://schemas.microsoft.com/office/drawing/2014/main" id="{2EB162D9-0AF6-4EEC-9470-3D283E1A30A7}"/>
               </a:ext>
             </a:extLst>
           </p:cNvPr>
@@ -5747,8 +5799,8 @@
         </p:blipFill>
         <p:spPr>
           <a:xfrm>
-            <a:off x="799707" y="2129363"/>
-            <a:ext cx="10097909" cy="3648584"/>
+            <a:off x="0" y="485730"/>
+            <a:ext cx="12192000" cy="5886540"/>
           </a:xfrm>
           <a:prstGeom prst="rect">
             <a:avLst/>
@@ -5757,10 +5809,10 @@
       </p:pic>
       <p:sp>
         <p:nvSpPr>
-          <p:cNvPr id="6" name="TextBox 5">
-            <a:extLst>
-              <a:ext uri="{FF2B5EF4-FFF2-40B4-BE49-F238E27FC236}">
-                <a16:creationId xmlns:a16="http://schemas.microsoft.com/office/drawing/2014/main" id="{7A53C59A-1A95-4FC7-AB43-C7A259FFA6C7}"/>
+          <p:cNvPr id="8" name="TextBox 7">
+            <a:extLst>
+              <a:ext uri="{FF2B5EF4-FFF2-40B4-BE49-F238E27FC236}">
+                <a16:creationId xmlns:a16="http://schemas.microsoft.com/office/drawing/2014/main" id="{835291A4-5C31-468E-853D-5CC31B696586}"/>
               </a:ext>
             </a:extLst>
           </p:cNvPr>
@@ -5769,8 +5821,8 @@
         </p:nvSpPr>
         <p:spPr>
           <a:xfrm>
-            <a:off x="213989" y="493362"/>
-            <a:ext cx="10571201" cy="369332"/>
+            <a:off x="0" y="-9525"/>
+            <a:ext cx="7275589" cy="369332"/>
           </a:xfrm>
           <a:prstGeom prst="rect">
             <a:avLst/>
@@ -5785,15 +5837,7 @@
           <a:p>
             <a:r>
               <a:rPr lang="en-NZ" b="1" dirty="0"/>
-              <a:t>Runs on subsets of dataset (rows) when only using blood pressure (</a:t>
-            </a:r>
-            <a:r>
-              <a:rPr lang="en-NZ" b="1" dirty="0" err="1"/>
-              <a:t>dia</a:t>
-            </a:r>
-            <a:r>
-              <a:rPr lang="en-NZ" b="1" dirty="0"/>
-              <a:t> &amp; sys) as inputs into the model</a:t>
+              <a:t>All 10 combination of 10% subset runs – variable weighting distribution</a:t>
             </a:r>
             <a:endParaRPr lang="en-GB" b="1" dirty="0"/>
           </a:p>
@@ -5802,7 +5846,7 @@
     </p:spTree>
     <p:extLst>
       <p:ext uri="{BB962C8B-B14F-4D97-AF65-F5344CB8AC3E}">
-        <p14:creationId xmlns:p14="http://schemas.microsoft.com/office/powerpoint/2010/main" val="65343148"/>
+        <p14:creationId xmlns:p14="http://schemas.microsoft.com/office/powerpoint/2010/main" val="1511892141"/>
       </p:ext>
     </p:extLst>
   </p:cSld>
@@ -5829,10 +5873,690 @@
           <a:chExt cx="0" cy="0"/>
         </a:xfrm>
       </p:grpSpPr>
+      <p:pic>
+        <p:nvPicPr>
+          <p:cNvPr id="5" name="Picture 4">
+            <a:extLst>
+              <a:ext uri="{FF2B5EF4-FFF2-40B4-BE49-F238E27FC236}">
+                <a16:creationId xmlns:a16="http://schemas.microsoft.com/office/drawing/2014/main" id="{A2D96899-916E-4667-967A-53C75DE0B124}"/>
+              </a:ext>
+            </a:extLst>
+          </p:cNvPr>
+          <p:cNvPicPr>
+            <a:picLocks noChangeAspect="1"/>
+          </p:cNvPicPr>
+          <p:nvPr/>
+        </p:nvPicPr>
+        <p:blipFill>
+          <a:blip r:embed="rId2">
+            <a:extLst>
+              <a:ext uri="{28A0092B-C50C-407E-A947-70E740481C1C}">
+                <a14:useLocalDpi xmlns:a14="http://schemas.microsoft.com/office/drawing/2010/main" val="0"/>
+              </a:ext>
+            </a:extLst>
+          </a:blip>
+          <a:stretch>
+            <a:fillRect/>
+          </a:stretch>
+        </p:blipFill>
+        <p:spPr>
+          <a:xfrm>
+            <a:off x="799707" y="2129363"/>
+            <a:ext cx="10097909" cy="3648584"/>
+          </a:xfrm>
+          <a:prstGeom prst="rect">
+            <a:avLst/>
+          </a:prstGeom>
+        </p:spPr>
+      </p:pic>
+      <p:sp>
+        <p:nvSpPr>
+          <p:cNvPr id="6" name="TextBox 5">
+            <a:extLst>
+              <a:ext uri="{FF2B5EF4-FFF2-40B4-BE49-F238E27FC236}">
+                <a16:creationId xmlns:a16="http://schemas.microsoft.com/office/drawing/2014/main" id="{7A53C59A-1A95-4FC7-AB43-C7A259FFA6C7}"/>
+              </a:ext>
+            </a:extLst>
+          </p:cNvPr>
+          <p:cNvSpPr txBox="1"/>
+          <p:nvPr/>
+        </p:nvSpPr>
+        <p:spPr>
+          <a:xfrm>
+            <a:off x="213989" y="493362"/>
+            <a:ext cx="10571201" cy="369332"/>
+          </a:xfrm>
+          <a:prstGeom prst="rect">
+            <a:avLst/>
+          </a:prstGeom>
+          <a:noFill/>
+        </p:spPr>
+        <p:txBody>
+          <a:bodyPr wrap="square" rtlCol="0">
+            <a:spAutoFit/>
+          </a:bodyPr>
+          <a:lstStyle/>
+          <a:p>
+            <a:r>
+              <a:rPr lang="en-NZ" b="1" dirty="0"/>
+              <a:t>Runs on subsets of dataset (rows) when only using blood pressure (</a:t>
+            </a:r>
+            <a:r>
+              <a:rPr lang="en-NZ" b="1" dirty="0" err="1"/>
+              <a:t>dia</a:t>
+            </a:r>
+            <a:r>
+              <a:rPr lang="en-NZ" b="1" dirty="0"/>
+              <a:t> &amp; sys) as inputs into the model</a:t>
+            </a:r>
+            <a:endParaRPr lang="en-GB" b="1" dirty="0"/>
+          </a:p>
+        </p:txBody>
+      </p:sp>
+    </p:spTree>
+    <p:extLst>
+      <p:ext uri="{BB962C8B-B14F-4D97-AF65-F5344CB8AC3E}">
+        <p14:creationId xmlns:p14="http://schemas.microsoft.com/office/powerpoint/2010/main" val="65343148"/>
+      </p:ext>
+    </p:extLst>
+  </p:cSld>
+  <p:clrMapOvr>
+    <a:masterClrMapping/>
+  </p:clrMapOvr>
+</p:sld>
+</file>
+
+<file path=ppt/slides/slide15.xml><?xml version="1.0" encoding="utf-8"?>
+<p:sld xmlns:a="http://schemas.openxmlformats.org/drawingml/2006/main" xmlns:r="http://schemas.openxmlformats.org/officeDocument/2006/relationships" xmlns:p="http://schemas.openxmlformats.org/presentationml/2006/main">
+  <p:cSld>
+    <p:spTree>
+      <p:nvGrpSpPr>
+        <p:cNvPr id="1" name=""/>
+        <p:cNvGrpSpPr/>
+        <p:nvPr/>
+      </p:nvGrpSpPr>
+      <p:grpSpPr>
+        <a:xfrm>
+          <a:off x="0" y="0"/>
+          <a:ext cx="0" cy="0"/>
+          <a:chOff x="0" y="0"/>
+          <a:chExt cx="0" cy="0"/>
+        </a:xfrm>
+      </p:grpSpPr>
+      <p:sp>
+        <p:nvSpPr>
+          <p:cNvPr id="2" name="TextBox 1">
+            <a:extLst>
+              <a:ext uri="{FF2B5EF4-FFF2-40B4-BE49-F238E27FC236}">
+                <a16:creationId xmlns:a16="http://schemas.microsoft.com/office/drawing/2014/main" id="{87137C21-2A3B-4D90-BB02-4D8AD3B6EB50}"/>
+              </a:ext>
+            </a:extLst>
+          </p:cNvPr>
+          <p:cNvSpPr txBox="1"/>
+          <p:nvPr/>
+        </p:nvSpPr>
+        <p:spPr>
+          <a:xfrm>
+            <a:off x="0" y="0"/>
+            <a:ext cx="12191999" cy="584775"/>
+          </a:xfrm>
+          <a:prstGeom prst="rect">
+            <a:avLst/>
+          </a:prstGeom>
+          <a:noFill/>
+        </p:spPr>
+        <p:txBody>
+          <a:bodyPr wrap="square" rtlCol="0">
+            <a:spAutoFit/>
+          </a:bodyPr>
+          <a:lstStyle/>
+          <a:p>
+            <a:pPr algn="ctr"/>
+            <a:r>
+              <a:rPr lang="en-NZ" sz="3200" b="1" dirty="0" err="1"/>
+              <a:t>NeuroPM</a:t>
+            </a:r>
+            <a:r>
+              <a:rPr lang="en-NZ" sz="3200" b="1" dirty="0"/>
+              <a:t> Toolbox Outline</a:t>
+            </a:r>
+            <a:endParaRPr lang="en-GB" sz="3200" b="1" dirty="0"/>
+          </a:p>
+        </p:txBody>
+      </p:sp>
+      <p:sp>
+        <p:nvSpPr>
+          <p:cNvPr id="3" name="TextBox 2">
+            <a:extLst>
+              <a:ext uri="{FF2B5EF4-FFF2-40B4-BE49-F238E27FC236}">
+                <a16:creationId xmlns:a16="http://schemas.microsoft.com/office/drawing/2014/main" id="{471AD88B-3C30-441F-A347-3392F81E75A7}"/>
+              </a:ext>
+            </a:extLst>
+          </p:cNvPr>
+          <p:cNvSpPr txBox="1"/>
+          <p:nvPr/>
+        </p:nvSpPr>
+        <p:spPr>
+          <a:xfrm>
+            <a:off x="0" y="553700"/>
+            <a:ext cx="6096000" cy="5816977"/>
+          </a:xfrm>
+          <a:prstGeom prst="rect">
+            <a:avLst/>
+          </a:prstGeom>
+          <a:noFill/>
+        </p:spPr>
+        <p:txBody>
+          <a:bodyPr wrap="square" rtlCol="0">
+            <a:spAutoFit/>
+          </a:bodyPr>
+          <a:lstStyle/>
+          <a:p>
+            <a:pPr marL="285750" indent="-285750">
+              <a:buFontTx/>
+              <a:buChar char="-"/>
+            </a:pPr>
+            <a:r>
+              <a:rPr lang="en-NZ" sz="1200" dirty="0"/>
+              <a:t>Given a matrix of N rows (patients) by M columns (features)</a:t>
+            </a:r>
+          </a:p>
+          <a:p>
+            <a:pPr marL="285750" indent="-285750">
+              <a:buFontTx/>
+              <a:buChar char="-"/>
+            </a:pPr>
+            <a:r>
+              <a:rPr lang="en-NZ" sz="1200" dirty="0"/>
+              <a:t>Separate rows into background/between/disease categories</a:t>
+            </a:r>
+          </a:p>
+          <a:p>
+            <a:endParaRPr lang="en-NZ" sz="1200" b="1" dirty="0"/>
+          </a:p>
+          <a:p>
+            <a:pPr marL="342900" indent="-342900">
+              <a:buFont typeface="+mj-lt"/>
+              <a:buAutoNum type="arabicPeriod"/>
+            </a:pPr>
+            <a:r>
+              <a:rPr lang="en-NZ" sz="1200" b="1" dirty="0"/>
+              <a:t>Dimensionality Reduction</a:t>
+            </a:r>
+          </a:p>
+          <a:p>
+            <a:pPr marL="800100" lvl="1" indent="-342900">
+              <a:buFont typeface="+mj-lt"/>
+              <a:buAutoNum type="alphaLcParenR"/>
+            </a:pPr>
+            <a:r>
+              <a:rPr lang="en-NZ" sz="1200" dirty="0"/>
+              <a:t>Compute the covariance matrix for the nodes in each of the background (</a:t>
+            </a:r>
+            <a:r>
+              <a:rPr lang="en-NZ" sz="1200" dirty="0" err="1"/>
+              <a:t>C</a:t>
+            </a:r>
+            <a:r>
+              <a:rPr lang="en-NZ" sz="1200" baseline="-25000" dirty="0" err="1"/>
+              <a:t>b</a:t>
+            </a:r>
+            <a:r>
+              <a:rPr lang="en-NZ" sz="1200" dirty="0"/>
+              <a:t>) or disease (C</a:t>
+            </a:r>
+            <a:r>
+              <a:rPr lang="en-NZ" sz="1200" baseline="-25000" dirty="0"/>
+              <a:t>d</a:t>
+            </a:r>
+            <a:r>
+              <a:rPr lang="en-NZ" sz="1200" dirty="0"/>
+              <a:t>) categories</a:t>
+            </a:r>
+          </a:p>
+          <a:p>
+            <a:pPr marL="800100" lvl="1" indent="-342900">
+              <a:buFont typeface="+mj-lt"/>
+              <a:buAutoNum type="alphaLcParenR"/>
+            </a:pPr>
+            <a:r>
+              <a:rPr lang="en-NZ" sz="1200" dirty="0"/>
+              <a:t>Define a range of values </a:t>
+            </a:r>
+            <a:r>
+              <a:rPr lang="el-GR" sz="1200" i="1" dirty="0"/>
+              <a:t>α</a:t>
+            </a:r>
+            <a:r>
+              <a:rPr lang="en-NZ" sz="1200" i="1" dirty="0"/>
+              <a:t> = 10</a:t>
+            </a:r>
+            <a:r>
+              <a:rPr lang="en-NZ" sz="1200" i="1" baseline="30000" dirty="0"/>
+              <a:t>-2 </a:t>
+            </a:r>
+            <a:r>
+              <a:rPr lang="en-NZ" sz="1200" i="1" dirty="0"/>
+              <a:t>to 10</a:t>
+            </a:r>
+            <a:r>
+              <a:rPr lang="en-NZ" sz="1200" i="1" baseline="30000" dirty="0"/>
+              <a:t>2</a:t>
+            </a:r>
+          </a:p>
+          <a:p>
+            <a:pPr marL="1257300" lvl="2" indent="-342900">
+              <a:buFont typeface="Arial" panose="020B0604020202020204" pitchFamily="34" charset="0"/>
+              <a:buChar char="•"/>
+            </a:pPr>
+            <a:r>
+              <a:rPr lang="en-NZ" sz="1200" dirty="0"/>
+              <a:t>For each </a:t>
+            </a:r>
+            <a:r>
+              <a:rPr lang="el-GR" sz="1200" i="1" dirty="0"/>
+              <a:t>α</a:t>
+            </a:r>
+            <a:r>
+              <a:rPr lang="en-NZ" sz="1200" i="1" dirty="0"/>
+              <a:t> </a:t>
+            </a:r>
+            <a:r>
+              <a:rPr lang="en-NZ" sz="1200" dirty="0"/>
+              <a:t>calculate a new combined covariance matrix where C = C</a:t>
+            </a:r>
+            <a:r>
+              <a:rPr lang="en-NZ" sz="1200" baseline="-25000" dirty="0"/>
+              <a:t>d</a:t>
+            </a:r>
+            <a:r>
+              <a:rPr lang="en-NZ" sz="1200" dirty="0"/>
+              <a:t> – </a:t>
+            </a:r>
+            <a:r>
+              <a:rPr lang="el-GR" sz="1200" i="1" dirty="0"/>
+              <a:t>α</a:t>
+            </a:r>
+            <a:r>
+              <a:rPr lang="en-NZ" sz="1200" dirty="0" err="1"/>
+              <a:t>C</a:t>
+            </a:r>
+            <a:r>
+              <a:rPr lang="en-NZ" sz="1200" baseline="-25000" dirty="0" err="1"/>
+              <a:t>b</a:t>
+            </a:r>
+            <a:r>
+              <a:rPr lang="en-NZ" sz="1200" dirty="0"/>
+              <a:t> such that the C gets less/more weighted towards the covariance of the background category</a:t>
+            </a:r>
+          </a:p>
+          <a:p>
+            <a:pPr marL="1257300" lvl="2" indent="-342900">
+              <a:buFont typeface="Arial" panose="020B0604020202020204" pitchFamily="34" charset="0"/>
+              <a:buChar char="•"/>
+            </a:pPr>
+            <a:r>
+              <a:rPr lang="en-NZ" sz="1200" dirty="0"/>
+              <a:t>Perform eigen decomposition to get the principle components (PC) for each C, each column is the eigen vector of each feature and the diagonal elements are the eigen values</a:t>
+            </a:r>
+          </a:p>
+          <a:p>
+            <a:pPr marL="1257300" lvl="2" indent="-342900">
+              <a:buFont typeface="Arial" panose="020B0604020202020204" pitchFamily="34" charset="0"/>
+              <a:buChar char="•"/>
+            </a:pPr>
+            <a:r>
+              <a:rPr lang="en-NZ" sz="1200" dirty="0"/>
+              <a:t>For each </a:t>
+            </a:r>
+            <a:r>
+              <a:rPr lang="el-GR" sz="1200" i="1" dirty="0"/>
+              <a:t>α</a:t>
+            </a:r>
+            <a:r>
+              <a:rPr lang="en-NZ" sz="1200" dirty="0"/>
+              <a:t> keep the PCs with the largest eigen values, the max number to keep is predefined</a:t>
+            </a:r>
+          </a:p>
+          <a:p>
+            <a:pPr marL="800100" lvl="1" indent="-342900">
+              <a:buFont typeface="+mj-lt"/>
+              <a:buAutoNum type="alphaLcParenR"/>
+            </a:pPr>
+            <a:r>
+              <a:rPr lang="en-NZ" sz="1200" dirty="0"/>
+              <a:t>Compute affinity matrix of the PCs between each combination of </a:t>
+            </a:r>
+            <a:r>
+              <a:rPr lang="el-GR" sz="1200" i="1" dirty="0"/>
+              <a:t>α</a:t>
+            </a:r>
+            <a:r>
+              <a:rPr lang="en-NZ" sz="1200" i="1" dirty="0"/>
+              <a:t> </a:t>
+            </a:r>
+            <a:r>
+              <a:rPr lang="en-NZ" sz="1200" dirty="0"/>
+              <a:t>using cosine similarity</a:t>
+            </a:r>
+          </a:p>
+          <a:p>
+            <a:pPr marL="800100" lvl="1" indent="-342900">
+              <a:buFont typeface="+mj-lt"/>
+              <a:buAutoNum type="alphaLcParenR"/>
+            </a:pPr>
+            <a:r>
+              <a:rPr lang="en-NZ" sz="1200" dirty="0"/>
+              <a:t>Use spectral clustering of the affinity matrix a pre-set number times and choose the cluster with the highest value of clustering quality</a:t>
+            </a:r>
+          </a:p>
+          <a:p>
+            <a:pPr marL="800100" lvl="1" indent="-342900">
+              <a:buFont typeface="+mj-lt"/>
+              <a:buAutoNum type="alphaLcParenR"/>
+            </a:pPr>
+            <a:r>
+              <a:rPr lang="en-NZ" sz="1200" dirty="0"/>
+              <a:t>For each unique group in the cluster</a:t>
+            </a:r>
+          </a:p>
+          <a:p>
+            <a:pPr marL="1257300" lvl="2" indent="-342900">
+              <a:buFont typeface="Arial" panose="020B0604020202020204" pitchFamily="34" charset="0"/>
+              <a:buChar char="•"/>
+            </a:pPr>
+            <a:r>
+              <a:rPr lang="en-NZ" sz="1200" dirty="0"/>
+              <a:t>Identify the associated subset of the affinity matrix in the group and find the </a:t>
+            </a:r>
+            <a:r>
+              <a:rPr lang="el-GR" sz="1200" i="1" dirty="0"/>
+              <a:t>α</a:t>
+            </a:r>
+            <a:r>
+              <a:rPr lang="en-NZ" sz="1200" dirty="0"/>
+              <a:t> corresponding to the maximum similarity</a:t>
+            </a:r>
+          </a:p>
+          <a:p>
+            <a:pPr marL="1257300" lvl="2" indent="-342900">
+              <a:buFont typeface="Arial" panose="020B0604020202020204" pitchFamily="34" charset="0"/>
+              <a:buChar char="•"/>
+            </a:pPr>
+            <a:r>
+              <a:rPr lang="en-NZ" sz="1200" dirty="0"/>
+              <a:t>Find the eigen decomposition with the associated </a:t>
+            </a:r>
+            <a:r>
+              <a:rPr lang="el-GR" sz="1200" i="1" dirty="0"/>
+              <a:t>α</a:t>
+            </a:r>
+            <a:r>
+              <a:rPr lang="en-NZ" sz="1200" i="1" dirty="0"/>
+              <a:t> </a:t>
+            </a:r>
+            <a:r>
+              <a:rPr lang="en-NZ" sz="1200" dirty="0"/>
+              <a:t>computed from above, these are the PCs of interest for this cluster group</a:t>
+            </a:r>
+          </a:p>
+          <a:p>
+            <a:pPr marL="1257300" lvl="2" indent="-342900">
+              <a:buFont typeface="Arial" panose="020B0604020202020204" pitchFamily="34" charset="0"/>
+              <a:buChar char="•"/>
+            </a:pPr>
+            <a:r>
+              <a:rPr lang="en-NZ" sz="1200" dirty="0"/>
+              <a:t>Perform matrix multiplication between the entire input dataset and the PC identified to obtain the contrastive PC (</a:t>
+            </a:r>
+            <a:r>
+              <a:rPr lang="en-NZ" sz="1200" dirty="0" err="1"/>
+              <a:t>cPC</a:t>
+            </a:r>
+            <a:r>
+              <a:rPr lang="en-NZ" sz="1200" dirty="0"/>
+              <a:t>)</a:t>
+            </a:r>
+          </a:p>
+          <a:p>
+            <a:pPr marL="1257300" lvl="2" indent="-342900">
+              <a:buFont typeface="Arial" panose="020B0604020202020204" pitchFamily="34" charset="0"/>
+              <a:buChar char="•"/>
+            </a:pPr>
+            <a:r>
+              <a:rPr lang="en-NZ" sz="1200" dirty="0"/>
+              <a:t>Use K-Means clustering on the rows in the </a:t>
+            </a:r>
+            <a:r>
+              <a:rPr lang="en-NZ" sz="1200" dirty="0" err="1"/>
+              <a:t>cPC</a:t>
+            </a:r>
+            <a:r>
+              <a:rPr lang="en-NZ" sz="1200" dirty="0"/>
+              <a:t> in the background/disease groups to compute the </a:t>
+            </a:r>
+            <a:r>
+              <a:rPr lang="en-NZ" sz="1200" dirty="0" err="1"/>
+              <a:t>clusterization</a:t>
+            </a:r>
+            <a:endParaRPr lang="en-NZ" sz="1200" dirty="0"/>
+          </a:p>
+          <a:p>
+            <a:pPr marL="800100" lvl="1" indent="-342900">
+              <a:buFont typeface="+mj-lt"/>
+              <a:buAutoNum type="alphaLcParenR"/>
+            </a:pPr>
+            <a:r>
+              <a:rPr lang="en-NZ" sz="1200" dirty="0"/>
+              <a:t>The final </a:t>
+            </a:r>
+            <a:r>
+              <a:rPr lang="en-NZ" sz="1200" dirty="0" err="1"/>
+              <a:t>cPC</a:t>
+            </a:r>
+            <a:r>
+              <a:rPr lang="en-NZ" sz="1200" dirty="0"/>
+              <a:t> is the </a:t>
+            </a:r>
+            <a:r>
+              <a:rPr lang="en-NZ" sz="1200" dirty="0" err="1"/>
+              <a:t>cPC</a:t>
+            </a:r>
+            <a:r>
+              <a:rPr lang="en-NZ" sz="1200" dirty="0"/>
+              <a:t> from the cluster group which produces the maximum </a:t>
+            </a:r>
+            <a:r>
+              <a:rPr lang="en-NZ" sz="1200" dirty="0" err="1"/>
+              <a:t>clusterization</a:t>
+            </a:r>
+            <a:r>
+              <a:rPr lang="en-NZ" sz="1200" dirty="0"/>
+              <a:t> of the disease category</a:t>
+            </a:r>
+          </a:p>
+        </p:txBody>
+      </p:sp>
+      <p:sp>
+        <p:nvSpPr>
+          <p:cNvPr id="5" name="Rectangle 4">
+            <a:extLst>
+              <a:ext uri="{FF2B5EF4-FFF2-40B4-BE49-F238E27FC236}">
+                <a16:creationId xmlns:a16="http://schemas.microsoft.com/office/drawing/2014/main" id="{5949CE9D-48A9-4703-AAC2-3B8A09048459}"/>
+              </a:ext>
+            </a:extLst>
+          </p:cNvPr>
+          <p:cNvSpPr/>
+          <p:nvPr/>
+        </p:nvSpPr>
+        <p:spPr>
+          <a:xfrm>
+            <a:off x="6096000" y="1102281"/>
+            <a:ext cx="6096000" cy="3785652"/>
+          </a:xfrm>
+          <a:prstGeom prst="rect">
+            <a:avLst/>
+          </a:prstGeom>
+        </p:spPr>
+        <p:txBody>
+          <a:bodyPr wrap="square">
+            <a:spAutoFit/>
+          </a:bodyPr>
+          <a:lstStyle/>
+          <a:p>
+            <a:pPr marL="342900" indent="-342900">
+              <a:buFont typeface="+mj-lt"/>
+              <a:buAutoNum type="arabicPeriod" startAt="2"/>
+            </a:pPr>
+            <a:r>
+              <a:rPr lang="en-NZ" sz="1200" b="1" dirty="0"/>
+              <a:t>Tree Generation</a:t>
+            </a:r>
+          </a:p>
+          <a:p>
+            <a:pPr marL="800100" lvl="1" indent="-342900">
+              <a:buFont typeface="+mj-lt"/>
+              <a:buAutoNum type="alphaLcParenR"/>
+            </a:pPr>
+            <a:r>
+              <a:rPr lang="en-NZ" sz="1200" dirty="0"/>
+              <a:t>Treat each row of the </a:t>
+            </a:r>
+            <a:r>
+              <a:rPr lang="en-NZ" sz="1200" dirty="0" err="1"/>
+              <a:t>cPC</a:t>
+            </a:r>
+            <a:r>
+              <a:rPr lang="en-NZ" sz="1200" dirty="0"/>
+              <a:t> space as a node</a:t>
+            </a:r>
+          </a:p>
+          <a:p>
+            <a:pPr marL="800100" lvl="1" indent="-342900">
+              <a:buFont typeface="+mj-lt"/>
+              <a:buAutoNum type="alphaLcParenR"/>
+            </a:pPr>
+            <a:r>
+              <a:rPr lang="en-NZ" sz="1200" dirty="0"/>
+              <a:t>Define a complete graph where every node is connected where the weights of the branch is the L2 distance between the values in the </a:t>
+            </a:r>
+            <a:r>
+              <a:rPr lang="en-NZ" sz="1200" dirty="0" err="1"/>
+              <a:t>cPC</a:t>
+            </a:r>
+            <a:r>
+              <a:rPr lang="en-NZ" sz="1200" dirty="0"/>
+              <a:t> space, do this for only the background and disease nodes</a:t>
+            </a:r>
+          </a:p>
+          <a:p>
+            <a:pPr marL="800100" lvl="1" indent="-342900">
+              <a:buFont typeface="+mj-lt"/>
+              <a:buAutoNum type="alphaLcParenR"/>
+            </a:pPr>
+            <a:r>
+              <a:rPr lang="en-NZ" sz="1200" dirty="0"/>
+              <a:t>Find the node in the background category which has the overall smallest distance to every other node, set this as the root node</a:t>
+            </a:r>
+          </a:p>
+          <a:p>
+            <a:pPr marL="800100" lvl="1" indent="-342900">
+              <a:buFont typeface="+mj-lt"/>
+              <a:buAutoNum type="alphaLcParenR"/>
+            </a:pPr>
+            <a:r>
+              <a:rPr lang="en-NZ" sz="1200" dirty="0"/>
+              <a:t>Compute the minimum spanning tree starting from the root node across the entire graph (prims algorithm)</a:t>
+            </a:r>
+          </a:p>
+          <a:p>
+            <a:pPr lvl="1"/>
+            <a:endParaRPr lang="en-NZ" sz="1200" dirty="0"/>
+          </a:p>
+          <a:p>
+            <a:pPr marL="342900" indent="-342900">
+              <a:buFont typeface="+mj-lt"/>
+              <a:buAutoNum type="arabicPeriod" startAt="2"/>
+            </a:pPr>
+            <a:r>
+              <a:rPr lang="en-NZ" sz="1200" b="1" dirty="0"/>
+              <a:t>Trajectory Inference/Pseudo-Time Score Calculation</a:t>
+            </a:r>
+          </a:p>
+          <a:p>
+            <a:pPr marL="800100" lvl="1" indent="-342900">
+              <a:buFont typeface="+mj-lt"/>
+              <a:buAutoNum type="alphaLcParenR"/>
+            </a:pPr>
+            <a:r>
+              <a:rPr lang="en-NZ" sz="1200" dirty="0"/>
+              <a:t>Calculate the pseudo-time (or disease progression) score for each node in the background/disease categories as the shortest distance (Dijkstra) from the node to the root node along the minimum spanning tree</a:t>
+            </a:r>
+          </a:p>
+          <a:p>
+            <a:pPr marL="800100" lvl="1" indent="-342900">
+              <a:buFont typeface="+mj-lt"/>
+              <a:buAutoNum type="alphaLcParenR"/>
+            </a:pPr>
+            <a:r>
+              <a:rPr lang="en-NZ" sz="1200" dirty="0"/>
+              <a:t>The pseudo-time score of the nodes in the between category is then extrapolated as the pseudo-time score of the node in the background/disease categories with the shortest distance in the </a:t>
+            </a:r>
+            <a:r>
+              <a:rPr lang="en-NZ" sz="1200" dirty="0" err="1"/>
+              <a:t>cPC</a:t>
+            </a:r>
+            <a:r>
+              <a:rPr lang="en-NZ" sz="1200" dirty="0"/>
+              <a:t> space from the between node</a:t>
+            </a:r>
+          </a:p>
+          <a:p>
+            <a:pPr marL="800100" lvl="1" indent="-342900">
+              <a:buFont typeface="+mj-lt"/>
+              <a:buAutoNum type="alphaLcParenR"/>
+            </a:pPr>
+            <a:r>
+              <a:rPr lang="en-NZ" sz="1200" dirty="0"/>
+              <a:t>The trajectories of disease progression are the major branches of the minimum spanning tree which is open for interpretation depending on how much variation you want to include</a:t>
+            </a:r>
+          </a:p>
+        </p:txBody>
+      </p:sp>
     </p:spTree>
     <p:extLst>
       <p:ext uri="{BB962C8B-B14F-4D97-AF65-F5344CB8AC3E}">
         <p14:creationId xmlns:p14="http://schemas.microsoft.com/office/powerpoint/2010/main" val="4125219743"/>
+      </p:ext>
+    </p:extLst>
+  </p:cSld>
+  <p:clrMapOvr>
+    <a:masterClrMapping/>
+  </p:clrMapOvr>
+</p:sld>
+</file>
+
+<file path=ppt/slides/slide16.xml><?xml version="1.0" encoding="utf-8"?>
+<p:sld xmlns:a="http://schemas.openxmlformats.org/drawingml/2006/main" xmlns:r="http://schemas.openxmlformats.org/officeDocument/2006/relationships" xmlns:p="http://schemas.openxmlformats.org/presentationml/2006/main">
+  <p:cSld>
+    <p:spTree>
+      <p:nvGrpSpPr>
+        <p:cNvPr id="1" name=""/>
+        <p:cNvGrpSpPr/>
+        <p:nvPr/>
+      </p:nvGrpSpPr>
+      <p:grpSpPr>
+        <a:xfrm>
+          <a:off x="0" y="0"/>
+          <a:ext cx="0" cy="0"/>
+          <a:chOff x="0" y="0"/>
+          <a:chExt cx="0" cy="0"/>
+        </a:xfrm>
+      </p:grpSpPr>
+    </p:spTree>
+    <p:extLst>
+      <p:ext uri="{BB962C8B-B14F-4D97-AF65-F5344CB8AC3E}">
+        <p14:creationId xmlns:p14="http://schemas.microsoft.com/office/powerpoint/2010/main" val="1647779813"/>
       </p:ext>
     </p:extLst>
   </p:cSld>
@@ -8281,7 +9005,7 @@
         </p:blipFill>
         <p:spPr>
           <a:xfrm>
-            <a:off x="1013460" y="783907"/>
+            <a:off x="238049" y="805852"/>
             <a:ext cx="9525000" cy="5953126"/>
           </a:xfrm>
           <a:prstGeom prst="rect">
@@ -8319,11 +9043,7 @@
           <a:p>
             <a:r>
               <a:rPr lang="en-NZ" sz="2800" b="1" dirty="0"/>
-              <a:t>Covariance of background for full data </a:t>
-            </a:r>
-            <a:r>
-              <a:rPr lang="en-NZ" sz="2800" b="1"/>
-              <a:t>(green) vs 10% data (red)</a:t>
+              <a:t>Covariance of background for full data (green) vs 10% data (red)</a:t>
             </a:r>
             <a:endParaRPr lang="en-GB" sz="2800" b="1" dirty="0"/>
           </a:p>

</xml_diff>

<commit_message>
added comparison between intermediate results of 10% vs 100% runs
</commit_message>
<xml_diff>
--- a/job_results.pptx
+++ b/job_results.pptx
@@ -5,7 +5,7 @@
     <p:sldMasterId id="2147483648" r:id="rId1"/>
   </p:sldMasterIdLst>
   <p:notesMasterIdLst>
-    <p:notesMasterId r:id="rId19"/>
+    <p:notesMasterId r:id="rId20"/>
   </p:notesMasterIdLst>
   <p:sldIdLst>
     <p:sldId id="256" r:id="rId2"/>
@@ -19,12 +19,13 @@
     <p:sldId id="267" r:id="rId10"/>
     <p:sldId id="270" r:id="rId11"/>
     <p:sldId id="271" r:id="rId12"/>
-    <p:sldId id="272" r:id="rId13"/>
-    <p:sldId id="275" r:id="rId14"/>
-    <p:sldId id="266" r:id="rId15"/>
-    <p:sldId id="263" r:id="rId16"/>
-    <p:sldId id="269" r:id="rId17"/>
-    <p:sldId id="274" r:id="rId18"/>
+    <p:sldId id="269" r:id="rId13"/>
+    <p:sldId id="272" r:id="rId14"/>
+    <p:sldId id="276" r:id="rId15"/>
+    <p:sldId id="275" r:id="rId16"/>
+    <p:sldId id="266" r:id="rId17"/>
+    <p:sldId id="263" r:id="rId18"/>
+    <p:sldId id="274" r:id="rId19"/>
   </p:sldIdLst>
   <p:sldSz cx="12192000" cy="6858000"/>
   <p:notesSz cx="6858000" cy="9144000"/>
@@ -192,7 +193,7 @@
   <pc:docChgLst>
     <pc:chgData name="Zhao Xiong" userId="5eba49e5-2895-4cd9-83e8-b3064fe76704" providerId="ADAL" clId="{B606E7B2-EFF5-418A-8639-9F7537C4DA50}"/>
     <pc:docChg chg="undo custSel addSld delSld modSld sldOrd">
-      <pc:chgData name="Zhao Xiong" userId="5eba49e5-2895-4cd9-83e8-b3064fe76704" providerId="ADAL" clId="{B606E7B2-EFF5-418A-8639-9F7537C4DA50}" dt="2022-05-19T15:47:15.938" v="9966" actId="20577"/>
+      <pc:chgData name="Zhao Xiong" userId="5eba49e5-2895-4cd9-83e8-b3064fe76704" providerId="ADAL" clId="{B606E7B2-EFF5-418A-8639-9F7537C4DA50}" dt="2022-05-20T13:28:17.507" v="10411"/>
       <pc:docMkLst>
         <pc:docMk/>
       </pc:docMkLst>
@@ -678,7 +679,7 @@
         </pc:picChg>
       </pc:sldChg>
       <pc:sldChg chg="addSp delSp modSp add ord">
-        <pc:chgData name="Zhao Xiong" userId="5eba49e5-2895-4cd9-83e8-b3064fe76704" providerId="ADAL" clId="{B606E7B2-EFF5-418A-8639-9F7537C4DA50}" dt="2022-05-19T14:49:05.348" v="9158" actId="20577"/>
+        <pc:chgData name="Zhao Xiong" userId="5eba49e5-2895-4cd9-83e8-b3064fe76704" providerId="ADAL" clId="{B606E7B2-EFF5-418A-8639-9F7537C4DA50}" dt="2022-05-20T13:10:02.063" v="9967" actId="14100"/>
         <pc:sldMkLst>
           <pc:docMk/>
           <pc:sldMk cId="3573502216" sldId="266"/>
@@ -700,7 +701,7 @@
           </ac:spMkLst>
         </pc:spChg>
         <pc:spChg chg="add mod">
-          <ac:chgData name="Zhao Xiong" userId="5eba49e5-2895-4cd9-83e8-b3064fe76704" providerId="ADAL" clId="{B606E7B2-EFF5-418A-8639-9F7537C4DA50}" dt="2022-05-19T14:49:05.348" v="9158" actId="20577"/>
+          <ac:chgData name="Zhao Xiong" userId="5eba49e5-2895-4cd9-83e8-b3064fe76704" providerId="ADAL" clId="{B606E7B2-EFF5-418A-8639-9F7537C4DA50}" dt="2022-05-20T13:10:02.063" v="9967" actId="14100"/>
           <ac:spMkLst>
             <pc:docMk/>
             <pc:sldMk cId="3573502216" sldId="266"/>
@@ -1090,8 +1091,8 @@
           </ac:picMkLst>
         </pc:picChg>
       </pc:sldChg>
-      <pc:sldChg chg="addSp delSp modSp add">
-        <pc:chgData name="Zhao Xiong" userId="5eba49e5-2895-4cd9-83e8-b3064fe76704" providerId="ADAL" clId="{B606E7B2-EFF5-418A-8639-9F7537C4DA50}" dt="2022-05-19T14:59:22.368" v="9530" actId="1035"/>
+      <pc:sldChg chg="addSp delSp modSp add ord">
+        <pc:chgData name="Zhao Xiong" userId="5eba49e5-2895-4cd9-83e8-b3064fe76704" providerId="ADAL" clId="{B606E7B2-EFF5-418A-8639-9F7537C4DA50}" dt="2022-05-20T13:28:17.507" v="10411"/>
         <pc:sldMkLst>
           <pc:docMk/>
           <pc:sldMk cId="4125219743" sldId="269"/>
@@ -1328,7 +1329,7 @@
         </pc:picChg>
       </pc:sldChg>
       <pc:sldChg chg="addSp delSp modSp add">
-        <pc:chgData name="Zhao Xiong" userId="5eba49e5-2895-4cd9-83e8-b3064fe76704" providerId="ADAL" clId="{B606E7B2-EFF5-418A-8639-9F7537C4DA50}" dt="2022-05-19T13:00:27.022" v="3342" actId="1076"/>
+        <pc:chgData name="Zhao Xiong" userId="5eba49e5-2895-4cd9-83e8-b3064fe76704" providerId="ADAL" clId="{B606E7B2-EFF5-418A-8639-9F7537C4DA50}" dt="2022-05-20T13:10:57.226" v="9970" actId="1076"/>
         <pc:sldMkLst>
           <pc:docMk/>
           <pc:sldMk cId="3841447951" sldId="272"/>
@@ -1366,7 +1367,7 @@
           </ac:picMkLst>
         </pc:picChg>
         <pc:picChg chg="add mod">
-          <ac:chgData name="Zhao Xiong" userId="5eba49e5-2895-4cd9-83e8-b3064fe76704" providerId="ADAL" clId="{B606E7B2-EFF5-418A-8639-9F7537C4DA50}" dt="2022-05-19T13:00:27.022" v="3342" actId="1076"/>
+          <ac:chgData name="Zhao Xiong" userId="5eba49e5-2895-4cd9-83e8-b3064fe76704" providerId="ADAL" clId="{B606E7B2-EFF5-418A-8639-9F7537C4DA50}" dt="2022-05-20T13:10:57.226" v="9970" actId="1076"/>
           <ac:picMkLst>
             <pc:docMk/>
             <pc:sldMk cId="3841447951" sldId="272"/>
@@ -1536,6 +1537,149 @@
             <pc:docMk/>
             <pc:sldMk cId="842150243" sldId="275"/>
             <ac:picMk id="11" creationId="{683F6D36-64CE-4660-A2EB-E0C24B880E3A}"/>
+          </ac:picMkLst>
+        </pc:picChg>
+      </pc:sldChg>
+      <pc:sldChg chg="addSp delSp modSp add">
+        <pc:chgData name="Zhao Xiong" userId="5eba49e5-2895-4cd9-83e8-b3064fe76704" providerId="ADAL" clId="{B606E7B2-EFF5-418A-8639-9F7537C4DA50}" dt="2022-05-20T13:26:48.211" v="10410" actId="20577"/>
+        <pc:sldMkLst>
+          <pc:docMk/>
+          <pc:sldMk cId="3437013850" sldId="276"/>
+        </pc:sldMkLst>
+        <pc:spChg chg="del">
+          <ac:chgData name="Zhao Xiong" userId="5eba49e5-2895-4cd9-83e8-b3064fe76704" providerId="ADAL" clId="{B606E7B2-EFF5-418A-8639-9F7537C4DA50}" dt="2022-05-20T13:10:49.387" v="9969"/>
+          <ac:spMkLst>
+            <pc:docMk/>
+            <pc:sldMk cId="3437013850" sldId="276"/>
+            <ac:spMk id="2" creationId="{DC91CC11-112B-4FA2-B39F-72D236478E09}"/>
+          </ac:spMkLst>
+        </pc:spChg>
+        <pc:spChg chg="del">
+          <ac:chgData name="Zhao Xiong" userId="5eba49e5-2895-4cd9-83e8-b3064fe76704" providerId="ADAL" clId="{B606E7B2-EFF5-418A-8639-9F7537C4DA50}" dt="2022-05-20T13:10:49.387" v="9969"/>
+          <ac:spMkLst>
+            <pc:docMk/>
+            <pc:sldMk cId="3437013850" sldId="276"/>
+            <ac:spMk id="3" creationId="{48C1BC5F-4C2F-4EAD-88D5-B3C09D69A9BA}"/>
+          </ac:spMkLst>
+        </pc:spChg>
+        <pc:spChg chg="add mod">
+          <ac:chgData name="Zhao Xiong" userId="5eba49e5-2895-4cd9-83e8-b3064fe76704" providerId="ADAL" clId="{B606E7B2-EFF5-418A-8639-9F7537C4DA50}" dt="2022-05-20T13:17:51.155" v="10217" actId="20577"/>
+          <ac:spMkLst>
+            <pc:docMk/>
+            <pc:sldMk cId="3437013850" sldId="276"/>
+            <ac:spMk id="5" creationId="{88E36227-E7DB-4F39-ACA1-3C41AEE2947D}"/>
+          </ac:spMkLst>
+        </pc:spChg>
+        <pc:spChg chg="add mod">
+          <ac:chgData name="Zhao Xiong" userId="5eba49e5-2895-4cd9-83e8-b3064fe76704" providerId="ADAL" clId="{B606E7B2-EFF5-418A-8639-9F7537C4DA50}" dt="2022-05-20T13:19:46.003" v="10272" actId="1035"/>
+          <ac:spMkLst>
+            <pc:docMk/>
+            <pc:sldMk cId="3437013850" sldId="276"/>
+            <ac:spMk id="7" creationId="{0CF441AD-D24D-4DB7-AEB5-38E1E010AFD5}"/>
+          </ac:spMkLst>
+        </pc:spChg>
+        <pc:spChg chg="add mod">
+          <ac:chgData name="Zhao Xiong" userId="5eba49e5-2895-4cd9-83e8-b3064fe76704" providerId="ADAL" clId="{B606E7B2-EFF5-418A-8639-9F7537C4DA50}" dt="2022-05-20T13:19:44.098" v="10268" actId="1036"/>
+          <ac:spMkLst>
+            <pc:docMk/>
+            <pc:sldMk cId="3437013850" sldId="276"/>
+            <ac:spMk id="8" creationId="{ED6BCD35-3DAF-4E69-8AF9-5A640F488A10}"/>
+          </ac:spMkLst>
+        </pc:spChg>
+        <pc:spChg chg="add mod">
+          <ac:chgData name="Zhao Xiong" userId="5eba49e5-2895-4cd9-83e8-b3064fe76704" providerId="ADAL" clId="{B606E7B2-EFF5-418A-8639-9F7537C4DA50}" dt="2022-05-20T13:26:43.956" v="10407" actId="20577"/>
+          <ac:spMkLst>
+            <pc:docMk/>
+            <pc:sldMk cId="3437013850" sldId="276"/>
+            <ac:spMk id="10" creationId="{ED9A69E3-2193-49D6-B04E-55DE49B5B412}"/>
+          </ac:spMkLst>
+        </pc:spChg>
+        <pc:spChg chg="add mod">
+          <ac:chgData name="Zhao Xiong" userId="5eba49e5-2895-4cd9-83e8-b3064fe76704" providerId="ADAL" clId="{B606E7B2-EFF5-418A-8639-9F7537C4DA50}" dt="2022-05-20T13:26:48.211" v="10410" actId="20577"/>
+          <ac:spMkLst>
+            <pc:docMk/>
+            <pc:sldMk cId="3437013850" sldId="276"/>
+            <ac:spMk id="12" creationId="{6746BBF7-8D3C-4C17-A476-A595D7A49376}"/>
+          </ac:spMkLst>
+        </pc:spChg>
+        <pc:spChg chg="add mod">
+          <ac:chgData name="Zhao Xiong" userId="5eba49e5-2895-4cd9-83e8-b3064fe76704" providerId="ADAL" clId="{B606E7B2-EFF5-418A-8639-9F7537C4DA50}" dt="2022-05-20T13:21:04.276" v="10295" actId="20577"/>
+          <ac:spMkLst>
+            <pc:docMk/>
+            <pc:sldMk cId="3437013850" sldId="276"/>
+            <ac:spMk id="14" creationId="{D5480878-0678-410F-BCC1-F5B63A76A117}"/>
+          </ac:spMkLst>
+        </pc:spChg>
+        <pc:spChg chg="add mod">
+          <ac:chgData name="Zhao Xiong" userId="5eba49e5-2895-4cd9-83e8-b3064fe76704" providerId="ADAL" clId="{B606E7B2-EFF5-418A-8639-9F7537C4DA50}" dt="2022-05-20T13:24:40.004" v="10317" actId="20577"/>
+          <ac:spMkLst>
+            <pc:docMk/>
+            <pc:sldMk cId="3437013850" sldId="276"/>
+            <ac:spMk id="16" creationId="{97F992BA-0046-414B-B242-326C8F979013}"/>
+          </ac:spMkLst>
+        </pc:spChg>
+        <pc:spChg chg="add mod">
+          <ac:chgData name="Zhao Xiong" userId="5eba49e5-2895-4cd9-83e8-b3064fe76704" providerId="ADAL" clId="{B606E7B2-EFF5-418A-8639-9F7537C4DA50}" dt="2022-05-20T13:26:41.331" v="10404" actId="20577"/>
+          <ac:spMkLst>
+            <pc:docMk/>
+            <pc:sldMk cId="3437013850" sldId="276"/>
+            <ac:spMk id="18" creationId="{5FC2BB98-7DC2-4080-AF7B-229F70465EB4}"/>
+          </ac:spMkLst>
+        </pc:spChg>
+        <pc:picChg chg="add mod">
+          <ac:chgData name="Zhao Xiong" userId="5eba49e5-2895-4cd9-83e8-b3064fe76704" providerId="ADAL" clId="{B606E7B2-EFF5-418A-8639-9F7537C4DA50}" dt="2022-05-20T13:15:28.851" v="10158" actId="1035"/>
+          <ac:picMkLst>
+            <pc:docMk/>
+            <pc:sldMk cId="3437013850" sldId="276"/>
+            <ac:picMk id="4" creationId="{3DBA9D61-A95D-461A-A8E5-C9C131D9B99D}"/>
+          </ac:picMkLst>
+        </pc:picChg>
+        <pc:picChg chg="add mod">
+          <ac:chgData name="Zhao Xiong" userId="5eba49e5-2895-4cd9-83e8-b3064fe76704" providerId="ADAL" clId="{B606E7B2-EFF5-418A-8639-9F7537C4DA50}" dt="2022-05-20T13:15:28.851" v="10158" actId="1035"/>
+          <ac:picMkLst>
+            <pc:docMk/>
+            <pc:sldMk cId="3437013850" sldId="276"/>
+            <ac:picMk id="6" creationId="{264A1250-9FAF-417F-9922-67D074A60200}"/>
+          </ac:picMkLst>
+        </pc:picChg>
+        <pc:picChg chg="add mod">
+          <ac:chgData name="Zhao Xiong" userId="5eba49e5-2895-4cd9-83e8-b3064fe76704" providerId="ADAL" clId="{B606E7B2-EFF5-418A-8639-9F7537C4DA50}" dt="2022-05-20T13:19:04.466" v="10229" actId="14100"/>
+          <ac:picMkLst>
+            <pc:docMk/>
+            <pc:sldMk cId="3437013850" sldId="276"/>
+            <ac:picMk id="9" creationId="{A37946B2-A8C3-4601-B813-875BED881A58}"/>
+          </ac:picMkLst>
+        </pc:picChg>
+        <pc:picChg chg="add mod">
+          <ac:chgData name="Zhao Xiong" userId="5eba49e5-2895-4cd9-83e8-b3064fe76704" providerId="ADAL" clId="{B606E7B2-EFF5-418A-8639-9F7537C4DA50}" dt="2022-05-20T13:18:50.226" v="10226" actId="1076"/>
+          <ac:picMkLst>
+            <pc:docMk/>
+            <pc:sldMk cId="3437013850" sldId="276"/>
+            <ac:picMk id="11" creationId="{4F6C404D-301E-4B24-8CA7-E9A4DBC23318}"/>
+          </ac:picMkLst>
+        </pc:picChg>
+        <pc:picChg chg="add mod">
+          <ac:chgData name="Zhao Xiong" userId="5eba49e5-2895-4cd9-83e8-b3064fe76704" providerId="ADAL" clId="{B606E7B2-EFF5-418A-8639-9F7537C4DA50}" dt="2022-05-20T13:20:50.626" v="10276" actId="1076"/>
+          <ac:picMkLst>
+            <pc:docMk/>
+            <pc:sldMk cId="3437013850" sldId="276"/>
+            <ac:picMk id="13" creationId="{E53B9E04-3100-424F-9637-BCC0329948FE}"/>
+          </ac:picMkLst>
+        </pc:picChg>
+        <pc:picChg chg="add mod">
+          <ac:chgData name="Zhao Xiong" userId="5eba49e5-2895-4cd9-83e8-b3064fe76704" providerId="ADAL" clId="{B606E7B2-EFF5-418A-8639-9F7537C4DA50}" dt="2022-05-20T13:24:17.411" v="10299" actId="14100"/>
+          <ac:picMkLst>
+            <pc:docMk/>
+            <pc:sldMk cId="3437013850" sldId="276"/>
+            <ac:picMk id="15" creationId="{E8060267-3272-48B2-A214-4E255690E64B}"/>
+          </ac:picMkLst>
+        </pc:picChg>
+        <pc:picChg chg="add mod">
+          <ac:chgData name="Zhao Xiong" userId="5eba49e5-2895-4cd9-83e8-b3064fe76704" providerId="ADAL" clId="{B606E7B2-EFF5-418A-8639-9F7537C4DA50}" dt="2022-05-20T13:25:31.330" v="10320" actId="14100"/>
+          <ac:picMkLst>
+            <pc:docMk/>
+            <pc:sldMk cId="3437013850" sldId="276"/>
+            <ac:picMk id="17" creationId="{B53F4381-24FF-4F8C-9263-30F4CA20AE5A}"/>
           </ac:picMkLst>
         </pc:picChg>
       </pc:sldChg>
@@ -1626,7 +1770,7 @@
           <a:p>
             <a:fld id="{3F756EDF-0C8E-4F27-B2A4-7BBF4F0FD9CE}" type="datetimeFigureOut">
               <a:rPr lang="en-GB" smtClean="0"/>
-              <a:t>19/05/2022</a:t>
+              <a:t>20/05/2022</a:t>
             </a:fld>
             <a:endParaRPr lang="en-GB"/>
           </a:p>
@@ -2043,7 +2187,7 @@
           <a:p>
             <a:fld id="{B1B6DC73-6F54-48A7-AC0A-0EE4EE00B05A}" type="datetimeFigureOut">
               <a:rPr lang="en-GB" smtClean="0"/>
-              <a:t>19/05/2022</a:t>
+              <a:t>20/05/2022</a:t>
             </a:fld>
             <a:endParaRPr lang="en-GB"/>
           </a:p>
@@ -2243,7 +2387,7 @@
           <a:p>
             <a:fld id="{B1B6DC73-6F54-48A7-AC0A-0EE4EE00B05A}" type="datetimeFigureOut">
               <a:rPr lang="en-GB" smtClean="0"/>
-              <a:t>19/05/2022</a:t>
+              <a:t>20/05/2022</a:t>
             </a:fld>
             <a:endParaRPr lang="en-GB"/>
           </a:p>
@@ -2453,7 +2597,7 @@
           <a:p>
             <a:fld id="{B1B6DC73-6F54-48A7-AC0A-0EE4EE00B05A}" type="datetimeFigureOut">
               <a:rPr lang="en-GB" smtClean="0"/>
-              <a:t>19/05/2022</a:t>
+              <a:t>20/05/2022</a:t>
             </a:fld>
             <a:endParaRPr lang="en-GB"/>
           </a:p>
@@ -2653,7 +2797,7 @@
           <a:p>
             <a:fld id="{B1B6DC73-6F54-48A7-AC0A-0EE4EE00B05A}" type="datetimeFigureOut">
               <a:rPr lang="en-GB" smtClean="0"/>
-              <a:t>19/05/2022</a:t>
+              <a:t>20/05/2022</a:t>
             </a:fld>
             <a:endParaRPr lang="en-GB"/>
           </a:p>
@@ -2929,7 +3073,7 @@
           <a:p>
             <a:fld id="{B1B6DC73-6F54-48A7-AC0A-0EE4EE00B05A}" type="datetimeFigureOut">
               <a:rPr lang="en-GB" smtClean="0"/>
-              <a:t>19/05/2022</a:t>
+              <a:t>20/05/2022</a:t>
             </a:fld>
             <a:endParaRPr lang="en-GB"/>
           </a:p>
@@ -3197,7 +3341,7 @@
           <a:p>
             <a:fld id="{B1B6DC73-6F54-48A7-AC0A-0EE4EE00B05A}" type="datetimeFigureOut">
               <a:rPr lang="en-GB" smtClean="0"/>
-              <a:t>19/05/2022</a:t>
+              <a:t>20/05/2022</a:t>
             </a:fld>
             <a:endParaRPr lang="en-GB"/>
           </a:p>
@@ -3612,7 +3756,7 @@
           <a:p>
             <a:fld id="{B1B6DC73-6F54-48A7-AC0A-0EE4EE00B05A}" type="datetimeFigureOut">
               <a:rPr lang="en-GB" smtClean="0"/>
-              <a:t>19/05/2022</a:t>
+              <a:t>20/05/2022</a:t>
             </a:fld>
             <a:endParaRPr lang="en-GB"/>
           </a:p>
@@ -3754,7 +3898,7 @@
           <a:p>
             <a:fld id="{B1B6DC73-6F54-48A7-AC0A-0EE4EE00B05A}" type="datetimeFigureOut">
               <a:rPr lang="en-GB" smtClean="0"/>
-              <a:t>19/05/2022</a:t>
+              <a:t>20/05/2022</a:t>
             </a:fld>
             <a:endParaRPr lang="en-GB"/>
           </a:p>
@@ -3867,7 +4011,7 @@
           <a:p>
             <a:fld id="{B1B6DC73-6F54-48A7-AC0A-0EE4EE00B05A}" type="datetimeFigureOut">
               <a:rPr lang="en-GB" smtClean="0"/>
-              <a:t>19/05/2022</a:t>
+              <a:t>20/05/2022</a:t>
             </a:fld>
             <a:endParaRPr lang="en-GB"/>
           </a:p>
@@ -4180,7 +4324,7 @@
           <a:p>
             <a:fld id="{B1B6DC73-6F54-48A7-AC0A-0EE4EE00B05A}" type="datetimeFigureOut">
               <a:rPr lang="en-GB" smtClean="0"/>
-              <a:t>19/05/2022</a:t>
+              <a:t>20/05/2022</a:t>
             </a:fld>
             <a:endParaRPr lang="en-GB"/>
           </a:p>
@@ -4469,7 +4613,7 @@
           <a:p>
             <a:fld id="{B1B6DC73-6F54-48A7-AC0A-0EE4EE00B05A}" type="datetimeFigureOut">
               <a:rPr lang="en-GB" smtClean="0"/>
-              <a:t>19/05/2022</a:t>
+              <a:t>20/05/2022</a:t>
             </a:fld>
             <a:endParaRPr lang="en-GB"/>
           </a:p>
@@ -4712,7 +4856,7 @@
           <a:p>
             <a:fld id="{B1B6DC73-6F54-48A7-AC0A-0EE4EE00B05A}" type="datetimeFigureOut">
               <a:rPr lang="en-GB" smtClean="0"/>
-              <a:t>19/05/2022</a:t>
+              <a:t>20/05/2022</a:t>
             </a:fld>
             <a:endParaRPr lang="en-GB"/>
           </a:p>
@@ -6023,42 +6167,12 @@
           <a:chExt cx="0" cy="0"/>
         </a:xfrm>
       </p:grpSpPr>
-      <p:pic>
-        <p:nvPicPr>
-          <p:cNvPr id="5" name="Picture 4">
-            <a:extLst>
-              <a:ext uri="{FF2B5EF4-FFF2-40B4-BE49-F238E27FC236}">
-                <a16:creationId xmlns:a16="http://schemas.microsoft.com/office/drawing/2014/main" id="{AFE9CAA6-BF7E-469A-A974-23ABAD91CE1F}"/>
-              </a:ext>
-            </a:extLst>
-          </p:cNvPr>
-          <p:cNvPicPr>
-            <a:picLocks noChangeAspect="1"/>
-          </p:cNvPicPr>
-          <p:nvPr/>
-        </p:nvPicPr>
-        <p:blipFill>
-          <a:blip r:embed="rId2"/>
-          <a:stretch>
-            <a:fillRect/>
-          </a:stretch>
-        </p:blipFill>
-        <p:spPr>
-          <a:xfrm>
-            <a:off x="238049" y="805852"/>
-            <a:ext cx="9525000" cy="5953126"/>
-          </a:xfrm>
-          <a:prstGeom prst="rect">
-            <a:avLst/>
-          </a:prstGeom>
-        </p:spPr>
-      </p:pic>
-      <p:sp>
-        <p:nvSpPr>
-          <p:cNvPr id="6" name="TextBox 5">
-            <a:extLst>
-              <a:ext uri="{FF2B5EF4-FFF2-40B4-BE49-F238E27FC236}">
-                <a16:creationId xmlns:a16="http://schemas.microsoft.com/office/drawing/2014/main" id="{EEE3435B-843F-4AEE-80B3-F1F68C324391}"/>
+      <p:sp>
+        <p:nvSpPr>
+          <p:cNvPr id="2" name="TextBox 1">
+            <a:extLst>
+              <a:ext uri="{FF2B5EF4-FFF2-40B4-BE49-F238E27FC236}">
+                <a16:creationId xmlns:a16="http://schemas.microsoft.com/office/drawing/2014/main" id="{87137C21-2A3B-4D90-BB02-4D8AD3B6EB50}"/>
               </a:ext>
             </a:extLst>
           </p:cNvPr>
@@ -6068,7 +6182,7 @@
         <p:spPr>
           <a:xfrm>
             <a:off x="0" y="0"/>
-            <a:ext cx="12191999" cy="523220"/>
+            <a:ext cx="12191999" cy="584775"/>
           </a:xfrm>
           <a:prstGeom prst="rect">
             <a:avLst/>
@@ -6081,18 +6195,570 @@
           </a:bodyPr>
           <a:lstStyle/>
           <a:p>
-            <a:r>
-              <a:rPr lang="en-NZ" sz="2800" b="1" dirty="0"/>
-              <a:t>Covariance of background for full data (green) vs 10% data (red)</a:t>
-            </a:r>
-            <a:endParaRPr lang="en-GB" sz="2800" b="1" dirty="0"/>
+            <a:pPr algn="ctr"/>
+            <a:r>
+              <a:rPr lang="en-NZ" sz="3200" b="1" dirty="0" err="1"/>
+              <a:t>NeuroPM</a:t>
+            </a:r>
+            <a:r>
+              <a:rPr lang="en-NZ" sz="3200" b="1" dirty="0"/>
+              <a:t> Toolbox Outline</a:t>
+            </a:r>
+            <a:endParaRPr lang="en-GB" sz="3200" b="1" dirty="0"/>
+          </a:p>
+        </p:txBody>
+      </p:sp>
+      <p:sp>
+        <p:nvSpPr>
+          <p:cNvPr id="3" name="TextBox 2">
+            <a:extLst>
+              <a:ext uri="{FF2B5EF4-FFF2-40B4-BE49-F238E27FC236}">
+                <a16:creationId xmlns:a16="http://schemas.microsoft.com/office/drawing/2014/main" id="{471AD88B-3C30-441F-A347-3392F81E75A7}"/>
+              </a:ext>
+            </a:extLst>
+          </p:cNvPr>
+          <p:cNvSpPr txBox="1"/>
+          <p:nvPr/>
+        </p:nvSpPr>
+        <p:spPr>
+          <a:xfrm>
+            <a:off x="0" y="1616219"/>
+            <a:ext cx="6096000" cy="5447645"/>
+          </a:xfrm>
+          <a:prstGeom prst="rect">
+            <a:avLst/>
+          </a:prstGeom>
+          <a:noFill/>
+        </p:spPr>
+        <p:txBody>
+          <a:bodyPr wrap="square" rtlCol="0">
+            <a:spAutoFit/>
+          </a:bodyPr>
+          <a:lstStyle/>
+          <a:p>
+            <a:pPr marL="342900" indent="-342900">
+              <a:buFont typeface="+mj-lt"/>
+              <a:buAutoNum type="arabicPeriod"/>
+            </a:pPr>
+            <a:r>
+              <a:rPr lang="en-NZ" sz="1200" b="1" dirty="0"/>
+              <a:t>Dimensionality Reduction</a:t>
+            </a:r>
+          </a:p>
+          <a:p>
+            <a:pPr marL="800100" lvl="1" indent="-342900">
+              <a:buFont typeface="+mj-lt"/>
+              <a:buAutoNum type="alphaLcParenR"/>
+            </a:pPr>
+            <a:r>
+              <a:rPr lang="en-NZ" sz="1200" dirty="0"/>
+              <a:t>Compute the covariance matrix for the nodes in each of the background (</a:t>
+            </a:r>
+            <a:r>
+              <a:rPr lang="en-NZ" sz="1200" dirty="0" err="1"/>
+              <a:t>C</a:t>
+            </a:r>
+            <a:r>
+              <a:rPr lang="en-NZ" sz="1200" baseline="-25000" dirty="0" err="1"/>
+              <a:t>b</a:t>
+            </a:r>
+            <a:r>
+              <a:rPr lang="en-NZ" sz="1200" dirty="0"/>
+              <a:t>) or disease (C</a:t>
+            </a:r>
+            <a:r>
+              <a:rPr lang="en-NZ" sz="1200" baseline="-25000" dirty="0"/>
+              <a:t>d</a:t>
+            </a:r>
+            <a:r>
+              <a:rPr lang="en-NZ" sz="1200" dirty="0"/>
+              <a:t>) categories</a:t>
+            </a:r>
+          </a:p>
+          <a:p>
+            <a:pPr marL="800100" lvl="1" indent="-342900">
+              <a:buFont typeface="+mj-lt"/>
+              <a:buAutoNum type="alphaLcParenR"/>
+            </a:pPr>
+            <a:r>
+              <a:rPr lang="en-NZ" sz="1200" dirty="0"/>
+              <a:t>Define a range of values </a:t>
+            </a:r>
+            <a:r>
+              <a:rPr lang="el-GR" sz="1200" i="1" dirty="0"/>
+              <a:t>α</a:t>
+            </a:r>
+            <a:r>
+              <a:rPr lang="en-NZ" sz="1200" i="1" dirty="0"/>
+              <a:t> = 10</a:t>
+            </a:r>
+            <a:r>
+              <a:rPr lang="en-NZ" sz="1200" i="1" baseline="30000" dirty="0"/>
+              <a:t>-2 </a:t>
+            </a:r>
+            <a:r>
+              <a:rPr lang="en-NZ" sz="1200" i="1" dirty="0"/>
+              <a:t>to 10</a:t>
+            </a:r>
+            <a:r>
+              <a:rPr lang="en-NZ" sz="1200" i="1" baseline="30000" dirty="0"/>
+              <a:t>2</a:t>
+            </a:r>
+          </a:p>
+          <a:p>
+            <a:pPr marL="1257300" lvl="2" indent="-342900">
+              <a:buFont typeface="Arial" panose="020B0604020202020204" pitchFamily="34" charset="0"/>
+              <a:buChar char="•"/>
+            </a:pPr>
+            <a:r>
+              <a:rPr lang="en-NZ" sz="1200" dirty="0"/>
+              <a:t>For each </a:t>
+            </a:r>
+            <a:r>
+              <a:rPr lang="el-GR" sz="1200" i="1" dirty="0"/>
+              <a:t>α</a:t>
+            </a:r>
+            <a:r>
+              <a:rPr lang="en-NZ" sz="1200" i="1" dirty="0"/>
+              <a:t> </a:t>
+            </a:r>
+            <a:r>
+              <a:rPr lang="en-NZ" sz="1200" dirty="0"/>
+              <a:t>calculate a new combined covariance matrix where C = C</a:t>
+            </a:r>
+            <a:r>
+              <a:rPr lang="en-NZ" sz="1200" baseline="-25000" dirty="0"/>
+              <a:t>d</a:t>
+            </a:r>
+            <a:r>
+              <a:rPr lang="en-NZ" sz="1200" dirty="0"/>
+              <a:t> – </a:t>
+            </a:r>
+            <a:r>
+              <a:rPr lang="el-GR" sz="1200" i="1" dirty="0"/>
+              <a:t>α</a:t>
+            </a:r>
+            <a:r>
+              <a:rPr lang="en-NZ" sz="1200" dirty="0" err="1"/>
+              <a:t>C</a:t>
+            </a:r>
+            <a:r>
+              <a:rPr lang="en-NZ" sz="1200" baseline="-25000" dirty="0" err="1"/>
+              <a:t>b</a:t>
+            </a:r>
+            <a:r>
+              <a:rPr lang="en-NZ" sz="1200" dirty="0"/>
+              <a:t> such that the C gets less/more weighted towards the covariance of the background category</a:t>
+            </a:r>
+          </a:p>
+          <a:p>
+            <a:pPr marL="1257300" lvl="2" indent="-342900">
+              <a:buFont typeface="Arial" panose="020B0604020202020204" pitchFamily="34" charset="0"/>
+              <a:buChar char="•"/>
+            </a:pPr>
+            <a:r>
+              <a:rPr lang="en-NZ" sz="1200" dirty="0"/>
+              <a:t>Perform eigen decomposition to get the principle components (PC) for each C, each column is the eigen vector of each feature and the diagonal elements are the eigen values</a:t>
+            </a:r>
+          </a:p>
+          <a:p>
+            <a:pPr marL="1257300" lvl="2" indent="-342900">
+              <a:buFont typeface="Arial" panose="020B0604020202020204" pitchFamily="34" charset="0"/>
+              <a:buChar char="•"/>
+            </a:pPr>
+            <a:r>
+              <a:rPr lang="en-NZ" sz="1200" dirty="0"/>
+              <a:t>For each </a:t>
+            </a:r>
+            <a:r>
+              <a:rPr lang="el-GR" sz="1200" i="1" dirty="0"/>
+              <a:t>α</a:t>
+            </a:r>
+            <a:r>
+              <a:rPr lang="en-NZ" sz="1200" dirty="0"/>
+              <a:t> keep the PCs with the largest eigen values, the max number to keep is predefined</a:t>
+            </a:r>
+          </a:p>
+          <a:p>
+            <a:pPr marL="800100" lvl="1" indent="-342900">
+              <a:buFont typeface="+mj-lt"/>
+              <a:buAutoNum type="alphaLcParenR"/>
+            </a:pPr>
+            <a:r>
+              <a:rPr lang="en-NZ" sz="1200" dirty="0"/>
+              <a:t>Compute affinity matrix of the PCs between each combination of </a:t>
+            </a:r>
+            <a:r>
+              <a:rPr lang="el-GR" sz="1200" i="1" dirty="0"/>
+              <a:t>α</a:t>
+            </a:r>
+            <a:r>
+              <a:rPr lang="en-NZ" sz="1200" i="1" dirty="0"/>
+              <a:t> </a:t>
+            </a:r>
+            <a:r>
+              <a:rPr lang="en-NZ" sz="1200" dirty="0"/>
+              <a:t>using cosine similarity</a:t>
+            </a:r>
+          </a:p>
+          <a:p>
+            <a:pPr marL="800100" lvl="1" indent="-342900">
+              <a:buFont typeface="+mj-lt"/>
+              <a:buAutoNum type="alphaLcParenR"/>
+            </a:pPr>
+            <a:r>
+              <a:rPr lang="en-NZ" sz="1200" dirty="0"/>
+              <a:t>Use spectral clustering of the affinity matrix a pre-set number times and choose the cluster with the highest value of clustering quality</a:t>
+            </a:r>
+          </a:p>
+          <a:p>
+            <a:pPr marL="800100" lvl="1" indent="-342900">
+              <a:buFont typeface="+mj-lt"/>
+              <a:buAutoNum type="alphaLcParenR"/>
+            </a:pPr>
+            <a:r>
+              <a:rPr lang="en-NZ" sz="1200" dirty="0"/>
+              <a:t>For each unique group in the cluster</a:t>
+            </a:r>
+          </a:p>
+          <a:p>
+            <a:pPr marL="1257300" lvl="2" indent="-342900">
+              <a:buFont typeface="Arial" panose="020B0604020202020204" pitchFamily="34" charset="0"/>
+              <a:buChar char="•"/>
+            </a:pPr>
+            <a:r>
+              <a:rPr lang="en-NZ" sz="1200" dirty="0"/>
+              <a:t>Identify the associated subset of the affinity matrix in the group and find the </a:t>
+            </a:r>
+            <a:r>
+              <a:rPr lang="el-GR" sz="1200" i="1" dirty="0"/>
+              <a:t>α</a:t>
+            </a:r>
+            <a:r>
+              <a:rPr lang="en-NZ" sz="1200" dirty="0"/>
+              <a:t> corresponding to the maximum similarity</a:t>
+            </a:r>
+          </a:p>
+          <a:p>
+            <a:pPr marL="1257300" lvl="2" indent="-342900">
+              <a:buFont typeface="Arial" panose="020B0604020202020204" pitchFamily="34" charset="0"/>
+              <a:buChar char="•"/>
+            </a:pPr>
+            <a:r>
+              <a:rPr lang="en-NZ" sz="1200" dirty="0"/>
+              <a:t>Find the eigen decomposition with the associated </a:t>
+            </a:r>
+            <a:r>
+              <a:rPr lang="el-GR" sz="1200" i="1" dirty="0"/>
+              <a:t>α</a:t>
+            </a:r>
+            <a:r>
+              <a:rPr lang="en-NZ" sz="1200" i="1" dirty="0"/>
+              <a:t> </a:t>
+            </a:r>
+            <a:r>
+              <a:rPr lang="en-NZ" sz="1200" dirty="0"/>
+              <a:t>computed from above, these are the PCs of interest for this cluster group</a:t>
+            </a:r>
+          </a:p>
+          <a:p>
+            <a:pPr marL="1257300" lvl="2" indent="-342900">
+              <a:buFont typeface="Arial" panose="020B0604020202020204" pitchFamily="34" charset="0"/>
+              <a:buChar char="•"/>
+            </a:pPr>
+            <a:r>
+              <a:rPr lang="en-NZ" sz="1200" dirty="0"/>
+              <a:t>Perform matrix multiplication between the entire input dataset and the PC identified to project the data onto the </a:t>
+            </a:r>
+            <a:r>
+              <a:rPr lang="el-GR" sz="1200" i="1" dirty="0"/>
+              <a:t>α</a:t>
+            </a:r>
+            <a:r>
+              <a:rPr lang="en-NZ" sz="1200" dirty="0"/>
+              <a:t> space and obtain the contrastive PC (</a:t>
+            </a:r>
+            <a:r>
+              <a:rPr lang="en-NZ" sz="1200" dirty="0" err="1"/>
+              <a:t>cPC</a:t>
+            </a:r>
+            <a:r>
+              <a:rPr lang="en-NZ" sz="1200" dirty="0"/>
+              <a:t>)</a:t>
+            </a:r>
+          </a:p>
+          <a:p>
+            <a:pPr marL="1257300" lvl="2" indent="-342900">
+              <a:buFont typeface="Arial" panose="020B0604020202020204" pitchFamily="34" charset="0"/>
+              <a:buChar char="•"/>
+            </a:pPr>
+            <a:r>
+              <a:rPr lang="en-NZ" sz="1200" dirty="0"/>
+              <a:t>Use K-Means clustering on the rows in the </a:t>
+            </a:r>
+            <a:r>
+              <a:rPr lang="en-NZ" sz="1200" dirty="0" err="1"/>
+              <a:t>cPC</a:t>
+            </a:r>
+            <a:r>
+              <a:rPr lang="en-NZ" sz="1200" dirty="0"/>
+              <a:t> in the background/disease groups to compute the clustering </a:t>
+            </a:r>
+            <a:r>
+              <a:rPr lang="en-NZ" sz="1200" dirty="0" err="1"/>
+              <a:t>tendancy</a:t>
+            </a:r>
+            <a:endParaRPr lang="en-NZ" sz="1200" dirty="0"/>
+          </a:p>
+          <a:p>
+            <a:pPr marL="800100" lvl="1" indent="-342900">
+              <a:buFont typeface="+mj-lt"/>
+              <a:buAutoNum type="alphaLcParenR"/>
+            </a:pPr>
+            <a:r>
+              <a:rPr lang="en-NZ" sz="1200" dirty="0"/>
+              <a:t>The final </a:t>
+            </a:r>
+            <a:r>
+              <a:rPr lang="en-NZ" sz="1200" dirty="0" err="1"/>
+              <a:t>cPC</a:t>
+            </a:r>
+            <a:r>
+              <a:rPr lang="en-NZ" sz="1200" dirty="0"/>
+              <a:t> is the </a:t>
+            </a:r>
+            <a:r>
+              <a:rPr lang="en-NZ" sz="1200" dirty="0" err="1"/>
+              <a:t>cPC</a:t>
+            </a:r>
+            <a:r>
+              <a:rPr lang="en-NZ" sz="1200" dirty="0"/>
+              <a:t> from the cluster group which produces the maximum clustering </a:t>
+            </a:r>
+            <a:r>
+              <a:rPr lang="en-NZ" sz="1200" dirty="0" err="1"/>
+              <a:t>tendancy</a:t>
+            </a:r>
+            <a:r>
+              <a:rPr lang="en-NZ" sz="1200" dirty="0"/>
+              <a:t> of the disease category</a:t>
+            </a:r>
+          </a:p>
+        </p:txBody>
+      </p:sp>
+      <p:sp>
+        <p:nvSpPr>
+          <p:cNvPr id="5" name="Rectangle 4">
+            <a:extLst>
+              <a:ext uri="{FF2B5EF4-FFF2-40B4-BE49-F238E27FC236}">
+                <a16:creationId xmlns:a16="http://schemas.microsoft.com/office/drawing/2014/main" id="{5949CE9D-48A9-4703-AAC2-3B8A09048459}"/>
+              </a:ext>
+            </a:extLst>
+          </p:cNvPr>
+          <p:cNvSpPr/>
+          <p:nvPr/>
+        </p:nvSpPr>
+        <p:spPr>
+          <a:xfrm>
+            <a:off x="6095999" y="1616219"/>
+            <a:ext cx="6096000" cy="3785652"/>
+          </a:xfrm>
+          <a:prstGeom prst="rect">
+            <a:avLst/>
+          </a:prstGeom>
+        </p:spPr>
+        <p:txBody>
+          <a:bodyPr wrap="square">
+            <a:spAutoFit/>
+          </a:bodyPr>
+          <a:lstStyle/>
+          <a:p>
+            <a:pPr marL="342900" indent="-342900">
+              <a:buFont typeface="+mj-lt"/>
+              <a:buAutoNum type="arabicPeriod" startAt="2"/>
+            </a:pPr>
+            <a:r>
+              <a:rPr lang="en-NZ" sz="1200" b="1" dirty="0"/>
+              <a:t>Tree Generation</a:t>
+            </a:r>
+          </a:p>
+          <a:p>
+            <a:pPr marL="800100" lvl="1" indent="-342900">
+              <a:buFont typeface="+mj-lt"/>
+              <a:buAutoNum type="alphaLcParenR"/>
+            </a:pPr>
+            <a:r>
+              <a:rPr lang="en-NZ" sz="1200" dirty="0"/>
+              <a:t>Treat each row of the </a:t>
+            </a:r>
+            <a:r>
+              <a:rPr lang="en-NZ" sz="1200" dirty="0" err="1"/>
+              <a:t>cPC</a:t>
+            </a:r>
+            <a:r>
+              <a:rPr lang="en-NZ" sz="1200" dirty="0"/>
+              <a:t> space as a node</a:t>
+            </a:r>
+          </a:p>
+          <a:p>
+            <a:pPr marL="800100" lvl="1" indent="-342900">
+              <a:buFont typeface="+mj-lt"/>
+              <a:buAutoNum type="alphaLcParenR"/>
+            </a:pPr>
+            <a:r>
+              <a:rPr lang="en-NZ" sz="1200" dirty="0"/>
+              <a:t>Define a complete graph where every node is connected where the weights of the branch is the L2 distance between the values in the </a:t>
+            </a:r>
+            <a:r>
+              <a:rPr lang="en-NZ" sz="1200" dirty="0" err="1"/>
+              <a:t>cPC</a:t>
+            </a:r>
+            <a:r>
+              <a:rPr lang="en-NZ" sz="1200" dirty="0"/>
+              <a:t> space, do this for only the background and disease nodes</a:t>
+            </a:r>
+          </a:p>
+          <a:p>
+            <a:pPr marL="800100" lvl="1" indent="-342900">
+              <a:buFont typeface="+mj-lt"/>
+              <a:buAutoNum type="alphaLcParenR"/>
+            </a:pPr>
+            <a:r>
+              <a:rPr lang="en-NZ" sz="1200" dirty="0"/>
+              <a:t>Find the node in the background category which has the overall smallest distance to every other node, set this as the root node</a:t>
+            </a:r>
+          </a:p>
+          <a:p>
+            <a:pPr marL="800100" lvl="1" indent="-342900">
+              <a:buFont typeface="+mj-lt"/>
+              <a:buAutoNum type="alphaLcParenR"/>
+            </a:pPr>
+            <a:r>
+              <a:rPr lang="en-NZ" sz="1200" dirty="0"/>
+              <a:t>Compute the minimum spanning tree starting from the root node across the entire graph (prims algorithm)</a:t>
+            </a:r>
+          </a:p>
+          <a:p>
+            <a:pPr lvl="1"/>
+            <a:endParaRPr lang="en-NZ" sz="1200" dirty="0"/>
+          </a:p>
+          <a:p>
+            <a:pPr marL="342900" indent="-342900">
+              <a:buFont typeface="+mj-lt"/>
+              <a:buAutoNum type="arabicPeriod" startAt="2"/>
+            </a:pPr>
+            <a:r>
+              <a:rPr lang="en-NZ" sz="1200" b="1" dirty="0"/>
+              <a:t>Trajectory Inference/Pseudo-Time Score Calculation</a:t>
+            </a:r>
+          </a:p>
+          <a:p>
+            <a:pPr marL="800100" lvl="1" indent="-342900">
+              <a:buFont typeface="+mj-lt"/>
+              <a:buAutoNum type="alphaLcParenR"/>
+            </a:pPr>
+            <a:r>
+              <a:rPr lang="en-NZ" sz="1200" dirty="0"/>
+              <a:t>Calculate the pseudo-time (or disease progression) score for each node in the background/disease categories as the shortest distance (Dijkstra) from the node to the root node along the minimum spanning tree</a:t>
+            </a:r>
+          </a:p>
+          <a:p>
+            <a:pPr marL="800100" lvl="1" indent="-342900">
+              <a:buFont typeface="+mj-lt"/>
+              <a:buAutoNum type="alphaLcParenR"/>
+            </a:pPr>
+            <a:r>
+              <a:rPr lang="en-NZ" sz="1200" dirty="0"/>
+              <a:t>The pseudo-time score of the nodes in the between category is then extrapolated as the pseudo-time score of the node in the background/disease categories with the shortest distance in the </a:t>
+            </a:r>
+            <a:r>
+              <a:rPr lang="en-NZ" sz="1200" dirty="0" err="1"/>
+              <a:t>cPC</a:t>
+            </a:r>
+            <a:r>
+              <a:rPr lang="en-NZ" sz="1200" dirty="0"/>
+              <a:t> space from the between node</a:t>
+            </a:r>
+          </a:p>
+          <a:p>
+            <a:pPr marL="800100" lvl="1" indent="-342900">
+              <a:buFont typeface="+mj-lt"/>
+              <a:buAutoNum type="alphaLcParenR"/>
+            </a:pPr>
+            <a:r>
+              <a:rPr lang="en-NZ" sz="1200" dirty="0"/>
+              <a:t>The trajectories of disease progression are the major branches of the minimum spanning tree which is open for interpretation depending on how much variation you want to include</a:t>
+            </a:r>
+          </a:p>
+        </p:txBody>
+      </p:sp>
+      <p:sp>
+        <p:nvSpPr>
+          <p:cNvPr id="6" name="Rectangle 5">
+            <a:extLst>
+              <a:ext uri="{FF2B5EF4-FFF2-40B4-BE49-F238E27FC236}">
+                <a16:creationId xmlns:a16="http://schemas.microsoft.com/office/drawing/2014/main" id="{DCFEFAB7-8B6D-4178-A04C-257B6EFB88E4}"/>
+              </a:ext>
+            </a:extLst>
+          </p:cNvPr>
+          <p:cNvSpPr/>
+          <p:nvPr/>
+        </p:nvSpPr>
+        <p:spPr>
+          <a:xfrm>
+            <a:off x="-1" y="526255"/>
+            <a:ext cx="12191999" cy="1015663"/>
+          </a:xfrm>
+          <a:prstGeom prst="rect">
+            <a:avLst/>
+          </a:prstGeom>
+        </p:spPr>
+        <p:txBody>
+          <a:bodyPr wrap="square">
+            <a:spAutoFit/>
+          </a:bodyPr>
+          <a:lstStyle/>
+          <a:p>
+            <a:r>
+              <a:rPr lang="en-NZ" sz="1200" dirty="0"/>
+              <a:t>Assumption:</a:t>
+            </a:r>
+          </a:p>
+          <a:p>
+            <a:pPr marL="171450" indent="-171450">
+              <a:buFontTx/>
+              <a:buChar char="-"/>
+            </a:pPr>
+            <a:r>
+              <a:rPr lang="en-NZ" sz="1200" dirty="0"/>
+              <a:t>Given a large cohort of patients, we can assume they are at different stages of disease, and therefore produce a pseudo-temporal distribution of the progression of disease</a:t>
+            </a:r>
+          </a:p>
+          <a:p>
+            <a:endParaRPr lang="en-NZ" sz="1200" dirty="0"/>
+          </a:p>
+          <a:p>
+            <a:r>
+              <a:rPr lang="en-NZ" sz="1200" dirty="0"/>
+              <a:t>Data:</a:t>
+            </a:r>
+          </a:p>
+          <a:p>
+            <a:pPr marL="285750" indent="-285750">
+              <a:buFontTx/>
+              <a:buChar char="-"/>
+            </a:pPr>
+            <a:r>
+              <a:rPr lang="en-NZ" sz="1200" dirty="0"/>
+              <a:t>Given a matrix of N rows (patients) by M columns (features), separate rows into background/between/disease categories</a:t>
+            </a:r>
           </a:p>
         </p:txBody>
       </p:sp>
     </p:spTree>
     <p:extLst>
       <p:ext uri="{BB962C8B-B14F-4D97-AF65-F5344CB8AC3E}">
-        <p14:creationId xmlns:p14="http://schemas.microsoft.com/office/powerpoint/2010/main" val="3841447951"/>
+        <p14:creationId xmlns:p14="http://schemas.microsoft.com/office/powerpoint/2010/main" val="4125219743"/>
       </p:ext>
     </p:extLst>
   </p:cSld>
@@ -6119,192 +6785,12 @@
           <a:chExt cx="0" cy="0"/>
         </a:xfrm>
       </p:grpSpPr>
-      <p:sp>
-        <p:nvSpPr>
-          <p:cNvPr id="4" name="TextBox 3">
-            <a:extLst>
-              <a:ext uri="{FF2B5EF4-FFF2-40B4-BE49-F238E27FC236}">
-                <a16:creationId xmlns:a16="http://schemas.microsoft.com/office/drawing/2014/main" id="{327B066D-B21D-4911-AF52-D1403D359AAD}"/>
-              </a:ext>
-            </a:extLst>
-          </p:cNvPr>
-          <p:cNvSpPr txBox="1"/>
-          <p:nvPr/>
-        </p:nvSpPr>
-        <p:spPr>
-          <a:xfrm>
-            <a:off x="0" y="0"/>
-            <a:ext cx="12191999" cy="523220"/>
-          </a:xfrm>
-          <a:prstGeom prst="rect">
-            <a:avLst/>
-          </a:prstGeom>
-          <a:noFill/>
-        </p:spPr>
-        <p:txBody>
-          <a:bodyPr wrap="square" rtlCol="0">
-            <a:spAutoFit/>
-          </a:bodyPr>
-          <a:lstStyle/>
-          <a:p>
-            <a:r>
-              <a:rPr lang="en-NZ" sz="2800" b="1" dirty="0"/>
-              <a:t>Testing subset 1:2800 vs 2:2802</a:t>
-            </a:r>
-            <a:endParaRPr lang="en-GB" sz="2800" b="1" dirty="0"/>
-          </a:p>
-        </p:txBody>
-      </p:sp>
       <p:pic>
         <p:nvPicPr>
-          <p:cNvPr id="2" name="Picture 1">
-            <a:extLst>
-              <a:ext uri="{FF2B5EF4-FFF2-40B4-BE49-F238E27FC236}">
-                <a16:creationId xmlns:a16="http://schemas.microsoft.com/office/drawing/2014/main" id="{7AF2B0FD-0BF1-43E4-ADCE-ED04868FD930}"/>
-              </a:ext>
-            </a:extLst>
-          </p:cNvPr>
-          <p:cNvPicPr>
-            <a:picLocks noChangeAspect="1"/>
-          </p:cNvPicPr>
-          <p:nvPr/>
-        </p:nvPicPr>
-        <p:blipFill rotWithShape="1">
-          <a:blip r:embed="rId2"/>
-          <a:srcRect t="4957" r="28177"/>
-          <a:stretch/>
-        </p:blipFill>
-        <p:spPr>
-          <a:xfrm>
-            <a:off x="156629" y="897830"/>
-            <a:ext cx="2605952" cy="4171604"/>
-          </a:xfrm>
-          <a:prstGeom prst="rect">
-            <a:avLst/>
-          </a:prstGeom>
-        </p:spPr>
-      </p:pic>
-      <p:pic>
-        <p:nvPicPr>
-          <p:cNvPr id="3" name="Picture 2">
-            <a:extLst>
-              <a:ext uri="{FF2B5EF4-FFF2-40B4-BE49-F238E27FC236}">
-                <a16:creationId xmlns:a16="http://schemas.microsoft.com/office/drawing/2014/main" id="{3028EAD8-2EEB-4838-8CA3-5DD5FAC0D37B}"/>
-              </a:ext>
-            </a:extLst>
-          </p:cNvPr>
-          <p:cNvPicPr>
-            <a:picLocks noChangeAspect="1"/>
-          </p:cNvPicPr>
-          <p:nvPr/>
-        </p:nvPicPr>
-        <p:blipFill rotWithShape="1">
-          <a:blip r:embed="rId3"/>
-          <a:srcRect t="4540" r="27009"/>
-          <a:stretch/>
-        </p:blipFill>
-        <p:spPr>
-          <a:xfrm>
-            <a:off x="2930830" y="897830"/>
-            <a:ext cx="2602184" cy="4156974"/>
-          </a:xfrm>
-          <a:prstGeom prst="rect">
-            <a:avLst/>
-          </a:prstGeom>
-        </p:spPr>
-      </p:pic>
-      <p:sp>
-        <p:nvSpPr>
-          <p:cNvPr id="5" name="TextBox 4">
-            <a:extLst>
-              <a:ext uri="{FF2B5EF4-FFF2-40B4-BE49-F238E27FC236}">
-                <a16:creationId xmlns:a16="http://schemas.microsoft.com/office/drawing/2014/main" id="{6F4D977B-615E-41A0-9D4F-CD40BC4ECCA4}"/>
-              </a:ext>
-            </a:extLst>
-          </p:cNvPr>
-          <p:cNvSpPr txBox="1"/>
-          <p:nvPr/>
-        </p:nvSpPr>
-        <p:spPr>
-          <a:xfrm>
-            <a:off x="156629" y="5094656"/>
-            <a:ext cx="2605952" cy="369332"/>
-          </a:xfrm>
-          <a:prstGeom prst="rect">
-            <a:avLst/>
-          </a:prstGeom>
-          <a:noFill/>
-        </p:spPr>
-        <p:txBody>
-          <a:bodyPr wrap="square" lIns="0" tIns="0" rIns="0" bIns="0" rtlCol="0">
-            <a:spAutoFit/>
-          </a:bodyPr>
-          <a:lstStyle/>
-          <a:p>
-            <a:pPr algn="ctr"/>
-            <a:r>
-              <a:rPr lang="en-NZ" sz="1200" b="1" dirty="0"/>
-              <a:t>Rows 1:2800</a:t>
-            </a:r>
-          </a:p>
-          <a:p>
-            <a:pPr algn="ctr"/>
-            <a:r>
-              <a:rPr lang="en-NZ" sz="1200" b="1" dirty="0"/>
-              <a:t>466 Variables Above Threshold</a:t>
-            </a:r>
-          </a:p>
-        </p:txBody>
-      </p:sp>
-      <p:sp>
-        <p:nvSpPr>
-          <p:cNvPr id="10" name="TextBox 9">
-            <a:extLst>
-              <a:ext uri="{FF2B5EF4-FFF2-40B4-BE49-F238E27FC236}">
-                <a16:creationId xmlns:a16="http://schemas.microsoft.com/office/drawing/2014/main" id="{A29BC89C-7380-4DAC-B053-8BC2AC9B7D18}"/>
-              </a:ext>
-            </a:extLst>
-          </p:cNvPr>
-          <p:cNvSpPr txBox="1"/>
-          <p:nvPr/>
-        </p:nvSpPr>
-        <p:spPr>
-          <a:xfrm>
-            <a:off x="2930830" y="5080026"/>
-            <a:ext cx="2605952" cy="369332"/>
-          </a:xfrm>
-          <a:prstGeom prst="rect">
-            <a:avLst/>
-          </a:prstGeom>
-          <a:noFill/>
-        </p:spPr>
-        <p:txBody>
-          <a:bodyPr wrap="square" lIns="0" tIns="0" rIns="0" bIns="0" rtlCol="0">
-            <a:spAutoFit/>
-          </a:bodyPr>
-          <a:lstStyle/>
-          <a:p>
-            <a:pPr algn="ctr"/>
-            <a:r>
-              <a:rPr lang="en-NZ" sz="1200" b="1" dirty="0"/>
-              <a:t>Rows 2:2801</a:t>
-            </a:r>
-          </a:p>
-          <a:p>
-            <a:pPr algn="ctr"/>
-            <a:r>
-              <a:rPr lang="en-NZ" sz="1200" b="1" dirty="0"/>
-              <a:t>464 Variables Above Threshold</a:t>
-            </a:r>
-          </a:p>
-        </p:txBody>
-      </p:sp>
-      <p:pic>
-        <p:nvPicPr>
-          <p:cNvPr id="11" name="Picture 10">
-            <a:extLst>
-              <a:ext uri="{FF2B5EF4-FFF2-40B4-BE49-F238E27FC236}">
-                <a16:creationId xmlns:a16="http://schemas.microsoft.com/office/drawing/2014/main" id="{683F6D36-64CE-4660-A2EB-E0C24B880E3A}"/>
+          <p:cNvPr id="5" name="Picture 4">
+            <a:extLst>
+              <a:ext uri="{FF2B5EF4-FFF2-40B4-BE49-F238E27FC236}">
+                <a16:creationId xmlns:a16="http://schemas.microsoft.com/office/drawing/2014/main" id="{AFE9CAA6-BF7E-469A-A974-23ABAD91CE1F}"/>
               </a:ext>
             </a:extLst>
           </p:cNvPr>
@@ -6314,15 +6800,15 @@
           <p:nvPr/>
         </p:nvPicPr>
         <p:blipFill>
-          <a:blip r:embed="rId4"/>
+          <a:blip r:embed="rId2"/>
           <a:stretch>
             <a:fillRect/>
           </a:stretch>
         </p:blipFill>
         <p:spPr>
           <a:xfrm>
-            <a:off x="5779352" y="897831"/>
-            <a:ext cx="2577164" cy="4156974"/>
+            <a:off x="259995" y="688809"/>
+            <a:ext cx="9525000" cy="5953126"/>
           </a:xfrm>
           <a:prstGeom prst="rect">
             <a:avLst/>
@@ -6331,10 +6817,10 @@
       </p:pic>
       <p:sp>
         <p:nvSpPr>
-          <p:cNvPr id="12" name="TextBox 11">
-            <a:extLst>
-              <a:ext uri="{FF2B5EF4-FFF2-40B4-BE49-F238E27FC236}">
-                <a16:creationId xmlns:a16="http://schemas.microsoft.com/office/drawing/2014/main" id="{C331A33F-BB94-4D46-BABC-48A3FE8AC753}"/>
+          <p:cNvPr id="6" name="TextBox 5">
+            <a:extLst>
+              <a:ext uri="{FF2B5EF4-FFF2-40B4-BE49-F238E27FC236}">
+                <a16:creationId xmlns:a16="http://schemas.microsoft.com/office/drawing/2014/main" id="{EEE3435B-843F-4AEE-80B3-F1F68C324391}"/>
               </a:ext>
             </a:extLst>
           </p:cNvPr>
@@ -6343,8 +6829,8 @@
         </p:nvSpPr>
         <p:spPr>
           <a:xfrm>
-            <a:off x="5779352" y="5054804"/>
-            <a:ext cx="2562770" cy="369332"/>
+            <a:off x="0" y="0"/>
+            <a:ext cx="12191999" cy="523220"/>
           </a:xfrm>
           <a:prstGeom prst="rect">
             <a:avLst/>
@@ -6352,93 +6838,23 @@
           <a:noFill/>
         </p:spPr>
         <p:txBody>
-          <a:bodyPr wrap="square" lIns="0" tIns="0" rIns="0" bIns="0" rtlCol="0">
+          <a:bodyPr wrap="square" rtlCol="0">
             <a:spAutoFit/>
           </a:bodyPr>
           <a:lstStyle/>
           <a:p>
-            <a:pPr algn="ctr"/>
-            <a:r>
-              <a:rPr lang="en-NZ" sz="1200" b="1"/>
-              <a:t>Rows 3:2802</a:t>
-            </a:r>
-            <a:endParaRPr lang="en-NZ" sz="1200" b="1" dirty="0"/>
-          </a:p>
-          <a:p>
-            <a:pPr algn="ctr"/>
-            <a:r>
-              <a:rPr lang="en-NZ" sz="1200" b="1" dirty="0"/>
-              <a:t>464 Variables Above Threshold</a:t>
-            </a:r>
-          </a:p>
-        </p:txBody>
-      </p:sp>
-      <p:sp>
-        <p:nvSpPr>
-          <p:cNvPr id="13" name="TextBox 12">
-            <a:extLst>
-              <a:ext uri="{FF2B5EF4-FFF2-40B4-BE49-F238E27FC236}">
-                <a16:creationId xmlns:a16="http://schemas.microsoft.com/office/drawing/2014/main" id="{F5B0AF2A-C591-40C9-AB95-DC636B67E369}"/>
-              </a:ext>
-            </a:extLst>
-          </p:cNvPr>
-          <p:cNvSpPr txBox="1"/>
-          <p:nvPr/>
-        </p:nvSpPr>
-        <p:spPr>
-          <a:xfrm>
-            <a:off x="6307521" y="5960169"/>
-            <a:ext cx="4849418" cy="553998"/>
-          </a:xfrm>
-          <a:prstGeom prst="rect">
-            <a:avLst/>
-          </a:prstGeom>
-          <a:solidFill>
-            <a:schemeClr val="bg1"/>
-          </a:solidFill>
-        </p:spPr>
-        <p:txBody>
-          <a:bodyPr wrap="square" lIns="0" tIns="0" rIns="0" bIns="0" rtlCol="0">
-            <a:spAutoFit/>
-          </a:bodyPr>
-          <a:lstStyle/>
-          <a:p>
-            <a:r>
-              <a:rPr lang="en-NZ" sz="1200" dirty="0">
-                <a:solidFill>
-                  <a:srgbClr val="FF0000"/>
-                </a:solidFill>
-              </a:rPr>
-              <a:t>Even when we just have 1 patient different, the variables outputted by </a:t>
-            </a:r>
-            <a:r>
-              <a:rPr lang="en-NZ" sz="1200" dirty="0" err="1">
-                <a:solidFill>
-                  <a:srgbClr val="FF0000"/>
-                </a:solidFill>
-              </a:rPr>
-              <a:t>cPCA</a:t>
-            </a:r>
-            <a:r>
-              <a:rPr lang="en-NZ" sz="1200" dirty="0">
-                <a:solidFill>
-                  <a:srgbClr val="FF0000"/>
-                </a:solidFill>
-              </a:rPr>
-              <a:t> can change pretty significantly, refer to excel spreadsheet for comparison of individual variables sorted by their weighting</a:t>
-            </a:r>
-            <a:endParaRPr lang="en-GB" sz="1200" dirty="0">
-              <a:solidFill>
-                <a:srgbClr val="FF0000"/>
-              </a:solidFill>
-            </a:endParaRPr>
+            <a:r>
+              <a:rPr lang="en-NZ" sz="2800" b="1" dirty="0"/>
+              <a:t>Covariance of background for full data (green) vs 10% data (red)</a:t>
+            </a:r>
+            <a:endParaRPr lang="en-GB" sz="2800" b="1" dirty="0"/>
           </a:p>
         </p:txBody>
       </p:sp>
     </p:spTree>
     <p:extLst>
       <p:ext uri="{BB962C8B-B14F-4D97-AF65-F5344CB8AC3E}">
-        <p14:creationId xmlns:p14="http://schemas.microsoft.com/office/powerpoint/2010/main" val="842150243"/>
+        <p14:creationId xmlns:p14="http://schemas.microsoft.com/office/powerpoint/2010/main" val="3841447951"/>
       </p:ext>
     </p:extLst>
   </p:cSld>
@@ -6467,10 +6883,10 @@
       </p:grpSpPr>
       <p:pic>
         <p:nvPicPr>
-          <p:cNvPr id="5" name="Picture 4">
-            <a:extLst>
-              <a:ext uri="{FF2B5EF4-FFF2-40B4-BE49-F238E27FC236}">
-                <a16:creationId xmlns:a16="http://schemas.microsoft.com/office/drawing/2014/main" id="{2BAC2202-805B-4DC3-A3C7-C9CC97599E10}"/>
+          <p:cNvPr id="4" name="Picture 3">
+            <a:extLst>
+              <a:ext uri="{FF2B5EF4-FFF2-40B4-BE49-F238E27FC236}">
+                <a16:creationId xmlns:a16="http://schemas.microsoft.com/office/drawing/2014/main" id="{3DBA9D61-A95D-461A-A8E5-C9C131D9B99D}"/>
               </a:ext>
             </a:extLst>
           </p:cNvPr>
@@ -6479,21 +6895,16 @@
           </p:cNvPicPr>
           <p:nvPr/>
         </p:nvPicPr>
-        <p:blipFill rotWithShape="1">
-          <a:blip r:embed="rId2">
-            <a:extLst>
-              <a:ext uri="{28A0092B-C50C-407E-A947-70E740481C1C}">
-                <a14:useLocalDpi xmlns:a14="http://schemas.microsoft.com/office/drawing/2010/main" val="0"/>
-              </a:ext>
-            </a:extLst>
-          </a:blip>
-          <a:srcRect r="54446"/>
-          <a:stretch/>
+        <p:blipFill>
+          <a:blip r:embed="rId2"/>
+          <a:stretch>
+            <a:fillRect/>
+          </a:stretch>
         </p:blipFill>
         <p:spPr>
           <a:xfrm>
-            <a:off x="76201" y="1140496"/>
-            <a:ext cx="2982682" cy="3890687"/>
+            <a:off x="104316" y="526792"/>
+            <a:ext cx="3977565" cy="1958562"/>
           </a:xfrm>
           <a:prstGeom prst="rect">
             <a:avLst/>
@@ -6502,10 +6913,10 @@
       </p:pic>
       <p:sp>
         <p:nvSpPr>
-          <p:cNvPr id="6" name="TextBox 5">
-            <a:extLst>
-              <a:ext uri="{FF2B5EF4-FFF2-40B4-BE49-F238E27FC236}">
-                <a16:creationId xmlns:a16="http://schemas.microsoft.com/office/drawing/2014/main" id="{108BEBBF-0CC4-49CA-B7B2-9D4B22059FB3}"/>
+          <p:cNvPr id="5" name="TextBox 4">
+            <a:extLst>
+              <a:ext uri="{FF2B5EF4-FFF2-40B4-BE49-F238E27FC236}">
+                <a16:creationId xmlns:a16="http://schemas.microsoft.com/office/drawing/2014/main" id="{88E36227-E7DB-4F39-ACA1-3C41AEE2947D}"/>
               </a:ext>
             </a:extLst>
           </p:cNvPr>
@@ -6514,8 +6925,8 @@
         </p:nvSpPr>
         <p:spPr>
           <a:xfrm>
-            <a:off x="213989" y="493362"/>
-            <a:ext cx="10571201" cy="369332"/>
+            <a:off x="0" y="0"/>
+            <a:ext cx="12191999" cy="400110"/>
           </a:xfrm>
           <a:prstGeom prst="rect">
             <a:avLst/>
@@ -6528,28 +6939,21 @@
           </a:bodyPr>
           <a:lstStyle/>
           <a:p>
-            <a:r>
-              <a:rPr lang="en-NZ" b="1" dirty="0"/>
-              <a:t>Handling abnormally high distance values in </a:t>
-            </a:r>
-            <a:r>
-              <a:rPr lang="en-NZ" b="1" dirty="0" err="1"/>
-              <a:t>cPC</a:t>
-            </a:r>
-            <a:r>
-              <a:rPr lang="en-NZ" b="1" dirty="0"/>
-              <a:t> (test on 20% subset ~5600 rows)</a:t>
-            </a:r>
-            <a:endParaRPr lang="en-GB" b="1" dirty="0"/>
+            <a:pPr algn="ctr"/>
+            <a:r>
+              <a:rPr lang="en-NZ" sz="2000" b="1" dirty="0"/>
+              <a:t>Compare Intermediate Results Pairs for 100% (left) vs 10% (right)</a:t>
+            </a:r>
+            <a:endParaRPr lang="en-GB" sz="2000" b="1" dirty="0"/>
           </a:p>
         </p:txBody>
       </p:sp>
       <p:pic>
         <p:nvPicPr>
-          <p:cNvPr id="2" name="Picture 1">
-            <a:extLst>
-              <a:ext uri="{FF2B5EF4-FFF2-40B4-BE49-F238E27FC236}">
-                <a16:creationId xmlns:a16="http://schemas.microsoft.com/office/drawing/2014/main" id="{0FA7BFA3-93B6-4DD8-BF5C-5441A83F4695}"/>
+          <p:cNvPr id="6" name="Picture 5">
+            <a:extLst>
+              <a:ext uri="{FF2B5EF4-FFF2-40B4-BE49-F238E27FC236}">
+                <a16:creationId xmlns:a16="http://schemas.microsoft.com/office/drawing/2014/main" id="{264A1250-9FAF-417F-9922-67D074A60200}"/>
               </a:ext>
             </a:extLst>
           </p:cNvPr>
@@ -6566,8 +6970,8 @@
         </p:blipFill>
         <p:spPr>
           <a:xfrm>
-            <a:off x="6041565" y="1140496"/>
-            <a:ext cx="2873800" cy="3841079"/>
+            <a:off x="104317" y="2670020"/>
+            <a:ext cx="3977565" cy="1958562"/>
           </a:xfrm>
           <a:prstGeom prst="rect">
             <a:avLst/>
@@ -6576,10 +6980,10 @@
       </p:pic>
       <p:sp>
         <p:nvSpPr>
-          <p:cNvPr id="8" name="TextBox 7">
-            <a:extLst>
-              <a:ext uri="{FF2B5EF4-FFF2-40B4-BE49-F238E27FC236}">
-                <a16:creationId xmlns:a16="http://schemas.microsoft.com/office/drawing/2014/main" id="{846D2B52-EEE0-4075-A79B-6528659C5996}"/>
+          <p:cNvPr id="7" name="TextBox 6">
+            <a:extLst>
+              <a:ext uri="{FF2B5EF4-FFF2-40B4-BE49-F238E27FC236}">
+                <a16:creationId xmlns:a16="http://schemas.microsoft.com/office/drawing/2014/main" id="{0CF441AD-D24D-4DB7-AEB5-38E1E010AFD5}"/>
               </a:ext>
             </a:extLst>
           </p:cNvPr>
@@ -6588,15 +6992,13 @@
         </p:nvSpPr>
         <p:spPr>
           <a:xfrm>
-            <a:off x="234218" y="4981575"/>
-            <a:ext cx="2099408" cy="369332"/>
-          </a:xfrm>
-          <a:prstGeom prst="rect">
-            <a:avLst/>
-          </a:prstGeom>
-          <a:solidFill>
-            <a:schemeClr val="bg1"/>
-          </a:solidFill>
+            <a:off x="104316" y="354970"/>
+            <a:ext cx="3977565" cy="184666"/>
+          </a:xfrm>
+          <a:prstGeom prst="rect">
+            <a:avLst/>
+          </a:prstGeom>
+          <a:noFill/>
         </p:spPr>
         <p:txBody>
           <a:bodyPr wrap="square" lIns="0" tIns="0" rIns="0" bIns="0" rtlCol="0">
@@ -6606,26 +7008,22 @@
           <a:p>
             <a:pPr algn="ctr"/>
             <a:r>
-              <a:rPr lang="en-NZ" sz="1200" b="1" dirty="0"/>
-              <a:t>1) Original </a:t>
-            </a:r>
-          </a:p>
-          <a:p>
-            <a:pPr algn="ctr"/>
-            <a:r>
-              <a:rPr lang="en-NZ" sz="1200" b="1" dirty="0"/>
-              <a:t>(Minimum Spanning Tree)</a:t>
-            </a:r>
-            <a:endParaRPr lang="en-GB" sz="1200" b="1" dirty="0"/>
-          </a:p>
-        </p:txBody>
-      </p:sp>
-      <p:sp>
-        <p:nvSpPr>
-          <p:cNvPr id="9" name="TextBox 8">
-            <a:extLst>
-              <a:ext uri="{FF2B5EF4-FFF2-40B4-BE49-F238E27FC236}">
-                <a16:creationId xmlns:a16="http://schemas.microsoft.com/office/drawing/2014/main" id="{159ECB6D-8197-42C9-9B08-115C0CB6E983}"/>
+              <a:rPr lang="en-NZ" sz="1200" b="1" dirty="0">
+                <a:solidFill>
+                  <a:srgbClr val="0070C0"/>
+                </a:solidFill>
+              </a:rPr>
+              <a:t>Covariance of Background Population</a:t>
+            </a:r>
+          </a:p>
+        </p:txBody>
+      </p:sp>
+      <p:sp>
+        <p:nvSpPr>
+          <p:cNvPr id="8" name="TextBox 7">
+            <a:extLst>
+              <a:ext uri="{FF2B5EF4-FFF2-40B4-BE49-F238E27FC236}">
+                <a16:creationId xmlns:a16="http://schemas.microsoft.com/office/drawing/2014/main" id="{ED6BCD35-3DAF-4E69-8AF9-5A640F488A10}"/>
               </a:ext>
             </a:extLst>
           </p:cNvPr>
@@ -6634,15 +7032,13 @@
         </p:nvSpPr>
         <p:spPr>
           <a:xfrm>
-            <a:off x="3275407" y="4981575"/>
-            <a:ext cx="1982394" cy="553998"/>
-          </a:xfrm>
-          <a:prstGeom prst="rect">
-            <a:avLst/>
-          </a:prstGeom>
-          <a:solidFill>
-            <a:schemeClr val="bg1"/>
-          </a:solidFill>
+            <a:off x="104316" y="2507299"/>
+            <a:ext cx="3977565" cy="184666"/>
+          </a:xfrm>
+          <a:prstGeom prst="rect">
+            <a:avLst/>
+          </a:prstGeom>
+          <a:noFill/>
         </p:spPr>
         <p:txBody>
           <a:bodyPr wrap="square" lIns="0" tIns="0" rIns="0" bIns="0" rtlCol="0">
@@ -6652,213 +7048,22 @@
           <a:p>
             <a:pPr algn="ctr"/>
             <a:r>
-              <a:rPr lang="en-NZ" sz="1200" b="1" dirty="0"/>
-              <a:t>2) Filter out large values in </a:t>
-            </a:r>
-            <a:r>
-              <a:rPr lang="en-NZ" sz="1200" b="1" dirty="0" err="1"/>
-              <a:t>cPC</a:t>
-            </a:r>
-            <a:r>
-              <a:rPr lang="en-NZ" sz="1200" b="1" dirty="0"/>
-              <a:t> space (set values above 3sd as the median)</a:t>
-            </a:r>
-            <a:endParaRPr lang="en-GB" sz="1200" b="1" dirty="0"/>
-          </a:p>
-        </p:txBody>
-      </p:sp>
-      <p:sp>
-        <p:nvSpPr>
-          <p:cNvPr id="10" name="TextBox 9">
-            <a:extLst>
-              <a:ext uri="{FF2B5EF4-FFF2-40B4-BE49-F238E27FC236}">
-                <a16:creationId xmlns:a16="http://schemas.microsoft.com/office/drawing/2014/main" id="{D67F0F88-F469-4158-8F13-A89F610E665A}"/>
-              </a:ext>
-            </a:extLst>
-          </p:cNvPr>
-          <p:cNvSpPr txBox="1"/>
-          <p:nvPr/>
-        </p:nvSpPr>
-        <p:spPr>
-          <a:xfrm>
-            <a:off x="6135621" y="4981575"/>
-            <a:ext cx="2227330" cy="369332"/>
-          </a:xfrm>
-          <a:prstGeom prst="rect">
-            <a:avLst/>
-          </a:prstGeom>
-          <a:solidFill>
-            <a:schemeClr val="bg1"/>
-          </a:solidFill>
-        </p:spPr>
-        <p:txBody>
-          <a:bodyPr wrap="square" lIns="0" tIns="0" rIns="0" bIns="0" rtlCol="0">
-            <a:spAutoFit/>
-          </a:bodyPr>
-          <a:lstStyle/>
-          <a:p>
-            <a:pPr algn="ctr"/>
-            <a:r>
-              <a:rPr lang="en-NZ" sz="1200" b="1" dirty="0"/>
-              <a:t>3) Shortest Path Tree Instead of Minimum Spanning Tree</a:t>
-            </a:r>
-            <a:endParaRPr lang="en-GB" sz="1200" b="1" dirty="0"/>
-          </a:p>
-        </p:txBody>
-      </p:sp>
-      <p:sp>
-        <p:nvSpPr>
-          <p:cNvPr id="11" name="TextBox 10">
-            <a:extLst>
-              <a:ext uri="{FF2B5EF4-FFF2-40B4-BE49-F238E27FC236}">
-                <a16:creationId xmlns:a16="http://schemas.microsoft.com/office/drawing/2014/main" id="{8DF388B5-B151-430B-A09E-940AEAB6AF19}"/>
-              </a:ext>
-            </a:extLst>
-          </p:cNvPr>
-          <p:cNvSpPr txBox="1"/>
-          <p:nvPr/>
-        </p:nvSpPr>
-        <p:spPr>
-          <a:xfrm>
-            <a:off x="9540280" y="4981575"/>
-            <a:ext cx="1356320" cy="369332"/>
-          </a:xfrm>
-          <a:prstGeom prst="rect">
-            <a:avLst/>
-          </a:prstGeom>
-          <a:solidFill>
-            <a:schemeClr val="bg1"/>
-          </a:solidFill>
-        </p:spPr>
-        <p:txBody>
-          <a:bodyPr wrap="square" lIns="0" tIns="0" rIns="0" bIns="0" rtlCol="0">
-            <a:spAutoFit/>
-          </a:bodyPr>
-          <a:lstStyle/>
-          <a:p>
-            <a:pPr algn="ctr"/>
-            <a:r>
-              <a:rPr lang="en-NZ" sz="1200" b="1" dirty="0"/>
-              <a:t>4) #2 (filter) + #3 (use shortest path tree)</a:t>
-            </a:r>
-            <a:endParaRPr lang="en-GB" sz="1200" b="1" dirty="0"/>
-          </a:p>
-        </p:txBody>
-      </p:sp>
-      <p:sp>
-        <p:nvSpPr>
-          <p:cNvPr id="12" name="TextBox 11">
-            <a:extLst>
-              <a:ext uri="{FF2B5EF4-FFF2-40B4-BE49-F238E27FC236}">
-                <a16:creationId xmlns:a16="http://schemas.microsoft.com/office/drawing/2014/main" id="{E23BCCE6-D4B3-49A4-8702-D3E432463990}"/>
-              </a:ext>
-            </a:extLst>
-          </p:cNvPr>
-          <p:cNvSpPr txBox="1"/>
-          <p:nvPr/>
-        </p:nvSpPr>
-        <p:spPr>
-          <a:xfrm>
-            <a:off x="4690862" y="5834957"/>
-            <a:ext cx="4849418" cy="553998"/>
-          </a:xfrm>
-          <a:prstGeom prst="rect">
-            <a:avLst/>
-          </a:prstGeom>
-          <a:solidFill>
-            <a:schemeClr val="bg1"/>
-          </a:solidFill>
-        </p:spPr>
-        <p:txBody>
-          <a:bodyPr wrap="square" lIns="0" tIns="0" rIns="0" bIns="0" rtlCol="0">
-            <a:spAutoFit/>
-          </a:bodyPr>
-          <a:lstStyle/>
-          <a:p>
-            <a:r>
-              <a:rPr lang="en-NZ" sz="1200" dirty="0">
+              <a:rPr lang="en-NZ" sz="1200" b="1" dirty="0">
                 <a:solidFill>
-                  <a:srgbClr val="FF0000"/>
+                  <a:srgbClr val="0070C0"/>
                 </a:solidFill>
               </a:rPr>
-              <a:t>Note that #2 is currently flawed as we cannot just reassign these abnormally large values in </a:t>
-            </a:r>
-            <a:r>
-              <a:rPr lang="en-NZ" sz="1200" dirty="0" err="1">
-                <a:solidFill>
-                  <a:srgbClr val="FF0000"/>
-                </a:solidFill>
-              </a:rPr>
-              <a:t>cPC</a:t>
-            </a:r>
-            <a:r>
-              <a:rPr lang="en-NZ" sz="1200" dirty="0">
-                <a:solidFill>
-                  <a:srgbClr val="FF0000"/>
-                </a:solidFill>
-              </a:rPr>
-              <a:t> space with the median (around 0), they should be instead replaced somehow by their next closest node ….</a:t>
-            </a:r>
-            <a:endParaRPr lang="en-GB" sz="1200" dirty="0">
-              <a:solidFill>
-                <a:srgbClr val="FF0000"/>
-              </a:solidFill>
-            </a:endParaRPr>
-          </a:p>
-        </p:txBody>
-      </p:sp>
-      <p:cxnSp>
-        <p:nvCxnSpPr>
-          <p:cNvPr id="17" name="Connector: Elbow 16">
-            <a:extLst>
-              <a:ext uri="{FF2B5EF4-FFF2-40B4-BE49-F238E27FC236}">
-                <a16:creationId xmlns:a16="http://schemas.microsoft.com/office/drawing/2014/main" id="{2943542E-98E6-4223-8034-821A97495596}"/>
-              </a:ext>
-            </a:extLst>
-          </p:cNvPr>
-          <p:cNvCxnSpPr>
-            <a:cxnSpLocks/>
-            <a:stCxn id="12" idx="1"/>
-            <a:endCxn id="9" idx="2"/>
-          </p:cNvCxnSpPr>
-          <p:nvPr/>
-        </p:nvCxnSpPr>
-        <p:spPr>
-          <a:xfrm rot="10800000">
-            <a:off x="4266604" y="5535574"/>
-            <a:ext cx="424258" cy="576383"/>
-          </a:xfrm>
-          <a:prstGeom prst="bentConnector2">
-            <a:avLst/>
-          </a:prstGeom>
-          <a:ln>
-            <a:solidFill>
-              <a:srgbClr val="FF0000"/>
-            </a:solidFill>
-            <a:tailEnd type="triangle"/>
-          </a:ln>
-        </p:spPr>
-        <p:style>
-          <a:lnRef idx="1">
-            <a:schemeClr val="accent1"/>
-          </a:lnRef>
-          <a:fillRef idx="0">
-            <a:schemeClr val="accent1"/>
-          </a:fillRef>
-          <a:effectRef idx="0">
-            <a:schemeClr val="accent1"/>
-          </a:effectRef>
-          <a:fontRef idx="minor">
-            <a:schemeClr val="tx1"/>
-          </a:fontRef>
-        </p:style>
-      </p:cxnSp>
+              <a:t>Covariance of Target Population</a:t>
+            </a:r>
+          </a:p>
+        </p:txBody>
+      </p:sp>
       <p:pic>
         <p:nvPicPr>
-          <p:cNvPr id="15" name="Picture 14">
-            <a:extLst>
-              <a:ext uri="{FF2B5EF4-FFF2-40B4-BE49-F238E27FC236}">
-                <a16:creationId xmlns:a16="http://schemas.microsoft.com/office/drawing/2014/main" id="{D8C13DE0-0AB8-4F7C-89AB-3778BEAD9361}"/>
+          <p:cNvPr id="9" name="Picture 8">
+            <a:extLst>
+              <a:ext uri="{FF2B5EF4-FFF2-40B4-BE49-F238E27FC236}">
+                <a16:creationId xmlns:a16="http://schemas.microsoft.com/office/drawing/2014/main" id="{A37946B2-A8C3-4601-B813-875BED881A58}"/>
               </a:ext>
             </a:extLst>
           </p:cNvPr>
@@ -6875,20 +7080,60 @@
         </p:blipFill>
         <p:spPr>
           <a:xfrm>
-            <a:off x="3058883" y="1140496"/>
-            <a:ext cx="2873800" cy="3841079"/>
+            <a:off x="4159374" y="525006"/>
+            <a:ext cx="4037361" cy="1960346"/>
           </a:xfrm>
           <a:prstGeom prst="rect">
             <a:avLst/>
           </a:prstGeom>
         </p:spPr>
       </p:pic>
+      <p:sp>
+        <p:nvSpPr>
+          <p:cNvPr id="10" name="TextBox 9">
+            <a:extLst>
+              <a:ext uri="{FF2B5EF4-FFF2-40B4-BE49-F238E27FC236}">
+                <a16:creationId xmlns:a16="http://schemas.microsoft.com/office/drawing/2014/main" id="{ED9A69E3-2193-49D6-B04E-55DE49B5B412}"/>
+              </a:ext>
+            </a:extLst>
+          </p:cNvPr>
+          <p:cNvSpPr txBox="1"/>
+          <p:nvPr/>
+        </p:nvSpPr>
+        <p:spPr>
+          <a:xfrm>
+            <a:off x="4159373" y="354969"/>
+            <a:ext cx="4037362" cy="184666"/>
+          </a:xfrm>
+          <a:prstGeom prst="rect">
+            <a:avLst/>
+          </a:prstGeom>
+          <a:noFill/>
+        </p:spPr>
+        <p:txBody>
+          <a:bodyPr wrap="square" lIns="0" tIns="0" rIns="0" bIns="0" rtlCol="0">
+            <a:spAutoFit/>
+          </a:bodyPr>
+          <a:lstStyle/>
+          <a:p>
+            <a:pPr algn="ctr"/>
+            <a:r>
+              <a:rPr lang="en-NZ" sz="1200" b="1" dirty="0">
+                <a:solidFill>
+                  <a:srgbClr val="0070C0"/>
+                </a:solidFill>
+              </a:rPr>
+              <a:t>Eigen Decomposition for All Alpha</a:t>
+            </a:r>
+          </a:p>
+        </p:txBody>
+      </p:sp>
       <p:pic>
         <p:nvPicPr>
-          <p:cNvPr id="19" name="Picture 18">
-            <a:extLst>
-              <a:ext uri="{FF2B5EF4-FFF2-40B4-BE49-F238E27FC236}">
-                <a16:creationId xmlns:a16="http://schemas.microsoft.com/office/drawing/2014/main" id="{F6139D21-7BD8-451D-8A9D-88C6155831EF}"/>
+          <p:cNvPr id="11" name="Picture 10">
+            <a:extLst>
+              <a:ext uri="{FF2B5EF4-FFF2-40B4-BE49-F238E27FC236}">
+                <a16:creationId xmlns:a16="http://schemas.microsoft.com/office/drawing/2014/main" id="{4F6C404D-301E-4B24-8CA7-E9A4DBC23318}"/>
               </a:ext>
             </a:extLst>
           </p:cNvPr>
@@ -6905,18 +7150,273 @@
         </p:blipFill>
         <p:spPr>
           <a:xfrm>
-            <a:off x="9009422" y="1144938"/>
-            <a:ext cx="2873800" cy="3836637"/>
+            <a:off x="4156936" y="2670020"/>
+            <a:ext cx="4039799" cy="1958562"/>
           </a:xfrm>
           <a:prstGeom prst="rect">
             <a:avLst/>
           </a:prstGeom>
         </p:spPr>
       </p:pic>
+      <p:sp>
+        <p:nvSpPr>
+          <p:cNvPr id="12" name="TextBox 11">
+            <a:extLst>
+              <a:ext uri="{FF2B5EF4-FFF2-40B4-BE49-F238E27FC236}">
+                <a16:creationId xmlns:a16="http://schemas.microsoft.com/office/drawing/2014/main" id="{6746BBF7-8D3C-4C17-A476-A595D7A49376}"/>
+              </a:ext>
+            </a:extLst>
+          </p:cNvPr>
+          <p:cNvSpPr txBox="1"/>
+          <p:nvPr/>
+        </p:nvSpPr>
+        <p:spPr>
+          <a:xfrm>
+            <a:off x="4156936" y="2507298"/>
+            <a:ext cx="4039799" cy="184666"/>
+          </a:xfrm>
+          <a:prstGeom prst="rect">
+            <a:avLst/>
+          </a:prstGeom>
+          <a:noFill/>
+        </p:spPr>
+        <p:txBody>
+          <a:bodyPr wrap="square" lIns="0" tIns="0" rIns="0" bIns="0" rtlCol="0">
+            <a:spAutoFit/>
+          </a:bodyPr>
+          <a:lstStyle/>
+          <a:p>
+            <a:pPr algn="ctr"/>
+            <a:r>
+              <a:rPr lang="en-NZ" sz="1200" b="1" dirty="0">
+                <a:solidFill>
+                  <a:srgbClr val="0070C0"/>
+                </a:solidFill>
+              </a:rPr>
+              <a:t>Eigen Values for All Alpha</a:t>
+            </a:r>
+          </a:p>
+        </p:txBody>
+      </p:sp>
+      <p:pic>
+        <p:nvPicPr>
+          <p:cNvPr id="13" name="Picture 12">
+            <a:extLst>
+              <a:ext uri="{FF2B5EF4-FFF2-40B4-BE49-F238E27FC236}">
+                <a16:creationId xmlns:a16="http://schemas.microsoft.com/office/drawing/2014/main" id="{E53B9E04-3100-424F-9637-BCC0329948FE}"/>
+              </a:ext>
+            </a:extLst>
+          </p:cNvPr>
+          <p:cNvPicPr>
+            <a:picLocks noChangeAspect="1"/>
+          </p:cNvPicPr>
+          <p:nvPr/>
+        </p:nvPicPr>
+        <p:blipFill>
+          <a:blip r:embed="rId6"/>
+          <a:stretch>
+            <a:fillRect/>
+          </a:stretch>
+        </p:blipFill>
+        <p:spPr>
+          <a:xfrm>
+            <a:off x="104315" y="4822349"/>
+            <a:ext cx="3977565" cy="1963394"/>
+          </a:xfrm>
+          <a:prstGeom prst="rect">
+            <a:avLst/>
+          </a:prstGeom>
+        </p:spPr>
+      </p:pic>
+      <p:sp>
+        <p:nvSpPr>
+          <p:cNvPr id="14" name="TextBox 13">
+            <a:extLst>
+              <a:ext uri="{FF2B5EF4-FFF2-40B4-BE49-F238E27FC236}">
+                <a16:creationId xmlns:a16="http://schemas.microsoft.com/office/drawing/2014/main" id="{D5480878-0678-410F-BCC1-F5B63A76A117}"/>
+              </a:ext>
+            </a:extLst>
+          </p:cNvPr>
+          <p:cNvSpPr txBox="1"/>
+          <p:nvPr/>
+        </p:nvSpPr>
+        <p:spPr>
+          <a:xfrm>
+            <a:off x="104315" y="4662931"/>
+            <a:ext cx="3977565" cy="184666"/>
+          </a:xfrm>
+          <a:prstGeom prst="rect">
+            <a:avLst/>
+          </a:prstGeom>
+          <a:noFill/>
+        </p:spPr>
+        <p:txBody>
+          <a:bodyPr wrap="square" lIns="0" tIns="0" rIns="0" bIns="0" rtlCol="0">
+            <a:spAutoFit/>
+          </a:bodyPr>
+          <a:lstStyle/>
+          <a:p>
+            <a:pPr algn="ctr"/>
+            <a:r>
+              <a:rPr lang="en-NZ" sz="1200" b="1" dirty="0">
+                <a:solidFill>
+                  <a:srgbClr val="0070C0"/>
+                </a:solidFill>
+              </a:rPr>
+              <a:t>Affinity Matrix</a:t>
+            </a:r>
+          </a:p>
+        </p:txBody>
+      </p:sp>
+      <p:pic>
+        <p:nvPicPr>
+          <p:cNvPr id="15" name="Picture 14">
+            <a:extLst>
+              <a:ext uri="{FF2B5EF4-FFF2-40B4-BE49-F238E27FC236}">
+                <a16:creationId xmlns:a16="http://schemas.microsoft.com/office/drawing/2014/main" id="{E8060267-3272-48B2-A214-4E255690E64B}"/>
+              </a:ext>
+            </a:extLst>
+          </p:cNvPr>
+          <p:cNvPicPr>
+            <a:picLocks noChangeAspect="1"/>
+          </p:cNvPicPr>
+          <p:nvPr/>
+        </p:nvPicPr>
+        <p:blipFill>
+          <a:blip r:embed="rId7"/>
+          <a:stretch>
+            <a:fillRect/>
+          </a:stretch>
+        </p:blipFill>
+        <p:spPr>
+          <a:xfrm>
+            <a:off x="4156937" y="4828607"/>
+            <a:ext cx="4039798" cy="1975453"/>
+          </a:xfrm>
+          <a:prstGeom prst="rect">
+            <a:avLst/>
+          </a:prstGeom>
+        </p:spPr>
+      </p:pic>
+      <p:sp>
+        <p:nvSpPr>
+          <p:cNvPr id="16" name="TextBox 15">
+            <a:extLst>
+              <a:ext uri="{FF2B5EF4-FFF2-40B4-BE49-F238E27FC236}">
+                <a16:creationId xmlns:a16="http://schemas.microsoft.com/office/drawing/2014/main" id="{97F992BA-0046-414B-B242-326C8F979013}"/>
+              </a:ext>
+            </a:extLst>
+          </p:cNvPr>
+          <p:cNvSpPr txBox="1"/>
+          <p:nvPr/>
+        </p:nvSpPr>
+        <p:spPr>
+          <a:xfrm>
+            <a:off x="4156936" y="4658516"/>
+            <a:ext cx="4039799" cy="184666"/>
+          </a:xfrm>
+          <a:prstGeom prst="rect">
+            <a:avLst/>
+          </a:prstGeom>
+          <a:noFill/>
+        </p:spPr>
+        <p:txBody>
+          <a:bodyPr wrap="square" lIns="0" tIns="0" rIns="0" bIns="0" rtlCol="0">
+            <a:spAutoFit/>
+          </a:bodyPr>
+          <a:lstStyle/>
+          <a:p>
+            <a:pPr algn="ctr"/>
+            <a:r>
+              <a:rPr lang="en-NZ" sz="1200" b="1" dirty="0" err="1">
+                <a:solidFill>
+                  <a:srgbClr val="0070C0"/>
+                </a:solidFill>
+              </a:rPr>
+              <a:t>cPCs</a:t>
+            </a:r>
+            <a:endParaRPr lang="en-NZ" sz="1200" b="1" dirty="0">
+              <a:solidFill>
+                <a:srgbClr val="0070C0"/>
+              </a:solidFill>
+            </a:endParaRPr>
+          </a:p>
+        </p:txBody>
+      </p:sp>
+      <p:pic>
+        <p:nvPicPr>
+          <p:cNvPr id="17" name="Picture 16">
+            <a:extLst>
+              <a:ext uri="{FF2B5EF4-FFF2-40B4-BE49-F238E27FC236}">
+                <a16:creationId xmlns:a16="http://schemas.microsoft.com/office/drawing/2014/main" id="{B53F4381-24FF-4F8C-9263-30F4CA20AE5A}"/>
+              </a:ext>
+            </a:extLst>
+          </p:cNvPr>
+          <p:cNvPicPr>
+            <a:picLocks noChangeAspect="1"/>
+          </p:cNvPicPr>
+          <p:nvPr/>
+        </p:nvPicPr>
+        <p:blipFill>
+          <a:blip r:embed="rId8"/>
+          <a:stretch>
+            <a:fillRect/>
+          </a:stretch>
+        </p:blipFill>
+        <p:spPr>
+          <a:xfrm>
+            <a:off x="8234467" y="525006"/>
+            <a:ext cx="3863276" cy="1960346"/>
+          </a:xfrm>
+          <a:prstGeom prst="rect">
+            <a:avLst/>
+          </a:prstGeom>
+        </p:spPr>
+      </p:pic>
+      <p:sp>
+        <p:nvSpPr>
+          <p:cNvPr id="18" name="TextBox 17">
+            <a:extLst>
+              <a:ext uri="{FF2B5EF4-FFF2-40B4-BE49-F238E27FC236}">
+                <a16:creationId xmlns:a16="http://schemas.microsoft.com/office/drawing/2014/main" id="{5FC2BB98-7DC2-4080-AF7B-229F70465EB4}"/>
+              </a:ext>
+            </a:extLst>
+          </p:cNvPr>
+          <p:cNvSpPr txBox="1"/>
+          <p:nvPr/>
+        </p:nvSpPr>
+        <p:spPr>
+          <a:xfrm>
+            <a:off x="8212249" y="354969"/>
+            <a:ext cx="3885494" cy="184666"/>
+          </a:xfrm>
+          <a:prstGeom prst="rect">
+            <a:avLst/>
+          </a:prstGeom>
+          <a:noFill/>
+        </p:spPr>
+        <p:txBody>
+          <a:bodyPr wrap="square" lIns="0" tIns="0" rIns="0" bIns="0" rtlCol="0">
+            <a:spAutoFit/>
+          </a:bodyPr>
+          <a:lstStyle/>
+          <a:p>
+            <a:pPr algn="ctr"/>
+            <a:r>
+              <a:rPr lang="en-NZ" sz="1200" b="1" dirty="0">
+                <a:solidFill>
+                  <a:srgbClr val="0070C0"/>
+                </a:solidFill>
+              </a:rPr>
+              <a:t>Eigen Decomposition Medoids (Nodal Weights) for all Alpha</a:t>
+            </a:r>
+          </a:p>
+        </p:txBody>
+      </p:sp>
     </p:spTree>
     <p:extLst>
       <p:ext uri="{BB962C8B-B14F-4D97-AF65-F5344CB8AC3E}">
-        <p14:creationId xmlns:p14="http://schemas.microsoft.com/office/powerpoint/2010/main" val="3573502216"/>
+        <p14:creationId xmlns:p14="http://schemas.microsoft.com/office/powerpoint/2010/main" val="3437013850"/>
       </p:ext>
     </p:extLst>
   </p:cSld>
@@ -6943,12 +7443,192 @@
           <a:chExt cx="0" cy="0"/>
         </a:xfrm>
       </p:grpSpPr>
+      <p:sp>
+        <p:nvSpPr>
+          <p:cNvPr id="4" name="TextBox 3">
+            <a:extLst>
+              <a:ext uri="{FF2B5EF4-FFF2-40B4-BE49-F238E27FC236}">
+                <a16:creationId xmlns:a16="http://schemas.microsoft.com/office/drawing/2014/main" id="{327B066D-B21D-4911-AF52-D1403D359AAD}"/>
+              </a:ext>
+            </a:extLst>
+          </p:cNvPr>
+          <p:cNvSpPr txBox="1"/>
+          <p:nvPr/>
+        </p:nvSpPr>
+        <p:spPr>
+          <a:xfrm>
+            <a:off x="0" y="0"/>
+            <a:ext cx="12191999" cy="523220"/>
+          </a:xfrm>
+          <a:prstGeom prst="rect">
+            <a:avLst/>
+          </a:prstGeom>
+          <a:noFill/>
+        </p:spPr>
+        <p:txBody>
+          <a:bodyPr wrap="square" rtlCol="0">
+            <a:spAutoFit/>
+          </a:bodyPr>
+          <a:lstStyle/>
+          <a:p>
+            <a:r>
+              <a:rPr lang="en-NZ" sz="2800" b="1" dirty="0"/>
+              <a:t>Testing subset 1:2800 vs 2:2802</a:t>
+            </a:r>
+            <a:endParaRPr lang="en-GB" sz="2800" b="1" dirty="0"/>
+          </a:p>
+        </p:txBody>
+      </p:sp>
       <p:pic>
         <p:nvPicPr>
-          <p:cNvPr id="5" name="Picture 4">
-            <a:extLst>
-              <a:ext uri="{FF2B5EF4-FFF2-40B4-BE49-F238E27FC236}">
-                <a16:creationId xmlns:a16="http://schemas.microsoft.com/office/drawing/2014/main" id="{A2D96899-916E-4667-967A-53C75DE0B124}"/>
+          <p:cNvPr id="2" name="Picture 1">
+            <a:extLst>
+              <a:ext uri="{FF2B5EF4-FFF2-40B4-BE49-F238E27FC236}">
+                <a16:creationId xmlns:a16="http://schemas.microsoft.com/office/drawing/2014/main" id="{7AF2B0FD-0BF1-43E4-ADCE-ED04868FD930}"/>
+              </a:ext>
+            </a:extLst>
+          </p:cNvPr>
+          <p:cNvPicPr>
+            <a:picLocks noChangeAspect="1"/>
+          </p:cNvPicPr>
+          <p:nvPr/>
+        </p:nvPicPr>
+        <p:blipFill rotWithShape="1">
+          <a:blip r:embed="rId2"/>
+          <a:srcRect t="4957" r="28177"/>
+          <a:stretch/>
+        </p:blipFill>
+        <p:spPr>
+          <a:xfrm>
+            <a:off x="156629" y="897830"/>
+            <a:ext cx="2605952" cy="4171604"/>
+          </a:xfrm>
+          <a:prstGeom prst="rect">
+            <a:avLst/>
+          </a:prstGeom>
+        </p:spPr>
+      </p:pic>
+      <p:pic>
+        <p:nvPicPr>
+          <p:cNvPr id="3" name="Picture 2">
+            <a:extLst>
+              <a:ext uri="{FF2B5EF4-FFF2-40B4-BE49-F238E27FC236}">
+                <a16:creationId xmlns:a16="http://schemas.microsoft.com/office/drawing/2014/main" id="{3028EAD8-2EEB-4838-8CA3-5DD5FAC0D37B}"/>
+              </a:ext>
+            </a:extLst>
+          </p:cNvPr>
+          <p:cNvPicPr>
+            <a:picLocks noChangeAspect="1"/>
+          </p:cNvPicPr>
+          <p:nvPr/>
+        </p:nvPicPr>
+        <p:blipFill rotWithShape="1">
+          <a:blip r:embed="rId3"/>
+          <a:srcRect t="4540" r="27009"/>
+          <a:stretch/>
+        </p:blipFill>
+        <p:spPr>
+          <a:xfrm>
+            <a:off x="2930830" y="897830"/>
+            <a:ext cx="2602184" cy="4156974"/>
+          </a:xfrm>
+          <a:prstGeom prst="rect">
+            <a:avLst/>
+          </a:prstGeom>
+        </p:spPr>
+      </p:pic>
+      <p:sp>
+        <p:nvSpPr>
+          <p:cNvPr id="5" name="TextBox 4">
+            <a:extLst>
+              <a:ext uri="{FF2B5EF4-FFF2-40B4-BE49-F238E27FC236}">
+                <a16:creationId xmlns:a16="http://schemas.microsoft.com/office/drawing/2014/main" id="{6F4D977B-615E-41A0-9D4F-CD40BC4ECCA4}"/>
+              </a:ext>
+            </a:extLst>
+          </p:cNvPr>
+          <p:cNvSpPr txBox="1"/>
+          <p:nvPr/>
+        </p:nvSpPr>
+        <p:spPr>
+          <a:xfrm>
+            <a:off x="156629" y="5094656"/>
+            <a:ext cx="2605952" cy="369332"/>
+          </a:xfrm>
+          <a:prstGeom prst="rect">
+            <a:avLst/>
+          </a:prstGeom>
+          <a:noFill/>
+        </p:spPr>
+        <p:txBody>
+          <a:bodyPr wrap="square" lIns="0" tIns="0" rIns="0" bIns="0" rtlCol="0">
+            <a:spAutoFit/>
+          </a:bodyPr>
+          <a:lstStyle/>
+          <a:p>
+            <a:pPr algn="ctr"/>
+            <a:r>
+              <a:rPr lang="en-NZ" sz="1200" b="1" dirty="0"/>
+              <a:t>Rows 1:2800</a:t>
+            </a:r>
+          </a:p>
+          <a:p>
+            <a:pPr algn="ctr"/>
+            <a:r>
+              <a:rPr lang="en-NZ" sz="1200" b="1" dirty="0"/>
+              <a:t>466 Variables Above Threshold</a:t>
+            </a:r>
+          </a:p>
+        </p:txBody>
+      </p:sp>
+      <p:sp>
+        <p:nvSpPr>
+          <p:cNvPr id="10" name="TextBox 9">
+            <a:extLst>
+              <a:ext uri="{FF2B5EF4-FFF2-40B4-BE49-F238E27FC236}">
+                <a16:creationId xmlns:a16="http://schemas.microsoft.com/office/drawing/2014/main" id="{A29BC89C-7380-4DAC-B053-8BC2AC9B7D18}"/>
+              </a:ext>
+            </a:extLst>
+          </p:cNvPr>
+          <p:cNvSpPr txBox="1"/>
+          <p:nvPr/>
+        </p:nvSpPr>
+        <p:spPr>
+          <a:xfrm>
+            <a:off x="2930830" y="5080026"/>
+            <a:ext cx="2605952" cy="369332"/>
+          </a:xfrm>
+          <a:prstGeom prst="rect">
+            <a:avLst/>
+          </a:prstGeom>
+          <a:noFill/>
+        </p:spPr>
+        <p:txBody>
+          <a:bodyPr wrap="square" lIns="0" tIns="0" rIns="0" bIns="0" rtlCol="0">
+            <a:spAutoFit/>
+          </a:bodyPr>
+          <a:lstStyle/>
+          <a:p>
+            <a:pPr algn="ctr"/>
+            <a:r>
+              <a:rPr lang="en-NZ" sz="1200" b="1" dirty="0"/>
+              <a:t>Rows 2:2801</a:t>
+            </a:r>
+          </a:p>
+          <a:p>
+            <a:pPr algn="ctr"/>
+            <a:r>
+              <a:rPr lang="en-NZ" sz="1200" b="1" dirty="0"/>
+              <a:t>464 Variables Above Threshold</a:t>
+            </a:r>
+          </a:p>
+        </p:txBody>
+      </p:sp>
+      <p:pic>
+        <p:nvPicPr>
+          <p:cNvPr id="11" name="Picture 10">
+            <a:extLst>
+              <a:ext uri="{FF2B5EF4-FFF2-40B4-BE49-F238E27FC236}">
+                <a16:creationId xmlns:a16="http://schemas.microsoft.com/office/drawing/2014/main" id="{683F6D36-64CE-4660-A2EB-E0C24B880E3A}"/>
               </a:ext>
             </a:extLst>
           </p:cNvPr>
@@ -6958,21 +7638,15 @@
           <p:nvPr/>
         </p:nvPicPr>
         <p:blipFill>
-          <a:blip r:embed="rId2">
-            <a:extLst>
-              <a:ext uri="{28A0092B-C50C-407E-A947-70E740481C1C}">
-                <a14:useLocalDpi xmlns:a14="http://schemas.microsoft.com/office/drawing/2010/main" val="0"/>
-              </a:ext>
-            </a:extLst>
-          </a:blip>
+          <a:blip r:embed="rId4"/>
           <a:stretch>
             <a:fillRect/>
           </a:stretch>
         </p:blipFill>
         <p:spPr>
           <a:xfrm>
-            <a:off x="799707" y="2129363"/>
-            <a:ext cx="10097909" cy="3648584"/>
+            <a:off x="5779352" y="897831"/>
+            <a:ext cx="2577164" cy="4156974"/>
           </a:xfrm>
           <a:prstGeom prst="rect">
             <a:avLst/>
@@ -6981,10 +7655,10 @@
       </p:pic>
       <p:sp>
         <p:nvSpPr>
-          <p:cNvPr id="6" name="TextBox 5">
-            <a:extLst>
-              <a:ext uri="{FF2B5EF4-FFF2-40B4-BE49-F238E27FC236}">
-                <a16:creationId xmlns:a16="http://schemas.microsoft.com/office/drawing/2014/main" id="{7A53C59A-1A95-4FC7-AB43-C7A259FFA6C7}"/>
+          <p:cNvPr id="12" name="TextBox 11">
+            <a:extLst>
+              <a:ext uri="{FF2B5EF4-FFF2-40B4-BE49-F238E27FC236}">
+                <a16:creationId xmlns:a16="http://schemas.microsoft.com/office/drawing/2014/main" id="{C331A33F-BB94-4D46-BABC-48A3FE8AC753}"/>
               </a:ext>
             </a:extLst>
           </p:cNvPr>
@@ -6993,8 +7667,8 @@
         </p:nvSpPr>
         <p:spPr>
           <a:xfrm>
-            <a:off x="213989" y="493362"/>
-            <a:ext cx="10571201" cy="369332"/>
+            <a:off x="5779352" y="5054804"/>
+            <a:ext cx="2562770" cy="369332"/>
           </a:xfrm>
           <a:prstGeom prst="rect">
             <a:avLst/>
@@ -7002,31 +7676,93 @@
           <a:noFill/>
         </p:spPr>
         <p:txBody>
-          <a:bodyPr wrap="square" rtlCol="0">
+          <a:bodyPr wrap="square" lIns="0" tIns="0" rIns="0" bIns="0" rtlCol="0">
             <a:spAutoFit/>
           </a:bodyPr>
           <a:lstStyle/>
           <a:p>
-            <a:r>
-              <a:rPr lang="en-NZ" b="1" dirty="0"/>
-              <a:t>Runs on subsets of dataset (rows) when only using blood pressure (</a:t>
-            </a:r>
-            <a:r>
-              <a:rPr lang="en-NZ" b="1" dirty="0" err="1"/>
-              <a:t>dia</a:t>
-            </a:r>
-            <a:r>
-              <a:rPr lang="en-NZ" b="1" dirty="0"/>
-              <a:t> &amp; sys) as inputs into the model</a:t>
-            </a:r>
-            <a:endParaRPr lang="en-GB" b="1" dirty="0"/>
+            <a:pPr algn="ctr"/>
+            <a:r>
+              <a:rPr lang="en-NZ" sz="1200" b="1"/>
+              <a:t>Rows 3:2802</a:t>
+            </a:r>
+            <a:endParaRPr lang="en-NZ" sz="1200" b="1" dirty="0"/>
+          </a:p>
+          <a:p>
+            <a:pPr algn="ctr"/>
+            <a:r>
+              <a:rPr lang="en-NZ" sz="1200" b="1" dirty="0"/>
+              <a:t>464 Variables Above Threshold</a:t>
+            </a:r>
+          </a:p>
+        </p:txBody>
+      </p:sp>
+      <p:sp>
+        <p:nvSpPr>
+          <p:cNvPr id="13" name="TextBox 12">
+            <a:extLst>
+              <a:ext uri="{FF2B5EF4-FFF2-40B4-BE49-F238E27FC236}">
+                <a16:creationId xmlns:a16="http://schemas.microsoft.com/office/drawing/2014/main" id="{F5B0AF2A-C591-40C9-AB95-DC636B67E369}"/>
+              </a:ext>
+            </a:extLst>
+          </p:cNvPr>
+          <p:cNvSpPr txBox="1"/>
+          <p:nvPr/>
+        </p:nvSpPr>
+        <p:spPr>
+          <a:xfrm>
+            <a:off x="6307521" y="5960169"/>
+            <a:ext cx="4849418" cy="553998"/>
+          </a:xfrm>
+          <a:prstGeom prst="rect">
+            <a:avLst/>
+          </a:prstGeom>
+          <a:solidFill>
+            <a:schemeClr val="bg1"/>
+          </a:solidFill>
+        </p:spPr>
+        <p:txBody>
+          <a:bodyPr wrap="square" lIns="0" tIns="0" rIns="0" bIns="0" rtlCol="0">
+            <a:spAutoFit/>
+          </a:bodyPr>
+          <a:lstStyle/>
+          <a:p>
+            <a:r>
+              <a:rPr lang="en-NZ" sz="1200" dirty="0">
+                <a:solidFill>
+                  <a:srgbClr val="FF0000"/>
+                </a:solidFill>
+              </a:rPr>
+              <a:t>Even when we just have 1 patient different, the variables outputted by </a:t>
+            </a:r>
+            <a:r>
+              <a:rPr lang="en-NZ" sz="1200" dirty="0" err="1">
+                <a:solidFill>
+                  <a:srgbClr val="FF0000"/>
+                </a:solidFill>
+              </a:rPr>
+              <a:t>cPCA</a:t>
+            </a:r>
+            <a:r>
+              <a:rPr lang="en-NZ" sz="1200" dirty="0">
+                <a:solidFill>
+                  <a:srgbClr val="FF0000"/>
+                </a:solidFill>
+              </a:rPr>
+              <a:t> can change pretty significantly, refer to excel spreadsheet for comparison of individual variables sorted by their weighting</a:t>
+            </a:r>
+            <a:endParaRPr lang="en-GB" sz="1200" dirty="0">
+              <a:solidFill>
+                <a:srgbClr val="FF0000"/>
+              </a:solidFill>
+            </a:endParaRPr>
           </a:p>
         </p:txBody>
       </p:sp>
     </p:spTree>
     <p:extLst>
       <p:ext uri="{BB962C8B-B14F-4D97-AF65-F5344CB8AC3E}">
-        <p14:creationId xmlns:p14="http://schemas.microsoft.com/office/powerpoint/2010/main" val="65343148"/>
+        <p14:creationId xmlns:p14="http://schemas.microsoft.com/office/powerpoint/2010/main" val="842150243"/>
       </p:ext>
     </p:extLst>
   </p:cSld>
@@ -7053,12 +7789,47 @@
           <a:chExt cx="0" cy="0"/>
         </a:xfrm>
       </p:grpSpPr>
-      <p:sp>
-        <p:nvSpPr>
-          <p:cNvPr id="2" name="TextBox 1">
-            <a:extLst>
-              <a:ext uri="{FF2B5EF4-FFF2-40B4-BE49-F238E27FC236}">
-                <a16:creationId xmlns:a16="http://schemas.microsoft.com/office/drawing/2014/main" id="{87137C21-2A3B-4D90-BB02-4D8AD3B6EB50}"/>
+      <p:pic>
+        <p:nvPicPr>
+          <p:cNvPr id="5" name="Picture 4">
+            <a:extLst>
+              <a:ext uri="{FF2B5EF4-FFF2-40B4-BE49-F238E27FC236}">
+                <a16:creationId xmlns:a16="http://schemas.microsoft.com/office/drawing/2014/main" id="{2BAC2202-805B-4DC3-A3C7-C9CC97599E10}"/>
+              </a:ext>
+            </a:extLst>
+          </p:cNvPr>
+          <p:cNvPicPr>
+            <a:picLocks noChangeAspect="1"/>
+          </p:cNvPicPr>
+          <p:nvPr/>
+        </p:nvPicPr>
+        <p:blipFill rotWithShape="1">
+          <a:blip r:embed="rId2">
+            <a:extLst>
+              <a:ext uri="{28A0092B-C50C-407E-A947-70E740481C1C}">
+                <a14:useLocalDpi xmlns:a14="http://schemas.microsoft.com/office/drawing/2010/main" val="0"/>
+              </a:ext>
+            </a:extLst>
+          </a:blip>
+          <a:srcRect r="54446"/>
+          <a:stretch/>
+        </p:blipFill>
+        <p:spPr>
+          <a:xfrm>
+            <a:off x="76201" y="1140496"/>
+            <a:ext cx="2982682" cy="3890687"/>
+          </a:xfrm>
+          <a:prstGeom prst="rect">
+            <a:avLst/>
+          </a:prstGeom>
+        </p:spPr>
+      </p:pic>
+      <p:sp>
+        <p:nvSpPr>
+          <p:cNvPr id="6" name="TextBox 5">
+            <a:extLst>
+              <a:ext uri="{FF2B5EF4-FFF2-40B4-BE49-F238E27FC236}">
+                <a16:creationId xmlns:a16="http://schemas.microsoft.com/office/drawing/2014/main" id="{108BEBBF-0CC4-49CA-B7B2-9D4B22059FB3}"/>
               </a:ext>
             </a:extLst>
           </p:cNvPr>
@@ -7067,8 +7838,8 @@
         </p:nvSpPr>
         <p:spPr>
           <a:xfrm>
-            <a:off x="0" y="0"/>
-            <a:ext cx="12191999" cy="584775"/>
+            <a:off x="213990" y="493362"/>
+            <a:ext cx="8461838" cy="369332"/>
           </a:xfrm>
           <a:prstGeom prst="rect">
             <a:avLst/>
@@ -7081,25 +7852,58 @@
           </a:bodyPr>
           <a:lstStyle/>
           <a:p>
-            <a:pPr algn="ctr"/>
-            <a:r>
-              <a:rPr lang="en-NZ" sz="3200" b="1" dirty="0" err="1"/>
-              <a:t>NeuroPM</a:t>
-            </a:r>
-            <a:r>
-              <a:rPr lang="en-NZ" sz="3200" b="1" dirty="0"/>
-              <a:t> Toolbox Outline</a:t>
-            </a:r>
-            <a:endParaRPr lang="en-GB" sz="3200" b="1" dirty="0"/>
-          </a:p>
-        </p:txBody>
-      </p:sp>
-      <p:sp>
-        <p:nvSpPr>
-          <p:cNvPr id="3" name="TextBox 2">
-            <a:extLst>
-              <a:ext uri="{FF2B5EF4-FFF2-40B4-BE49-F238E27FC236}">
-                <a16:creationId xmlns:a16="http://schemas.microsoft.com/office/drawing/2014/main" id="{471AD88B-3C30-441F-A347-3392F81E75A7}"/>
+            <a:r>
+              <a:rPr lang="en-NZ" b="1" dirty="0"/>
+              <a:t>Handling abnormally high distance values in </a:t>
+            </a:r>
+            <a:r>
+              <a:rPr lang="en-NZ" b="1" dirty="0" err="1"/>
+              <a:t>cPC</a:t>
+            </a:r>
+            <a:r>
+              <a:rPr lang="en-NZ" b="1" dirty="0"/>
+              <a:t> (test on 20% subset ~5600 rows)</a:t>
+            </a:r>
+            <a:endParaRPr lang="en-GB" b="1" dirty="0"/>
+          </a:p>
+        </p:txBody>
+      </p:sp>
+      <p:pic>
+        <p:nvPicPr>
+          <p:cNvPr id="2" name="Picture 1">
+            <a:extLst>
+              <a:ext uri="{FF2B5EF4-FFF2-40B4-BE49-F238E27FC236}">
+                <a16:creationId xmlns:a16="http://schemas.microsoft.com/office/drawing/2014/main" id="{0FA7BFA3-93B6-4DD8-BF5C-5441A83F4695}"/>
+              </a:ext>
+            </a:extLst>
+          </p:cNvPr>
+          <p:cNvPicPr>
+            <a:picLocks noChangeAspect="1"/>
+          </p:cNvPicPr>
+          <p:nvPr/>
+        </p:nvPicPr>
+        <p:blipFill>
+          <a:blip r:embed="rId3"/>
+          <a:stretch>
+            <a:fillRect/>
+          </a:stretch>
+        </p:blipFill>
+        <p:spPr>
+          <a:xfrm>
+            <a:off x="6041565" y="1140496"/>
+            <a:ext cx="2873800" cy="3841079"/>
+          </a:xfrm>
+          <a:prstGeom prst="rect">
+            <a:avLst/>
+          </a:prstGeom>
+        </p:spPr>
+      </p:pic>
+      <p:sp>
+        <p:nvSpPr>
+          <p:cNvPr id="8" name="TextBox 7">
+            <a:extLst>
+              <a:ext uri="{FF2B5EF4-FFF2-40B4-BE49-F238E27FC236}">
+                <a16:creationId xmlns:a16="http://schemas.microsoft.com/office/drawing/2014/main" id="{846D2B52-EEE0-4075-A79B-6528659C5996}"/>
               </a:ext>
             </a:extLst>
           </p:cNvPr>
@@ -7108,543 +7912,335 @@
         </p:nvSpPr>
         <p:spPr>
           <a:xfrm>
-            <a:off x="0" y="1616219"/>
-            <a:ext cx="6096000" cy="5447645"/>
-          </a:xfrm>
-          <a:prstGeom prst="rect">
-            <a:avLst/>
-          </a:prstGeom>
-          <a:noFill/>
-        </p:spPr>
-        <p:txBody>
-          <a:bodyPr wrap="square" rtlCol="0">
+            <a:off x="234218" y="4981575"/>
+            <a:ext cx="2099408" cy="369332"/>
+          </a:xfrm>
+          <a:prstGeom prst="rect">
+            <a:avLst/>
+          </a:prstGeom>
+          <a:solidFill>
+            <a:schemeClr val="bg1"/>
+          </a:solidFill>
+        </p:spPr>
+        <p:txBody>
+          <a:bodyPr wrap="square" lIns="0" tIns="0" rIns="0" bIns="0" rtlCol="0">
             <a:spAutoFit/>
           </a:bodyPr>
           <a:lstStyle/>
           <a:p>
-            <a:pPr marL="342900" indent="-342900">
-              <a:buFont typeface="+mj-lt"/>
-              <a:buAutoNum type="arabicPeriod"/>
-            </a:pPr>
+            <a:pPr algn="ctr"/>
             <a:r>
               <a:rPr lang="en-NZ" sz="1200" b="1" dirty="0"/>
-              <a:t>Dimensionality Reduction</a:t>
-            </a:r>
-          </a:p>
-          <a:p>
-            <a:pPr marL="800100" lvl="1" indent="-342900">
-              <a:buFont typeface="+mj-lt"/>
-              <a:buAutoNum type="alphaLcParenR"/>
-            </a:pPr>
-            <a:r>
-              <a:rPr lang="en-NZ" sz="1200" dirty="0"/>
-              <a:t>Compute the covariance matrix for the nodes in each of the background (</a:t>
-            </a:r>
-            <a:r>
-              <a:rPr lang="en-NZ" sz="1200" dirty="0" err="1"/>
-              <a:t>C</a:t>
-            </a:r>
-            <a:r>
-              <a:rPr lang="en-NZ" sz="1200" baseline="-25000" dirty="0" err="1"/>
-              <a:t>b</a:t>
-            </a:r>
-            <a:r>
-              <a:rPr lang="en-NZ" sz="1200" dirty="0"/>
-              <a:t>) or disease (C</a:t>
-            </a:r>
-            <a:r>
-              <a:rPr lang="en-NZ" sz="1200" baseline="-25000" dirty="0"/>
-              <a:t>d</a:t>
-            </a:r>
-            <a:r>
-              <a:rPr lang="en-NZ" sz="1200" dirty="0"/>
-              <a:t>) categories</a:t>
-            </a:r>
-          </a:p>
-          <a:p>
-            <a:pPr marL="800100" lvl="1" indent="-342900">
-              <a:buFont typeface="+mj-lt"/>
-              <a:buAutoNum type="alphaLcParenR"/>
-            </a:pPr>
-            <a:r>
-              <a:rPr lang="en-NZ" sz="1200" dirty="0"/>
-              <a:t>Define a range of values </a:t>
-            </a:r>
-            <a:r>
-              <a:rPr lang="el-GR" sz="1200" i="1" dirty="0"/>
-              <a:t>α</a:t>
-            </a:r>
-            <a:r>
-              <a:rPr lang="en-NZ" sz="1200" i="1" dirty="0"/>
-              <a:t> = 10</a:t>
-            </a:r>
-            <a:r>
-              <a:rPr lang="en-NZ" sz="1200" i="1" baseline="30000" dirty="0"/>
-              <a:t>-2 </a:t>
-            </a:r>
-            <a:r>
-              <a:rPr lang="en-NZ" sz="1200" i="1" dirty="0"/>
-              <a:t>to 10</a:t>
-            </a:r>
-            <a:r>
-              <a:rPr lang="en-NZ" sz="1200" i="1" baseline="30000" dirty="0"/>
-              <a:t>2</a:t>
-            </a:r>
-          </a:p>
-          <a:p>
-            <a:pPr marL="1257300" lvl="2" indent="-342900">
-              <a:buFont typeface="Arial" panose="020B0604020202020204" pitchFamily="34" charset="0"/>
-              <a:buChar char="•"/>
-            </a:pPr>
-            <a:r>
-              <a:rPr lang="en-NZ" sz="1200" dirty="0"/>
-              <a:t>For each </a:t>
-            </a:r>
-            <a:r>
-              <a:rPr lang="el-GR" sz="1200" i="1" dirty="0"/>
-              <a:t>α</a:t>
-            </a:r>
-            <a:r>
-              <a:rPr lang="en-NZ" sz="1200" i="1" dirty="0"/>
-              <a:t> </a:t>
-            </a:r>
-            <a:r>
-              <a:rPr lang="en-NZ" sz="1200" dirty="0"/>
-              <a:t>calculate a new combined covariance matrix where C = C</a:t>
-            </a:r>
-            <a:r>
-              <a:rPr lang="en-NZ" sz="1200" baseline="-25000" dirty="0"/>
-              <a:t>d</a:t>
-            </a:r>
-            <a:r>
-              <a:rPr lang="en-NZ" sz="1200" dirty="0"/>
-              <a:t> – </a:t>
-            </a:r>
-            <a:r>
-              <a:rPr lang="el-GR" sz="1200" i="1" dirty="0"/>
-              <a:t>α</a:t>
-            </a:r>
-            <a:r>
-              <a:rPr lang="en-NZ" sz="1200" dirty="0" err="1"/>
-              <a:t>C</a:t>
-            </a:r>
-            <a:r>
-              <a:rPr lang="en-NZ" sz="1200" baseline="-25000" dirty="0" err="1"/>
-              <a:t>b</a:t>
-            </a:r>
-            <a:r>
-              <a:rPr lang="en-NZ" sz="1200" dirty="0"/>
-              <a:t> such that the C gets less/more weighted towards the covariance of the background category</a:t>
-            </a:r>
-          </a:p>
-          <a:p>
-            <a:pPr marL="1257300" lvl="2" indent="-342900">
-              <a:buFont typeface="Arial" panose="020B0604020202020204" pitchFamily="34" charset="0"/>
-              <a:buChar char="•"/>
-            </a:pPr>
-            <a:r>
-              <a:rPr lang="en-NZ" sz="1200" dirty="0"/>
-              <a:t>Perform eigen decomposition to get the principle components (PC) for each C, each column is the eigen vector of each feature and the diagonal elements are the eigen values</a:t>
-            </a:r>
-          </a:p>
-          <a:p>
-            <a:pPr marL="1257300" lvl="2" indent="-342900">
-              <a:buFont typeface="Arial" panose="020B0604020202020204" pitchFamily="34" charset="0"/>
-              <a:buChar char="•"/>
-            </a:pPr>
-            <a:r>
-              <a:rPr lang="en-NZ" sz="1200" dirty="0"/>
-              <a:t>For each </a:t>
-            </a:r>
-            <a:r>
-              <a:rPr lang="el-GR" sz="1200" i="1" dirty="0"/>
-              <a:t>α</a:t>
-            </a:r>
-            <a:r>
-              <a:rPr lang="en-NZ" sz="1200" dirty="0"/>
-              <a:t> keep the PCs with the largest eigen values, the max number to keep is predefined</a:t>
-            </a:r>
-          </a:p>
-          <a:p>
-            <a:pPr marL="800100" lvl="1" indent="-342900">
-              <a:buFont typeface="+mj-lt"/>
-              <a:buAutoNum type="alphaLcParenR"/>
-            </a:pPr>
-            <a:r>
-              <a:rPr lang="en-NZ" sz="1200" dirty="0"/>
-              <a:t>Compute affinity matrix of the PCs between each combination of </a:t>
-            </a:r>
-            <a:r>
-              <a:rPr lang="el-GR" sz="1200" i="1" dirty="0"/>
-              <a:t>α</a:t>
-            </a:r>
-            <a:r>
-              <a:rPr lang="en-NZ" sz="1200" i="1" dirty="0"/>
-              <a:t> </a:t>
-            </a:r>
-            <a:r>
-              <a:rPr lang="en-NZ" sz="1200" dirty="0"/>
-              <a:t>using cosine similarity</a:t>
-            </a:r>
-          </a:p>
-          <a:p>
-            <a:pPr marL="800100" lvl="1" indent="-342900">
-              <a:buFont typeface="+mj-lt"/>
-              <a:buAutoNum type="alphaLcParenR"/>
-            </a:pPr>
-            <a:r>
-              <a:rPr lang="en-NZ" sz="1200" dirty="0"/>
-              <a:t>Use spectral clustering of the affinity matrix a pre-set number times and choose the cluster with the highest value of clustering quality</a:t>
-            </a:r>
-          </a:p>
-          <a:p>
-            <a:pPr marL="800100" lvl="1" indent="-342900">
-              <a:buFont typeface="+mj-lt"/>
-              <a:buAutoNum type="alphaLcParenR"/>
-            </a:pPr>
-            <a:r>
-              <a:rPr lang="en-NZ" sz="1200" dirty="0"/>
-              <a:t>For each unique group in the cluster</a:t>
-            </a:r>
-          </a:p>
-          <a:p>
-            <a:pPr marL="1257300" lvl="2" indent="-342900">
-              <a:buFont typeface="Arial" panose="020B0604020202020204" pitchFamily="34" charset="0"/>
-              <a:buChar char="•"/>
-            </a:pPr>
-            <a:r>
-              <a:rPr lang="en-NZ" sz="1200" dirty="0"/>
-              <a:t>Identify the associated subset of the affinity matrix in the group and find the </a:t>
-            </a:r>
-            <a:r>
-              <a:rPr lang="el-GR" sz="1200" i="1" dirty="0"/>
-              <a:t>α</a:t>
-            </a:r>
-            <a:r>
-              <a:rPr lang="en-NZ" sz="1200" dirty="0"/>
-              <a:t> corresponding to the maximum similarity</a:t>
-            </a:r>
-          </a:p>
-          <a:p>
-            <a:pPr marL="1257300" lvl="2" indent="-342900">
-              <a:buFont typeface="Arial" panose="020B0604020202020204" pitchFamily="34" charset="0"/>
-              <a:buChar char="•"/>
-            </a:pPr>
-            <a:r>
-              <a:rPr lang="en-NZ" sz="1200" dirty="0"/>
-              <a:t>Find the eigen decomposition with the associated </a:t>
-            </a:r>
-            <a:r>
-              <a:rPr lang="el-GR" sz="1200" i="1" dirty="0"/>
-              <a:t>α</a:t>
-            </a:r>
-            <a:r>
-              <a:rPr lang="en-NZ" sz="1200" i="1" dirty="0"/>
-              <a:t> </a:t>
-            </a:r>
-            <a:r>
-              <a:rPr lang="en-NZ" sz="1200" dirty="0"/>
-              <a:t>computed from above, these are the PCs of interest for this cluster group</a:t>
-            </a:r>
-          </a:p>
-          <a:p>
-            <a:pPr marL="1257300" lvl="2" indent="-342900">
-              <a:buFont typeface="Arial" panose="020B0604020202020204" pitchFamily="34" charset="0"/>
-              <a:buChar char="•"/>
-            </a:pPr>
-            <a:r>
-              <a:rPr lang="en-NZ" sz="1200" dirty="0"/>
-              <a:t>Perform matrix multiplication between the entire input dataset and the PC identified to project the data onto the </a:t>
-            </a:r>
-            <a:r>
-              <a:rPr lang="el-GR" sz="1200" i="1" dirty="0"/>
-              <a:t>α</a:t>
-            </a:r>
-            <a:r>
-              <a:rPr lang="en-NZ" sz="1200" dirty="0"/>
-              <a:t> space and obtain the contrastive PC (</a:t>
-            </a:r>
-            <a:r>
-              <a:rPr lang="en-NZ" sz="1200" dirty="0" err="1"/>
-              <a:t>cPC</a:t>
-            </a:r>
-            <a:r>
-              <a:rPr lang="en-NZ" sz="1200" dirty="0"/>
-              <a:t>)</a:t>
-            </a:r>
-          </a:p>
-          <a:p>
-            <a:pPr marL="1257300" lvl="2" indent="-342900">
-              <a:buFont typeface="Arial" panose="020B0604020202020204" pitchFamily="34" charset="0"/>
-              <a:buChar char="•"/>
-            </a:pPr>
-            <a:r>
-              <a:rPr lang="en-NZ" sz="1200" dirty="0"/>
-              <a:t>Use K-Means clustering on the rows in the </a:t>
-            </a:r>
-            <a:r>
-              <a:rPr lang="en-NZ" sz="1200" dirty="0" err="1"/>
-              <a:t>cPC</a:t>
-            </a:r>
-            <a:r>
-              <a:rPr lang="en-NZ" sz="1200" dirty="0"/>
-              <a:t> in the background/disease groups to compute the clustering </a:t>
-            </a:r>
-            <a:r>
-              <a:rPr lang="en-NZ" sz="1200" dirty="0" err="1"/>
-              <a:t>tendancy</a:t>
-            </a:r>
-            <a:endParaRPr lang="en-NZ" sz="1200" dirty="0"/>
-          </a:p>
-          <a:p>
-            <a:pPr marL="800100" lvl="1" indent="-342900">
-              <a:buFont typeface="+mj-lt"/>
-              <a:buAutoNum type="alphaLcParenR"/>
-            </a:pPr>
-            <a:r>
-              <a:rPr lang="en-NZ" sz="1200" dirty="0"/>
-              <a:t>The final </a:t>
-            </a:r>
-            <a:r>
-              <a:rPr lang="en-NZ" sz="1200" dirty="0" err="1"/>
-              <a:t>cPC</a:t>
-            </a:r>
-            <a:r>
-              <a:rPr lang="en-NZ" sz="1200" dirty="0"/>
-              <a:t> is the </a:t>
-            </a:r>
-            <a:r>
-              <a:rPr lang="en-NZ" sz="1200" dirty="0" err="1"/>
-              <a:t>cPC</a:t>
-            </a:r>
-            <a:r>
-              <a:rPr lang="en-NZ" sz="1200" dirty="0"/>
-              <a:t> from the cluster group which produces the maximum clustering </a:t>
-            </a:r>
-            <a:r>
-              <a:rPr lang="en-NZ" sz="1200" dirty="0" err="1"/>
-              <a:t>tendancy</a:t>
-            </a:r>
-            <a:r>
-              <a:rPr lang="en-NZ" sz="1200" dirty="0"/>
-              <a:t> of the disease category</a:t>
-            </a:r>
-          </a:p>
-        </p:txBody>
-      </p:sp>
-      <p:sp>
-        <p:nvSpPr>
-          <p:cNvPr id="5" name="Rectangle 4">
-            <a:extLst>
-              <a:ext uri="{FF2B5EF4-FFF2-40B4-BE49-F238E27FC236}">
-                <a16:creationId xmlns:a16="http://schemas.microsoft.com/office/drawing/2014/main" id="{5949CE9D-48A9-4703-AAC2-3B8A09048459}"/>
-              </a:ext>
-            </a:extLst>
-          </p:cNvPr>
-          <p:cNvSpPr/>
+              <a:t>1) Original </a:t>
+            </a:r>
+          </a:p>
+          <a:p>
+            <a:pPr algn="ctr"/>
+            <a:r>
+              <a:rPr lang="en-NZ" sz="1200" b="1" dirty="0"/>
+              <a:t>(Minimum Spanning Tree)</a:t>
+            </a:r>
+            <a:endParaRPr lang="en-GB" sz="1200" b="1" dirty="0"/>
+          </a:p>
+        </p:txBody>
+      </p:sp>
+      <p:sp>
+        <p:nvSpPr>
+          <p:cNvPr id="9" name="TextBox 8">
+            <a:extLst>
+              <a:ext uri="{FF2B5EF4-FFF2-40B4-BE49-F238E27FC236}">
+                <a16:creationId xmlns:a16="http://schemas.microsoft.com/office/drawing/2014/main" id="{159ECB6D-8197-42C9-9B08-115C0CB6E983}"/>
+              </a:ext>
+            </a:extLst>
+          </p:cNvPr>
+          <p:cNvSpPr txBox="1"/>
           <p:nvPr/>
         </p:nvSpPr>
         <p:spPr>
           <a:xfrm>
-            <a:off x="6095999" y="1616219"/>
-            <a:ext cx="6096000" cy="3785652"/>
-          </a:xfrm>
-          <a:prstGeom prst="rect">
-            <a:avLst/>
-          </a:prstGeom>
-        </p:spPr>
-        <p:txBody>
-          <a:bodyPr wrap="square">
+            <a:off x="3275407" y="4981575"/>
+            <a:ext cx="1982394" cy="553998"/>
+          </a:xfrm>
+          <a:prstGeom prst="rect">
+            <a:avLst/>
+          </a:prstGeom>
+          <a:solidFill>
+            <a:schemeClr val="bg1"/>
+          </a:solidFill>
+        </p:spPr>
+        <p:txBody>
+          <a:bodyPr wrap="square" lIns="0" tIns="0" rIns="0" bIns="0" rtlCol="0">
             <a:spAutoFit/>
           </a:bodyPr>
           <a:lstStyle/>
           <a:p>
-            <a:pPr marL="342900" indent="-342900">
-              <a:buFont typeface="+mj-lt"/>
-              <a:buAutoNum type="arabicPeriod" startAt="2"/>
-            </a:pPr>
+            <a:pPr algn="ctr"/>
             <a:r>
               <a:rPr lang="en-NZ" sz="1200" b="1" dirty="0"/>
-              <a:t>Tree Generation</a:t>
-            </a:r>
-          </a:p>
-          <a:p>
-            <a:pPr marL="800100" lvl="1" indent="-342900">
-              <a:buFont typeface="+mj-lt"/>
-              <a:buAutoNum type="alphaLcParenR"/>
-            </a:pPr>
-            <a:r>
-              <a:rPr lang="en-NZ" sz="1200" dirty="0"/>
-              <a:t>Treat each row of the </a:t>
-            </a:r>
-            <a:r>
-              <a:rPr lang="en-NZ" sz="1200" dirty="0" err="1"/>
+              <a:t>2) Filter out large values in </a:t>
+            </a:r>
+            <a:r>
+              <a:rPr lang="en-NZ" sz="1200" b="1" dirty="0" err="1"/>
               <a:t>cPC</a:t>
             </a:r>
             <a:r>
-              <a:rPr lang="en-NZ" sz="1200" dirty="0"/>
-              <a:t> space as a node</a:t>
-            </a:r>
-          </a:p>
-          <a:p>
-            <a:pPr marL="800100" lvl="1" indent="-342900">
-              <a:buFont typeface="+mj-lt"/>
-              <a:buAutoNum type="alphaLcParenR"/>
-            </a:pPr>
-            <a:r>
-              <a:rPr lang="en-NZ" sz="1200" dirty="0"/>
-              <a:t>Define a complete graph where every node is connected where the weights of the branch is the L2 distance between the values in the </a:t>
-            </a:r>
-            <a:r>
-              <a:rPr lang="en-NZ" sz="1200" dirty="0" err="1"/>
-              <a:t>cPC</a:t>
-            </a:r>
-            <a:r>
-              <a:rPr lang="en-NZ" sz="1200" dirty="0"/>
-              <a:t> space, do this for only the background and disease nodes</a:t>
-            </a:r>
-          </a:p>
-          <a:p>
-            <a:pPr marL="800100" lvl="1" indent="-342900">
-              <a:buFont typeface="+mj-lt"/>
-              <a:buAutoNum type="alphaLcParenR"/>
-            </a:pPr>
-            <a:r>
-              <a:rPr lang="en-NZ" sz="1200" dirty="0"/>
-              <a:t>Find the node in the background category which has the overall smallest distance to every other node, set this as the root node</a:t>
-            </a:r>
-          </a:p>
-          <a:p>
-            <a:pPr marL="800100" lvl="1" indent="-342900">
-              <a:buFont typeface="+mj-lt"/>
-              <a:buAutoNum type="alphaLcParenR"/>
-            </a:pPr>
-            <a:r>
-              <a:rPr lang="en-NZ" sz="1200" dirty="0"/>
-              <a:t>Compute the minimum spanning tree starting from the root node across the entire graph (prims algorithm)</a:t>
-            </a:r>
-          </a:p>
-          <a:p>
-            <a:pPr lvl="1"/>
-            <a:endParaRPr lang="en-NZ" sz="1200" dirty="0"/>
-          </a:p>
-          <a:p>
-            <a:pPr marL="342900" indent="-342900">
-              <a:buFont typeface="+mj-lt"/>
-              <a:buAutoNum type="arabicPeriod" startAt="2"/>
-            </a:pPr>
-            <a:r>
               <a:rPr lang="en-NZ" sz="1200" b="1" dirty="0"/>
-              <a:t>Trajectory Inference/Pseudo-Time Score Calculation</a:t>
-            </a:r>
-          </a:p>
-          <a:p>
-            <a:pPr marL="800100" lvl="1" indent="-342900">
-              <a:buFont typeface="+mj-lt"/>
-              <a:buAutoNum type="alphaLcParenR"/>
-            </a:pPr>
-            <a:r>
-              <a:rPr lang="en-NZ" sz="1200" dirty="0"/>
-              <a:t>Calculate the pseudo-time (or disease progression) score for each node in the background/disease categories as the shortest distance (Dijkstra) from the node to the root node along the minimum spanning tree</a:t>
-            </a:r>
-          </a:p>
-          <a:p>
-            <a:pPr marL="800100" lvl="1" indent="-342900">
-              <a:buFont typeface="+mj-lt"/>
-              <a:buAutoNum type="alphaLcParenR"/>
-            </a:pPr>
-            <a:r>
-              <a:rPr lang="en-NZ" sz="1200" dirty="0"/>
-              <a:t>The pseudo-time score of the nodes in the between category is then extrapolated as the pseudo-time score of the node in the background/disease categories with the shortest distance in the </a:t>
-            </a:r>
-            <a:r>
-              <a:rPr lang="en-NZ" sz="1200" dirty="0" err="1"/>
-              <a:t>cPC</a:t>
-            </a:r>
-            <a:r>
-              <a:rPr lang="en-NZ" sz="1200" dirty="0"/>
-              <a:t> space from the between node</a:t>
-            </a:r>
-          </a:p>
-          <a:p>
-            <a:pPr marL="800100" lvl="1" indent="-342900">
-              <a:buFont typeface="+mj-lt"/>
-              <a:buAutoNum type="alphaLcParenR"/>
-            </a:pPr>
-            <a:r>
-              <a:rPr lang="en-NZ" sz="1200" dirty="0"/>
-              <a:t>The trajectories of disease progression are the major branches of the minimum spanning tree which is open for interpretation depending on how much variation you want to include</a:t>
-            </a:r>
-          </a:p>
-        </p:txBody>
-      </p:sp>
-      <p:sp>
-        <p:nvSpPr>
-          <p:cNvPr id="6" name="Rectangle 5">
-            <a:extLst>
-              <a:ext uri="{FF2B5EF4-FFF2-40B4-BE49-F238E27FC236}">
-                <a16:creationId xmlns:a16="http://schemas.microsoft.com/office/drawing/2014/main" id="{DCFEFAB7-8B6D-4178-A04C-257B6EFB88E4}"/>
-              </a:ext>
-            </a:extLst>
-          </p:cNvPr>
-          <p:cNvSpPr/>
+              <a:t> space (set values above 3sd as the median)</a:t>
+            </a:r>
+            <a:endParaRPr lang="en-GB" sz="1200" b="1" dirty="0"/>
+          </a:p>
+        </p:txBody>
+      </p:sp>
+      <p:sp>
+        <p:nvSpPr>
+          <p:cNvPr id="10" name="TextBox 9">
+            <a:extLst>
+              <a:ext uri="{FF2B5EF4-FFF2-40B4-BE49-F238E27FC236}">
+                <a16:creationId xmlns:a16="http://schemas.microsoft.com/office/drawing/2014/main" id="{D67F0F88-F469-4158-8F13-A89F610E665A}"/>
+              </a:ext>
+            </a:extLst>
+          </p:cNvPr>
+          <p:cNvSpPr txBox="1"/>
           <p:nvPr/>
         </p:nvSpPr>
         <p:spPr>
           <a:xfrm>
-            <a:off x="-1" y="526255"/>
-            <a:ext cx="12191999" cy="1015663"/>
-          </a:xfrm>
-          <a:prstGeom prst="rect">
-            <a:avLst/>
-          </a:prstGeom>
-        </p:spPr>
-        <p:txBody>
-          <a:bodyPr wrap="square">
+            <a:off x="6135621" y="4981575"/>
+            <a:ext cx="2227330" cy="369332"/>
+          </a:xfrm>
+          <a:prstGeom prst="rect">
+            <a:avLst/>
+          </a:prstGeom>
+          <a:solidFill>
+            <a:schemeClr val="bg1"/>
+          </a:solidFill>
+        </p:spPr>
+        <p:txBody>
+          <a:bodyPr wrap="square" lIns="0" tIns="0" rIns="0" bIns="0" rtlCol="0">
             <a:spAutoFit/>
           </a:bodyPr>
           <a:lstStyle/>
           <a:p>
-            <a:r>
-              <a:rPr lang="en-NZ" sz="1200" dirty="0"/>
-              <a:t>Assumption:</a:t>
-            </a:r>
-          </a:p>
-          <a:p>
-            <a:pPr marL="171450" indent="-171450">
-              <a:buFontTx/>
-              <a:buChar char="-"/>
-            </a:pPr>
-            <a:r>
-              <a:rPr lang="en-NZ" sz="1200" dirty="0"/>
-              <a:t>Given a large cohort of patients, we can assume they are at different stages of disease, and therefore produce a pseudo-temporal distribution of the progression of disease</a:t>
-            </a:r>
-          </a:p>
-          <a:p>
-            <a:endParaRPr lang="en-NZ" sz="1200" dirty="0"/>
-          </a:p>
-          <a:p>
-            <a:r>
-              <a:rPr lang="en-NZ" sz="1200" dirty="0"/>
-              <a:t>Data:</a:t>
-            </a:r>
-          </a:p>
-          <a:p>
-            <a:pPr marL="285750" indent="-285750">
-              <a:buFontTx/>
-              <a:buChar char="-"/>
-            </a:pPr>
-            <a:r>
-              <a:rPr lang="en-NZ" sz="1200" dirty="0"/>
-              <a:t>Given a matrix of N rows (patients) by M columns (features), separate rows into background/between/disease categories</a:t>
-            </a:r>
-          </a:p>
-        </p:txBody>
-      </p:sp>
+            <a:pPr algn="ctr"/>
+            <a:r>
+              <a:rPr lang="en-NZ" sz="1200" b="1" dirty="0"/>
+              <a:t>3) Shortest Path Tree Instead of Minimum Spanning Tree</a:t>
+            </a:r>
+            <a:endParaRPr lang="en-GB" sz="1200" b="1" dirty="0"/>
+          </a:p>
+        </p:txBody>
+      </p:sp>
+      <p:sp>
+        <p:nvSpPr>
+          <p:cNvPr id="11" name="TextBox 10">
+            <a:extLst>
+              <a:ext uri="{FF2B5EF4-FFF2-40B4-BE49-F238E27FC236}">
+                <a16:creationId xmlns:a16="http://schemas.microsoft.com/office/drawing/2014/main" id="{8DF388B5-B151-430B-A09E-940AEAB6AF19}"/>
+              </a:ext>
+            </a:extLst>
+          </p:cNvPr>
+          <p:cNvSpPr txBox="1"/>
+          <p:nvPr/>
+        </p:nvSpPr>
+        <p:spPr>
+          <a:xfrm>
+            <a:off x="9540280" y="4981575"/>
+            <a:ext cx="1356320" cy="369332"/>
+          </a:xfrm>
+          <a:prstGeom prst="rect">
+            <a:avLst/>
+          </a:prstGeom>
+          <a:solidFill>
+            <a:schemeClr val="bg1"/>
+          </a:solidFill>
+        </p:spPr>
+        <p:txBody>
+          <a:bodyPr wrap="square" lIns="0" tIns="0" rIns="0" bIns="0" rtlCol="0">
+            <a:spAutoFit/>
+          </a:bodyPr>
+          <a:lstStyle/>
+          <a:p>
+            <a:pPr algn="ctr"/>
+            <a:r>
+              <a:rPr lang="en-NZ" sz="1200" b="1" dirty="0"/>
+              <a:t>4) #2 (filter) + #3 (use shortest path tree)</a:t>
+            </a:r>
+            <a:endParaRPr lang="en-GB" sz="1200" b="1" dirty="0"/>
+          </a:p>
+        </p:txBody>
+      </p:sp>
+      <p:sp>
+        <p:nvSpPr>
+          <p:cNvPr id="12" name="TextBox 11">
+            <a:extLst>
+              <a:ext uri="{FF2B5EF4-FFF2-40B4-BE49-F238E27FC236}">
+                <a16:creationId xmlns:a16="http://schemas.microsoft.com/office/drawing/2014/main" id="{E23BCCE6-D4B3-49A4-8702-D3E432463990}"/>
+              </a:ext>
+            </a:extLst>
+          </p:cNvPr>
+          <p:cNvSpPr txBox="1"/>
+          <p:nvPr/>
+        </p:nvSpPr>
+        <p:spPr>
+          <a:xfrm>
+            <a:off x="4690862" y="5834957"/>
+            <a:ext cx="4849418" cy="553998"/>
+          </a:xfrm>
+          <a:prstGeom prst="rect">
+            <a:avLst/>
+          </a:prstGeom>
+          <a:solidFill>
+            <a:schemeClr val="bg1"/>
+          </a:solidFill>
+        </p:spPr>
+        <p:txBody>
+          <a:bodyPr wrap="square" lIns="0" tIns="0" rIns="0" bIns="0" rtlCol="0">
+            <a:spAutoFit/>
+          </a:bodyPr>
+          <a:lstStyle/>
+          <a:p>
+            <a:r>
+              <a:rPr lang="en-NZ" sz="1200" dirty="0">
+                <a:solidFill>
+                  <a:srgbClr val="FF0000"/>
+                </a:solidFill>
+              </a:rPr>
+              <a:t>Note that #2 is currently flawed as we cannot just reassign these abnormally large values in </a:t>
+            </a:r>
+            <a:r>
+              <a:rPr lang="en-NZ" sz="1200" dirty="0" err="1">
+                <a:solidFill>
+                  <a:srgbClr val="FF0000"/>
+                </a:solidFill>
+              </a:rPr>
+              <a:t>cPC</a:t>
+            </a:r>
+            <a:r>
+              <a:rPr lang="en-NZ" sz="1200" dirty="0">
+                <a:solidFill>
+                  <a:srgbClr val="FF0000"/>
+                </a:solidFill>
+              </a:rPr>
+              <a:t> space with the median (around 0), they should be instead replaced somehow by their next closest node ….</a:t>
+            </a:r>
+            <a:endParaRPr lang="en-GB" sz="1200" dirty="0">
+              <a:solidFill>
+                <a:srgbClr val="FF0000"/>
+              </a:solidFill>
+            </a:endParaRPr>
+          </a:p>
+        </p:txBody>
+      </p:sp>
+      <p:cxnSp>
+        <p:nvCxnSpPr>
+          <p:cNvPr id="17" name="Connector: Elbow 16">
+            <a:extLst>
+              <a:ext uri="{FF2B5EF4-FFF2-40B4-BE49-F238E27FC236}">
+                <a16:creationId xmlns:a16="http://schemas.microsoft.com/office/drawing/2014/main" id="{2943542E-98E6-4223-8034-821A97495596}"/>
+              </a:ext>
+            </a:extLst>
+          </p:cNvPr>
+          <p:cNvCxnSpPr>
+            <a:cxnSpLocks/>
+            <a:stCxn id="12" idx="1"/>
+            <a:endCxn id="9" idx="2"/>
+          </p:cNvCxnSpPr>
+          <p:nvPr/>
+        </p:nvCxnSpPr>
+        <p:spPr>
+          <a:xfrm rot="10800000">
+            <a:off x="4266604" y="5535574"/>
+            <a:ext cx="424258" cy="576383"/>
+          </a:xfrm>
+          <a:prstGeom prst="bentConnector2">
+            <a:avLst/>
+          </a:prstGeom>
+          <a:ln>
+            <a:solidFill>
+              <a:srgbClr val="FF0000"/>
+            </a:solidFill>
+            <a:tailEnd type="triangle"/>
+          </a:ln>
+        </p:spPr>
+        <p:style>
+          <a:lnRef idx="1">
+            <a:schemeClr val="accent1"/>
+          </a:lnRef>
+          <a:fillRef idx="0">
+            <a:schemeClr val="accent1"/>
+          </a:fillRef>
+          <a:effectRef idx="0">
+            <a:schemeClr val="accent1"/>
+          </a:effectRef>
+          <a:fontRef idx="minor">
+            <a:schemeClr val="tx1"/>
+          </a:fontRef>
+        </p:style>
+      </p:cxnSp>
+      <p:pic>
+        <p:nvPicPr>
+          <p:cNvPr id="15" name="Picture 14">
+            <a:extLst>
+              <a:ext uri="{FF2B5EF4-FFF2-40B4-BE49-F238E27FC236}">
+                <a16:creationId xmlns:a16="http://schemas.microsoft.com/office/drawing/2014/main" id="{D8C13DE0-0AB8-4F7C-89AB-3778BEAD9361}"/>
+              </a:ext>
+            </a:extLst>
+          </p:cNvPr>
+          <p:cNvPicPr>
+            <a:picLocks noChangeAspect="1"/>
+          </p:cNvPicPr>
+          <p:nvPr/>
+        </p:nvPicPr>
+        <p:blipFill>
+          <a:blip r:embed="rId4"/>
+          <a:stretch>
+            <a:fillRect/>
+          </a:stretch>
+        </p:blipFill>
+        <p:spPr>
+          <a:xfrm>
+            <a:off x="3058883" y="1140496"/>
+            <a:ext cx="2873800" cy="3841079"/>
+          </a:xfrm>
+          <a:prstGeom prst="rect">
+            <a:avLst/>
+          </a:prstGeom>
+        </p:spPr>
+      </p:pic>
+      <p:pic>
+        <p:nvPicPr>
+          <p:cNvPr id="19" name="Picture 18">
+            <a:extLst>
+              <a:ext uri="{FF2B5EF4-FFF2-40B4-BE49-F238E27FC236}">
+                <a16:creationId xmlns:a16="http://schemas.microsoft.com/office/drawing/2014/main" id="{F6139D21-7BD8-451D-8A9D-88C6155831EF}"/>
+              </a:ext>
+            </a:extLst>
+          </p:cNvPr>
+          <p:cNvPicPr>
+            <a:picLocks noChangeAspect="1"/>
+          </p:cNvPicPr>
+          <p:nvPr/>
+        </p:nvPicPr>
+        <p:blipFill>
+          <a:blip r:embed="rId5"/>
+          <a:stretch>
+            <a:fillRect/>
+          </a:stretch>
+        </p:blipFill>
+        <p:spPr>
+          <a:xfrm>
+            <a:off x="9009422" y="1144938"/>
+            <a:ext cx="2873800" cy="3836637"/>
+          </a:xfrm>
+          <a:prstGeom prst="rect">
+            <a:avLst/>
+          </a:prstGeom>
+        </p:spPr>
+      </p:pic>
     </p:spTree>
     <p:extLst>
       <p:ext uri="{BB962C8B-B14F-4D97-AF65-F5344CB8AC3E}">
-        <p14:creationId xmlns:p14="http://schemas.microsoft.com/office/powerpoint/2010/main" val="4125219743"/>
+        <p14:creationId xmlns:p14="http://schemas.microsoft.com/office/powerpoint/2010/main" val="3573502216"/>
       </p:ext>
     </p:extLst>
   </p:cSld>
@@ -7655,6 +8251,116 @@
 </file>
 
 <file path=ppt/slides/slide17.xml><?xml version="1.0" encoding="utf-8"?>
+<p:sld xmlns:a="http://schemas.openxmlformats.org/drawingml/2006/main" xmlns:r="http://schemas.openxmlformats.org/officeDocument/2006/relationships" xmlns:p="http://schemas.openxmlformats.org/presentationml/2006/main">
+  <p:cSld>
+    <p:spTree>
+      <p:nvGrpSpPr>
+        <p:cNvPr id="1" name=""/>
+        <p:cNvGrpSpPr/>
+        <p:nvPr/>
+      </p:nvGrpSpPr>
+      <p:grpSpPr>
+        <a:xfrm>
+          <a:off x="0" y="0"/>
+          <a:ext cx="0" cy="0"/>
+          <a:chOff x="0" y="0"/>
+          <a:chExt cx="0" cy="0"/>
+        </a:xfrm>
+      </p:grpSpPr>
+      <p:pic>
+        <p:nvPicPr>
+          <p:cNvPr id="5" name="Picture 4">
+            <a:extLst>
+              <a:ext uri="{FF2B5EF4-FFF2-40B4-BE49-F238E27FC236}">
+                <a16:creationId xmlns:a16="http://schemas.microsoft.com/office/drawing/2014/main" id="{A2D96899-916E-4667-967A-53C75DE0B124}"/>
+              </a:ext>
+            </a:extLst>
+          </p:cNvPr>
+          <p:cNvPicPr>
+            <a:picLocks noChangeAspect="1"/>
+          </p:cNvPicPr>
+          <p:nvPr/>
+        </p:nvPicPr>
+        <p:blipFill>
+          <a:blip r:embed="rId2">
+            <a:extLst>
+              <a:ext uri="{28A0092B-C50C-407E-A947-70E740481C1C}">
+                <a14:useLocalDpi xmlns:a14="http://schemas.microsoft.com/office/drawing/2010/main" val="0"/>
+              </a:ext>
+            </a:extLst>
+          </a:blip>
+          <a:stretch>
+            <a:fillRect/>
+          </a:stretch>
+        </p:blipFill>
+        <p:spPr>
+          <a:xfrm>
+            <a:off x="799707" y="2129363"/>
+            <a:ext cx="10097909" cy="3648584"/>
+          </a:xfrm>
+          <a:prstGeom prst="rect">
+            <a:avLst/>
+          </a:prstGeom>
+        </p:spPr>
+      </p:pic>
+      <p:sp>
+        <p:nvSpPr>
+          <p:cNvPr id="6" name="TextBox 5">
+            <a:extLst>
+              <a:ext uri="{FF2B5EF4-FFF2-40B4-BE49-F238E27FC236}">
+                <a16:creationId xmlns:a16="http://schemas.microsoft.com/office/drawing/2014/main" id="{7A53C59A-1A95-4FC7-AB43-C7A259FFA6C7}"/>
+              </a:ext>
+            </a:extLst>
+          </p:cNvPr>
+          <p:cNvSpPr txBox="1"/>
+          <p:nvPr/>
+        </p:nvSpPr>
+        <p:spPr>
+          <a:xfrm>
+            <a:off x="213989" y="493362"/>
+            <a:ext cx="10571201" cy="369332"/>
+          </a:xfrm>
+          <a:prstGeom prst="rect">
+            <a:avLst/>
+          </a:prstGeom>
+          <a:noFill/>
+        </p:spPr>
+        <p:txBody>
+          <a:bodyPr wrap="square" rtlCol="0">
+            <a:spAutoFit/>
+          </a:bodyPr>
+          <a:lstStyle/>
+          <a:p>
+            <a:r>
+              <a:rPr lang="en-NZ" b="1" dirty="0"/>
+              <a:t>Runs on subsets of dataset (rows) when only using blood pressure (</a:t>
+            </a:r>
+            <a:r>
+              <a:rPr lang="en-NZ" b="1" dirty="0" err="1"/>
+              <a:t>dia</a:t>
+            </a:r>
+            <a:r>
+              <a:rPr lang="en-NZ" b="1" dirty="0"/>
+              <a:t> &amp; sys) as inputs into the model</a:t>
+            </a:r>
+            <a:endParaRPr lang="en-GB" b="1" dirty="0"/>
+          </a:p>
+        </p:txBody>
+      </p:sp>
+    </p:spTree>
+    <p:extLst>
+      <p:ext uri="{BB962C8B-B14F-4D97-AF65-F5344CB8AC3E}">
+        <p14:creationId xmlns:p14="http://schemas.microsoft.com/office/powerpoint/2010/main" val="65343148"/>
+      </p:ext>
+    </p:extLst>
+  </p:cSld>
+  <p:clrMapOvr>
+    <a:masterClrMapping/>
+  </p:clrMapOvr>
+</p:sld>
+</file>
+
+<file path=ppt/slides/slide18.xml><?xml version="1.0" encoding="utf-8"?>
 <p:sld xmlns:a="http://schemas.openxmlformats.org/drawingml/2006/main" xmlns:r="http://schemas.openxmlformats.org/officeDocument/2006/relationships" xmlns:p="http://schemas.openxmlformats.org/presentationml/2006/main">
   <p:cSld>
     <p:spTree>

</xml_diff>

<commit_message>
added visualization of Vmedoid which is the same distribution as the nodal contributions
</commit_message>
<xml_diff>
--- a/job_results.pptx
+++ b/job_results.pptx
@@ -193,7 +193,7 @@
   <pc:docChgLst>
     <pc:chgData name="Zhao Xiong" userId="5eba49e5-2895-4cd9-83e8-b3064fe76704" providerId="ADAL" clId="{B606E7B2-EFF5-418A-8639-9F7537C4DA50}"/>
     <pc:docChg chg="undo custSel addSld delSld modSld sldOrd">
-      <pc:chgData name="Zhao Xiong" userId="5eba49e5-2895-4cd9-83e8-b3064fe76704" providerId="ADAL" clId="{B606E7B2-EFF5-418A-8639-9F7537C4DA50}" dt="2022-05-20T18:40:19.540" v="10429" actId="1035"/>
+      <pc:chgData name="Zhao Xiong" userId="5eba49e5-2895-4cd9-83e8-b3064fe76704" providerId="ADAL" clId="{B606E7B2-EFF5-418A-8639-9F7537C4DA50}" dt="2022-05-21T16:37:57.115" v="10442" actId="20577"/>
       <pc:docMkLst>
         <pc:docMk/>
       </pc:docMkLst>
@@ -1541,7 +1541,7 @@
         </pc:picChg>
       </pc:sldChg>
       <pc:sldChg chg="addSp delSp modSp add">
-        <pc:chgData name="Zhao Xiong" userId="5eba49e5-2895-4cd9-83e8-b3064fe76704" providerId="ADAL" clId="{B606E7B2-EFF5-418A-8639-9F7537C4DA50}" dt="2022-05-20T18:40:19.540" v="10429" actId="1035"/>
+        <pc:chgData name="Zhao Xiong" userId="5eba49e5-2895-4cd9-83e8-b3064fe76704" providerId="ADAL" clId="{B606E7B2-EFF5-418A-8639-9F7537C4DA50}" dt="2022-05-21T16:37:57.115" v="10442" actId="20577"/>
         <pc:sldMkLst>
           <pc:docMk/>
           <pc:sldMk cId="3437013850" sldId="276"/>
@@ -1626,6 +1626,22 @@
             <ac:spMk id="18" creationId="{5FC2BB98-7DC2-4080-AF7B-229F70465EB4}"/>
           </ac:spMkLst>
         </pc:spChg>
+        <pc:spChg chg="add mod">
+          <ac:chgData name="Zhao Xiong" userId="5eba49e5-2895-4cd9-83e8-b3064fe76704" providerId="ADAL" clId="{B606E7B2-EFF5-418A-8639-9F7537C4DA50}" dt="2022-05-21T16:37:57.115" v="10442" actId="20577"/>
+          <ac:spMkLst>
+            <pc:docMk/>
+            <pc:sldMk cId="3437013850" sldId="276"/>
+            <ac:spMk id="19" creationId="{35182448-AD81-432E-9D5C-F58591C61A82}"/>
+          </ac:spMkLst>
+        </pc:spChg>
+        <pc:picChg chg="add mod">
+          <ac:chgData name="Zhao Xiong" userId="5eba49e5-2895-4cd9-83e8-b3064fe76704" providerId="ADAL" clId="{B606E7B2-EFF5-418A-8639-9F7537C4DA50}" dt="2022-05-21T16:37:39.236" v="10434" actId="14100"/>
+          <ac:picMkLst>
+            <pc:docMk/>
+            <pc:sldMk cId="3437013850" sldId="276"/>
+            <ac:picMk id="2" creationId="{2461382E-AE62-44E5-AC21-DFDC52804B7E}"/>
+          </ac:picMkLst>
+        </pc:picChg>
         <pc:picChg chg="add mod">
           <ac:chgData name="Zhao Xiong" userId="5eba49e5-2895-4cd9-83e8-b3064fe76704" providerId="ADAL" clId="{B606E7B2-EFF5-418A-8639-9F7537C4DA50}" dt="2022-05-20T18:38:26.274" v="10425" actId="1037"/>
           <ac:picMkLst>
@@ -1770,7 +1786,7 @@
           <a:p>
             <a:fld id="{3F756EDF-0C8E-4F27-B2A4-7BBF4F0FD9CE}" type="datetimeFigureOut">
               <a:rPr lang="en-GB" smtClean="0"/>
-              <a:t>20/05/2022</a:t>
+              <a:t>21/05/2022</a:t>
             </a:fld>
             <a:endParaRPr lang="en-GB"/>
           </a:p>
@@ -2187,7 +2203,7 @@
           <a:p>
             <a:fld id="{B1B6DC73-6F54-48A7-AC0A-0EE4EE00B05A}" type="datetimeFigureOut">
               <a:rPr lang="en-GB" smtClean="0"/>
-              <a:t>20/05/2022</a:t>
+              <a:t>21/05/2022</a:t>
             </a:fld>
             <a:endParaRPr lang="en-GB"/>
           </a:p>
@@ -2387,7 +2403,7 @@
           <a:p>
             <a:fld id="{B1B6DC73-6F54-48A7-AC0A-0EE4EE00B05A}" type="datetimeFigureOut">
               <a:rPr lang="en-GB" smtClean="0"/>
-              <a:t>20/05/2022</a:t>
+              <a:t>21/05/2022</a:t>
             </a:fld>
             <a:endParaRPr lang="en-GB"/>
           </a:p>
@@ -2597,7 +2613,7 @@
           <a:p>
             <a:fld id="{B1B6DC73-6F54-48A7-AC0A-0EE4EE00B05A}" type="datetimeFigureOut">
               <a:rPr lang="en-GB" smtClean="0"/>
-              <a:t>20/05/2022</a:t>
+              <a:t>21/05/2022</a:t>
             </a:fld>
             <a:endParaRPr lang="en-GB"/>
           </a:p>
@@ -2797,7 +2813,7 @@
           <a:p>
             <a:fld id="{B1B6DC73-6F54-48A7-AC0A-0EE4EE00B05A}" type="datetimeFigureOut">
               <a:rPr lang="en-GB" smtClean="0"/>
-              <a:t>20/05/2022</a:t>
+              <a:t>21/05/2022</a:t>
             </a:fld>
             <a:endParaRPr lang="en-GB"/>
           </a:p>
@@ -3073,7 +3089,7 @@
           <a:p>
             <a:fld id="{B1B6DC73-6F54-48A7-AC0A-0EE4EE00B05A}" type="datetimeFigureOut">
               <a:rPr lang="en-GB" smtClean="0"/>
-              <a:t>20/05/2022</a:t>
+              <a:t>21/05/2022</a:t>
             </a:fld>
             <a:endParaRPr lang="en-GB"/>
           </a:p>
@@ -3341,7 +3357,7 @@
           <a:p>
             <a:fld id="{B1B6DC73-6F54-48A7-AC0A-0EE4EE00B05A}" type="datetimeFigureOut">
               <a:rPr lang="en-GB" smtClean="0"/>
-              <a:t>20/05/2022</a:t>
+              <a:t>21/05/2022</a:t>
             </a:fld>
             <a:endParaRPr lang="en-GB"/>
           </a:p>
@@ -3756,7 +3772,7 @@
           <a:p>
             <a:fld id="{B1B6DC73-6F54-48A7-AC0A-0EE4EE00B05A}" type="datetimeFigureOut">
               <a:rPr lang="en-GB" smtClean="0"/>
-              <a:t>20/05/2022</a:t>
+              <a:t>21/05/2022</a:t>
             </a:fld>
             <a:endParaRPr lang="en-GB"/>
           </a:p>
@@ -3898,7 +3914,7 @@
           <a:p>
             <a:fld id="{B1B6DC73-6F54-48A7-AC0A-0EE4EE00B05A}" type="datetimeFigureOut">
               <a:rPr lang="en-GB" smtClean="0"/>
-              <a:t>20/05/2022</a:t>
+              <a:t>21/05/2022</a:t>
             </a:fld>
             <a:endParaRPr lang="en-GB"/>
           </a:p>
@@ -4011,7 +4027,7 @@
           <a:p>
             <a:fld id="{B1B6DC73-6F54-48A7-AC0A-0EE4EE00B05A}" type="datetimeFigureOut">
               <a:rPr lang="en-GB" smtClean="0"/>
-              <a:t>20/05/2022</a:t>
+              <a:t>21/05/2022</a:t>
             </a:fld>
             <a:endParaRPr lang="en-GB"/>
           </a:p>
@@ -4324,7 +4340,7 @@
           <a:p>
             <a:fld id="{B1B6DC73-6F54-48A7-AC0A-0EE4EE00B05A}" type="datetimeFigureOut">
               <a:rPr lang="en-GB" smtClean="0"/>
-              <a:t>20/05/2022</a:t>
+              <a:t>21/05/2022</a:t>
             </a:fld>
             <a:endParaRPr lang="en-GB"/>
           </a:p>
@@ -4613,7 +4629,7 @@
           <a:p>
             <a:fld id="{B1B6DC73-6F54-48A7-AC0A-0EE4EE00B05A}" type="datetimeFigureOut">
               <a:rPr lang="en-GB" smtClean="0"/>
-              <a:t>20/05/2022</a:t>
+              <a:t>21/05/2022</a:t>
             </a:fld>
             <a:endParaRPr lang="en-GB"/>
           </a:p>
@@ -4856,7 +4872,7 @@
           <a:p>
             <a:fld id="{B1B6DC73-6F54-48A7-AC0A-0EE4EE00B05A}" type="datetimeFigureOut">
               <a:rPr lang="en-GB" smtClean="0"/>
-              <a:t>20/05/2022</a:t>
+              <a:t>21/05/2022</a:t>
             </a:fld>
             <a:endParaRPr lang="en-GB"/>
           </a:p>
@@ -7409,6 +7425,76 @@
                 </a:solidFill>
               </a:rPr>
               <a:t>Eigen Decomposition Medoids (Nodal Weights) for all Alpha</a:t>
+            </a:r>
+          </a:p>
+        </p:txBody>
+      </p:sp>
+      <p:pic>
+        <p:nvPicPr>
+          <p:cNvPr id="2" name="Picture 1">
+            <a:extLst>
+              <a:ext uri="{FF2B5EF4-FFF2-40B4-BE49-F238E27FC236}">
+                <a16:creationId xmlns:a16="http://schemas.microsoft.com/office/drawing/2014/main" id="{2461382E-AE62-44E5-AC21-DFDC52804B7E}"/>
+              </a:ext>
+            </a:extLst>
+          </p:cNvPr>
+          <p:cNvPicPr>
+            <a:picLocks noChangeAspect="1"/>
+          </p:cNvPicPr>
+          <p:nvPr/>
+        </p:nvPicPr>
+        <p:blipFill>
+          <a:blip r:embed="rId9"/>
+          <a:stretch>
+            <a:fillRect/>
+          </a:stretch>
+        </p:blipFill>
+        <p:spPr>
+          <a:xfrm>
+            <a:off x="8249215" y="2668945"/>
+            <a:ext cx="3845842" cy="1958562"/>
+          </a:xfrm>
+          <a:prstGeom prst="rect">
+            <a:avLst/>
+          </a:prstGeom>
+        </p:spPr>
+      </p:pic>
+      <p:sp>
+        <p:nvSpPr>
+          <p:cNvPr id="19" name="TextBox 18">
+            <a:extLst>
+              <a:ext uri="{FF2B5EF4-FFF2-40B4-BE49-F238E27FC236}">
+                <a16:creationId xmlns:a16="http://schemas.microsoft.com/office/drawing/2014/main" id="{35182448-AD81-432E-9D5C-F58591C61A82}"/>
+              </a:ext>
+            </a:extLst>
+          </p:cNvPr>
+          <p:cNvSpPr txBox="1"/>
+          <p:nvPr/>
+        </p:nvSpPr>
+        <p:spPr>
+          <a:xfrm>
+            <a:off x="8226997" y="2524549"/>
+            <a:ext cx="3885494" cy="184666"/>
+          </a:xfrm>
+          <a:prstGeom prst="rect">
+            <a:avLst/>
+          </a:prstGeom>
+          <a:noFill/>
+        </p:spPr>
+        <p:txBody>
+          <a:bodyPr wrap="square" lIns="0" tIns="0" rIns="0" bIns="0" rtlCol="0">
+            <a:spAutoFit/>
+          </a:bodyPr>
+          <a:lstStyle/>
+          <a:p>
+            <a:pPr algn="ctr"/>
+            <a:r>
+              <a:rPr lang="en-NZ" sz="1200" b="1" dirty="0">
+                <a:solidFill>
+                  <a:srgbClr val="0070C0"/>
+                </a:solidFill>
+              </a:rPr>
+              <a:t>Medoids (Nodal Weights) for Best Alphas</a:t>
             </a:r>
           </a:p>
         </p:txBody>

</xml_diff>

<commit_message>
first implementation of combining 2 10% runs
</commit_message>
<xml_diff>
--- a/job_results.pptx
+++ b/job_results.pptx
@@ -5,7 +5,7 @@
     <p:sldMasterId id="2147483648" r:id="rId1"/>
   </p:sldMasterIdLst>
   <p:notesMasterIdLst>
-    <p:notesMasterId r:id="rId20"/>
+    <p:notesMasterId r:id="rId21"/>
   </p:notesMasterIdLst>
   <p:sldIdLst>
     <p:sldId id="256" r:id="rId2"/>
@@ -24,8 +24,9 @@
     <p:sldId id="276" r:id="rId15"/>
     <p:sldId id="275" r:id="rId16"/>
     <p:sldId id="266" r:id="rId17"/>
-    <p:sldId id="263" r:id="rId18"/>
-    <p:sldId id="274" r:id="rId19"/>
+    <p:sldId id="277" r:id="rId18"/>
+    <p:sldId id="263" r:id="rId19"/>
+    <p:sldId id="274" r:id="rId20"/>
   </p:sldIdLst>
   <p:sldSz cx="12192000" cy="6858000"/>
   <p:notesSz cx="6858000" cy="9144000"/>
@@ -193,7 +194,7 @@
   <pc:docChgLst>
     <pc:chgData name="Zhao Xiong" userId="5eba49e5-2895-4cd9-83e8-b3064fe76704" providerId="ADAL" clId="{B606E7B2-EFF5-418A-8639-9F7537C4DA50}"/>
     <pc:docChg chg="undo custSel addSld delSld modSld sldOrd">
-      <pc:chgData name="Zhao Xiong" userId="5eba49e5-2895-4cd9-83e8-b3064fe76704" providerId="ADAL" clId="{B606E7B2-EFF5-418A-8639-9F7537C4DA50}" dt="2022-05-21T16:37:57.115" v="10442" actId="20577"/>
+      <pc:chgData name="Zhao Xiong" userId="5eba49e5-2895-4cd9-83e8-b3064fe76704" providerId="ADAL" clId="{B606E7B2-EFF5-418A-8639-9F7537C4DA50}" dt="2022-05-26T14:40:04.549" v="11057" actId="1035"/>
       <pc:docMkLst>
         <pc:docMk/>
       </pc:docMkLst>
@@ -1699,6 +1700,173 @@
           </ac:picMkLst>
         </pc:picChg>
       </pc:sldChg>
+      <pc:sldChg chg="addSp delSp modSp add">
+        <pc:chgData name="Zhao Xiong" userId="5eba49e5-2895-4cd9-83e8-b3064fe76704" providerId="ADAL" clId="{B606E7B2-EFF5-418A-8639-9F7537C4DA50}" dt="2022-05-26T14:40:04.549" v="11057" actId="1035"/>
+        <pc:sldMkLst>
+          <pc:docMk/>
+          <pc:sldMk cId="488936307" sldId="277"/>
+        </pc:sldMkLst>
+        <pc:spChg chg="del">
+          <ac:chgData name="Zhao Xiong" userId="5eba49e5-2895-4cd9-83e8-b3064fe76704" providerId="ADAL" clId="{B606E7B2-EFF5-418A-8639-9F7537C4DA50}" dt="2022-05-26T13:09:58.297" v="10444" actId="478"/>
+          <ac:spMkLst>
+            <pc:docMk/>
+            <pc:sldMk cId="488936307" sldId="277"/>
+            <ac:spMk id="2" creationId="{8591231F-CE81-45B6-8CE9-2A378F126B13}"/>
+          </ac:spMkLst>
+        </pc:spChg>
+        <pc:spChg chg="del">
+          <ac:chgData name="Zhao Xiong" userId="5eba49e5-2895-4cd9-83e8-b3064fe76704" providerId="ADAL" clId="{B606E7B2-EFF5-418A-8639-9F7537C4DA50}" dt="2022-05-26T13:09:58.297" v="10444" actId="478"/>
+          <ac:spMkLst>
+            <pc:docMk/>
+            <pc:sldMk cId="488936307" sldId="277"/>
+            <ac:spMk id="3" creationId="{DCF90029-BF6E-49B6-978D-21358CB4771A}"/>
+          </ac:spMkLst>
+        </pc:spChg>
+        <pc:spChg chg="add mod">
+          <ac:chgData name="Zhao Xiong" userId="5eba49e5-2895-4cd9-83e8-b3064fe76704" providerId="ADAL" clId="{B606E7B2-EFF5-418A-8639-9F7537C4DA50}" dt="2022-05-26T14:33:26.781" v="10838" actId="313"/>
+          <ac:spMkLst>
+            <pc:docMk/>
+            <pc:sldMk cId="488936307" sldId="277"/>
+            <ac:spMk id="4" creationId="{C91C1337-10B3-4EBA-AA88-A19AFA920006}"/>
+          </ac:spMkLst>
+        </pc:spChg>
+        <pc:spChg chg="add mod topLvl">
+          <ac:chgData name="Zhao Xiong" userId="5eba49e5-2895-4cd9-83e8-b3064fe76704" providerId="ADAL" clId="{B606E7B2-EFF5-418A-8639-9F7537C4DA50}" dt="2022-05-26T14:36:54.227" v="11016" actId="1035"/>
+          <ac:spMkLst>
+            <pc:docMk/>
+            <pc:sldMk cId="488936307" sldId="277"/>
+            <ac:spMk id="8" creationId="{A1060072-1F98-4C29-BED5-FC1AB896BE0C}"/>
+          </ac:spMkLst>
+        </pc:spChg>
+        <pc:spChg chg="add mod topLvl">
+          <ac:chgData name="Zhao Xiong" userId="5eba49e5-2895-4cd9-83e8-b3064fe76704" providerId="ADAL" clId="{B606E7B2-EFF5-418A-8639-9F7537C4DA50}" dt="2022-05-26T14:36:48.812" v="10984" actId="165"/>
+          <ac:spMkLst>
+            <pc:docMk/>
+            <pc:sldMk cId="488936307" sldId="277"/>
+            <ac:spMk id="9" creationId="{742E45F5-E8A1-47D7-AA77-1C69E205CCF8}"/>
+          </ac:spMkLst>
+        </pc:spChg>
+        <pc:spChg chg="add mod">
+          <ac:chgData name="Zhao Xiong" userId="5eba49e5-2895-4cd9-83e8-b3064fe76704" providerId="ADAL" clId="{B606E7B2-EFF5-418A-8639-9F7537C4DA50}" dt="2022-05-26T14:36:59.739" v="11017" actId="1076"/>
+          <ac:spMkLst>
+            <pc:docMk/>
+            <pc:sldMk cId="488936307" sldId="277"/>
+            <ac:spMk id="10" creationId="{963C75F1-AF78-4BF4-A79B-39A23BA5A1D5}"/>
+          </ac:spMkLst>
+        </pc:spChg>
+        <pc:spChg chg="add mod">
+          <ac:chgData name="Zhao Xiong" userId="5eba49e5-2895-4cd9-83e8-b3064fe76704" providerId="ADAL" clId="{B606E7B2-EFF5-418A-8639-9F7537C4DA50}" dt="2022-05-26T14:37:42.294" v="11033" actId="1038"/>
+          <ac:spMkLst>
+            <pc:docMk/>
+            <pc:sldMk cId="488936307" sldId="277"/>
+            <ac:spMk id="14" creationId="{B8AD830E-14FC-44AB-B60B-3C47B3B54690}"/>
+          </ac:spMkLst>
+        </pc:spChg>
+        <pc:spChg chg="add mod">
+          <ac:chgData name="Zhao Xiong" userId="5eba49e5-2895-4cd9-83e8-b3064fe76704" providerId="ADAL" clId="{B606E7B2-EFF5-418A-8639-9F7537C4DA50}" dt="2022-05-26T14:37:42.294" v="11033" actId="1038"/>
+          <ac:spMkLst>
+            <pc:docMk/>
+            <pc:sldMk cId="488936307" sldId="277"/>
+            <ac:spMk id="16" creationId="{BBEBB754-045A-42EE-AA9B-65D3ED829172}"/>
+          </ac:spMkLst>
+        </pc:spChg>
+        <pc:grpChg chg="add del mod">
+          <ac:chgData name="Zhao Xiong" userId="5eba49e5-2895-4cd9-83e8-b3064fe76704" providerId="ADAL" clId="{B606E7B2-EFF5-418A-8639-9F7537C4DA50}" dt="2022-05-26T14:35:50.486" v="10935" actId="165"/>
+          <ac:grpSpMkLst>
+            <pc:docMk/>
+            <pc:sldMk cId="488936307" sldId="277"/>
+            <ac:grpSpMk id="17" creationId="{4785F734-ADFE-457A-87C4-6002FFF9D847}"/>
+          </ac:grpSpMkLst>
+        </pc:grpChg>
+        <pc:grpChg chg="add del mod">
+          <ac:chgData name="Zhao Xiong" userId="5eba49e5-2895-4cd9-83e8-b3064fe76704" providerId="ADAL" clId="{B606E7B2-EFF5-418A-8639-9F7537C4DA50}" dt="2022-05-26T14:36:12.918" v="10945" actId="165"/>
+          <ac:grpSpMkLst>
+            <pc:docMk/>
+            <pc:sldMk cId="488936307" sldId="277"/>
+            <ac:grpSpMk id="18" creationId="{CE07B7B2-AEC7-4971-A7A5-E902CB4B07C2}"/>
+          </ac:grpSpMkLst>
+        </pc:grpChg>
+        <pc:grpChg chg="add del mod">
+          <ac:chgData name="Zhao Xiong" userId="5eba49e5-2895-4cd9-83e8-b3064fe76704" providerId="ADAL" clId="{B606E7B2-EFF5-418A-8639-9F7537C4DA50}" dt="2022-05-26T14:36:48.812" v="10984" actId="165"/>
+          <ac:grpSpMkLst>
+            <pc:docMk/>
+            <pc:sldMk cId="488936307" sldId="277"/>
+            <ac:grpSpMk id="19" creationId="{DB37B350-C096-4FE8-852A-62DB2914009E}"/>
+          </ac:grpSpMkLst>
+        </pc:grpChg>
+        <pc:picChg chg="add mod topLvl">
+          <ac:chgData name="Zhao Xiong" userId="5eba49e5-2895-4cd9-83e8-b3064fe76704" providerId="ADAL" clId="{B606E7B2-EFF5-418A-8639-9F7537C4DA50}" dt="2022-05-26T14:36:54.227" v="11016" actId="1035"/>
+          <ac:picMkLst>
+            <pc:docMk/>
+            <pc:sldMk cId="488936307" sldId="277"/>
+            <ac:picMk id="5" creationId="{A1C27B8B-4630-41D8-90DE-6689EB111F56}"/>
+          </ac:picMkLst>
+        </pc:picChg>
+        <pc:picChg chg="add mod topLvl">
+          <ac:chgData name="Zhao Xiong" userId="5eba49e5-2895-4cd9-83e8-b3064fe76704" providerId="ADAL" clId="{B606E7B2-EFF5-418A-8639-9F7537C4DA50}" dt="2022-05-26T14:36:48.812" v="10984" actId="165"/>
+          <ac:picMkLst>
+            <pc:docMk/>
+            <pc:sldMk cId="488936307" sldId="277"/>
+            <ac:picMk id="6" creationId="{75CBB639-FE54-4B9C-8CDE-A8F72992F4C9}"/>
+          </ac:picMkLst>
+        </pc:picChg>
+        <pc:picChg chg="add mod">
+          <ac:chgData name="Zhao Xiong" userId="5eba49e5-2895-4cd9-83e8-b3064fe76704" providerId="ADAL" clId="{B606E7B2-EFF5-418A-8639-9F7537C4DA50}" dt="2022-05-26T14:36:59.739" v="11017" actId="1076"/>
+          <ac:picMkLst>
+            <pc:docMk/>
+            <pc:sldMk cId="488936307" sldId="277"/>
+            <ac:picMk id="7" creationId="{2EB90CA0-7089-4B2A-817F-F2DFB002EC81}"/>
+          </ac:picMkLst>
+        </pc:picChg>
+        <pc:picChg chg="add del mod modCrop">
+          <ac:chgData name="Zhao Xiong" userId="5eba49e5-2895-4cd9-83e8-b3064fe76704" providerId="ADAL" clId="{B606E7B2-EFF5-418A-8639-9F7537C4DA50}" dt="2022-05-26T13:33:02.551" v="10722" actId="478"/>
+          <ac:picMkLst>
+            <pc:docMk/>
+            <pc:sldMk cId="488936307" sldId="277"/>
+            <ac:picMk id="11" creationId="{F8ADE25A-34CA-4170-9A12-28DB36A7991C}"/>
+          </ac:picMkLst>
+        </pc:picChg>
+        <pc:picChg chg="add del mod modCrop">
+          <ac:chgData name="Zhao Xiong" userId="5eba49e5-2895-4cd9-83e8-b3064fe76704" providerId="ADAL" clId="{B606E7B2-EFF5-418A-8639-9F7537C4DA50}" dt="2022-05-26T13:33:02.551" v="10722" actId="478"/>
+          <ac:picMkLst>
+            <pc:docMk/>
+            <pc:sldMk cId="488936307" sldId="277"/>
+            <ac:picMk id="12" creationId="{38AC2573-8780-4AC3-87D3-1B3FF81B4B7F}"/>
+          </ac:picMkLst>
+        </pc:picChg>
+        <pc:picChg chg="add mod">
+          <ac:chgData name="Zhao Xiong" userId="5eba49e5-2895-4cd9-83e8-b3064fe76704" providerId="ADAL" clId="{B606E7B2-EFF5-418A-8639-9F7537C4DA50}" dt="2022-05-26T14:37:42.294" v="11033" actId="1038"/>
+          <ac:picMkLst>
+            <pc:docMk/>
+            <pc:sldMk cId="488936307" sldId="277"/>
+            <ac:picMk id="13" creationId="{D4FDDA89-6DA2-4ADA-9587-48774A5F7526}"/>
+          </ac:picMkLst>
+        </pc:picChg>
+        <pc:picChg chg="add mod">
+          <ac:chgData name="Zhao Xiong" userId="5eba49e5-2895-4cd9-83e8-b3064fe76704" providerId="ADAL" clId="{B606E7B2-EFF5-418A-8639-9F7537C4DA50}" dt="2022-05-26T14:37:42.294" v="11033" actId="1038"/>
+          <ac:picMkLst>
+            <pc:docMk/>
+            <pc:sldMk cId="488936307" sldId="277"/>
+            <ac:picMk id="15" creationId="{8F1FA3A5-C47D-424C-A455-CF43803145B8}"/>
+          </ac:picMkLst>
+        </pc:picChg>
+        <pc:cxnChg chg="add mod">
+          <ac:chgData name="Zhao Xiong" userId="5eba49e5-2895-4cd9-83e8-b3064fe76704" providerId="ADAL" clId="{B606E7B2-EFF5-418A-8639-9F7537C4DA50}" dt="2022-05-26T14:39:53.012" v="11042" actId="1037"/>
+          <ac:cxnSpMkLst>
+            <pc:docMk/>
+            <pc:sldMk cId="488936307" sldId="277"/>
+            <ac:cxnSpMk id="21" creationId="{4833C7A2-7CB5-4D16-80DC-DAC6AA1F4E90}"/>
+          </ac:cxnSpMkLst>
+        </pc:cxnChg>
+        <pc:cxnChg chg="add mod">
+          <ac:chgData name="Zhao Xiong" userId="5eba49e5-2895-4cd9-83e8-b3064fe76704" providerId="ADAL" clId="{B606E7B2-EFF5-418A-8639-9F7537C4DA50}" dt="2022-05-26T14:40:04.549" v="11057" actId="1035"/>
+          <ac:cxnSpMkLst>
+            <pc:docMk/>
+            <pc:sldMk cId="488936307" sldId="277"/>
+            <ac:cxnSpMk id="22" creationId="{44E0AFEA-D62E-48F0-A0E1-B9821750099A}"/>
+          </ac:cxnSpMkLst>
+        </pc:cxnChg>
+      </pc:sldChg>
     </pc:docChg>
   </pc:docChgLst>
 </pc:chgInfo>
@@ -1786,7 +1954,7 @@
           <a:p>
             <a:fld id="{3F756EDF-0C8E-4F27-B2A4-7BBF4F0FD9CE}" type="datetimeFigureOut">
               <a:rPr lang="en-GB" smtClean="0"/>
-              <a:t>21/05/2022</a:t>
+              <a:t>26/05/2022</a:t>
             </a:fld>
             <a:endParaRPr lang="en-GB"/>
           </a:p>
@@ -2203,7 +2371,7 @@
           <a:p>
             <a:fld id="{B1B6DC73-6F54-48A7-AC0A-0EE4EE00B05A}" type="datetimeFigureOut">
               <a:rPr lang="en-GB" smtClean="0"/>
-              <a:t>21/05/2022</a:t>
+              <a:t>26/05/2022</a:t>
             </a:fld>
             <a:endParaRPr lang="en-GB"/>
           </a:p>
@@ -2403,7 +2571,7 @@
           <a:p>
             <a:fld id="{B1B6DC73-6F54-48A7-AC0A-0EE4EE00B05A}" type="datetimeFigureOut">
               <a:rPr lang="en-GB" smtClean="0"/>
-              <a:t>21/05/2022</a:t>
+              <a:t>26/05/2022</a:t>
             </a:fld>
             <a:endParaRPr lang="en-GB"/>
           </a:p>
@@ -2613,7 +2781,7 @@
           <a:p>
             <a:fld id="{B1B6DC73-6F54-48A7-AC0A-0EE4EE00B05A}" type="datetimeFigureOut">
               <a:rPr lang="en-GB" smtClean="0"/>
-              <a:t>21/05/2022</a:t>
+              <a:t>26/05/2022</a:t>
             </a:fld>
             <a:endParaRPr lang="en-GB"/>
           </a:p>
@@ -2813,7 +2981,7 @@
           <a:p>
             <a:fld id="{B1B6DC73-6F54-48A7-AC0A-0EE4EE00B05A}" type="datetimeFigureOut">
               <a:rPr lang="en-GB" smtClean="0"/>
-              <a:t>21/05/2022</a:t>
+              <a:t>26/05/2022</a:t>
             </a:fld>
             <a:endParaRPr lang="en-GB"/>
           </a:p>
@@ -3089,7 +3257,7 @@
           <a:p>
             <a:fld id="{B1B6DC73-6F54-48A7-AC0A-0EE4EE00B05A}" type="datetimeFigureOut">
               <a:rPr lang="en-GB" smtClean="0"/>
-              <a:t>21/05/2022</a:t>
+              <a:t>26/05/2022</a:t>
             </a:fld>
             <a:endParaRPr lang="en-GB"/>
           </a:p>
@@ -3357,7 +3525,7 @@
           <a:p>
             <a:fld id="{B1B6DC73-6F54-48A7-AC0A-0EE4EE00B05A}" type="datetimeFigureOut">
               <a:rPr lang="en-GB" smtClean="0"/>
-              <a:t>21/05/2022</a:t>
+              <a:t>26/05/2022</a:t>
             </a:fld>
             <a:endParaRPr lang="en-GB"/>
           </a:p>
@@ -3772,7 +3940,7 @@
           <a:p>
             <a:fld id="{B1B6DC73-6F54-48A7-AC0A-0EE4EE00B05A}" type="datetimeFigureOut">
               <a:rPr lang="en-GB" smtClean="0"/>
-              <a:t>21/05/2022</a:t>
+              <a:t>26/05/2022</a:t>
             </a:fld>
             <a:endParaRPr lang="en-GB"/>
           </a:p>
@@ -3914,7 +4082,7 @@
           <a:p>
             <a:fld id="{B1B6DC73-6F54-48A7-AC0A-0EE4EE00B05A}" type="datetimeFigureOut">
               <a:rPr lang="en-GB" smtClean="0"/>
-              <a:t>21/05/2022</a:t>
+              <a:t>26/05/2022</a:t>
             </a:fld>
             <a:endParaRPr lang="en-GB"/>
           </a:p>
@@ -4027,7 +4195,7 @@
           <a:p>
             <a:fld id="{B1B6DC73-6F54-48A7-AC0A-0EE4EE00B05A}" type="datetimeFigureOut">
               <a:rPr lang="en-GB" smtClean="0"/>
-              <a:t>21/05/2022</a:t>
+              <a:t>26/05/2022</a:t>
             </a:fld>
             <a:endParaRPr lang="en-GB"/>
           </a:p>
@@ -4340,7 +4508,7 @@
           <a:p>
             <a:fld id="{B1B6DC73-6F54-48A7-AC0A-0EE4EE00B05A}" type="datetimeFigureOut">
               <a:rPr lang="en-GB" smtClean="0"/>
-              <a:t>21/05/2022</a:t>
+              <a:t>26/05/2022</a:t>
             </a:fld>
             <a:endParaRPr lang="en-GB"/>
           </a:p>
@@ -4629,7 +4797,7 @@
           <a:p>
             <a:fld id="{B1B6DC73-6F54-48A7-AC0A-0EE4EE00B05A}" type="datetimeFigureOut">
               <a:rPr lang="en-GB" smtClean="0"/>
-              <a:t>21/05/2022</a:t>
+              <a:t>26/05/2022</a:t>
             </a:fld>
             <a:endParaRPr lang="en-GB"/>
           </a:p>
@@ -4872,7 +5040,7 @@
           <a:p>
             <a:fld id="{B1B6DC73-6F54-48A7-AC0A-0EE4EE00B05A}" type="datetimeFigureOut">
               <a:rPr lang="en-GB" smtClean="0"/>
-              <a:t>21/05/2022</a:t>
+              <a:t>26/05/2022</a:t>
             </a:fld>
             <a:endParaRPr lang="en-GB"/>
           </a:p>
@@ -8353,6 +8521,516 @@
           <a:chExt cx="0" cy="0"/>
         </a:xfrm>
       </p:grpSpPr>
+      <p:sp>
+        <p:nvSpPr>
+          <p:cNvPr id="4" name="TextBox 3">
+            <a:extLst>
+              <a:ext uri="{FF2B5EF4-FFF2-40B4-BE49-F238E27FC236}">
+                <a16:creationId xmlns:a16="http://schemas.microsoft.com/office/drawing/2014/main" id="{C91C1337-10B3-4EBA-AA88-A19AFA920006}"/>
+              </a:ext>
+            </a:extLst>
+          </p:cNvPr>
+          <p:cNvSpPr txBox="1"/>
+          <p:nvPr/>
+        </p:nvSpPr>
+        <p:spPr>
+          <a:xfrm>
+            <a:off x="0" y="0"/>
+            <a:ext cx="12192000" cy="646331"/>
+          </a:xfrm>
+          <a:prstGeom prst="rect">
+            <a:avLst/>
+          </a:prstGeom>
+          <a:noFill/>
+        </p:spPr>
+        <p:txBody>
+          <a:bodyPr wrap="square" rtlCol="0">
+            <a:spAutoFit/>
+          </a:bodyPr>
+          <a:lstStyle/>
+          <a:p>
+            <a:r>
+              <a:rPr lang="en-NZ" b="1" dirty="0"/>
+              <a:t>Combining the outputs of individual runs into one graph (Naïve approach: concatenate outputs of </a:t>
+            </a:r>
+            <a:r>
+              <a:rPr lang="en-NZ" b="1" dirty="0" err="1"/>
+              <a:t>cPCA</a:t>
+            </a:r>
+            <a:r>
+              <a:rPr lang="en-NZ" b="1" dirty="0"/>
+              <a:t> function, sum variable contributions)</a:t>
+            </a:r>
+            <a:endParaRPr lang="en-GB" b="1" dirty="0"/>
+          </a:p>
+        </p:txBody>
+      </p:sp>
+      <p:pic>
+        <p:nvPicPr>
+          <p:cNvPr id="7" name="Picture 6">
+            <a:extLst>
+              <a:ext uri="{FF2B5EF4-FFF2-40B4-BE49-F238E27FC236}">
+                <a16:creationId xmlns:a16="http://schemas.microsoft.com/office/drawing/2014/main" id="{2EB90CA0-7089-4B2A-817F-F2DFB002EC81}"/>
+              </a:ext>
+            </a:extLst>
+          </p:cNvPr>
+          <p:cNvPicPr>
+            <a:picLocks noChangeAspect="1"/>
+          </p:cNvPicPr>
+          <p:nvPr/>
+        </p:nvPicPr>
+        <p:blipFill>
+          <a:blip r:embed="rId2"/>
+          <a:stretch>
+            <a:fillRect/>
+          </a:stretch>
+        </p:blipFill>
+        <p:spPr>
+          <a:xfrm>
+            <a:off x="2462072" y="1742651"/>
+            <a:ext cx="1937440" cy="3546500"/>
+          </a:xfrm>
+          <a:prstGeom prst="rect">
+            <a:avLst/>
+          </a:prstGeom>
+        </p:spPr>
+      </p:pic>
+      <p:pic>
+        <p:nvPicPr>
+          <p:cNvPr id="5" name="Picture 4">
+            <a:extLst>
+              <a:ext uri="{FF2B5EF4-FFF2-40B4-BE49-F238E27FC236}">
+                <a16:creationId xmlns:a16="http://schemas.microsoft.com/office/drawing/2014/main" id="{A1C27B8B-4630-41D8-90DE-6689EB111F56}"/>
+              </a:ext>
+            </a:extLst>
+          </p:cNvPr>
+          <p:cNvPicPr>
+            <a:picLocks noChangeAspect="1"/>
+          </p:cNvPicPr>
+          <p:nvPr/>
+        </p:nvPicPr>
+        <p:blipFill>
+          <a:blip r:embed="rId3"/>
+          <a:stretch>
+            <a:fillRect/>
+          </a:stretch>
+        </p:blipFill>
+        <p:spPr>
+          <a:xfrm>
+            <a:off x="158192" y="655321"/>
+            <a:ext cx="1942832" cy="2939060"/>
+          </a:xfrm>
+          <a:prstGeom prst="rect">
+            <a:avLst/>
+          </a:prstGeom>
+        </p:spPr>
+      </p:pic>
+      <p:pic>
+        <p:nvPicPr>
+          <p:cNvPr id="6" name="Picture 5">
+            <a:extLst>
+              <a:ext uri="{FF2B5EF4-FFF2-40B4-BE49-F238E27FC236}">
+                <a16:creationId xmlns:a16="http://schemas.microsoft.com/office/drawing/2014/main" id="{75CBB639-FE54-4B9C-8CDE-A8F72992F4C9}"/>
+              </a:ext>
+            </a:extLst>
+          </p:cNvPr>
+          <p:cNvPicPr>
+            <a:picLocks noChangeAspect="1"/>
+          </p:cNvPicPr>
+          <p:nvPr/>
+        </p:nvPicPr>
+        <p:blipFill>
+          <a:blip r:embed="rId4"/>
+          <a:stretch>
+            <a:fillRect/>
+          </a:stretch>
+        </p:blipFill>
+        <p:spPr>
+          <a:xfrm>
+            <a:off x="158192" y="3790576"/>
+            <a:ext cx="1940957" cy="2939060"/>
+          </a:xfrm>
+          <a:prstGeom prst="rect">
+            <a:avLst/>
+          </a:prstGeom>
+        </p:spPr>
+      </p:pic>
+      <p:sp>
+        <p:nvSpPr>
+          <p:cNvPr id="8" name="TextBox 7">
+            <a:extLst>
+              <a:ext uri="{FF2B5EF4-FFF2-40B4-BE49-F238E27FC236}">
+                <a16:creationId xmlns:a16="http://schemas.microsoft.com/office/drawing/2014/main" id="{A1060072-1F98-4C29-BED5-FC1AB896BE0C}"/>
+              </a:ext>
+            </a:extLst>
+          </p:cNvPr>
+          <p:cNvSpPr txBox="1"/>
+          <p:nvPr/>
+        </p:nvSpPr>
+        <p:spPr>
+          <a:xfrm>
+            <a:off x="158192" y="3515901"/>
+            <a:ext cx="1942832" cy="153037"/>
+          </a:xfrm>
+          <a:prstGeom prst="rect">
+            <a:avLst/>
+          </a:prstGeom>
+          <a:solidFill>
+            <a:schemeClr val="bg1"/>
+          </a:solidFill>
+        </p:spPr>
+        <p:txBody>
+          <a:bodyPr wrap="square" lIns="0" tIns="0" rIns="0" bIns="0" rtlCol="0">
+            <a:spAutoFit/>
+          </a:bodyPr>
+          <a:lstStyle/>
+          <a:p>
+            <a:pPr algn="ctr"/>
+            <a:r>
+              <a:rPr lang="en-NZ" sz="1200" b="1" dirty="0"/>
+              <a:t>1-3000</a:t>
+            </a:r>
+            <a:endParaRPr lang="en-GB" sz="1200" b="1" dirty="0"/>
+          </a:p>
+        </p:txBody>
+      </p:sp>
+      <p:sp>
+        <p:nvSpPr>
+          <p:cNvPr id="9" name="TextBox 8">
+            <a:extLst>
+              <a:ext uri="{FF2B5EF4-FFF2-40B4-BE49-F238E27FC236}">
+                <a16:creationId xmlns:a16="http://schemas.microsoft.com/office/drawing/2014/main" id="{742E45F5-E8A1-47D7-AA77-1C69E205CCF8}"/>
+              </a:ext>
+            </a:extLst>
+          </p:cNvPr>
+          <p:cNvSpPr txBox="1"/>
+          <p:nvPr/>
+        </p:nvSpPr>
+        <p:spPr>
+          <a:xfrm>
+            <a:off x="158192" y="6651624"/>
+            <a:ext cx="1998268" cy="153037"/>
+          </a:xfrm>
+          <a:prstGeom prst="rect">
+            <a:avLst/>
+          </a:prstGeom>
+          <a:solidFill>
+            <a:schemeClr val="bg1"/>
+          </a:solidFill>
+        </p:spPr>
+        <p:txBody>
+          <a:bodyPr wrap="square" lIns="0" tIns="0" rIns="0" bIns="0" rtlCol="0">
+            <a:spAutoFit/>
+          </a:bodyPr>
+          <a:lstStyle/>
+          <a:p>
+            <a:pPr algn="ctr"/>
+            <a:r>
+              <a:rPr lang="en-NZ" sz="1200" b="1" dirty="0"/>
+              <a:t>3001-6000</a:t>
+            </a:r>
+            <a:endParaRPr lang="en-GB" sz="1200" b="1" dirty="0"/>
+          </a:p>
+        </p:txBody>
+      </p:sp>
+      <p:sp>
+        <p:nvSpPr>
+          <p:cNvPr id="10" name="TextBox 9">
+            <a:extLst>
+              <a:ext uri="{FF2B5EF4-FFF2-40B4-BE49-F238E27FC236}">
+                <a16:creationId xmlns:a16="http://schemas.microsoft.com/office/drawing/2014/main" id="{963C75F1-AF78-4BF4-A79B-39A23BA5A1D5}"/>
+              </a:ext>
+            </a:extLst>
+          </p:cNvPr>
+          <p:cNvSpPr txBox="1"/>
+          <p:nvPr/>
+        </p:nvSpPr>
+        <p:spPr>
+          <a:xfrm>
+            <a:off x="2519417" y="5312229"/>
+            <a:ext cx="1880095" cy="184666"/>
+          </a:xfrm>
+          <a:prstGeom prst="rect">
+            <a:avLst/>
+          </a:prstGeom>
+          <a:solidFill>
+            <a:schemeClr val="bg1"/>
+          </a:solidFill>
+        </p:spPr>
+        <p:txBody>
+          <a:bodyPr wrap="square" lIns="0" tIns="0" rIns="0" bIns="0" rtlCol="0">
+            <a:spAutoFit/>
+          </a:bodyPr>
+          <a:lstStyle/>
+          <a:p>
+            <a:pPr algn="ctr"/>
+            <a:r>
+              <a:rPr lang="en-NZ" sz="1200" b="1" dirty="0"/>
+              <a:t>Merged 1-6000</a:t>
+            </a:r>
+            <a:endParaRPr lang="en-GB" sz="1200" b="1" dirty="0"/>
+          </a:p>
+        </p:txBody>
+      </p:sp>
+      <p:pic>
+        <p:nvPicPr>
+          <p:cNvPr id="13" name="Picture 12">
+            <a:extLst>
+              <a:ext uri="{FF2B5EF4-FFF2-40B4-BE49-F238E27FC236}">
+                <a16:creationId xmlns:a16="http://schemas.microsoft.com/office/drawing/2014/main" id="{D4FDDA89-6DA2-4ADA-9587-48774A5F7526}"/>
+              </a:ext>
+            </a:extLst>
+          </p:cNvPr>
+          <p:cNvPicPr>
+            <a:picLocks noChangeAspect="1"/>
+          </p:cNvPicPr>
+          <p:nvPr/>
+        </p:nvPicPr>
+        <p:blipFill>
+          <a:blip r:embed="rId5"/>
+          <a:stretch>
+            <a:fillRect/>
+          </a:stretch>
+        </p:blipFill>
+        <p:spPr>
+          <a:xfrm>
+            <a:off x="4477467" y="1742651"/>
+            <a:ext cx="2136694" cy="3546500"/>
+          </a:xfrm>
+          <a:prstGeom prst="rect">
+            <a:avLst/>
+          </a:prstGeom>
+        </p:spPr>
+      </p:pic>
+      <p:sp>
+        <p:nvSpPr>
+          <p:cNvPr id="14" name="TextBox 13">
+            <a:extLst>
+              <a:ext uri="{FF2B5EF4-FFF2-40B4-BE49-F238E27FC236}">
+                <a16:creationId xmlns:a16="http://schemas.microsoft.com/office/drawing/2014/main" id="{B8AD830E-14FC-44AB-B60B-3C47B3B54690}"/>
+              </a:ext>
+            </a:extLst>
+          </p:cNvPr>
+          <p:cNvSpPr txBox="1"/>
+          <p:nvPr/>
+        </p:nvSpPr>
+        <p:spPr>
+          <a:xfrm>
+            <a:off x="4400320" y="5318977"/>
+            <a:ext cx="2290987" cy="369332"/>
+          </a:xfrm>
+          <a:prstGeom prst="rect">
+            <a:avLst/>
+          </a:prstGeom>
+          <a:solidFill>
+            <a:schemeClr val="bg1"/>
+          </a:solidFill>
+        </p:spPr>
+        <p:txBody>
+          <a:bodyPr wrap="square" lIns="0" tIns="0" rIns="0" bIns="0" rtlCol="0">
+            <a:spAutoFit/>
+          </a:bodyPr>
+          <a:lstStyle/>
+          <a:p>
+            <a:pPr algn="ctr"/>
+            <a:r>
+              <a:rPr lang="en-NZ" sz="1200" b="1" dirty="0"/>
+              <a:t>Merged 1-6000</a:t>
+            </a:r>
+          </a:p>
+          <a:p>
+            <a:pPr algn="ctr"/>
+            <a:r>
+              <a:rPr lang="en-NZ" sz="1200" b="1" dirty="0"/>
+              <a:t>Fix Between Group A Bit</a:t>
+            </a:r>
+            <a:endParaRPr lang="en-GB" sz="1200" b="1" dirty="0"/>
+          </a:p>
+        </p:txBody>
+      </p:sp>
+      <p:pic>
+        <p:nvPicPr>
+          <p:cNvPr id="15" name="Picture 14">
+            <a:extLst>
+              <a:ext uri="{FF2B5EF4-FFF2-40B4-BE49-F238E27FC236}">
+                <a16:creationId xmlns:a16="http://schemas.microsoft.com/office/drawing/2014/main" id="{8F1FA3A5-C47D-424C-A455-CF43803145B8}"/>
+              </a:ext>
+            </a:extLst>
+          </p:cNvPr>
+          <p:cNvPicPr>
+            <a:picLocks noChangeAspect="1"/>
+          </p:cNvPicPr>
+          <p:nvPr/>
+        </p:nvPicPr>
+        <p:blipFill>
+          <a:blip r:embed="rId6"/>
+          <a:stretch>
+            <a:fillRect/>
+          </a:stretch>
+        </p:blipFill>
+        <p:spPr>
+          <a:xfrm>
+            <a:off x="6722595" y="1742651"/>
+            <a:ext cx="2301313" cy="3546500"/>
+          </a:xfrm>
+          <a:prstGeom prst="rect">
+            <a:avLst/>
+          </a:prstGeom>
+        </p:spPr>
+      </p:pic>
+      <p:sp>
+        <p:nvSpPr>
+          <p:cNvPr id="16" name="TextBox 15">
+            <a:extLst>
+              <a:ext uri="{FF2B5EF4-FFF2-40B4-BE49-F238E27FC236}">
+                <a16:creationId xmlns:a16="http://schemas.microsoft.com/office/drawing/2014/main" id="{BBEBB754-045A-42EE-AA9B-65D3ED829172}"/>
+              </a:ext>
+            </a:extLst>
+          </p:cNvPr>
+          <p:cNvSpPr txBox="1"/>
+          <p:nvPr/>
+        </p:nvSpPr>
+        <p:spPr>
+          <a:xfrm>
+            <a:off x="6722595" y="5318977"/>
+            <a:ext cx="2301313" cy="369332"/>
+          </a:xfrm>
+          <a:prstGeom prst="rect">
+            <a:avLst/>
+          </a:prstGeom>
+          <a:solidFill>
+            <a:schemeClr val="bg1"/>
+          </a:solidFill>
+        </p:spPr>
+        <p:txBody>
+          <a:bodyPr wrap="square" lIns="0" tIns="0" rIns="0" bIns="0" rtlCol="0">
+            <a:spAutoFit/>
+          </a:bodyPr>
+          <a:lstStyle/>
+          <a:p>
+            <a:pPr algn="ctr"/>
+            <a:r>
+              <a:rPr lang="en-NZ" sz="1200" b="1" dirty="0"/>
+              <a:t>Same as one of the left but using shortest path tree </a:t>
+            </a:r>
+            <a:endParaRPr lang="en-GB" sz="1200" b="1" dirty="0"/>
+          </a:p>
+        </p:txBody>
+      </p:sp>
+      <p:cxnSp>
+        <p:nvCxnSpPr>
+          <p:cNvPr id="21" name="Straight Connector 20">
+            <a:extLst>
+              <a:ext uri="{FF2B5EF4-FFF2-40B4-BE49-F238E27FC236}">
+                <a16:creationId xmlns:a16="http://schemas.microsoft.com/office/drawing/2014/main" id="{4833C7A2-7CB5-4D16-80DC-DAC6AA1F4E90}"/>
+              </a:ext>
+            </a:extLst>
+          </p:cNvPr>
+          <p:cNvCxnSpPr/>
+          <p:nvPr/>
+        </p:nvCxnSpPr>
+        <p:spPr>
+          <a:xfrm>
+            <a:off x="2324912" y="525780"/>
+            <a:ext cx="0" cy="6309360"/>
+          </a:xfrm>
+          <a:prstGeom prst="line">
+            <a:avLst/>
+          </a:prstGeom>
+          <a:ln w="76200">
+            <a:solidFill>
+              <a:srgbClr val="FF0000"/>
+            </a:solidFill>
+          </a:ln>
+        </p:spPr>
+        <p:style>
+          <a:lnRef idx="1">
+            <a:schemeClr val="accent1"/>
+          </a:lnRef>
+          <a:fillRef idx="0">
+            <a:schemeClr val="accent1"/>
+          </a:fillRef>
+          <a:effectRef idx="0">
+            <a:schemeClr val="accent1"/>
+          </a:effectRef>
+          <a:fontRef idx="minor">
+            <a:schemeClr val="tx1"/>
+          </a:fontRef>
+        </p:style>
+      </p:cxnSp>
+      <p:cxnSp>
+        <p:nvCxnSpPr>
+          <p:cNvPr id="22" name="Straight Connector 21">
+            <a:extLst>
+              <a:ext uri="{FF2B5EF4-FFF2-40B4-BE49-F238E27FC236}">
+                <a16:creationId xmlns:a16="http://schemas.microsoft.com/office/drawing/2014/main" id="{44E0AFEA-D62E-48F0-A0E1-B9821750099A}"/>
+              </a:ext>
+            </a:extLst>
+          </p:cNvPr>
+          <p:cNvCxnSpPr>
+            <a:cxnSpLocks/>
+          </p:cNvCxnSpPr>
+          <p:nvPr/>
+        </p:nvCxnSpPr>
+        <p:spPr>
+          <a:xfrm>
+            <a:off x="9251492" y="480060"/>
+            <a:ext cx="0" cy="6355081"/>
+          </a:xfrm>
+          <a:prstGeom prst="line">
+            <a:avLst/>
+          </a:prstGeom>
+          <a:ln w="76200">
+            <a:solidFill>
+              <a:srgbClr val="FF0000"/>
+            </a:solidFill>
+          </a:ln>
+        </p:spPr>
+        <p:style>
+          <a:lnRef idx="1">
+            <a:schemeClr val="accent1"/>
+          </a:lnRef>
+          <a:fillRef idx="0">
+            <a:schemeClr val="accent1"/>
+          </a:fillRef>
+          <a:effectRef idx="0">
+            <a:schemeClr val="accent1"/>
+          </a:effectRef>
+          <a:fontRef idx="minor">
+            <a:schemeClr val="tx1"/>
+          </a:fontRef>
+        </p:style>
+      </p:cxnSp>
+    </p:spTree>
+    <p:extLst>
+      <p:ext uri="{BB962C8B-B14F-4D97-AF65-F5344CB8AC3E}">
+        <p14:creationId xmlns:p14="http://schemas.microsoft.com/office/powerpoint/2010/main" val="488936307"/>
+      </p:ext>
+    </p:extLst>
+  </p:cSld>
+  <p:clrMapOvr>
+    <a:masterClrMapping/>
+  </p:clrMapOvr>
+</p:sld>
+</file>
+
+<file path=ppt/slides/slide18.xml><?xml version="1.0" encoding="utf-8"?>
+<p:sld xmlns:a="http://schemas.openxmlformats.org/drawingml/2006/main" xmlns:r="http://schemas.openxmlformats.org/officeDocument/2006/relationships" xmlns:p="http://schemas.openxmlformats.org/presentationml/2006/main">
+  <p:cSld>
+    <p:spTree>
+      <p:nvGrpSpPr>
+        <p:cNvPr id="1" name=""/>
+        <p:cNvGrpSpPr/>
+        <p:nvPr/>
+      </p:nvGrpSpPr>
+      <p:grpSpPr>
+        <a:xfrm>
+          <a:off x="0" y="0"/>
+          <a:ext cx="0" cy="0"/>
+          <a:chOff x="0" y="0"/>
+          <a:chExt cx="0" cy="0"/>
+        </a:xfrm>
+      </p:grpSpPr>
       <p:pic>
         <p:nvPicPr>
           <p:cNvPr id="5" name="Picture 4">
@@ -8446,7 +9124,7 @@
 </p:sld>
 </file>
 
-<file path=ppt/slides/slide18.xml><?xml version="1.0" encoding="utf-8"?>
+<file path=ppt/slides/slide19.xml><?xml version="1.0" encoding="utf-8"?>
 <p:sld xmlns:a="http://schemas.openxmlformats.org/drawingml/2006/main" xmlns:r="http://schemas.openxmlformats.org/officeDocument/2006/relationships" xmlns:p="http://schemas.openxmlformats.org/presentationml/2006/main">
   <p:cSld>
     <p:spTree>

</xml_diff>

<commit_message>
fixed bugs, succesfully merged 9000 patient from 3 runs into single model
</commit_message>
<xml_diff>
--- a/job_results.pptx
+++ b/job_results.pptx
@@ -194,7 +194,7 @@
   <pc:docChgLst>
     <pc:chgData name="Zhao Xiong" userId="5eba49e5-2895-4cd9-83e8-b3064fe76704" providerId="ADAL" clId="{B606E7B2-EFF5-418A-8639-9F7537C4DA50}"/>
     <pc:docChg chg="undo custSel addSld delSld modSld sldOrd">
-      <pc:chgData name="Zhao Xiong" userId="5eba49e5-2895-4cd9-83e8-b3064fe76704" providerId="ADAL" clId="{B606E7B2-EFF5-418A-8639-9F7537C4DA50}" dt="2022-05-26T14:40:04.549" v="11057" actId="1035"/>
+      <pc:chgData name="Zhao Xiong" userId="5eba49e5-2895-4cd9-83e8-b3064fe76704" providerId="ADAL" clId="{B606E7B2-EFF5-418A-8639-9F7537C4DA50}" dt="2022-05-26T16:09:02.515" v="11265" actId="5793"/>
       <pc:docMkLst>
         <pc:docMk/>
       </pc:docMkLst>
@@ -1701,7 +1701,7 @@
         </pc:picChg>
       </pc:sldChg>
       <pc:sldChg chg="addSp delSp modSp add">
-        <pc:chgData name="Zhao Xiong" userId="5eba49e5-2895-4cd9-83e8-b3064fe76704" providerId="ADAL" clId="{B606E7B2-EFF5-418A-8639-9F7537C4DA50}" dt="2022-05-26T14:40:04.549" v="11057" actId="1035"/>
+        <pc:chgData name="Zhao Xiong" userId="5eba49e5-2895-4cd9-83e8-b3064fe76704" providerId="ADAL" clId="{B606E7B2-EFF5-418A-8639-9F7537C4DA50}" dt="2022-05-26T16:09:02.515" v="11265" actId="5793"/>
         <pc:sldMkLst>
           <pc:docMk/>
           <pc:sldMk cId="488936307" sldId="277"/>
@@ -1755,7 +1755,7 @@
           </ac:spMkLst>
         </pc:spChg>
         <pc:spChg chg="add mod">
-          <ac:chgData name="Zhao Xiong" userId="5eba49e5-2895-4cd9-83e8-b3064fe76704" providerId="ADAL" clId="{B606E7B2-EFF5-418A-8639-9F7537C4DA50}" dt="2022-05-26T14:37:42.294" v="11033" actId="1038"/>
+          <ac:chgData name="Zhao Xiong" userId="5eba49e5-2895-4cd9-83e8-b3064fe76704" providerId="ADAL" clId="{B606E7B2-EFF5-418A-8639-9F7537C4DA50}" dt="2022-05-26T16:09:02.515" v="11265" actId="5793"/>
           <ac:spMkLst>
             <pc:docMk/>
             <pc:sldMk cId="488936307" sldId="277"/>
@@ -1770,6 +1770,22 @@
             <ac:spMk id="16" creationId="{BBEBB754-045A-42EE-AA9B-65D3ED829172}"/>
           </ac:spMkLst>
         </pc:spChg>
+        <pc:spChg chg="add mod">
+          <ac:chgData name="Zhao Xiong" userId="5eba49e5-2895-4cd9-83e8-b3064fe76704" providerId="ADAL" clId="{B606E7B2-EFF5-418A-8639-9F7537C4DA50}" dt="2022-05-26T16:06:05.838" v="11201" actId="1035"/>
+          <ac:spMkLst>
+            <pc:docMk/>
+            <pc:sldMk cId="488936307" sldId="277"/>
+            <ac:spMk id="18" creationId="{B4BB9277-2934-48A0-ADB8-CB80E7EEB020}"/>
+          </ac:spMkLst>
+        </pc:spChg>
+        <pc:spChg chg="add mod">
+          <ac:chgData name="Zhao Xiong" userId="5eba49e5-2895-4cd9-83e8-b3064fe76704" providerId="ADAL" clId="{B606E7B2-EFF5-418A-8639-9F7537C4DA50}" dt="2022-05-26T16:05:26.257" v="11182" actId="1036"/>
+          <ac:spMkLst>
+            <pc:docMk/>
+            <pc:sldMk cId="488936307" sldId="277"/>
+            <ac:spMk id="19" creationId="{D50DC477-A3B7-4E02-9EE6-B8F1DB23EE6E}"/>
+          </ac:spMkLst>
+        </pc:spChg>
         <pc:grpChg chg="add del mod">
           <ac:chgData name="Zhao Xiong" userId="5eba49e5-2895-4cd9-83e8-b3064fe76704" providerId="ADAL" clId="{B606E7B2-EFF5-418A-8639-9F7537C4DA50}" dt="2022-05-26T14:35:50.486" v="10935" actId="165"/>
           <ac:grpSpMkLst>
@@ -1794,6 +1810,22 @@
             <ac:grpSpMk id="19" creationId="{DB37B350-C096-4FE8-852A-62DB2914009E}"/>
           </ac:grpSpMkLst>
         </pc:grpChg>
+        <pc:picChg chg="add del mod">
+          <ac:chgData name="Zhao Xiong" userId="5eba49e5-2895-4cd9-83e8-b3064fe76704" providerId="ADAL" clId="{B606E7B2-EFF5-418A-8639-9F7537C4DA50}" dt="2022-05-26T15:53:36.519" v="11060" actId="478"/>
+          <ac:picMkLst>
+            <pc:docMk/>
+            <pc:sldMk cId="488936307" sldId="277"/>
+            <ac:picMk id="2" creationId="{E9384FDA-9C70-411E-AF0F-85239AFC3D4E}"/>
+          </ac:picMkLst>
+        </pc:picChg>
+        <pc:picChg chg="add del mod">
+          <ac:chgData name="Zhao Xiong" userId="5eba49e5-2895-4cd9-83e8-b3064fe76704" providerId="ADAL" clId="{B606E7B2-EFF5-418A-8639-9F7537C4DA50}" dt="2022-05-26T16:05:01.985" v="11159" actId="478"/>
+          <ac:picMkLst>
+            <pc:docMk/>
+            <pc:sldMk cId="488936307" sldId="277"/>
+            <ac:picMk id="3" creationId="{3523A306-BA48-44C6-A0C2-CAAC4A915B58}"/>
+          </ac:picMkLst>
+        </pc:picChg>
         <pc:picChg chg="add mod topLvl">
           <ac:chgData name="Zhao Xiong" userId="5eba49e5-2895-4cd9-83e8-b3064fe76704" providerId="ADAL" clId="{B606E7B2-EFF5-418A-8639-9F7537C4DA50}" dt="2022-05-26T14:36:54.227" v="11016" actId="1035"/>
           <ac:picMkLst>
@@ -1810,12 +1842,20 @@
             <ac:picMk id="6" creationId="{75CBB639-FE54-4B9C-8CDE-A8F72992F4C9}"/>
           </ac:picMkLst>
         </pc:picChg>
-        <pc:picChg chg="add mod">
-          <ac:chgData name="Zhao Xiong" userId="5eba49e5-2895-4cd9-83e8-b3064fe76704" providerId="ADAL" clId="{B606E7B2-EFF5-418A-8639-9F7537C4DA50}" dt="2022-05-26T14:36:59.739" v="11017" actId="1076"/>
+        <pc:picChg chg="add del mod">
+          <ac:chgData name="Zhao Xiong" userId="5eba49e5-2895-4cd9-83e8-b3064fe76704" providerId="ADAL" clId="{B606E7B2-EFF5-418A-8639-9F7537C4DA50}" dt="2022-05-26T15:58:48.337" v="11136" actId="478"/>
           <ac:picMkLst>
             <pc:docMk/>
             <pc:sldMk cId="488936307" sldId="277"/>
             <ac:picMk id="7" creationId="{2EB90CA0-7089-4B2A-817F-F2DFB002EC81}"/>
+          </ac:picMkLst>
+        </pc:picChg>
+        <pc:picChg chg="add del mod">
+          <ac:chgData name="Zhao Xiong" userId="5eba49e5-2895-4cd9-83e8-b3064fe76704" providerId="ADAL" clId="{B606E7B2-EFF5-418A-8639-9F7537C4DA50}" dt="2022-05-26T16:06:02.142" v="11187" actId="478"/>
+          <ac:picMkLst>
+            <pc:docMk/>
+            <pc:sldMk cId="488936307" sldId="277"/>
+            <ac:picMk id="11" creationId="{25B91144-4FD4-4C49-8865-0CD4C0FDD7FA}"/>
           </ac:picMkLst>
         </pc:picChg>
         <pc:picChg chg="add del mod modCrop">
@@ -1835,19 +1875,91 @@
           </ac:picMkLst>
         </pc:picChg>
         <pc:picChg chg="add mod">
-          <ac:chgData name="Zhao Xiong" userId="5eba49e5-2895-4cd9-83e8-b3064fe76704" providerId="ADAL" clId="{B606E7B2-EFF5-418A-8639-9F7537C4DA50}" dt="2022-05-26T14:37:42.294" v="11033" actId="1038"/>
+          <ac:chgData name="Zhao Xiong" userId="5eba49e5-2895-4cd9-83e8-b3064fe76704" providerId="ADAL" clId="{B606E7B2-EFF5-418A-8639-9F7537C4DA50}" dt="2022-05-26T16:02:46.790" v="11158" actId="14100"/>
+          <ac:picMkLst>
+            <pc:docMk/>
+            <pc:sldMk cId="488936307" sldId="277"/>
+            <ac:picMk id="12" creationId="{894902A8-89A4-4902-BBC6-42A830FC254F}"/>
+          </ac:picMkLst>
+        </pc:picChg>
+        <pc:picChg chg="add del mod">
+          <ac:chgData name="Zhao Xiong" userId="5eba49e5-2895-4cd9-83e8-b3064fe76704" providerId="ADAL" clId="{B606E7B2-EFF5-418A-8639-9F7537C4DA50}" dt="2022-05-26T16:01:13.489" v="11147" actId="478"/>
           <ac:picMkLst>
             <pc:docMk/>
             <pc:sldMk cId="488936307" sldId="277"/>
             <ac:picMk id="13" creationId="{D4FDDA89-6DA2-4ADA-9587-48774A5F7526}"/>
           </ac:picMkLst>
         </pc:picChg>
-        <pc:picChg chg="add mod">
-          <ac:chgData name="Zhao Xiong" userId="5eba49e5-2895-4cd9-83e8-b3064fe76704" providerId="ADAL" clId="{B606E7B2-EFF5-418A-8639-9F7537C4DA50}" dt="2022-05-26T14:37:42.294" v="11033" actId="1038"/>
+        <pc:picChg chg="add del mod">
+          <ac:chgData name="Zhao Xiong" userId="5eba49e5-2895-4cd9-83e8-b3064fe76704" providerId="ADAL" clId="{B606E7B2-EFF5-418A-8639-9F7537C4DA50}" dt="2022-05-26T16:02:16.207" v="11151" actId="478"/>
           <ac:picMkLst>
             <pc:docMk/>
             <pc:sldMk cId="488936307" sldId="277"/>
             <ac:picMk id="15" creationId="{8F1FA3A5-C47D-424C-A455-CF43803145B8}"/>
+          </ac:picMkLst>
+        </pc:picChg>
+        <pc:picChg chg="add mod">
+          <ac:chgData name="Zhao Xiong" userId="5eba49e5-2895-4cd9-83e8-b3064fe76704" providerId="ADAL" clId="{B606E7B2-EFF5-418A-8639-9F7537C4DA50}" dt="2022-05-26T16:02:46.790" v="11158" actId="14100"/>
+          <ac:picMkLst>
+            <pc:docMk/>
+            <pc:sldMk cId="488936307" sldId="277"/>
+            <ac:picMk id="17" creationId="{6F50B5D9-25FB-48DD-8D1B-D4F060EC8C34}"/>
+          </ac:picMkLst>
+        </pc:picChg>
+        <pc:picChg chg="add mod">
+          <ac:chgData name="Zhao Xiong" userId="5eba49e5-2895-4cd9-83e8-b3064fe76704" providerId="ADAL" clId="{B606E7B2-EFF5-418A-8639-9F7537C4DA50}" dt="2022-05-26T16:02:46.790" v="11158" actId="14100"/>
+          <ac:picMkLst>
+            <pc:docMk/>
+            <pc:sldMk cId="488936307" sldId="277"/>
+            <ac:picMk id="20" creationId="{69E98260-EFA0-48C7-979A-68512F008494}"/>
+          </ac:picMkLst>
+        </pc:picChg>
+        <pc:picChg chg="add del mod ord">
+          <ac:chgData name="Zhao Xiong" userId="5eba49e5-2895-4cd9-83e8-b3064fe76704" providerId="ADAL" clId="{B606E7B2-EFF5-418A-8639-9F7537C4DA50}" dt="2022-05-26T16:05:54.963" v="11183"/>
+          <ac:picMkLst>
+            <pc:docMk/>
+            <pc:sldMk cId="488936307" sldId="277"/>
+            <ac:picMk id="23" creationId="{82BC2542-98B6-44E8-A2A6-E401FF031E84}"/>
+          </ac:picMkLst>
+        </pc:picChg>
+        <pc:picChg chg="add mod ord">
+          <ac:chgData name="Zhao Xiong" userId="5eba49e5-2895-4cd9-83e8-b3064fe76704" providerId="ADAL" clId="{B606E7B2-EFF5-418A-8639-9F7537C4DA50}" dt="2022-05-26T16:06:04.625" v="11194" actId="1036"/>
+          <ac:picMkLst>
+            <pc:docMk/>
+            <pc:sldMk cId="488936307" sldId="277"/>
+            <ac:picMk id="24" creationId="{EAFA1202-2A37-4DA0-8C2E-45C1539E982F}"/>
+          </ac:picMkLst>
+        </pc:picChg>
+        <pc:picChg chg="add del mod">
+          <ac:chgData name="Zhao Xiong" userId="5eba49e5-2895-4cd9-83e8-b3064fe76704" providerId="ADAL" clId="{B606E7B2-EFF5-418A-8639-9F7537C4DA50}" dt="2022-05-26T16:08:37.743" v="11209" actId="478"/>
+          <ac:picMkLst>
+            <pc:docMk/>
+            <pc:sldMk cId="488936307" sldId="277"/>
+            <ac:picMk id="25" creationId="{33F1757F-0FF5-4736-A16B-F6F031D66134}"/>
+          </ac:picMkLst>
+        </pc:picChg>
+        <pc:picChg chg="add del">
+          <ac:chgData name="Zhao Xiong" userId="5eba49e5-2895-4cd9-83e8-b3064fe76704" providerId="ADAL" clId="{B606E7B2-EFF5-418A-8639-9F7537C4DA50}" dt="2022-05-26T16:08:06.735" v="11206"/>
+          <ac:picMkLst>
+            <pc:docMk/>
+            <pc:sldMk cId="488936307" sldId="277"/>
+            <ac:picMk id="26" creationId="{BF122641-D069-417B-A506-8C41CE923EC9}"/>
+          </ac:picMkLst>
+        </pc:picChg>
+        <pc:picChg chg="add del">
+          <ac:chgData name="Zhao Xiong" userId="5eba49e5-2895-4cd9-83e8-b3064fe76704" providerId="ADAL" clId="{B606E7B2-EFF5-418A-8639-9F7537C4DA50}" dt="2022-05-26T16:08:29.872" v="11208"/>
+          <ac:picMkLst>
+            <pc:docMk/>
+            <pc:sldMk cId="488936307" sldId="277"/>
+            <ac:picMk id="27" creationId="{CE5F0A65-3BEB-4145-B4C5-FA26D527E685}"/>
+          </ac:picMkLst>
+        </pc:picChg>
+        <pc:picChg chg="add mod">
+          <ac:chgData name="Zhao Xiong" userId="5eba49e5-2895-4cd9-83e8-b3064fe76704" providerId="ADAL" clId="{B606E7B2-EFF5-418A-8639-9F7537C4DA50}" dt="2022-05-26T16:08:51.393" v="11218" actId="1035"/>
+          <ac:picMkLst>
+            <pc:docMk/>
+            <pc:sldMk cId="488936307" sldId="277"/>
+            <ac:picMk id="28" creationId="{DB72361D-5797-440B-AD21-58E5A3F03CC9}"/>
           </ac:picMkLst>
         </pc:picChg>
         <pc:cxnChg chg="add mod">
@@ -8521,56 +8633,12 @@
           <a:chExt cx="0" cy="0"/>
         </a:xfrm>
       </p:grpSpPr>
-      <p:sp>
-        <p:nvSpPr>
-          <p:cNvPr id="4" name="TextBox 3">
-            <a:extLst>
-              <a:ext uri="{FF2B5EF4-FFF2-40B4-BE49-F238E27FC236}">
-                <a16:creationId xmlns:a16="http://schemas.microsoft.com/office/drawing/2014/main" id="{C91C1337-10B3-4EBA-AA88-A19AFA920006}"/>
-              </a:ext>
-            </a:extLst>
-          </p:cNvPr>
-          <p:cNvSpPr txBox="1"/>
-          <p:nvPr/>
-        </p:nvSpPr>
-        <p:spPr>
-          <a:xfrm>
-            <a:off x="0" y="0"/>
-            <a:ext cx="12192000" cy="646331"/>
-          </a:xfrm>
-          <a:prstGeom prst="rect">
-            <a:avLst/>
-          </a:prstGeom>
-          <a:noFill/>
-        </p:spPr>
-        <p:txBody>
-          <a:bodyPr wrap="square" rtlCol="0">
-            <a:spAutoFit/>
-          </a:bodyPr>
-          <a:lstStyle/>
-          <a:p>
-            <a:r>
-              <a:rPr lang="en-NZ" b="1" dirty="0"/>
-              <a:t>Combining the outputs of individual runs into one graph (Naïve approach: concatenate outputs of </a:t>
-            </a:r>
-            <a:r>
-              <a:rPr lang="en-NZ" b="1" dirty="0" err="1"/>
-              <a:t>cPCA</a:t>
-            </a:r>
-            <a:r>
-              <a:rPr lang="en-NZ" b="1" dirty="0"/>
-              <a:t> function, sum variable contributions)</a:t>
-            </a:r>
-            <a:endParaRPr lang="en-GB" b="1" dirty="0"/>
-          </a:p>
-        </p:txBody>
-      </p:sp>
       <p:pic>
         <p:nvPicPr>
-          <p:cNvPr id="7" name="Picture 6">
-            <a:extLst>
-              <a:ext uri="{FF2B5EF4-FFF2-40B4-BE49-F238E27FC236}">
-                <a16:creationId xmlns:a16="http://schemas.microsoft.com/office/drawing/2014/main" id="{2EB90CA0-7089-4B2A-817F-F2DFB002EC81}"/>
+          <p:cNvPr id="24" name="Picture 23">
+            <a:extLst>
+              <a:ext uri="{FF2B5EF4-FFF2-40B4-BE49-F238E27FC236}">
+                <a16:creationId xmlns:a16="http://schemas.microsoft.com/office/drawing/2014/main" id="{EAFA1202-2A37-4DA0-8C2E-45C1539E982F}"/>
               </a:ext>
             </a:extLst>
           </p:cNvPr>
@@ -8587,14 +8655,58 @@
         </p:blipFill>
         <p:spPr>
           <a:xfrm>
-            <a:off x="2462072" y="1742651"/>
-            <a:ext cx="1937440" cy="3546500"/>
+            <a:off x="9728505" y="3590564"/>
+            <a:ext cx="2074139" cy="3152832"/>
           </a:xfrm>
           <a:prstGeom prst="rect">
             <a:avLst/>
           </a:prstGeom>
         </p:spPr>
       </p:pic>
+      <p:sp>
+        <p:nvSpPr>
+          <p:cNvPr id="4" name="TextBox 3">
+            <a:extLst>
+              <a:ext uri="{FF2B5EF4-FFF2-40B4-BE49-F238E27FC236}">
+                <a16:creationId xmlns:a16="http://schemas.microsoft.com/office/drawing/2014/main" id="{C91C1337-10B3-4EBA-AA88-A19AFA920006}"/>
+              </a:ext>
+            </a:extLst>
+          </p:cNvPr>
+          <p:cNvSpPr txBox="1"/>
+          <p:nvPr/>
+        </p:nvSpPr>
+        <p:spPr>
+          <a:xfrm>
+            <a:off x="0" y="0"/>
+            <a:ext cx="12192000" cy="646331"/>
+          </a:xfrm>
+          <a:prstGeom prst="rect">
+            <a:avLst/>
+          </a:prstGeom>
+          <a:noFill/>
+        </p:spPr>
+        <p:txBody>
+          <a:bodyPr wrap="square" rtlCol="0">
+            <a:spAutoFit/>
+          </a:bodyPr>
+          <a:lstStyle/>
+          <a:p>
+            <a:r>
+              <a:rPr lang="en-NZ" b="1" dirty="0"/>
+              <a:t>Combining the outputs of individual runs into one graph (Naïve approach: concatenate outputs of </a:t>
+            </a:r>
+            <a:r>
+              <a:rPr lang="en-NZ" b="1" dirty="0" err="1"/>
+              <a:t>cPCA</a:t>
+            </a:r>
+            <a:r>
+              <a:rPr lang="en-NZ" b="1" dirty="0"/>
+              <a:t> function, sum variable contributions)</a:t>
+            </a:r>
+            <a:endParaRPr lang="en-GB" b="1" dirty="0"/>
+          </a:p>
+        </p:txBody>
+      </p:sp>
       <p:pic>
         <p:nvPicPr>
           <p:cNvPr id="5" name="Picture 4">
@@ -8772,36 +8884,6 @@
           </a:p>
         </p:txBody>
       </p:sp>
-      <p:pic>
-        <p:nvPicPr>
-          <p:cNvPr id="13" name="Picture 12">
-            <a:extLst>
-              <a:ext uri="{FF2B5EF4-FFF2-40B4-BE49-F238E27FC236}">
-                <a16:creationId xmlns:a16="http://schemas.microsoft.com/office/drawing/2014/main" id="{D4FDDA89-6DA2-4ADA-9587-48774A5F7526}"/>
-              </a:ext>
-            </a:extLst>
-          </p:cNvPr>
-          <p:cNvPicPr>
-            <a:picLocks noChangeAspect="1"/>
-          </p:cNvPicPr>
-          <p:nvPr/>
-        </p:nvPicPr>
-        <p:blipFill>
-          <a:blip r:embed="rId5"/>
-          <a:stretch>
-            <a:fillRect/>
-          </a:stretch>
-        </p:blipFill>
-        <p:spPr>
-          <a:xfrm>
-            <a:off x="4477467" y="1742651"/>
-            <a:ext cx="2136694" cy="3546500"/>
-          </a:xfrm>
-          <a:prstGeom prst="rect">
-            <a:avLst/>
-          </a:prstGeom>
-        </p:spPr>
-      </p:pic>
       <p:sp>
         <p:nvSpPr>
           <p:cNvPr id="14" name="TextBox 13">
@@ -8817,7 +8899,7 @@
         <p:spPr>
           <a:xfrm>
             <a:off x="4400320" y="5318977"/>
-            <a:ext cx="2290987" cy="369332"/>
+            <a:ext cx="2290987" cy="738664"/>
           </a:xfrm>
           <a:prstGeom prst="rect">
             <a:avLst/>
@@ -8842,42 +8924,16 @@
             <a:pPr algn="ctr"/>
             <a:r>
               <a:rPr lang="en-NZ" sz="1200" b="1" dirty="0"/>
-              <a:t>Fix Between Group A Bit</a:t>
+              <a:t>Fix Between Group </a:t>
+            </a:r>
+            <a:r>
+              <a:rPr lang="en-NZ" sz="1200" b="1"/>
+              <a:t>A Bit (sometimes makes it better, sometimes doesn’t)</a:t>
             </a:r>
             <a:endParaRPr lang="en-GB" sz="1200" b="1" dirty="0"/>
           </a:p>
         </p:txBody>
       </p:sp>
-      <p:pic>
-        <p:nvPicPr>
-          <p:cNvPr id="15" name="Picture 14">
-            <a:extLst>
-              <a:ext uri="{FF2B5EF4-FFF2-40B4-BE49-F238E27FC236}">
-                <a16:creationId xmlns:a16="http://schemas.microsoft.com/office/drawing/2014/main" id="{8F1FA3A5-C47D-424C-A455-CF43803145B8}"/>
-              </a:ext>
-            </a:extLst>
-          </p:cNvPr>
-          <p:cNvPicPr>
-            <a:picLocks noChangeAspect="1"/>
-          </p:cNvPicPr>
-          <p:nvPr/>
-        </p:nvPicPr>
-        <p:blipFill>
-          <a:blip r:embed="rId6"/>
-          <a:stretch>
-            <a:fillRect/>
-          </a:stretch>
-        </p:blipFill>
-        <p:spPr>
-          <a:xfrm>
-            <a:off x="6722595" y="1742651"/>
-            <a:ext cx="2301313" cy="3546500"/>
-          </a:xfrm>
-          <a:prstGeom prst="rect">
-            <a:avLst/>
-          </a:prstGeom>
-        </p:spPr>
-      </p:pic>
       <p:sp>
         <p:nvSpPr>
           <p:cNvPr id="16" name="TextBox 15">
@@ -9001,6 +9057,204 @@
           </a:fontRef>
         </p:style>
       </p:cxnSp>
+      <p:sp>
+        <p:nvSpPr>
+          <p:cNvPr id="18" name="TextBox 17">
+            <a:extLst>
+              <a:ext uri="{FF2B5EF4-FFF2-40B4-BE49-F238E27FC236}">
+                <a16:creationId xmlns:a16="http://schemas.microsoft.com/office/drawing/2014/main" id="{B4BB9277-2934-48A0-ADB8-CB80E7EEB020}"/>
+              </a:ext>
+            </a:extLst>
+          </p:cNvPr>
+          <p:cNvSpPr txBox="1"/>
+          <p:nvPr/>
+        </p:nvSpPr>
+        <p:spPr>
+          <a:xfrm>
+            <a:off x="9925608" y="3336564"/>
+            <a:ext cx="1880095" cy="184666"/>
+          </a:xfrm>
+          <a:prstGeom prst="rect">
+            <a:avLst/>
+          </a:prstGeom>
+          <a:solidFill>
+            <a:schemeClr val="bg1"/>
+          </a:solidFill>
+        </p:spPr>
+        <p:txBody>
+          <a:bodyPr wrap="square" lIns="0" tIns="0" rIns="0" bIns="0" rtlCol="0">
+            <a:spAutoFit/>
+          </a:bodyPr>
+          <a:lstStyle/>
+          <a:p>
+            <a:pPr algn="ctr"/>
+            <a:r>
+              <a:rPr lang="en-NZ" sz="1200" b="1" dirty="0"/>
+              <a:t>Merged 1-9000 (MST)</a:t>
+            </a:r>
+            <a:endParaRPr lang="en-GB" sz="1200" b="1" dirty="0"/>
+          </a:p>
+        </p:txBody>
+      </p:sp>
+      <p:sp>
+        <p:nvSpPr>
+          <p:cNvPr id="19" name="TextBox 18">
+            <a:extLst>
+              <a:ext uri="{FF2B5EF4-FFF2-40B4-BE49-F238E27FC236}">
+                <a16:creationId xmlns:a16="http://schemas.microsoft.com/office/drawing/2014/main" id="{D50DC477-A3B7-4E02-9EE6-B8F1DB23EE6E}"/>
+              </a:ext>
+            </a:extLst>
+          </p:cNvPr>
+          <p:cNvSpPr txBox="1"/>
+          <p:nvPr/>
+        </p:nvSpPr>
+        <p:spPr>
+          <a:xfrm>
+            <a:off x="9972154" y="6635233"/>
+            <a:ext cx="1880095" cy="184666"/>
+          </a:xfrm>
+          <a:prstGeom prst="rect">
+            <a:avLst/>
+          </a:prstGeom>
+          <a:solidFill>
+            <a:schemeClr val="bg1"/>
+          </a:solidFill>
+        </p:spPr>
+        <p:txBody>
+          <a:bodyPr wrap="square" lIns="0" tIns="0" rIns="0" bIns="0" rtlCol="0">
+            <a:spAutoFit/>
+          </a:bodyPr>
+          <a:lstStyle/>
+          <a:p>
+            <a:pPr algn="ctr"/>
+            <a:r>
+              <a:rPr lang="en-NZ" sz="1200" b="1" dirty="0"/>
+              <a:t>Merged 1-9000 (SPT)</a:t>
+            </a:r>
+            <a:endParaRPr lang="en-GB" sz="1200" b="1" dirty="0"/>
+          </a:p>
+        </p:txBody>
+      </p:sp>
+      <p:pic>
+        <p:nvPicPr>
+          <p:cNvPr id="12" name="Picture 11">
+            <a:extLst>
+              <a:ext uri="{FF2B5EF4-FFF2-40B4-BE49-F238E27FC236}">
+                <a16:creationId xmlns:a16="http://schemas.microsoft.com/office/drawing/2014/main" id="{894902A8-89A4-4902-BBC6-42A830FC254F}"/>
+              </a:ext>
+            </a:extLst>
+          </p:cNvPr>
+          <p:cNvPicPr>
+            <a:picLocks noChangeAspect="1"/>
+          </p:cNvPicPr>
+          <p:nvPr/>
+        </p:nvPicPr>
+        <p:blipFill>
+          <a:blip r:embed="rId5"/>
+          <a:stretch>
+            <a:fillRect/>
+          </a:stretch>
+        </p:blipFill>
+        <p:spPr>
+          <a:xfrm>
+            <a:off x="2433348" y="1536193"/>
+            <a:ext cx="1966164" cy="3752960"/>
+          </a:xfrm>
+          <a:prstGeom prst="rect">
+            <a:avLst/>
+          </a:prstGeom>
+        </p:spPr>
+      </p:pic>
+      <p:pic>
+        <p:nvPicPr>
+          <p:cNvPr id="17" name="Picture 16">
+            <a:extLst>
+              <a:ext uri="{FF2B5EF4-FFF2-40B4-BE49-F238E27FC236}">
+                <a16:creationId xmlns:a16="http://schemas.microsoft.com/office/drawing/2014/main" id="{6F50B5D9-25FB-48DD-8D1B-D4F060EC8C34}"/>
+              </a:ext>
+            </a:extLst>
+          </p:cNvPr>
+          <p:cNvPicPr>
+            <a:picLocks noChangeAspect="1"/>
+          </p:cNvPicPr>
+          <p:nvPr/>
+        </p:nvPicPr>
+        <p:blipFill>
+          <a:blip r:embed="rId6"/>
+          <a:stretch>
+            <a:fillRect/>
+          </a:stretch>
+        </p:blipFill>
+        <p:spPr>
+          <a:xfrm>
+            <a:off x="4507947" y="1536192"/>
+            <a:ext cx="2136694" cy="3752959"/>
+          </a:xfrm>
+          <a:prstGeom prst="rect">
+            <a:avLst/>
+          </a:prstGeom>
+        </p:spPr>
+      </p:pic>
+      <p:pic>
+        <p:nvPicPr>
+          <p:cNvPr id="20" name="Picture 19">
+            <a:extLst>
+              <a:ext uri="{FF2B5EF4-FFF2-40B4-BE49-F238E27FC236}">
+                <a16:creationId xmlns:a16="http://schemas.microsoft.com/office/drawing/2014/main" id="{69E98260-EFA0-48C7-979A-68512F008494}"/>
+              </a:ext>
+            </a:extLst>
+          </p:cNvPr>
+          <p:cNvPicPr>
+            <a:picLocks noChangeAspect="1"/>
+          </p:cNvPicPr>
+          <p:nvPr/>
+        </p:nvPicPr>
+        <p:blipFill>
+          <a:blip r:embed="rId7"/>
+          <a:stretch>
+            <a:fillRect/>
+          </a:stretch>
+        </p:blipFill>
+        <p:spPr>
+          <a:xfrm>
+            <a:off x="6753076" y="1536192"/>
+            <a:ext cx="2301314" cy="3752959"/>
+          </a:xfrm>
+          <a:prstGeom prst="rect">
+            <a:avLst/>
+          </a:prstGeom>
+        </p:spPr>
+      </p:pic>
+      <p:pic>
+        <p:nvPicPr>
+          <p:cNvPr id="28" name="Picture 27">
+            <a:extLst>
+              <a:ext uri="{FF2B5EF4-FFF2-40B4-BE49-F238E27FC236}">
+                <a16:creationId xmlns:a16="http://schemas.microsoft.com/office/drawing/2014/main" id="{DB72361D-5797-440B-AD21-58E5A3F03CC9}"/>
+              </a:ext>
+            </a:extLst>
+          </p:cNvPr>
+          <p:cNvPicPr>
+            <a:picLocks noChangeAspect="1"/>
+          </p:cNvPicPr>
+          <p:nvPr/>
+        </p:nvPicPr>
+        <p:blipFill>
+          <a:blip r:embed="rId8"/>
+          <a:stretch>
+            <a:fillRect/>
+          </a:stretch>
+        </p:blipFill>
+        <p:spPr>
+          <a:xfrm>
+            <a:off x="9728504" y="378390"/>
+            <a:ext cx="2074139" cy="2982276"/>
+          </a:xfrm>
+          <a:prstGeom prst="rect">
+            <a:avLst/>
+          </a:prstGeom>
+        </p:spPr>
+      </p:pic>
     </p:spTree>
     <p:extLst>
       <p:ext uri="{BB962C8B-B14F-4D97-AF65-F5344CB8AC3E}">

</xml_diff>

<commit_message>
add a little more info for ppt
</commit_message>
<xml_diff>
--- a/job_results.pptx
+++ b/job_results.pptx
@@ -194,7 +194,7 @@
   <pc:docChgLst>
     <pc:chgData name="Zhao Xiong" userId="5eba49e5-2895-4cd9-83e8-b3064fe76704" providerId="ADAL" clId="{B606E7B2-EFF5-418A-8639-9F7537C4DA50}"/>
     <pc:docChg chg="undo custSel addSld delSld modSld sldOrd">
-      <pc:chgData name="Zhao Xiong" userId="5eba49e5-2895-4cd9-83e8-b3064fe76704" providerId="ADAL" clId="{B606E7B2-EFF5-418A-8639-9F7537C4DA50}" dt="2022-05-26T17:34:07.486" v="11269"/>
+      <pc:chgData name="Zhao Xiong" userId="5eba49e5-2895-4cd9-83e8-b3064fe76704" providerId="ADAL" clId="{B606E7B2-EFF5-418A-8639-9F7537C4DA50}" dt="2022-05-26T17:45:05.965" v="11530" actId="403"/>
       <pc:docMkLst>
         <pc:docMk/>
       </pc:docMkLst>
@@ -1701,7 +1701,7 @@
         </pc:picChg>
       </pc:sldChg>
       <pc:sldChg chg="addSp delSp modSp add">
-        <pc:chgData name="Zhao Xiong" userId="5eba49e5-2895-4cd9-83e8-b3064fe76704" providerId="ADAL" clId="{B606E7B2-EFF5-418A-8639-9F7537C4DA50}" dt="2022-05-26T16:09:02.515" v="11265" actId="5793"/>
+        <pc:chgData name="Zhao Xiong" userId="5eba49e5-2895-4cd9-83e8-b3064fe76704" providerId="ADAL" clId="{B606E7B2-EFF5-418A-8639-9F7537C4DA50}" dt="2022-05-26T17:45:05.965" v="11530" actId="403"/>
         <pc:sldMkLst>
           <pc:docMk/>
           <pc:sldMk cId="488936307" sldId="277"/>
@@ -1784,6 +1784,14 @@
             <pc:docMk/>
             <pc:sldMk cId="488936307" sldId="277"/>
             <ac:spMk id="19" creationId="{D50DC477-A3B7-4E02-9EE6-B8F1DB23EE6E}"/>
+          </ac:spMkLst>
+        </pc:spChg>
+        <pc:spChg chg="add mod">
+          <ac:chgData name="Zhao Xiong" userId="5eba49e5-2895-4cd9-83e8-b3064fe76704" providerId="ADAL" clId="{B606E7B2-EFF5-418A-8639-9F7537C4DA50}" dt="2022-05-26T17:45:05.965" v="11530" actId="403"/>
+          <ac:spMkLst>
+            <pc:docMk/>
+            <pc:sldMk cId="488936307" sldId="277"/>
+            <ac:spMk id="23" creationId="{0284FBB9-D735-4E75-A921-A60AD18F3D20}"/>
           </ac:spMkLst>
         </pc:spChg>
         <pc:grpChg chg="add del mod">
@@ -8431,6 +8439,69 @@
           </a:prstGeom>
         </p:spPr>
       </p:pic>
+      <p:sp>
+        <p:nvSpPr>
+          <p:cNvPr id="23" name="TextBox 22">
+            <a:extLst>
+              <a:ext uri="{FF2B5EF4-FFF2-40B4-BE49-F238E27FC236}">
+                <a16:creationId xmlns:a16="http://schemas.microsoft.com/office/drawing/2014/main" id="{0284FBB9-D735-4E75-A921-A60AD18F3D20}"/>
+              </a:ext>
+            </a:extLst>
+          </p:cNvPr>
+          <p:cNvSpPr txBox="1"/>
+          <p:nvPr/>
+        </p:nvSpPr>
+        <p:spPr>
+          <a:xfrm>
+            <a:off x="4280250" y="6475653"/>
+            <a:ext cx="4849418" cy="338554"/>
+          </a:xfrm>
+          <a:prstGeom prst="rect">
+            <a:avLst/>
+          </a:prstGeom>
+          <a:solidFill>
+            <a:schemeClr val="bg1"/>
+          </a:solidFill>
+        </p:spPr>
+        <p:txBody>
+          <a:bodyPr wrap="square" lIns="0" tIns="0" rIns="0" bIns="0" rtlCol="0">
+            <a:spAutoFit/>
+          </a:bodyPr>
+          <a:lstStyle/>
+          <a:p>
+            <a:pPr algn="ctr"/>
+            <a:r>
+              <a:rPr lang="en-NZ" sz="1100" dirty="0">
+                <a:solidFill>
+                  <a:srgbClr val="FF0000"/>
+                </a:solidFill>
+              </a:rPr>
+              <a:t>Can further improve these by switching to SPT, filter </a:t>
+            </a:r>
+            <a:r>
+              <a:rPr lang="en-NZ" sz="1100" dirty="0" err="1">
+                <a:solidFill>
+                  <a:srgbClr val="FF0000"/>
+                </a:solidFill>
+              </a:rPr>
+              <a:t>cPC</a:t>
+            </a:r>
+            <a:r>
+              <a:rPr lang="en-NZ" sz="1100" dirty="0">
+                <a:solidFill>
+                  <a:srgbClr val="FF0000"/>
+                </a:solidFill>
+              </a:rPr>
+              <a:t> outliers, (filter out eigen vectors), defining more extreme target population</a:t>
+            </a:r>
+            <a:endParaRPr lang="en-GB" sz="1100" dirty="0">
+              <a:solidFill>
+                <a:srgbClr val="FF0000"/>
+              </a:solidFill>
+            </a:endParaRPr>
+          </a:p>
+        </p:txBody>
+      </p:sp>
     </p:spTree>
     <p:extLst>
       <p:ext uri="{BB962C8B-B14F-4D97-AF65-F5344CB8AC3E}">

</xml_diff>

<commit_message>
updated with 5 sub-runs, cPCA now working for 15k patients
</commit_message>
<xml_diff>
--- a/job_results.pptx
+++ b/job_results.pptx
@@ -194,7 +194,7 @@
   <pc:docChgLst>
     <pc:chgData name="Zhao Xiong" userId="5eba49e5-2895-4cd9-83e8-b3064fe76704" providerId="ADAL" clId="{B606E7B2-EFF5-418A-8639-9F7537C4DA50}"/>
     <pc:docChg chg="undo custSel addSld delSld modSld sldOrd">
-      <pc:chgData name="Zhao Xiong" userId="5eba49e5-2895-4cd9-83e8-b3064fe76704" providerId="ADAL" clId="{B606E7B2-EFF5-418A-8639-9F7537C4DA50}" dt="2022-05-26T18:34:45.061" v="11550"/>
+      <pc:chgData name="Zhao Xiong" userId="5eba49e5-2895-4cd9-83e8-b3064fe76704" providerId="ADAL" clId="{B606E7B2-EFF5-418A-8639-9F7537C4DA50}" dt="2022-05-26T19:07:48.036" v="11563" actId="20577"/>
       <pc:docMkLst>
         <pc:docMk/>
       </pc:docMkLst>
@@ -1701,7 +1701,7 @@
         </pc:picChg>
       </pc:sldChg>
       <pc:sldChg chg="addSp delSp modSp add">
-        <pc:chgData name="Zhao Xiong" userId="5eba49e5-2895-4cd9-83e8-b3064fe76704" providerId="ADAL" clId="{B606E7B2-EFF5-418A-8639-9F7537C4DA50}" dt="2022-05-26T18:29:32.292" v="11547"/>
+        <pc:chgData name="Zhao Xiong" userId="5eba49e5-2895-4cd9-83e8-b3064fe76704" providerId="ADAL" clId="{B606E7B2-EFF5-418A-8639-9F7537C4DA50}" dt="2022-05-26T19:07:48.036" v="11563" actId="20577"/>
         <pc:sldMkLst>
           <pc:docMk/>
           <pc:sldMk cId="488936307" sldId="277"/>
@@ -1794,6 +1794,14 @@
             <ac:spMk id="23" creationId="{0284FBB9-D735-4E75-A921-A60AD18F3D20}"/>
           </ac:spMkLst>
         </pc:spChg>
+        <pc:spChg chg="add mod">
+          <ac:chgData name="Zhao Xiong" userId="5eba49e5-2895-4cd9-83e8-b3064fe76704" providerId="ADAL" clId="{B606E7B2-EFF5-418A-8639-9F7537C4DA50}" dt="2022-05-26T19:07:48.036" v="11563" actId="20577"/>
+          <ac:spMkLst>
+            <pc:docMk/>
+            <pc:sldMk cId="488936307" sldId="277"/>
+            <ac:spMk id="24" creationId="{07D464BB-C1F6-4809-BC86-77FD8119B12D}"/>
+          </ac:spMkLst>
+        </pc:spChg>
         <pc:grpChg chg="add del mod">
           <ac:chgData name="Zhao Xiong" userId="5eba49e5-2895-4cd9-83e8-b3064fe76704" providerId="ADAL" clId="{B606E7B2-EFF5-418A-8639-9F7537C4DA50}" dt="2022-05-26T14:35:50.486" v="10935" actId="165"/>
           <ac:grpSpMkLst>
@@ -1840,6 +1848,14 @@
             <pc:docMk/>
             <pc:sldMk cId="488936307" sldId="277"/>
             <ac:picMk id="3" creationId="{3523A306-BA48-44C6-A0C2-CAAC4A915B58}"/>
+          </ac:picMkLst>
+        </pc:picChg>
+        <pc:picChg chg="add mod">
+          <ac:chgData name="Zhao Xiong" userId="5eba49e5-2895-4cd9-83e8-b3064fe76704" providerId="ADAL" clId="{B606E7B2-EFF5-418A-8639-9F7537C4DA50}" dt="2022-05-26T19:07:44.520" v="11561" actId="1076"/>
+          <ac:picMkLst>
+            <pc:docMk/>
+            <pc:sldMk cId="488936307" sldId="277"/>
+            <ac:picMk id="3" creationId="{4ED5EF45-248E-46CA-803A-BA5C9EECDD3B}"/>
           </ac:picMkLst>
         </pc:picChg>
         <pc:picChg chg="add mod topLvl">
@@ -8605,6 +8621,75 @@
           </a:prstGeom>
         </p:spPr>
       </p:pic>
+      <p:pic>
+        <p:nvPicPr>
+          <p:cNvPr id="3" name="Picture 2">
+            <a:extLst>
+              <a:ext uri="{FF2B5EF4-FFF2-40B4-BE49-F238E27FC236}">
+                <a16:creationId xmlns:a16="http://schemas.microsoft.com/office/drawing/2014/main" id="{4ED5EF45-248E-46CA-803A-BA5C9EECDD3B}"/>
+              </a:ext>
+            </a:extLst>
+          </p:cNvPr>
+          <p:cNvPicPr>
+            <a:picLocks noChangeAspect="1"/>
+          </p:cNvPicPr>
+          <p:nvPr/>
+        </p:nvPicPr>
+        <p:blipFill>
+          <a:blip r:embed="rId9"/>
+          <a:stretch>
+            <a:fillRect/>
+          </a:stretch>
+        </p:blipFill>
+        <p:spPr>
+          <a:xfrm>
+            <a:off x="11999747" y="1536192"/>
+            <a:ext cx="2098183" cy="3908837"/>
+          </a:xfrm>
+          <a:prstGeom prst="rect">
+            <a:avLst/>
+          </a:prstGeom>
+        </p:spPr>
+      </p:pic>
+      <p:sp>
+        <p:nvSpPr>
+          <p:cNvPr id="24" name="TextBox 23">
+            <a:extLst>
+              <a:ext uri="{FF2B5EF4-FFF2-40B4-BE49-F238E27FC236}">
+                <a16:creationId xmlns:a16="http://schemas.microsoft.com/office/drawing/2014/main" id="{07D464BB-C1F6-4809-BC86-77FD8119B12D}"/>
+              </a:ext>
+            </a:extLst>
+          </p:cNvPr>
+          <p:cNvSpPr txBox="1"/>
+          <p:nvPr/>
+        </p:nvSpPr>
+        <p:spPr>
+          <a:xfrm>
+            <a:off x="12138331" y="5445028"/>
+            <a:ext cx="1959600" cy="188535"/>
+          </a:xfrm>
+          <a:prstGeom prst="rect">
+            <a:avLst/>
+          </a:prstGeom>
+          <a:solidFill>
+            <a:schemeClr val="bg1"/>
+          </a:solidFill>
+        </p:spPr>
+        <p:txBody>
+          <a:bodyPr wrap="square" lIns="0" tIns="0" rIns="0" bIns="0" rtlCol="0">
+            <a:spAutoFit/>
+          </a:bodyPr>
+          <a:lstStyle/>
+          <a:p>
+            <a:pPr algn="ctr"/>
+            <a:r>
+              <a:rPr lang="en-NZ" sz="1200" b="1" dirty="0"/>
+              <a:t>Merged 1-15000 (MST)</a:t>
+            </a:r>
+            <a:endParaRPr lang="en-GB" sz="1200" b="1" dirty="0"/>
+          </a:p>
+        </p:txBody>
+      </p:sp>
     </p:spTree>
     <p:extLst>
       <p:ext uri="{BB962C8B-B14F-4D97-AF65-F5344CB8AC3E}">

</xml_diff>

<commit_message>
added some notes to ppt
</commit_message>
<xml_diff>
--- a/job_results.pptx
+++ b/job_results.pptx
@@ -5,7 +5,7 @@
     <p:sldMasterId id="2147483648" r:id="rId1"/>
   </p:sldMasterIdLst>
   <p:notesMasterIdLst>
-    <p:notesMasterId r:id="rId21"/>
+    <p:notesMasterId r:id="rId22"/>
   </p:notesMasterIdLst>
   <p:sldIdLst>
     <p:sldId id="256" r:id="rId2"/>
@@ -25,8 +25,9 @@
     <p:sldId id="269" r:id="rId16"/>
     <p:sldId id="277" r:id="rId17"/>
     <p:sldId id="274" r:id="rId18"/>
-    <p:sldId id="275" r:id="rId19"/>
-    <p:sldId id="263" r:id="rId20"/>
+    <p:sldId id="278" r:id="rId19"/>
+    <p:sldId id="275" r:id="rId20"/>
+    <p:sldId id="263" r:id="rId21"/>
   </p:sldIdLst>
   <p:sldSz cx="12192000" cy="6858000"/>
   <p:notesSz cx="6858000" cy="9144000"/>
@@ -194,7 +195,7 @@
   <pc:docChgLst>
     <pc:chgData name="Zhao Xiong" userId="5eba49e5-2895-4cd9-83e8-b3064fe76704" providerId="ADAL" clId="{B606E7B2-EFF5-418A-8639-9F7537C4DA50}"/>
     <pc:docChg chg="undo custSel addSld delSld modSld sldOrd">
-      <pc:chgData name="Zhao Xiong" userId="5eba49e5-2895-4cd9-83e8-b3064fe76704" providerId="ADAL" clId="{B606E7B2-EFF5-418A-8639-9F7537C4DA50}" dt="2022-05-26T19:07:48.036" v="11563" actId="20577"/>
+      <pc:chgData name="Zhao Xiong" userId="5eba49e5-2895-4cd9-83e8-b3064fe76704" providerId="ADAL" clId="{B606E7B2-EFF5-418A-8639-9F7537C4DA50}" dt="2022-05-27T13:07:27.125" v="12048" actId="20577"/>
       <pc:docMkLst>
         <pc:docMk/>
       </pc:docMkLst>
@@ -680,7 +681,7 @@
         </pc:picChg>
       </pc:sldChg>
       <pc:sldChg chg="addSp delSp modSp add ord">
-        <pc:chgData name="Zhao Xiong" userId="5eba49e5-2895-4cd9-83e8-b3064fe76704" providerId="ADAL" clId="{B606E7B2-EFF5-418A-8639-9F7537C4DA50}" dt="2022-05-26T18:34:45.061" v="11550"/>
+        <pc:chgData name="Zhao Xiong" userId="5eba49e5-2895-4cd9-83e8-b3064fe76704" providerId="ADAL" clId="{B606E7B2-EFF5-418A-8639-9F7537C4DA50}" dt="2022-05-27T13:07:27.125" v="12048" actId="20577"/>
         <pc:sldMkLst>
           <pc:docMk/>
           <pc:sldMk cId="3573502216" sldId="266"/>
@@ -742,11 +743,19 @@
           </ac:spMkLst>
         </pc:spChg>
         <pc:spChg chg="add mod">
-          <ac:chgData name="Zhao Xiong" userId="5eba49e5-2895-4cd9-83e8-b3064fe76704" providerId="ADAL" clId="{B606E7B2-EFF5-418A-8639-9F7537C4DA50}" dt="2022-05-16T16:42:49.097" v="2918" actId="1076"/>
+          <ac:chgData name="Zhao Xiong" userId="5eba49e5-2895-4cd9-83e8-b3064fe76704" providerId="ADAL" clId="{B606E7B2-EFF5-418A-8639-9F7537C4DA50}" dt="2022-05-27T13:07:06.743" v="11929" actId="14100"/>
           <ac:spMkLst>
             <pc:docMk/>
             <pc:sldMk cId="3573502216" sldId="266"/>
             <ac:spMk id="12" creationId="{E23BCCE6-D4B3-49A4-8702-D3E432463990}"/>
+          </ac:spMkLst>
+        </pc:spChg>
+        <pc:spChg chg="add mod">
+          <ac:chgData name="Zhao Xiong" userId="5eba49e5-2895-4cd9-83e8-b3064fe76704" providerId="ADAL" clId="{B606E7B2-EFF5-418A-8639-9F7537C4DA50}" dt="2022-05-27T13:07:27.125" v="12048" actId="20577"/>
+          <ac:spMkLst>
+            <pc:docMk/>
+            <pc:sldMk cId="3573502216" sldId="266"/>
+            <ac:spMk id="14" creationId="{23622833-5016-4415-AB81-0DFE075F55FA}"/>
           </ac:spMkLst>
         </pc:spChg>
         <pc:picChg chg="add mod modCrop">
@@ -854,7 +863,7 @@
           </ac:cxnSpMkLst>
         </pc:cxnChg>
         <pc:cxnChg chg="add mod">
-          <ac:chgData name="Zhao Xiong" userId="5eba49e5-2895-4cd9-83e8-b3064fe76704" providerId="ADAL" clId="{B606E7B2-EFF5-418A-8639-9F7537C4DA50}" dt="2022-05-16T16:42:49.097" v="2918" actId="1076"/>
+          <ac:chgData name="Zhao Xiong" userId="5eba49e5-2895-4cd9-83e8-b3064fe76704" providerId="ADAL" clId="{B606E7B2-EFF5-418A-8639-9F7537C4DA50}" dt="2022-05-27T13:07:06.743" v="11929" actId="14100"/>
           <ac:cxnSpMkLst>
             <pc:docMk/>
             <pc:sldMk cId="3573502216" sldId="266"/>
@@ -1407,12 +1416,60 @@
           </ac:picMkLst>
         </pc:picChg>
       </pc:sldChg>
-      <pc:sldChg chg="add ord">
-        <pc:chgData name="Zhao Xiong" userId="5eba49e5-2895-4cd9-83e8-b3064fe76704" providerId="ADAL" clId="{B606E7B2-EFF5-418A-8639-9F7537C4DA50}" dt="2022-05-26T18:33:47.849" v="11548"/>
+      <pc:sldChg chg="addSp delSp modSp add ord">
+        <pc:chgData name="Zhao Xiong" userId="5eba49e5-2895-4cd9-83e8-b3064fe76704" providerId="ADAL" clId="{B606E7B2-EFF5-418A-8639-9F7537C4DA50}" dt="2022-05-27T12:57:44.531" v="11928" actId="14100"/>
         <pc:sldMkLst>
           <pc:docMk/>
           <pc:sldMk cId="1647779813" sldId="274"/>
         </pc:sldMkLst>
+        <pc:spChg chg="add mod">
+          <ac:chgData name="Zhao Xiong" userId="5eba49e5-2895-4cd9-83e8-b3064fe76704" providerId="ADAL" clId="{B606E7B2-EFF5-418A-8639-9F7537C4DA50}" dt="2022-05-27T12:49:48.421" v="11920" actId="404"/>
+          <ac:spMkLst>
+            <pc:docMk/>
+            <pc:sldMk cId="1647779813" sldId="274"/>
+            <ac:spMk id="3" creationId="{055F6A25-0466-4CF1-BE20-5089E35ACC33}"/>
+          </ac:spMkLst>
+        </pc:spChg>
+        <pc:spChg chg="add mod">
+          <ac:chgData name="Zhao Xiong" userId="5eba49e5-2895-4cd9-83e8-b3064fe76704" providerId="ADAL" clId="{B606E7B2-EFF5-418A-8639-9F7537C4DA50}" dt="2022-05-27T12:43:22.898" v="11835" actId="14100"/>
+          <ac:spMkLst>
+            <pc:docMk/>
+            <pc:sldMk cId="1647779813" sldId="274"/>
+            <ac:spMk id="6" creationId="{7AD60870-9A30-4876-9016-B43131D17153}"/>
+          </ac:spMkLst>
+        </pc:spChg>
+        <pc:spChg chg="add mod">
+          <ac:chgData name="Zhao Xiong" userId="5eba49e5-2895-4cd9-83e8-b3064fe76704" providerId="ADAL" clId="{B606E7B2-EFF5-418A-8639-9F7537C4DA50}" dt="2022-05-27T12:57:40.851" v="11927" actId="1076"/>
+          <ac:spMkLst>
+            <pc:docMk/>
+            <pc:sldMk cId="1647779813" sldId="274"/>
+            <ac:spMk id="7" creationId="{943C1D6E-80E5-4EDB-90EE-5E3BFA16D938}"/>
+          </ac:spMkLst>
+        </pc:spChg>
+        <pc:picChg chg="add del mod modCrop">
+          <ac:chgData name="Zhao Xiong" userId="5eba49e5-2895-4cd9-83e8-b3064fe76704" providerId="ADAL" clId="{B606E7B2-EFF5-418A-8639-9F7537C4DA50}" dt="2022-05-27T12:32:45.332" v="11781" actId="478"/>
+          <ac:picMkLst>
+            <pc:docMk/>
+            <pc:sldMk cId="1647779813" sldId="274"/>
+            <ac:picMk id="2" creationId="{43A20E14-3383-47DB-8F62-975C303DBAAF}"/>
+          </ac:picMkLst>
+        </pc:picChg>
+        <pc:picChg chg="add mod">
+          <ac:chgData name="Zhao Xiong" userId="5eba49e5-2895-4cd9-83e8-b3064fe76704" providerId="ADAL" clId="{B606E7B2-EFF5-418A-8639-9F7537C4DA50}" dt="2022-05-27T12:57:44.531" v="11928" actId="14100"/>
+          <ac:picMkLst>
+            <pc:docMk/>
+            <pc:sldMk cId="1647779813" sldId="274"/>
+            <ac:picMk id="4" creationId="{D9CC8378-BAA4-46C9-8B9D-41B8F1C051E5}"/>
+          </ac:picMkLst>
+        </pc:picChg>
+        <pc:picChg chg="add mod modCrop">
+          <ac:chgData name="Zhao Xiong" userId="5eba49e5-2895-4cd9-83e8-b3064fe76704" providerId="ADAL" clId="{B606E7B2-EFF5-418A-8639-9F7537C4DA50}" dt="2022-05-27T12:57:35.371" v="11926" actId="1076"/>
+          <ac:picMkLst>
+            <pc:docMk/>
+            <pc:sldMk cId="1647779813" sldId="274"/>
+            <ac:picMk id="5" creationId="{3C4DFD63-8CE2-430B-9460-FBB98166AB9A}"/>
+          </ac:picMkLst>
+        </pc:picChg>
       </pc:sldChg>
       <pc:sldChg chg="addSp delSp modSp add ord">
         <pc:chgData name="Zhao Xiong" userId="5eba49e5-2895-4cd9-83e8-b3064fe76704" providerId="ADAL" clId="{B606E7B2-EFF5-418A-8639-9F7537C4DA50}" dt="2022-05-26T17:33:37.293" v="11268"/>
@@ -1701,7 +1758,7 @@
         </pc:picChg>
       </pc:sldChg>
       <pc:sldChg chg="addSp delSp modSp add">
-        <pc:chgData name="Zhao Xiong" userId="5eba49e5-2895-4cd9-83e8-b3064fe76704" providerId="ADAL" clId="{B606E7B2-EFF5-418A-8639-9F7537C4DA50}" dt="2022-05-26T19:07:48.036" v="11563" actId="20577"/>
+        <pc:chgData name="Zhao Xiong" userId="5eba49e5-2895-4cd9-83e8-b3064fe76704" providerId="ADAL" clId="{B606E7B2-EFF5-418A-8639-9F7537C4DA50}" dt="2022-05-27T12:26:44.411" v="11690" actId="14100"/>
         <pc:sldMkLst>
           <pc:docMk/>
           <pc:sldMk cId="488936307" sldId="277"/>
@@ -1762,8 +1819,8 @@
             <ac:spMk id="14" creationId="{B8AD830E-14FC-44AB-B60B-3C47B3B54690}"/>
           </ac:spMkLst>
         </pc:spChg>
-        <pc:spChg chg="add mod">
-          <ac:chgData name="Zhao Xiong" userId="5eba49e5-2895-4cd9-83e8-b3064fe76704" providerId="ADAL" clId="{B606E7B2-EFF5-418A-8639-9F7537C4DA50}" dt="2022-05-26T14:37:42.294" v="11033" actId="1038"/>
+        <pc:spChg chg="add del mod">
+          <ac:chgData name="Zhao Xiong" userId="5eba49e5-2895-4cd9-83e8-b3064fe76704" providerId="ADAL" clId="{B606E7B2-EFF5-418A-8639-9F7537C4DA50}" dt="2022-05-27T12:26:02.352" v="11564" actId="478"/>
           <ac:spMkLst>
             <pc:docMk/>
             <pc:sldMk cId="488936307" sldId="277"/>
@@ -1771,7 +1828,7 @@
           </ac:spMkLst>
         </pc:spChg>
         <pc:spChg chg="add mod">
-          <ac:chgData name="Zhao Xiong" userId="5eba49e5-2895-4cd9-83e8-b3064fe76704" providerId="ADAL" clId="{B606E7B2-EFF5-418A-8639-9F7537C4DA50}" dt="2022-05-26T18:28:57.772" v="11534" actId="1036"/>
+          <ac:chgData name="Zhao Xiong" userId="5eba49e5-2895-4cd9-83e8-b3064fe76704" providerId="ADAL" clId="{B606E7B2-EFF5-418A-8639-9F7537C4DA50}" dt="2022-05-27T12:26:18.853" v="11638" actId="1038"/>
           <ac:spMkLst>
             <pc:docMk/>
             <pc:sldMk cId="488936307" sldId="277"/>
@@ -1779,7 +1836,7 @@
           </ac:spMkLst>
         </pc:spChg>
         <pc:spChg chg="add mod">
-          <ac:chgData name="Zhao Xiong" userId="5eba49e5-2895-4cd9-83e8-b3064fe76704" providerId="ADAL" clId="{B606E7B2-EFF5-418A-8639-9F7537C4DA50}" dt="2022-05-26T18:29:32.292" v="11547"/>
+          <ac:chgData name="Zhao Xiong" userId="5eba49e5-2895-4cd9-83e8-b3064fe76704" providerId="ADAL" clId="{B606E7B2-EFF5-418A-8639-9F7537C4DA50}" dt="2022-05-27T12:26:18.853" v="11638" actId="1038"/>
           <ac:spMkLst>
             <pc:docMk/>
             <pc:sldMk cId="488936307" sldId="277"/>
@@ -1787,7 +1844,7 @@
           </ac:spMkLst>
         </pc:spChg>
         <pc:spChg chg="add mod">
-          <ac:chgData name="Zhao Xiong" userId="5eba49e5-2895-4cd9-83e8-b3064fe76704" providerId="ADAL" clId="{B606E7B2-EFF5-418A-8639-9F7537C4DA50}" dt="2022-05-26T17:45:05.965" v="11530" actId="403"/>
+          <ac:chgData name="Zhao Xiong" userId="5eba49e5-2895-4cd9-83e8-b3064fe76704" providerId="ADAL" clId="{B606E7B2-EFF5-418A-8639-9F7537C4DA50}" dt="2022-05-27T12:26:20.670" v="11639" actId="14100"/>
           <ac:spMkLst>
             <pc:docMk/>
             <pc:sldMk cId="488936307" sldId="277"/>
@@ -1795,7 +1852,7 @@
           </ac:spMkLst>
         </pc:spChg>
         <pc:spChg chg="add mod">
-          <ac:chgData name="Zhao Xiong" userId="5eba49e5-2895-4cd9-83e8-b3064fe76704" providerId="ADAL" clId="{B606E7B2-EFF5-418A-8639-9F7537C4DA50}" dt="2022-05-26T19:07:48.036" v="11563" actId="20577"/>
+          <ac:chgData name="Zhao Xiong" userId="5eba49e5-2895-4cd9-83e8-b3064fe76704" providerId="ADAL" clId="{B606E7B2-EFF5-418A-8639-9F7537C4DA50}" dt="2022-05-27T12:26:42.508" v="11689" actId="1076"/>
           <ac:spMkLst>
             <pc:docMk/>
             <pc:sldMk cId="488936307" sldId="277"/>
@@ -1827,7 +1884,7 @@
           </ac:grpSpMkLst>
         </pc:grpChg>
         <pc:picChg chg="add mod">
-          <ac:chgData name="Zhao Xiong" userId="5eba49e5-2895-4cd9-83e8-b3064fe76704" providerId="ADAL" clId="{B606E7B2-EFF5-418A-8639-9F7537C4DA50}" dt="2022-05-26T18:29:25.689" v="11544" actId="14100"/>
+          <ac:chgData name="Zhao Xiong" userId="5eba49e5-2895-4cd9-83e8-b3064fe76704" providerId="ADAL" clId="{B606E7B2-EFF5-418A-8639-9F7537C4DA50}" dt="2022-05-27T12:26:18.853" v="11638" actId="1038"/>
           <ac:picMkLst>
             <pc:docMk/>
             <pc:sldMk cId="488936307" sldId="277"/>
@@ -1851,7 +1908,7 @@
           </ac:picMkLst>
         </pc:picChg>
         <pc:picChg chg="add mod">
-          <ac:chgData name="Zhao Xiong" userId="5eba49e5-2895-4cd9-83e8-b3064fe76704" providerId="ADAL" clId="{B606E7B2-EFF5-418A-8639-9F7537C4DA50}" dt="2022-05-26T19:07:44.520" v="11561" actId="1076"/>
+          <ac:chgData name="Zhao Xiong" userId="5eba49e5-2895-4cd9-83e8-b3064fe76704" providerId="ADAL" clId="{B606E7B2-EFF5-418A-8639-9F7537C4DA50}" dt="2022-05-27T12:26:44.411" v="11690" actId="14100"/>
           <ac:picMkLst>
             <pc:docMk/>
             <pc:sldMk cId="488936307" sldId="277"/>
@@ -1938,8 +1995,8 @@
             <ac:picMk id="17" creationId="{6F50B5D9-25FB-48DD-8D1B-D4F060EC8C34}"/>
           </ac:picMkLst>
         </pc:picChg>
-        <pc:picChg chg="add mod">
-          <ac:chgData name="Zhao Xiong" userId="5eba49e5-2895-4cd9-83e8-b3064fe76704" providerId="ADAL" clId="{B606E7B2-EFF5-418A-8639-9F7537C4DA50}" dt="2022-05-26T16:02:46.790" v="11158" actId="14100"/>
+        <pc:picChg chg="add del mod">
+          <ac:chgData name="Zhao Xiong" userId="5eba49e5-2895-4cd9-83e8-b3064fe76704" providerId="ADAL" clId="{B606E7B2-EFF5-418A-8639-9F7537C4DA50}" dt="2022-05-27T12:26:02.352" v="11564" actId="478"/>
           <ac:picMkLst>
             <pc:docMk/>
             <pc:sldMk cId="488936307" sldId="277"/>
@@ -1987,7 +2044,7 @@
           </ac:picMkLst>
         </pc:picChg>
         <pc:picChg chg="add mod modCrop">
-          <ac:chgData name="Zhao Xiong" userId="5eba49e5-2895-4cd9-83e8-b3064fe76704" providerId="ADAL" clId="{B606E7B2-EFF5-418A-8639-9F7537C4DA50}" dt="2022-05-26T18:29:02.918" v="11535" actId="732"/>
+          <ac:chgData name="Zhao Xiong" userId="5eba49e5-2895-4cd9-83e8-b3064fe76704" providerId="ADAL" clId="{B606E7B2-EFF5-418A-8639-9F7537C4DA50}" dt="2022-05-27T12:26:18.853" v="11638" actId="1038"/>
           <ac:picMkLst>
             <pc:docMk/>
             <pc:sldMk cId="488936307" sldId="277"/>
@@ -2003,13 +2060,20 @@
           </ac:cxnSpMkLst>
         </pc:cxnChg>
         <pc:cxnChg chg="add mod">
-          <ac:chgData name="Zhao Xiong" userId="5eba49e5-2895-4cd9-83e8-b3064fe76704" providerId="ADAL" clId="{B606E7B2-EFF5-418A-8639-9F7537C4DA50}" dt="2022-05-26T14:40:04.549" v="11057" actId="1035"/>
+          <ac:chgData name="Zhao Xiong" userId="5eba49e5-2895-4cd9-83e8-b3064fe76704" providerId="ADAL" clId="{B606E7B2-EFF5-418A-8639-9F7537C4DA50}" dt="2022-05-27T12:26:18.853" v="11638" actId="1038"/>
           <ac:cxnSpMkLst>
             <pc:docMk/>
             <pc:sldMk cId="488936307" sldId="277"/>
             <ac:cxnSpMk id="22" creationId="{44E0AFEA-D62E-48F0-A0E1-B9821750099A}"/>
           </ac:cxnSpMkLst>
         </pc:cxnChg>
+      </pc:sldChg>
+      <pc:sldChg chg="add">
+        <pc:chgData name="Zhao Xiong" userId="5eba49e5-2895-4cd9-83e8-b3064fe76704" providerId="ADAL" clId="{B606E7B2-EFF5-418A-8639-9F7537C4DA50}" dt="2022-05-27T12:26:52.743" v="11691"/>
+        <pc:sldMkLst>
+          <pc:docMk/>
+          <pc:sldMk cId="2614382736" sldId="278"/>
+        </pc:sldMkLst>
       </pc:sldChg>
     </pc:docChg>
   </pc:docChgLst>
@@ -2098,7 +2162,7 @@
           <a:p>
             <a:fld id="{3F756EDF-0C8E-4F27-B2A4-7BBF4F0FD9CE}" type="datetimeFigureOut">
               <a:rPr lang="en-GB" smtClean="0"/>
-              <a:t>26/05/2022</a:t>
+              <a:t>27/05/2022</a:t>
             </a:fld>
             <a:endParaRPr lang="en-GB"/>
           </a:p>
@@ -2515,7 +2579,7 @@
           <a:p>
             <a:fld id="{B1B6DC73-6F54-48A7-AC0A-0EE4EE00B05A}" type="datetimeFigureOut">
               <a:rPr lang="en-GB" smtClean="0"/>
-              <a:t>26/05/2022</a:t>
+              <a:t>27/05/2022</a:t>
             </a:fld>
             <a:endParaRPr lang="en-GB"/>
           </a:p>
@@ -2715,7 +2779,7 @@
           <a:p>
             <a:fld id="{B1B6DC73-6F54-48A7-AC0A-0EE4EE00B05A}" type="datetimeFigureOut">
               <a:rPr lang="en-GB" smtClean="0"/>
-              <a:t>26/05/2022</a:t>
+              <a:t>27/05/2022</a:t>
             </a:fld>
             <a:endParaRPr lang="en-GB"/>
           </a:p>
@@ -2925,7 +2989,7 @@
           <a:p>
             <a:fld id="{B1B6DC73-6F54-48A7-AC0A-0EE4EE00B05A}" type="datetimeFigureOut">
               <a:rPr lang="en-GB" smtClean="0"/>
-              <a:t>26/05/2022</a:t>
+              <a:t>27/05/2022</a:t>
             </a:fld>
             <a:endParaRPr lang="en-GB"/>
           </a:p>
@@ -3125,7 +3189,7 @@
           <a:p>
             <a:fld id="{B1B6DC73-6F54-48A7-AC0A-0EE4EE00B05A}" type="datetimeFigureOut">
               <a:rPr lang="en-GB" smtClean="0"/>
-              <a:t>26/05/2022</a:t>
+              <a:t>27/05/2022</a:t>
             </a:fld>
             <a:endParaRPr lang="en-GB"/>
           </a:p>
@@ -3401,7 +3465,7 @@
           <a:p>
             <a:fld id="{B1B6DC73-6F54-48A7-AC0A-0EE4EE00B05A}" type="datetimeFigureOut">
               <a:rPr lang="en-GB" smtClean="0"/>
-              <a:t>26/05/2022</a:t>
+              <a:t>27/05/2022</a:t>
             </a:fld>
             <a:endParaRPr lang="en-GB"/>
           </a:p>
@@ -3669,7 +3733,7 @@
           <a:p>
             <a:fld id="{B1B6DC73-6F54-48A7-AC0A-0EE4EE00B05A}" type="datetimeFigureOut">
               <a:rPr lang="en-GB" smtClean="0"/>
-              <a:t>26/05/2022</a:t>
+              <a:t>27/05/2022</a:t>
             </a:fld>
             <a:endParaRPr lang="en-GB"/>
           </a:p>
@@ -4084,7 +4148,7 @@
           <a:p>
             <a:fld id="{B1B6DC73-6F54-48A7-AC0A-0EE4EE00B05A}" type="datetimeFigureOut">
               <a:rPr lang="en-GB" smtClean="0"/>
-              <a:t>26/05/2022</a:t>
+              <a:t>27/05/2022</a:t>
             </a:fld>
             <a:endParaRPr lang="en-GB"/>
           </a:p>
@@ -4226,7 +4290,7 @@
           <a:p>
             <a:fld id="{B1B6DC73-6F54-48A7-AC0A-0EE4EE00B05A}" type="datetimeFigureOut">
               <a:rPr lang="en-GB" smtClean="0"/>
-              <a:t>26/05/2022</a:t>
+              <a:t>27/05/2022</a:t>
             </a:fld>
             <a:endParaRPr lang="en-GB"/>
           </a:p>
@@ -4339,7 +4403,7 @@
           <a:p>
             <a:fld id="{B1B6DC73-6F54-48A7-AC0A-0EE4EE00B05A}" type="datetimeFigureOut">
               <a:rPr lang="en-GB" smtClean="0"/>
-              <a:t>26/05/2022</a:t>
+              <a:t>27/05/2022</a:t>
             </a:fld>
             <a:endParaRPr lang="en-GB"/>
           </a:p>
@@ -4652,7 +4716,7 @@
           <a:p>
             <a:fld id="{B1B6DC73-6F54-48A7-AC0A-0EE4EE00B05A}" type="datetimeFigureOut">
               <a:rPr lang="en-GB" smtClean="0"/>
-              <a:t>26/05/2022</a:t>
+              <a:t>27/05/2022</a:t>
             </a:fld>
             <a:endParaRPr lang="en-GB"/>
           </a:p>
@@ -4941,7 +5005,7 @@
           <a:p>
             <a:fld id="{B1B6DC73-6F54-48A7-AC0A-0EE4EE00B05A}" type="datetimeFigureOut">
               <a:rPr lang="en-GB" smtClean="0"/>
-              <a:t>26/05/2022</a:t>
+              <a:t>27/05/2022</a:t>
             </a:fld>
             <a:endParaRPr lang="en-GB"/>
           </a:p>
@@ -5184,7 +5248,7 @@
           <a:p>
             <a:fld id="{B1B6DC73-6F54-48A7-AC0A-0EE4EE00B05A}" type="datetimeFigureOut">
               <a:rPr lang="en-GB" smtClean="0"/>
-              <a:t>26/05/2022</a:t>
+              <a:t>27/05/2022</a:t>
             </a:fld>
             <a:endParaRPr lang="en-GB"/>
           </a:p>
@@ -8208,45 +8272,6 @@
           </a:p>
         </p:txBody>
       </p:sp>
-      <p:sp>
-        <p:nvSpPr>
-          <p:cNvPr id="16" name="TextBox 15">
-            <a:extLst>
-              <a:ext uri="{FF2B5EF4-FFF2-40B4-BE49-F238E27FC236}">
-                <a16:creationId xmlns:a16="http://schemas.microsoft.com/office/drawing/2014/main" id="{BBEBB754-045A-42EE-AA9B-65D3ED829172}"/>
-              </a:ext>
-            </a:extLst>
-          </p:cNvPr>
-          <p:cNvSpPr txBox="1"/>
-          <p:nvPr/>
-        </p:nvSpPr>
-        <p:spPr>
-          <a:xfrm>
-            <a:off x="6722595" y="5318977"/>
-            <a:ext cx="2301313" cy="369332"/>
-          </a:xfrm>
-          <a:prstGeom prst="rect">
-            <a:avLst/>
-          </a:prstGeom>
-          <a:solidFill>
-            <a:schemeClr val="bg1"/>
-          </a:solidFill>
-        </p:spPr>
-        <p:txBody>
-          <a:bodyPr wrap="square" lIns="0" tIns="0" rIns="0" bIns="0" rtlCol="0">
-            <a:spAutoFit/>
-          </a:bodyPr>
-          <a:lstStyle/>
-          <a:p>
-            <a:pPr algn="ctr"/>
-            <a:r>
-              <a:rPr lang="en-NZ" sz="1200" b="1" dirty="0"/>
-              <a:t>Same as one of the left but using shortest path tree </a:t>
-            </a:r>
-            <a:endParaRPr lang="en-GB" sz="1200" b="1" dirty="0"/>
-          </a:p>
-        </p:txBody>
-      </p:sp>
       <p:cxnSp>
         <p:nvCxnSpPr>
           <p:cNvPr id="21" name="Straight Connector 20">
@@ -8304,7 +8329,7 @@
         </p:nvCxnSpPr>
         <p:spPr>
           <a:xfrm>
-            <a:off x="9251492" y="480060"/>
+            <a:off x="7206792" y="480060"/>
             <a:ext cx="0" cy="6355081"/>
           </a:xfrm>
           <a:prstGeom prst="line">
@@ -8345,7 +8370,7 @@
         </p:nvSpPr>
         <p:spPr>
           <a:xfrm>
-            <a:off x="9925608" y="3336564"/>
+            <a:off x="7880908" y="3336564"/>
             <a:ext cx="1880095" cy="184666"/>
           </a:xfrm>
           <a:prstGeom prst="rect">
@@ -8384,7 +8409,7 @@
         </p:nvSpPr>
         <p:spPr>
           <a:xfrm>
-            <a:off x="9972154" y="6635233"/>
+            <a:off x="7927454" y="6635233"/>
             <a:ext cx="1880095" cy="184666"/>
           </a:xfrm>
           <a:prstGeom prst="rect">
@@ -8471,10 +8496,10 @@
       </p:pic>
       <p:pic>
         <p:nvPicPr>
-          <p:cNvPr id="20" name="Picture 19">
-            <a:extLst>
-              <a:ext uri="{FF2B5EF4-FFF2-40B4-BE49-F238E27FC236}">
-                <a16:creationId xmlns:a16="http://schemas.microsoft.com/office/drawing/2014/main" id="{69E98260-EFA0-48C7-979A-68512F008494}"/>
+          <p:cNvPr id="28" name="Picture 27">
+            <a:extLst>
+              <a:ext uri="{FF2B5EF4-FFF2-40B4-BE49-F238E27FC236}">
+                <a16:creationId xmlns:a16="http://schemas.microsoft.com/office/drawing/2014/main" id="{DB72361D-5797-440B-AD21-58E5A3F03CC9}"/>
               </a:ext>
             </a:extLst>
           </p:cNvPr>
@@ -8483,44 +8508,14 @@
           </p:cNvPicPr>
           <p:nvPr/>
         </p:nvPicPr>
-        <p:blipFill>
+        <p:blipFill rotWithShape="1">
           <a:blip r:embed="rId6"/>
-          <a:stretch>
-            <a:fillRect/>
-          </a:stretch>
-        </p:blipFill>
-        <p:spPr>
-          <a:xfrm>
-            <a:off x="6753076" y="1536192"/>
-            <a:ext cx="2301314" cy="3752959"/>
-          </a:xfrm>
-          <a:prstGeom prst="rect">
-            <a:avLst/>
-          </a:prstGeom>
-        </p:spPr>
-      </p:pic>
-      <p:pic>
-        <p:nvPicPr>
-          <p:cNvPr id="28" name="Picture 27">
-            <a:extLst>
-              <a:ext uri="{FF2B5EF4-FFF2-40B4-BE49-F238E27FC236}">
-                <a16:creationId xmlns:a16="http://schemas.microsoft.com/office/drawing/2014/main" id="{DB72361D-5797-440B-AD21-58E5A3F03CC9}"/>
-              </a:ext>
-            </a:extLst>
-          </p:cNvPr>
-          <p:cNvPicPr>
-            <a:picLocks noChangeAspect="1"/>
-          </p:cNvPicPr>
-          <p:nvPr/>
-        </p:nvPicPr>
-        <p:blipFill rotWithShape="1">
-          <a:blip r:embed="rId7"/>
           <a:srcRect b="808"/>
           <a:stretch/>
         </p:blipFill>
         <p:spPr>
           <a:xfrm>
-            <a:off x="9728504" y="378390"/>
+            <a:off x="7683804" y="378390"/>
             <a:ext cx="2074139" cy="2958174"/>
           </a:xfrm>
           <a:prstGeom prst="rect">
@@ -8542,8 +8537,8 @@
         </p:nvSpPr>
         <p:spPr>
           <a:xfrm>
-            <a:off x="4280250" y="6475653"/>
-            <a:ext cx="4849418" cy="338554"/>
+            <a:off x="2606309" y="6456436"/>
+            <a:ext cx="4264793" cy="338554"/>
           </a:xfrm>
           <a:prstGeom prst="rect">
             <a:avLst/>
@@ -8565,7 +8560,7 @@
                   <a:srgbClr val="FF0000"/>
                 </a:solidFill>
               </a:rPr>
-              <a:t>Can further improve these by switching to SPT, filter </a:t>
+              <a:t>Can further improve these by tuning tree generation, filter </a:t>
             </a:r>
             <a:r>
               <a:rPr lang="en-NZ" sz="1100" dirty="0" err="1">
@@ -8597,6 +8592,36 @@
             <a:extLst>
               <a:ext uri="{FF2B5EF4-FFF2-40B4-BE49-F238E27FC236}">
                 <a16:creationId xmlns:a16="http://schemas.microsoft.com/office/drawing/2014/main" id="{9AAAA310-4DDF-402D-AFB9-45D7B92874A1}"/>
+              </a:ext>
+            </a:extLst>
+          </p:cNvPr>
+          <p:cNvPicPr>
+            <a:picLocks noChangeAspect="1"/>
+          </p:cNvPicPr>
+          <p:nvPr/>
+        </p:nvPicPr>
+        <p:blipFill>
+          <a:blip r:embed="rId7"/>
+          <a:stretch>
+            <a:fillRect/>
+          </a:stretch>
+        </p:blipFill>
+        <p:spPr>
+          <a:xfrm>
+            <a:off x="7713953" y="3594381"/>
+            <a:ext cx="2043990" cy="3031332"/>
+          </a:xfrm>
+          <a:prstGeom prst="rect">
+            <a:avLst/>
+          </a:prstGeom>
+        </p:spPr>
+      </p:pic>
+      <p:pic>
+        <p:nvPicPr>
+          <p:cNvPr id="3" name="Picture 2">
+            <a:extLst>
+              <a:ext uri="{FF2B5EF4-FFF2-40B4-BE49-F238E27FC236}">
+                <a16:creationId xmlns:a16="http://schemas.microsoft.com/office/drawing/2014/main" id="{4ED5EF45-248E-46CA-803A-BA5C9EECDD3B}"/>
               </a:ext>
             </a:extLst>
           </p:cNvPr>
@@ -8613,44 +8638,14 @@
         </p:blipFill>
         <p:spPr>
           <a:xfrm>
-            <a:off x="9758653" y="3594381"/>
-            <a:ext cx="2043990" cy="3031332"/>
+            <a:off x="9807549" y="1639962"/>
+            <a:ext cx="2226252" cy="3908837"/>
           </a:xfrm>
           <a:prstGeom prst="rect">
             <a:avLst/>
           </a:prstGeom>
         </p:spPr>
       </p:pic>
-      <p:pic>
-        <p:nvPicPr>
-          <p:cNvPr id="3" name="Picture 2">
-            <a:extLst>
-              <a:ext uri="{FF2B5EF4-FFF2-40B4-BE49-F238E27FC236}">
-                <a16:creationId xmlns:a16="http://schemas.microsoft.com/office/drawing/2014/main" id="{4ED5EF45-248E-46CA-803A-BA5C9EECDD3B}"/>
-              </a:ext>
-            </a:extLst>
-          </p:cNvPr>
-          <p:cNvPicPr>
-            <a:picLocks noChangeAspect="1"/>
-          </p:cNvPicPr>
-          <p:nvPr/>
-        </p:nvPicPr>
-        <p:blipFill>
-          <a:blip r:embed="rId9"/>
-          <a:stretch>
-            <a:fillRect/>
-          </a:stretch>
-        </p:blipFill>
-        <p:spPr>
-          <a:xfrm>
-            <a:off x="11999747" y="1536192"/>
-            <a:ext cx="2098183" cy="3908837"/>
-          </a:xfrm>
-          <a:prstGeom prst="rect">
-            <a:avLst/>
-          </a:prstGeom>
-        </p:spPr>
-      </p:pic>
       <p:sp>
         <p:nvSpPr>
           <p:cNvPr id="24" name="TextBox 23">
@@ -8665,7 +8660,7 @@
         </p:nvSpPr>
         <p:spPr>
           <a:xfrm>
-            <a:off x="12138331" y="5445028"/>
+            <a:off x="9946133" y="5548798"/>
             <a:ext cx="1959600" cy="188535"/>
           </a:xfrm>
           <a:prstGeom prst="rect">
@@ -8720,6 +8715,197 @@
           <a:chExt cx="0" cy="0"/>
         </a:xfrm>
       </p:grpSpPr>
+      <p:sp>
+        <p:nvSpPr>
+          <p:cNvPr id="3" name="TextBox 2">
+            <a:extLst>
+              <a:ext uri="{FF2B5EF4-FFF2-40B4-BE49-F238E27FC236}">
+                <a16:creationId xmlns:a16="http://schemas.microsoft.com/office/drawing/2014/main" id="{055F6A25-0466-4CF1-BE20-5089E35ACC33}"/>
+              </a:ext>
+            </a:extLst>
+          </p:cNvPr>
+          <p:cNvSpPr txBox="1"/>
+          <p:nvPr/>
+        </p:nvSpPr>
+        <p:spPr>
+          <a:xfrm>
+            <a:off x="0" y="0"/>
+            <a:ext cx="12192000" cy="461665"/>
+          </a:xfrm>
+          <a:prstGeom prst="rect">
+            <a:avLst/>
+          </a:prstGeom>
+          <a:noFill/>
+        </p:spPr>
+        <p:txBody>
+          <a:bodyPr wrap="square" rtlCol="0">
+            <a:spAutoFit/>
+          </a:bodyPr>
+          <a:lstStyle/>
+          <a:p>
+            <a:r>
+              <a:rPr lang="en-NZ" sz="2400" b="1" dirty="0"/>
+              <a:t>Trajectory plotting (basic plotting using </a:t>
+            </a:r>
+            <a:r>
+              <a:rPr lang="en-NZ" sz="2400" b="1" dirty="0" err="1"/>
+              <a:t>Matlab</a:t>
+            </a:r>
+            <a:r>
+              <a:rPr lang="en-NZ" sz="2400" b="1" dirty="0"/>
+              <a:t>)</a:t>
+            </a:r>
+            <a:endParaRPr lang="en-GB" sz="2400" b="1" dirty="0"/>
+          </a:p>
+        </p:txBody>
+      </p:sp>
+      <p:pic>
+        <p:nvPicPr>
+          <p:cNvPr id="4" name="Picture 3">
+            <a:extLst>
+              <a:ext uri="{FF2B5EF4-FFF2-40B4-BE49-F238E27FC236}">
+                <a16:creationId xmlns:a16="http://schemas.microsoft.com/office/drawing/2014/main" id="{D9CC8378-BAA4-46C9-8B9D-41B8F1C051E5}"/>
+              </a:ext>
+            </a:extLst>
+          </p:cNvPr>
+          <p:cNvPicPr>
+            <a:picLocks noChangeAspect="1"/>
+          </p:cNvPicPr>
+          <p:nvPr/>
+        </p:nvPicPr>
+        <p:blipFill>
+          <a:blip r:embed="rId2"/>
+          <a:stretch>
+            <a:fillRect/>
+          </a:stretch>
+        </p:blipFill>
+        <p:spPr>
+          <a:xfrm>
+            <a:off x="5081840" y="876300"/>
+            <a:ext cx="4543425" cy="5105400"/>
+          </a:xfrm>
+          <a:prstGeom prst="rect">
+            <a:avLst/>
+          </a:prstGeom>
+          <a:ln w="38100">
+            <a:solidFill>
+              <a:schemeClr val="tx1"/>
+            </a:solidFill>
+          </a:ln>
+        </p:spPr>
+      </p:pic>
+      <p:pic>
+        <p:nvPicPr>
+          <p:cNvPr id="5" name="Picture 4">
+            <a:extLst>
+              <a:ext uri="{FF2B5EF4-FFF2-40B4-BE49-F238E27FC236}">
+                <a16:creationId xmlns:a16="http://schemas.microsoft.com/office/drawing/2014/main" id="{3C4DFD63-8CE2-430B-9460-FBB98166AB9A}"/>
+              </a:ext>
+            </a:extLst>
+          </p:cNvPr>
+          <p:cNvPicPr>
+            <a:picLocks noChangeAspect="1"/>
+          </p:cNvPicPr>
+          <p:nvPr/>
+        </p:nvPicPr>
+        <p:blipFill rotWithShape="1">
+          <a:blip r:embed="rId3"/>
+          <a:srcRect l="3157" t="4988"/>
+          <a:stretch/>
+        </p:blipFill>
+        <p:spPr>
+          <a:xfrm>
+            <a:off x="295023" y="876300"/>
+            <a:ext cx="4543426" cy="5105400"/>
+          </a:xfrm>
+          <a:prstGeom prst="rect">
+            <a:avLst/>
+          </a:prstGeom>
+          <a:ln w="38100">
+            <a:solidFill>
+              <a:schemeClr val="tx1"/>
+            </a:solidFill>
+          </a:ln>
+        </p:spPr>
+      </p:pic>
+      <p:sp>
+        <p:nvSpPr>
+          <p:cNvPr id="6" name="TextBox 5">
+            <a:extLst>
+              <a:ext uri="{FF2B5EF4-FFF2-40B4-BE49-F238E27FC236}">
+                <a16:creationId xmlns:a16="http://schemas.microsoft.com/office/drawing/2014/main" id="{7AD60870-9A30-4876-9016-B43131D17153}"/>
+              </a:ext>
+            </a:extLst>
+          </p:cNvPr>
+          <p:cNvSpPr txBox="1"/>
+          <p:nvPr/>
+        </p:nvSpPr>
+        <p:spPr>
+          <a:xfrm>
+            <a:off x="1171071" y="6058187"/>
+            <a:ext cx="2791330" cy="307777"/>
+          </a:xfrm>
+          <a:prstGeom prst="rect">
+            <a:avLst/>
+          </a:prstGeom>
+          <a:solidFill>
+            <a:schemeClr val="bg1"/>
+          </a:solidFill>
+        </p:spPr>
+        <p:txBody>
+          <a:bodyPr wrap="square" lIns="0" tIns="0" rIns="0" bIns="0" rtlCol="0">
+            <a:spAutoFit/>
+          </a:bodyPr>
+          <a:lstStyle/>
+          <a:p>
+            <a:pPr algn="ctr"/>
+            <a:r>
+              <a:rPr lang="en-NZ" sz="2000" b="1" dirty="0"/>
+              <a:t>3000 Patients (10%)</a:t>
+            </a:r>
+            <a:endParaRPr lang="en-GB" sz="2000" b="1" dirty="0"/>
+          </a:p>
+        </p:txBody>
+      </p:sp>
+      <p:sp>
+        <p:nvSpPr>
+          <p:cNvPr id="7" name="TextBox 6">
+            <a:extLst>
+              <a:ext uri="{FF2B5EF4-FFF2-40B4-BE49-F238E27FC236}">
+                <a16:creationId xmlns:a16="http://schemas.microsoft.com/office/drawing/2014/main" id="{943C1D6E-80E5-4EDB-90EE-5E3BFA16D938}"/>
+              </a:ext>
+            </a:extLst>
+          </p:cNvPr>
+          <p:cNvSpPr txBox="1"/>
+          <p:nvPr/>
+        </p:nvSpPr>
+        <p:spPr>
+          <a:xfrm>
+            <a:off x="6062161" y="6058187"/>
+            <a:ext cx="2582782" cy="307777"/>
+          </a:xfrm>
+          <a:prstGeom prst="rect">
+            <a:avLst/>
+          </a:prstGeom>
+          <a:solidFill>
+            <a:schemeClr val="bg1"/>
+          </a:solidFill>
+        </p:spPr>
+        <p:txBody>
+          <a:bodyPr wrap="square" lIns="0" tIns="0" rIns="0" bIns="0" rtlCol="0">
+            <a:spAutoFit/>
+          </a:bodyPr>
+          <a:lstStyle/>
+          <a:p>
+            <a:pPr algn="ctr"/>
+            <a:r>
+              <a:rPr lang="en-NZ" sz="2000" b="1" dirty="0"/>
+              <a:t>15000 Patients (50%)</a:t>
+            </a:r>
+            <a:endParaRPr lang="en-GB" sz="2000" b="1" dirty="0"/>
+          </a:p>
+        </p:txBody>
+      </p:sp>
     </p:spTree>
     <p:extLst>
       <p:ext uri="{BB962C8B-B14F-4D97-AF65-F5344CB8AC3E}">
@@ -8750,326 +8936,10 @@
           <a:chExt cx="0" cy="0"/>
         </a:xfrm>
       </p:grpSpPr>
-      <p:sp>
-        <p:nvSpPr>
-          <p:cNvPr id="4" name="TextBox 3">
-            <a:extLst>
-              <a:ext uri="{FF2B5EF4-FFF2-40B4-BE49-F238E27FC236}">
-                <a16:creationId xmlns:a16="http://schemas.microsoft.com/office/drawing/2014/main" id="{327B066D-B21D-4911-AF52-D1403D359AAD}"/>
-              </a:ext>
-            </a:extLst>
-          </p:cNvPr>
-          <p:cNvSpPr txBox="1"/>
-          <p:nvPr/>
-        </p:nvSpPr>
-        <p:spPr>
-          <a:xfrm>
-            <a:off x="0" y="0"/>
-            <a:ext cx="12191999" cy="523220"/>
-          </a:xfrm>
-          <a:prstGeom prst="rect">
-            <a:avLst/>
-          </a:prstGeom>
-          <a:noFill/>
-        </p:spPr>
-        <p:txBody>
-          <a:bodyPr wrap="square" rtlCol="0">
-            <a:spAutoFit/>
-          </a:bodyPr>
-          <a:lstStyle/>
-          <a:p>
-            <a:r>
-              <a:rPr lang="en-NZ" sz="2800" b="1" dirty="0"/>
-              <a:t>Testing subset 1:2800 vs 2:2802</a:t>
-            </a:r>
-            <a:endParaRPr lang="en-GB" sz="2800" b="1" dirty="0"/>
-          </a:p>
-        </p:txBody>
-      </p:sp>
-      <p:pic>
-        <p:nvPicPr>
-          <p:cNvPr id="2" name="Picture 1">
-            <a:extLst>
-              <a:ext uri="{FF2B5EF4-FFF2-40B4-BE49-F238E27FC236}">
-                <a16:creationId xmlns:a16="http://schemas.microsoft.com/office/drawing/2014/main" id="{7AF2B0FD-0BF1-43E4-ADCE-ED04868FD930}"/>
-              </a:ext>
-            </a:extLst>
-          </p:cNvPr>
-          <p:cNvPicPr>
-            <a:picLocks noChangeAspect="1"/>
-          </p:cNvPicPr>
-          <p:nvPr/>
-        </p:nvPicPr>
-        <p:blipFill rotWithShape="1">
-          <a:blip r:embed="rId2"/>
-          <a:srcRect t="4957" r="28177"/>
-          <a:stretch/>
-        </p:blipFill>
-        <p:spPr>
-          <a:xfrm>
-            <a:off x="156629" y="897830"/>
-            <a:ext cx="2605952" cy="4171604"/>
-          </a:xfrm>
-          <a:prstGeom prst="rect">
-            <a:avLst/>
-          </a:prstGeom>
-        </p:spPr>
-      </p:pic>
-      <p:pic>
-        <p:nvPicPr>
-          <p:cNvPr id="3" name="Picture 2">
-            <a:extLst>
-              <a:ext uri="{FF2B5EF4-FFF2-40B4-BE49-F238E27FC236}">
-                <a16:creationId xmlns:a16="http://schemas.microsoft.com/office/drawing/2014/main" id="{3028EAD8-2EEB-4838-8CA3-5DD5FAC0D37B}"/>
-              </a:ext>
-            </a:extLst>
-          </p:cNvPr>
-          <p:cNvPicPr>
-            <a:picLocks noChangeAspect="1"/>
-          </p:cNvPicPr>
-          <p:nvPr/>
-        </p:nvPicPr>
-        <p:blipFill rotWithShape="1">
-          <a:blip r:embed="rId3"/>
-          <a:srcRect t="4540" r="27009"/>
-          <a:stretch/>
-        </p:blipFill>
-        <p:spPr>
-          <a:xfrm>
-            <a:off x="2930830" y="897830"/>
-            <a:ext cx="2602184" cy="4156974"/>
-          </a:xfrm>
-          <a:prstGeom prst="rect">
-            <a:avLst/>
-          </a:prstGeom>
-        </p:spPr>
-      </p:pic>
-      <p:sp>
-        <p:nvSpPr>
-          <p:cNvPr id="5" name="TextBox 4">
-            <a:extLst>
-              <a:ext uri="{FF2B5EF4-FFF2-40B4-BE49-F238E27FC236}">
-                <a16:creationId xmlns:a16="http://schemas.microsoft.com/office/drawing/2014/main" id="{6F4D977B-615E-41A0-9D4F-CD40BC4ECCA4}"/>
-              </a:ext>
-            </a:extLst>
-          </p:cNvPr>
-          <p:cNvSpPr txBox="1"/>
-          <p:nvPr/>
-        </p:nvSpPr>
-        <p:spPr>
-          <a:xfrm>
-            <a:off x="156629" y="5094656"/>
-            <a:ext cx="2605952" cy="369332"/>
-          </a:xfrm>
-          <a:prstGeom prst="rect">
-            <a:avLst/>
-          </a:prstGeom>
-          <a:noFill/>
-        </p:spPr>
-        <p:txBody>
-          <a:bodyPr wrap="square" lIns="0" tIns="0" rIns="0" bIns="0" rtlCol="0">
-            <a:spAutoFit/>
-          </a:bodyPr>
-          <a:lstStyle/>
-          <a:p>
-            <a:pPr algn="ctr"/>
-            <a:r>
-              <a:rPr lang="en-NZ" sz="1200" b="1" dirty="0"/>
-              <a:t>Rows 1:2800</a:t>
-            </a:r>
-          </a:p>
-          <a:p>
-            <a:pPr algn="ctr"/>
-            <a:r>
-              <a:rPr lang="en-NZ" sz="1200" b="1" dirty="0"/>
-              <a:t>466 Variables Above Threshold</a:t>
-            </a:r>
-          </a:p>
-        </p:txBody>
-      </p:sp>
-      <p:sp>
-        <p:nvSpPr>
-          <p:cNvPr id="10" name="TextBox 9">
-            <a:extLst>
-              <a:ext uri="{FF2B5EF4-FFF2-40B4-BE49-F238E27FC236}">
-                <a16:creationId xmlns:a16="http://schemas.microsoft.com/office/drawing/2014/main" id="{A29BC89C-7380-4DAC-B053-8BC2AC9B7D18}"/>
-              </a:ext>
-            </a:extLst>
-          </p:cNvPr>
-          <p:cNvSpPr txBox="1"/>
-          <p:nvPr/>
-        </p:nvSpPr>
-        <p:spPr>
-          <a:xfrm>
-            <a:off x="2930830" y="5080026"/>
-            <a:ext cx="2605952" cy="369332"/>
-          </a:xfrm>
-          <a:prstGeom prst="rect">
-            <a:avLst/>
-          </a:prstGeom>
-          <a:noFill/>
-        </p:spPr>
-        <p:txBody>
-          <a:bodyPr wrap="square" lIns="0" tIns="0" rIns="0" bIns="0" rtlCol="0">
-            <a:spAutoFit/>
-          </a:bodyPr>
-          <a:lstStyle/>
-          <a:p>
-            <a:pPr algn="ctr"/>
-            <a:r>
-              <a:rPr lang="en-NZ" sz="1200" b="1" dirty="0"/>
-              <a:t>Rows 2:2801</a:t>
-            </a:r>
-          </a:p>
-          <a:p>
-            <a:pPr algn="ctr"/>
-            <a:r>
-              <a:rPr lang="en-NZ" sz="1200" b="1" dirty="0"/>
-              <a:t>464 Variables Above Threshold</a:t>
-            </a:r>
-          </a:p>
-        </p:txBody>
-      </p:sp>
-      <p:pic>
-        <p:nvPicPr>
-          <p:cNvPr id="11" name="Picture 10">
-            <a:extLst>
-              <a:ext uri="{FF2B5EF4-FFF2-40B4-BE49-F238E27FC236}">
-                <a16:creationId xmlns:a16="http://schemas.microsoft.com/office/drawing/2014/main" id="{683F6D36-64CE-4660-A2EB-E0C24B880E3A}"/>
-              </a:ext>
-            </a:extLst>
-          </p:cNvPr>
-          <p:cNvPicPr>
-            <a:picLocks noChangeAspect="1"/>
-          </p:cNvPicPr>
-          <p:nvPr/>
-        </p:nvPicPr>
-        <p:blipFill>
-          <a:blip r:embed="rId4"/>
-          <a:stretch>
-            <a:fillRect/>
-          </a:stretch>
-        </p:blipFill>
-        <p:spPr>
-          <a:xfrm>
-            <a:off x="5779352" y="897831"/>
-            <a:ext cx="2577164" cy="4156974"/>
-          </a:xfrm>
-          <a:prstGeom prst="rect">
-            <a:avLst/>
-          </a:prstGeom>
-        </p:spPr>
-      </p:pic>
-      <p:sp>
-        <p:nvSpPr>
-          <p:cNvPr id="12" name="TextBox 11">
-            <a:extLst>
-              <a:ext uri="{FF2B5EF4-FFF2-40B4-BE49-F238E27FC236}">
-                <a16:creationId xmlns:a16="http://schemas.microsoft.com/office/drawing/2014/main" id="{C331A33F-BB94-4D46-BABC-48A3FE8AC753}"/>
-              </a:ext>
-            </a:extLst>
-          </p:cNvPr>
-          <p:cNvSpPr txBox="1"/>
-          <p:nvPr/>
-        </p:nvSpPr>
-        <p:spPr>
-          <a:xfrm>
-            <a:off x="5779352" y="5054804"/>
-            <a:ext cx="2562770" cy="369332"/>
-          </a:xfrm>
-          <a:prstGeom prst="rect">
-            <a:avLst/>
-          </a:prstGeom>
-          <a:noFill/>
-        </p:spPr>
-        <p:txBody>
-          <a:bodyPr wrap="square" lIns="0" tIns="0" rIns="0" bIns="0" rtlCol="0">
-            <a:spAutoFit/>
-          </a:bodyPr>
-          <a:lstStyle/>
-          <a:p>
-            <a:pPr algn="ctr"/>
-            <a:r>
-              <a:rPr lang="en-NZ" sz="1200" b="1"/>
-              <a:t>Rows 3:2802</a:t>
-            </a:r>
-            <a:endParaRPr lang="en-NZ" sz="1200" b="1" dirty="0"/>
-          </a:p>
-          <a:p>
-            <a:pPr algn="ctr"/>
-            <a:r>
-              <a:rPr lang="en-NZ" sz="1200" b="1" dirty="0"/>
-              <a:t>464 Variables Above Threshold</a:t>
-            </a:r>
-          </a:p>
-        </p:txBody>
-      </p:sp>
-      <p:sp>
-        <p:nvSpPr>
-          <p:cNvPr id="13" name="TextBox 12">
-            <a:extLst>
-              <a:ext uri="{FF2B5EF4-FFF2-40B4-BE49-F238E27FC236}">
-                <a16:creationId xmlns:a16="http://schemas.microsoft.com/office/drawing/2014/main" id="{F5B0AF2A-C591-40C9-AB95-DC636B67E369}"/>
-              </a:ext>
-            </a:extLst>
-          </p:cNvPr>
-          <p:cNvSpPr txBox="1"/>
-          <p:nvPr/>
-        </p:nvSpPr>
-        <p:spPr>
-          <a:xfrm>
-            <a:off x="6307521" y="5960169"/>
-            <a:ext cx="4849418" cy="553998"/>
-          </a:xfrm>
-          <a:prstGeom prst="rect">
-            <a:avLst/>
-          </a:prstGeom>
-          <a:solidFill>
-            <a:schemeClr val="bg1"/>
-          </a:solidFill>
-        </p:spPr>
-        <p:txBody>
-          <a:bodyPr wrap="square" lIns="0" tIns="0" rIns="0" bIns="0" rtlCol="0">
-            <a:spAutoFit/>
-          </a:bodyPr>
-          <a:lstStyle/>
-          <a:p>
-            <a:r>
-              <a:rPr lang="en-NZ" sz="1200" dirty="0">
-                <a:solidFill>
-                  <a:srgbClr val="FF0000"/>
-                </a:solidFill>
-              </a:rPr>
-              <a:t>Even when we just have 1 patient different, the variables outputted by </a:t>
-            </a:r>
-            <a:r>
-              <a:rPr lang="en-NZ" sz="1200" dirty="0" err="1">
-                <a:solidFill>
-                  <a:srgbClr val="FF0000"/>
-                </a:solidFill>
-              </a:rPr>
-              <a:t>cPCA</a:t>
-            </a:r>
-            <a:r>
-              <a:rPr lang="en-NZ" sz="1200" dirty="0">
-                <a:solidFill>
-                  <a:srgbClr val="FF0000"/>
-                </a:solidFill>
-              </a:rPr>
-              <a:t> can change pretty significantly, refer to excel spreadsheet for comparison of individual variables sorted by their weighting</a:t>
-            </a:r>
-            <a:endParaRPr lang="en-GB" sz="1200" dirty="0">
-              <a:solidFill>
-                <a:srgbClr val="FF0000"/>
-              </a:solidFill>
-            </a:endParaRPr>
-          </a:p>
-        </p:txBody>
-      </p:sp>
     </p:spTree>
     <p:extLst>
       <p:ext uri="{BB962C8B-B14F-4D97-AF65-F5344CB8AC3E}">
-        <p14:creationId xmlns:p14="http://schemas.microsoft.com/office/powerpoint/2010/main" val="842150243"/>
+        <p14:creationId xmlns:p14="http://schemas.microsoft.com/office/powerpoint/2010/main" val="2614382736"/>
       </p:ext>
     </p:extLst>
   </p:cSld>
@@ -9096,12 +8966,48 @@
           <a:chExt cx="0" cy="0"/>
         </a:xfrm>
       </p:grpSpPr>
+      <p:sp>
+        <p:nvSpPr>
+          <p:cNvPr id="4" name="TextBox 3">
+            <a:extLst>
+              <a:ext uri="{FF2B5EF4-FFF2-40B4-BE49-F238E27FC236}">
+                <a16:creationId xmlns:a16="http://schemas.microsoft.com/office/drawing/2014/main" id="{327B066D-B21D-4911-AF52-D1403D359AAD}"/>
+              </a:ext>
+            </a:extLst>
+          </p:cNvPr>
+          <p:cNvSpPr txBox="1"/>
+          <p:nvPr/>
+        </p:nvSpPr>
+        <p:spPr>
+          <a:xfrm>
+            <a:off x="0" y="0"/>
+            <a:ext cx="12191999" cy="523220"/>
+          </a:xfrm>
+          <a:prstGeom prst="rect">
+            <a:avLst/>
+          </a:prstGeom>
+          <a:noFill/>
+        </p:spPr>
+        <p:txBody>
+          <a:bodyPr wrap="square" rtlCol="0">
+            <a:spAutoFit/>
+          </a:bodyPr>
+          <a:lstStyle/>
+          <a:p>
+            <a:r>
+              <a:rPr lang="en-NZ" sz="2800" b="1" dirty="0"/>
+              <a:t>Testing subset 1:2800 vs 2:2802</a:t>
+            </a:r>
+            <a:endParaRPr lang="en-GB" sz="2800" b="1" dirty="0"/>
+          </a:p>
+        </p:txBody>
+      </p:sp>
       <p:pic>
         <p:nvPicPr>
-          <p:cNvPr id="5" name="Picture 4">
-            <a:extLst>
-              <a:ext uri="{FF2B5EF4-FFF2-40B4-BE49-F238E27FC236}">
-                <a16:creationId xmlns:a16="http://schemas.microsoft.com/office/drawing/2014/main" id="{A2D96899-916E-4667-967A-53C75DE0B124}"/>
+          <p:cNvPr id="2" name="Picture 1">
+            <a:extLst>
+              <a:ext uri="{FF2B5EF4-FFF2-40B4-BE49-F238E27FC236}">
+                <a16:creationId xmlns:a16="http://schemas.microsoft.com/office/drawing/2014/main" id="{7AF2B0FD-0BF1-43E4-ADCE-ED04868FD930}"/>
               </a:ext>
             </a:extLst>
           </p:cNvPr>
@@ -9110,22 +9016,160 @@
           </p:cNvPicPr>
           <p:nvPr/>
         </p:nvPicPr>
+        <p:blipFill rotWithShape="1">
+          <a:blip r:embed="rId2"/>
+          <a:srcRect t="4957" r="28177"/>
+          <a:stretch/>
+        </p:blipFill>
+        <p:spPr>
+          <a:xfrm>
+            <a:off x="156629" y="897830"/>
+            <a:ext cx="2605952" cy="4171604"/>
+          </a:xfrm>
+          <a:prstGeom prst="rect">
+            <a:avLst/>
+          </a:prstGeom>
+        </p:spPr>
+      </p:pic>
+      <p:pic>
+        <p:nvPicPr>
+          <p:cNvPr id="3" name="Picture 2">
+            <a:extLst>
+              <a:ext uri="{FF2B5EF4-FFF2-40B4-BE49-F238E27FC236}">
+                <a16:creationId xmlns:a16="http://schemas.microsoft.com/office/drawing/2014/main" id="{3028EAD8-2EEB-4838-8CA3-5DD5FAC0D37B}"/>
+              </a:ext>
+            </a:extLst>
+          </p:cNvPr>
+          <p:cNvPicPr>
+            <a:picLocks noChangeAspect="1"/>
+          </p:cNvPicPr>
+          <p:nvPr/>
+        </p:nvPicPr>
+        <p:blipFill rotWithShape="1">
+          <a:blip r:embed="rId3"/>
+          <a:srcRect t="4540" r="27009"/>
+          <a:stretch/>
+        </p:blipFill>
+        <p:spPr>
+          <a:xfrm>
+            <a:off x="2930830" y="897830"/>
+            <a:ext cx="2602184" cy="4156974"/>
+          </a:xfrm>
+          <a:prstGeom prst="rect">
+            <a:avLst/>
+          </a:prstGeom>
+        </p:spPr>
+      </p:pic>
+      <p:sp>
+        <p:nvSpPr>
+          <p:cNvPr id="5" name="TextBox 4">
+            <a:extLst>
+              <a:ext uri="{FF2B5EF4-FFF2-40B4-BE49-F238E27FC236}">
+                <a16:creationId xmlns:a16="http://schemas.microsoft.com/office/drawing/2014/main" id="{6F4D977B-615E-41A0-9D4F-CD40BC4ECCA4}"/>
+              </a:ext>
+            </a:extLst>
+          </p:cNvPr>
+          <p:cNvSpPr txBox="1"/>
+          <p:nvPr/>
+        </p:nvSpPr>
+        <p:spPr>
+          <a:xfrm>
+            <a:off x="156629" y="5094656"/>
+            <a:ext cx="2605952" cy="369332"/>
+          </a:xfrm>
+          <a:prstGeom prst="rect">
+            <a:avLst/>
+          </a:prstGeom>
+          <a:noFill/>
+        </p:spPr>
+        <p:txBody>
+          <a:bodyPr wrap="square" lIns="0" tIns="0" rIns="0" bIns="0" rtlCol="0">
+            <a:spAutoFit/>
+          </a:bodyPr>
+          <a:lstStyle/>
+          <a:p>
+            <a:pPr algn="ctr"/>
+            <a:r>
+              <a:rPr lang="en-NZ" sz="1200" b="1" dirty="0"/>
+              <a:t>Rows 1:2800</a:t>
+            </a:r>
+          </a:p>
+          <a:p>
+            <a:pPr algn="ctr"/>
+            <a:r>
+              <a:rPr lang="en-NZ" sz="1200" b="1" dirty="0"/>
+              <a:t>466 Variables Above Threshold</a:t>
+            </a:r>
+          </a:p>
+        </p:txBody>
+      </p:sp>
+      <p:sp>
+        <p:nvSpPr>
+          <p:cNvPr id="10" name="TextBox 9">
+            <a:extLst>
+              <a:ext uri="{FF2B5EF4-FFF2-40B4-BE49-F238E27FC236}">
+                <a16:creationId xmlns:a16="http://schemas.microsoft.com/office/drawing/2014/main" id="{A29BC89C-7380-4DAC-B053-8BC2AC9B7D18}"/>
+              </a:ext>
+            </a:extLst>
+          </p:cNvPr>
+          <p:cNvSpPr txBox="1"/>
+          <p:nvPr/>
+        </p:nvSpPr>
+        <p:spPr>
+          <a:xfrm>
+            <a:off x="2930830" y="5080026"/>
+            <a:ext cx="2605952" cy="369332"/>
+          </a:xfrm>
+          <a:prstGeom prst="rect">
+            <a:avLst/>
+          </a:prstGeom>
+          <a:noFill/>
+        </p:spPr>
+        <p:txBody>
+          <a:bodyPr wrap="square" lIns="0" tIns="0" rIns="0" bIns="0" rtlCol="0">
+            <a:spAutoFit/>
+          </a:bodyPr>
+          <a:lstStyle/>
+          <a:p>
+            <a:pPr algn="ctr"/>
+            <a:r>
+              <a:rPr lang="en-NZ" sz="1200" b="1" dirty="0"/>
+              <a:t>Rows 2:2801</a:t>
+            </a:r>
+          </a:p>
+          <a:p>
+            <a:pPr algn="ctr"/>
+            <a:r>
+              <a:rPr lang="en-NZ" sz="1200" b="1" dirty="0"/>
+              <a:t>464 Variables Above Threshold</a:t>
+            </a:r>
+          </a:p>
+        </p:txBody>
+      </p:sp>
+      <p:pic>
+        <p:nvPicPr>
+          <p:cNvPr id="11" name="Picture 10">
+            <a:extLst>
+              <a:ext uri="{FF2B5EF4-FFF2-40B4-BE49-F238E27FC236}">
+                <a16:creationId xmlns:a16="http://schemas.microsoft.com/office/drawing/2014/main" id="{683F6D36-64CE-4660-A2EB-E0C24B880E3A}"/>
+              </a:ext>
+            </a:extLst>
+          </p:cNvPr>
+          <p:cNvPicPr>
+            <a:picLocks noChangeAspect="1"/>
+          </p:cNvPicPr>
+          <p:nvPr/>
+        </p:nvPicPr>
         <p:blipFill>
-          <a:blip r:embed="rId2">
-            <a:extLst>
-              <a:ext uri="{28A0092B-C50C-407E-A947-70E740481C1C}">
-                <a14:useLocalDpi xmlns:a14="http://schemas.microsoft.com/office/drawing/2010/main" val="0"/>
-              </a:ext>
-            </a:extLst>
-          </a:blip>
+          <a:blip r:embed="rId4"/>
           <a:stretch>
             <a:fillRect/>
           </a:stretch>
         </p:blipFill>
         <p:spPr>
           <a:xfrm>
-            <a:off x="799707" y="2129363"/>
-            <a:ext cx="10097909" cy="3648584"/>
+            <a:off x="5779352" y="897831"/>
+            <a:ext cx="2577164" cy="4156974"/>
           </a:xfrm>
           <a:prstGeom prst="rect">
             <a:avLst/>
@@ -9134,10 +9178,10 @@
       </p:pic>
       <p:sp>
         <p:nvSpPr>
-          <p:cNvPr id="6" name="TextBox 5">
-            <a:extLst>
-              <a:ext uri="{FF2B5EF4-FFF2-40B4-BE49-F238E27FC236}">
-                <a16:creationId xmlns:a16="http://schemas.microsoft.com/office/drawing/2014/main" id="{7A53C59A-1A95-4FC7-AB43-C7A259FFA6C7}"/>
+          <p:cNvPr id="12" name="TextBox 11">
+            <a:extLst>
+              <a:ext uri="{FF2B5EF4-FFF2-40B4-BE49-F238E27FC236}">
+                <a16:creationId xmlns:a16="http://schemas.microsoft.com/office/drawing/2014/main" id="{C331A33F-BB94-4D46-BABC-48A3FE8AC753}"/>
               </a:ext>
             </a:extLst>
           </p:cNvPr>
@@ -9146,8 +9190,8 @@
         </p:nvSpPr>
         <p:spPr>
           <a:xfrm>
-            <a:off x="213989" y="493362"/>
-            <a:ext cx="10571201" cy="369332"/>
+            <a:off x="5779352" y="5054804"/>
+            <a:ext cx="2562770" cy="369332"/>
           </a:xfrm>
           <a:prstGeom prst="rect">
             <a:avLst/>
@@ -9155,31 +9199,93 @@
           <a:noFill/>
         </p:spPr>
         <p:txBody>
-          <a:bodyPr wrap="square" rtlCol="0">
+          <a:bodyPr wrap="square" lIns="0" tIns="0" rIns="0" bIns="0" rtlCol="0">
             <a:spAutoFit/>
           </a:bodyPr>
           <a:lstStyle/>
           <a:p>
-            <a:r>
-              <a:rPr lang="en-NZ" b="1" dirty="0"/>
-              <a:t>Runs on subsets of dataset (rows) when only using blood pressure (</a:t>
-            </a:r>
-            <a:r>
-              <a:rPr lang="en-NZ" b="1" dirty="0" err="1"/>
-              <a:t>dia</a:t>
-            </a:r>
-            <a:r>
-              <a:rPr lang="en-NZ" b="1" dirty="0"/>
-              <a:t> &amp; sys) as inputs into the model</a:t>
-            </a:r>
-            <a:endParaRPr lang="en-GB" b="1" dirty="0"/>
+            <a:pPr algn="ctr"/>
+            <a:r>
+              <a:rPr lang="en-NZ" sz="1200" b="1"/>
+              <a:t>Rows 3:2802</a:t>
+            </a:r>
+            <a:endParaRPr lang="en-NZ" sz="1200" b="1" dirty="0"/>
+          </a:p>
+          <a:p>
+            <a:pPr algn="ctr"/>
+            <a:r>
+              <a:rPr lang="en-NZ" sz="1200" b="1" dirty="0"/>
+              <a:t>464 Variables Above Threshold</a:t>
+            </a:r>
+          </a:p>
+        </p:txBody>
+      </p:sp>
+      <p:sp>
+        <p:nvSpPr>
+          <p:cNvPr id="13" name="TextBox 12">
+            <a:extLst>
+              <a:ext uri="{FF2B5EF4-FFF2-40B4-BE49-F238E27FC236}">
+                <a16:creationId xmlns:a16="http://schemas.microsoft.com/office/drawing/2014/main" id="{F5B0AF2A-C591-40C9-AB95-DC636B67E369}"/>
+              </a:ext>
+            </a:extLst>
+          </p:cNvPr>
+          <p:cNvSpPr txBox="1"/>
+          <p:nvPr/>
+        </p:nvSpPr>
+        <p:spPr>
+          <a:xfrm>
+            <a:off x="6307521" y="5960169"/>
+            <a:ext cx="4849418" cy="553998"/>
+          </a:xfrm>
+          <a:prstGeom prst="rect">
+            <a:avLst/>
+          </a:prstGeom>
+          <a:solidFill>
+            <a:schemeClr val="bg1"/>
+          </a:solidFill>
+        </p:spPr>
+        <p:txBody>
+          <a:bodyPr wrap="square" lIns="0" tIns="0" rIns="0" bIns="0" rtlCol="0">
+            <a:spAutoFit/>
+          </a:bodyPr>
+          <a:lstStyle/>
+          <a:p>
+            <a:r>
+              <a:rPr lang="en-NZ" sz="1200" dirty="0">
+                <a:solidFill>
+                  <a:srgbClr val="FF0000"/>
+                </a:solidFill>
+              </a:rPr>
+              <a:t>Even when we just have 1 patient different, the variables outputted by </a:t>
+            </a:r>
+            <a:r>
+              <a:rPr lang="en-NZ" sz="1200" dirty="0" err="1">
+                <a:solidFill>
+                  <a:srgbClr val="FF0000"/>
+                </a:solidFill>
+              </a:rPr>
+              <a:t>cPCA</a:t>
+            </a:r>
+            <a:r>
+              <a:rPr lang="en-NZ" sz="1200" dirty="0">
+                <a:solidFill>
+                  <a:srgbClr val="FF0000"/>
+                </a:solidFill>
+              </a:rPr>
+              <a:t> can change pretty significantly, refer to excel spreadsheet for comparison of individual variables sorted by their weighting</a:t>
+            </a:r>
+            <a:endParaRPr lang="en-GB" sz="1200" dirty="0">
+              <a:solidFill>
+                <a:srgbClr val="FF0000"/>
+              </a:solidFill>
+            </a:endParaRPr>
           </a:p>
         </p:txBody>
       </p:sp>
     </p:spTree>
     <p:extLst>
       <p:ext uri="{BB962C8B-B14F-4D97-AF65-F5344CB8AC3E}">
-        <p14:creationId xmlns:p14="http://schemas.microsoft.com/office/powerpoint/2010/main" val="65343148"/>
+        <p14:creationId xmlns:p14="http://schemas.microsoft.com/office/powerpoint/2010/main" val="842150243"/>
       </p:ext>
     </p:extLst>
   </p:cSld>
@@ -9700,6 +9806,116 @@
     <p:extLst>
       <p:ext uri="{BB962C8B-B14F-4D97-AF65-F5344CB8AC3E}">
         <p14:creationId xmlns:p14="http://schemas.microsoft.com/office/powerpoint/2010/main" val="4234346216"/>
+      </p:ext>
+    </p:extLst>
+  </p:cSld>
+  <p:clrMapOvr>
+    <a:masterClrMapping/>
+  </p:clrMapOvr>
+</p:sld>
+</file>
+
+<file path=ppt/slides/slide20.xml><?xml version="1.0" encoding="utf-8"?>
+<p:sld xmlns:a="http://schemas.openxmlformats.org/drawingml/2006/main" xmlns:r="http://schemas.openxmlformats.org/officeDocument/2006/relationships" xmlns:p="http://schemas.openxmlformats.org/presentationml/2006/main">
+  <p:cSld>
+    <p:spTree>
+      <p:nvGrpSpPr>
+        <p:cNvPr id="1" name=""/>
+        <p:cNvGrpSpPr/>
+        <p:nvPr/>
+      </p:nvGrpSpPr>
+      <p:grpSpPr>
+        <a:xfrm>
+          <a:off x="0" y="0"/>
+          <a:ext cx="0" cy="0"/>
+          <a:chOff x="0" y="0"/>
+          <a:chExt cx="0" cy="0"/>
+        </a:xfrm>
+      </p:grpSpPr>
+      <p:pic>
+        <p:nvPicPr>
+          <p:cNvPr id="5" name="Picture 4">
+            <a:extLst>
+              <a:ext uri="{FF2B5EF4-FFF2-40B4-BE49-F238E27FC236}">
+                <a16:creationId xmlns:a16="http://schemas.microsoft.com/office/drawing/2014/main" id="{A2D96899-916E-4667-967A-53C75DE0B124}"/>
+              </a:ext>
+            </a:extLst>
+          </p:cNvPr>
+          <p:cNvPicPr>
+            <a:picLocks noChangeAspect="1"/>
+          </p:cNvPicPr>
+          <p:nvPr/>
+        </p:nvPicPr>
+        <p:blipFill>
+          <a:blip r:embed="rId2">
+            <a:extLst>
+              <a:ext uri="{28A0092B-C50C-407E-A947-70E740481C1C}">
+                <a14:useLocalDpi xmlns:a14="http://schemas.microsoft.com/office/drawing/2010/main" val="0"/>
+              </a:ext>
+            </a:extLst>
+          </a:blip>
+          <a:stretch>
+            <a:fillRect/>
+          </a:stretch>
+        </p:blipFill>
+        <p:spPr>
+          <a:xfrm>
+            <a:off x="799707" y="2129363"/>
+            <a:ext cx="10097909" cy="3648584"/>
+          </a:xfrm>
+          <a:prstGeom prst="rect">
+            <a:avLst/>
+          </a:prstGeom>
+        </p:spPr>
+      </p:pic>
+      <p:sp>
+        <p:nvSpPr>
+          <p:cNvPr id="6" name="TextBox 5">
+            <a:extLst>
+              <a:ext uri="{FF2B5EF4-FFF2-40B4-BE49-F238E27FC236}">
+                <a16:creationId xmlns:a16="http://schemas.microsoft.com/office/drawing/2014/main" id="{7A53C59A-1A95-4FC7-AB43-C7A259FFA6C7}"/>
+              </a:ext>
+            </a:extLst>
+          </p:cNvPr>
+          <p:cNvSpPr txBox="1"/>
+          <p:nvPr/>
+        </p:nvSpPr>
+        <p:spPr>
+          <a:xfrm>
+            <a:off x="213989" y="493362"/>
+            <a:ext cx="10571201" cy="369332"/>
+          </a:xfrm>
+          <a:prstGeom prst="rect">
+            <a:avLst/>
+          </a:prstGeom>
+          <a:noFill/>
+        </p:spPr>
+        <p:txBody>
+          <a:bodyPr wrap="square" rtlCol="0">
+            <a:spAutoFit/>
+          </a:bodyPr>
+          <a:lstStyle/>
+          <a:p>
+            <a:r>
+              <a:rPr lang="en-NZ" b="1" dirty="0"/>
+              <a:t>Runs on subsets of dataset (rows) when only using blood pressure (</a:t>
+            </a:r>
+            <a:r>
+              <a:rPr lang="en-NZ" b="1" dirty="0" err="1"/>
+              <a:t>dia</a:t>
+            </a:r>
+            <a:r>
+              <a:rPr lang="en-NZ" b="1" dirty="0"/>
+              <a:t> &amp; sys) as inputs into the model</a:t>
+            </a:r>
+            <a:endParaRPr lang="en-GB" b="1" dirty="0"/>
+          </a:p>
+        </p:txBody>
+      </p:sp>
+    </p:spTree>
+    <p:extLst>
+      <p:ext uri="{BB962C8B-B14F-4D97-AF65-F5344CB8AC3E}">
+        <p14:creationId xmlns:p14="http://schemas.microsoft.com/office/powerpoint/2010/main" val="65343148"/>
       </p:ext>
     </p:extLst>
   </p:cSld>
@@ -10535,7 +10751,7 @@
         <p:spPr>
           <a:xfrm>
             <a:off x="4690862" y="5834957"/>
-            <a:ext cx="4849418" cy="553998"/>
+            <a:ext cx="2800801" cy="923330"/>
           </a:xfrm>
           <a:prstGeom prst="rect">
             <a:avLst/>
@@ -10601,7 +10817,7 @@
         <p:spPr>
           <a:xfrm rot="10800000">
             <a:off x="4266604" y="5535574"/>
-            <a:ext cx="424258" cy="576383"/>
+            <a:ext cx="424258" cy="761049"/>
           </a:xfrm>
           <a:prstGeom prst="bentConnector2">
             <a:avLst/>
@@ -10688,6 +10904,52 @@
           </a:prstGeom>
         </p:spPr>
       </p:pic>
+      <p:sp>
+        <p:nvSpPr>
+          <p:cNvPr id="14" name="TextBox 13">
+            <a:extLst>
+              <a:ext uri="{FF2B5EF4-FFF2-40B4-BE49-F238E27FC236}">
+                <a16:creationId xmlns:a16="http://schemas.microsoft.com/office/drawing/2014/main" id="{23622833-5016-4415-AB81-0DFE075F55FA}"/>
+              </a:ext>
+            </a:extLst>
+          </p:cNvPr>
+          <p:cNvSpPr txBox="1"/>
+          <p:nvPr/>
+        </p:nvSpPr>
+        <p:spPr>
+          <a:xfrm>
+            <a:off x="9082421" y="5373292"/>
+            <a:ext cx="2800801" cy="553998"/>
+          </a:xfrm>
+          <a:prstGeom prst="rect">
+            <a:avLst/>
+          </a:prstGeom>
+          <a:solidFill>
+            <a:schemeClr val="bg1"/>
+          </a:solidFill>
+        </p:spPr>
+        <p:txBody>
+          <a:bodyPr wrap="square" lIns="0" tIns="0" rIns="0" bIns="0" rtlCol="0">
+            <a:spAutoFit/>
+          </a:bodyPr>
+          <a:lstStyle/>
+          <a:p>
+            <a:r>
+              <a:rPr lang="en-NZ" sz="1200" b="1" dirty="0">
+                <a:solidFill>
+                  <a:srgbClr val="FF0000"/>
+                </a:solidFill>
+              </a:rPr>
+              <a:t>DON’T USE SHORTEST PATH TREE AS THIS DOESN’T MAKE THE RIGHT TRAJECTORY GRAPH STOOOOOPID !!!!!!!!</a:t>
+            </a:r>
+            <a:endParaRPr lang="en-GB" sz="1200" b="1" dirty="0">
+              <a:solidFill>
+                <a:srgbClr val="FF0000"/>
+              </a:solidFill>
+            </a:endParaRPr>
+          </a:p>
+        </p:txBody>
+      </p:sp>
     </p:spTree>
     <p:extLst>
       <p:ext uri="{BB962C8B-B14F-4D97-AF65-F5344CB8AC3E}">

</xml_diff>

<commit_message>
append methods for neuroPM in ppt
</commit_message>
<xml_diff>
--- a/job_results.pptx
+++ b/job_results.pptx
@@ -195,7 +195,7 @@
   <pc:docChgLst>
     <pc:chgData name="Zhao Xiong" userId="5eba49e5-2895-4cd9-83e8-b3064fe76704" providerId="ADAL" clId="{B606E7B2-EFF5-418A-8639-9F7537C4DA50}"/>
     <pc:docChg chg="undo custSel addSld delSld modSld sldOrd">
-      <pc:chgData name="Zhao Xiong" userId="5eba49e5-2895-4cd9-83e8-b3064fe76704" providerId="ADAL" clId="{B606E7B2-EFF5-418A-8639-9F7537C4DA50}" dt="2022-05-27T14:22:40.621" v="12059" actId="20577"/>
+      <pc:chgData name="Zhao Xiong" userId="5eba49e5-2895-4cd9-83e8-b3064fe76704" providerId="ADAL" clId="{B606E7B2-EFF5-418A-8639-9F7537C4DA50}" dt="2022-05-27T16:35:35.709" v="12835" actId="20577"/>
       <pc:docMkLst>
         <pc:docMk/>
       </pc:docMkLst>
@@ -1102,7 +1102,7 @@
         </pc:picChg>
       </pc:sldChg>
       <pc:sldChg chg="addSp delSp modSp add ord">
-        <pc:chgData name="Zhao Xiong" userId="5eba49e5-2895-4cd9-83e8-b3064fe76704" providerId="ADAL" clId="{B606E7B2-EFF5-418A-8639-9F7537C4DA50}" dt="2022-05-26T17:33:32.325" v="11267"/>
+        <pc:chgData name="Zhao Xiong" userId="5eba49e5-2895-4cd9-83e8-b3064fe76704" providerId="ADAL" clId="{B606E7B2-EFF5-418A-8639-9F7537C4DA50}" dt="2022-05-27T16:35:35.709" v="12835" actId="20577"/>
         <pc:sldMkLst>
           <pc:docMk/>
           <pc:sldMk cId="4125219743" sldId="269"/>
@@ -1124,7 +1124,7 @@
           </ac:spMkLst>
         </pc:spChg>
         <pc:spChg chg="add mod">
-          <ac:chgData name="Zhao Xiong" userId="5eba49e5-2895-4cd9-83e8-b3064fe76704" providerId="ADAL" clId="{B606E7B2-EFF5-418A-8639-9F7537C4DA50}" dt="2022-05-19T14:59:01.560" v="9511" actId="1035"/>
+          <ac:chgData name="Zhao Xiong" userId="5eba49e5-2895-4cd9-83e8-b3064fe76704" providerId="ADAL" clId="{B606E7B2-EFF5-418A-8639-9F7537C4DA50}" dt="2022-05-27T16:35:35.709" v="12835" actId="20577"/>
           <ac:spMkLst>
             <pc:docMk/>
             <pc:sldMk cId="4125219743" sldId="269"/>
@@ -1148,7 +1148,7 @@
           </ac:spMkLst>
         </pc:spChg>
         <pc:spChg chg="add mod">
-          <ac:chgData name="Zhao Xiong" userId="5eba49e5-2895-4cd9-83e8-b3064fe76704" providerId="ADAL" clId="{B606E7B2-EFF5-418A-8639-9F7537C4DA50}" dt="2022-05-19T14:59:01.560" v="9511" actId="1035"/>
+          <ac:chgData name="Zhao Xiong" userId="5eba49e5-2895-4cd9-83e8-b3064fe76704" providerId="ADAL" clId="{B606E7B2-EFF5-418A-8639-9F7537C4DA50}" dt="2022-05-27T16:30:01.775" v="12137" actId="14100"/>
           <ac:spMkLst>
             <pc:docMk/>
             <pc:sldMk cId="4125219743" sldId="269"/>
@@ -1164,7 +1164,7 @@
           </ac:spMkLst>
         </pc:spChg>
         <pc:spChg chg="add mod">
-          <ac:chgData name="Zhao Xiong" userId="5eba49e5-2895-4cd9-83e8-b3064fe76704" providerId="ADAL" clId="{B606E7B2-EFF5-418A-8639-9F7537C4DA50}" dt="2022-05-19T14:59:22.368" v="9530" actId="1035"/>
+          <ac:chgData name="Zhao Xiong" userId="5eba49e5-2895-4cd9-83e8-b3064fe76704" providerId="ADAL" clId="{B606E7B2-EFF5-418A-8639-9F7537C4DA50}" dt="2022-05-27T16:28:01.758" v="12066" actId="20577"/>
           <ac:spMkLst>
             <pc:docMk/>
             <pc:sldMk cId="4125219743" sldId="269"/>
@@ -7438,8 +7438,8 @@
         </p:nvSpPr>
         <p:spPr>
           <a:xfrm>
-            <a:off x="0" y="1616219"/>
-            <a:ext cx="6096000" cy="5447645"/>
+            <a:off x="-1" y="1022665"/>
+            <a:ext cx="6192253" cy="5816977"/>
           </a:xfrm>
           <a:prstGeom prst="rect">
             <a:avLst/>
@@ -7602,7 +7602,7 @@
             </a:pPr>
             <a:r>
               <a:rPr lang="en-NZ" sz="1200" dirty="0"/>
-              <a:t>Compute affinity matrix of the PCs between each combination of </a:t>
+              <a:t>Compute affinity matrix of the PCs for each combination of </a:t>
             </a:r>
             <a:r>
               <a:rPr lang="el-GR" sz="1200" i="1" dirty="0"/>
@@ -7624,7 +7624,15 @@
             </a:pPr>
             <a:r>
               <a:rPr lang="en-NZ" sz="1200" dirty="0"/>
-              <a:t>Use spectral clustering of the affinity matrix a pre-set number times and choose the cluster with the highest value of clustering quality</a:t>
+              <a:t>Use spectral clustering of the affinity matrix a pre-set number times and choose the cluster (set of </a:t>
+            </a:r>
+            <a:r>
+              <a:rPr lang="el-GR" sz="1200" i="1" dirty="0"/>
+              <a:t>α</a:t>
+            </a:r>
+            <a:r>
+              <a:rPr lang="en-NZ" sz="1200" dirty="0"/>
+              <a:t>) with the highest value of clustering quality</a:t>
             </a:r>
           </a:p>
           <a:p>
@@ -7692,16 +7700,13 @@
             </a:r>
             <a:r>
               <a:rPr lang="en-NZ" sz="1200" dirty="0"/>
-              <a:t> space and obtain the contrastive PC (</a:t>
+              <a:t> space and obtain the </a:t>
             </a:r>
             <a:r>
               <a:rPr lang="en-NZ" sz="1200" dirty="0" err="1"/>
               <a:t>cPC</a:t>
             </a:r>
-            <a:r>
-              <a:rPr lang="en-NZ" sz="1200" dirty="0"/>
-              <a:t>)</a:t>
-            </a:r>
+            <a:endParaRPr lang="en-NZ" sz="1200" dirty="0"/>
           </a:p>
           <a:p>
             <a:pPr marL="1257300" lvl="2" indent="-342900">
@@ -7718,13 +7723,8 @@
             </a:r>
             <a:r>
               <a:rPr lang="en-NZ" sz="1200" dirty="0"/>
-              <a:t> in the background/disease groups to compute the clustering </a:t>
-            </a:r>
-            <a:r>
-              <a:rPr lang="en-NZ" sz="1200" dirty="0" err="1"/>
-              <a:t>tendancy</a:t>
-            </a:r>
-            <a:endParaRPr lang="en-NZ" sz="1200" dirty="0"/>
+              <a:t> in the background/disease groups to compute the clustering tendency of the disease vs background</a:t>
+            </a:r>
           </a:p>
           <a:p>
             <a:pPr marL="800100" lvl="1" indent="-342900">
@@ -7749,15 +7749,30 @@
             </a:r>
             <a:r>
               <a:rPr lang="en-NZ" sz="1200" dirty="0"/>
-              <a:t> from the cluster group which produces the maximum clustering </a:t>
+              <a:t> from the cluster group which produces the maximum clustering tendency of the background/disease groups as this means the values are clustered more tightly and the clusters have less overlap</a:t>
+            </a:r>
+          </a:p>
+          <a:p>
+            <a:pPr lvl="1"/>
+            <a:endParaRPr lang="en-NZ" sz="1200" dirty="0"/>
+          </a:p>
+          <a:p>
+            <a:pPr lvl="1"/>
+            <a:r>
+              <a:rPr lang="en-NZ" sz="1200" dirty="0"/>
+              <a:t>TLDR: perform PCA on a range of weighted sums of the background/disease, the final </a:t>
             </a:r>
             <a:r>
               <a:rPr lang="en-NZ" sz="1200" dirty="0" err="1"/>
-              <a:t>tendancy</a:t>
+              <a:t>cPC</a:t>
+            </a:r>
+            <a:r>
+              <a:rPr lang="en-NZ" sz="1200"/>
+              <a:t> </a:t>
             </a:r>
             <a:r>
               <a:rPr lang="en-NZ" sz="1200" dirty="0"/>
-              <a:t> of the disease category</a:t>
+              <a:t>then corresponds to the weighting variable which produces the highest clustering tendency of the background/disease in the PC space</a:t>
             </a:r>
           </a:p>
         </p:txBody>
@@ -7776,8 +7791,8 @@
         </p:nvSpPr>
         <p:spPr>
           <a:xfrm>
-            <a:off x="6095999" y="1616219"/>
-            <a:ext cx="6096000" cy="3785652"/>
+            <a:off x="6095999" y="1022665"/>
+            <a:ext cx="6095999" cy="3785652"/>
           </a:xfrm>
           <a:prstGeom prst="rect">
             <a:avLst/>
@@ -7923,7 +7938,7 @@
         <p:spPr>
           <a:xfrm>
             <a:off x="-1" y="526255"/>
-            <a:ext cx="12191999" cy="1015663"/>
+            <a:ext cx="12191999" cy="461665"/>
           </a:xfrm>
           <a:prstGeom prst="rect">
             <a:avLst/>
@@ -7937,36 +7952,13 @@
           <a:p>
             <a:r>
               <a:rPr lang="en-NZ" sz="1200" dirty="0"/>
-              <a:t>Assumption:</a:t>
-            </a:r>
-          </a:p>
-          <a:p>
-            <a:pPr marL="171450" indent="-171450">
-              <a:buFontTx/>
-              <a:buChar char="-"/>
-            </a:pPr>
+              <a:t>Assumption: Given a large cohort of patients, we can assume they are at different stages of disease, and therefore produce a pseudo-temporal distribution of the progression of disease</a:t>
+            </a:r>
+          </a:p>
+          <a:p>
             <a:r>
               <a:rPr lang="en-NZ" sz="1200" dirty="0"/>
-              <a:t>Given a large cohort of patients, we can assume they are at different stages of disease, and therefore produce a pseudo-temporal distribution of the progression of disease</a:t>
-            </a:r>
-          </a:p>
-          <a:p>
-            <a:endParaRPr lang="en-NZ" sz="1200" dirty="0"/>
-          </a:p>
-          <a:p>
-            <a:r>
-              <a:rPr lang="en-NZ" sz="1200" dirty="0"/>
-              <a:t>Data:</a:t>
-            </a:r>
-          </a:p>
-          <a:p>
-            <a:pPr marL="285750" indent="-285750">
-              <a:buFontTx/>
-              <a:buChar char="-"/>
-            </a:pPr>
-            <a:r>
-              <a:rPr lang="en-NZ" sz="1200" dirty="0"/>
-              <a:t>Given a matrix of N rows (patients) by M columns (features), separate rows into background/between/disease categories</a:t>
+              <a:t>Data: Given a matrix of N rows (patients) by M columns (features), separate rows into background/between/disease categories</a:t>
             </a:r>
           </a:p>
         </p:txBody>

</xml_diff>

<commit_message>
added root node visualization on MST
</commit_message>
<xml_diff>
--- a/job_results.pptx
+++ b/job_results.pptx
@@ -5,7 +5,7 @@
     <p:sldMasterId id="2147483648" r:id="rId1"/>
   </p:sldMasterIdLst>
   <p:notesMasterIdLst>
-    <p:notesMasterId r:id="rId22"/>
+    <p:notesMasterId r:id="rId23"/>
   </p:notesMasterIdLst>
   <p:sldIdLst>
     <p:sldId id="256" r:id="rId2"/>
@@ -26,8 +26,9 @@
     <p:sldId id="277" r:id="rId17"/>
     <p:sldId id="274" r:id="rId18"/>
     <p:sldId id="278" r:id="rId19"/>
-    <p:sldId id="275" r:id="rId20"/>
-    <p:sldId id="263" r:id="rId21"/>
+    <p:sldId id="279" r:id="rId20"/>
+    <p:sldId id="275" r:id="rId21"/>
+    <p:sldId id="263" r:id="rId22"/>
   </p:sldIdLst>
   <p:sldSz cx="12192000" cy="6858000"/>
   <p:notesSz cx="6858000" cy="9144000"/>
@@ -195,7 +196,7 @@
   <pc:docChgLst>
     <pc:chgData name="Zhao Xiong" userId="5eba49e5-2895-4cd9-83e8-b3064fe76704" providerId="ADAL" clId="{B606E7B2-EFF5-418A-8639-9F7537C4DA50}"/>
     <pc:docChg chg="undo custSel addSld delSld modSld sldOrd">
-      <pc:chgData name="Zhao Xiong" userId="5eba49e5-2895-4cd9-83e8-b3064fe76704" providerId="ADAL" clId="{B606E7B2-EFF5-418A-8639-9F7537C4DA50}" dt="2022-05-28T13:13:56.045" v="12849" actId="1037"/>
+      <pc:chgData name="Zhao Xiong" userId="5eba49e5-2895-4cd9-83e8-b3064fe76704" providerId="ADAL" clId="{B606E7B2-EFF5-418A-8639-9F7537C4DA50}" dt="2022-06-10T13:55:19.578" v="13157" actId="1036"/>
       <pc:docMkLst>
         <pc:docMk/>
       </pc:docMkLst>
@@ -1417,7 +1418,7 @@
         </pc:picChg>
       </pc:sldChg>
       <pc:sldChg chg="addSp delSp modSp add ord">
-        <pc:chgData name="Zhao Xiong" userId="5eba49e5-2895-4cd9-83e8-b3064fe76704" providerId="ADAL" clId="{B606E7B2-EFF5-418A-8639-9F7537C4DA50}" dt="2022-05-27T12:57:44.531" v="11928" actId="14100"/>
+        <pc:chgData name="Zhao Xiong" userId="5eba49e5-2895-4cd9-83e8-b3064fe76704" providerId="ADAL" clId="{B606E7B2-EFF5-418A-8639-9F7537C4DA50}" dt="2022-06-10T13:55:19.578" v="13157" actId="1036"/>
         <pc:sldMkLst>
           <pc:docMk/>
           <pc:sldMk cId="1647779813" sldId="274"/>
@@ -1431,7 +1432,7 @@
           </ac:spMkLst>
         </pc:spChg>
         <pc:spChg chg="add mod">
-          <ac:chgData name="Zhao Xiong" userId="5eba49e5-2895-4cd9-83e8-b3064fe76704" providerId="ADAL" clId="{B606E7B2-EFF5-418A-8639-9F7537C4DA50}" dt="2022-05-27T12:43:22.898" v="11835" actId="14100"/>
+          <ac:chgData name="Zhao Xiong" userId="5eba49e5-2895-4cd9-83e8-b3064fe76704" providerId="ADAL" clId="{B606E7B2-EFF5-418A-8639-9F7537C4DA50}" dt="2022-06-10T13:55:19.578" v="13157" actId="1036"/>
           <ac:spMkLst>
             <pc:docMk/>
             <pc:sldMk cId="1647779813" sldId="274"/>
@@ -1439,11 +1440,19 @@
           </ac:spMkLst>
         </pc:spChg>
         <pc:spChg chg="add mod">
-          <ac:chgData name="Zhao Xiong" userId="5eba49e5-2895-4cd9-83e8-b3064fe76704" providerId="ADAL" clId="{B606E7B2-EFF5-418A-8639-9F7537C4DA50}" dt="2022-05-27T12:57:40.851" v="11927" actId="1076"/>
+          <ac:chgData name="Zhao Xiong" userId="5eba49e5-2895-4cd9-83e8-b3064fe76704" providerId="ADAL" clId="{B606E7B2-EFF5-418A-8639-9F7537C4DA50}" dt="2022-06-10T13:55:19.578" v="13157" actId="1036"/>
           <ac:spMkLst>
             <pc:docMk/>
             <pc:sldMk cId="1647779813" sldId="274"/>
             <ac:spMk id="7" creationId="{943C1D6E-80E5-4EDB-90EE-5E3BFA16D938}"/>
+          </ac:spMkLst>
+        </pc:spChg>
+        <pc:spChg chg="add del">
+          <ac:chgData name="Zhao Xiong" userId="5eba49e5-2895-4cd9-83e8-b3064fe76704" providerId="ADAL" clId="{B606E7B2-EFF5-418A-8639-9F7537C4DA50}" dt="2022-06-10T13:40:24.460" v="12859"/>
+          <ac:spMkLst>
+            <pc:docMk/>
+            <pc:sldMk cId="1647779813" sldId="274"/>
+            <ac:spMk id="8" creationId="{090D6B53-A05B-4291-A153-2F4659E498ED}"/>
           </ac:spMkLst>
         </pc:spChg>
         <pc:picChg chg="add del mod modCrop">
@@ -1455,7 +1464,7 @@
           </ac:picMkLst>
         </pc:picChg>
         <pc:picChg chg="add mod">
-          <ac:chgData name="Zhao Xiong" userId="5eba49e5-2895-4cd9-83e8-b3064fe76704" providerId="ADAL" clId="{B606E7B2-EFF5-418A-8639-9F7537C4DA50}" dt="2022-05-27T12:57:44.531" v="11928" actId="14100"/>
+          <ac:chgData name="Zhao Xiong" userId="5eba49e5-2895-4cd9-83e8-b3064fe76704" providerId="ADAL" clId="{B606E7B2-EFF5-418A-8639-9F7537C4DA50}" dt="2022-06-10T13:55:02.727" v="13146" actId="1076"/>
           <ac:picMkLst>
             <pc:docMk/>
             <pc:sldMk cId="1647779813" sldId="274"/>
@@ -1463,7 +1472,7 @@
           </ac:picMkLst>
         </pc:picChg>
         <pc:picChg chg="add mod modCrop">
-          <ac:chgData name="Zhao Xiong" userId="5eba49e5-2895-4cd9-83e8-b3064fe76704" providerId="ADAL" clId="{B606E7B2-EFF5-418A-8639-9F7537C4DA50}" dt="2022-05-27T12:57:35.371" v="11926" actId="1076"/>
+          <ac:chgData name="Zhao Xiong" userId="5eba49e5-2895-4cd9-83e8-b3064fe76704" providerId="ADAL" clId="{B606E7B2-EFF5-418A-8639-9F7537C4DA50}" dt="2022-06-10T13:55:02.727" v="13146" actId="1076"/>
           <ac:picMkLst>
             <pc:docMk/>
             <pc:sldMk cId="1647779813" sldId="274"/>
@@ -2068,11 +2077,74 @@
           </ac:cxnSpMkLst>
         </pc:cxnChg>
       </pc:sldChg>
-      <pc:sldChg chg="add">
-        <pc:chgData name="Zhao Xiong" userId="5eba49e5-2895-4cd9-83e8-b3064fe76704" providerId="ADAL" clId="{B606E7B2-EFF5-418A-8639-9F7537C4DA50}" dt="2022-05-27T12:26:52.743" v="11691"/>
+      <pc:sldChg chg="addSp modSp add">
+        <pc:chgData name="Zhao Xiong" userId="5eba49e5-2895-4cd9-83e8-b3064fe76704" providerId="ADAL" clId="{B606E7B2-EFF5-418A-8639-9F7537C4DA50}" dt="2022-06-10T13:51:29.559" v="13142" actId="14100"/>
         <pc:sldMkLst>
           <pc:docMk/>
           <pc:sldMk cId="2614382736" sldId="278"/>
+        </pc:sldMkLst>
+        <pc:spChg chg="add mod">
+          <ac:chgData name="Zhao Xiong" userId="5eba49e5-2895-4cd9-83e8-b3064fe76704" providerId="ADAL" clId="{B606E7B2-EFF5-418A-8639-9F7537C4DA50}" dt="2022-06-10T13:49:34.941" v="13138" actId="20577"/>
+          <ac:spMkLst>
+            <pc:docMk/>
+            <pc:sldMk cId="2614382736" sldId="278"/>
+            <ac:spMk id="4" creationId="{39AEA78F-5F59-4479-87B7-16AFF5AB2EEF}"/>
+          </ac:spMkLst>
+        </pc:spChg>
+        <pc:spChg chg="add mod">
+          <ac:chgData name="Zhao Xiong" userId="5eba49e5-2895-4cd9-83e8-b3064fe76704" providerId="ADAL" clId="{B606E7B2-EFF5-418A-8639-9F7537C4DA50}" dt="2022-06-10T13:49:00.555" v="13011" actId="1035"/>
+          <ac:spMkLst>
+            <pc:docMk/>
+            <pc:sldMk cId="2614382736" sldId="278"/>
+            <ac:spMk id="5" creationId="{5B6261DD-4C83-4374-92E0-3E6D8887F011}"/>
+          </ac:spMkLst>
+        </pc:spChg>
+        <pc:spChg chg="add mod">
+          <ac:chgData name="Zhao Xiong" userId="5eba49e5-2895-4cd9-83e8-b3064fe76704" providerId="ADAL" clId="{B606E7B2-EFF5-418A-8639-9F7537C4DA50}" dt="2022-06-10T13:49:55.279" v="13139" actId="1076"/>
+          <ac:spMkLst>
+            <pc:docMk/>
+            <pc:sldMk cId="2614382736" sldId="278"/>
+            <ac:spMk id="8" creationId="{FFC0D1DF-D4AE-48DD-8351-A8C55314D8DA}"/>
+          </ac:spMkLst>
+        </pc:spChg>
+        <pc:spChg chg="add mod">
+          <ac:chgData name="Zhao Xiong" userId="5eba49e5-2895-4cd9-83e8-b3064fe76704" providerId="ADAL" clId="{B606E7B2-EFF5-418A-8639-9F7537C4DA50}" dt="2022-06-10T13:49:03.757" v="13015" actId="20577"/>
+          <ac:spMkLst>
+            <pc:docMk/>
+            <pc:sldMk cId="2614382736" sldId="278"/>
+            <ac:spMk id="11" creationId="{D9F5A6D0-2B34-4F3E-9A73-8E137B9E2B3A}"/>
+          </ac:spMkLst>
+        </pc:spChg>
+        <pc:picChg chg="add mod modCrop">
+          <ac:chgData name="Zhao Xiong" userId="5eba49e5-2895-4cd9-83e8-b3064fe76704" providerId="ADAL" clId="{B606E7B2-EFF5-418A-8639-9F7537C4DA50}" dt="2022-06-10T13:51:26.119" v="13141" actId="14100"/>
+          <ac:picMkLst>
+            <pc:docMk/>
+            <pc:sldMk cId="2614382736" sldId="278"/>
+            <ac:picMk id="3" creationId="{319FB025-DFE9-4B6D-ACD6-88F9E6F112A3}"/>
+          </ac:picMkLst>
+        </pc:picChg>
+        <pc:picChg chg="add mod">
+          <ac:chgData name="Zhao Xiong" userId="5eba49e5-2895-4cd9-83e8-b3064fe76704" providerId="ADAL" clId="{B606E7B2-EFF5-418A-8639-9F7537C4DA50}" dt="2022-06-10T13:49:55.279" v="13139" actId="1076"/>
+          <ac:picMkLst>
+            <pc:docMk/>
+            <pc:sldMk cId="2614382736" sldId="278"/>
+            <ac:picMk id="7" creationId="{E9A1E23D-6402-43E7-8D9F-E68D2C1882E8}"/>
+          </ac:picMkLst>
+        </pc:picChg>
+        <pc:picChg chg="add mod">
+          <ac:chgData name="Zhao Xiong" userId="5eba49e5-2895-4cd9-83e8-b3064fe76704" providerId="ADAL" clId="{B606E7B2-EFF5-418A-8639-9F7537C4DA50}" dt="2022-06-10T13:51:29.559" v="13142" actId="14100"/>
+          <ac:picMkLst>
+            <pc:docMk/>
+            <pc:sldMk cId="2614382736" sldId="278"/>
+            <ac:picMk id="10" creationId="{354FCEEB-20C4-4702-A6A5-E2806CE18178}"/>
+          </ac:picMkLst>
+        </pc:picChg>
+      </pc:sldChg>
+      <pc:sldChg chg="add">
+        <pc:chgData name="Zhao Xiong" userId="5eba49e5-2895-4cd9-83e8-b3064fe76704" providerId="ADAL" clId="{B606E7B2-EFF5-418A-8639-9F7537C4DA50}" dt="2022-06-10T13:36:38.495" v="12850"/>
+        <pc:sldMkLst>
+          <pc:docMk/>
+          <pc:sldMk cId="286555550" sldId="279"/>
         </pc:sldMkLst>
       </pc:sldChg>
     </pc:docChg>
@@ -2162,7 +2234,7 @@
           <a:p>
             <a:fld id="{3F756EDF-0C8E-4F27-B2A4-7BBF4F0FD9CE}" type="datetimeFigureOut">
               <a:rPr lang="en-GB" smtClean="0"/>
-              <a:t>28/05/2022</a:t>
+              <a:t>10/06/2022</a:t>
             </a:fld>
             <a:endParaRPr lang="en-GB"/>
           </a:p>
@@ -2579,7 +2651,7 @@
           <a:p>
             <a:fld id="{B1B6DC73-6F54-48A7-AC0A-0EE4EE00B05A}" type="datetimeFigureOut">
               <a:rPr lang="en-GB" smtClean="0"/>
-              <a:t>28/05/2022</a:t>
+              <a:t>10/06/2022</a:t>
             </a:fld>
             <a:endParaRPr lang="en-GB"/>
           </a:p>
@@ -2779,7 +2851,7 @@
           <a:p>
             <a:fld id="{B1B6DC73-6F54-48A7-AC0A-0EE4EE00B05A}" type="datetimeFigureOut">
               <a:rPr lang="en-GB" smtClean="0"/>
-              <a:t>28/05/2022</a:t>
+              <a:t>10/06/2022</a:t>
             </a:fld>
             <a:endParaRPr lang="en-GB"/>
           </a:p>
@@ -2989,7 +3061,7 @@
           <a:p>
             <a:fld id="{B1B6DC73-6F54-48A7-AC0A-0EE4EE00B05A}" type="datetimeFigureOut">
               <a:rPr lang="en-GB" smtClean="0"/>
-              <a:t>28/05/2022</a:t>
+              <a:t>10/06/2022</a:t>
             </a:fld>
             <a:endParaRPr lang="en-GB"/>
           </a:p>
@@ -3189,7 +3261,7 @@
           <a:p>
             <a:fld id="{B1B6DC73-6F54-48A7-AC0A-0EE4EE00B05A}" type="datetimeFigureOut">
               <a:rPr lang="en-GB" smtClean="0"/>
-              <a:t>28/05/2022</a:t>
+              <a:t>10/06/2022</a:t>
             </a:fld>
             <a:endParaRPr lang="en-GB"/>
           </a:p>
@@ -3465,7 +3537,7 @@
           <a:p>
             <a:fld id="{B1B6DC73-6F54-48A7-AC0A-0EE4EE00B05A}" type="datetimeFigureOut">
               <a:rPr lang="en-GB" smtClean="0"/>
-              <a:t>28/05/2022</a:t>
+              <a:t>10/06/2022</a:t>
             </a:fld>
             <a:endParaRPr lang="en-GB"/>
           </a:p>
@@ -3733,7 +3805,7 @@
           <a:p>
             <a:fld id="{B1B6DC73-6F54-48A7-AC0A-0EE4EE00B05A}" type="datetimeFigureOut">
               <a:rPr lang="en-GB" smtClean="0"/>
-              <a:t>28/05/2022</a:t>
+              <a:t>10/06/2022</a:t>
             </a:fld>
             <a:endParaRPr lang="en-GB"/>
           </a:p>
@@ -4148,7 +4220,7 @@
           <a:p>
             <a:fld id="{B1B6DC73-6F54-48A7-AC0A-0EE4EE00B05A}" type="datetimeFigureOut">
               <a:rPr lang="en-GB" smtClean="0"/>
-              <a:t>28/05/2022</a:t>
+              <a:t>10/06/2022</a:t>
             </a:fld>
             <a:endParaRPr lang="en-GB"/>
           </a:p>
@@ -4290,7 +4362,7 @@
           <a:p>
             <a:fld id="{B1B6DC73-6F54-48A7-AC0A-0EE4EE00B05A}" type="datetimeFigureOut">
               <a:rPr lang="en-GB" smtClean="0"/>
-              <a:t>28/05/2022</a:t>
+              <a:t>10/06/2022</a:t>
             </a:fld>
             <a:endParaRPr lang="en-GB"/>
           </a:p>
@@ -4403,7 +4475,7 @@
           <a:p>
             <a:fld id="{B1B6DC73-6F54-48A7-AC0A-0EE4EE00B05A}" type="datetimeFigureOut">
               <a:rPr lang="en-GB" smtClean="0"/>
-              <a:t>28/05/2022</a:t>
+              <a:t>10/06/2022</a:t>
             </a:fld>
             <a:endParaRPr lang="en-GB"/>
           </a:p>
@@ -4716,7 +4788,7 @@
           <a:p>
             <a:fld id="{B1B6DC73-6F54-48A7-AC0A-0EE4EE00B05A}" type="datetimeFigureOut">
               <a:rPr lang="en-GB" smtClean="0"/>
-              <a:t>28/05/2022</a:t>
+              <a:t>10/06/2022</a:t>
             </a:fld>
             <a:endParaRPr lang="en-GB"/>
           </a:p>
@@ -5005,7 +5077,7 @@
           <a:p>
             <a:fld id="{B1B6DC73-6F54-48A7-AC0A-0EE4EE00B05A}" type="datetimeFigureOut">
               <a:rPr lang="en-GB" smtClean="0"/>
-              <a:t>28/05/2022</a:t>
+              <a:t>10/06/2022</a:t>
             </a:fld>
             <a:endParaRPr lang="en-GB"/>
           </a:p>
@@ -5248,7 +5320,7 @@
           <a:p>
             <a:fld id="{B1B6DC73-6F54-48A7-AC0A-0EE4EE00B05A}" type="datetimeFigureOut">
               <a:rPr lang="en-GB" smtClean="0"/>
-              <a:t>28/05/2022</a:t>
+              <a:t>10/06/2022</a:t>
             </a:fld>
             <a:endParaRPr lang="en-GB"/>
           </a:p>
@@ -8773,8 +8845,8 @@
         </p:blipFill>
         <p:spPr>
           <a:xfrm>
-            <a:off x="5081840" y="876300"/>
-            <a:ext cx="4543425" cy="5105400"/>
+            <a:off x="5285040" y="859693"/>
+            <a:ext cx="4543425" cy="4590562"/>
           </a:xfrm>
           <a:prstGeom prst="rect">
             <a:avLst/>
@@ -8807,8 +8879,8 @@
         </p:blipFill>
         <p:spPr>
           <a:xfrm>
-            <a:off x="295023" y="876300"/>
-            <a:ext cx="4543426" cy="5105400"/>
+            <a:off x="498223" y="859693"/>
+            <a:ext cx="4543426" cy="4590562"/>
           </a:xfrm>
           <a:prstGeom prst="rect">
             <a:avLst/>
@@ -8834,8 +8906,8 @@
         </p:nvSpPr>
         <p:spPr>
           <a:xfrm>
-            <a:off x="1171071" y="6058187"/>
-            <a:ext cx="2791330" cy="307777"/>
+            <a:off x="498223" y="5503297"/>
+            <a:ext cx="4543426" cy="307777"/>
           </a:xfrm>
           <a:prstGeom prst="rect">
             <a:avLst/>
@@ -8873,8 +8945,8 @@
         </p:nvSpPr>
         <p:spPr>
           <a:xfrm>
-            <a:off x="6062161" y="6058187"/>
-            <a:ext cx="2582782" cy="307777"/>
+            <a:off x="5285040" y="5503297"/>
+            <a:ext cx="4543425" cy="307777"/>
           </a:xfrm>
           <a:prstGeom prst="rect">
             <a:avLst/>
@@ -8928,6 +9000,304 @@
           <a:chExt cx="0" cy="0"/>
         </a:xfrm>
       </p:grpSpPr>
+      <p:pic>
+        <p:nvPicPr>
+          <p:cNvPr id="3" name="Picture 2">
+            <a:extLst>
+              <a:ext uri="{FF2B5EF4-FFF2-40B4-BE49-F238E27FC236}">
+                <a16:creationId xmlns:a16="http://schemas.microsoft.com/office/drawing/2014/main" id="{319FB025-DFE9-4B6D-ACD6-88F9E6F112A3}"/>
+              </a:ext>
+            </a:extLst>
+          </p:cNvPr>
+          <p:cNvPicPr>
+            <a:picLocks noChangeAspect="1"/>
+          </p:cNvPicPr>
+          <p:nvPr/>
+        </p:nvPicPr>
+        <p:blipFill>
+          <a:blip r:embed="rId2">
+            <a:extLst>
+              <a:ext uri="{28A0092B-C50C-407E-A947-70E740481C1C}">
+                <a14:useLocalDpi xmlns:a14="http://schemas.microsoft.com/office/drawing/2010/main" val="0"/>
+              </a:ext>
+            </a:extLst>
+          </a:blip>
+          <a:stretch>
+            <a:fillRect/>
+          </a:stretch>
+        </p:blipFill>
+        <p:spPr>
+          <a:xfrm>
+            <a:off x="3245138" y="369333"/>
+            <a:ext cx="2852863" cy="6318084"/>
+          </a:xfrm>
+          <a:prstGeom prst="rect">
+            <a:avLst/>
+          </a:prstGeom>
+        </p:spPr>
+      </p:pic>
+      <p:sp>
+        <p:nvSpPr>
+          <p:cNvPr id="4" name="TextBox 3">
+            <a:extLst>
+              <a:ext uri="{FF2B5EF4-FFF2-40B4-BE49-F238E27FC236}">
+                <a16:creationId xmlns:a16="http://schemas.microsoft.com/office/drawing/2014/main" id="{39AEA78F-5F59-4479-87B7-16AFF5AB2EEF}"/>
+              </a:ext>
+            </a:extLst>
+          </p:cNvPr>
+          <p:cNvSpPr txBox="1"/>
+          <p:nvPr/>
+        </p:nvSpPr>
+        <p:spPr>
+          <a:xfrm>
+            <a:off x="0" y="0"/>
+            <a:ext cx="12192000" cy="369332"/>
+          </a:xfrm>
+          <a:prstGeom prst="rect">
+            <a:avLst/>
+          </a:prstGeom>
+          <a:noFill/>
+        </p:spPr>
+        <p:txBody>
+          <a:bodyPr wrap="square" rtlCol="0">
+            <a:spAutoFit/>
+          </a:bodyPr>
+          <a:lstStyle/>
+          <a:p>
+            <a:r>
+              <a:rPr lang="en-NZ" b="1" dirty="0"/>
+              <a:t>Run </a:t>
+            </a:r>
+            <a:r>
+              <a:rPr lang="en-NZ" b="1" dirty="0" err="1"/>
+              <a:t>cPCA</a:t>
+            </a:r>
+            <a:r>
+              <a:rPr lang="en-NZ" b="1" dirty="0"/>
+              <a:t> on sub-batches and combine individual </a:t>
+            </a:r>
+            <a:r>
+              <a:rPr lang="en-NZ" b="1" dirty="0" err="1"/>
+              <a:t>cPCs</a:t>
+            </a:r>
+            <a:r>
+              <a:rPr lang="en-NZ" b="1" dirty="0"/>
+              <a:t> when generating the final tree/disease scores</a:t>
+            </a:r>
+            <a:endParaRPr lang="en-GB" b="1" dirty="0"/>
+          </a:p>
+        </p:txBody>
+      </p:sp>
+      <p:sp>
+        <p:nvSpPr>
+          <p:cNvPr id="5" name="TextBox 4">
+            <a:extLst>
+              <a:ext uri="{FF2B5EF4-FFF2-40B4-BE49-F238E27FC236}">
+                <a16:creationId xmlns:a16="http://schemas.microsoft.com/office/drawing/2014/main" id="{5B6261DD-4C83-4374-92E0-3E6D8887F011}"/>
+              </a:ext>
+            </a:extLst>
+          </p:cNvPr>
+          <p:cNvSpPr txBox="1"/>
+          <p:nvPr/>
+        </p:nvSpPr>
+        <p:spPr>
+          <a:xfrm>
+            <a:off x="3380627" y="6024162"/>
+            <a:ext cx="2717374" cy="492443"/>
+          </a:xfrm>
+          <a:prstGeom prst="rect">
+            <a:avLst/>
+          </a:prstGeom>
+          <a:solidFill>
+            <a:schemeClr val="bg1"/>
+          </a:solidFill>
+        </p:spPr>
+        <p:txBody>
+          <a:bodyPr wrap="square" lIns="0" tIns="0" rIns="0" bIns="0" rtlCol="0">
+            <a:spAutoFit/>
+          </a:bodyPr>
+          <a:lstStyle/>
+          <a:p>
+            <a:pPr algn="ctr"/>
+            <a:r>
+              <a:rPr lang="en-NZ" sz="1600" b="1" dirty="0"/>
+              <a:t>10 Batches </a:t>
+            </a:r>
+          </a:p>
+          <a:p>
+            <a:pPr algn="ctr"/>
+            <a:r>
+              <a:rPr lang="en-NZ" sz="1600" b="1" dirty="0"/>
+              <a:t>(3000 Patients Each)</a:t>
+            </a:r>
+            <a:endParaRPr lang="en-GB" sz="1600" b="1" dirty="0"/>
+          </a:p>
+        </p:txBody>
+      </p:sp>
+      <p:pic>
+        <p:nvPicPr>
+          <p:cNvPr id="7" name="Picture 6">
+            <a:extLst>
+              <a:ext uri="{FF2B5EF4-FFF2-40B4-BE49-F238E27FC236}">
+                <a16:creationId xmlns:a16="http://schemas.microsoft.com/office/drawing/2014/main" id="{E9A1E23D-6402-43E7-8D9F-E68D2C1882E8}"/>
+              </a:ext>
+            </a:extLst>
+          </p:cNvPr>
+          <p:cNvPicPr>
+            <a:picLocks noChangeAspect="1"/>
+          </p:cNvPicPr>
+          <p:nvPr/>
+        </p:nvPicPr>
+        <p:blipFill>
+          <a:blip r:embed="rId3">
+            <a:extLst>
+              <a:ext uri="{28A0092B-C50C-407E-A947-70E740481C1C}">
+                <a14:useLocalDpi xmlns:a14="http://schemas.microsoft.com/office/drawing/2010/main" val="0"/>
+              </a:ext>
+            </a:extLst>
+          </a:blip>
+          <a:stretch>
+            <a:fillRect/>
+          </a:stretch>
+        </p:blipFill>
+        <p:spPr>
+          <a:xfrm>
+            <a:off x="8981679" y="378857"/>
+            <a:ext cx="3124595" cy="6243904"/>
+          </a:xfrm>
+          <a:prstGeom prst="rect">
+            <a:avLst/>
+          </a:prstGeom>
+        </p:spPr>
+      </p:pic>
+      <p:sp>
+        <p:nvSpPr>
+          <p:cNvPr id="8" name="TextBox 7">
+            <a:extLst>
+              <a:ext uri="{FF2B5EF4-FFF2-40B4-BE49-F238E27FC236}">
+                <a16:creationId xmlns:a16="http://schemas.microsoft.com/office/drawing/2014/main" id="{FFC0D1DF-D4AE-48DD-8351-A8C55314D8DA}"/>
+              </a:ext>
+            </a:extLst>
+          </p:cNvPr>
+          <p:cNvSpPr txBox="1"/>
+          <p:nvPr/>
+        </p:nvSpPr>
+        <p:spPr>
+          <a:xfrm>
+            <a:off x="9185289" y="6024162"/>
+            <a:ext cx="2717374" cy="492443"/>
+          </a:xfrm>
+          <a:prstGeom prst="rect">
+            <a:avLst/>
+          </a:prstGeom>
+          <a:solidFill>
+            <a:schemeClr val="bg1"/>
+          </a:solidFill>
+        </p:spPr>
+        <p:txBody>
+          <a:bodyPr wrap="square" lIns="0" tIns="0" rIns="0" bIns="0" rtlCol="0">
+            <a:spAutoFit/>
+          </a:bodyPr>
+          <a:lstStyle/>
+          <a:p>
+            <a:pPr algn="ctr"/>
+            <a:r>
+              <a:rPr lang="en-NZ" sz="1600" b="1" dirty="0"/>
+              <a:t>20 Batches </a:t>
+            </a:r>
+          </a:p>
+          <a:p>
+            <a:pPr algn="ctr"/>
+            <a:r>
+              <a:rPr lang="en-NZ" sz="1600" b="1" dirty="0"/>
+              <a:t>(1500 Patients Each)</a:t>
+            </a:r>
+            <a:endParaRPr lang="en-GB" sz="1600" b="1" dirty="0"/>
+          </a:p>
+        </p:txBody>
+      </p:sp>
+      <p:pic>
+        <p:nvPicPr>
+          <p:cNvPr id="10" name="Picture 9">
+            <a:extLst>
+              <a:ext uri="{FF2B5EF4-FFF2-40B4-BE49-F238E27FC236}">
+                <a16:creationId xmlns:a16="http://schemas.microsoft.com/office/drawing/2014/main" id="{354FCEEB-20C4-4702-A6A5-E2806CE18178}"/>
+              </a:ext>
+            </a:extLst>
+          </p:cNvPr>
+          <p:cNvPicPr>
+            <a:picLocks noChangeAspect="1"/>
+          </p:cNvPicPr>
+          <p:nvPr/>
+        </p:nvPicPr>
+        <p:blipFill>
+          <a:blip r:embed="rId4">
+            <a:extLst>
+              <a:ext uri="{28A0092B-C50C-407E-A947-70E740481C1C}">
+                <a14:useLocalDpi xmlns:a14="http://schemas.microsoft.com/office/drawing/2010/main" val="0"/>
+              </a:ext>
+            </a:extLst>
+          </a:blip>
+          <a:stretch>
+            <a:fillRect/>
+          </a:stretch>
+        </p:blipFill>
+        <p:spPr>
+          <a:xfrm>
+            <a:off x="85726" y="378857"/>
+            <a:ext cx="3071472" cy="6137748"/>
+          </a:xfrm>
+          <a:prstGeom prst="rect">
+            <a:avLst/>
+          </a:prstGeom>
+        </p:spPr>
+      </p:pic>
+      <p:sp>
+        <p:nvSpPr>
+          <p:cNvPr id="11" name="TextBox 10">
+            <a:extLst>
+              <a:ext uri="{FF2B5EF4-FFF2-40B4-BE49-F238E27FC236}">
+                <a16:creationId xmlns:a16="http://schemas.microsoft.com/office/drawing/2014/main" id="{D9F5A6D0-2B34-4F3E-9A73-8E137B9E2B3A}"/>
+              </a:ext>
+            </a:extLst>
+          </p:cNvPr>
+          <p:cNvSpPr txBox="1"/>
+          <p:nvPr/>
+        </p:nvSpPr>
+        <p:spPr>
+          <a:xfrm>
+            <a:off x="262775" y="5872400"/>
+            <a:ext cx="2717374" cy="492443"/>
+          </a:xfrm>
+          <a:prstGeom prst="rect">
+            <a:avLst/>
+          </a:prstGeom>
+          <a:solidFill>
+            <a:schemeClr val="bg1"/>
+          </a:solidFill>
+        </p:spPr>
+        <p:txBody>
+          <a:bodyPr wrap="square" lIns="0" tIns="0" rIns="0" bIns="0" rtlCol="0">
+            <a:spAutoFit/>
+          </a:bodyPr>
+          <a:lstStyle/>
+          <a:p>
+            <a:pPr algn="ctr"/>
+            <a:r>
+              <a:rPr lang="en-NZ" sz="1600" b="1" dirty="0"/>
+              <a:t>5 Batches </a:t>
+            </a:r>
+          </a:p>
+          <a:p>
+            <a:pPr algn="ctr"/>
+            <a:r>
+              <a:rPr lang="en-NZ" sz="1600" b="1" dirty="0"/>
+              <a:t>(6000 Patients Each)</a:t>
+            </a:r>
+            <a:endParaRPr lang="en-GB" sz="1600" b="1" dirty="0"/>
+          </a:p>
+        </p:txBody>
+      </p:sp>
     </p:spTree>
     <p:extLst>
       <p:ext uri="{BB962C8B-B14F-4D97-AF65-F5344CB8AC3E}">
@@ -8958,326 +9328,10 @@
           <a:chExt cx="0" cy="0"/>
         </a:xfrm>
       </p:grpSpPr>
-      <p:sp>
-        <p:nvSpPr>
-          <p:cNvPr id="4" name="TextBox 3">
-            <a:extLst>
-              <a:ext uri="{FF2B5EF4-FFF2-40B4-BE49-F238E27FC236}">
-                <a16:creationId xmlns:a16="http://schemas.microsoft.com/office/drawing/2014/main" id="{327B066D-B21D-4911-AF52-D1403D359AAD}"/>
-              </a:ext>
-            </a:extLst>
-          </p:cNvPr>
-          <p:cNvSpPr txBox="1"/>
-          <p:nvPr/>
-        </p:nvSpPr>
-        <p:spPr>
-          <a:xfrm>
-            <a:off x="0" y="0"/>
-            <a:ext cx="12191999" cy="523220"/>
-          </a:xfrm>
-          <a:prstGeom prst="rect">
-            <a:avLst/>
-          </a:prstGeom>
-          <a:noFill/>
-        </p:spPr>
-        <p:txBody>
-          <a:bodyPr wrap="square" rtlCol="0">
-            <a:spAutoFit/>
-          </a:bodyPr>
-          <a:lstStyle/>
-          <a:p>
-            <a:r>
-              <a:rPr lang="en-NZ" sz="2800" b="1" dirty="0"/>
-              <a:t>Testing subset 1:2800 vs 2:2802</a:t>
-            </a:r>
-            <a:endParaRPr lang="en-GB" sz="2800" b="1" dirty="0"/>
-          </a:p>
-        </p:txBody>
-      </p:sp>
-      <p:pic>
-        <p:nvPicPr>
-          <p:cNvPr id="2" name="Picture 1">
-            <a:extLst>
-              <a:ext uri="{FF2B5EF4-FFF2-40B4-BE49-F238E27FC236}">
-                <a16:creationId xmlns:a16="http://schemas.microsoft.com/office/drawing/2014/main" id="{7AF2B0FD-0BF1-43E4-ADCE-ED04868FD930}"/>
-              </a:ext>
-            </a:extLst>
-          </p:cNvPr>
-          <p:cNvPicPr>
-            <a:picLocks noChangeAspect="1"/>
-          </p:cNvPicPr>
-          <p:nvPr/>
-        </p:nvPicPr>
-        <p:blipFill rotWithShape="1">
-          <a:blip r:embed="rId2"/>
-          <a:srcRect t="4957" r="28177"/>
-          <a:stretch/>
-        </p:blipFill>
-        <p:spPr>
-          <a:xfrm>
-            <a:off x="156629" y="897830"/>
-            <a:ext cx="2605952" cy="4171604"/>
-          </a:xfrm>
-          <a:prstGeom prst="rect">
-            <a:avLst/>
-          </a:prstGeom>
-        </p:spPr>
-      </p:pic>
-      <p:pic>
-        <p:nvPicPr>
-          <p:cNvPr id="3" name="Picture 2">
-            <a:extLst>
-              <a:ext uri="{FF2B5EF4-FFF2-40B4-BE49-F238E27FC236}">
-                <a16:creationId xmlns:a16="http://schemas.microsoft.com/office/drawing/2014/main" id="{3028EAD8-2EEB-4838-8CA3-5DD5FAC0D37B}"/>
-              </a:ext>
-            </a:extLst>
-          </p:cNvPr>
-          <p:cNvPicPr>
-            <a:picLocks noChangeAspect="1"/>
-          </p:cNvPicPr>
-          <p:nvPr/>
-        </p:nvPicPr>
-        <p:blipFill rotWithShape="1">
-          <a:blip r:embed="rId3"/>
-          <a:srcRect t="4540" r="27009"/>
-          <a:stretch/>
-        </p:blipFill>
-        <p:spPr>
-          <a:xfrm>
-            <a:off x="2930830" y="897830"/>
-            <a:ext cx="2602184" cy="4156974"/>
-          </a:xfrm>
-          <a:prstGeom prst="rect">
-            <a:avLst/>
-          </a:prstGeom>
-        </p:spPr>
-      </p:pic>
-      <p:sp>
-        <p:nvSpPr>
-          <p:cNvPr id="5" name="TextBox 4">
-            <a:extLst>
-              <a:ext uri="{FF2B5EF4-FFF2-40B4-BE49-F238E27FC236}">
-                <a16:creationId xmlns:a16="http://schemas.microsoft.com/office/drawing/2014/main" id="{6F4D977B-615E-41A0-9D4F-CD40BC4ECCA4}"/>
-              </a:ext>
-            </a:extLst>
-          </p:cNvPr>
-          <p:cNvSpPr txBox="1"/>
-          <p:nvPr/>
-        </p:nvSpPr>
-        <p:spPr>
-          <a:xfrm>
-            <a:off x="156629" y="5094656"/>
-            <a:ext cx="2605952" cy="369332"/>
-          </a:xfrm>
-          <a:prstGeom prst="rect">
-            <a:avLst/>
-          </a:prstGeom>
-          <a:noFill/>
-        </p:spPr>
-        <p:txBody>
-          <a:bodyPr wrap="square" lIns="0" tIns="0" rIns="0" bIns="0" rtlCol="0">
-            <a:spAutoFit/>
-          </a:bodyPr>
-          <a:lstStyle/>
-          <a:p>
-            <a:pPr algn="ctr"/>
-            <a:r>
-              <a:rPr lang="en-NZ" sz="1200" b="1" dirty="0"/>
-              <a:t>Rows 1:2800</a:t>
-            </a:r>
-          </a:p>
-          <a:p>
-            <a:pPr algn="ctr"/>
-            <a:r>
-              <a:rPr lang="en-NZ" sz="1200" b="1" dirty="0"/>
-              <a:t>466 Variables Above Threshold</a:t>
-            </a:r>
-          </a:p>
-        </p:txBody>
-      </p:sp>
-      <p:sp>
-        <p:nvSpPr>
-          <p:cNvPr id="10" name="TextBox 9">
-            <a:extLst>
-              <a:ext uri="{FF2B5EF4-FFF2-40B4-BE49-F238E27FC236}">
-                <a16:creationId xmlns:a16="http://schemas.microsoft.com/office/drawing/2014/main" id="{A29BC89C-7380-4DAC-B053-8BC2AC9B7D18}"/>
-              </a:ext>
-            </a:extLst>
-          </p:cNvPr>
-          <p:cNvSpPr txBox="1"/>
-          <p:nvPr/>
-        </p:nvSpPr>
-        <p:spPr>
-          <a:xfrm>
-            <a:off x="2930830" y="5080026"/>
-            <a:ext cx="2605952" cy="369332"/>
-          </a:xfrm>
-          <a:prstGeom prst="rect">
-            <a:avLst/>
-          </a:prstGeom>
-          <a:noFill/>
-        </p:spPr>
-        <p:txBody>
-          <a:bodyPr wrap="square" lIns="0" tIns="0" rIns="0" bIns="0" rtlCol="0">
-            <a:spAutoFit/>
-          </a:bodyPr>
-          <a:lstStyle/>
-          <a:p>
-            <a:pPr algn="ctr"/>
-            <a:r>
-              <a:rPr lang="en-NZ" sz="1200" b="1" dirty="0"/>
-              <a:t>Rows 2:2801</a:t>
-            </a:r>
-          </a:p>
-          <a:p>
-            <a:pPr algn="ctr"/>
-            <a:r>
-              <a:rPr lang="en-NZ" sz="1200" b="1" dirty="0"/>
-              <a:t>464 Variables Above Threshold</a:t>
-            </a:r>
-          </a:p>
-        </p:txBody>
-      </p:sp>
-      <p:pic>
-        <p:nvPicPr>
-          <p:cNvPr id="11" name="Picture 10">
-            <a:extLst>
-              <a:ext uri="{FF2B5EF4-FFF2-40B4-BE49-F238E27FC236}">
-                <a16:creationId xmlns:a16="http://schemas.microsoft.com/office/drawing/2014/main" id="{683F6D36-64CE-4660-A2EB-E0C24B880E3A}"/>
-              </a:ext>
-            </a:extLst>
-          </p:cNvPr>
-          <p:cNvPicPr>
-            <a:picLocks noChangeAspect="1"/>
-          </p:cNvPicPr>
-          <p:nvPr/>
-        </p:nvPicPr>
-        <p:blipFill>
-          <a:blip r:embed="rId4"/>
-          <a:stretch>
-            <a:fillRect/>
-          </a:stretch>
-        </p:blipFill>
-        <p:spPr>
-          <a:xfrm>
-            <a:off x="5779352" y="897831"/>
-            <a:ext cx="2577164" cy="4156974"/>
-          </a:xfrm>
-          <a:prstGeom prst="rect">
-            <a:avLst/>
-          </a:prstGeom>
-        </p:spPr>
-      </p:pic>
-      <p:sp>
-        <p:nvSpPr>
-          <p:cNvPr id="12" name="TextBox 11">
-            <a:extLst>
-              <a:ext uri="{FF2B5EF4-FFF2-40B4-BE49-F238E27FC236}">
-                <a16:creationId xmlns:a16="http://schemas.microsoft.com/office/drawing/2014/main" id="{C331A33F-BB94-4D46-BABC-48A3FE8AC753}"/>
-              </a:ext>
-            </a:extLst>
-          </p:cNvPr>
-          <p:cNvSpPr txBox="1"/>
-          <p:nvPr/>
-        </p:nvSpPr>
-        <p:spPr>
-          <a:xfrm>
-            <a:off x="5779352" y="5054804"/>
-            <a:ext cx="2562770" cy="369332"/>
-          </a:xfrm>
-          <a:prstGeom prst="rect">
-            <a:avLst/>
-          </a:prstGeom>
-          <a:noFill/>
-        </p:spPr>
-        <p:txBody>
-          <a:bodyPr wrap="square" lIns="0" tIns="0" rIns="0" bIns="0" rtlCol="0">
-            <a:spAutoFit/>
-          </a:bodyPr>
-          <a:lstStyle/>
-          <a:p>
-            <a:pPr algn="ctr"/>
-            <a:r>
-              <a:rPr lang="en-NZ" sz="1200" b="1"/>
-              <a:t>Rows 3:2802</a:t>
-            </a:r>
-            <a:endParaRPr lang="en-NZ" sz="1200" b="1" dirty="0"/>
-          </a:p>
-          <a:p>
-            <a:pPr algn="ctr"/>
-            <a:r>
-              <a:rPr lang="en-NZ" sz="1200" b="1" dirty="0"/>
-              <a:t>464 Variables Above Threshold</a:t>
-            </a:r>
-          </a:p>
-        </p:txBody>
-      </p:sp>
-      <p:sp>
-        <p:nvSpPr>
-          <p:cNvPr id="13" name="TextBox 12">
-            <a:extLst>
-              <a:ext uri="{FF2B5EF4-FFF2-40B4-BE49-F238E27FC236}">
-                <a16:creationId xmlns:a16="http://schemas.microsoft.com/office/drawing/2014/main" id="{F5B0AF2A-C591-40C9-AB95-DC636B67E369}"/>
-              </a:ext>
-            </a:extLst>
-          </p:cNvPr>
-          <p:cNvSpPr txBox="1"/>
-          <p:nvPr/>
-        </p:nvSpPr>
-        <p:spPr>
-          <a:xfrm>
-            <a:off x="6307521" y="5960169"/>
-            <a:ext cx="4849418" cy="553998"/>
-          </a:xfrm>
-          <a:prstGeom prst="rect">
-            <a:avLst/>
-          </a:prstGeom>
-          <a:solidFill>
-            <a:schemeClr val="bg1"/>
-          </a:solidFill>
-        </p:spPr>
-        <p:txBody>
-          <a:bodyPr wrap="square" lIns="0" tIns="0" rIns="0" bIns="0" rtlCol="0">
-            <a:spAutoFit/>
-          </a:bodyPr>
-          <a:lstStyle/>
-          <a:p>
-            <a:r>
-              <a:rPr lang="en-NZ" sz="1200" dirty="0">
-                <a:solidFill>
-                  <a:srgbClr val="FF0000"/>
-                </a:solidFill>
-              </a:rPr>
-              <a:t>Even when we just have 1 patient different, the variables outputted by </a:t>
-            </a:r>
-            <a:r>
-              <a:rPr lang="en-NZ" sz="1200" dirty="0" err="1">
-                <a:solidFill>
-                  <a:srgbClr val="FF0000"/>
-                </a:solidFill>
-              </a:rPr>
-              <a:t>cPCA</a:t>
-            </a:r>
-            <a:r>
-              <a:rPr lang="en-NZ" sz="1200" dirty="0">
-                <a:solidFill>
-                  <a:srgbClr val="FF0000"/>
-                </a:solidFill>
-              </a:rPr>
-              <a:t> can change pretty significantly, refer to excel spreadsheet for comparison of individual variables sorted by their weighting</a:t>
-            </a:r>
-            <a:endParaRPr lang="en-GB" sz="1200" dirty="0">
-              <a:solidFill>
-                <a:srgbClr val="FF0000"/>
-              </a:solidFill>
-            </a:endParaRPr>
-          </a:p>
-        </p:txBody>
-      </p:sp>
     </p:spTree>
     <p:extLst>
       <p:ext uri="{BB962C8B-B14F-4D97-AF65-F5344CB8AC3E}">
-        <p14:creationId xmlns:p14="http://schemas.microsoft.com/office/powerpoint/2010/main" val="842150243"/>
+        <p14:creationId xmlns:p14="http://schemas.microsoft.com/office/powerpoint/2010/main" val="286555550"/>
       </p:ext>
     </p:extLst>
   </p:cSld>
@@ -9808,6 +9862,352 @@
 </file>
 
 <file path=ppt/slides/slide20.xml><?xml version="1.0" encoding="utf-8"?>
+<p:sld xmlns:a="http://schemas.openxmlformats.org/drawingml/2006/main" xmlns:r="http://schemas.openxmlformats.org/officeDocument/2006/relationships" xmlns:p="http://schemas.openxmlformats.org/presentationml/2006/main">
+  <p:cSld>
+    <p:spTree>
+      <p:nvGrpSpPr>
+        <p:cNvPr id="1" name=""/>
+        <p:cNvGrpSpPr/>
+        <p:nvPr/>
+      </p:nvGrpSpPr>
+      <p:grpSpPr>
+        <a:xfrm>
+          <a:off x="0" y="0"/>
+          <a:ext cx="0" cy="0"/>
+          <a:chOff x="0" y="0"/>
+          <a:chExt cx="0" cy="0"/>
+        </a:xfrm>
+      </p:grpSpPr>
+      <p:sp>
+        <p:nvSpPr>
+          <p:cNvPr id="4" name="TextBox 3">
+            <a:extLst>
+              <a:ext uri="{FF2B5EF4-FFF2-40B4-BE49-F238E27FC236}">
+                <a16:creationId xmlns:a16="http://schemas.microsoft.com/office/drawing/2014/main" id="{327B066D-B21D-4911-AF52-D1403D359AAD}"/>
+              </a:ext>
+            </a:extLst>
+          </p:cNvPr>
+          <p:cNvSpPr txBox="1"/>
+          <p:nvPr/>
+        </p:nvSpPr>
+        <p:spPr>
+          <a:xfrm>
+            <a:off x="0" y="0"/>
+            <a:ext cx="12191999" cy="523220"/>
+          </a:xfrm>
+          <a:prstGeom prst="rect">
+            <a:avLst/>
+          </a:prstGeom>
+          <a:noFill/>
+        </p:spPr>
+        <p:txBody>
+          <a:bodyPr wrap="square" rtlCol="0">
+            <a:spAutoFit/>
+          </a:bodyPr>
+          <a:lstStyle/>
+          <a:p>
+            <a:r>
+              <a:rPr lang="en-NZ" sz="2800" b="1" dirty="0"/>
+              <a:t>Testing subset 1:2800 vs 2:2802</a:t>
+            </a:r>
+            <a:endParaRPr lang="en-GB" sz="2800" b="1" dirty="0"/>
+          </a:p>
+        </p:txBody>
+      </p:sp>
+      <p:pic>
+        <p:nvPicPr>
+          <p:cNvPr id="2" name="Picture 1">
+            <a:extLst>
+              <a:ext uri="{FF2B5EF4-FFF2-40B4-BE49-F238E27FC236}">
+                <a16:creationId xmlns:a16="http://schemas.microsoft.com/office/drawing/2014/main" id="{7AF2B0FD-0BF1-43E4-ADCE-ED04868FD930}"/>
+              </a:ext>
+            </a:extLst>
+          </p:cNvPr>
+          <p:cNvPicPr>
+            <a:picLocks noChangeAspect="1"/>
+          </p:cNvPicPr>
+          <p:nvPr/>
+        </p:nvPicPr>
+        <p:blipFill rotWithShape="1">
+          <a:blip r:embed="rId2"/>
+          <a:srcRect t="4957" r="28177"/>
+          <a:stretch/>
+        </p:blipFill>
+        <p:spPr>
+          <a:xfrm>
+            <a:off x="156629" y="897830"/>
+            <a:ext cx="2605952" cy="4171604"/>
+          </a:xfrm>
+          <a:prstGeom prst="rect">
+            <a:avLst/>
+          </a:prstGeom>
+        </p:spPr>
+      </p:pic>
+      <p:pic>
+        <p:nvPicPr>
+          <p:cNvPr id="3" name="Picture 2">
+            <a:extLst>
+              <a:ext uri="{FF2B5EF4-FFF2-40B4-BE49-F238E27FC236}">
+                <a16:creationId xmlns:a16="http://schemas.microsoft.com/office/drawing/2014/main" id="{3028EAD8-2EEB-4838-8CA3-5DD5FAC0D37B}"/>
+              </a:ext>
+            </a:extLst>
+          </p:cNvPr>
+          <p:cNvPicPr>
+            <a:picLocks noChangeAspect="1"/>
+          </p:cNvPicPr>
+          <p:nvPr/>
+        </p:nvPicPr>
+        <p:blipFill rotWithShape="1">
+          <a:blip r:embed="rId3"/>
+          <a:srcRect t="4540" r="27009"/>
+          <a:stretch/>
+        </p:blipFill>
+        <p:spPr>
+          <a:xfrm>
+            <a:off x="2930830" y="897830"/>
+            <a:ext cx="2602184" cy="4156974"/>
+          </a:xfrm>
+          <a:prstGeom prst="rect">
+            <a:avLst/>
+          </a:prstGeom>
+        </p:spPr>
+      </p:pic>
+      <p:sp>
+        <p:nvSpPr>
+          <p:cNvPr id="5" name="TextBox 4">
+            <a:extLst>
+              <a:ext uri="{FF2B5EF4-FFF2-40B4-BE49-F238E27FC236}">
+                <a16:creationId xmlns:a16="http://schemas.microsoft.com/office/drawing/2014/main" id="{6F4D977B-615E-41A0-9D4F-CD40BC4ECCA4}"/>
+              </a:ext>
+            </a:extLst>
+          </p:cNvPr>
+          <p:cNvSpPr txBox="1"/>
+          <p:nvPr/>
+        </p:nvSpPr>
+        <p:spPr>
+          <a:xfrm>
+            <a:off x="156629" y="5094656"/>
+            <a:ext cx="2605952" cy="369332"/>
+          </a:xfrm>
+          <a:prstGeom prst="rect">
+            <a:avLst/>
+          </a:prstGeom>
+          <a:noFill/>
+        </p:spPr>
+        <p:txBody>
+          <a:bodyPr wrap="square" lIns="0" tIns="0" rIns="0" bIns="0" rtlCol="0">
+            <a:spAutoFit/>
+          </a:bodyPr>
+          <a:lstStyle/>
+          <a:p>
+            <a:pPr algn="ctr"/>
+            <a:r>
+              <a:rPr lang="en-NZ" sz="1200" b="1" dirty="0"/>
+              <a:t>Rows 1:2800</a:t>
+            </a:r>
+          </a:p>
+          <a:p>
+            <a:pPr algn="ctr"/>
+            <a:r>
+              <a:rPr lang="en-NZ" sz="1200" b="1" dirty="0"/>
+              <a:t>466 Variables Above Threshold</a:t>
+            </a:r>
+          </a:p>
+        </p:txBody>
+      </p:sp>
+      <p:sp>
+        <p:nvSpPr>
+          <p:cNvPr id="10" name="TextBox 9">
+            <a:extLst>
+              <a:ext uri="{FF2B5EF4-FFF2-40B4-BE49-F238E27FC236}">
+                <a16:creationId xmlns:a16="http://schemas.microsoft.com/office/drawing/2014/main" id="{A29BC89C-7380-4DAC-B053-8BC2AC9B7D18}"/>
+              </a:ext>
+            </a:extLst>
+          </p:cNvPr>
+          <p:cNvSpPr txBox="1"/>
+          <p:nvPr/>
+        </p:nvSpPr>
+        <p:spPr>
+          <a:xfrm>
+            <a:off x="2930830" y="5080026"/>
+            <a:ext cx="2605952" cy="369332"/>
+          </a:xfrm>
+          <a:prstGeom prst="rect">
+            <a:avLst/>
+          </a:prstGeom>
+          <a:noFill/>
+        </p:spPr>
+        <p:txBody>
+          <a:bodyPr wrap="square" lIns="0" tIns="0" rIns="0" bIns="0" rtlCol="0">
+            <a:spAutoFit/>
+          </a:bodyPr>
+          <a:lstStyle/>
+          <a:p>
+            <a:pPr algn="ctr"/>
+            <a:r>
+              <a:rPr lang="en-NZ" sz="1200" b="1" dirty="0"/>
+              <a:t>Rows 2:2801</a:t>
+            </a:r>
+          </a:p>
+          <a:p>
+            <a:pPr algn="ctr"/>
+            <a:r>
+              <a:rPr lang="en-NZ" sz="1200" b="1" dirty="0"/>
+              <a:t>464 Variables Above Threshold</a:t>
+            </a:r>
+          </a:p>
+        </p:txBody>
+      </p:sp>
+      <p:pic>
+        <p:nvPicPr>
+          <p:cNvPr id="11" name="Picture 10">
+            <a:extLst>
+              <a:ext uri="{FF2B5EF4-FFF2-40B4-BE49-F238E27FC236}">
+                <a16:creationId xmlns:a16="http://schemas.microsoft.com/office/drawing/2014/main" id="{683F6D36-64CE-4660-A2EB-E0C24B880E3A}"/>
+              </a:ext>
+            </a:extLst>
+          </p:cNvPr>
+          <p:cNvPicPr>
+            <a:picLocks noChangeAspect="1"/>
+          </p:cNvPicPr>
+          <p:nvPr/>
+        </p:nvPicPr>
+        <p:blipFill>
+          <a:blip r:embed="rId4"/>
+          <a:stretch>
+            <a:fillRect/>
+          </a:stretch>
+        </p:blipFill>
+        <p:spPr>
+          <a:xfrm>
+            <a:off x="5779352" y="897831"/>
+            <a:ext cx="2577164" cy="4156974"/>
+          </a:xfrm>
+          <a:prstGeom prst="rect">
+            <a:avLst/>
+          </a:prstGeom>
+        </p:spPr>
+      </p:pic>
+      <p:sp>
+        <p:nvSpPr>
+          <p:cNvPr id="12" name="TextBox 11">
+            <a:extLst>
+              <a:ext uri="{FF2B5EF4-FFF2-40B4-BE49-F238E27FC236}">
+                <a16:creationId xmlns:a16="http://schemas.microsoft.com/office/drawing/2014/main" id="{C331A33F-BB94-4D46-BABC-48A3FE8AC753}"/>
+              </a:ext>
+            </a:extLst>
+          </p:cNvPr>
+          <p:cNvSpPr txBox="1"/>
+          <p:nvPr/>
+        </p:nvSpPr>
+        <p:spPr>
+          <a:xfrm>
+            <a:off x="5779352" y="5054804"/>
+            <a:ext cx="2562770" cy="369332"/>
+          </a:xfrm>
+          <a:prstGeom prst="rect">
+            <a:avLst/>
+          </a:prstGeom>
+          <a:noFill/>
+        </p:spPr>
+        <p:txBody>
+          <a:bodyPr wrap="square" lIns="0" tIns="0" rIns="0" bIns="0" rtlCol="0">
+            <a:spAutoFit/>
+          </a:bodyPr>
+          <a:lstStyle/>
+          <a:p>
+            <a:pPr algn="ctr"/>
+            <a:r>
+              <a:rPr lang="en-NZ" sz="1200" b="1"/>
+              <a:t>Rows 3:2802</a:t>
+            </a:r>
+            <a:endParaRPr lang="en-NZ" sz="1200" b="1" dirty="0"/>
+          </a:p>
+          <a:p>
+            <a:pPr algn="ctr"/>
+            <a:r>
+              <a:rPr lang="en-NZ" sz="1200" b="1" dirty="0"/>
+              <a:t>464 Variables Above Threshold</a:t>
+            </a:r>
+          </a:p>
+        </p:txBody>
+      </p:sp>
+      <p:sp>
+        <p:nvSpPr>
+          <p:cNvPr id="13" name="TextBox 12">
+            <a:extLst>
+              <a:ext uri="{FF2B5EF4-FFF2-40B4-BE49-F238E27FC236}">
+                <a16:creationId xmlns:a16="http://schemas.microsoft.com/office/drawing/2014/main" id="{F5B0AF2A-C591-40C9-AB95-DC636B67E369}"/>
+              </a:ext>
+            </a:extLst>
+          </p:cNvPr>
+          <p:cNvSpPr txBox="1"/>
+          <p:nvPr/>
+        </p:nvSpPr>
+        <p:spPr>
+          <a:xfrm>
+            <a:off x="6307521" y="5960169"/>
+            <a:ext cx="4849418" cy="553998"/>
+          </a:xfrm>
+          <a:prstGeom prst="rect">
+            <a:avLst/>
+          </a:prstGeom>
+          <a:solidFill>
+            <a:schemeClr val="bg1"/>
+          </a:solidFill>
+        </p:spPr>
+        <p:txBody>
+          <a:bodyPr wrap="square" lIns="0" tIns="0" rIns="0" bIns="0" rtlCol="0">
+            <a:spAutoFit/>
+          </a:bodyPr>
+          <a:lstStyle/>
+          <a:p>
+            <a:r>
+              <a:rPr lang="en-NZ" sz="1200" dirty="0">
+                <a:solidFill>
+                  <a:srgbClr val="FF0000"/>
+                </a:solidFill>
+              </a:rPr>
+              <a:t>Even when we just have 1 patient different, the variables outputted by </a:t>
+            </a:r>
+            <a:r>
+              <a:rPr lang="en-NZ" sz="1200" dirty="0" err="1">
+                <a:solidFill>
+                  <a:srgbClr val="FF0000"/>
+                </a:solidFill>
+              </a:rPr>
+              <a:t>cPCA</a:t>
+            </a:r>
+            <a:r>
+              <a:rPr lang="en-NZ" sz="1200" dirty="0">
+                <a:solidFill>
+                  <a:srgbClr val="FF0000"/>
+                </a:solidFill>
+              </a:rPr>
+              <a:t> can change pretty significantly, refer to excel spreadsheet for comparison of individual variables sorted by their weighting</a:t>
+            </a:r>
+            <a:endParaRPr lang="en-GB" sz="1200" dirty="0">
+              <a:solidFill>
+                <a:srgbClr val="FF0000"/>
+              </a:solidFill>
+            </a:endParaRPr>
+          </a:p>
+        </p:txBody>
+      </p:sp>
+    </p:spTree>
+    <p:extLst>
+      <p:ext uri="{BB962C8B-B14F-4D97-AF65-F5344CB8AC3E}">
+        <p14:creationId xmlns:p14="http://schemas.microsoft.com/office/powerpoint/2010/main" val="842150243"/>
+      </p:ext>
+    </p:extLst>
+  </p:cSld>
+  <p:clrMapOvr>
+    <a:masterClrMapping/>
+  </p:clrMapOvr>
+</p:sld>
+</file>
+
+<file path=ppt/slides/slide21.xml><?xml version="1.0" encoding="utf-8"?>
 <p:sld xmlns:a="http://schemas.openxmlformats.org/drawingml/2006/main" xmlns:r="http://schemas.openxmlformats.org/officeDocument/2006/relationships" xmlns:p="http://schemas.openxmlformats.org/presentationml/2006/main">
   <p:cSld>
     <p:spTree>

</xml_diff>

<commit_message>
added root node on MST visualization
</commit_message>
<xml_diff>
--- a/job_results.pptx
+++ b/job_results.pptx
@@ -5,7 +5,7 @@
     <p:sldMasterId id="2147483648" r:id="rId1"/>
   </p:sldMasterIdLst>
   <p:notesMasterIdLst>
-    <p:notesMasterId r:id="rId23"/>
+    <p:notesMasterId r:id="rId24"/>
   </p:notesMasterIdLst>
   <p:sldIdLst>
     <p:sldId id="256" r:id="rId2"/>
@@ -25,10 +25,11 @@
     <p:sldId id="269" r:id="rId16"/>
     <p:sldId id="277" r:id="rId17"/>
     <p:sldId id="274" r:id="rId18"/>
-    <p:sldId id="278" r:id="rId19"/>
-    <p:sldId id="279" r:id="rId20"/>
-    <p:sldId id="275" r:id="rId21"/>
-    <p:sldId id="263" r:id="rId22"/>
+    <p:sldId id="279" r:id="rId19"/>
+    <p:sldId id="278" r:id="rId20"/>
+    <p:sldId id="280" r:id="rId21"/>
+    <p:sldId id="275" r:id="rId22"/>
+    <p:sldId id="263" r:id="rId23"/>
   </p:sldIdLst>
   <p:sldSz cx="12192000" cy="6858000"/>
   <p:notesSz cx="6858000" cy="9144000"/>
@@ -196,7 +197,7 @@
   <pc:docChgLst>
     <pc:chgData name="Zhao Xiong" userId="5eba49e5-2895-4cd9-83e8-b3064fe76704" providerId="ADAL" clId="{B606E7B2-EFF5-418A-8639-9F7537C4DA50}"/>
     <pc:docChg chg="undo custSel addSld delSld modSld sldOrd">
-      <pc:chgData name="Zhao Xiong" userId="5eba49e5-2895-4cd9-83e8-b3064fe76704" providerId="ADAL" clId="{B606E7B2-EFF5-418A-8639-9F7537C4DA50}" dt="2022-06-10T13:55:19.578" v="13157" actId="1036"/>
+      <pc:chgData name="Zhao Xiong" userId="5eba49e5-2895-4cd9-83e8-b3064fe76704" providerId="ADAL" clId="{B606E7B2-EFF5-418A-8639-9F7537C4DA50}" dt="2022-06-10T15:24:43.874" v="13325" actId="20577"/>
       <pc:docMkLst>
         <pc:docMk/>
       </pc:docMkLst>
@@ -2077,8 +2078,8 @@
           </ac:cxnSpMkLst>
         </pc:cxnChg>
       </pc:sldChg>
-      <pc:sldChg chg="addSp modSp add">
-        <pc:chgData name="Zhao Xiong" userId="5eba49e5-2895-4cd9-83e8-b3064fe76704" providerId="ADAL" clId="{B606E7B2-EFF5-418A-8639-9F7537C4DA50}" dt="2022-06-10T13:51:29.559" v="13142" actId="14100"/>
+      <pc:sldChg chg="addSp delSp modSp add">
+        <pc:chgData name="Zhao Xiong" userId="5eba49e5-2895-4cd9-83e8-b3064fe76704" providerId="ADAL" clId="{B606E7B2-EFF5-418A-8639-9F7537C4DA50}" dt="2022-06-10T15:23:20.318" v="13179" actId="1076"/>
         <pc:sldMkLst>
           <pc:docMk/>
           <pc:sldMk cId="2614382736" sldId="278"/>
@@ -2092,7 +2093,7 @@
           </ac:spMkLst>
         </pc:spChg>
         <pc:spChg chg="add mod">
-          <ac:chgData name="Zhao Xiong" userId="5eba49e5-2895-4cd9-83e8-b3064fe76704" providerId="ADAL" clId="{B606E7B2-EFF5-418A-8639-9F7537C4DA50}" dt="2022-06-10T13:49:00.555" v="13011" actId="1035"/>
+          <ac:chgData name="Zhao Xiong" userId="5eba49e5-2895-4cd9-83e8-b3064fe76704" providerId="ADAL" clId="{B606E7B2-EFF5-418A-8639-9F7537C4DA50}" dt="2022-06-10T15:21:53.887" v="13169" actId="1076"/>
           <ac:spMkLst>
             <pc:docMk/>
             <pc:sldMk cId="2614382736" sldId="278"/>
@@ -2100,7 +2101,7 @@
           </ac:spMkLst>
         </pc:spChg>
         <pc:spChg chg="add mod">
-          <ac:chgData name="Zhao Xiong" userId="5eba49e5-2895-4cd9-83e8-b3064fe76704" providerId="ADAL" clId="{B606E7B2-EFF5-418A-8639-9F7537C4DA50}" dt="2022-06-10T13:49:55.279" v="13139" actId="1076"/>
+          <ac:chgData name="Zhao Xiong" userId="5eba49e5-2895-4cd9-83e8-b3064fe76704" providerId="ADAL" clId="{B606E7B2-EFF5-418A-8639-9F7537C4DA50}" dt="2022-06-10T15:23:20.318" v="13179" actId="1076"/>
           <ac:spMkLst>
             <pc:docMk/>
             <pc:sldMk cId="2614382736" sldId="278"/>
@@ -2115,36 +2116,75 @@
             <ac:spMk id="11" creationId="{D9F5A6D0-2B34-4F3E-9A73-8E137B9E2B3A}"/>
           </ac:spMkLst>
         </pc:spChg>
-        <pc:picChg chg="add mod modCrop">
-          <ac:chgData name="Zhao Xiong" userId="5eba49e5-2895-4cd9-83e8-b3064fe76704" providerId="ADAL" clId="{B606E7B2-EFF5-418A-8639-9F7537C4DA50}" dt="2022-06-10T13:51:26.119" v="13141" actId="14100"/>
+        <pc:picChg chg="add del mod modCrop">
+          <ac:chgData name="Zhao Xiong" userId="5eba49e5-2895-4cd9-83e8-b3064fe76704" providerId="ADAL" clId="{B606E7B2-EFF5-418A-8639-9F7537C4DA50}" dt="2022-06-10T15:19:47.441" v="13163" actId="478"/>
           <ac:picMkLst>
             <pc:docMk/>
             <pc:sldMk cId="2614382736" sldId="278"/>
             <ac:picMk id="3" creationId="{319FB025-DFE9-4B6D-ACD6-88F9E6F112A3}"/>
           </ac:picMkLst>
         </pc:picChg>
-        <pc:picChg chg="add mod">
-          <ac:chgData name="Zhao Xiong" userId="5eba49e5-2895-4cd9-83e8-b3064fe76704" providerId="ADAL" clId="{B606E7B2-EFF5-418A-8639-9F7537C4DA50}" dt="2022-06-10T13:49:55.279" v="13139" actId="1076"/>
+        <pc:picChg chg="add mod ord">
+          <ac:chgData name="Zhao Xiong" userId="5eba49e5-2895-4cd9-83e8-b3064fe76704" providerId="ADAL" clId="{B606E7B2-EFF5-418A-8639-9F7537C4DA50}" dt="2022-06-10T15:19:44.551" v="13162" actId="167"/>
+          <ac:picMkLst>
+            <pc:docMk/>
+            <pc:sldMk cId="2614382736" sldId="278"/>
+            <ac:picMk id="6" creationId="{9134262D-10CD-4BE8-A558-A770283BC772}"/>
+          </ac:picMkLst>
+        </pc:picChg>
+        <pc:picChg chg="add del mod">
+          <ac:chgData name="Zhao Xiong" userId="5eba49e5-2895-4cd9-83e8-b3064fe76704" providerId="ADAL" clId="{B606E7B2-EFF5-418A-8639-9F7537C4DA50}" dt="2022-06-10T15:22:29.314" v="13171" actId="478"/>
           <ac:picMkLst>
             <pc:docMk/>
             <pc:sldMk cId="2614382736" sldId="278"/>
             <ac:picMk id="7" creationId="{E9A1E23D-6402-43E7-8D9F-E68D2C1882E8}"/>
           </ac:picMkLst>
         </pc:picChg>
-        <pc:picChg chg="add mod">
-          <ac:chgData name="Zhao Xiong" userId="5eba49e5-2895-4cd9-83e8-b3064fe76704" providerId="ADAL" clId="{B606E7B2-EFF5-418A-8639-9F7537C4DA50}" dt="2022-06-10T13:51:29.559" v="13142" actId="14100"/>
+        <pc:picChg chg="add del mod">
+          <ac:chgData name="Zhao Xiong" userId="5eba49e5-2895-4cd9-83e8-b3064fe76704" providerId="ADAL" clId="{B606E7B2-EFF5-418A-8639-9F7537C4DA50}" dt="2022-06-10T15:19:32.177" v="13158" actId="478"/>
           <ac:picMkLst>
             <pc:docMk/>
             <pc:sldMk cId="2614382736" sldId="278"/>
             <ac:picMk id="10" creationId="{354FCEEB-20C4-4702-A6A5-E2806CE18178}"/>
           </ac:picMkLst>
         </pc:picChg>
+        <pc:picChg chg="add mod ord">
+          <ac:chgData name="Zhao Xiong" userId="5eba49e5-2895-4cd9-83e8-b3064fe76704" providerId="ADAL" clId="{B606E7B2-EFF5-418A-8639-9F7537C4DA50}" dt="2022-06-10T15:21:56.247" v="13170" actId="14100"/>
+          <ac:picMkLst>
+            <pc:docMk/>
+            <pc:sldMk cId="2614382736" sldId="278"/>
+            <ac:picMk id="12" creationId="{5F9CB0EE-3DC6-463D-BD6E-B4B6EAEE10B5}"/>
+          </ac:picMkLst>
+        </pc:picChg>
+        <pc:picChg chg="add mod ord">
+          <ac:chgData name="Zhao Xiong" userId="5eba49e5-2895-4cd9-83e8-b3064fe76704" providerId="ADAL" clId="{B606E7B2-EFF5-418A-8639-9F7537C4DA50}" dt="2022-06-10T15:23:20.318" v="13179" actId="1076"/>
+          <ac:picMkLst>
+            <pc:docMk/>
+            <pc:sldMk cId="2614382736" sldId="278"/>
+            <ac:picMk id="14" creationId="{72E63266-E9BE-4A65-816B-8A50AA3C8A9E}"/>
+          </ac:picMkLst>
+        </pc:picChg>
       </pc:sldChg>
-      <pc:sldChg chg="add">
-        <pc:chgData name="Zhao Xiong" userId="5eba49e5-2895-4cd9-83e8-b3064fe76704" providerId="ADAL" clId="{B606E7B2-EFF5-418A-8639-9F7537C4DA50}" dt="2022-06-10T13:36:38.495" v="12850"/>
+      <pc:sldChg chg="addSp modSp add ord">
+        <pc:chgData name="Zhao Xiong" userId="5eba49e5-2895-4cd9-83e8-b3064fe76704" providerId="ADAL" clId="{B606E7B2-EFF5-418A-8639-9F7537C4DA50}" dt="2022-06-10T15:24:43.874" v="13325" actId="20577"/>
         <pc:sldMkLst>
           <pc:docMk/>
           <pc:sldMk cId="286555550" sldId="279"/>
+        </pc:sldMkLst>
+        <pc:spChg chg="add mod">
+          <ac:chgData name="Zhao Xiong" userId="5eba49e5-2895-4cd9-83e8-b3064fe76704" providerId="ADAL" clId="{B606E7B2-EFF5-418A-8639-9F7537C4DA50}" dt="2022-06-10T15:24:43.874" v="13325" actId="20577"/>
+          <ac:spMkLst>
+            <pc:docMk/>
+            <pc:sldMk cId="286555550" sldId="279"/>
+            <ac:spMk id="2" creationId="{9A72E9C6-8A44-48A8-B94B-F2D99E09894C}"/>
+          </ac:spMkLst>
+        </pc:spChg>
+      </pc:sldChg>
+      <pc:sldChg chg="add">
+        <pc:chgData name="Zhao Xiong" userId="5eba49e5-2895-4cd9-83e8-b3064fe76704" providerId="ADAL" clId="{B606E7B2-EFF5-418A-8639-9F7537C4DA50}" dt="2022-06-10T15:23:55.271" v="13181"/>
+        <pc:sldMkLst>
+          <pc:docMk/>
+          <pc:sldMk cId="3191795158" sldId="280"/>
         </pc:sldMkLst>
       </pc:sldChg>
     </pc:docChg>
@@ -9000,48 +9040,12 @@
           <a:chExt cx="0" cy="0"/>
         </a:xfrm>
       </p:grpSpPr>
-      <p:pic>
-        <p:nvPicPr>
-          <p:cNvPr id="3" name="Picture 2">
-            <a:extLst>
-              <a:ext uri="{FF2B5EF4-FFF2-40B4-BE49-F238E27FC236}">
-                <a16:creationId xmlns:a16="http://schemas.microsoft.com/office/drawing/2014/main" id="{319FB025-DFE9-4B6D-ACD6-88F9E6F112A3}"/>
-              </a:ext>
-            </a:extLst>
-          </p:cNvPr>
-          <p:cNvPicPr>
-            <a:picLocks noChangeAspect="1"/>
-          </p:cNvPicPr>
-          <p:nvPr/>
-        </p:nvPicPr>
-        <p:blipFill>
-          <a:blip r:embed="rId2">
-            <a:extLst>
-              <a:ext uri="{28A0092B-C50C-407E-A947-70E740481C1C}">
-                <a14:useLocalDpi xmlns:a14="http://schemas.microsoft.com/office/drawing/2010/main" val="0"/>
-              </a:ext>
-            </a:extLst>
-          </a:blip>
-          <a:stretch>
-            <a:fillRect/>
-          </a:stretch>
-        </p:blipFill>
-        <p:spPr>
-          <a:xfrm>
-            <a:off x="3245138" y="369333"/>
-            <a:ext cx="2852863" cy="6318084"/>
-          </a:xfrm>
-          <a:prstGeom prst="rect">
-            <a:avLst/>
-          </a:prstGeom>
-        </p:spPr>
-      </p:pic>
-      <p:sp>
-        <p:nvSpPr>
-          <p:cNvPr id="4" name="TextBox 3">
-            <a:extLst>
-              <a:ext uri="{FF2B5EF4-FFF2-40B4-BE49-F238E27FC236}">
-                <a16:creationId xmlns:a16="http://schemas.microsoft.com/office/drawing/2014/main" id="{39AEA78F-5F59-4479-87B7-16AFF5AB2EEF}"/>
+      <p:sp>
+        <p:nvSpPr>
+          <p:cNvPr id="2" name="TextBox 1">
+            <a:extLst>
+              <a:ext uri="{FF2B5EF4-FFF2-40B4-BE49-F238E27FC236}">
+                <a16:creationId xmlns:a16="http://schemas.microsoft.com/office/drawing/2014/main" id="{9A72E9C6-8A44-48A8-B94B-F2D99E09894C}"/>
               </a:ext>
             </a:extLst>
           </p:cNvPr>
@@ -9066,7 +9070,7 @@
           <a:p>
             <a:r>
               <a:rPr lang="en-NZ" b="1" dirty="0"/>
-              <a:t>Run </a:t>
+              <a:t>Improving full </a:t>
             </a:r>
             <a:r>
               <a:rPr lang="en-NZ" b="1" dirty="0" err="1"/>
@@ -9074,7 +9078,7 @@
             </a:r>
             <a:r>
               <a:rPr lang="en-NZ" b="1" dirty="0"/>
-              <a:t> on sub-batches and combine individual </a:t>
+              <a:t> runs (single batch) by changing the number of max </a:t>
             </a:r>
             <a:r>
               <a:rPr lang="en-NZ" b="1" dirty="0" err="1"/>
@@ -9082,226 +9086,20 @@
             </a:r>
             <a:r>
               <a:rPr lang="en-NZ" b="1" dirty="0"/>
-              <a:t> when generating the final tree/disease scores</a:t>
+              <a:t> and number </a:t>
+            </a:r>
+            <a:r>
+              <a:rPr lang="en-NZ" b="1"/>
+              <a:t>of clusters</a:t>
             </a:r>
             <a:endParaRPr lang="en-GB" b="1" dirty="0"/>
-          </a:p>
-        </p:txBody>
-      </p:sp>
-      <p:sp>
-        <p:nvSpPr>
-          <p:cNvPr id="5" name="TextBox 4">
-            <a:extLst>
-              <a:ext uri="{FF2B5EF4-FFF2-40B4-BE49-F238E27FC236}">
-                <a16:creationId xmlns:a16="http://schemas.microsoft.com/office/drawing/2014/main" id="{5B6261DD-4C83-4374-92E0-3E6D8887F011}"/>
-              </a:ext>
-            </a:extLst>
-          </p:cNvPr>
-          <p:cNvSpPr txBox="1"/>
-          <p:nvPr/>
-        </p:nvSpPr>
-        <p:spPr>
-          <a:xfrm>
-            <a:off x="3380627" y="6024162"/>
-            <a:ext cx="2717374" cy="492443"/>
-          </a:xfrm>
-          <a:prstGeom prst="rect">
-            <a:avLst/>
-          </a:prstGeom>
-          <a:solidFill>
-            <a:schemeClr val="bg1"/>
-          </a:solidFill>
-        </p:spPr>
-        <p:txBody>
-          <a:bodyPr wrap="square" lIns="0" tIns="0" rIns="0" bIns="0" rtlCol="0">
-            <a:spAutoFit/>
-          </a:bodyPr>
-          <a:lstStyle/>
-          <a:p>
-            <a:pPr algn="ctr"/>
-            <a:r>
-              <a:rPr lang="en-NZ" sz="1600" b="1" dirty="0"/>
-              <a:t>10 Batches </a:t>
-            </a:r>
-          </a:p>
-          <a:p>
-            <a:pPr algn="ctr"/>
-            <a:r>
-              <a:rPr lang="en-NZ" sz="1600" b="1" dirty="0"/>
-              <a:t>(3000 Patients Each)</a:t>
-            </a:r>
-            <a:endParaRPr lang="en-GB" sz="1600" b="1" dirty="0"/>
-          </a:p>
-        </p:txBody>
-      </p:sp>
-      <p:pic>
-        <p:nvPicPr>
-          <p:cNvPr id="7" name="Picture 6">
-            <a:extLst>
-              <a:ext uri="{FF2B5EF4-FFF2-40B4-BE49-F238E27FC236}">
-                <a16:creationId xmlns:a16="http://schemas.microsoft.com/office/drawing/2014/main" id="{E9A1E23D-6402-43E7-8D9F-E68D2C1882E8}"/>
-              </a:ext>
-            </a:extLst>
-          </p:cNvPr>
-          <p:cNvPicPr>
-            <a:picLocks noChangeAspect="1"/>
-          </p:cNvPicPr>
-          <p:nvPr/>
-        </p:nvPicPr>
-        <p:blipFill>
-          <a:blip r:embed="rId3">
-            <a:extLst>
-              <a:ext uri="{28A0092B-C50C-407E-A947-70E740481C1C}">
-                <a14:useLocalDpi xmlns:a14="http://schemas.microsoft.com/office/drawing/2010/main" val="0"/>
-              </a:ext>
-            </a:extLst>
-          </a:blip>
-          <a:stretch>
-            <a:fillRect/>
-          </a:stretch>
-        </p:blipFill>
-        <p:spPr>
-          <a:xfrm>
-            <a:off x="8981679" y="378857"/>
-            <a:ext cx="3124595" cy="6243904"/>
-          </a:xfrm>
-          <a:prstGeom prst="rect">
-            <a:avLst/>
-          </a:prstGeom>
-        </p:spPr>
-      </p:pic>
-      <p:sp>
-        <p:nvSpPr>
-          <p:cNvPr id="8" name="TextBox 7">
-            <a:extLst>
-              <a:ext uri="{FF2B5EF4-FFF2-40B4-BE49-F238E27FC236}">
-                <a16:creationId xmlns:a16="http://schemas.microsoft.com/office/drawing/2014/main" id="{FFC0D1DF-D4AE-48DD-8351-A8C55314D8DA}"/>
-              </a:ext>
-            </a:extLst>
-          </p:cNvPr>
-          <p:cNvSpPr txBox="1"/>
-          <p:nvPr/>
-        </p:nvSpPr>
-        <p:spPr>
-          <a:xfrm>
-            <a:off x="9185289" y="6024162"/>
-            <a:ext cx="2717374" cy="492443"/>
-          </a:xfrm>
-          <a:prstGeom prst="rect">
-            <a:avLst/>
-          </a:prstGeom>
-          <a:solidFill>
-            <a:schemeClr val="bg1"/>
-          </a:solidFill>
-        </p:spPr>
-        <p:txBody>
-          <a:bodyPr wrap="square" lIns="0" tIns="0" rIns="0" bIns="0" rtlCol="0">
-            <a:spAutoFit/>
-          </a:bodyPr>
-          <a:lstStyle/>
-          <a:p>
-            <a:pPr algn="ctr"/>
-            <a:r>
-              <a:rPr lang="en-NZ" sz="1600" b="1" dirty="0"/>
-              <a:t>20 Batches </a:t>
-            </a:r>
-          </a:p>
-          <a:p>
-            <a:pPr algn="ctr"/>
-            <a:r>
-              <a:rPr lang="en-NZ" sz="1600" b="1" dirty="0"/>
-              <a:t>(1500 Patients Each)</a:t>
-            </a:r>
-            <a:endParaRPr lang="en-GB" sz="1600" b="1" dirty="0"/>
-          </a:p>
-        </p:txBody>
-      </p:sp>
-      <p:pic>
-        <p:nvPicPr>
-          <p:cNvPr id="10" name="Picture 9">
-            <a:extLst>
-              <a:ext uri="{FF2B5EF4-FFF2-40B4-BE49-F238E27FC236}">
-                <a16:creationId xmlns:a16="http://schemas.microsoft.com/office/drawing/2014/main" id="{354FCEEB-20C4-4702-A6A5-E2806CE18178}"/>
-              </a:ext>
-            </a:extLst>
-          </p:cNvPr>
-          <p:cNvPicPr>
-            <a:picLocks noChangeAspect="1"/>
-          </p:cNvPicPr>
-          <p:nvPr/>
-        </p:nvPicPr>
-        <p:blipFill>
-          <a:blip r:embed="rId4">
-            <a:extLst>
-              <a:ext uri="{28A0092B-C50C-407E-A947-70E740481C1C}">
-                <a14:useLocalDpi xmlns:a14="http://schemas.microsoft.com/office/drawing/2010/main" val="0"/>
-              </a:ext>
-            </a:extLst>
-          </a:blip>
-          <a:stretch>
-            <a:fillRect/>
-          </a:stretch>
-        </p:blipFill>
-        <p:spPr>
-          <a:xfrm>
-            <a:off x="85726" y="378857"/>
-            <a:ext cx="3071472" cy="6137748"/>
-          </a:xfrm>
-          <a:prstGeom prst="rect">
-            <a:avLst/>
-          </a:prstGeom>
-        </p:spPr>
-      </p:pic>
-      <p:sp>
-        <p:nvSpPr>
-          <p:cNvPr id="11" name="TextBox 10">
-            <a:extLst>
-              <a:ext uri="{FF2B5EF4-FFF2-40B4-BE49-F238E27FC236}">
-                <a16:creationId xmlns:a16="http://schemas.microsoft.com/office/drawing/2014/main" id="{D9F5A6D0-2B34-4F3E-9A73-8E137B9E2B3A}"/>
-              </a:ext>
-            </a:extLst>
-          </p:cNvPr>
-          <p:cNvSpPr txBox="1"/>
-          <p:nvPr/>
-        </p:nvSpPr>
-        <p:spPr>
-          <a:xfrm>
-            <a:off x="262775" y="5872400"/>
-            <a:ext cx="2717374" cy="492443"/>
-          </a:xfrm>
-          <a:prstGeom prst="rect">
-            <a:avLst/>
-          </a:prstGeom>
-          <a:solidFill>
-            <a:schemeClr val="bg1"/>
-          </a:solidFill>
-        </p:spPr>
-        <p:txBody>
-          <a:bodyPr wrap="square" lIns="0" tIns="0" rIns="0" bIns="0" rtlCol="0">
-            <a:spAutoFit/>
-          </a:bodyPr>
-          <a:lstStyle/>
-          <a:p>
-            <a:pPr algn="ctr"/>
-            <a:r>
-              <a:rPr lang="en-NZ" sz="1600" b="1" dirty="0"/>
-              <a:t>5 Batches </a:t>
-            </a:r>
-          </a:p>
-          <a:p>
-            <a:pPr algn="ctr"/>
-            <a:r>
-              <a:rPr lang="en-NZ" sz="1600" b="1" dirty="0"/>
-              <a:t>(6000 Patients Each)</a:t>
-            </a:r>
-            <a:endParaRPr lang="en-GB" sz="1600" b="1" dirty="0"/>
           </a:p>
         </p:txBody>
       </p:sp>
     </p:spTree>
     <p:extLst>
       <p:ext uri="{BB962C8B-B14F-4D97-AF65-F5344CB8AC3E}">
-        <p14:creationId xmlns:p14="http://schemas.microsoft.com/office/powerpoint/2010/main" val="2614382736"/>
+        <p14:creationId xmlns:p14="http://schemas.microsoft.com/office/powerpoint/2010/main" val="286555550"/>
       </p:ext>
     </p:extLst>
   </p:cSld>
@@ -9328,10 +9126,308 @@
           <a:chExt cx="0" cy="0"/>
         </a:xfrm>
       </p:grpSpPr>
+      <p:pic>
+        <p:nvPicPr>
+          <p:cNvPr id="14" name="Picture 13">
+            <a:extLst>
+              <a:ext uri="{FF2B5EF4-FFF2-40B4-BE49-F238E27FC236}">
+                <a16:creationId xmlns:a16="http://schemas.microsoft.com/office/drawing/2014/main" id="{72E63266-E9BE-4A65-816B-8A50AA3C8A9E}"/>
+              </a:ext>
+            </a:extLst>
+          </p:cNvPr>
+          <p:cNvPicPr>
+            <a:picLocks noChangeAspect="1"/>
+          </p:cNvPicPr>
+          <p:nvPr/>
+        </p:nvPicPr>
+        <p:blipFill>
+          <a:blip r:embed="rId2">
+            <a:extLst>
+              <a:ext uri="{28A0092B-C50C-407E-A947-70E740481C1C}">
+                <a14:useLocalDpi xmlns:a14="http://schemas.microsoft.com/office/drawing/2010/main" val="0"/>
+              </a:ext>
+            </a:extLst>
+          </a:blip>
+          <a:stretch>
+            <a:fillRect/>
+          </a:stretch>
+        </p:blipFill>
+        <p:spPr>
+          <a:xfrm>
+            <a:off x="8951470" y="378855"/>
+            <a:ext cx="3076239" cy="6147273"/>
+          </a:xfrm>
+          <a:prstGeom prst="rect">
+            <a:avLst/>
+          </a:prstGeom>
+        </p:spPr>
+      </p:pic>
+      <p:pic>
+        <p:nvPicPr>
+          <p:cNvPr id="12" name="Picture 11">
+            <a:extLst>
+              <a:ext uri="{FF2B5EF4-FFF2-40B4-BE49-F238E27FC236}">
+                <a16:creationId xmlns:a16="http://schemas.microsoft.com/office/drawing/2014/main" id="{5F9CB0EE-3DC6-463D-BD6E-B4B6EAEE10B5}"/>
+              </a:ext>
+            </a:extLst>
+          </p:cNvPr>
+          <p:cNvPicPr>
+            <a:picLocks noChangeAspect="1"/>
+          </p:cNvPicPr>
+          <p:nvPr/>
+        </p:nvPicPr>
+        <p:blipFill>
+          <a:blip r:embed="rId3">
+            <a:extLst>
+              <a:ext uri="{28A0092B-C50C-407E-A947-70E740481C1C}">
+                <a14:useLocalDpi xmlns:a14="http://schemas.microsoft.com/office/drawing/2010/main" val="0"/>
+              </a:ext>
+            </a:extLst>
+          </a:blip>
+          <a:stretch>
+            <a:fillRect/>
+          </a:stretch>
+        </p:blipFill>
+        <p:spPr>
+          <a:xfrm>
+            <a:off x="3247691" y="378856"/>
+            <a:ext cx="3076239" cy="6147273"/>
+          </a:xfrm>
+          <a:prstGeom prst="rect">
+            <a:avLst/>
+          </a:prstGeom>
+        </p:spPr>
+      </p:pic>
+      <p:pic>
+        <p:nvPicPr>
+          <p:cNvPr id="6" name="Picture 5">
+            <a:extLst>
+              <a:ext uri="{FF2B5EF4-FFF2-40B4-BE49-F238E27FC236}">
+                <a16:creationId xmlns:a16="http://schemas.microsoft.com/office/drawing/2014/main" id="{9134262D-10CD-4BE8-A558-A770283BC772}"/>
+              </a:ext>
+            </a:extLst>
+          </p:cNvPr>
+          <p:cNvPicPr>
+            <a:picLocks noChangeAspect="1"/>
+          </p:cNvPicPr>
+          <p:nvPr/>
+        </p:nvPicPr>
+        <p:blipFill>
+          <a:blip r:embed="rId4">
+            <a:extLst>
+              <a:ext uri="{28A0092B-C50C-407E-A947-70E740481C1C}">
+                <a14:useLocalDpi xmlns:a14="http://schemas.microsoft.com/office/drawing/2010/main" val="0"/>
+              </a:ext>
+            </a:extLst>
+          </a:blip>
+          <a:stretch>
+            <a:fillRect/>
+          </a:stretch>
+        </p:blipFill>
+        <p:spPr>
+          <a:xfrm>
+            <a:off x="85726" y="369332"/>
+            <a:ext cx="3076239" cy="6147273"/>
+          </a:xfrm>
+          <a:prstGeom prst="rect">
+            <a:avLst/>
+          </a:prstGeom>
+        </p:spPr>
+      </p:pic>
+      <p:sp>
+        <p:nvSpPr>
+          <p:cNvPr id="4" name="TextBox 3">
+            <a:extLst>
+              <a:ext uri="{FF2B5EF4-FFF2-40B4-BE49-F238E27FC236}">
+                <a16:creationId xmlns:a16="http://schemas.microsoft.com/office/drawing/2014/main" id="{39AEA78F-5F59-4479-87B7-16AFF5AB2EEF}"/>
+              </a:ext>
+            </a:extLst>
+          </p:cNvPr>
+          <p:cNvSpPr txBox="1"/>
+          <p:nvPr/>
+        </p:nvSpPr>
+        <p:spPr>
+          <a:xfrm>
+            <a:off x="0" y="0"/>
+            <a:ext cx="12192000" cy="369332"/>
+          </a:xfrm>
+          <a:prstGeom prst="rect">
+            <a:avLst/>
+          </a:prstGeom>
+          <a:noFill/>
+        </p:spPr>
+        <p:txBody>
+          <a:bodyPr wrap="square" rtlCol="0">
+            <a:spAutoFit/>
+          </a:bodyPr>
+          <a:lstStyle/>
+          <a:p>
+            <a:r>
+              <a:rPr lang="en-NZ" b="1" dirty="0"/>
+              <a:t>Run </a:t>
+            </a:r>
+            <a:r>
+              <a:rPr lang="en-NZ" b="1" dirty="0" err="1"/>
+              <a:t>cPCA</a:t>
+            </a:r>
+            <a:r>
+              <a:rPr lang="en-NZ" b="1" dirty="0"/>
+              <a:t> on sub-batches and combine individual </a:t>
+            </a:r>
+            <a:r>
+              <a:rPr lang="en-NZ" b="1" dirty="0" err="1"/>
+              <a:t>cPCs</a:t>
+            </a:r>
+            <a:r>
+              <a:rPr lang="en-NZ" b="1" dirty="0"/>
+              <a:t> when generating the final tree/disease scores</a:t>
+            </a:r>
+            <a:endParaRPr lang="en-GB" b="1" dirty="0"/>
+          </a:p>
+        </p:txBody>
+      </p:sp>
+      <p:sp>
+        <p:nvSpPr>
+          <p:cNvPr id="5" name="TextBox 4">
+            <a:extLst>
+              <a:ext uri="{FF2B5EF4-FFF2-40B4-BE49-F238E27FC236}">
+                <a16:creationId xmlns:a16="http://schemas.microsoft.com/office/drawing/2014/main" id="{5B6261DD-4C83-4374-92E0-3E6D8887F011}"/>
+              </a:ext>
+            </a:extLst>
+          </p:cNvPr>
+          <p:cNvSpPr txBox="1"/>
+          <p:nvPr/>
+        </p:nvSpPr>
+        <p:spPr>
+          <a:xfrm>
+            <a:off x="3386767" y="5872399"/>
+            <a:ext cx="2717374" cy="492443"/>
+          </a:xfrm>
+          <a:prstGeom prst="rect">
+            <a:avLst/>
+          </a:prstGeom>
+          <a:solidFill>
+            <a:schemeClr val="bg1"/>
+          </a:solidFill>
+        </p:spPr>
+        <p:txBody>
+          <a:bodyPr wrap="square" lIns="0" tIns="0" rIns="0" bIns="0" rtlCol="0">
+            <a:spAutoFit/>
+          </a:bodyPr>
+          <a:lstStyle/>
+          <a:p>
+            <a:pPr algn="ctr"/>
+            <a:r>
+              <a:rPr lang="en-NZ" sz="1600" b="1" dirty="0"/>
+              <a:t>10 Batches </a:t>
+            </a:r>
+          </a:p>
+          <a:p>
+            <a:pPr algn="ctr"/>
+            <a:r>
+              <a:rPr lang="en-NZ" sz="1600" b="1" dirty="0"/>
+              <a:t>(3000 Patients Each)</a:t>
+            </a:r>
+            <a:endParaRPr lang="en-GB" sz="1600" b="1" dirty="0"/>
+          </a:p>
+        </p:txBody>
+      </p:sp>
+      <p:sp>
+        <p:nvSpPr>
+          <p:cNvPr id="8" name="TextBox 7">
+            <a:extLst>
+              <a:ext uri="{FF2B5EF4-FFF2-40B4-BE49-F238E27FC236}">
+                <a16:creationId xmlns:a16="http://schemas.microsoft.com/office/drawing/2014/main" id="{FFC0D1DF-D4AE-48DD-8351-A8C55314D8DA}"/>
+              </a:ext>
+            </a:extLst>
+          </p:cNvPr>
+          <p:cNvSpPr txBox="1"/>
+          <p:nvPr/>
+        </p:nvSpPr>
+        <p:spPr>
+          <a:xfrm>
+            <a:off x="9130902" y="5875444"/>
+            <a:ext cx="2717374" cy="492443"/>
+          </a:xfrm>
+          <a:prstGeom prst="rect">
+            <a:avLst/>
+          </a:prstGeom>
+          <a:solidFill>
+            <a:schemeClr val="bg1"/>
+          </a:solidFill>
+        </p:spPr>
+        <p:txBody>
+          <a:bodyPr wrap="square" lIns="0" tIns="0" rIns="0" bIns="0" rtlCol="0">
+            <a:spAutoFit/>
+          </a:bodyPr>
+          <a:lstStyle/>
+          <a:p>
+            <a:pPr algn="ctr"/>
+            <a:r>
+              <a:rPr lang="en-NZ" sz="1600" b="1" dirty="0"/>
+              <a:t>20 Batches </a:t>
+            </a:r>
+          </a:p>
+          <a:p>
+            <a:pPr algn="ctr"/>
+            <a:r>
+              <a:rPr lang="en-NZ" sz="1600" b="1" dirty="0"/>
+              <a:t>(1500 Patients Each)</a:t>
+            </a:r>
+            <a:endParaRPr lang="en-GB" sz="1600" b="1" dirty="0"/>
+          </a:p>
+        </p:txBody>
+      </p:sp>
+      <p:sp>
+        <p:nvSpPr>
+          <p:cNvPr id="11" name="TextBox 10">
+            <a:extLst>
+              <a:ext uri="{FF2B5EF4-FFF2-40B4-BE49-F238E27FC236}">
+                <a16:creationId xmlns:a16="http://schemas.microsoft.com/office/drawing/2014/main" id="{D9F5A6D0-2B34-4F3E-9A73-8E137B9E2B3A}"/>
+              </a:ext>
+            </a:extLst>
+          </p:cNvPr>
+          <p:cNvSpPr txBox="1"/>
+          <p:nvPr/>
+        </p:nvSpPr>
+        <p:spPr>
+          <a:xfrm>
+            <a:off x="262775" y="5872400"/>
+            <a:ext cx="2717374" cy="492443"/>
+          </a:xfrm>
+          <a:prstGeom prst="rect">
+            <a:avLst/>
+          </a:prstGeom>
+          <a:solidFill>
+            <a:schemeClr val="bg1"/>
+          </a:solidFill>
+        </p:spPr>
+        <p:txBody>
+          <a:bodyPr wrap="square" lIns="0" tIns="0" rIns="0" bIns="0" rtlCol="0">
+            <a:spAutoFit/>
+          </a:bodyPr>
+          <a:lstStyle/>
+          <a:p>
+            <a:pPr algn="ctr"/>
+            <a:r>
+              <a:rPr lang="en-NZ" sz="1600" b="1" dirty="0"/>
+              <a:t>5 Batches </a:t>
+            </a:r>
+          </a:p>
+          <a:p>
+            <a:pPr algn="ctr"/>
+            <a:r>
+              <a:rPr lang="en-NZ" sz="1600" b="1" dirty="0"/>
+              <a:t>(6000 Patients Each)</a:t>
+            </a:r>
+            <a:endParaRPr lang="en-GB" sz="1600" b="1" dirty="0"/>
+          </a:p>
+        </p:txBody>
+      </p:sp>
     </p:spTree>
     <p:extLst>
       <p:ext uri="{BB962C8B-B14F-4D97-AF65-F5344CB8AC3E}">
-        <p14:creationId xmlns:p14="http://schemas.microsoft.com/office/powerpoint/2010/main" val="286555550"/>
+        <p14:creationId xmlns:p14="http://schemas.microsoft.com/office/powerpoint/2010/main" val="2614382736"/>
       </p:ext>
     </p:extLst>
   </p:cSld>
@@ -9878,6 +9974,36 @@
           <a:chExt cx="0" cy="0"/>
         </a:xfrm>
       </p:grpSpPr>
+    </p:spTree>
+    <p:extLst>
+      <p:ext uri="{BB962C8B-B14F-4D97-AF65-F5344CB8AC3E}">
+        <p14:creationId xmlns:p14="http://schemas.microsoft.com/office/powerpoint/2010/main" val="3191795158"/>
+      </p:ext>
+    </p:extLst>
+  </p:cSld>
+  <p:clrMapOvr>
+    <a:masterClrMapping/>
+  </p:clrMapOvr>
+</p:sld>
+</file>
+
+<file path=ppt/slides/slide21.xml><?xml version="1.0" encoding="utf-8"?>
+<p:sld xmlns:a="http://schemas.openxmlformats.org/drawingml/2006/main" xmlns:r="http://schemas.openxmlformats.org/officeDocument/2006/relationships" xmlns:p="http://schemas.openxmlformats.org/presentationml/2006/main">
+  <p:cSld>
+    <p:spTree>
+      <p:nvGrpSpPr>
+        <p:cNvPr id="1" name=""/>
+        <p:cNvGrpSpPr/>
+        <p:nvPr/>
+      </p:nvGrpSpPr>
+      <p:grpSpPr>
+        <a:xfrm>
+          <a:off x="0" y="0"/>
+          <a:ext cx="0" cy="0"/>
+          <a:chOff x="0" y="0"/>
+          <a:chExt cx="0" cy="0"/>
+        </a:xfrm>
+      </p:grpSpPr>
       <p:sp>
         <p:nvSpPr>
           <p:cNvPr id="4" name="TextBox 3">
@@ -10207,7 +10333,7 @@
 </p:sld>
 </file>
 
-<file path=ppt/slides/slide21.xml><?xml version="1.0" encoding="utf-8"?>
+<file path=ppt/slides/slide22.xml><?xml version="1.0" encoding="utf-8"?>
 <p:sld xmlns:a="http://schemas.openxmlformats.org/drawingml/2006/main" xmlns:r="http://schemas.openxmlformats.org/officeDocument/2006/relationships" xmlns:p="http://schemas.openxmlformats.org/presentationml/2006/main">
   <p:cSld>
     <p:spTree>

</xml_diff>

<commit_message>
move python visualization to fmrib
</commit_message>
<xml_diff>
--- a/job_results.pptx
+++ b/job_results.pptx
@@ -5,7 +5,7 @@
     <p:sldMasterId id="2147483648" r:id="rId1"/>
   </p:sldMasterIdLst>
   <p:notesMasterIdLst>
-    <p:notesMasterId r:id="rId24"/>
+    <p:notesMasterId r:id="rId25"/>
   </p:notesMasterIdLst>
   <p:sldIdLst>
     <p:sldId id="256" r:id="rId2"/>
@@ -27,9 +27,10 @@
     <p:sldId id="274" r:id="rId18"/>
     <p:sldId id="279" r:id="rId19"/>
     <p:sldId id="278" r:id="rId20"/>
-    <p:sldId id="280" r:id="rId21"/>
-    <p:sldId id="275" r:id="rId22"/>
-    <p:sldId id="263" r:id="rId23"/>
+    <p:sldId id="281" r:id="rId21"/>
+    <p:sldId id="280" r:id="rId22"/>
+    <p:sldId id="275" r:id="rId23"/>
+    <p:sldId id="263" r:id="rId24"/>
   </p:sldIdLst>
   <p:sldSz cx="12192000" cy="6858000"/>
   <p:notesSz cx="6858000" cy="9144000"/>
@@ -197,7 +198,7 @@
   <pc:docChgLst>
     <pc:chgData name="Zhao Xiong" userId="5eba49e5-2895-4cd9-83e8-b3064fe76704" providerId="ADAL" clId="{B606E7B2-EFF5-418A-8639-9F7537C4DA50}"/>
     <pc:docChg chg="undo custSel addSld delSld modSld sldOrd">
-      <pc:chgData name="Zhao Xiong" userId="5eba49e5-2895-4cd9-83e8-b3064fe76704" providerId="ADAL" clId="{B606E7B2-EFF5-418A-8639-9F7537C4DA50}" dt="2022-06-10T15:24:43.874" v="13325" actId="20577"/>
+      <pc:chgData name="Zhao Xiong" userId="5eba49e5-2895-4cd9-83e8-b3064fe76704" providerId="ADAL" clId="{B606E7B2-EFF5-418A-8639-9F7537C4DA50}" dt="2022-06-11T17:41:15.449" v="13750" actId="14100"/>
       <pc:docMkLst>
         <pc:docMk/>
       </pc:docMkLst>
@@ -2079,43 +2080,75 @@
         </pc:cxnChg>
       </pc:sldChg>
       <pc:sldChg chg="addSp delSp modSp add">
-        <pc:chgData name="Zhao Xiong" userId="5eba49e5-2895-4cd9-83e8-b3064fe76704" providerId="ADAL" clId="{B606E7B2-EFF5-418A-8639-9F7537C4DA50}" dt="2022-06-10T15:23:20.318" v="13179" actId="1076"/>
+        <pc:chgData name="Zhao Xiong" userId="5eba49e5-2895-4cd9-83e8-b3064fe76704" providerId="ADAL" clId="{B606E7B2-EFF5-418A-8639-9F7537C4DA50}" dt="2022-06-11T17:38:17.713" v="13725" actId="1076"/>
         <pc:sldMkLst>
           <pc:docMk/>
           <pc:sldMk cId="2614382736" sldId="278"/>
         </pc:sldMkLst>
         <pc:spChg chg="add mod">
-          <ac:chgData name="Zhao Xiong" userId="5eba49e5-2895-4cd9-83e8-b3064fe76704" providerId="ADAL" clId="{B606E7B2-EFF5-418A-8639-9F7537C4DA50}" dt="2022-06-10T13:49:34.941" v="13138" actId="20577"/>
+          <ac:chgData name="Zhao Xiong" userId="5eba49e5-2895-4cd9-83e8-b3064fe76704" providerId="ADAL" clId="{B606E7B2-EFF5-418A-8639-9F7537C4DA50}" dt="2022-06-11T13:39:08.634" v="13334" actId="20577"/>
           <ac:spMkLst>
             <pc:docMk/>
             <pc:sldMk cId="2614382736" sldId="278"/>
             <ac:spMk id="4" creationId="{39AEA78F-5F59-4479-87B7-16AFF5AB2EEF}"/>
           </ac:spMkLst>
         </pc:spChg>
-        <pc:spChg chg="add mod">
-          <ac:chgData name="Zhao Xiong" userId="5eba49e5-2895-4cd9-83e8-b3064fe76704" providerId="ADAL" clId="{B606E7B2-EFF5-418A-8639-9F7537C4DA50}" dt="2022-06-10T15:21:53.887" v="13169" actId="1076"/>
+        <pc:spChg chg="add mod topLvl">
+          <ac:chgData name="Zhao Xiong" userId="5eba49e5-2895-4cd9-83e8-b3064fe76704" providerId="ADAL" clId="{B606E7B2-EFF5-418A-8639-9F7537C4DA50}" dt="2022-06-11T17:38:17.713" v="13725" actId="1076"/>
           <ac:spMkLst>
             <pc:docMk/>
             <pc:sldMk cId="2614382736" sldId="278"/>
             <ac:spMk id="5" creationId="{5B6261DD-4C83-4374-92E0-3E6D8887F011}"/>
           </ac:spMkLst>
         </pc:spChg>
-        <pc:spChg chg="add mod">
-          <ac:chgData name="Zhao Xiong" userId="5eba49e5-2895-4cd9-83e8-b3064fe76704" providerId="ADAL" clId="{B606E7B2-EFF5-418A-8639-9F7537C4DA50}" dt="2022-06-10T15:23:20.318" v="13179" actId="1076"/>
+        <pc:spChg chg="add del mod">
+          <ac:chgData name="Zhao Xiong" userId="5eba49e5-2895-4cd9-83e8-b3064fe76704" providerId="ADAL" clId="{B606E7B2-EFF5-418A-8639-9F7537C4DA50}" dt="2022-06-11T17:35:43.158" v="13714"/>
           <ac:spMkLst>
             <pc:docMk/>
             <pc:sldMk cId="2614382736" sldId="278"/>
             <ac:spMk id="8" creationId="{FFC0D1DF-D4AE-48DD-8351-A8C55314D8DA}"/>
           </ac:spMkLst>
         </pc:spChg>
-        <pc:spChg chg="add mod">
-          <ac:chgData name="Zhao Xiong" userId="5eba49e5-2895-4cd9-83e8-b3064fe76704" providerId="ADAL" clId="{B606E7B2-EFF5-418A-8639-9F7537C4DA50}" dt="2022-06-10T13:49:03.757" v="13015" actId="20577"/>
+        <pc:spChg chg="add del mod">
+          <ac:chgData name="Zhao Xiong" userId="5eba49e5-2895-4cd9-83e8-b3064fe76704" providerId="ADAL" clId="{B606E7B2-EFF5-418A-8639-9F7537C4DA50}" dt="2022-06-11T17:35:21.039" v="13704" actId="478"/>
+          <ac:spMkLst>
+            <pc:docMk/>
+            <pc:sldMk cId="2614382736" sldId="278"/>
+            <ac:spMk id="9" creationId="{EE71BF86-7E58-4451-96F9-7974351BE8C3}"/>
+          </ac:spMkLst>
+        </pc:spChg>
+        <pc:spChg chg="add mod topLvl">
+          <ac:chgData name="Zhao Xiong" userId="5eba49e5-2895-4cd9-83e8-b3064fe76704" providerId="ADAL" clId="{B606E7B2-EFF5-418A-8639-9F7537C4DA50}" dt="2022-06-11T17:36:27.464" v="13718" actId="165"/>
           <ac:spMkLst>
             <pc:docMk/>
             <pc:sldMk cId="2614382736" sldId="278"/>
             <ac:spMk id="11" creationId="{D9F5A6D0-2B34-4F3E-9A73-8E137B9E2B3A}"/>
           </ac:spMkLst>
         </pc:spChg>
+        <pc:spChg chg="add mod topLvl">
+          <ac:chgData name="Zhao Xiong" userId="5eba49e5-2895-4cd9-83e8-b3064fe76704" providerId="ADAL" clId="{B606E7B2-EFF5-418A-8639-9F7537C4DA50}" dt="2022-06-11T17:36:27.464" v="13718" actId="165"/>
+          <ac:spMkLst>
+            <pc:docMk/>
+            <pc:sldMk cId="2614382736" sldId="278"/>
+            <ac:spMk id="13" creationId="{55EA1411-1356-48A4-8459-5413D68B91BA}"/>
+          </ac:spMkLst>
+        </pc:spChg>
+        <pc:spChg chg="add mod topLvl">
+          <ac:chgData name="Zhao Xiong" userId="5eba49e5-2895-4cd9-83e8-b3064fe76704" providerId="ADAL" clId="{B606E7B2-EFF5-418A-8639-9F7537C4DA50}" dt="2022-06-11T17:36:27.464" v="13718" actId="165"/>
+          <ac:spMkLst>
+            <pc:docMk/>
+            <pc:sldMk cId="2614382736" sldId="278"/>
+            <ac:spMk id="16" creationId="{7674D89A-EC46-48CB-ACC4-77A9492BB3D5}"/>
+          </ac:spMkLst>
+        </pc:spChg>
+        <pc:grpChg chg="add del mod">
+          <ac:chgData name="Zhao Xiong" userId="5eba49e5-2895-4cd9-83e8-b3064fe76704" providerId="ADAL" clId="{B606E7B2-EFF5-418A-8639-9F7537C4DA50}" dt="2022-06-11T17:36:27.464" v="13718" actId="165"/>
+          <ac:grpSpMkLst>
+            <pc:docMk/>
+            <pc:sldMk cId="2614382736" sldId="278"/>
+            <ac:grpSpMk id="7" creationId="{A5C9C49C-6D52-4E32-ADCC-AEF9E45328EC}"/>
+          </ac:grpSpMkLst>
+        </pc:grpChg>
         <pc:picChg chg="add del mod modCrop">
           <ac:chgData name="Zhao Xiong" userId="5eba49e5-2895-4cd9-83e8-b3064fe76704" providerId="ADAL" clId="{B606E7B2-EFF5-418A-8639-9F7537C4DA50}" dt="2022-06-10T15:19:47.441" v="13163" actId="478"/>
           <ac:picMkLst>
@@ -2124,8 +2157,16 @@
             <ac:picMk id="3" creationId="{319FB025-DFE9-4B6D-ACD6-88F9E6F112A3}"/>
           </ac:picMkLst>
         </pc:picChg>
-        <pc:picChg chg="add mod ord">
-          <ac:chgData name="Zhao Xiong" userId="5eba49e5-2895-4cd9-83e8-b3064fe76704" providerId="ADAL" clId="{B606E7B2-EFF5-418A-8639-9F7537C4DA50}" dt="2022-06-10T15:19:44.551" v="13162" actId="167"/>
+        <pc:picChg chg="add mod ord topLvl">
+          <ac:chgData name="Zhao Xiong" userId="5eba49e5-2895-4cd9-83e8-b3064fe76704" providerId="ADAL" clId="{B606E7B2-EFF5-418A-8639-9F7537C4DA50}" dt="2022-06-11T17:36:47.705" v="13723" actId="14100"/>
+          <ac:picMkLst>
+            <pc:docMk/>
+            <pc:sldMk cId="2614382736" sldId="278"/>
+            <ac:picMk id="3" creationId="{A33D84D2-DC8D-4AD9-884D-7AA269A14858}"/>
+          </ac:picMkLst>
+        </pc:picChg>
+        <pc:picChg chg="add mod ord topLvl">
+          <ac:chgData name="Zhao Xiong" userId="5eba49e5-2895-4cd9-83e8-b3064fe76704" providerId="ADAL" clId="{B606E7B2-EFF5-418A-8639-9F7537C4DA50}" dt="2022-06-11T17:36:41.953" v="13722" actId="14100"/>
           <ac:picMkLst>
             <pc:docMk/>
             <pc:sldMk cId="2614382736" sldId="278"/>
@@ -2148,31 +2189,47 @@
             <ac:picMk id="10" creationId="{354FCEEB-20C4-4702-A6A5-E2806CE18178}"/>
           </ac:picMkLst>
         </pc:picChg>
-        <pc:picChg chg="add mod ord">
-          <ac:chgData name="Zhao Xiong" userId="5eba49e5-2895-4cd9-83e8-b3064fe76704" providerId="ADAL" clId="{B606E7B2-EFF5-418A-8639-9F7537C4DA50}" dt="2022-06-10T15:21:56.247" v="13170" actId="14100"/>
+        <pc:picChg chg="add mod ord topLvl">
+          <ac:chgData name="Zhao Xiong" userId="5eba49e5-2895-4cd9-83e8-b3064fe76704" providerId="ADAL" clId="{B606E7B2-EFF5-418A-8639-9F7537C4DA50}" dt="2022-06-11T17:36:27.464" v="13718" actId="165"/>
           <ac:picMkLst>
             <pc:docMk/>
             <pc:sldMk cId="2614382736" sldId="278"/>
             <ac:picMk id="12" creationId="{5F9CB0EE-3DC6-463D-BD6E-B4B6EAEE10B5}"/>
           </ac:picMkLst>
         </pc:picChg>
-        <pc:picChg chg="add mod ord">
-          <ac:chgData name="Zhao Xiong" userId="5eba49e5-2895-4cd9-83e8-b3064fe76704" providerId="ADAL" clId="{B606E7B2-EFF5-418A-8639-9F7537C4DA50}" dt="2022-06-10T15:23:20.318" v="13179" actId="1076"/>
+        <pc:picChg chg="add del mod ord">
+          <ac:chgData name="Zhao Xiong" userId="5eba49e5-2895-4cd9-83e8-b3064fe76704" providerId="ADAL" clId="{B606E7B2-EFF5-418A-8639-9F7537C4DA50}" dt="2022-06-11T17:35:41.083" v="13713"/>
           <ac:picMkLst>
             <pc:docMk/>
             <pc:sldMk cId="2614382736" sldId="278"/>
             <ac:picMk id="14" creationId="{72E63266-E9BE-4A65-816B-8A50AA3C8A9E}"/>
           </ac:picMkLst>
         </pc:picChg>
+        <pc:picChg chg="add mod topLvl">
+          <ac:chgData name="Zhao Xiong" userId="5eba49e5-2895-4cd9-83e8-b3064fe76704" providerId="ADAL" clId="{B606E7B2-EFF5-418A-8639-9F7537C4DA50}" dt="2022-06-11T17:36:38.081" v="13721" actId="14100"/>
+          <ac:picMkLst>
+            <pc:docMk/>
+            <pc:sldMk cId="2614382736" sldId="278"/>
+            <ac:picMk id="15" creationId="{7343A08B-450E-4570-93D3-07B38EB66E98}"/>
+          </ac:picMkLst>
+        </pc:picChg>
+        <pc:cxnChg chg="add del mod">
+          <ac:chgData name="Zhao Xiong" userId="5eba49e5-2895-4cd9-83e8-b3064fe76704" providerId="ADAL" clId="{B606E7B2-EFF5-418A-8639-9F7537C4DA50}" dt="2022-06-11T17:32:37.066" v="13692"/>
+          <ac:cxnSpMkLst>
+            <pc:docMk/>
+            <pc:sldMk cId="2614382736" sldId="278"/>
+            <ac:cxnSpMk id="10" creationId="{C6C6B8D3-553E-4C62-BDAF-B7A97E7D0756}"/>
+          </ac:cxnSpMkLst>
+        </pc:cxnChg>
       </pc:sldChg>
       <pc:sldChg chg="addSp modSp add ord">
-        <pc:chgData name="Zhao Xiong" userId="5eba49e5-2895-4cd9-83e8-b3064fe76704" providerId="ADAL" clId="{B606E7B2-EFF5-418A-8639-9F7537C4DA50}" dt="2022-06-10T15:24:43.874" v="13325" actId="20577"/>
+        <pc:chgData name="Zhao Xiong" userId="5eba49e5-2895-4cd9-83e8-b3064fe76704" providerId="ADAL" clId="{B606E7B2-EFF5-418A-8639-9F7537C4DA50}" dt="2022-06-11T13:46:05.391" v="13606" actId="113"/>
         <pc:sldMkLst>
           <pc:docMk/>
           <pc:sldMk cId="286555550" sldId="279"/>
         </pc:sldMkLst>
         <pc:spChg chg="add mod">
-          <ac:chgData name="Zhao Xiong" userId="5eba49e5-2895-4cd9-83e8-b3064fe76704" providerId="ADAL" clId="{B606E7B2-EFF5-418A-8639-9F7537C4DA50}" dt="2022-06-10T15:24:43.874" v="13325" actId="20577"/>
+          <ac:chgData name="Zhao Xiong" userId="5eba49e5-2895-4cd9-83e8-b3064fe76704" providerId="ADAL" clId="{B606E7B2-EFF5-418A-8639-9F7537C4DA50}" dt="2022-06-11T13:46:05.391" v="13606" actId="113"/>
           <ac:spMkLst>
             <pc:docMk/>
             <pc:sldMk cId="286555550" sldId="279"/>
@@ -2180,12 +2237,99 @@
           </ac:spMkLst>
         </pc:spChg>
       </pc:sldChg>
-      <pc:sldChg chg="add">
-        <pc:chgData name="Zhao Xiong" userId="5eba49e5-2895-4cd9-83e8-b3064fe76704" providerId="ADAL" clId="{B606E7B2-EFF5-418A-8639-9F7537C4DA50}" dt="2022-06-10T15:23:55.271" v="13181"/>
+      <pc:sldChg chg="addSp delSp modSp add">
+        <pc:chgData name="Zhao Xiong" userId="5eba49e5-2895-4cd9-83e8-b3064fe76704" providerId="ADAL" clId="{B606E7B2-EFF5-418A-8639-9F7537C4DA50}" dt="2022-06-11T17:38:48.969" v="13733" actId="1076"/>
         <pc:sldMkLst>
           <pc:docMk/>
           <pc:sldMk cId="3191795158" sldId="280"/>
         </pc:sldMkLst>
+        <pc:spChg chg="add mod">
+          <ac:chgData name="Zhao Xiong" userId="5eba49e5-2895-4cd9-83e8-b3064fe76704" providerId="ADAL" clId="{B606E7B2-EFF5-418A-8639-9F7537C4DA50}" dt="2022-06-11T13:42:11.352" v="13389" actId="20577"/>
+          <ac:spMkLst>
+            <pc:docMk/>
+            <pc:sldMk cId="3191795158" sldId="280"/>
+            <ac:spMk id="4" creationId="{18AF918B-E8AD-46B5-84EB-2E52A6F19681}"/>
+          </ac:spMkLst>
+        </pc:spChg>
+        <pc:spChg chg="add mod">
+          <ac:chgData name="Zhao Xiong" userId="5eba49e5-2895-4cd9-83e8-b3064fe76704" providerId="ADAL" clId="{B606E7B2-EFF5-418A-8639-9F7537C4DA50}" dt="2022-06-11T17:38:39.961" v="13731" actId="1076"/>
+          <ac:spMkLst>
+            <pc:docMk/>
+            <pc:sldMk cId="3191795158" sldId="280"/>
+            <ac:spMk id="5" creationId="{5B67B6A9-6158-44DD-A410-D89197251410}"/>
+          </ac:spMkLst>
+        </pc:spChg>
+        <pc:spChg chg="add mod">
+          <ac:chgData name="Zhao Xiong" userId="5eba49e5-2895-4cd9-83e8-b3064fe76704" providerId="ADAL" clId="{B606E7B2-EFF5-418A-8639-9F7537C4DA50}" dt="2022-06-11T17:38:48.969" v="13733" actId="1076"/>
+          <ac:spMkLst>
+            <pc:docMk/>
+            <pc:sldMk cId="3191795158" sldId="280"/>
+            <ac:spMk id="8" creationId="{3771993F-74AF-42E3-AC42-7E65534CD0DD}"/>
+          </ac:spMkLst>
+        </pc:spChg>
+        <pc:picChg chg="add mod">
+          <ac:chgData name="Zhao Xiong" userId="5eba49e5-2895-4cd9-83e8-b3064fe76704" providerId="ADAL" clId="{B606E7B2-EFF5-418A-8639-9F7537C4DA50}" dt="2022-06-11T17:38:28.469" v="13726" actId="14100"/>
+          <ac:picMkLst>
+            <pc:docMk/>
+            <pc:sldMk cId="3191795158" sldId="280"/>
+            <ac:picMk id="3" creationId="{2FCEC3B7-93E3-46EC-9360-766D1A5F2864}"/>
+          </ac:picMkLst>
+        </pc:picChg>
+        <pc:picChg chg="add mod">
+          <ac:chgData name="Zhao Xiong" userId="5eba49e5-2895-4cd9-83e8-b3064fe76704" providerId="ADAL" clId="{B606E7B2-EFF5-418A-8639-9F7537C4DA50}" dt="2022-06-11T17:38:48.969" v="13733" actId="1076"/>
+          <ac:picMkLst>
+            <pc:docMk/>
+            <pc:sldMk cId="3191795158" sldId="280"/>
+            <ac:picMk id="6" creationId="{802D6637-C750-46BB-A41B-C1ABFDD6448F}"/>
+          </ac:picMkLst>
+        </pc:picChg>
+        <pc:picChg chg="add del">
+          <ac:chgData name="Zhao Xiong" userId="5eba49e5-2895-4cd9-83e8-b3064fe76704" providerId="ADAL" clId="{B606E7B2-EFF5-418A-8639-9F7537C4DA50}" dt="2022-06-11T15:39:31.701" v="13611"/>
+          <ac:picMkLst>
+            <pc:docMk/>
+            <pc:sldMk cId="3191795158" sldId="280"/>
+            <ac:picMk id="7" creationId="{4BF5663B-0545-4FF2-AFC8-94E0D80B281F}"/>
+          </ac:picMkLst>
+        </pc:picChg>
+      </pc:sldChg>
+      <pc:sldChg chg="addSp delSp modSp add">
+        <pc:chgData name="Zhao Xiong" userId="5eba49e5-2895-4cd9-83e8-b3064fe76704" providerId="ADAL" clId="{B606E7B2-EFF5-418A-8639-9F7537C4DA50}" dt="2022-06-11T17:41:15.449" v="13750" actId="14100"/>
+        <pc:sldMkLst>
+          <pc:docMk/>
+          <pc:sldMk cId="3056703919" sldId="281"/>
+        </pc:sldMkLst>
+        <pc:spChg chg="del">
+          <ac:chgData name="Zhao Xiong" userId="5eba49e5-2895-4cd9-83e8-b3064fe76704" providerId="ADAL" clId="{B606E7B2-EFF5-418A-8639-9F7537C4DA50}" dt="2022-06-11T17:40:27.104" v="13735"/>
+          <ac:spMkLst>
+            <pc:docMk/>
+            <pc:sldMk cId="3056703919" sldId="281"/>
+            <ac:spMk id="2" creationId="{13A53524-41A1-443F-BB6E-54B39A302BC2}"/>
+          </ac:spMkLst>
+        </pc:spChg>
+        <pc:spChg chg="del">
+          <ac:chgData name="Zhao Xiong" userId="5eba49e5-2895-4cd9-83e8-b3064fe76704" providerId="ADAL" clId="{B606E7B2-EFF5-418A-8639-9F7537C4DA50}" dt="2022-06-11T17:40:27.104" v="13735"/>
+          <ac:spMkLst>
+            <pc:docMk/>
+            <pc:sldMk cId="3056703919" sldId="281"/>
+            <ac:spMk id="3" creationId="{86553003-A6F2-42CA-9A77-F34E7A0028A6}"/>
+          </ac:spMkLst>
+        </pc:spChg>
+        <pc:spChg chg="add">
+          <ac:chgData name="Zhao Xiong" userId="5eba49e5-2895-4cd9-83e8-b3064fe76704" providerId="ADAL" clId="{B606E7B2-EFF5-418A-8639-9F7537C4DA50}" dt="2022-06-11T17:40:33.064" v="13736"/>
+          <ac:spMkLst>
+            <pc:docMk/>
+            <pc:sldMk cId="3056703919" sldId="281"/>
+            <ac:spMk id="4" creationId="{A29E08DB-96CD-43FB-9E19-2EFFF47EA112}"/>
+          </ac:spMkLst>
+        </pc:spChg>
+        <pc:spChg chg="add mod">
+          <ac:chgData name="Zhao Xiong" userId="5eba49e5-2895-4cd9-83e8-b3064fe76704" providerId="ADAL" clId="{B606E7B2-EFF5-418A-8639-9F7537C4DA50}" dt="2022-06-11T17:41:15.449" v="13750" actId="14100"/>
+          <ac:spMkLst>
+            <pc:docMk/>
+            <pc:sldMk cId="3056703919" sldId="281"/>
+            <ac:spMk id="5" creationId="{C1FD59DC-8FE1-4B9B-81D0-5D1BC19580D1}"/>
+          </ac:spMkLst>
+        </pc:spChg>
       </pc:sldChg>
     </pc:docChg>
   </pc:docChgLst>
@@ -2274,7 +2418,7 @@
           <a:p>
             <a:fld id="{3F756EDF-0C8E-4F27-B2A4-7BBF4F0FD9CE}" type="datetimeFigureOut">
               <a:rPr lang="en-GB" smtClean="0"/>
-              <a:t>10/06/2022</a:t>
+              <a:t>11/06/2022</a:t>
             </a:fld>
             <a:endParaRPr lang="en-GB"/>
           </a:p>
@@ -2691,7 +2835,7 @@
           <a:p>
             <a:fld id="{B1B6DC73-6F54-48A7-AC0A-0EE4EE00B05A}" type="datetimeFigureOut">
               <a:rPr lang="en-GB" smtClean="0"/>
-              <a:t>10/06/2022</a:t>
+              <a:t>11/06/2022</a:t>
             </a:fld>
             <a:endParaRPr lang="en-GB"/>
           </a:p>
@@ -2891,7 +3035,7 @@
           <a:p>
             <a:fld id="{B1B6DC73-6F54-48A7-AC0A-0EE4EE00B05A}" type="datetimeFigureOut">
               <a:rPr lang="en-GB" smtClean="0"/>
-              <a:t>10/06/2022</a:t>
+              <a:t>11/06/2022</a:t>
             </a:fld>
             <a:endParaRPr lang="en-GB"/>
           </a:p>
@@ -3101,7 +3245,7 @@
           <a:p>
             <a:fld id="{B1B6DC73-6F54-48A7-AC0A-0EE4EE00B05A}" type="datetimeFigureOut">
               <a:rPr lang="en-GB" smtClean="0"/>
-              <a:t>10/06/2022</a:t>
+              <a:t>11/06/2022</a:t>
             </a:fld>
             <a:endParaRPr lang="en-GB"/>
           </a:p>
@@ -3301,7 +3445,7 @@
           <a:p>
             <a:fld id="{B1B6DC73-6F54-48A7-AC0A-0EE4EE00B05A}" type="datetimeFigureOut">
               <a:rPr lang="en-GB" smtClean="0"/>
-              <a:t>10/06/2022</a:t>
+              <a:t>11/06/2022</a:t>
             </a:fld>
             <a:endParaRPr lang="en-GB"/>
           </a:p>
@@ -3577,7 +3721,7 @@
           <a:p>
             <a:fld id="{B1B6DC73-6F54-48A7-AC0A-0EE4EE00B05A}" type="datetimeFigureOut">
               <a:rPr lang="en-GB" smtClean="0"/>
-              <a:t>10/06/2022</a:t>
+              <a:t>11/06/2022</a:t>
             </a:fld>
             <a:endParaRPr lang="en-GB"/>
           </a:p>
@@ -3845,7 +3989,7 @@
           <a:p>
             <a:fld id="{B1B6DC73-6F54-48A7-AC0A-0EE4EE00B05A}" type="datetimeFigureOut">
               <a:rPr lang="en-GB" smtClean="0"/>
-              <a:t>10/06/2022</a:t>
+              <a:t>11/06/2022</a:t>
             </a:fld>
             <a:endParaRPr lang="en-GB"/>
           </a:p>
@@ -4260,7 +4404,7 @@
           <a:p>
             <a:fld id="{B1B6DC73-6F54-48A7-AC0A-0EE4EE00B05A}" type="datetimeFigureOut">
               <a:rPr lang="en-GB" smtClean="0"/>
-              <a:t>10/06/2022</a:t>
+              <a:t>11/06/2022</a:t>
             </a:fld>
             <a:endParaRPr lang="en-GB"/>
           </a:p>
@@ -4402,7 +4546,7 @@
           <a:p>
             <a:fld id="{B1B6DC73-6F54-48A7-AC0A-0EE4EE00B05A}" type="datetimeFigureOut">
               <a:rPr lang="en-GB" smtClean="0"/>
-              <a:t>10/06/2022</a:t>
+              <a:t>11/06/2022</a:t>
             </a:fld>
             <a:endParaRPr lang="en-GB"/>
           </a:p>
@@ -4515,7 +4659,7 @@
           <a:p>
             <a:fld id="{B1B6DC73-6F54-48A7-AC0A-0EE4EE00B05A}" type="datetimeFigureOut">
               <a:rPr lang="en-GB" smtClean="0"/>
-              <a:t>10/06/2022</a:t>
+              <a:t>11/06/2022</a:t>
             </a:fld>
             <a:endParaRPr lang="en-GB"/>
           </a:p>
@@ -4828,7 +4972,7 @@
           <a:p>
             <a:fld id="{B1B6DC73-6F54-48A7-AC0A-0EE4EE00B05A}" type="datetimeFigureOut">
               <a:rPr lang="en-GB" smtClean="0"/>
-              <a:t>10/06/2022</a:t>
+              <a:t>11/06/2022</a:t>
             </a:fld>
             <a:endParaRPr lang="en-GB"/>
           </a:p>
@@ -5117,7 +5261,7 @@
           <a:p>
             <a:fld id="{B1B6DC73-6F54-48A7-AC0A-0EE4EE00B05A}" type="datetimeFigureOut">
               <a:rPr lang="en-GB" smtClean="0"/>
-              <a:t>10/06/2022</a:t>
+              <a:t>11/06/2022</a:t>
             </a:fld>
             <a:endParaRPr lang="en-GB"/>
           </a:p>
@@ -5360,7 +5504,7 @@
           <a:p>
             <a:fld id="{B1B6DC73-6F54-48A7-AC0A-0EE4EE00B05A}" type="datetimeFigureOut">
               <a:rPr lang="en-GB" smtClean="0"/>
-              <a:t>10/06/2022</a:t>
+              <a:t>11/06/2022</a:t>
             </a:fld>
             <a:endParaRPr lang="en-GB"/>
           </a:p>
@@ -9055,7 +9199,7 @@
         <p:spPr>
           <a:xfrm>
             <a:off x="0" y="0"/>
-            <a:ext cx="12192000" cy="369332"/>
+            <a:ext cx="12192000" cy="646331"/>
           </a:xfrm>
           <a:prstGeom prst="rect">
             <a:avLst/>
@@ -9086,13 +9230,31 @@
             </a:r>
             <a:r>
               <a:rPr lang="en-NZ" b="1" dirty="0"/>
-              <a:t> and number </a:t>
-            </a:r>
-            <a:r>
-              <a:rPr lang="en-NZ" b="1"/>
-              <a:t>of clusters</a:t>
-            </a:r>
-            <a:endParaRPr lang="en-GB" b="1" dirty="0"/>
+              <a:t> and number of clusters</a:t>
+            </a:r>
+          </a:p>
+          <a:p>
+            <a:r>
+              <a:rPr lang="en-NZ" dirty="0"/>
+              <a:t>Best: max </a:t>
+            </a:r>
+            <a:r>
+              <a:rPr lang="en-NZ" dirty="0" err="1"/>
+              <a:t>cPC</a:t>
+            </a:r>
+            <a:r>
+              <a:rPr lang="en-NZ" dirty="0"/>
+              <a:t> = 250, filter out eigen vectors in </a:t>
+            </a:r>
+            <a:r>
+              <a:rPr lang="en-NZ" dirty="0" err="1"/>
+              <a:t>cPCA</a:t>
+            </a:r>
+            <a:r>
+              <a:rPr lang="en-NZ" dirty="0"/>
+              <a:t> with large values, 100 clusters for clustering tendency, 160/100 target</a:t>
+            </a:r>
+            <a:endParaRPr lang="en-GB" dirty="0"/>
           </a:p>
         </p:txBody>
       </p:sp>
@@ -9126,12 +9288,64 @@
           <a:chExt cx="0" cy="0"/>
         </a:xfrm>
       </p:grpSpPr>
+      <p:sp>
+        <p:nvSpPr>
+          <p:cNvPr id="4" name="TextBox 3">
+            <a:extLst>
+              <a:ext uri="{FF2B5EF4-FFF2-40B4-BE49-F238E27FC236}">
+                <a16:creationId xmlns:a16="http://schemas.microsoft.com/office/drawing/2014/main" id="{39AEA78F-5F59-4479-87B7-16AFF5AB2EEF}"/>
+              </a:ext>
+            </a:extLst>
+          </p:cNvPr>
+          <p:cNvSpPr txBox="1"/>
+          <p:nvPr/>
+        </p:nvSpPr>
+        <p:spPr>
+          <a:xfrm>
+            <a:off x="0" y="0"/>
+            <a:ext cx="12192000" cy="369332"/>
+          </a:xfrm>
+          <a:prstGeom prst="rect">
+            <a:avLst/>
+          </a:prstGeom>
+          <a:noFill/>
+        </p:spPr>
+        <p:txBody>
+          <a:bodyPr wrap="square" rtlCol="0">
+            <a:spAutoFit/>
+          </a:bodyPr>
+          <a:lstStyle/>
+          <a:p>
+            <a:r>
+              <a:rPr lang="en-NZ" b="1" dirty="0"/>
+              <a:t>Run </a:t>
+            </a:r>
+            <a:r>
+              <a:rPr lang="en-NZ" b="1" dirty="0" err="1"/>
+              <a:t>cPCA</a:t>
+            </a:r>
+            <a:r>
+              <a:rPr lang="en-NZ" b="1" dirty="0"/>
+              <a:t> on sub-batches and combine individual </a:t>
+            </a:r>
+            <a:r>
+              <a:rPr lang="en-NZ" b="1" dirty="0" err="1"/>
+              <a:t>cPCs</a:t>
+            </a:r>
+            <a:r>
+              <a:rPr lang="en-NZ" b="1" dirty="0"/>
+              <a:t> when generating the final tree/disease scores (140/80)</a:t>
+            </a:r>
+            <a:endParaRPr lang="en-GB" b="1" dirty="0"/>
+          </a:p>
+        </p:txBody>
+      </p:sp>
       <p:pic>
         <p:nvPicPr>
-          <p:cNvPr id="14" name="Picture 13">
-            <a:extLst>
-              <a:ext uri="{FF2B5EF4-FFF2-40B4-BE49-F238E27FC236}">
-                <a16:creationId xmlns:a16="http://schemas.microsoft.com/office/drawing/2014/main" id="{72E63266-E9BE-4A65-816B-8A50AA3C8A9E}"/>
+          <p:cNvPr id="3" name="Picture 2">
+            <a:extLst>
+              <a:ext uri="{FF2B5EF4-FFF2-40B4-BE49-F238E27FC236}">
+                <a16:creationId xmlns:a16="http://schemas.microsoft.com/office/drawing/2014/main" id="{A33D84D2-DC8D-4AD9-884D-7AA269A14858}"/>
               </a:ext>
             </a:extLst>
           </p:cNvPr>
@@ -9154,8 +9368,8 @@
         </p:blipFill>
         <p:spPr>
           <a:xfrm>
-            <a:off x="8951470" y="378855"/>
-            <a:ext cx="3076239" cy="6147273"/>
+            <a:off x="6137075" y="559412"/>
+            <a:ext cx="2947952" cy="5900043"/>
           </a:xfrm>
           <a:prstGeom prst="rect">
             <a:avLst/>
@@ -9190,8 +9404,8 @@
         </p:blipFill>
         <p:spPr>
           <a:xfrm>
-            <a:off x="3247691" y="378856"/>
-            <a:ext cx="3076239" cy="6147273"/>
+            <a:off x="3106974" y="568539"/>
+            <a:ext cx="2947952" cy="5890915"/>
           </a:xfrm>
           <a:prstGeom prst="rect">
             <a:avLst/>
@@ -9226,8 +9440,8 @@
         </p:blipFill>
         <p:spPr>
           <a:xfrm>
-            <a:off x="85726" y="369332"/>
-            <a:ext cx="3076239" cy="6147273"/>
+            <a:off x="76871" y="559412"/>
+            <a:ext cx="2947952" cy="5900041"/>
           </a:xfrm>
           <a:prstGeom prst="rect">
             <a:avLst/>
@@ -9236,10 +9450,10 @@
       </p:pic>
       <p:sp>
         <p:nvSpPr>
-          <p:cNvPr id="4" name="TextBox 3">
-            <a:extLst>
-              <a:ext uri="{FF2B5EF4-FFF2-40B4-BE49-F238E27FC236}">
-                <a16:creationId xmlns:a16="http://schemas.microsoft.com/office/drawing/2014/main" id="{39AEA78F-5F59-4479-87B7-16AFF5AB2EEF}"/>
+          <p:cNvPr id="5" name="TextBox 4">
+            <a:extLst>
+              <a:ext uri="{FF2B5EF4-FFF2-40B4-BE49-F238E27FC236}">
+                <a16:creationId xmlns:a16="http://schemas.microsoft.com/office/drawing/2014/main" id="{5B6261DD-4C83-4374-92E0-3E6D8887F011}"/>
               </a:ext>
             </a:extLst>
           </p:cNvPr>
@@ -9248,60 +9462,8 @@
         </p:nvSpPr>
         <p:spPr>
           <a:xfrm>
-            <a:off x="0" y="0"/>
-            <a:ext cx="12192000" cy="369332"/>
-          </a:xfrm>
-          <a:prstGeom prst="rect">
-            <a:avLst/>
-          </a:prstGeom>
-          <a:noFill/>
-        </p:spPr>
-        <p:txBody>
-          <a:bodyPr wrap="square" rtlCol="0">
-            <a:spAutoFit/>
-          </a:bodyPr>
-          <a:lstStyle/>
-          <a:p>
-            <a:r>
-              <a:rPr lang="en-NZ" b="1" dirty="0"/>
-              <a:t>Run </a:t>
-            </a:r>
-            <a:r>
-              <a:rPr lang="en-NZ" b="1" dirty="0" err="1"/>
-              <a:t>cPCA</a:t>
-            </a:r>
-            <a:r>
-              <a:rPr lang="en-NZ" b="1" dirty="0"/>
-              <a:t> on sub-batches and combine individual </a:t>
-            </a:r>
-            <a:r>
-              <a:rPr lang="en-NZ" b="1" dirty="0" err="1"/>
-              <a:t>cPCs</a:t>
-            </a:r>
-            <a:r>
-              <a:rPr lang="en-NZ" b="1" dirty="0"/>
-              <a:t> when generating the final tree/disease scores</a:t>
-            </a:r>
-            <a:endParaRPr lang="en-GB" b="1" dirty="0"/>
-          </a:p>
-        </p:txBody>
-      </p:sp>
-      <p:sp>
-        <p:nvSpPr>
-          <p:cNvPr id="5" name="TextBox 4">
-            <a:extLst>
-              <a:ext uri="{FF2B5EF4-FFF2-40B4-BE49-F238E27FC236}">
-                <a16:creationId xmlns:a16="http://schemas.microsoft.com/office/drawing/2014/main" id="{5B6261DD-4C83-4374-92E0-3E6D8887F011}"/>
-              </a:ext>
-            </a:extLst>
-          </p:cNvPr>
-          <p:cNvSpPr txBox="1"/>
-          <p:nvPr/>
-        </p:nvSpPr>
-        <p:spPr>
-          <a:xfrm>
-            <a:off x="3386767" y="5872399"/>
-            <a:ext cx="2717374" cy="492443"/>
+            <a:off x="3381835" y="5822718"/>
+            <a:ext cx="2515539" cy="492443"/>
           </a:xfrm>
           <a:prstGeom prst="rect">
             <a:avLst/>
@@ -9334,10 +9496,10 @@
       </p:sp>
       <p:sp>
         <p:nvSpPr>
-          <p:cNvPr id="8" name="TextBox 7">
-            <a:extLst>
-              <a:ext uri="{FF2B5EF4-FFF2-40B4-BE49-F238E27FC236}">
-                <a16:creationId xmlns:a16="http://schemas.microsoft.com/office/drawing/2014/main" id="{FFC0D1DF-D4AE-48DD-8351-A8C55314D8DA}"/>
+          <p:cNvPr id="11" name="TextBox 10">
+            <a:extLst>
+              <a:ext uri="{FF2B5EF4-FFF2-40B4-BE49-F238E27FC236}">
+                <a16:creationId xmlns:a16="http://schemas.microsoft.com/office/drawing/2014/main" id="{D9F5A6D0-2B34-4F3E-9A73-8E137B9E2B3A}"/>
               </a:ext>
             </a:extLst>
           </p:cNvPr>
@@ -9346,8 +9508,8 @@
         </p:nvSpPr>
         <p:spPr>
           <a:xfrm>
-            <a:off x="9130902" y="5875444"/>
-            <a:ext cx="2717374" cy="492443"/>
+            <a:off x="246537" y="5832987"/>
+            <a:ext cx="2604052" cy="471907"/>
           </a:xfrm>
           <a:prstGeom prst="rect">
             <a:avLst/>
@@ -9365,14 +9527,14 @@
             <a:pPr algn="ctr"/>
             <a:r>
               <a:rPr lang="en-NZ" sz="1600" b="1" dirty="0"/>
-              <a:t>20 Batches </a:t>
+              <a:t>5 Batches </a:t>
             </a:r>
           </a:p>
           <a:p>
             <a:pPr algn="ctr"/>
             <a:r>
               <a:rPr lang="en-NZ" sz="1600" b="1" dirty="0"/>
-              <a:t>(1500 Patients Each)</a:t>
+              <a:t>(6000 Patients Each)</a:t>
             </a:r>
             <a:endParaRPr lang="en-GB" sz="1600" b="1" dirty="0"/>
           </a:p>
@@ -9380,10 +9542,10 @@
       </p:sp>
       <p:sp>
         <p:nvSpPr>
-          <p:cNvPr id="11" name="TextBox 10">
-            <a:extLst>
-              <a:ext uri="{FF2B5EF4-FFF2-40B4-BE49-F238E27FC236}">
-                <a16:creationId xmlns:a16="http://schemas.microsoft.com/office/drawing/2014/main" id="{D9F5A6D0-2B34-4F3E-9A73-8E137B9E2B3A}"/>
+          <p:cNvPr id="13" name="TextBox 12">
+            <a:extLst>
+              <a:ext uri="{FF2B5EF4-FFF2-40B4-BE49-F238E27FC236}">
+                <a16:creationId xmlns:a16="http://schemas.microsoft.com/office/drawing/2014/main" id="{55EA1411-1356-48A4-8459-5413D68B91BA}"/>
               </a:ext>
             </a:extLst>
           </p:cNvPr>
@@ -9392,8 +9554,8 @@
         </p:nvSpPr>
         <p:spPr>
           <a:xfrm>
-            <a:off x="262775" y="5872400"/>
-            <a:ext cx="2717374" cy="492443"/>
+            <a:off x="6441015" y="5863791"/>
+            <a:ext cx="2404311" cy="471907"/>
           </a:xfrm>
           <a:prstGeom prst="rect">
             <a:avLst/>
@@ -9411,14 +9573,96 @@
             <a:pPr algn="ctr"/>
             <a:r>
               <a:rPr lang="en-NZ" sz="1600" b="1" dirty="0"/>
-              <a:t>5 Batches </a:t>
+              <a:t>15 Batches </a:t>
             </a:r>
           </a:p>
           <a:p>
             <a:pPr algn="ctr"/>
             <a:r>
               <a:rPr lang="en-NZ" sz="1600" b="1" dirty="0"/>
-              <a:t>(6000 Patients Each)</a:t>
+              <a:t>(2000 Patients Each)</a:t>
+            </a:r>
+            <a:endParaRPr lang="en-GB" sz="1600" b="1" dirty="0"/>
+          </a:p>
+        </p:txBody>
+      </p:sp>
+      <p:pic>
+        <p:nvPicPr>
+          <p:cNvPr id="15" name="Picture 14">
+            <a:extLst>
+              <a:ext uri="{FF2B5EF4-FFF2-40B4-BE49-F238E27FC236}">
+                <a16:creationId xmlns:a16="http://schemas.microsoft.com/office/drawing/2014/main" id="{7343A08B-450E-4570-93D3-07B38EB66E98}"/>
+              </a:ext>
+            </a:extLst>
+          </p:cNvPr>
+          <p:cNvPicPr>
+            <a:picLocks noChangeAspect="1"/>
+          </p:cNvPicPr>
+          <p:nvPr/>
+        </p:nvPicPr>
+        <p:blipFill>
+          <a:blip r:embed="rId5">
+            <a:extLst>
+              <a:ext uri="{28A0092B-C50C-407E-A947-70E740481C1C}">
+                <a14:useLocalDpi xmlns:a14="http://schemas.microsoft.com/office/drawing/2010/main" val="0"/>
+              </a:ext>
+            </a:extLst>
+          </a:blip>
+          <a:stretch>
+            <a:fillRect/>
+          </a:stretch>
+        </p:blipFill>
+        <p:spPr>
+          <a:xfrm>
+            <a:off x="9167177" y="559413"/>
+            <a:ext cx="2947952" cy="5900041"/>
+          </a:xfrm>
+          <a:prstGeom prst="rect">
+            <a:avLst/>
+          </a:prstGeom>
+        </p:spPr>
+      </p:pic>
+      <p:sp>
+        <p:nvSpPr>
+          <p:cNvPr id="16" name="TextBox 15">
+            <a:extLst>
+              <a:ext uri="{FF2B5EF4-FFF2-40B4-BE49-F238E27FC236}">
+                <a16:creationId xmlns:a16="http://schemas.microsoft.com/office/drawing/2014/main" id="{7674D89A-EC46-48CB-ACC4-77A9492BB3D5}"/>
+              </a:ext>
+            </a:extLst>
+          </p:cNvPr>
+          <p:cNvSpPr txBox="1"/>
+          <p:nvPr/>
+        </p:nvSpPr>
+        <p:spPr>
+          <a:xfrm>
+            <a:off x="9339126" y="5835905"/>
+            <a:ext cx="2604052" cy="471907"/>
+          </a:xfrm>
+          <a:prstGeom prst="rect">
+            <a:avLst/>
+          </a:prstGeom>
+          <a:solidFill>
+            <a:schemeClr val="bg1"/>
+          </a:solidFill>
+        </p:spPr>
+        <p:txBody>
+          <a:bodyPr wrap="square" lIns="0" tIns="0" rIns="0" bIns="0" rtlCol="0">
+            <a:spAutoFit/>
+          </a:bodyPr>
+          <a:lstStyle/>
+          <a:p>
+            <a:pPr algn="ctr"/>
+            <a:r>
+              <a:rPr lang="en-NZ" sz="1600" b="1" dirty="0"/>
+              <a:t>20 Batches </a:t>
+            </a:r>
+          </a:p>
+          <a:p>
+            <a:pPr algn="ctr"/>
+            <a:r>
+              <a:rPr lang="en-NZ" sz="1600" b="1" dirty="0"/>
+              <a:t>(1500 Patients Each)</a:t>
             </a:r>
             <a:endParaRPr lang="en-GB" sz="1600" b="1" dirty="0"/>
           </a:p>
@@ -9974,10 +10218,108 @@
           <a:chExt cx="0" cy="0"/>
         </a:xfrm>
       </p:grpSpPr>
+      <p:sp>
+        <p:nvSpPr>
+          <p:cNvPr id="4" name="TextBox 3">
+            <a:extLst>
+              <a:ext uri="{FF2B5EF4-FFF2-40B4-BE49-F238E27FC236}">
+                <a16:creationId xmlns:a16="http://schemas.microsoft.com/office/drawing/2014/main" id="{A29E08DB-96CD-43FB-9E19-2EFFF47EA112}"/>
+              </a:ext>
+            </a:extLst>
+          </p:cNvPr>
+          <p:cNvSpPr txBox="1"/>
+          <p:nvPr/>
+        </p:nvSpPr>
+        <p:spPr>
+          <a:xfrm>
+            <a:off x="0" y="0"/>
+            <a:ext cx="12192000" cy="369332"/>
+          </a:xfrm>
+          <a:prstGeom prst="rect">
+            <a:avLst/>
+          </a:prstGeom>
+          <a:noFill/>
+        </p:spPr>
+        <p:txBody>
+          <a:bodyPr wrap="square" rtlCol="0">
+            <a:spAutoFit/>
+          </a:bodyPr>
+          <a:lstStyle/>
+          <a:p>
+            <a:r>
+              <a:rPr lang="en-NZ" b="1" dirty="0"/>
+              <a:t>Run </a:t>
+            </a:r>
+            <a:r>
+              <a:rPr lang="en-NZ" b="1" dirty="0" err="1"/>
+              <a:t>cPCA</a:t>
+            </a:r>
+            <a:r>
+              <a:rPr lang="en-NZ" b="1" dirty="0"/>
+              <a:t> on sub-batches and combine individual </a:t>
+            </a:r>
+            <a:r>
+              <a:rPr lang="en-NZ" b="1" dirty="0" err="1"/>
+              <a:t>cPCs</a:t>
+            </a:r>
+            <a:r>
+              <a:rPr lang="en-NZ" b="1" dirty="0"/>
+              <a:t> when generating the final tree/disease scores (140/80)</a:t>
+            </a:r>
+            <a:endParaRPr lang="en-GB" b="1" dirty="0"/>
+          </a:p>
+        </p:txBody>
+      </p:sp>
+      <p:sp>
+        <p:nvSpPr>
+          <p:cNvPr id="5" name="TextBox 4">
+            <a:extLst>
+              <a:ext uri="{FF2B5EF4-FFF2-40B4-BE49-F238E27FC236}">
+                <a16:creationId xmlns:a16="http://schemas.microsoft.com/office/drawing/2014/main" id="{C1FD59DC-8FE1-4B9B-81D0-5D1BC19580D1}"/>
+              </a:ext>
+            </a:extLst>
+          </p:cNvPr>
+          <p:cNvSpPr txBox="1"/>
+          <p:nvPr/>
+        </p:nvSpPr>
+        <p:spPr>
+          <a:xfrm>
+            <a:off x="109156" y="6195413"/>
+            <a:ext cx="2165121" cy="492443"/>
+          </a:xfrm>
+          <a:prstGeom prst="rect">
+            <a:avLst/>
+          </a:prstGeom>
+          <a:solidFill>
+            <a:schemeClr val="bg1"/>
+          </a:solidFill>
+        </p:spPr>
+        <p:txBody>
+          <a:bodyPr wrap="square" lIns="0" tIns="0" rIns="0" bIns="0" rtlCol="0">
+            <a:spAutoFit/>
+          </a:bodyPr>
+          <a:lstStyle/>
+          <a:p>
+            <a:pPr algn="ctr"/>
+            <a:r>
+              <a:rPr lang="en-NZ" sz="1600" b="1" dirty="0"/>
+              <a:t>25 Batches </a:t>
+            </a:r>
+          </a:p>
+          <a:p>
+            <a:pPr algn="ctr"/>
+            <a:r>
+              <a:rPr lang="en-NZ" sz="1600" b="1" dirty="0"/>
+              <a:t>(1200 Patients Each)</a:t>
+            </a:r>
+            <a:endParaRPr lang="en-GB" sz="1600" b="1" dirty="0"/>
+          </a:p>
+        </p:txBody>
+      </p:sp>
     </p:spTree>
     <p:extLst>
       <p:ext uri="{BB962C8B-B14F-4D97-AF65-F5344CB8AC3E}">
-        <p14:creationId xmlns:p14="http://schemas.microsoft.com/office/powerpoint/2010/main" val="3191795158"/>
+        <p14:creationId xmlns:p14="http://schemas.microsoft.com/office/powerpoint/2010/main" val="3056703919"/>
       </p:ext>
     </p:extLst>
   </p:cSld>
@@ -10004,6 +10346,252 @@
           <a:chExt cx="0" cy="0"/>
         </a:xfrm>
       </p:grpSpPr>
+      <p:pic>
+        <p:nvPicPr>
+          <p:cNvPr id="3" name="Picture 2">
+            <a:extLst>
+              <a:ext uri="{FF2B5EF4-FFF2-40B4-BE49-F238E27FC236}">
+                <a16:creationId xmlns:a16="http://schemas.microsoft.com/office/drawing/2014/main" id="{2FCEC3B7-93E3-46EC-9360-766D1A5F2864}"/>
+              </a:ext>
+            </a:extLst>
+          </p:cNvPr>
+          <p:cNvPicPr>
+            <a:picLocks noChangeAspect="1"/>
+          </p:cNvPicPr>
+          <p:nvPr/>
+        </p:nvPicPr>
+        <p:blipFill>
+          <a:blip r:embed="rId2">
+            <a:extLst>
+              <a:ext uri="{28A0092B-C50C-407E-A947-70E740481C1C}">
+                <a14:useLocalDpi xmlns:a14="http://schemas.microsoft.com/office/drawing/2010/main" val="0"/>
+              </a:ext>
+            </a:extLst>
+          </a:blip>
+          <a:stretch>
+            <a:fillRect/>
+          </a:stretch>
+        </p:blipFill>
+        <p:spPr>
+          <a:xfrm>
+            <a:off x="104821" y="617416"/>
+            <a:ext cx="3018114" cy="6031120"/>
+          </a:xfrm>
+          <a:prstGeom prst="rect">
+            <a:avLst/>
+          </a:prstGeom>
+        </p:spPr>
+      </p:pic>
+      <p:sp>
+        <p:nvSpPr>
+          <p:cNvPr id="4" name="TextBox 3">
+            <a:extLst>
+              <a:ext uri="{FF2B5EF4-FFF2-40B4-BE49-F238E27FC236}">
+                <a16:creationId xmlns:a16="http://schemas.microsoft.com/office/drawing/2014/main" id="{18AF918B-E8AD-46B5-84EB-2E52A6F19681}"/>
+              </a:ext>
+            </a:extLst>
+          </p:cNvPr>
+          <p:cNvSpPr txBox="1"/>
+          <p:nvPr/>
+        </p:nvSpPr>
+        <p:spPr>
+          <a:xfrm>
+            <a:off x="0" y="0"/>
+            <a:ext cx="12192000" cy="369332"/>
+          </a:xfrm>
+          <a:prstGeom prst="rect">
+            <a:avLst/>
+          </a:prstGeom>
+          <a:noFill/>
+        </p:spPr>
+        <p:txBody>
+          <a:bodyPr wrap="square" rtlCol="0">
+            <a:spAutoFit/>
+          </a:bodyPr>
+          <a:lstStyle/>
+          <a:p>
+            <a:r>
+              <a:rPr lang="en-NZ" b="1" dirty="0"/>
+              <a:t>Run </a:t>
+            </a:r>
+            <a:r>
+              <a:rPr lang="en-NZ" b="1" dirty="0" err="1"/>
+              <a:t>cPCA</a:t>
+            </a:r>
+            <a:r>
+              <a:rPr lang="en-NZ" b="1" dirty="0"/>
+              <a:t> on sub-batches and combine individual </a:t>
+            </a:r>
+            <a:r>
+              <a:rPr lang="en-NZ" b="1" dirty="0" err="1"/>
+              <a:t>cPCs</a:t>
+            </a:r>
+            <a:r>
+              <a:rPr lang="en-NZ" b="1" dirty="0"/>
+              <a:t> when generating the final tree/disease scores (160/100)</a:t>
+            </a:r>
+            <a:endParaRPr lang="en-GB" b="1" dirty="0"/>
+          </a:p>
+        </p:txBody>
+      </p:sp>
+      <p:sp>
+        <p:nvSpPr>
+          <p:cNvPr id="5" name="TextBox 4">
+            <a:extLst>
+              <a:ext uri="{FF2B5EF4-FFF2-40B4-BE49-F238E27FC236}">
+                <a16:creationId xmlns:a16="http://schemas.microsoft.com/office/drawing/2014/main" id="{5B67B6A9-6158-44DD-A410-D89197251410}"/>
+              </a:ext>
+            </a:extLst>
+          </p:cNvPr>
+          <p:cNvSpPr txBox="1"/>
+          <p:nvPr/>
+        </p:nvSpPr>
+        <p:spPr>
+          <a:xfrm>
+            <a:off x="588875" y="6049070"/>
+            <a:ext cx="2024182" cy="492443"/>
+          </a:xfrm>
+          <a:prstGeom prst="rect">
+            <a:avLst/>
+          </a:prstGeom>
+          <a:solidFill>
+            <a:schemeClr val="bg1"/>
+          </a:solidFill>
+        </p:spPr>
+        <p:txBody>
+          <a:bodyPr wrap="square" lIns="0" tIns="0" rIns="0" bIns="0" rtlCol="0">
+            <a:spAutoFit/>
+          </a:bodyPr>
+          <a:lstStyle/>
+          <a:p>
+            <a:pPr algn="ctr"/>
+            <a:r>
+              <a:rPr lang="en-NZ" sz="1600" b="1" dirty="0"/>
+              <a:t>10 Batches </a:t>
+            </a:r>
+          </a:p>
+          <a:p>
+            <a:pPr algn="ctr"/>
+            <a:r>
+              <a:rPr lang="en-NZ" sz="1600" b="1" dirty="0"/>
+              <a:t>(3000 Patients Each)</a:t>
+            </a:r>
+            <a:endParaRPr lang="en-GB" sz="1600" b="1" dirty="0"/>
+          </a:p>
+        </p:txBody>
+      </p:sp>
+      <p:pic>
+        <p:nvPicPr>
+          <p:cNvPr id="6" name="Picture 5">
+            <a:extLst>
+              <a:ext uri="{FF2B5EF4-FFF2-40B4-BE49-F238E27FC236}">
+                <a16:creationId xmlns:a16="http://schemas.microsoft.com/office/drawing/2014/main" id="{802D6637-C750-46BB-A41B-C1ABFDD6448F}"/>
+              </a:ext>
+            </a:extLst>
+          </p:cNvPr>
+          <p:cNvPicPr>
+            <a:picLocks noChangeAspect="1"/>
+          </p:cNvPicPr>
+          <p:nvPr/>
+        </p:nvPicPr>
+        <p:blipFill>
+          <a:blip r:embed="rId3">
+            <a:extLst>
+              <a:ext uri="{28A0092B-C50C-407E-A947-70E740481C1C}">
+                <a14:useLocalDpi xmlns:a14="http://schemas.microsoft.com/office/drawing/2010/main" val="0"/>
+              </a:ext>
+            </a:extLst>
+          </a:blip>
+          <a:stretch>
+            <a:fillRect/>
+          </a:stretch>
+        </p:blipFill>
+        <p:spPr>
+          <a:xfrm>
+            <a:off x="3196996" y="617416"/>
+            <a:ext cx="3018114" cy="6031120"/>
+          </a:xfrm>
+          <a:prstGeom prst="rect">
+            <a:avLst/>
+          </a:prstGeom>
+        </p:spPr>
+      </p:pic>
+      <p:sp>
+        <p:nvSpPr>
+          <p:cNvPr id="8" name="TextBox 7">
+            <a:extLst>
+              <a:ext uri="{FF2B5EF4-FFF2-40B4-BE49-F238E27FC236}">
+                <a16:creationId xmlns:a16="http://schemas.microsoft.com/office/drawing/2014/main" id="{3771993F-74AF-42E3-AC42-7E65534CD0DD}"/>
+              </a:ext>
+            </a:extLst>
+          </p:cNvPr>
+          <p:cNvSpPr txBox="1"/>
+          <p:nvPr/>
+        </p:nvSpPr>
+        <p:spPr>
+          <a:xfrm>
+            <a:off x="3681049" y="6049070"/>
+            <a:ext cx="2024182" cy="492443"/>
+          </a:xfrm>
+          <a:prstGeom prst="rect">
+            <a:avLst/>
+          </a:prstGeom>
+          <a:solidFill>
+            <a:schemeClr val="bg1"/>
+          </a:solidFill>
+        </p:spPr>
+        <p:txBody>
+          <a:bodyPr wrap="square" lIns="0" tIns="0" rIns="0" bIns="0" rtlCol="0">
+            <a:spAutoFit/>
+          </a:bodyPr>
+          <a:lstStyle/>
+          <a:p>
+            <a:pPr algn="ctr"/>
+            <a:r>
+              <a:rPr lang="en-NZ" sz="1600" b="1" dirty="0"/>
+              <a:t>15 Batches </a:t>
+            </a:r>
+          </a:p>
+          <a:p>
+            <a:pPr algn="ctr"/>
+            <a:r>
+              <a:rPr lang="en-NZ" sz="1600" b="1" dirty="0"/>
+              <a:t>(2000 Patients Each)</a:t>
+            </a:r>
+            <a:endParaRPr lang="en-GB" sz="1600" b="1" dirty="0"/>
+          </a:p>
+        </p:txBody>
+      </p:sp>
+    </p:spTree>
+    <p:extLst>
+      <p:ext uri="{BB962C8B-B14F-4D97-AF65-F5344CB8AC3E}">
+        <p14:creationId xmlns:p14="http://schemas.microsoft.com/office/powerpoint/2010/main" val="3191795158"/>
+      </p:ext>
+    </p:extLst>
+  </p:cSld>
+  <p:clrMapOvr>
+    <a:masterClrMapping/>
+  </p:clrMapOvr>
+</p:sld>
+</file>
+
+<file path=ppt/slides/slide22.xml><?xml version="1.0" encoding="utf-8"?>
+<p:sld xmlns:a="http://schemas.openxmlformats.org/drawingml/2006/main" xmlns:r="http://schemas.openxmlformats.org/officeDocument/2006/relationships" xmlns:p="http://schemas.openxmlformats.org/presentationml/2006/main">
+  <p:cSld>
+    <p:spTree>
+      <p:nvGrpSpPr>
+        <p:cNvPr id="1" name=""/>
+        <p:cNvGrpSpPr/>
+        <p:nvPr/>
+      </p:nvGrpSpPr>
+      <p:grpSpPr>
+        <a:xfrm>
+          <a:off x="0" y="0"/>
+          <a:ext cx="0" cy="0"/>
+          <a:chOff x="0" y="0"/>
+          <a:chExt cx="0" cy="0"/>
+        </a:xfrm>
+      </p:grpSpPr>
       <p:sp>
         <p:nvSpPr>
           <p:cNvPr id="4" name="TextBox 3">
@@ -10333,7 +10921,7 @@
 </p:sld>
 </file>
 
-<file path=ppt/slides/slide22.xml><?xml version="1.0" encoding="utf-8"?>
+<file path=ppt/slides/slide23.xml><?xml version="1.0" encoding="utf-8"?>
 <p:sld xmlns:a="http://schemas.openxmlformats.org/drawingml/2006/main" xmlns:r="http://schemas.openxmlformats.org/officeDocument/2006/relationships" xmlns:p="http://schemas.openxmlformats.org/presentationml/2006/main">
   <p:cSld>
     <p:spTree>

</xml_diff>

<commit_message>
add more visualization to pptx
</commit_message>
<xml_diff>
--- a/job_results.pptx
+++ b/job_results.pptx
@@ -198,7 +198,7 @@
   <pc:docChgLst>
     <pc:chgData name="Zhao Xiong" userId="5eba49e5-2895-4cd9-83e8-b3064fe76704" providerId="ADAL" clId="{B606E7B2-EFF5-418A-8639-9F7537C4DA50}"/>
     <pc:docChg chg="undo custSel addSld delSld modSld sldOrd">
-      <pc:chgData name="Zhao Xiong" userId="5eba49e5-2895-4cd9-83e8-b3064fe76704" providerId="ADAL" clId="{B606E7B2-EFF5-418A-8639-9F7537C4DA50}" dt="2022-06-11T17:41:15.449" v="13750" actId="14100"/>
+      <pc:chgData name="Zhao Xiong" userId="5eba49e5-2895-4cd9-83e8-b3064fe76704" providerId="ADAL" clId="{B606E7B2-EFF5-418A-8639-9F7537C4DA50}" dt="2022-06-11T19:39:19.707" v="13836" actId="1076"/>
       <pc:docMkLst>
         <pc:docMk/>
       </pc:docMkLst>
@@ -2238,7 +2238,7 @@
         </pc:spChg>
       </pc:sldChg>
       <pc:sldChg chg="addSp delSp modSp add">
-        <pc:chgData name="Zhao Xiong" userId="5eba49e5-2895-4cd9-83e8-b3064fe76704" providerId="ADAL" clId="{B606E7B2-EFF5-418A-8639-9F7537C4DA50}" dt="2022-06-11T17:38:48.969" v="13733" actId="1076"/>
+        <pc:chgData name="Zhao Xiong" userId="5eba49e5-2895-4cd9-83e8-b3064fe76704" providerId="ADAL" clId="{B606E7B2-EFF5-418A-8639-9F7537C4DA50}" dt="2022-06-11T19:39:19.707" v="13836" actId="1076"/>
         <pc:sldMkLst>
           <pc:docMk/>
           <pc:sldMk cId="3191795158" sldId="280"/>
@@ -2252,7 +2252,7 @@
           </ac:spMkLst>
         </pc:spChg>
         <pc:spChg chg="add mod">
-          <ac:chgData name="Zhao Xiong" userId="5eba49e5-2895-4cd9-83e8-b3064fe76704" providerId="ADAL" clId="{B606E7B2-EFF5-418A-8639-9F7537C4DA50}" dt="2022-06-11T17:38:39.961" v="13731" actId="1076"/>
+          <ac:chgData name="Zhao Xiong" userId="5eba49e5-2895-4cd9-83e8-b3064fe76704" providerId="ADAL" clId="{B606E7B2-EFF5-418A-8639-9F7537C4DA50}" dt="2022-06-11T19:39:14.556" v="13835" actId="1076"/>
           <ac:spMkLst>
             <pc:docMk/>
             <pc:sldMk cId="3191795158" sldId="280"/>
@@ -2260,7 +2260,7 @@
           </ac:spMkLst>
         </pc:spChg>
         <pc:spChg chg="add mod">
-          <ac:chgData name="Zhao Xiong" userId="5eba49e5-2895-4cd9-83e8-b3064fe76704" providerId="ADAL" clId="{B606E7B2-EFF5-418A-8639-9F7537C4DA50}" dt="2022-06-11T17:38:48.969" v="13733" actId="1076"/>
+          <ac:chgData name="Zhao Xiong" userId="5eba49e5-2895-4cd9-83e8-b3064fe76704" providerId="ADAL" clId="{B606E7B2-EFF5-418A-8639-9F7537C4DA50}" dt="2022-06-11T19:39:19.707" v="13836" actId="1076"/>
           <ac:spMkLst>
             <pc:docMk/>
             <pc:sldMk cId="3191795158" sldId="280"/>
@@ -2268,7 +2268,7 @@
           </ac:spMkLst>
         </pc:spChg>
         <pc:picChg chg="add mod">
-          <ac:chgData name="Zhao Xiong" userId="5eba49e5-2895-4cd9-83e8-b3064fe76704" providerId="ADAL" clId="{B606E7B2-EFF5-418A-8639-9F7537C4DA50}" dt="2022-06-11T17:38:28.469" v="13726" actId="14100"/>
+          <ac:chgData name="Zhao Xiong" userId="5eba49e5-2895-4cd9-83e8-b3064fe76704" providerId="ADAL" clId="{B606E7B2-EFF5-418A-8639-9F7537C4DA50}" dt="2022-06-11T19:39:14.556" v="13835" actId="1076"/>
           <ac:picMkLst>
             <pc:docMk/>
             <pc:sldMk cId="3191795158" sldId="280"/>
@@ -2276,7 +2276,7 @@
           </ac:picMkLst>
         </pc:picChg>
         <pc:picChg chg="add mod">
-          <ac:chgData name="Zhao Xiong" userId="5eba49e5-2895-4cd9-83e8-b3064fe76704" providerId="ADAL" clId="{B606E7B2-EFF5-418A-8639-9F7537C4DA50}" dt="2022-06-11T17:38:48.969" v="13733" actId="1076"/>
+          <ac:chgData name="Zhao Xiong" userId="5eba49e5-2895-4cd9-83e8-b3064fe76704" providerId="ADAL" clId="{B606E7B2-EFF5-418A-8639-9F7537C4DA50}" dt="2022-06-11T19:39:19.707" v="13836" actId="1076"/>
           <ac:picMkLst>
             <pc:docMk/>
             <pc:sldMk cId="3191795158" sldId="280"/>
@@ -2293,7 +2293,7 @@
         </pc:picChg>
       </pc:sldChg>
       <pc:sldChg chg="addSp delSp modSp add">
-        <pc:chgData name="Zhao Xiong" userId="5eba49e5-2895-4cd9-83e8-b3064fe76704" providerId="ADAL" clId="{B606E7B2-EFF5-418A-8639-9F7537C4DA50}" dt="2022-06-11T17:41:15.449" v="13750" actId="14100"/>
+        <pc:chgData name="Zhao Xiong" userId="5eba49e5-2895-4cd9-83e8-b3064fe76704" providerId="ADAL" clId="{B606E7B2-EFF5-418A-8639-9F7537C4DA50}" dt="2022-06-11T19:38:49.196" v="13802" actId="1038"/>
         <pc:sldMkLst>
           <pc:docMk/>
           <pc:sldMk cId="3056703919" sldId="281"/>
@@ -2323,13 +2323,21 @@
           </ac:spMkLst>
         </pc:spChg>
         <pc:spChg chg="add mod">
-          <ac:chgData name="Zhao Xiong" userId="5eba49e5-2895-4cd9-83e8-b3064fe76704" providerId="ADAL" clId="{B606E7B2-EFF5-418A-8639-9F7537C4DA50}" dt="2022-06-11T17:41:15.449" v="13750" actId="14100"/>
+          <ac:chgData name="Zhao Xiong" userId="5eba49e5-2895-4cd9-83e8-b3064fe76704" providerId="ADAL" clId="{B606E7B2-EFF5-418A-8639-9F7537C4DA50}" dt="2022-06-11T19:38:49.196" v="13802" actId="1038"/>
           <ac:spMkLst>
             <pc:docMk/>
             <pc:sldMk cId="3056703919" sldId="281"/>
             <ac:spMk id="5" creationId="{C1FD59DC-8FE1-4B9B-81D0-5D1BC19580D1}"/>
           </ac:spMkLst>
         </pc:spChg>
+        <pc:picChg chg="add mod ord">
+          <ac:chgData name="Zhao Xiong" userId="5eba49e5-2895-4cd9-83e8-b3064fe76704" providerId="ADAL" clId="{B606E7B2-EFF5-418A-8639-9F7537C4DA50}" dt="2022-06-11T19:38:49.196" v="13802" actId="1038"/>
+          <ac:picMkLst>
+            <pc:docMk/>
+            <pc:sldMk cId="3056703919" sldId="281"/>
+            <ac:picMk id="3" creationId="{2ACABFA8-4C3B-4718-9426-623CF01A275D}"/>
+          </ac:picMkLst>
+        </pc:picChg>
       </pc:sldChg>
     </pc:docChg>
   </pc:docChgLst>
@@ -10218,6 +10226,42 @@
           <a:chExt cx="0" cy="0"/>
         </a:xfrm>
       </p:grpSpPr>
+      <p:pic>
+        <p:nvPicPr>
+          <p:cNvPr id="3" name="Picture 2">
+            <a:extLst>
+              <a:ext uri="{FF2B5EF4-FFF2-40B4-BE49-F238E27FC236}">
+                <a16:creationId xmlns:a16="http://schemas.microsoft.com/office/drawing/2014/main" id="{2ACABFA8-4C3B-4718-9426-623CF01A275D}"/>
+              </a:ext>
+            </a:extLst>
+          </p:cNvPr>
+          <p:cNvPicPr>
+            <a:picLocks noChangeAspect="1"/>
+          </p:cNvPicPr>
+          <p:nvPr/>
+        </p:nvPicPr>
+        <p:blipFill>
+          <a:blip r:embed="rId2">
+            <a:extLst>
+              <a:ext uri="{28A0092B-C50C-407E-A947-70E740481C1C}">
+                <a14:useLocalDpi xmlns:a14="http://schemas.microsoft.com/office/drawing/2010/main" val="0"/>
+              </a:ext>
+            </a:extLst>
+          </a:blip>
+          <a:stretch>
+            <a:fillRect/>
+          </a:stretch>
+        </p:blipFill>
+        <p:spPr>
+          <a:xfrm>
+            <a:off x="105294" y="369332"/>
+            <a:ext cx="3020860" cy="6488668"/>
+          </a:xfrm>
+          <a:prstGeom prst="rect">
+            <a:avLst/>
+          </a:prstGeom>
+        </p:spPr>
+      </p:pic>
       <p:sp>
         <p:nvSpPr>
           <p:cNvPr id="4" name="TextBox 3">
@@ -10284,7 +10328,7 @@
         </p:nvSpPr>
         <p:spPr>
           <a:xfrm>
-            <a:off x="109156" y="6195413"/>
+            <a:off x="533162" y="6242446"/>
             <a:ext cx="2165121" cy="492443"/>
           </a:xfrm>
           <a:prstGeom prst="rect">
@@ -10374,8 +10418,8 @@
         </p:blipFill>
         <p:spPr>
           <a:xfrm>
-            <a:off x="104821" y="617416"/>
-            <a:ext cx="3018114" cy="6031120"/>
+            <a:off x="101603" y="617416"/>
+            <a:ext cx="2821352" cy="6031120"/>
           </a:xfrm>
           <a:prstGeom prst="rect">
             <a:avLst/>
@@ -10448,7 +10492,7 @@
         </p:nvSpPr>
         <p:spPr>
           <a:xfrm>
-            <a:off x="588875" y="6049070"/>
+            <a:off x="500188" y="6049032"/>
             <a:ext cx="2024182" cy="492443"/>
           </a:xfrm>
           <a:prstGeom prst="rect">
@@ -10508,8 +10552,8 @@
         </p:blipFill>
         <p:spPr>
           <a:xfrm>
-            <a:off x="3196996" y="617416"/>
-            <a:ext cx="3018114" cy="6031120"/>
+            <a:off x="3029655" y="617416"/>
+            <a:ext cx="2821352" cy="6031120"/>
           </a:xfrm>
           <a:prstGeom prst="rect">
             <a:avLst/>
@@ -10530,7 +10574,7 @@
         </p:nvSpPr>
         <p:spPr>
           <a:xfrm>
-            <a:off x="3681049" y="6049070"/>
+            <a:off x="3428240" y="6049070"/>
             <a:ext cx="2024182" cy="492443"/>
           </a:xfrm>
           <a:prstGeom prst="rect">

</xml_diff>

<commit_message>
added more template for future runs on full cPCA
</commit_message>
<xml_diff>
--- a/job_results.pptx
+++ b/job_results.pptx
@@ -198,7 +198,7 @@
   <pc:docChgLst>
     <pc:chgData name="Zhao Xiong" userId="5eba49e5-2895-4cd9-83e8-b3064fe76704" providerId="ADAL" clId="{B606E7B2-EFF5-418A-8639-9F7537C4DA50}"/>
     <pc:docChg chg="undo custSel addSld delSld modSld sldOrd">
-      <pc:chgData name="Zhao Xiong" userId="5eba49e5-2895-4cd9-83e8-b3064fe76704" providerId="ADAL" clId="{B606E7B2-EFF5-418A-8639-9F7537C4DA50}" dt="2022-06-11T19:39:19.707" v="13836" actId="1076"/>
+      <pc:chgData name="Zhao Xiong" userId="5eba49e5-2895-4cd9-83e8-b3064fe76704" providerId="ADAL" clId="{B606E7B2-EFF5-418A-8639-9F7537C4DA50}" dt="2022-06-12T12:25:05.018" v="13969" actId="1076"/>
       <pc:docMkLst>
         <pc:docMk/>
       </pc:docMkLst>
@@ -2223,7 +2223,7 @@
         </pc:cxnChg>
       </pc:sldChg>
       <pc:sldChg chg="addSp modSp add ord">
-        <pc:chgData name="Zhao Xiong" userId="5eba49e5-2895-4cd9-83e8-b3064fe76704" providerId="ADAL" clId="{B606E7B2-EFF5-418A-8639-9F7537C4DA50}" dt="2022-06-11T13:46:05.391" v="13606" actId="113"/>
+        <pc:chgData name="Zhao Xiong" userId="5eba49e5-2895-4cd9-83e8-b3064fe76704" providerId="ADAL" clId="{B606E7B2-EFF5-418A-8639-9F7537C4DA50}" dt="2022-06-12T12:25:05.018" v="13969" actId="1076"/>
         <pc:sldMkLst>
           <pc:docMk/>
           <pc:sldMk cId="286555550" sldId="279"/>
@@ -2236,6 +2236,38 @@
             <ac:spMk id="2" creationId="{9A72E9C6-8A44-48A8-B94B-F2D99E09894C}"/>
           </ac:spMkLst>
         </pc:spChg>
+        <pc:spChg chg="add mod">
+          <ac:chgData name="Zhao Xiong" userId="5eba49e5-2895-4cd9-83e8-b3064fe76704" providerId="ADAL" clId="{B606E7B2-EFF5-418A-8639-9F7537C4DA50}" dt="2022-06-12T12:24:45.264" v="13938" actId="113"/>
+          <ac:spMkLst>
+            <pc:docMk/>
+            <pc:sldMk cId="286555550" sldId="279"/>
+            <ac:spMk id="5" creationId="{C6FA748D-3184-44B0-84D5-32BAD4DF80F3}"/>
+          </ac:spMkLst>
+        </pc:spChg>
+        <pc:spChg chg="add mod">
+          <ac:chgData name="Zhao Xiong" userId="5eba49e5-2895-4cd9-83e8-b3064fe76704" providerId="ADAL" clId="{B606E7B2-EFF5-418A-8639-9F7537C4DA50}" dt="2022-06-12T12:25:05.018" v="13969" actId="1076"/>
+          <ac:spMkLst>
+            <pc:docMk/>
+            <pc:sldMk cId="286555550" sldId="279"/>
+            <ac:spMk id="6" creationId="{F8FFFAFA-AAF7-42D6-A8B7-F7FCFEB75EBD}"/>
+          </ac:spMkLst>
+        </pc:spChg>
+        <pc:spChg chg="add mod">
+          <ac:chgData name="Zhao Xiong" userId="5eba49e5-2895-4cd9-83e8-b3064fe76704" providerId="ADAL" clId="{B606E7B2-EFF5-418A-8639-9F7537C4DA50}" dt="2022-06-12T12:25:01.687" v="13968" actId="20577"/>
+          <ac:spMkLst>
+            <pc:docMk/>
+            <pc:sldMk cId="286555550" sldId="279"/>
+            <ac:spMk id="7" creationId="{AE9E07F9-7B11-4718-8987-E6C3D632CBA1}"/>
+          </ac:spMkLst>
+        </pc:spChg>
+        <pc:picChg chg="add mod modCrop">
+          <ac:chgData name="Zhao Xiong" userId="5eba49e5-2895-4cd9-83e8-b3064fe76704" providerId="ADAL" clId="{B606E7B2-EFF5-418A-8639-9F7537C4DA50}" dt="2022-06-12T12:23:55.898" v="13849" actId="1076"/>
+          <ac:picMkLst>
+            <pc:docMk/>
+            <pc:sldMk cId="286555550" sldId="279"/>
+            <ac:picMk id="4" creationId="{742E49B8-F066-493F-9D9B-05F1C96D685E}"/>
+          </ac:picMkLst>
+        </pc:picChg>
       </pc:sldChg>
       <pc:sldChg chg="addSp delSp modSp add">
         <pc:chgData name="Zhao Xiong" userId="5eba49e5-2895-4cd9-83e8-b3064fe76704" providerId="ADAL" clId="{B606E7B2-EFF5-418A-8639-9F7537C4DA50}" dt="2022-06-11T19:39:19.707" v="13836" actId="1076"/>
@@ -2426,7 +2458,7 @@
           <a:p>
             <a:fld id="{3F756EDF-0C8E-4F27-B2A4-7BBF4F0FD9CE}" type="datetimeFigureOut">
               <a:rPr lang="en-GB" smtClean="0"/>
-              <a:t>11/06/2022</a:t>
+              <a:t>12/06/2022</a:t>
             </a:fld>
             <a:endParaRPr lang="en-GB"/>
           </a:p>
@@ -2843,7 +2875,7 @@
           <a:p>
             <a:fld id="{B1B6DC73-6F54-48A7-AC0A-0EE4EE00B05A}" type="datetimeFigureOut">
               <a:rPr lang="en-GB" smtClean="0"/>
-              <a:t>11/06/2022</a:t>
+              <a:t>12/06/2022</a:t>
             </a:fld>
             <a:endParaRPr lang="en-GB"/>
           </a:p>
@@ -3043,7 +3075,7 @@
           <a:p>
             <a:fld id="{B1B6DC73-6F54-48A7-AC0A-0EE4EE00B05A}" type="datetimeFigureOut">
               <a:rPr lang="en-GB" smtClean="0"/>
-              <a:t>11/06/2022</a:t>
+              <a:t>12/06/2022</a:t>
             </a:fld>
             <a:endParaRPr lang="en-GB"/>
           </a:p>
@@ -3253,7 +3285,7 @@
           <a:p>
             <a:fld id="{B1B6DC73-6F54-48A7-AC0A-0EE4EE00B05A}" type="datetimeFigureOut">
               <a:rPr lang="en-GB" smtClean="0"/>
-              <a:t>11/06/2022</a:t>
+              <a:t>12/06/2022</a:t>
             </a:fld>
             <a:endParaRPr lang="en-GB"/>
           </a:p>
@@ -3453,7 +3485,7 @@
           <a:p>
             <a:fld id="{B1B6DC73-6F54-48A7-AC0A-0EE4EE00B05A}" type="datetimeFigureOut">
               <a:rPr lang="en-GB" smtClean="0"/>
-              <a:t>11/06/2022</a:t>
+              <a:t>12/06/2022</a:t>
             </a:fld>
             <a:endParaRPr lang="en-GB"/>
           </a:p>
@@ -3729,7 +3761,7 @@
           <a:p>
             <a:fld id="{B1B6DC73-6F54-48A7-AC0A-0EE4EE00B05A}" type="datetimeFigureOut">
               <a:rPr lang="en-GB" smtClean="0"/>
-              <a:t>11/06/2022</a:t>
+              <a:t>12/06/2022</a:t>
             </a:fld>
             <a:endParaRPr lang="en-GB"/>
           </a:p>
@@ -3997,7 +4029,7 @@
           <a:p>
             <a:fld id="{B1B6DC73-6F54-48A7-AC0A-0EE4EE00B05A}" type="datetimeFigureOut">
               <a:rPr lang="en-GB" smtClean="0"/>
-              <a:t>11/06/2022</a:t>
+              <a:t>12/06/2022</a:t>
             </a:fld>
             <a:endParaRPr lang="en-GB"/>
           </a:p>
@@ -4412,7 +4444,7 @@
           <a:p>
             <a:fld id="{B1B6DC73-6F54-48A7-AC0A-0EE4EE00B05A}" type="datetimeFigureOut">
               <a:rPr lang="en-GB" smtClean="0"/>
-              <a:t>11/06/2022</a:t>
+              <a:t>12/06/2022</a:t>
             </a:fld>
             <a:endParaRPr lang="en-GB"/>
           </a:p>
@@ -4554,7 +4586,7 @@
           <a:p>
             <a:fld id="{B1B6DC73-6F54-48A7-AC0A-0EE4EE00B05A}" type="datetimeFigureOut">
               <a:rPr lang="en-GB" smtClean="0"/>
-              <a:t>11/06/2022</a:t>
+              <a:t>12/06/2022</a:t>
             </a:fld>
             <a:endParaRPr lang="en-GB"/>
           </a:p>
@@ -4667,7 +4699,7 @@
           <a:p>
             <a:fld id="{B1B6DC73-6F54-48A7-AC0A-0EE4EE00B05A}" type="datetimeFigureOut">
               <a:rPr lang="en-GB" smtClean="0"/>
-              <a:t>11/06/2022</a:t>
+              <a:t>12/06/2022</a:t>
             </a:fld>
             <a:endParaRPr lang="en-GB"/>
           </a:p>
@@ -4980,7 +5012,7 @@
           <a:p>
             <a:fld id="{B1B6DC73-6F54-48A7-AC0A-0EE4EE00B05A}" type="datetimeFigureOut">
               <a:rPr lang="en-GB" smtClean="0"/>
-              <a:t>11/06/2022</a:t>
+              <a:t>12/06/2022</a:t>
             </a:fld>
             <a:endParaRPr lang="en-GB"/>
           </a:p>
@@ -5269,7 +5301,7 @@
           <a:p>
             <a:fld id="{B1B6DC73-6F54-48A7-AC0A-0EE4EE00B05A}" type="datetimeFigureOut">
               <a:rPr lang="en-GB" smtClean="0"/>
-              <a:t>11/06/2022</a:t>
+              <a:t>12/06/2022</a:t>
             </a:fld>
             <a:endParaRPr lang="en-GB"/>
           </a:p>
@@ -5512,7 +5544,7 @@
           <a:p>
             <a:fld id="{B1B6DC73-6F54-48A7-AC0A-0EE4EE00B05A}" type="datetimeFigureOut">
               <a:rPr lang="en-GB" smtClean="0"/>
-              <a:t>11/06/2022</a:t>
+              <a:t>12/06/2022</a:t>
             </a:fld>
             <a:endParaRPr lang="en-GB"/>
           </a:p>
@@ -9263,6 +9295,160 @@
               <a:t> with large values, 100 clusters for clustering tendency, 160/100 target</a:t>
             </a:r>
             <a:endParaRPr lang="en-GB" dirty="0"/>
+          </a:p>
+        </p:txBody>
+      </p:sp>
+      <p:pic>
+        <p:nvPicPr>
+          <p:cNvPr id="4" name="Picture 3">
+            <a:extLst>
+              <a:ext uri="{FF2B5EF4-FFF2-40B4-BE49-F238E27FC236}">
+                <a16:creationId xmlns:a16="http://schemas.microsoft.com/office/drawing/2014/main" id="{742E49B8-F066-493F-9D9B-05F1C96D685E}"/>
+              </a:ext>
+            </a:extLst>
+          </p:cNvPr>
+          <p:cNvPicPr>
+            <a:picLocks noChangeAspect="1"/>
+          </p:cNvPicPr>
+          <p:nvPr/>
+        </p:nvPicPr>
+        <p:blipFill rotWithShape="1">
+          <a:blip r:embed="rId2">
+            <a:extLst>
+              <a:ext uri="{28A0092B-C50C-407E-A947-70E740481C1C}">
+                <a14:useLocalDpi xmlns:a14="http://schemas.microsoft.com/office/drawing/2010/main" val="0"/>
+              </a:ext>
+            </a:extLst>
+          </a:blip>
+          <a:srcRect t="4687" b="10590"/>
+          <a:stretch/>
+        </p:blipFill>
+        <p:spPr>
+          <a:xfrm>
+            <a:off x="119209" y="646331"/>
+            <a:ext cx="3491499" cy="5911146"/>
+          </a:xfrm>
+          <a:prstGeom prst="rect">
+            <a:avLst/>
+          </a:prstGeom>
+        </p:spPr>
+      </p:pic>
+      <p:sp>
+        <p:nvSpPr>
+          <p:cNvPr id="5" name="TextBox 4">
+            <a:extLst>
+              <a:ext uri="{FF2B5EF4-FFF2-40B4-BE49-F238E27FC236}">
+                <a16:creationId xmlns:a16="http://schemas.microsoft.com/office/drawing/2014/main" id="{C6FA748D-3184-44B0-84D5-32BAD4DF80F3}"/>
+              </a:ext>
+            </a:extLst>
+          </p:cNvPr>
+          <p:cNvSpPr txBox="1"/>
+          <p:nvPr/>
+        </p:nvSpPr>
+        <p:spPr>
+          <a:xfrm>
+            <a:off x="119209" y="6488668"/>
+            <a:ext cx="3491499" cy="369332"/>
+          </a:xfrm>
+          <a:prstGeom prst="rect">
+            <a:avLst/>
+          </a:prstGeom>
+          <a:noFill/>
+        </p:spPr>
+        <p:txBody>
+          <a:bodyPr wrap="square" rtlCol="0">
+            <a:spAutoFit/>
+          </a:bodyPr>
+          <a:lstStyle/>
+          <a:p>
+            <a:pPr algn="ctr"/>
+            <a:r>
+              <a:rPr lang="en-NZ" b="1" dirty="0"/>
+              <a:t>As Above</a:t>
+            </a:r>
+            <a:endParaRPr lang="en-GB" b="1" dirty="0"/>
+          </a:p>
+        </p:txBody>
+      </p:sp>
+      <p:sp>
+        <p:nvSpPr>
+          <p:cNvPr id="6" name="TextBox 5">
+            <a:extLst>
+              <a:ext uri="{FF2B5EF4-FFF2-40B4-BE49-F238E27FC236}">
+                <a16:creationId xmlns:a16="http://schemas.microsoft.com/office/drawing/2014/main" id="{F8FFFAFA-AAF7-42D6-A8B7-F7FCFEB75EBD}"/>
+              </a:ext>
+            </a:extLst>
+          </p:cNvPr>
+          <p:cNvSpPr txBox="1"/>
+          <p:nvPr/>
+        </p:nvSpPr>
+        <p:spPr>
+          <a:xfrm>
+            <a:off x="4081609" y="6488668"/>
+            <a:ext cx="3491498" cy="369332"/>
+          </a:xfrm>
+          <a:prstGeom prst="rect">
+            <a:avLst/>
+          </a:prstGeom>
+          <a:noFill/>
+        </p:spPr>
+        <p:txBody>
+          <a:bodyPr wrap="square" rtlCol="0">
+            <a:spAutoFit/>
+          </a:bodyPr>
+          <a:lstStyle/>
+          <a:p>
+            <a:pPr algn="ctr"/>
+            <a:r>
+              <a:rPr lang="en-NZ" b="1" dirty="0"/>
+              <a:t>+ Filter out large eigen </a:t>
+            </a:r>
+            <a:r>
+              <a:rPr lang="en-NZ" b="1" dirty="0" err="1"/>
+              <a:t>vec</a:t>
+            </a:r>
+            <a:r>
+              <a:rPr lang="en-NZ" b="1" dirty="0"/>
+              <a:t> values</a:t>
+            </a:r>
+            <a:endParaRPr lang="en-GB" b="1" dirty="0"/>
+          </a:p>
+        </p:txBody>
+      </p:sp>
+      <p:sp>
+        <p:nvSpPr>
+          <p:cNvPr id="7" name="TextBox 6">
+            <a:extLst>
+              <a:ext uri="{FF2B5EF4-FFF2-40B4-BE49-F238E27FC236}">
+                <a16:creationId xmlns:a16="http://schemas.microsoft.com/office/drawing/2014/main" id="{AE9E07F9-7B11-4718-8987-E6C3D632CBA1}"/>
+              </a:ext>
+            </a:extLst>
+          </p:cNvPr>
+          <p:cNvSpPr txBox="1"/>
+          <p:nvPr/>
+        </p:nvSpPr>
+        <p:spPr>
+          <a:xfrm>
+            <a:off x="8581293" y="6488668"/>
+            <a:ext cx="3491498" cy="369332"/>
+          </a:xfrm>
+          <a:prstGeom prst="rect">
+            <a:avLst/>
+          </a:prstGeom>
+          <a:noFill/>
+        </p:spPr>
+        <p:txBody>
+          <a:bodyPr wrap="square" rtlCol="0">
+            <a:spAutoFit/>
+          </a:bodyPr>
+          <a:lstStyle/>
+          <a:p>
+            <a:pPr algn="ctr"/>
+            <a:r>
+              <a:rPr lang="en-NZ" b="1" dirty="0"/>
+              <a:t>Tune Lambda Threshold</a:t>
+            </a:r>
+            <a:endParaRPr lang="en-GB" b="1" dirty="0"/>
           </a:p>
         </p:txBody>
       </p:sp>

</xml_diff>

<commit_message>
added one more result to ppt
</commit_message>
<xml_diff>
--- a/job_results.pptx
+++ b/job_results.pptx
@@ -198,7 +198,7 @@
   <pc:docChgLst>
     <pc:chgData name="Zhao Xiong" userId="5eba49e5-2895-4cd9-83e8-b3064fe76704" providerId="ADAL" clId="{B606E7B2-EFF5-418A-8639-9F7537C4DA50}"/>
     <pc:docChg chg="undo custSel addSld delSld modSld sldOrd">
-      <pc:chgData name="Zhao Xiong" userId="5eba49e5-2895-4cd9-83e8-b3064fe76704" providerId="ADAL" clId="{B606E7B2-EFF5-418A-8639-9F7537C4DA50}" dt="2022-06-12T12:25:05.018" v="13969" actId="1076"/>
+      <pc:chgData name="Zhao Xiong" userId="5eba49e5-2895-4cd9-83e8-b3064fe76704" providerId="ADAL" clId="{B606E7B2-EFF5-418A-8639-9F7537C4DA50}" dt="2022-06-12T15:55:05.036" v="14005" actId="14100"/>
       <pc:docMkLst>
         <pc:docMk/>
       </pc:docMkLst>
@@ -2223,7 +2223,7 @@
         </pc:cxnChg>
       </pc:sldChg>
       <pc:sldChg chg="addSp modSp add ord">
-        <pc:chgData name="Zhao Xiong" userId="5eba49e5-2895-4cd9-83e8-b3064fe76704" providerId="ADAL" clId="{B606E7B2-EFF5-418A-8639-9F7537C4DA50}" dt="2022-06-12T12:25:05.018" v="13969" actId="1076"/>
+        <pc:chgData name="Zhao Xiong" userId="5eba49e5-2895-4cd9-83e8-b3064fe76704" providerId="ADAL" clId="{B606E7B2-EFF5-418A-8639-9F7537C4DA50}" dt="2022-06-12T15:55:05.036" v="14005" actId="14100"/>
         <pc:sldMkLst>
           <pc:docMk/>
           <pc:sldMk cId="286555550" sldId="279"/>
@@ -2237,7 +2237,7 @@
           </ac:spMkLst>
         </pc:spChg>
         <pc:spChg chg="add mod">
-          <ac:chgData name="Zhao Xiong" userId="5eba49e5-2895-4cd9-83e8-b3064fe76704" providerId="ADAL" clId="{B606E7B2-EFF5-418A-8639-9F7537C4DA50}" dt="2022-06-12T12:24:45.264" v="13938" actId="113"/>
+          <ac:chgData name="Zhao Xiong" userId="5eba49e5-2895-4cd9-83e8-b3064fe76704" providerId="ADAL" clId="{B606E7B2-EFF5-418A-8639-9F7537C4DA50}" dt="2022-06-12T15:43:52.605" v="14001" actId="1036"/>
           <ac:spMkLst>
             <pc:docMk/>
             <pc:sldMk cId="286555550" sldId="279"/>
@@ -2245,7 +2245,7 @@
           </ac:spMkLst>
         </pc:spChg>
         <pc:spChg chg="add mod">
-          <ac:chgData name="Zhao Xiong" userId="5eba49e5-2895-4cd9-83e8-b3064fe76704" providerId="ADAL" clId="{B606E7B2-EFF5-418A-8639-9F7537C4DA50}" dt="2022-06-12T12:25:05.018" v="13969" actId="1076"/>
+          <ac:chgData name="Zhao Xiong" userId="5eba49e5-2895-4cd9-83e8-b3064fe76704" providerId="ADAL" clId="{B606E7B2-EFF5-418A-8639-9F7537C4DA50}" dt="2022-06-12T15:55:01.612" v="14004" actId="1076"/>
           <ac:spMkLst>
             <pc:docMk/>
             <pc:sldMk cId="286555550" sldId="279"/>
@@ -2261,11 +2261,19 @@
           </ac:spMkLst>
         </pc:spChg>
         <pc:picChg chg="add mod modCrop">
-          <ac:chgData name="Zhao Xiong" userId="5eba49e5-2895-4cd9-83e8-b3064fe76704" providerId="ADAL" clId="{B606E7B2-EFF5-418A-8639-9F7537C4DA50}" dt="2022-06-12T12:23:55.898" v="13849" actId="1076"/>
+          <ac:chgData name="Zhao Xiong" userId="5eba49e5-2895-4cd9-83e8-b3064fe76704" providerId="ADAL" clId="{B606E7B2-EFF5-418A-8639-9F7537C4DA50}" dt="2022-06-12T15:43:52.605" v="14001" actId="1036"/>
           <ac:picMkLst>
             <pc:docMk/>
             <pc:sldMk cId="286555550" sldId="279"/>
             <ac:picMk id="4" creationId="{742E49B8-F066-493F-9D9B-05F1C96D685E}"/>
+          </ac:picMkLst>
+        </pc:picChg>
+        <pc:picChg chg="add mod modCrop">
+          <ac:chgData name="Zhao Xiong" userId="5eba49e5-2895-4cd9-83e8-b3064fe76704" providerId="ADAL" clId="{B606E7B2-EFF5-418A-8639-9F7537C4DA50}" dt="2022-06-12T15:55:05.036" v="14005" actId="14100"/>
+          <ac:picMkLst>
+            <pc:docMk/>
+            <pc:sldMk cId="286555550" sldId="279"/>
+            <ac:picMk id="8" creationId="{17A1BE6C-3722-4BB5-8CA8-F2A10D804792}"/>
           </ac:picMkLst>
         </pc:picChg>
       </pc:sldChg>
@@ -9325,8 +9333,8 @@
         </p:blipFill>
         <p:spPr>
           <a:xfrm>
-            <a:off x="119209" y="646331"/>
-            <a:ext cx="3491499" cy="5911146"/>
+            <a:off x="101103" y="860077"/>
+            <a:ext cx="3303162" cy="5592292"/>
           </a:xfrm>
           <a:prstGeom prst="rect">
             <a:avLst/>
@@ -9347,8 +9355,8 @@
         </p:nvSpPr>
         <p:spPr>
           <a:xfrm>
-            <a:off x="119209" y="6488668"/>
-            <a:ext cx="3491499" cy="369332"/>
+            <a:off x="525043" y="6427130"/>
+            <a:ext cx="2455282" cy="369332"/>
           </a:xfrm>
           <a:prstGeom prst="rect">
             <a:avLst/>
@@ -9384,7 +9392,7 @@
         </p:nvSpPr>
         <p:spPr>
           <a:xfrm>
-            <a:off x="4081609" y="6488668"/>
+            <a:off x="3474424" y="6427130"/>
             <a:ext cx="3491498" cy="369332"/>
           </a:xfrm>
           <a:prstGeom prst="rect">
@@ -9452,6 +9460,41 @@
           </a:p>
         </p:txBody>
       </p:sp>
+      <p:pic>
+        <p:nvPicPr>
+          <p:cNvPr id="8" name="Picture 7">
+            <a:extLst>
+              <a:ext uri="{FF2B5EF4-FFF2-40B4-BE49-F238E27FC236}">
+                <a16:creationId xmlns:a16="http://schemas.microsoft.com/office/drawing/2014/main" id="{17A1BE6C-3722-4BB5-8CA8-F2A10D804792}"/>
+              </a:ext>
+            </a:extLst>
+          </p:cNvPr>
+          <p:cNvPicPr>
+            <a:picLocks noChangeAspect="1"/>
+          </p:cNvPicPr>
+          <p:nvPr/>
+        </p:nvPicPr>
+        <p:blipFill rotWithShape="1">
+          <a:blip r:embed="rId3">
+            <a:extLst>
+              <a:ext uri="{28A0092B-C50C-407E-A947-70E740481C1C}">
+                <a14:useLocalDpi xmlns:a14="http://schemas.microsoft.com/office/drawing/2010/main" val="0"/>
+              </a:ext>
+            </a:extLst>
+          </a:blip>
+          <a:srcRect t="4712" b="10097"/>
+          <a:stretch/>
+        </p:blipFill>
+        <p:spPr>
+          <a:xfrm>
+            <a:off x="3577663" y="860077"/>
+            <a:ext cx="3285020" cy="5592292"/>
+          </a:xfrm>
+          <a:prstGeom prst="rect">
+            <a:avLst/>
+          </a:prstGeom>
+        </p:spPr>
+      </p:pic>
     </p:spTree>
     <p:extLst>
       <p:ext uri="{BB962C8B-B14F-4D97-AF65-F5344CB8AC3E}">

</xml_diff>

<commit_message>
added results to ppt
</commit_message>
<xml_diff>
--- a/job_results.pptx
+++ b/job_results.pptx
@@ -198,7 +198,7 @@
   <pc:docChgLst>
     <pc:chgData name="Zhao Xiong" userId="5eba49e5-2895-4cd9-83e8-b3064fe76704" providerId="ADAL" clId="{B606E7B2-EFF5-418A-8639-9F7537C4DA50}"/>
     <pc:docChg chg="undo custSel addSld delSld modSld sldOrd">
-      <pc:chgData name="Zhao Xiong" userId="5eba49e5-2895-4cd9-83e8-b3064fe76704" providerId="ADAL" clId="{B606E7B2-EFF5-418A-8639-9F7537C4DA50}" dt="2022-06-15T12:54:14.473" v="14205" actId="2696"/>
+      <pc:chgData name="Zhao Xiong" userId="5eba49e5-2895-4cd9-83e8-b3064fe76704" providerId="ADAL" clId="{B606E7B2-EFF5-418A-8639-9F7537C4DA50}" dt="2022-06-15T17:39:51.420" v="14309" actId="732"/>
       <pc:docMkLst>
         <pc:docMk/>
       </pc:docMkLst>
@@ -2294,7 +2294,7 @@
         </pc:picChg>
       </pc:sldChg>
       <pc:sldChg chg="addSp delSp modSp add">
-        <pc:chgData name="Zhao Xiong" userId="5eba49e5-2895-4cd9-83e8-b3064fe76704" providerId="ADAL" clId="{B606E7B2-EFF5-418A-8639-9F7537C4DA50}" dt="2022-06-15T12:54:00.887" v="14204" actId="1076"/>
+        <pc:chgData name="Zhao Xiong" userId="5eba49e5-2895-4cd9-83e8-b3064fe76704" providerId="ADAL" clId="{B606E7B2-EFF5-418A-8639-9F7537C4DA50}" dt="2022-06-15T17:39:51.420" v="14309" actId="732"/>
         <pc:sldMkLst>
           <pc:docMk/>
           <pc:sldMk cId="3191795158" sldId="280"/>
@@ -2308,7 +2308,7 @@
           </ac:spMkLst>
         </pc:spChg>
         <pc:spChg chg="add mod">
-          <ac:chgData name="Zhao Xiong" userId="5eba49e5-2895-4cd9-83e8-b3064fe76704" providerId="ADAL" clId="{B606E7B2-EFF5-418A-8639-9F7537C4DA50}" dt="2022-06-15T12:53:25.927" v="14193" actId="1076"/>
+          <ac:chgData name="Zhao Xiong" userId="5eba49e5-2895-4cd9-83e8-b3064fe76704" providerId="ADAL" clId="{B606E7B2-EFF5-418A-8639-9F7537C4DA50}" dt="2022-06-15T17:39:11.908" v="14305" actId="1076"/>
           <ac:spMkLst>
             <pc:docMk/>
             <pc:sldMk cId="3191795158" sldId="280"/>
@@ -2316,7 +2316,7 @@
           </ac:spMkLst>
         </pc:spChg>
         <pc:spChg chg="add mod">
-          <ac:chgData name="Zhao Xiong" userId="5eba49e5-2895-4cd9-83e8-b3064fe76704" providerId="ADAL" clId="{B606E7B2-EFF5-418A-8639-9F7537C4DA50}" dt="2022-06-15T12:53:30.135" v="14194" actId="1076"/>
+          <ac:chgData name="Zhao Xiong" userId="5eba49e5-2895-4cd9-83e8-b3064fe76704" providerId="ADAL" clId="{B606E7B2-EFF5-418A-8639-9F7537C4DA50}" dt="2022-06-15T17:39:11.908" v="14305" actId="1076"/>
           <ac:spMkLst>
             <pc:docMk/>
             <pc:sldMk cId="3191795158" sldId="280"/>
@@ -2324,7 +2324,7 @@
           </ac:spMkLst>
         </pc:spChg>
         <pc:spChg chg="add mod">
-          <ac:chgData name="Zhao Xiong" userId="5eba49e5-2895-4cd9-83e8-b3064fe76704" providerId="ADAL" clId="{B606E7B2-EFF5-418A-8639-9F7537C4DA50}" dt="2022-06-15T12:53:25.927" v="14193" actId="1076"/>
+          <ac:chgData name="Zhao Xiong" userId="5eba49e5-2895-4cd9-83e8-b3064fe76704" providerId="ADAL" clId="{B606E7B2-EFF5-418A-8639-9F7537C4DA50}" dt="2022-06-15T17:39:11.908" v="14305" actId="1076"/>
           <ac:spMkLst>
             <pc:docMk/>
             <pc:sldMk cId="3191795158" sldId="280"/>
@@ -2332,23 +2332,23 @@
           </ac:spMkLst>
         </pc:spChg>
         <pc:spChg chg="add mod">
-          <ac:chgData name="Zhao Xiong" userId="5eba49e5-2895-4cd9-83e8-b3064fe76704" providerId="ADAL" clId="{B606E7B2-EFF5-418A-8639-9F7537C4DA50}" dt="2022-06-15T12:54:00.887" v="14204" actId="1076"/>
+          <ac:chgData name="Zhao Xiong" userId="5eba49e5-2895-4cd9-83e8-b3064fe76704" providerId="ADAL" clId="{B606E7B2-EFF5-418A-8639-9F7537C4DA50}" dt="2022-06-15T17:39:11.908" v="14305" actId="1076"/>
           <ac:spMkLst>
             <pc:docMk/>
             <pc:sldMk cId="3191795158" sldId="280"/>
             <ac:spMk id="9" creationId="{EAAE8511-41AA-4BAE-B960-3AFC9CFC0456}"/>
           </ac:spMkLst>
         </pc:spChg>
-        <pc:picChg chg="add mod">
-          <ac:chgData name="Zhao Xiong" userId="5eba49e5-2895-4cd9-83e8-b3064fe76704" providerId="ADAL" clId="{B606E7B2-EFF5-418A-8639-9F7537C4DA50}" dt="2022-06-15T12:53:25.927" v="14193" actId="1076"/>
+        <pc:picChg chg="add mod modCrop">
+          <ac:chgData name="Zhao Xiong" userId="5eba49e5-2895-4cd9-83e8-b3064fe76704" providerId="ADAL" clId="{B606E7B2-EFF5-418A-8639-9F7537C4DA50}" dt="2022-06-15T17:39:21.076" v="14307" actId="732"/>
           <ac:picMkLst>
             <pc:docMk/>
             <pc:sldMk cId="3191795158" sldId="280"/>
             <ac:picMk id="3" creationId="{2FCEC3B7-93E3-46EC-9360-766D1A5F2864}"/>
           </ac:picMkLst>
         </pc:picChg>
-        <pc:picChg chg="add mod">
-          <ac:chgData name="Zhao Xiong" userId="5eba49e5-2895-4cd9-83e8-b3064fe76704" providerId="ADAL" clId="{B606E7B2-EFF5-418A-8639-9F7537C4DA50}" dt="2022-06-15T12:53:25.927" v="14193" actId="1076"/>
+        <pc:picChg chg="add mod modCrop">
+          <ac:chgData name="Zhao Xiong" userId="5eba49e5-2895-4cd9-83e8-b3064fe76704" providerId="ADAL" clId="{B606E7B2-EFF5-418A-8639-9F7537C4DA50}" dt="2022-06-15T17:39:51.420" v="14309" actId="732"/>
           <ac:picMkLst>
             <pc:docMk/>
             <pc:sldMk cId="3191795158" sldId="280"/>
@@ -2361,6 +2361,14 @@
             <pc:docMk/>
             <pc:sldMk cId="3191795158" sldId="280"/>
             <ac:picMk id="7" creationId="{4BF5663B-0545-4FF2-AFC8-94E0D80B281F}"/>
+          </ac:picMkLst>
+        </pc:picChg>
+        <pc:picChg chg="add mod ord modCrop">
+          <ac:chgData name="Zhao Xiong" userId="5eba49e5-2895-4cd9-83e8-b3064fe76704" providerId="ADAL" clId="{B606E7B2-EFF5-418A-8639-9F7537C4DA50}" dt="2022-06-15T17:39:25.148" v="14308" actId="732"/>
+          <ac:picMkLst>
+            <pc:docMk/>
+            <pc:sldMk cId="3191795158" sldId="280"/>
+            <ac:picMk id="10" creationId="{F294D62E-F0A8-4BDA-8F4B-1582DEC8EEFE}"/>
           </ac:picMkLst>
         </pc:picChg>
       </pc:sldChg>
@@ -10735,10 +10743,10 @@
       </p:grpSpPr>
       <p:pic>
         <p:nvPicPr>
-          <p:cNvPr id="3" name="Picture 2">
-            <a:extLst>
-              <a:ext uri="{FF2B5EF4-FFF2-40B4-BE49-F238E27FC236}">
-                <a16:creationId xmlns:a16="http://schemas.microsoft.com/office/drawing/2014/main" id="{2FCEC3B7-93E3-46EC-9360-766D1A5F2864}"/>
+          <p:cNvPr id="10" name="Picture 9">
+            <a:extLst>
+              <a:ext uri="{FF2B5EF4-FFF2-40B4-BE49-F238E27FC236}">
+                <a16:creationId xmlns:a16="http://schemas.microsoft.com/office/drawing/2014/main" id="{F294D62E-F0A8-4BDA-8F4B-1582DEC8EEFE}"/>
               </a:ext>
             </a:extLst>
           </p:cNvPr>
@@ -10747,7 +10755,7 @@
           </p:cNvPicPr>
           <p:nvPr/>
         </p:nvPicPr>
-        <p:blipFill>
+        <p:blipFill rotWithShape="1">
           <a:blip r:embed="rId2">
             <a:extLst>
               <a:ext uri="{28A0092B-C50C-407E-A947-70E740481C1C}">
@@ -10755,14 +10763,48 @@
               </a:ext>
             </a:extLst>
           </a:blip>
-          <a:stretch>
-            <a:fillRect/>
-          </a:stretch>
+          <a:srcRect l="6494" r="9083" b="9899"/>
+          <a:stretch/>
         </p:blipFill>
         <p:spPr>
           <a:xfrm>
-            <a:off x="6096000" y="503116"/>
-            <a:ext cx="2821352" cy="6031120"/>
+            <a:off x="179753" y="656493"/>
+            <a:ext cx="2336801" cy="5175717"/>
+          </a:xfrm>
+          <a:prstGeom prst="rect">
+            <a:avLst/>
+          </a:prstGeom>
+        </p:spPr>
+      </p:pic>
+      <p:pic>
+        <p:nvPicPr>
+          <p:cNvPr id="3" name="Picture 2">
+            <a:extLst>
+              <a:ext uri="{FF2B5EF4-FFF2-40B4-BE49-F238E27FC236}">
+                <a16:creationId xmlns:a16="http://schemas.microsoft.com/office/drawing/2014/main" id="{2FCEC3B7-93E3-46EC-9360-766D1A5F2864}"/>
+              </a:ext>
+            </a:extLst>
+          </p:cNvPr>
+          <p:cNvPicPr>
+            <a:picLocks noChangeAspect="1"/>
+          </p:cNvPicPr>
+          <p:nvPr/>
+        </p:nvPicPr>
+        <p:blipFill rotWithShape="1">
+          <a:blip r:embed="rId3">
+            <a:extLst>
+              <a:ext uri="{28A0092B-C50C-407E-A947-70E740481C1C}">
+                <a14:useLocalDpi xmlns:a14="http://schemas.microsoft.com/office/drawing/2010/main" val="0"/>
+              </a:ext>
+            </a:extLst>
+          </a:blip>
+          <a:srcRect l="6368" r="9402" b="9899"/>
+          <a:stretch/>
+        </p:blipFill>
+        <p:spPr>
+          <a:xfrm>
+            <a:off x="4959977" y="656493"/>
+            <a:ext cx="2179495" cy="5175717"/>
           </a:xfrm>
           <a:prstGeom prst="rect">
             <a:avLst/>
@@ -10835,7 +10877,7 @@
         </p:nvSpPr>
         <p:spPr>
           <a:xfrm>
-            <a:off x="6494585" y="5934732"/>
+            <a:off x="5115646" y="5832210"/>
             <a:ext cx="2024182" cy="492443"/>
           </a:xfrm>
           <a:prstGeom prst="rect">
@@ -10881,22 +10923,21 @@
           </p:cNvPicPr>
           <p:nvPr/>
         </p:nvPicPr>
-        <p:blipFill>
-          <a:blip r:embed="rId3">
+        <p:blipFill rotWithShape="1">
+          <a:blip r:embed="rId4">
             <a:extLst>
               <a:ext uri="{28A0092B-C50C-407E-A947-70E740481C1C}">
                 <a14:useLocalDpi xmlns:a14="http://schemas.microsoft.com/office/drawing/2010/main" val="0"/>
               </a:ext>
             </a:extLst>
           </a:blip>
-          <a:stretch>
-            <a:fillRect/>
-          </a:stretch>
+          <a:srcRect l="6622" r="7791" b="9897"/>
+          <a:stretch/>
         </p:blipFill>
         <p:spPr>
           <a:xfrm>
-            <a:off x="9024052" y="503116"/>
-            <a:ext cx="2821352" cy="6031120"/>
+            <a:off x="7211396" y="656455"/>
+            <a:ext cx="2214555" cy="5175755"/>
           </a:xfrm>
           <a:prstGeom prst="rect">
             <a:avLst/>
@@ -10917,7 +10958,7 @@
         </p:nvSpPr>
         <p:spPr>
           <a:xfrm>
-            <a:off x="9422637" y="5934770"/>
+            <a:off x="7360481" y="5832210"/>
             <a:ext cx="2024182" cy="492443"/>
           </a:xfrm>
           <a:prstGeom prst="rect">
@@ -10963,7 +11004,7 @@
         </p:nvSpPr>
         <p:spPr>
           <a:xfrm>
-            <a:off x="510933" y="5934732"/>
+            <a:off x="398086" y="5832210"/>
             <a:ext cx="2024182" cy="492443"/>
           </a:xfrm>
           <a:prstGeom prst="rect">
@@ -11009,7 +11050,7 @@
         </p:nvSpPr>
         <p:spPr>
           <a:xfrm>
-            <a:off x="3339858" y="5934732"/>
+            <a:off x="2766049" y="5832210"/>
             <a:ext cx="2024182" cy="492443"/>
           </a:xfrm>
           <a:prstGeom prst="rect">

</xml_diff>

<commit_message>
added results for 160/100
</commit_message>
<xml_diff>
--- a/job_results.pptx
+++ b/job_results.pptx
@@ -198,7 +198,7 @@
   <pc:docChgLst>
     <pc:chgData name="Zhao Xiong" userId="5eba49e5-2895-4cd9-83e8-b3064fe76704" providerId="ADAL" clId="{B606E7B2-EFF5-418A-8639-9F7537C4DA50}"/>
     <pc:docChg chg="undo custSel addSld delSld modSld sldOrd">
-      <pc:chgData name="Zhao Xiong" userId="5eba49e5-2895-4cd9-83e8-b3064fe76704" providerId="ADAL" clId="{B606E7B2-EFF5-418A-8639-9F7537C4DA50}" dt="2022-06-15T17:39:51.420" v="14309" actId="732"/>
+      <pc:chgData name="Zhao Xiong" userId="5eba49e5-2895-4cd9-83e8-b3064fe76704" providerId="ADAL" clId="{B606E7B2-EFF5-418A-8639-9F7537C4DA50}" dt="2022-06-16T12:49:49.857" v="14404" actId="1038"/>
       <pc:docMkLst>
         <pc:docMk/>
       </pc:docMkLst>
@@ -2294,7 +2294,7 @@
         </pc:picChg>
       </pc:sldChg>
       <pc:sldChg chg="addSp delSp modSp add">
-        <pc:chgData name="Zhao Xiong" userId="5eba49e5-2895-4cd9-83e8-b3064fe76704" providerId="ADAL" clId="{B606E7B2-EFF5-418A-8639-9F7537C4DA50}" dt="2022-06-15T17:39:51.420" v="14309" actId="732"/>
+        <pc:chgData name="Zhao Xiong" userId="5eba49e5-2895-4cd9-83e8-b3064fe76704" providerId="ADAL" clId="{B606E7B2-EFF5-418A-8639-9F7537C4DA50}" dt="2022-06-16T12:49:49.857" v="14404" actId="1038"/>
         <pc:sldMkLst>
           <pc:docMk/>
           <pc:sldMk cId="3191795158" sldId="280"/>
@@ -2308,7 +2308,7 @@
           </ac:spMkLst>
         </pc:spChg>
         <pc:spChg chg="add mod">
-          <ac:chgData name="Zhao Xiong" userId="5eba49e5-2895-4cd9-83e8-b3064fe76704" providerId="ADAL" clId="{B606E7B2-EFF5-418A-8639-9F7537C4DA50}" dt="2022-06-15T17:39:11.908" v="14305" actId="1076"/>
+          <ac:chgData name="Zhao Xiong" userId="5eba49e5-2895-4cd9-83e8-b3064fe76704" providerId="ADAL" clId="{B606E7B2-EFF5-418A-8639-9F7537C4DA50}" dt="2022-06-16T12:49:39.650" v="14390" actId="1076"/>
           <ac:spMkLst>
             <pc:docMk/>
             <pc:sldMk cId="3191795158" sldId="280"/>
@@ -2324,23 +2324,39 @@
           </ac:spMkLst>
         </pc:spChg>
         <pc:spChg chg="add mod">
-          <ac:chgData name="Zhao Xiong" userId="5eba49e5-2895-4cd9-83e8-b3064fe76704" providerId="ADAL" clId="{B606E7B2-EFF5-418A-8639-9F7537C4DA50}" dt="2022-06-15T17:39:11.908" v="14305" actId="1076"/>
+          <ac:chgData name="Zhao Xiong" userId="5eba49e5-2895-4cd9-83e8-b3064fe76704" providerId="ADAL" clId="{B606E7B2-EFF5-418A-8639-9F7537C4DA50}" dt="2022-06-16T12:47:55.441" v="14357" actId="1037"/>
           <ac:spMkLst>
             <pc:docMk/>
             <pc:sldMk cId="3191795158" sldId="280"/>
             <ac:spMk id="8" creationId="{3771993F-74AF-42E3-AC42-7E65534CD0DD}"/>
           </ac:spMkLst>
         </pc:spChg>
-        <pc:spChg chg="add mod">
-          <ac:chgData name="Zhao Xiong" userId="5eba49e5-2895-4cd9-83e8-b3064fe76704" providerId="ADAL" clId="{B606E7B2-EFF5-418A-8639-9F7537C4DA50}" dt="2022-06-15T17:39:11.908" v="14305" actId="1076"/>
+        <pc:spChg chg="add del mod">
+          <ac:chgData name="Zhao Xiong" userId="5eba49e5-2895-4cd9-83e8-b3064fe76704" providerId="ADAL" clId="{B606E7B2-EFF5-418A-8639-9F7537C4DA50}" dt="2022-06-16T12:49:36.663" v="14389"/>
           <ac:spMkLst>
             <pc:docMk/>
             <pc:sldMk cId="3191795158" sldId="280"/>
             <ac:spMk id="9" creationId="{EAAE8511-41AA-4BAE-B960-3AFC9CFC0456}"/>
           </ac:spMkLst>
         </pc:spChg>
+        <pc:spChg chg="add mod">
+          <ac:chgData name="Zhao Xiong" userId="5eba49e5-2895-4cd9-83e8-b3064fe76704" providerId="ADAL" clId="{B606E7B2-EFF5-418A-8639-9F7537C4DA50}" dt="2022-06-16T12:49:00.817" v="14382" actId="1038"/>
+          <ac:spMkLst>
+            <pc:docMk/>
+            <pc:sldMk cId="3191795158" sldId="280"/>
+            <ac:spMk id="11" creationId="{E982C131-79E0-41B7-8A65-2738EDCCFD00}"/>
+          </ac:spMkLst>
+        </pc:spChg>
+        <pc:spChg chg="add mod">
+          <ac:chgData name="Zhao Xiong" userId="5eba49e5-2895-4cd9-83e8-b3064fe76704" providerId="ADAL" clId="{B606E7B2-EFF5-418A-8639-9F7537C4DA50}" dt="2022-06-16T12:49:49.857" v="14404" actId="1038"/>
+          <ac:spMkLst>
+            <pc:docMk/>
+            <pc:sldMk cId="3191795158" sldId="280"/>
+            <ac:spMk id="15" creationId="{54BA703D-E99F-4935-A68E-718C07B2E6EF}"/>
+          </ac:spMkLst>
+        </pc:spChg>
         <pc:picChg chg="add mod modCrop">
-          <ac:chgData name="Zhao Xiong" userId="5eba49e5-2895-4cd9-83e8-b3064fe76704" providerId="ADAL" clId="{B606E7B2-EFF5-418A-8639-9F7537C4DA50}" dt="2022-06-15T17:39:21.076" v="14307" actId="732"/>
+          <ac:chgData name="Zhao Xiong" userId="5eba49e5-2895-4cd9-83e8-b3064fe76704" providerId="ADAL" clId="{B606E7B2-EFF5-418A-8639-9F7537C4DA50}" dt="2022-06-16T12:49:39.650" v="14390" actId="1076"/>
           <ac:picMkLst>
             <pc:docMk/>
             <pc:sldMk cId="3191795158" sldId="280"/>
@@ -2348,7 +2364,7 @@
           </ac:picMkLst>
         </pc:picChg>
         <pc:picChg chg="add mod modCrop">
-          <ac:chgData name="Zhao Xiong" userId="5eba49e5-2895-4cd9-83e8-b3064fe76704" providerId="ADAL" clId="{B606E7B2-EFF5-418A-8639-9F7537C4DA50}" dt="2022-06-15T17:39:51.420" v="14309" actId="732"/>
+          <ac:chgData name="Zhao Xiong" userId="5eba49e5-2895-4cd9-83e8-b3064fe76704" providerId="ADAL" clId="{B606E7B2-EFF5-418A-8639-9F7537C4DA50}" dt="2022-06-16T12:47:55.441" v="14357" actId="1037"/>
           <ac:picMkLst>
             <pc:docMk/>
             <pc:sldMk cId="3191795158" sldId="280"/>
@@ -2369,6 +2385,30 @@
             <pc:docMk/>
             <pc:sldMk cId="3191795158" sldId="280"/>
             <ac:picMk id="10" creationId="{F294D62E-F0A8-4BDA-8F4B-1582DEC8EEFE}"/>
+          </ac:picMkLst>
+        </pc:picChg>
+        <pc:picChg chg="add del mod modCrop">
+          <ac:chgData name="Zhao Xiong" userId="5eba49e5-2895-4cd9-83e8-b3064fe76704" providerId="ADAL" clId="{B606E7B2-EFF5-418A-8639-9F7537C4DA50}" dt="2022-06-16T12:49:36.663" v="14389"/>
+          <ac:picMkLst>
+            <pc:docMk/>
+            <pc:sldMk cId="3191795158" sldId="280"/>
+            <ac:picMk id="12" creationId="{C98888D4-D092-4E58-AFE8-95B7220A48CD}"/>
+          </ac:picMkLst>
+        </pc:picChg>
+        <pc:picChg chg="add mod modCrop">
+          <ac:chgData name="Zhao Xiong" userId="5eba49e5-2895-4cd9-83e8-b3064fe76704" providerId="ADAL" clId="{B606E7B2-EFF5-418A-8639-9F7537C4DA50}" dt="2022-06-16T12:48:56.634" v="14367" actId="14100"/>
+          <ac:picMkLst>
+            <pc:docMk/>
+            <pc:sldMk cId="3191795158" sldId="280"/>
+            <ac:picMk id="14" creationId="{9FE12FCF-556A-4D1C-84CA-7826A2469D1C}"/>
+          </ac:picMkLst>
+        </pc:picChg>
+        <pc:picChg chg="add mod">
+          <ac:chgData name="Zhao Xiong" userId="5eba49e5-2895-4cd9-83e8-b3064fe76704" providerId="ADAL" clId="{B606E7B2-EFF5-418A-8639-9F7537C4DA50}" dt="2022-06-16T12:49:44.338" v="14392" actId="1076"/>
+          <ac:picMkLst>
+            <pc:docMk/>
+            <pc:sldMk cId="3191795158" sldId="280"/>
+            <ac:picMk id="16" creationId="{FDDD52B4-2F87-4E7A-AD27-DA015DDCBC5D}"/>
           </ac:picMkLst>
         </pc:picChg>
       </pc:sldChg>
@@ -2553,7 +2593,7 @@
           <a:p>
             <a:fld id="{3F756EDF-0C8E-4F27-B2A4-7BBF4F0FD9CE}" type="datetimeFigureOut">
               <a:rPr lang="en-GB" smtClean="0"/>
-              <a:t>15/06/2022</a:t>
+              <a:t>16/06/2022</a:t>
             </a:fld>
             <a:endParaRPr lang="en-GB"/>
           </a:p>
@@ -2970,7 +3010,7 @@
           <a:p>
             <a:fld id="{B1B6DC73-6F54-48A7-AC0A-0EE4EE00B05A}" type="datetimeFigureOut">
               <a:rPr lang="en-GB" smtClean="0"/>
-              <a:t>15/06/2022</a:t>
+              <a:t>16/06/2022</a:t>
             </a:fld>
             <a:endParaRPr lang="en-GB"/>
           </a:p>
@@ -3170,7 +3210,7 @@
           <a:p>
             <a:fld id="{B1B6DC73-6F54-48A7-AC0A-0EE4EE00B05A}" type="datetimeFigureOut">
               <a:rPr lang="en-GB" smtClean="0"/>
-              <a:t>15/06/2022</a:t>
+              <a:t>16/06/2022</a:t>
             </a:fld>
             <a:endParaRPr lang="en-GB"/>
           </a:p>
@@ -3380,7 +3420,7 @@
           <a:p>
             <a:fld id="{B1B6DC73-6F54-48A7-AC0A-0EE4EE00B05A}" type="datetimeFigureOut">
               <a:rPr lang="en-GB" smtClean="0"/>
-              <a:t>15/06/2022</a:t>
+              <a:t>16/06/2022</a:t>
             </a:fld>
             <a:endParaRPr lang="en-GB"/>
           </a:p>
@@ -3580,7 +3620,7 @@
           <a:p>
             <a:fld id="{B1B6DC73-6F54-48A7-AC0A-0EE4EE00B05A}" type="datetimeFigureOut">
               <a:rPr lang="en-GB" smtClean="0"/>
-              <a:t>15/06/2022</a:t>
+              <a:t>16/06/2022</a:t>
             </a:fld>
             <a:endParaRPr lang="en-GB"/>
           </a:p>
@@ -3856,7 +3896,7 @@
           <a:p>
             <a:fld id="{B1B6DC73-6F54-48A7-AC0A-0EE4EE00B05A}" type="datetimeFigureOut">
               <a:rPr lang="en-GB" smtClean="0"/>
-              <a:t>15/06/2022</a:t>
+              <a:t>16/06/2022</a:t>
             </a:fld>
             <a:endParaRPr lang="en-GB"/>
           </a:p>
@@ -4124,7 +4164,7 @@
           <a:p>
             <a:fld id="{B1B6DC73-6F54-48A7-AC0A-0EE4EE00B05A}" type="datetimeFigureOut">
               <a:rPr lang="en-GB" smtClean="0"/>
-              <a:t>15/06/2022</a:t>
+              <a:t>16/06/2022</a:t>
             </a:fld>
             <a:endParaRPr lang="en-GB"/>
           </a:p>
@@ -4539,7 +4579,7 @@
           <a:p>
             <a:fld id="{B1B6DC73-6F54-48A7-AC0A-0EE4EE00B05A}" type="datetimeFigureOut">
               <a:rPr lang="en-GB" smtClean="0"/>
-              <a:t>15/06/2022</a:t>
+              <a:t>16/06/2022</a:t>
             </a:fld>
             <a:endParaRPr lang="en-GB"/>
           </a:p>
@@ -4681,7 +4721,7 @@
           <a:p>
             <a:fld id="{B1B6DC73-6F54-48A7-AC0A-0EE4EE00B05A}" type="datetimeFigureOut">
               <a:rPr lang="en-GB" smtClean="0"/>
-              <a:t>15/06/2022</a:t>
+              <a:t>16/06/2022</a:t>
             </a:fld>
             <a:endParaRPr lang="en-GB"/>
           </a:p>
@@ -4794,7 +4834,7 @@
           <a:p>
             <a:fld id="{B1B6DC73-6F54-48A7-AC0A-0EE4EE00B05A}" type="datetimeFigureOut">
               <a:rPr lang="en-GB" smtClean="0"/>
-              <a:t>15/06/2022</a:t>
+              <a:t>16/06/2022</a:t>
             </a:fld>
             <a:endParaRPr lang="en-GB"/>
           </a:p>
@@ -5107,7 +5147,7 @@
           <a:p>
             <a:fld id="{B1B6DC73-6F54-48A7-AC0A-0EE4EE00B05A}" type="datetimeFigureOut">
               <a:rPr lang="en-GB" smtClean="0"/>
-              <a:t>15/06/2022</a:t>
+              <a:t>16/06/2022</a:t>
             </a:fld>
             <a:endParaRPr lang="en-GB"/>
           </a:p>
@@ -5396,7 +5436,7 @@
           <a:p>
             <a:fld id="{B1B6DC73-6F54-48A7-AC0A-0EE4EE00B05A}" type="datetimeFigureOut">
               <a:rPr lang="en-GB" smtClean="0"/>
-              <a:t>15/06/2022</a:t>
+              <a:t>16/06/2022</a:t>
             </a:fld>
             <a:endParaRPr lang="en-GB"/>
           </a:p>
@@ -5639,7 +5679,7 @@
           <a:p>
             <a:fld id="{B1B6DC73-6F54-48A7-AC0A-0EE4EE00B05A}" type="datetimeFigureOut">
               <a:rPr lang="en-GB" smtClean="0"/>
-              <a:t>15/06/2022</a:t>
+              <a:t>16/06/2022</a:t>
             </a:fld>
             <a:endParaRPr lang="en-GB"/>
           </a:p>
@@ -10803,7 +10843,7 @@
         </p:blipFill>
         <p:spPr>
           <a:xfrm>
-            <a:off x="4959977" y="656493"/>
+            <a:off x="2592313" y="656454"/>
             <a:ext cx="2179495" cy="5175717"/>
           </a:xfrm>
           <a:prstGeom prst="rect">
@@ -10877,7 +10917,7 @@
         </p:nvSpPr>
         <p:spPr>
           <a:xfrm>
-            <a:off x="5115646" y="5832210"/>
+            <a:off x="2747982" y="5832171"/>
             <a:ext cx="2024182" cy="492443"/>
           </a:xfrm>
           <a:prstGeom prst="rect">
@@ -10936,7 +10976,7 @@
         </p:blipFill>
         <p:spPr>
           <a:xfrm>
-            <a:off x="7211396" y="656455"/>
+            <a:off x="7385132" y="656455"/>
             <a:ext cx="2214555" cy="5175755"/>
           </a:xfrm>
           <a:prstGeom prst="rect">
@@ -10958,7 +10998,7 @@
         </p:nvSpPr>
         <p:spPr>
           <a:xfrm>
-            <a:off x="7360481" y="5832210"/>
+            <a:off x="7534217" y="5832210"/>
             <a:ext cx="2024182" cy="492443"/>
           </a:xfrm>
           <a:prstGeom prst="rect">
@@ -11038,10 +11078,10 @@
       </p:sp>
       <p:sp>
         <p:nvSpPr>
-          <p:cNvPr id="9" name="TextBox 8">
-            <a:extLst>
-              <a:ext uri="{FF2B5EF4-FFF2-40B4-BE49-F238E27FC236}">
-                <a16:creationId xmlns:a16="http://schemas.microsoft.com/office/drawing/2014/main" id="{EAAE8511-41AA-4BAE-B960-3AFC9CFC0456}"/>
+          <p:cNvPr id="11" name="TextBox 10">
+            <a:extLst>
+              <a:ext uri="{FF2B5EF4-FFF2-40B4-BE49-F238E27FC236}">
+                <a16:creationId xmlns:a16="http://schemas.microsoft.com/office/drawing/2014/main" id="{E982C131-79E0-41B7-8A65-2738EDCCFD00}"/>
               </a:ext>
             </a:extLst>
           </p:cNvPr>
@@ -11050,7 +11090,7 @@
         </p:nvSpPr>
         <p:spPr>
           <a:xfrm>
-            <a:off x="2766049" y="5832210"/>
+            <a:off x="9961756" y="5832210"/>
             <a:ext cx="2024182" cy="492443"/>
           </a:xfrm>
           <a:prstGeom prst="rect">
@@ -11069,19 +11109,135 @@
             <a:pPr algn="ctr"/>
             <a:r>
               <a:rPr lang="en-NZ" sz="1600" b="1" dirty="0"/>
-              <a:t>8 Batches </a:t>
+              <a:t>20 Batches </a:t>
             </a:r>
           </a:p>
           <a:p>
             <a:pPr algn="ctr"/>
             <a:r>
               <a:rPr lang="en-NZ" sz="1600" b="1" dirty="0"/>
-              <a:t>(3750 Patients Each)</a:t>
+              <a:t>(1500 Patients Each)</a:t>
             </a:r>
             <a:endParaRPr lang="en-GB" sz="1600" b="1" dirty="0"/>
           </a:p>
         </p:txBody>
       </p:sp>
+      <p:pic>
+        <p:nvPicPr>
+          <p:cNvPr id="14" name="Picture 13">
+            <a:extLst>
+              <a:ext uri="{FF2B5EF4-FFF2-40B4-BE49-F238E27FC236}">
+                <a16:creationId xmlns:a16="http://schemas.microsoft.com/office/drawing/2014/main" id="{9FE12FCF-556A-4D1C-84CA-7826A2469D1C}"/>
+              </a:ext>
+            </a:extLst>
+          </p:cNvPr>
+          <p:cNvPicPr>
+            <a:picLocks noChangeAspect="1"/>
+          </p:cNvPicPr>
+          <p:nvPr/>
+        </p:nvPicPr>
+        <p:blipFill rotWithShape="1">
+          <a:blip r:embed="rId5">
+            <a:extLst>
+              <a:ext uri="{28A0092B-C50C-407E-A947-70E740481C1C}">
+                <a14:useLocalDpi xmlns:a14="http://schemas.microsoft.com/office/drawing/2010/main" val="0"/>
+              </a:ext>
+            </a:extLst>
+          </a:blip>
+          <a:srcRect l="6005" r="8201" b="10470"/>
+          <a:stretch/>
+        </p:blipFill>
+        <p:spPr>
+          <a:xfrm>
+            <a:off x="9629777" y="656454"/>
+            <a:ext cx="2481980" cy="5175755"/>
+          </a:xfrm>
+          <a:prstGeom prst="rect">
+            <a:avLst/>
+          </a:prstGeom>
+        </p:spPr>
+      </p:pic>
+      <p:sp>
+        <p:nvSpPr>
+          <p:cNvPr id="15" name="TextBox 14">
+            <a:extLst>
+              <a:ext uri="{FF2B5EF4-FFF2-40B4-BE49-F238E27FC236}">
+                <a16:creationId xmlns:a16="http://schemas.microsoft.com/office/drawing/2014/main" id="{54BA703D-E99F-4935-A68E-718C07B2E6EF}"/>
+              </a:ext>
+            </a:extLst>
+          </p:cNvPr>
+          <p:cNvSpPr txBox="1"/>
+          <p:nvPr/>
+        </p:nvSpPr>
+        <p:spPr>
+          <a:xfrm>
+            <a:off x="5208516" y="5832171"/>
+            <a:ext cx="2024182" cy="492443"/>
+          </a:xfrm>
+          <a:prstGeom prst="rect">
+            <a:avLst/>
+          </a:prstGeom>
+          <a:solidFill>
+            <a:schemeClr val="bg1"/>
+          </a:solidFill>
+        </p:spPr>
+        <p:txBody>
+          <a:bodyPr wrap="square" lIns="0" tIns="0" rIns="0" bIns="0" rtlCol="0">
+            <a:spAutoFit/>
+          </a:bodyPr>
+          <a:lstStyle/>
+          <a:p>
+            <a:pPr algn="ctr"/>
+            <a:r>
+              <a:rPr lang="en-NZ" sz="1600" b="1" dirty="0"/>
+              <a:t>12 Batches </a:t>
+            </a:r>
+          </a:p>
+          <a:p>
+            <a:pPr algn="ctr"/>
+            <a:r>
+              <a:rPr lang="en-NZ" sz="1600" b="1" dirty="0"/>
+              <a:t>(2500 Patients Each)</a:t>
+            </a:r>
+            <a:endParaRPr lang="en-GB" sz="1600" b="1" dirty="0"/>
+          </a:p>
+        </p:txBody>
+      </p:sp>
+      <p:pic>
+        <p:nvPicPr>
+          <p:cNvPr id="16" name="Picture 15">
+            <a:extLst>
+              <a:ext uri="{FF2B5EF4-FFF2-40B4-BE49-F238E27FC236}">
+                <a16:creationId xmlns:a16="http://schemas.microsoft.com/office/drawing/2014/main" id="{FDDD52B4-2F87-4E7A-AD27-DA015DDCBC5D}"/>
+              </a:ext>
+            </a:extLst>
+          </p:cNvPr>
+          <p:cNvPicPr>
+            <a:picLocks noChangeAspect="1"/>
+          </p:cNvPicPr>
+          <p:nvPr/>
+        </p:nvPicPr>
+        <p:blipFill rotWithShape="1">
+          <a:blip r:embed="rId6">
+            <a:extLst>
+              <a:ext uri="{28A0092B-C50C-407E-A947-70E740481C1C}">
+                <a14:useLocalDpi xmlns:a14="http://schemas.microsoft.com/office/drawing/2010/main" val="0"/>
+              </a:ext>
+            </a:extLst>
+          </a:blip>
+          <a:srcRect l="5451" r="7210" b="10041"/>
+          <a:stretch/>
+        </p:blipFill>
+        <p:spPr>
+          <a:xfrm>
+            <a:off x="4838565" y="656415"/>
+            <a:ext cx="2514617" cy="5175755"/>
+          </a:xfrm>
+          <a:prstGeom prst="rect">
+            <a:avLst/>
+          </a:prstGeom>
+        </p:spPr>
+      </p:pic>
     </p:spTree>
     <p:extLst>
       <p:ext uri="{BB962C8B-B14F-4D97-AF65-F5344CB8AC3E}">

</xml_diff>

<commit_message>
added some results to ppt and also u
</commit_message>
<xml_diff>
--- a/job_results.pptx
+++ b/job_results.pptx
@@ -198,7 +198,7 @@
   <pc:docChgLst>
     <pc:chgData name="Zhao Xiong" userId="5eba49e5-2895-4cd9-83e8-b3064fe76704" providerId="ADAL" clId="{B606E7B2-EFF5-418A-8639-9F7537C4DA50}"/>
     <pc:docChg chg="undo custSel addSld delSld modSld sldOrd">
-      <pc:chgData name="Zhao Xiong" userId="5eba49e5-2895-4cd9-83e8-b3064fe76704" providerId="ADAL" clId="{B606E7B2-EFF5-418A-8639-9F7537C4DA50}" dt="2022-06-16T12:49:49.857" v="14404" actId="1038"/>
+      <pc:chgData name="Zhao Xiong" userId="5eba49e5-2895-4cd9-83e8-b3064fe76704" providerId="ADAL" clId="{B606E7B2-EFF5-418A-8639-9F7537C4DA50}" dt="2022-06-16T14:30:18.779" v="14431" actId="1076"/>
       <pc:docMkLst>
         <pc:docMk/>
       </pc:docMkLst>
@@ -2294,7 +2294,7 @@
         </pc:picChg>
       </pc:sldChg>
       <pc:sldChg chg="addSp delSp modSp add">
-        <pc:chgData name="Zhao Xiong" userId="5eba49e5-2895-4cd9-83e8-b3064fe76704" providerId="ADAL" clId="{B606E7B2-EFF5-418A-8639-9F7537C4DA50}" dt="2022-06-16T12:49:49.857" v="14404" actId="1038"/>
+        <pc:chgData name="Zhao Xiong" userId="5eba49e5-2895-4cd9-83e8-b3064fe76704" providerId="ADAL" clId="{B606E7B2-EFF5-418A-8639-9F7537C4DA50}" dt="2022-06-16T14:30:18.779" v="14431" actId="1076"/>
         <pc:sldMkLst>
           <pc:docMk/>
           <pc:sldMk cId="3191795158" sldId="280"/>
@@ -2324,7 +2324,7 @@
           </ac:spMkLst>
         </pc:spChg>
         <pc:spChg chg="add mod">
-          <ac:chgData name="Zhao Xiong" userId="5eba49e5-2895-4cd9-83e8-b3064fe76704" providerId="ADAL" clId="{B606E7B2-EFF5-418A-8639-9F7537C4DA50}" dt="2022-06-16T12:47:55.441" v="14357" actId="1037"/>
+          <ac:chgData name="Zhao Xiong" userId="5eba49e5-2895-4cd9-83e8-b3064fe76704" providerId="ADAL" clId="{B606E7B2-EFF5-418A-8639-9F7537C4DA50}" dt="2022-06-16T14:30:01.218" v="14426" actId="1076"/>
           <ac:spMkLst>
             <pc:docMk/>
             <pc:sldMk cId="3191795158" sldId="280"/>
@@ -2340,31 +2340,39 @@
           </ac:spMkLst>
         </pc:spChg>
         <pc:spChg chg="add mod">
-          <ac:chgData name="Zhao Xiong" userId="5eba49e5-2895-4cd9-83e8-b3064fe76704" providerId="ADAL" clId="{B606E7B2-EFF5-418A-8639-9F7537C4DA50}" dt="2022-06-16T12:49:00.817" v="14382" actId="1038"/>
+          <ac:chgData name="Zhao Xiong" userId="5eba49e5-2895-4cd9-83e8-b3064fe76704" providerId="ADAL" clId="{B606E7B2-EFF5-418A-8639-9F7537C4DA50}" dt="2022-06-16T14:30:01.218" v="14426" actId="1076"/>
           <ac:spMkLst>
             <pc:docMk/>
             <pc:sldMk cId="3191795158" sldId="280"/>
             <ac:spMk id="11" creationId="{E982C131-79E0-41B7-8A65-2738EDCCFD00}"/>
           </ac:spMkLst>
         </pc:spChg>
-        <pc:spChg chg="add mod">
-          <ac:chgData name="Zhao Xiong" userId="5eba49e5-2895-4cd9-83e8-b3064fe76704" providerId="ADAL" clId="{B606E7B2-EFF5-418A-8639-9F7537C4DA50}" dt="2022-06-16T12:49:49.857" v="14404" actId="1038"/>
+        <pc:spChg chg="add del mod">
+          <ac:chgData name="Zhao Xiong" userId="5eba49e5-2895-4cd9-83e8-b3064fe76704" providerId="ADAL" clId="{B606E7B2-EFF5-418A-8639-9F7537C4DA50}" dt="2022-06-16T14:29:58.363" v="14425" actId="478"/>
           <ac:spMkLst>
             <pc:docMk/>
             <pc:sldMk cId="3191795158" sldId="280"/>
             <ac:spMk id="15" creationId="{54BA703D-E99F-4935-A68E-718C07B2E6EF}"/>
           </ac:spMkLst>
         </pc:spChg>
+        <pc:spChg chg="add mod">
+          <ac:chgData name="Zhao Xiong" userId="5eba49e5-2895-4cd9-83e8-b3064fe76704" providerId="ADAL" clId="{B606E7B2-EFF5-418A-8639-9F7537C4DA50}" dt="2022-06-16T14:30:08.875" v="14430" actId="20577"/>
+          <ac:spMkLst>
+            <pc:docMk/>
+            <pc:sldMk cId="3191795158" sldId="280"/>
+            <ac:spMk id="17" creationId="{C1B01031-D3FA-4F7D-AB0C-B9540470AA23}"/>
+          </ac:spMkLst>
+        </pc:spChg>
         <pc:picChg chg="add mod modCrop">
-          <ac:chgData name="Zhao Xiong" userId="5eba49e5-2895-4cd9-83e8-b3064fe76704" providerId="ADAL" clId="{B606E7B2-EFF5-418A-8639-9F7537C4DA50}" dt="2022-06-16T12:49:39.650" v="14390" actId="1076"/>
+          <ac:chgData name="Zhao Xiong" userId="5eba49e5-2895-4cd9-83e8-b3064fe76704" providerId="ADAL" clId="{B606E7B2-EFF5-418A-8639-9F7537C4DA50}" dt="2022-06-16T14:30:18.779" v="14431" actId="1076"/>
           <ac:picMkLst>
             <pc:docMk/>
             <pc:sldMk cId="3191795158" sldId="280"/>
             <ac:picMk id="3" creationId="{2FCEC3B7-93E3-46EC-9360-766D1A5F2864}"/>
           </ac:picMkLst>
         </pc:picChg>
-        <pc:picChg chg="add mod modCrop">
-          <ac:chgData name="Zhao Xiong" userId="5eba49e5-2895-4cd9-83e8-b3064fe76704" providerId="ADAL" clId="{B606E7B2-EFF5-418A-8639-9F7537C4DA50}" dt="2022-06-16T12:47:55.441" v="14357" actId="1037"/>
+        <pc:picChg chg="add del mod modCrop">
+          <ac:chgData name="Zhao Xiong" userId="5eba49e5-2895-4cd9-83e8-b3064fe76704" providerId="ADAL" clId="{B606E7B2-EFF5-418A-8639-9F7537C4DA50}" dt="2022-06-16T14:24:00.656" v="14416" actId="478"/>
           <ac:picMkLst>
             <pc:docMk/>
             <pc:sldMk cId="3191795158" sldId="280"/>
@@ -2379,6 +2387,14 @@
             <ac:picMk id="7" creationId="{4BF5663B-0545-4FF2-AFC8-94E0D80B281F}"/>
           </ac:picMkLst>
         </pc:picChg>
+        <pc:picChg chg="add mod modCrop">
+          <ac:chgData name="Zhao Xiong" userId="5eba49e5-2895-4cd9-83e8-b3064fe76704" providerId="ADAL" clId="{B606E7B2-EFF5-418A-8639-9F7537C4DA50}" dt="2022-06-16T14:30:01.218" v="14426" actId="1076"/>
+          <ac:picMkLst>
+            <pc:docMk/>
+            <pc:sldMk cId="3191795158" sldId="280"/>
+            <ac:picMk id="9" creationId="{DE5540BD-C850-4CBF-8509-C50E19E6FD09}"/>
+          </ac:picMkLst>
+        </pc:picChg>
         <pc:picChg chg="add mod ord modCrop">
           <ac:chgData name="Zhao Xiong" userId="5eba49e5-2895-4cd9-83e8-b3064fe76704" providerId="ADAL" clId="{B606E7B2-EFF5-418A-8639-9F7537C4DA50}" dt="2022-06-15T17:39:25.148" v="14308" actId="732"/>
           <ac:picMkLst>
@@ -2396,15 +2412,15 @@
           </ac:picMkLst>
         </pc:picChg>
         <pc:picChg chg="add mod modCrop">
-          <ac:chgData name="Zhao Xiong" userId="5eba49e5-2895-4cd9-83e8-b3064fe76704" providerId="ADAL" clId="{B606E7B2-EFF5-418A-8639-9F7537C4DA50}" dt="2022-06-16T12:48:56.634" v="14367" actId="14100"/>
+          <ac:chgData name="Zhao Xiong" userId="5eba49e5-2895-4cd9-83e8-b3064fe76704" providerId="ADAL" clId="{B606E7B2-EFF5-418A-8639-9F7537C4DA50}" dt="2022-06-16T14:30:01.218" v="14426" actId="1076"/>
           <ac:picMkLst>
             <pc:docMk/>
             <pc:sldMk cId="3191795158" sldId="280"/>
             <ac:picMk id="14" creationId="{9FE12FCF-556A-4D1C-84CA-7826A2469D1C}"/>
           </ac:picMkLst>
         </pc:picChg>
-        <pc:picChg chg="add mod">
-          <ac:chgData name="Zhao Xiong" userId="5eba49e5-2895-4cd9-83e8-b3064fe76704" providerId="ADAL" clId="{B606E7B2-EFF5-418A-8639-9F7537C4DA50}" dt="2022-06-16T12:49:44.338" v="14392" actId="1076"/>
+        <pc:picChg chg="add del mod">
+          <ac:chgData name="Zhao Xiong" userId="5eba49e5-2895-4cd9-83e8-b3064fe76704" providerId="ADAL" clId="{B606E7B2-EFF5-418A-8639-9F7537C4DA50}" dt="2022-06-16T14:29:57.131" v="14424" actId="478"/>
           <ac:picMkLst>
             <pc:docMk/>
             <pc:sldMk cId="3191795158" sldId="280"/>
@@ -10843,7 +10859,7 @@
         </p:blipFill>
         <p:spPr>
           <a:xfrm>
-            <a:off x="2592313" y="656454"/>
+            <a:off x="2675987" y="184666"/>
             <a:ext cx="2179495" cy="5175717"/>
           </a:xfrm>
           <a:prstGeom prst="rect">
@@ -10949,41 +10965,6 @@
           </a:p>
         </p:txBody>
       </p:sp>
-      <p:pic>
-        <p:nvPicPr>
-          <p:cNvPr id="6" name="Picture 5">
-            <a:extLst>
-              <a:ext uri="{FF2B5EF4-FFF2-40B4-BE49-F238E27FC236}">
-                <a16:creationId xmlns:a16="http://schemas.microsoft.com/office/drawing/2014/main" id="{802D6637-C750-46BB-A41B-C1ABFDD6448F}"/>
-              </a:ext>
-            </a:extLst>
-          </p:cNvPr>
-          <p:cNvPicPr>
-            <a:picLocks noChangeAspect="1"/>
-          </p:cNvPicPr>
-          <p:nvPr/>
-        </p:nvPicPr>
-        <p:blipFill rotWithShape="1">
-          <a:blip r:embed="rId4">
-            <a:extLst>
-              <a:ext uri="{28A0092B-C50C-407E-A947-70E740481C1C}">
-                <a14:useLocalDpi xmlns:a14="http://schemas.microsoft.com/office/drawing/2010/main" val="0"/>
-              </a:ext>
-            </a:extLst>
-          </a:blip>
-          <a:srcRect l="6622" r="7791" b="9897"/>
-          <a:stretch/>
-        </p:blipFill>
-        <p:spPr>
-          <a:xfrm>
-            <a:off x="7385132" y="656455"/>
-            <a:ext cx="2214555" cy="5175755"/>
-          </a:xfrm>
-          <a:prstGeom prst="rect">
-            <a:avLst/>
-          </a:prstGeom>
-        </p:spPr>
-      </p:pic>
       <p:sp>
         <p:nvSpPr>
           <p:cNvPr id="8" name="TextBox 7">
@@ -10998,7 +10979,7 @@
         </p:nvSpPr>
         <p:spPr>
           <a:xfrm>
-            <a:off x="7534217" y="5832210"/>
+            <a:off x="5151504" y="5832249"/>
             <a:ext cx="2024182" cy="492443"/>
           </a:xfrm>
           <a:prstGeom prst="rect">
@@ -11090,7 +11071,7 @@
         </p:nvSpPr>
         <p:spPr>
           <a:xfrm>
-            <a:off x="9961756" y="5832210"/>
+            <a:off x="7579043" y="5832249"/>
             <a:ext cx="2024182" cy="492443"/>
           </a:xfrm>
           <a:prstGeom prst="rect">
@@ -11137,7 +11118,7 @@
           <p:nvPr/>
         </p:nvPicPr>
         <p:blipFill rotWithShape="1">
-          <a:blip r:embed="rId5">
+          <a:blip r:embed="rId4">
             <a:extLst>
               <a:ext uri="{28A0092B-C50C-407E-A947-70E740481C1C}">
                 <a14:useLocalDpi xmlns:a14="http://schemas.microsoft.com/office/drawing/2010/main" val="0"/>
@@ -11149,7 +11130,7 @@
         </p:blipFill>
         <p:spPr>
           <a:xfrm>
-            <a:off x="9629777" y="656454"/>
+            <a:off x="7247064" y="656493"/>
             <a:ext cx="2481980" cy="5175755"/>
           </a:xfrm>
           <a:prstGeom prst="rect">
@@ -11157,12 +11138,47 @@
           </a:prstGeom>
         </p:spPr>
       </p:pic>
-      <p:sp>
-        <p:nvSpPr>
-          <p:cNvPr id="15" name="TextBox 14">
-            <a:extLst>
-              <a:ext uri="{FF2B5EF4-FFF2-40B4-BE49-F238E27FC236}">
-                <a16:creationId xmlns:a16="http://schemas.microsoft.com/office/drawing/2014/main" id="{54BA703D-E99F-4935-A68E-718C07B2E6EF}"/>
+      <p:pic>
+        <p:nvPicPr>
+          <p:cNvPr id="9" name="Picture 8">
+            <a:extLst>
+              <a:ext uri="{FF2B5EF4-FFF2-40B4-BE49-F238E27FC236}">
+                <a16:creationId xmlns:a16="http://schemas.microsoft.com/office/drawing/2014/main" id="{DE5540BD-C850-4CBF-8509-C50E19E6FD09}"/>
+              </a:ext>
+            </a:extLst>
+          </p:cNvPr>
+          <p:cNvPicPr>
+            <a:picLocks noChangeAspect="1"/>
+          </p:cNvPicPr>
+          <p:nvPr/>
+        </p:nvPicPr>
+        <p:blipFill rotWithShape="1">
+          <a:blip r:embed="rId5">
+            <a:extLst>
+              <a:ext uri="{28A0092B-C50C-407E-A947-70E740481C1C}">
+                <a14:useLocalDpi xmlns:a14="http://schemas.microsoft.com/office/drawing/2010/main" val="0"/>
+              </a:ext>
+            </a:extLst>
+          </a:blip>
+          <a:srcRect l="5837" r="8517" b="10800"/>
+          <a:stretch/>
+        </p:blipFill>
+        <p:spPr>
+          <a:xfrm>
+            <a:off x="5007169" y="656454"/>
+            <a:ext cx="2177661" cy="5175755"/>
+          </a:xfrm>
+          <a:prstGeom prst="rect">
+            <a:avLst/>
+          </a:prstGeom>
+        </p:spPr>
+      </p:pic>
+      <p:sp>
+        <p:nvSpPr>
+          <p:cNvPr id="17" name="TextBox 16">
+            <a:extLst>
+              <a:ext uri="{FF2B5EF4-FFF2-40B4-BE49-F238E27FC236}">
+                <a16:creationId xmlns:a16="http://schemas.microsoft.com/office/drawing/2014/main" id="{C1B01031-D3FA-4F7D-AB0C-B9540470AA23}"/>
               </a:ext>
             </a:extLst>
           </p:cNvPr>
@@ -11171,7 +11187,7 @@
         </p:nvSpPr>
         <p:spPr>
           <a:xfrm>
-            <a:off x="5208516" y="5832171"/>
+            <a:off x="9935204" y="5832171"/>
             <a:ext cx="2024182" cy="492443"/>
           </a:xfrm>
           <a:prstGeom prst="rect">
@@ -11190,54 +11206,19 @@
             <a:pPr algn="ctr"/>
             <a:r>
               <a:rPr lang="en-NZ" sz="1600" b="1" dirty="0"/>
-              <a:t>12 Batches </a:t>
+              <a:t>25 Batches </a:t>
             </a:r>
           </a:p>
           <a:p>
             <a:pPr algn="ctr"/>
             <a:r>
               <a:rPr lang="en-NZ" sz="1600" b="1" dirty="0"/>
-              <a:t>(2500 Patients Each)</a:t>
+              <a:t>(1500 Patients Each)</a:t>
             </a:r>
             <a:endParaRPr lang="en-GB" sz="1600" b="1" dirty="0"/>
           </a:p>
         </p:txBody>
       </p:sp>
-      <p:pic>
-        <p:nvPicPr>
-          <p:cNvPr id="16" name="Picture 15">
-            <a:extLst>
-              <a:ext uri="{FF2B5EF4-FFF2-40B4-BE49-F238E27FC236}">
-                <a16:creationId xmlns:a16="http://schemas.microsoft.com/office/drawing/2014/main" id="{FDDD52B4-2F87-4E7A-AD27-DA015DDCBC5D}"/>
-              </a:ext>
-            </a:extLst>
-          </p:cNvPr>
-          <p:cNvPicPr>
-            <a:picLocks noChangeAspect="1"/>
-          </p:cNvPicPr>
-          <p:nvPr/>
-        </p:nvPicPr>
-        <p:blipFill rotWithShape="1">
-          <a:blip r:embed="rId6">
-            <a:extLst>
-              <a:ext uri="{28A0092B-C50C-407E-A947-70E740481C1C}">
-                <a14:useLocalDpi xmlns:a14="http://schemas.microsoft.com/office/drawing/2010/main" val="0"/>
-              </a:ext>
-            </a:extLst>
-          </a:blip>
-          <a:srcRect l="5451" r="7210" b="10041"/>
-          <a:stretch/>
-        </p:blipFill>
-        <p:spPr>
-          <a:xfrm>
-            <a:off x="4838565" y="656415"/>
-            <a:ext cx="2514617" cy="5175755"/>
-          </a:xfrm>
-          <a:prstGeom prst="rect">
-            <a:avLst/>
-          </a:prstGeom>
-        </p:spPr>
-      </p:pic>
     </p:spTree>
     <p:extLst>
       <p:ext uri="{BB962C8B-B14F-4D97-AF65-F5344CB8AC3E}">

</xml_diff>

<commit_message>
added plotly to ppt
</commit_message>
<xml_diff>
--- a/job_results.pptx
+++ b/job_results.pptx
@@ -5,7 +5,7 @@
     <p:sldMasterId id="2147483648" r:id="rId1"/>
   </p:sldMasterIdLst>
   <p:notesMasterIdLst>
-    <p:notesMasterId r:id="rId25"/>
+    <p:notesMasterId r:id="rId27"/>
   </p:notesMasterIdLst>
   <p:sldIdLst>
     <p:sldId id="256" r:id="rId2"/>
@@ -29,8 +29,10 @@
     <p:sldId id="278" r:id="rId20"/>
     <p:sldId id="280" r:id="rId21"/>
     <p:sldId id="282" r:id="rId22"/>
-    <p:sldId id="275" r:id="rId23"/>
-    <p:sldId id="263" r:id="rId24"/>
+    <p:sldId id="283" r:id="rId23"/>
+    <p:sldId id="284" r:id="rId24"/>
+    <p:sldId id="275" r:id="rId25"/>
+    <p:sldId id="263" r:id="rId26"/>
   </p:sldIdLst>
   <p:sldSz cx="12192000" cy="6858000"/>
   <p:notesSz cx="6858000" cy="9144000"/>
@@ -198,7 +200,7 @@
   <pc:docChgLst>
     <pc:chgData name="Zhao Xiong" userId="5eba49e5-2895-4cd9-83e8-b3064fe76704" providerId="ADAL" clId="{B606E7B2-EFF5-418A-8639-9F7537C4DA50}"/>
     <pc:docChg chg="undo custSel addSld delSld modSld sldOrd">
-      <pc:chgData name="Zhao Xiong" userId="5eba49e5-2895-4cd9-83e8-b3064fe76704" providerId="ADAL" clId="{B606E7B2-EFF5-418A-8639-9F7537C4DA50}" dt="2022-06-18T15:22:38.846" v="14811" actId="1037"/>
+      <pc:chgData name="Zhao Xiong" userId="5eba49e5-2895-4cd9-83e8-b3064fe76704" providerId="ADAL" clId="{B606E7B2-EFF5-418A-8639-9F7537C4DA50}" dt="2022-06-18T15:59:45.560" v="14885" actId="1076"/>
       <pc:docMkLst>
         <pc:docMk/>
       </pc:docMkLst>
@@ -2617,6 +2619,68 @@
             <ac:picMk id="15" creationId="{CD670C90-6158-48CB-99C5-1038DA77715B}"/>
           </ac:picMkLst>
         </pc:picChg>
+      </pc:sldChg>
+      <pc:sldChg chg="addSp delSp modSp add">
+        <pc:chgData name="Zhao Xiong" userId="5eba49e5-2895-4cd9-83e8-b3064fe76704" providerId="ADAL" clId="{B606E7B2-EFF5-418A-8639-9F7537C4DA50}" dt="2022-06-18T15:59:45.560" v="14885" actId="1076"/>
+        <pc:sldMkLst>
+          <pc:docMk/>
+          <pc:sldMk cId="2763442935" sldId="283"/>
+        </pc:sldMkLst>
+        <pc:spChg chg="del">
+          <ac:chgData name="Zhao Xiong" userId="5eba49e5-2895-4cd9-83e8-b3064fe76704" providerId="ADAL" clId="{B606E7B2-EFF5-418A-8639-9F7537C4DA50}" dt="2022-06-18T15:59:05.601" v="14815" actId="478"/>
+          <ac:spMkLst>
+            <pc:docMk/>
+            <pc:sldMk cId="2763442935" sldId="283"/>
+            <ac:spMk id="2" creationId="{440AB55B-8648-4A7E-A3F1-CBADB102CC3B}"/>
+          </ac:spMkLst>
+        </pc:spChg>
+        <pc:spChg chg="del">
+          <ac:chgData name="Zhao Xiong" userId="5eba49e5-2895-4cd9-83e8-b3064fe76704" providerId="ADAL" clId="{B606E7B2-EFF5-418A-8639-9F7537C4DA50}" dt="2022-06-18T15:59:05.601" v="14815" actId="478"/>
+          <ac:spMkLst>
+            <pc:docMk/>
+            <pc:sldMk cId="2763442935" sldId="283"/>
+            <ac:spMk id="3" creationId="{CED8B65B-D4E5-41DB-9C6C-A39C86E11586}"/>
+          </ac:spMkLst>
+        </pc:spChg>
+        <pc:spChg chg="add mod">
+          <ac:chgData name="Zhao Xiong" userId="5eba49e5-2895-4cd9-83e8-b3064fe76704" providerId="ADAL" clId="{B606E7B2-EFF5-418A-8639-9F7537C4DA50}" dt="2022-06-18T15:59:31.041" v="14884" actId="20577"/>
+          <ac:spMkLst>
+            <pc:docMk/>
+            <pc:sldMk cId="2763442935" sldId="283"/>
+            <ac:spMk id="5" creationId="{7FB87E52-D2D1-473C-89A1-3130212F1F63}"/>
+          </ac:spMkLst>
+        </pc:spChg>
+        <pc:picChg chg="add mod">
+          <ac:chgData name="Zhao Xiong" userId="5eba49e5-2895-4cd9-83e8-b3064fe76704" providerId="ADAL" clId="{B606E7B2-EFF5-418A-8639-9F7537C4DA50}" dt="2022-06-18T15:59:45.560" v="14885" actId="1076"/>
+          <ac:picMkLst>
+            <pc:docMk/>
+            <pc:sldMk cId="2763442935" sldId="283"/>
+            <ac:picMk id="4" creationId="{40BBEE19-387A-46F1-BFE8-E5AF3C72930B}"/>
+          </ac:picMkLst>
+        </pc:picChg>
+      </pc:sldChg>
+      <pc:sldChg chg="delSp add">
+        <pc:chgData name="Zhao Xiong" userId="5eba49e5-2895-4cd9-83e8-b3064fe76704" providerId="ADAL" clId="{B606E7B2-EFF5-418A-8639-9F7537C4DA50}" dt="2022-06-18T15:59:03.741" v="14814" actId="478"/>
+        <pc:sldMkLst>
+          <pc:docMk/>
+          <pc:sldMk cId="3096138305" sldId="284"/>
+        </pc:sldMkLst>
+        <pc:spChg chg="del">
+          <ac:chgData name="Zhao Xiong" userId="5eba49e5-2895-4cd9-83e8-b3064fe76704" providerId="ADAL" clId="{B606E7B2-EFF5-418A-8639-9F7537C4DA50}" dt="2022-06-18T15:59:03.741" v="14814" actId="478"/>
+          <ac:spMkLst>
+            <pc:docMk/>
+            <pc:sldMk cId="3096138305" sldId="284"/>
+            <ac:spMk id="2" creationId="{02B78EB2-BE8B-4F62-864A-EF173B3C13B0}"/>
+          </ac:spMkLst>
+        </pc:spChg>
+        <pc:spChg chg="del">
+          <ac:chgData name="Zhao Xiong" userId="5eba49e5-2895-4cd9-83e8-b3064fe76704" providerId="ADAL" clId="{B606E7B2-EFF5-418A-8639-9F7537C4DA50}" dt="2022-06-18T15:59:03.741" v="14814" actId="478"/>
+          <ac:spMkLst>
+            <pc:docMk/>
+            <pc:sldMk cId="3096138305" sldId="284"/>
+            <ac:spMk id="3" creationId="{DA5BEAEB-C87B-479E-819B-63183C436DC2}"/>
+          </ac:spMkLst>
+        </pc:spChg>
       </pc:sldChg>
     </pc:docChg>
   </pc:docChgLst>
@@ -11710,6 +11774,140 @@
           <a:chExt cx="0" cy="0"/>
         </a:xfrm>
       </p:grpSpPr>
+      <p:pic>
+        <p:nvPicPr>
+          <p:cNvPr id="4" name="Picture 3">
+            <a:extLst>
+              <a:ext uri="{FF2B5EF4-FFF2-40B4-BE49-F238E27FC236}">
+                <a16:creationId xmlns:a16="http://schemas.microsoft.com/office/drawing/2014/main" id="{40BBEE19-387A-46F1-BFE8-E5AF3C72930B}"/>
+              </a:ext>
+            </a:extLst>
+          </p:cNvPr>
+          <p:cNvPicPr>
+            <a:picLocks noChangeAspect="1"/>
+          </p:cNvPicPr>
+          <p:nvPr/>
+        </p:nvPicPr>
+        <p:blipFill>
+          <a:blip r:embed="rId2"/>
+          <a:stretch>
+            <a:fillRect/>
+          </a:stretch>
+        </p:blipFill>
+        <p:spPr>
+          <a:xfrm>
+            <a:off x="468923" y="369332"/>
+            <a:ext cx="11254154" cy="6355583"/>
+          </a:xfrm>
+          <a:prstGeom prst="rect">
+            <a:avLst/>
+          </a:prstGeom>
+        </p:spPr>
+      </p:pic>
+      <p:sp>
+        <p:nvSpPr>
+          <p:cNvPr id="5" name="TextBox 4">
+            <a:extLst>
+              <a:ext uri="{FF2B5EF4-FFF2-40B4-BE49-F238E27FC236}">
+                <a16:creationId xmlns:a16="http://schemas.microsoft.com/office/drawing/2014/main" id="{7FB87E52-D2D1-473C-89A1-3130212F1F63}"/>
+              </a:ext>
+            </a:extLst>
+          </p:cNvPr>
+          <p:cNvSpPr txBox="1"/>
+          <p:nvPr/>
+        </p:nvSpPr>
+        <p:spPr>
+          <a:xfrm>
+            <a:off x="0" y="0"/>
+            <a:ext cx="12192000" cy="369332"/>
+          </a:xfrm>
+          <a:prstGeom prst="rect">
+            <a:avLst/>
+          </a:prstGeom>
+          <a:noFill/>
+        </p:spPr>
+        <p:txBody>
+          <a:bodyPr wrap="square" rtlCol="0">
+            <a:spAutoFit/>
+          </a:bodyPr>
+          <a:lstStyle/>
+          <a:p>
+            <a:r>
+              <a:rPr lang="en-NZ" b="1" dirty="0"/>
+              <a:t>Trajectory Visualization (Python </a:t>
+            </a:r>
+            <a:r>
+              <a:rPr lang="en-NZ" b="1" dirty="0" err="1"/>
+              <a:t>Plotly</a:t>
+            </a:r>
+            <a:r>
+              <a:rPr lang="en-NZ" b="1" dirty="0"/>
+              <a:t>)</a:t>
+            </a:r>
+            <a:endParaRPr lang="en-GB" b="1" dirty="0"/>
+          </a:p>
+        </p:txBody>
+      </p:sp>
+    </p:spTree>
+    <p:extLst>
+      <p:ext uri="{BB962C8B-B14F-4D97-AF65-F5344CB8AC3E}">
+        <p14:creationId xmlns:p14="http://schemas.microsoft.com/office/powerpoint/2010/main" val="2763442935"/>
+      </p:ext>
+    </p:extLst>
+  </p:cSld>
+  <p:clrMapOvr>
+    <a:masterClrMapping/>
+  </p:clrMapOvr>
+</p:sld>
+</file>
+
+<file path=ppt/slides/slide23.xml><?xml version="1.0" encoding="utf-8"?>
+<p:sld xmlns:a="http://schemas.openxmlformats.org/drawingml/2006/main" xmlns:r="http://schemas.openxmlformats.org/officeDocument/2006/relationships" xmlns:p="http://schemas.openxmlformats.org/presentationml/2006/main">
+  <p:cSld>
+    <p:spTree>
+      <p:nvGrpSpPr>
+        <p:cNvPr id="1" name=""/>
+        <p:cNvGrpSpPr/>
+        <p:nvPr/>
+      </p:nvGrpSpPr>
+      <p:grpSpPr>
+        <a:xfrm>
+          <a:off x="0" y="0"/>
+          <a:ext cx="0" cy="0"/>
+          <a:chOff x="0" y="0"/>
+          <a:chExt cx="0" cy="0"/>
+        </a:xfrm>
+      </p:grpSpPr>
+    </p:spTree>
+    <p:extLst>
+      <p:ext uri="{BB962C8B-B14F-4D97-AF65-F5344CB8AC3E}">
+        <p14:creationId xmlns:p14="http://schemas.microsoft.com/office/powerpoint/2010/main" val="3096138305"/>
+      </p:ext>
+    </p:extLst>
+  </p:cSld>
+  <p:clrMapOvr>
+    <a:masterClrMapping/>
+  </p:clrMapOvr>
+</p:sld>
+</file>
+
+<file path=ppt/slides/slide24.xml><?xml version="1.0" encoding="utf-8"?>
+<p:sld xmlns:a="http://schemas.openxmlformats.org/drawingml/2006/main" xmlns:r="http://schemas.openxmlformats.org/officeDocument/2006/relationships" xmlns:p="http://schemas.openxmlformats.org/presentationml/2006/main">
+  <p:cSld>
+    <p:spTree>
+      <p:nvGrpSpPr>
+        <p:cNvPr id="1" name=""/>
+        <p:cNvGrpSpPr/>
+        <p:nvPr/>
+      </p:nvGrpSpPr>
+      <p:grpSpPr>
+        <a:xfrm>
+          <a:off x="0" y="0"/>
+          <a:ext cx="0" cy="0"/>
+          <a:chOff x="0" y="0"/>
+          <a:chExt cx="0" cy="0"/>
+        </a:xfrm>
+      </p:grpSpPr>
       <p:sp>
         <p:nvSpPr>
           <p:cNvPr id="4" name="TextBox 3">
@@ -12039,7 +12237,7 @@
 </p:sld>
 </file>
 
-<file path=ppt/slides/slide23.xml><?xml version="1.0" encoding="utf-8"?>
+<file path=ppt/slides/slide25.xml><?xml version="1.0" encoding="utf-8"?>
 <p:sld xmlns:a="http://schemas.openxmlformats.org/drawingml/2006/main" xmlns:r="http://schemas.openxmlformats.org/officeDocument/2006/relationships" xmlns:p="http://schemas.openxmlformats.org/presentationml/2006/main">
   <p:cSld>
     <p:spTree>

</xml_diff>

<commit_message>
added AUC to evaluation
</commit_message>
<xml_diff>
--- a/job_results.pptx
+++ b/job_results.pptx
@@ -5,7 +5,7 @@
     <p:sldMasterId id="2147483648" r:id="rId1"/>
   </p:sldMasterIdLst>
   <p:notesMasterIdLst>
-    <p:notesMasterId r:id="rId31"/>
+    <p:notesMasterId r:id="rId32"/>
   </p:notesMasterIdLst>
   <p:sldIdLst>
     <p:sldId id="256" r:id="rId2"/>
@@ -35,8 +35,9 @@
     <p:sldId id="286" r:id="rId26"/>
     <p:sldId id="287" r:id="rId27"/>
     <p:sldId id="288" r:id="rId28"/>
-    <p:sldId id="275" r:id="rId29"/>
-    <p:sldId id="263" r:id="rId30"/>
+    <p:sldId id="289" r:id="rId29"/>
+    <p:sldId id="275" r:id="rId30"/>
+    <p:sldId id="263" r:id="rId31"/>
   </p:sldIdLst>
   <p:sldSz cx="12192000" cy="6858000"/>
   <p:notesSz cx="6858000" cy="9144000"/>
@@ -2889,12 +2890,12 @@
   <pc:docChgLst>
     <pc:chgData name="zhaohan" userId="95e304e8ede71739" providerId="LiveId" clId="{740E24C1-5156-4599-B84F-B42CCA40E00D}"/>
     <pc:docChg chg="undo custSel addSld modSld">
-      <pc:chgData name="zhaohan" userId="95e304e8ede71739" providerId="LiveId" clId="{740E24C1-5156-4599-B84F-B42CCA40E00D}" dt="2022-07-02T04:54:48.348" v="444" actId="20577"/>
+      <pc:chgData name="zhaohan" userId="95e304e8ede71739" providerId="LiveId" clId="{740E24C1-5156-4599-B84F-B42CCA40E00D}" dt="2022-07-02T11:29:42.984" v="538" actId="21"/>
       <pc:docMkLst>
         <pc:docMk/>
       </pc:docMkLst>
       <pc:sldChg chg="addSp delSp modSp mod">
-        <pc:chgData name="zhaohan" userId="95e304e8ede71739" providerId="LiveId" clId="{740E24C1-5156-4599-B84F-B42CCA40E00D}" dt="2022-07-02T04:54:48.348" v="444" actId="20577"/>
+        <pc:chgData name="zhaohan" userId="95e304e8ede71739" providerId="LiveId" clId="{740E24C1-5156-4599-B84F-B42CCA40E00D}" dt="2022-07-02T08:49:18.184" v="468" actId="20577"/>
         <pc:sldMkLst>
           <pc:docMk/>
           <pc:sldMk cId="504494362" sldId="287"/>
@@ -2972,7 +2973,7 @@
           </ac:spMkLst>
         </pc:spChg>
         <pc:spChg chg="add mod">
-          <ac:chgData name="zhaohan" userId="95e304e8ede71739" providerId="LiveId" clId="{740E24C1-5156-4599-B84F-B42CCA40E00D}" dt="2022-07-01T00:32:13.071" v="351" actId="20577"/>
+          <ac:chgData name="zhaohan" userId="95e304e8ede71739" providerId="LiveId" clId="{740E24C1-5156-4599-B84F-B42CCA40E00D}" dt="2022-07-02T08:48:49.523" v="452" actId="1076"/>
           <ac:spMkLst>
             <pc:docMk/>
             <pc:sldMk cId="504494362" sldId="287"/>
@@ -2988,19 +2989,130 @@
           </ac:spMkLst>
         </pc:spChg>
         <pc:spChg chg="add mod">
-          <ac:chgData name="zhaohan" userId="95e304e8ede71739" providerId="LiveId" clId="{740E24C1-5156-4599-B84F-B42CCA40E00D}" dt="2022-07-02T04:54:48.348" v="444" actId="20577"/>
+          <ac:chgData name="zhaohan" userId="95e304e8ede71739" providerId="LiveId" clId="{740E24C1-5156-4599-B84F-B42CCA40E00D}" dt="2022-07-02T08:48:30.003" v="445" actId="1076"/>
           <ac:spMkLst>
             <pc:docMk/>
             <pc:sldMk cId="504494362" sldId="287"/>
             <ac:spMk id="10" creationId="{3802BC98-06D8-5238-3379-57DBEF6A7D26}"/>
           </ac:spMkLst>
         </pc:spChg>
+        <pc:spChg chg="add mod">
+          <ac:chgData name="zhaohan" userId="95e304e8ede71739" providerId="LiveId" clId="{740E24C1-5156-4599-B84F-B42CCA40E00D}" dt="2022-07-02T08:48:44.941" v="451" actId="20577"/>
+          <ac:spMkLst>
+            <pc:docMk/>
+            <pc:sldMk cId="504494362" sldId="287"/>
+            <ac:spMk id="11" creationId="{0A0B048D-1BC8-6839-96A2-AF2D7F6A4D2C}"/>
+          </ac:spMkLst>
+        </pc:spChg>
+        <pc:spChg chg="add mod">
+          <ac:chgData name="zhaohan" userId="95e304e8ede71739" providerId="LiveId" clId="{740E24C1-5156-4599-B84F-B42CCA40E00D}" dt="2022-07-02T08:49:18.184" v="468" actId="20577"/>
+          <ac:spMkLst>
+            <pc:docMk/>
+            <pc:sldMk cId="504494362" sldId="287"/>
+            <ac:spMk id="12" creationId="{8726D8E8-3F53-21B8-A378-A54F2DB7E068}"/>
+          </ac:spMkLst>
+        </pc:spChg>
       </pc:sldChg>
-      <pc:sldChg chg="add">
-        <pc:chgData name="zhaohan" userId="95e304e8ede71739" providerId="LiveId" clId="{740E24C1-5156-4599-B84F-B42CCA40E00D}" dt="2022-06-30T06:11:49.243" v="0"/>
+      <pc:sldChg chg="addSp delSp modSp add mod">
+        <pc:chgData name="zhaohan" userId="95e304e8ede71739" providerId="LiveId" clId="{740E24C1-5156-4599-B84F-B42CCA40E00D}" dt="2022-07-02T11:29:42.984" v="538" actId="21"/>
         <pc:sldMkLst>
           <pc:docMk/>
           <pc:sldMk cId="2571968155" sldId="288"/>
+        </pc:sldMkLst>
+        <pc:spChg chg="add mod">
+          <ac:chgData name="zhaohan" userId="95e304e8ede71739" providerId="LiveId" clId="{740E24C1-5156-4599-B84F-B42CCA40E00D}" dt="2022-07-02T11:24:08.100" v="473" actId="20577"/>
+          <ac:spMkLst>
+            <pc:docMk/>
+            <pc:sldMk cId="2571968155" sldId="288"/>
+            <ac:spMk id="2" creationId="{0DC165B2-DA56-875D-2DA4-E53105F93824}"/>
+          </ac:spMkLst>
+        </pc:spChg>
+        <pc:spChg chg="add mod">
+          <ac:chgData name="zhaohan" userId="95e304e8ede71739" providerId="LiveId" clId="{740E24C1-5156-4599-B84F-B42CCA40E00D}" dt="2022-07-02T11:29:39.204" v="536" actId="207"/>
+          <ac:spMkLst>
+            <pc:docMk/>
+            <pc:sldMk cId="2571968155" sldId="288"/>
+            <ac:spMk id="4" creationId="{456D4B22-AC02-8FC8-EC1B-4F18DB718833}"/>
+          </ac:spMkLst>
+        </pc:spChg>
+        <pc:spChg chg="add mod">
+          <ac:chgData name="zhaohan" userId="95e304e8ede71739" providerId="LiveId" clId="{740E24C1-5156-4599-B84F-B42CCA40E00D}" dt="2022-07-02T11:29:19.467" v="533" actId="571"/>
+          <ac:spMkLst>
+            <pc:docMk/>
+            <pc:sldMk cId="2571968155" sldId="288"/>
+            <ac:spMk id="11" creationId="{D5EE938A-5087-1500-A3FC-D359452A557E}"/>
+          </ac:spMkLst>
+        </pc:spChg>
+        <pc:graphicFrameChg chg="add mod">
+          <ac:chgData name="zhaohan" userId="95e304e8ede71739" providerId="LiveId" clId="{740E24C1-5156-4599-B84F-B42CCA40E00D}" dt="2022-07-02T11:27:05.248" v="480" actId="1076"/>
+          <ac:graphicFrameMkLst>
+            <pc:docMk/>
+            <pc:sldMk cId="2571968155" sldId="288"/>
+            <ac:graphicFrameMk id="3" creationId="{15B3081A-8FFC-B7E9-69B2-81B32491C43D}"/>
+          </ac:graphicFrameMkLst>
+        </pc:graphicFrameChg>
+        <pc:graphicFrameChg chg="add del mod">
+          <ac:chgData name="zhaohan" userId="95e304e8ede71739" providerId="LiveId" clId="{740E24C1-5156-4599-B84F-B42CCA40E00D}" dt="2022-07-02T11:29:42.984" v="538" actId="21"/>
+          <ac:graphicFrameMkLst>
+            <pc:docMk/>
+            <pc:sldMk cId="2571968155" sldId="288"/>
+            <ac:graphicFrameMk id="5" creationId="{3B26D1D2-7503-83B9-EF24-863E3A92E05C}"/>
+          </ac:graphicFrameMkLst>
+        </pc:graphicFrameChg>
+        <pc:graphicFrameChg chg="add del mod">
+          <ac:chgData name="zhaohan" userId="95e304e8ede71739" providerId="LiveId" clId="{740E24C1-5156-4599-B84F-B42CCA40E00D}" dt="2022-07-02T11:29:41.862" v="537" actId="21"/>
+          <ac:graphicFrameMkLst>
+            <pc:docMk/>
+            <pc:sldMk cId="2571968155" sldId="288"/>
+            <ac:graphicFrameMk id="6" creationId="{643654B8-228E-86C7-2622-C4BF55EC438F}"/>
+          </ac:graphicFrameMkLst>
+        </pc:graphicFrameChg>
+        <pc:graphicFrameChg chg="add del mod">
+          <ac:chgData name="zhaohan" userId="95e304e8ede71739" providerId="LiveId" clId="{740E24C1-5156-4599-B84F-B42CCA40E00D}" dt="2022-07-02T11:27:56.982" v="506" actId="21"/>
+          <ac:graphicFrameMkLst>
+            <pc:docMk/>
+            <pc:sldMk cId="2571968155" sldId="288"/>
+            <ac:graphicFrameMk id="7" creationId="{8CEE1393-BCBB-BE6E-E037-A6A95F6BD212}"/>
+          </ac:graphicFrameMkLst>
+        </pc:graphicFrameChg>
+        <pc:graphicFrameChg chg="add del mod modGraphic">
+          <ac:chgData name="zhaohan" userId="95e304e8ede71739" providerId="LiveId" clId="{740E24C1-5156-4599-B84F-B42CCA40E00D}" dt="2022-07-02T11:28:44.977" v="524" actId="21"/>
+          <ac:graphicFrameMkLst>
+            <pc:docMk/>
+            <pc:sldMk cId="2571968155" sldId="288"/>
+            <ac:graphicFrameMk id="8" creationId="{B0C31BD2-831D-6F39-DD32-A530D0B0AAAF}"/>
+          </ac:graphicFrameMkLst>
+        </pc:graphicFrameChg>
+        <pc:graphicFrameChg chg="add del mod">
+          <ac:chgData name="zhaohan" userId="95e304e8ede71739" providerId="LiveId" clId="{740E24C1-5156-4599-B84F-B42CCA40E00D}" dt="2022-07-02T11:28:05.650" v="509"/>
+          <ac:graphicFrameMkLst>
+            <pc:docMk/>
+            <pc:sldMk cId="2571968155" sldId="288"/>
+            <ac:graphicFrameMk id="9" creationId="{71CAA50A-CB68-5C8D-5FCF-4CFA55EB395D}"/>
+          </ac:graphicFrameMkLst>
+        </pc:graphicFrameChg>
+        <pc:graphicFrameChg chg="add mod">
+          <ac:chgData name="zhaohan" userId="95e304e8ede71739" providerId="LiveId" clId="{740E24C1-5156-4599-B84F-B42CCA40E00D}" dt="2022-07-02T11:29:23.153" v="535" actId="1076"/>
+          <ac:graphicFrameMkLst>
+            <pc:docMk/>
+            <pc:sldMk cId="2571968155" sldId="288"/>
+            <ac:graphicFrameMk id="10" creationId="{32A9EF0F-4E36-C8E2-7947-307E30508C79}"/>
+          </ac:graphicFrameMkLst>
+        </pc:graphicFrameChg>
+        <pc:graphicFrameChg chg="add mod">
+          <ac:chgData name="zhaohan" userId="95e304e8ede71739" providerId="LiveId" clId="{740E24C1-5156-4599-B84F-B42CCA40E00D}" dt="2022-07-02T11:29:19.467" v="533" actId="571"/>
+          <ac:graphicFrameMkLst>
+            <pc:docMk/>
+            <pc:sldMk cId="2571968155" sldId="288"/>
+            <ac:graphicFrameMk id="12" creationId="{B6F62C6E-BE91-102B-2FD0-8642F93B7408}"/>
+          </ac:graphicFrameMkLst>
+        </pc:graphicFrameChg>
+      </pc:sldChg>
+      <pc:sldChg chg="add">
+        <pc:chgData name="zhaohan" userId="95e304e8ede71739" providerId="LiveId" clId="{740E24C1-5156-4599-B84F-B42CCA40E00D}" dt="2022-07-02T11:23:34.579" v="469"/>
+        <pc:sldMkLst>
+          <pc:docMk/>
+          <pc:sldMk cId="302987753" sldId="289"/>
         </pc:sldMkLst>
       </pc:sldChg>
     </pc:docChg>
@@ -13679,8 +13791,8 @@
         </p:nvSpPr>
         <p:spPr>
           <a:xfrm>
-            <a:off x="0" y="3198167"/>
-            <a:ext cx="12192000" cy="461665"/>
+            <a:off x="0" y="3204399"/>
+            <a:ext cx="5723467" cy="461665"/>
           </a:xfrm>
           <a:prstGeom prst="rect">
             <a:avLst/>
@@ -13715,7 +13827,7 @@
         </p:nvSpPr>
         <p:spPr>
           <a:xfrm>
-            <a:off x="345552" y="3933308"/>
+            <a:off x="345552" y="3778744"/>
             <a:ext cx="5246593" cy="2308324"/>
           </a:xfrm>
           <a:prstGeom prst="rect">
@@ -13766,20 +13878,12 @@
               <a:t>cPCA</a:t>
             </a:r>
             <a:r>
-              <a:rPr lang="en-NZ" sz="1600" b="1" u="sng">
-                <a:solidFill>
-                  <a:srgbClr val="FF0000"/>
-                </a:solidFill>
-              </a:rPr>
-              <a:t> 10 </a:t>
-            </a:r>
-            <a:r>
               <a:rPr lang="en-NZ" sz="1600" b="1" u="sng" dirty="0">
                 <a:solidFill>
                   <a:srgbClr val="FF0000"/>
                 </a:solidFill>
               </a:rPr>
-              <a:t>batches (Compare Against Full Run):</a:t>
+              <a:t> 10 batches (Compare Against Full Run):</a:t>
             </a:r>
           </a:p>
           <a:p>
@@ -13815,6 +13919,137 @@
             <a:r>
               <a:rPr lang="en-US" sz="1600" dirty="0"/>
               <a:t> +- 0.03 [0.01, 0.11]</a:t>
+            </a:r>
+          </a:p>
+        </p:txBody>
+      </p:sp>
+      <p:sp>
+        <p:nvSpPr>
+          <p:cNvPr id="11" name="TextBox 10">
+            <a:extLst>
+              <a:ext uri="{FF2B5EF4-FFF2-40B4-BE49-F238E27FC236}">
+                <a16:creationId xmlns:a16="http://schemas.microsoft.com/office/drawing/2014/main" id="{0A0B048D-1BC8-6839-96A2-AF2D7F6A4D2C}"/>
+              </a:ext>
+            </a:extLst>
+          </p:cNvPr>
+          <p:cNvSpPr txBox="1"/>
+          <p:nvPr/>
+        </p:nvSpPr>
+        <p:spPr>
+          <a:xfrm>
+            <a:off x="6179378" y="3198166"/>
+            <a:ext cx="5723467" cy="461665"/>
+          </a:xfrm>
+          <a:prstGeom prst="rect">
+            <a:avLst/>
+          </a:prstGeom>
+          <a:noFill/>
+        </p:spPr>
+        <p:txBody>
+          <a:bodyPr wrap="square" rtlCol="0">
+            <a:spAutoFit/>
+          </a:bodyPr>
+          <a:lstStyle/>
+          <a:p>
+            <a:r>
+              <a:rPr lang="en-NZ" sz="2400" b="1" dirty="0"/>
+              <a:t>30 – fold cross validation</a:t>
+            </a:r>
+            <a:endParaRPr lang="en-GB" sz="2400" b="1" dirty="0"/>
+          </a:p>
+        </p:txBody>
+      </p:sp>
+      <p:sp>
+        <p:nvSpPr>
+          <p:cNvPr id="12" name="TextBox 11">
+            <a:extLst>
+              <a:ext uri="{FF2B5EF4-FFF2-40B4-BE49-F238E27FC236}">
+                <a16:creationId xmlns:a16="http://schemas.microsoft.com/office/drawing/2014/main" id="{8726D8E8-3F53-21B8-A378-A54F2DB7E068}"/>
+              </a:ext>
+            </a:extLst>
+          </p:cNvPr>
+          <p:cNvSpPr txBox="1"/>
+          <p:nvPr/>
+        </p:nvSpPr>
+        <p:spPr>
+          <a:xfrm>
+            <a:off x="6517753" y="3778744"/>
+            <a:ext cx="5246593" cy="2308324"/>
+          </a:xfrm>
+          <a:prstGeom prst="rect">
+            <a:avLst/>
+          </a:prstGeom>
+          <a:noFill/>
+        </p:spPr>
+        <p:txBody>
+          <a:bodyPr wrap="square">
+            <a:spAutoFit/>
+          </a:bodyPr>
+          <a:lstStyle/>
+          <a:p>
+            <a:r>
+              <a:rPr lang="en-NZ" sz="1600" b="1" u="sng" dirty="0" err="1"/>
+              <a:t>cPCA</a:t>
+            </a:r>
+            <a:r>
+              <a:rPr lang="en-NZ" sz="1600" b="1" u="sng" dirty="0"/>
+              <a:t> 10 batches (Compare Folds Between Themselves):</a:t>
+            </a:r>
+          </a:p>
+          <a:p>
+            <a:endParaRPr lang="en-US" sz="1600" dirty="0"/>
+          </a:p>
+          <a:p>
+            <a:r>
+              <a:rPr lang="en-US" sz="1600" dirty="0"/>
+              <a:t>Root Mean Squared Error is: </a:t>
+            </a:r>
+          </a:p>
+          <a:p>
+            <a:r>
+              <a:rPr lang="en-US" sz="1600" dirty="0"/>
+              <a:t>Mean Standard Deviation is:</a:t>
+            </a:r>
+          </a:p>
+          <a:p>
+            <a:endParaRPr lang="en-US" sz="1600" dirty="0"/>
+          </a:p>
+          <a:p>
+            <a:r>
+              <a:rPr lang="en-NZ" sz="1600" b="1" u="sng" dirty="0" err="1">
+                <a:solidFill>
+                  <a:srgbClr val="FF0000"/>
+                </a:solidFill>
+              </a:rPr>
+              <a:t>cPCA</a:t>
+            </a:r>
+            <a:r>
+              <a:rPr lang="en-NZ" sz="1600" b="1" u="sng" dirty="0">
+                <a:solidFill>
+                  <a:srgbClr val="FF0000"/>
+                </a:solidFill>
+              </a:rPr>
+              <a:t> 10 batches (Compare Against Full Run):</a:t>
+            </a:r>
+          </a:p>
+          <a:p>
+            <a:endParaRPr lang="en-NZ" sz="1600" b="1" u="sng" dirty="0"/>
+          </a:p>
+          <a:p>
+            <a:r>
+              <a:rPr lang="en-US" sz="1600" dirty="0"/>
+              <a:t>Root Mean Squared Error is: </a:t>
+            </a:r>
+            <a:endParaRPr lang="en-US" sz="1600" b="1" dirty="0">
+              <a:solidFill>
+                <a:srgbClr val="FF0000"/>
+              </a:solidFill>
+            </a:endParaRPr>
+          </a:p>
+          <a:p>
+            <a:r>
+              <a:rPr lang="en-US" sz="1600" dirty="0"/>
+              <a:t>Mean Standard Deviation is: </a:t>
             </a:r>
           </a:p>
         </p:txBody>
@@ -13849,6 +14084,220 @@
           <a:chExt cx="0" cy="0"/>
         </a:xfrm>
       </p:grpSpPr>
+      <p:sp>
+        <p:nvSpPr>
+          <p:cNvPr id="2" name="TextBox 1">
+            <a:extLst>
+              <a:ext uri="{FF2B5EF4-FFF2-40B4-BE49-F238E27FC236}">
+                <a16:creationId xmlns:a16="http://schemas.microsoft.com/office/drawing/2014/main" id="{0DC165B2-DA56-875D-2DA4-E53105F93824}"/>
+              </a:ext>
+            </a:extLst>
+          </p:cNvPr>
+          <p:cNvSpPr txBox="1"/>
+          <p:nvPr/>
+        </p:nvSpPr>
+        <p:spPr>
+          <a:xfrm>
+            <a:off x="0" y="0"/>
+            <a:ext cx="12192000" cy="461665"/>
+          </a:xfrm>
+          <a:prstGeom prst="rect">
+            <a:avLst/>
+          </a:prstGeom>
+          <a:noFill/>
+        </p:spPr>
+        <p:txBody>
+          <a:bodyPr wrap="square" rtlCol="0">
+            <a:spAutoFit/>
+          </a:bodyPr>
+          <a:lstStyle/>
+          <a:p>
+            <a:r>
+              <a:rPr lang="en-NZ" sz="2400" b="1" dirty="0"/>
+              <a:t>AUC</a:t>
+            </a:r>
+            <a:endParaRPr lang="en-GB" sz="2400" b="1" dirty="0"/>
+          </a:p>
+        </p:txBody>
+      </p:sp>
+      <p:graphicFrame>
+        <p:nvGraphicFramePr>
+          <p:cNvPr id="3" name="Object 2">
+            <a:extLst>
+              <a:ext uri="{FF2B5EF4-FFF2-40B4-BE49-F238E27FC236}">
+                <a16:creationId xmlns:a16="http://schemas.microsoft.com/office/drawing/2014/main" id="{15B3081A-8FFC-B7E9-69B2-81B32491C43D}"/>
+              </a:ext>
+            </a:extLst>
+          </p:cNvPr>
+          <p:cNvGraphicFramePr>
+            <a:graphicFrameLocks noChangeAspect="1"/>
+          </p:cNvGraphicFramePr>
+          <p:nvPr>
+            <p:extLst>
+              <p:ext uri="{D42A27DB-BD31-4B8C-83A1-F6EECF244321}">
+                <p14:modId xmlns:p14="http://schemas.microsoft.com/office/powerpoint/2010/main" val="2576325961"/>
+              </p:ext>
+            </p:extLst>
+          </p:nvPr>
+        </p:nvGraphicFramePr>
+        <p:xfrm>
+          <a:off x="5313737" y="871350"/>
+          <a:ext cx="6761723" cy="5868512"/>
+        </p:xfrm>
+        <a:graphic>
+          <a:graphicData uri="http://schemas.openxmlformats.org/presentationml/2006/ole">
+            <mc:AlternateContent xmlns:mc="http://schemas.openxmlformats.org/markup-compatibility/2006">
+              <mc:Choice xmlns:v="urn:schemas-microsoft-com:vml" Requires="v">
+                <p:oleObj name="Bitmap Image" r:id="rId2" imgW="5311080" imgH="4610160" progId="Paint.Picture">
+                  <p:embed/>
+                </p:oleObj>
+              </mc:Choice>
+              <mc:Fallback>
+                <p:oleObj name="Bitmap Image" r:id="rId2" imgW="5311080" imgH="4610160" progId="Paint.Picture">
+                  <p:embed/>
+                  <p:pic>
+                    <p:nvPicPr>
+                      <p:cNvPr id="3" name="Object 2">
+                        <a:extLst>
+                          <a:ext uri="{FF2B5EF4-FFF2-40B4-BE49-F238E27FC236}">
+                            <a16:creationId xmlns:a16="http://schemas.microsoft.com/office/drawing/2014/main" id="{15B3081A-8FFC-B7E9-69B2-81B32491C43D}"/>
+                          </a:ext>
+                        </a:extLst>
+                      </p:cNvPr>
+                      <p:cNvPicPr/>
+                      <p:nvPr/>
+                    </p:nvPicPr>
+                    <p:blipFill>
+                      <a:blip r:embed="rId3"/>
+                      <a:stretch>
+                        <a:fillRect/>
+                      </a:stretch>
+                    </p:blipFill>
+                    <p:spPr>
+                      <a:xfrm>
+                        <a:off x="5313737" y="871350"/>
+                        <a:ext cx="6761723" cy="5868512"/>
+                      </a:xfrm>
+                      <a:prstGeom prst="rect">
+                        <a:avLst/>
+                      </a:prstGeom>
+                    </p:spPr>
+                  </p:pic>
+                </p:oleObj>
+              </mc:Fallback>
+            </mc:AlternateContent>
+          </a:graphicData>
+        </a:graphic>
+      </p:graphicFrame>
+      <p:sp>
+        <p:nvSpPr>
+          <p:cNvPr id="4" name="TextBox 3">
+            <a:extLst>
+              <a:ext uri="{FF2B5EF4-FFF2-40B4-BE49-F238E27FC236}">
+                <a16:creationId xmlns:a16="http://schemas.microsoft.com/office/drawing/2014/main" id="{456D4B22-AC02-8FC8-EC1B-4F18DB718833}"/>
+              </a:ext>
+            </a:extLst>
+          </p:cNvPr>
+          <p:cNvSpPr txBox="1"/>
+          <p:nvPr/>
+        </p:nvSpPr>
+        <p:spPr>
+          <a:xfrm>
+            <a:off x="405551" y="638268"/>
+            <a:ext cx="3881305" cy="338554"/>
+          </a:xfrm>
+          <a:prstGeom prst="rect">
+            <a:avLst/>
+          </a:prstGeom>
+          <a:noFill/>
+        </p:spPr>
+        <p:txBody>
+          <a:bodyPr wrap="square">
+            <a:spAutoFit/>
+          </a:bodyPr>
+          <a:lstStyle/>
+          <a:p>
+            <a:pPr algn="ctr"/>
+            <a:r>
+              <a:rPr lang="en-US" sz="1600" b="1" dirty="0">
+                <a:solidFill>
+                  <a:srgbClr val="FF0000"/>
+                </a:solidFill>
+              </a:rPr>
+              <a:t>AUC = 0.99885</a:t>
+            </a:r>
+          </a:p>
+        </p:txBody>
+      </p:sp>
+      <p:graphicFrame>
+        <p:nvGraphicFramePr>
+          <p:cNvPr id="10" name="Object 9">
+            <a:extLst>
+              <a:ext uri="{FF2B5EF4-FFF2-40B4-BE49-F238E27FC236}">
+                <a16:creationId xmlns:a16="http://schemas.microsoft.com/office/drawing/2014/main" id="{32A9EF0F-4E36-C8E2-7947-307E30508C79}"/>
+              </a:ext>
+            </a:extLst>
+          </p:cNvPr>
+          <p:cNvGraphicFramePr>
+            <a:graphicFrameLocks noChangeAspect="1"/>
+          </p:cNvGraphicFramePr>
+          <p:nvPr>
+            <p:extLst>
+              <p:ext uri="{D42A27DB-BD31-4B8C-83A1-F6EECF244321}">
+                <p14:modId xmlns:p14="http://schemas.microsoft.com/office/powerpoint/2010/main" val="4220727880"/>
+              </p:ext>
+            </p:extLst>
+          </p:nvPr>
+        </p:nvGraphicFramePr>
+        <p:xfrm>
+          <a:off x="405551" y="1091047"/>
+          <a:ext cx="3881305" cy="5311042"/>
+        </p:xfrm>
+        <a:graphic>
+          <a:graphicData uri="http://schemas.openxmlformats.org/presentationml/2006/ole">
+            <mc:AlternateContent xmlns:mc="http://schemas.openxmlformats.org/markup-compatibility/2006">
+              <mc:Choice xmlns:v="urn:schemas-microsoft-com:vml" Requires="v">
+                <p:oleObj name="Bitmap Image" r:id="rId4" imgW="3185280" imgH="4671000" progId="Paint.Picture">
+                  <p:embed/>
+                </p:oleObj>
+              </mc:Choice>
+              <mc:Fallback>
+                <p:oleObj name="Bitmap Image" r:id="rId4" imgW="3185280" imgH="4671000" progId="Paint.Picture">
+                  <p:embed/>
+                  <p:pic>
+                    <p:nvPicPr>
+                      <p:cNvPr id="10" name="Object 9">
+                        <a:extLst>
+                          <a:ext uri="{FF2B5EF4-FFF2-40B4-BE49-F238E27FC236}">
+                            <a16:creationId xmlns:a16="http://schemas.microsoft.com/office/drawing/2014/main" id="{32A9EF0F-4E36-C8E2-7947-307E30508C79}"/>
+                          </a:ext>
+                        </a:extLst>
+                      </p:cNvPr>
+                      <p:cNvPicPr/>
+                      <p:nvPr/>
+                    </p:nvPicPr>
+                    <p:blipFill>
+                      <a:blip r:embed="rId5"/>
+                      <a:stretch>
+                        <a:fillRect/>
+                      </a:stretch>
+                    </p:blipFill>
+                    <p:spPr>
+                      <a:xfrm>
+                        <a:off x="405551" y="1091047"/>
+                        <a:ext cx="3881305" cy="5311042"/>
+                      </a:xfrm>
+                      <a:prstGeom prst="rect">
+                        <a:avLst/>
+                      </a:prstGeom>
+                    </p:spPr>
+                  </p:pic>
+                </p:oleObj>
+              </mc:Fallback>
+            </mc:AlternateContent>
+          </a:graphicData>
+        </a:graphic>
+      </p:graphicFrame>
     </p:spTree>
     <p:extLst>
       <p:ext uri="{BB962C8B-B14F-4D97-AF65-F5344CB8AC3E}">
@@ -13879,326 +14328,10 @@
           <a:chExt cx="0" cy="0"/>
         </a:xfrm>
       </p:grpSpPr>
-      <p:sp>
-        <p:nvSpPr>
-          <p:cNvPr id="4" name="TextBox 3">
-            <a:extLst>
-              <a:ext uri="{FF2B5EF4-FFF2-40B4-BE49-F238E27FC236}">
-                <a16:creationId xmlns:a16="http://schemas.microsoft.com/office/drawing/2014/main" id="{327B066D-B21D-4911-AF52-D1403D359AAD}"/>
-              </a:ext>
-            </a:extLst>
-          </p:cNvPr>
-          <p:cNvSpPr txBox="1"/>
-          <p:nvPr/>
-        </p:nvSpPr>
-        <p:spPr>
-          <a:xfrm>
-            <a:off x="0" y="0"/>
-            <a:ext cx="12191999" cy="523220"/>
-          </a:xfrm>
-          <a:prstGeom prst="rect">
-            <a:avLst/>
-          </a:prstGeom>
-          <a:noFill/>
-        </p:spPr>
-        <p:txBody>
-          <a:bodyPr wrap="square" rtlCol="0">
-            <a:spAutoFit/>
-          </a:bodyPr>
-          <a:lstStyle/>
-          <a:p>
-            <a:r>
-              <a:rPr lang="en-NZ" sz="2800" b="1" dirty="0"/>
-              <a:t>Testing subset 1:2800 vs 2:2802</a:t>
-            </a:r>
-            <a:endParaRPr lang="en-GB" sz="2800" b="1" dirty="0"/>
-          </a:p>
-        </p:txBody>
-      </p:sp>
-      <p:pic>
-        <p:nvPicPr>
-          <p:cNvPr id="2" name="Picture 1">
-            <a:extLst>
-              <a:ext uri="{FF2B5EF4-FFF2-40B4-BE49-F238E27FC236}">
-                <a16:creationId xmlns:a16="http://schemas.microsoft.com/office/drawing/2014/main" id="{7AF2B0FD-0BF1-43E4-ADCE-ED04868FD930}"/>
-              </a:ext>
-            </a:extLst>
-          </p:cNvPr>
-          <p:cNvPicPr>
-            <a:picLocks noChangeAspect="1"/>
-          </p:cNvPicPr>
-          <p:nvPr/>
-        </p:nvPicPr>
-        <p:blipFill rotWithShape="1">
-          <a:blip r:embed="rId2"/>
-          <a:srcRect t="4957" r="28177"/>
-          <a:stretch/>
-        </p:blipFill>
-        <p:spPr>
-          <a:xfrm>
-            <a:off x="156629" y="897830"/>
-            <a:ext cx="2605952" cy="4171604"/>
-          </a:xfrm>
-          <a:prstGeom prst="rect">
-            <a:avLst/>
-          </a:prstGeom>
-        </p:spPr>
-      </p:pic>
-      <p:pic>
-        <p:nvPicPr>
-          <p:cNvPr id="3" name="Picture 2">
-            <a:extLst>
-              <a:ext uri="{FF2B5EF4-FFF2-40B4-BE49-F238E27FC236}">
-                <a16:creationId xmlns:a16="http://schemas.microsoft.com/office/drawing/2014/main" id="{3028EAD8-2EEB-4838-8CA3-5DD5FAC0D37B}"/>
-              </a:ext>
-            </a:extLst>
-          </p:cNvPr>
-          <p:cNvPicPr>
-            <a:picLocks noChangeAspect="1"/>
-          </p:cNvPicPr>
-          <p:nvPr/>
-        </p:nvPicPr>
-        <p:blipFill rotWithShape="1">
-          <a:blip r:embed="rId3"/>
-          <a:srcRect t="4540" r="27009"/>
-          <a:stretch/>
-        </p:blipFill>
-        <p:spPr>
-          <a:xfrm>
-            <a:off x="2930830" y="897830"/>
-            <a:ext cx="2602184" cy="4156974"/>
-          </a:xfrm>
-          <a:prstGeom prst="rect">
-            <a:avLst/>
-          </a:prstGeom>
-        </p:spPr>
-      </p:pic>
-      <p:sp>
-        <p:nvSpPr>
-          <p:cNvPr id="5" name="TextBox 4">
-            <a:extLst>
-              <a:ext uri="{FF2B5EF4-FFF2-40B4-BE49-F238E27FC236}">
-                <a16:creationId xmlns:a16="http://schemas.microsoft.com/office/drawing/2014/main" id="{6F4D977B-615E-41A0-9D4F-CD40BC4ECCA4}"/>
-              </a:ext>
-            </a:extLst>
-          </p:cNvPr>
-          <p:cNvSpPr txBox="1"/>
-          <p:nvPr/>
-        </p:nvSpPr>
-        <p:spPr>
-          <a:xfrm>
-            <a:off x="156629" y="5094656"/>
-            <a:ext cx="2605952" cy="369332"/>
-          </a:xfrm>
-          <a:prstGeom prst="rect">
-            <a:avLst/>
-          </a:prstGeom>
-          <a:noFill/>
-        </p:spPr>
-        <p:txBody>
-          <a:bodyPr wrap="square" lIns="0" tIns="0" rIns="0" bIns="0" rtlCol="0">
-            <a:spAutoFit/>
-          </a:bodyPr>
-          <a:lstStyle/>
-          <a:p>
-            <a:pPr algn="ctr"/>
-            <a:r>
-              <a:rPr lang="en-NZ" sz="1200" b="1" dirty="0"/>
-              <a:t>Rows 1:2800</a:t>
-            </a:r>
-          </a:p>
-          <a:p>
-            <a:pPr algn="ctr"/>
-            <a:r>
-              <a:rPr lang="en-NZ" sz="1200" b="1" dirty="0"/>
-              <a:t>466 Variables Above Threshold</a:t>
-            </a:r>
-          </a:p>
-        </p:txBody>
-      </p:sp>
-      <p:sp>
-        <p:nvSpPr>
-          <p:cNvPr id="10" name="TextBox 9">
-            <a:extLst>
-              <a:ext uri="{FF2B5EF4-FFF2-40B4-BE49-F238E27FC236}">
-                <a16:creationId xmlns:a16="http://schemas.microsoft.com/office/drawing/2014/main" id="{A29BC89C-7380-4DAC-B053-8BC2AC9B7D18}"/>
-              </a:ext>
-            </a:extLst>
-          </p:cNvPr>
-          <p:cNvSpPr txBox="1"/>
-          <p:nvPr/>
-        </p:nvSpPr>
-        <p:spPr>
-          <a:xfrm>
-            <a:off x="2930830" y="5080026"/>
-            <a:ext cx="2605952" cy="369332"/>
-          </a:xfrm>
-          <a:prstGeom prst="rect">
-            <a:avLst/>
-          </a:prstGeom>
-          <a:noFill/>
-        </p:spPr>
-        <p:txBody>
-          <a:bodyPr wrap="square" lIns="0" tIns="0" rIns="0" bIns="0" rtlCol="0">
-            <a:spAutoFit/>
-          </a:bodyPr>
-          <a:lstStyle/>
-          <a:p>
-            <a:pPr algn="ctr"/>
-            <a:r>
-              <a:rPr lang="en-NZ" sz="1200" b="1" dirty="0"/>
-              <a:t>Rows 2:2801</a:t>
-            </a:r>
-          </a:p>
-          <a:p>
-            <a:pPr algn="ctr"/>
-            <a:r>
-              <a:rPr lang="en-NZ" sz="1200" b="1" dirty="0"/>
-              <a:t>464 Variables Above Threshold</a:t>
-            </a:r>
-          </a:p>
-        </p:txBody>
-      </p:sp>
-      <p:pic>
-        <p:nvPicPr>
-          <p:cNvPr id="11" name="Picture 10">
-            <a:extLst>
-              <a:ext uri="{FF2B5EF4-FFF2-40B4-BE49-F238E27FC236}">
-                <a16:creationId xmlns:a16="http://schemas.microsoft.com/office/drawing/2014/main" id="{683F6D36-64CE-4660-A2EB-E0C24B880E3A}"/>
-              </a:ext>
-            </a:extLst>
-          </p:cNvPr>
-          <p:cNvPicPr>
-            <a:picLocks noChangeAspect="1"/>
-          </p:cNvPicPr>
-          <p:nvPr/>
-        </p:nvPicPr>
-        <p:blipFill>
-          <a:blip r:embed="rId4"/>
-          <a:stretch>
-            <a:fillRect/>
-          </a:stretch>
-        </p:blipFill>
-        <p:spPr>
-          <a:xfrm>
-            <a:off x="5779352" y="897831"/>
-            <a:ext cx="2577164" cy="4156974"/>
-          </a:xfrm>
-          <a:prstGeom prst="rect">
-            <a:avLst/>
-          </a:prstGeom>
-        </p:spPr>
-      </p:pic>
-      <p:sp>
-        <p:nvSpPr>
-          <p:cNvPr id="12" name="TextBox 11">
-            <a:extLst>
-              <a:ext uri="{FF2B5EF4-FFF2-40B4-BE49-F238E27FC236}">
-                <a16:creationId xmlns:a16="http://schemas.microsoft.com/office/drawing/2014/main" id="{C331A33F-BB94-4D46-BABC-48A3FE8AC753}"/>
-              </a:ext>
-            </a:extLst>
-          </p:cNvPr>
-          <p:cNvSpPr txBox="1"/>
-          <p:nvPr/>
-        </p:nvSpPr>
-        <p:spPr>
-          <a:xfrm>
-            <a:off x="5779352" y="5054804"/>
-            <a:ext cx="2562770" cy="369332"/>
-          </a:xfrm>
-          <a:prstGeom prst="rect">
-            <a:avLst/>
-          </a:prstGeom>
-          <a:noFill/>
-        </p:spPr>
-        <p:txBody>
-          <a:bodyPr wrap="square" lIns="0" tIns="0" rIns="0" bIns="0" rtlCol="0">
-            <a:spAutoFit/>
-          </a:bodyPr>
-          <a:lstStyle/>
-          <a:p>
-            <a:pPr algn="ctr"/>
-            <a:r>
-              <a:rPr lang="en-NZ" sz="1200" b="1"/>
-              <a:t>Rows 3:2802</a:t>
-            </a:r>
-            <a:endParaRPr lang="en-NZ" sz="1200" b="1" dirty="0"/>
-          </a:p>
-          <a:p>
-            <a:pPr algn="ctr"/>
-            <a:r>
-              <a:rPr lang="en-NZ" sz="1200" b="1" dirty="0"/>
-              <a:t>464 Variables Above Threshold</a:t>
-            </a:r>
-          </a:p>
-        </p:txBody>
-      </p:sp>
-      <p:sp>
-        <p:nvSpPr>
-          <p:cNvPr id="13" name="TextBox 12">
-            <a:extLst>
-              <a:ext uri="{FF2B5EF4-FFF2-40B4-BE49-F238E27FC236}">
-                <a16:creationId xmlns:a16="http://schemas.microsoft.com/office/drawing/2014/main" id="{F5B0AF2A-C591-40C9-AB95-DC636B67E369}"/>
-              </a:ext>
-            </a:extLst>
-          </p:cNvPr>
-          <p:cNvSpPr txBox="1"/>
-          <p:nvPr/>
-        </p:nvSpPr>
-        <p:spPr>
-          <a:xfrm>
-            <a:off x="6307521" y="5960169"/>
-            <a:ext cx="4849418" cy="553998"/>
-          </a:xfrm>
-          <a:prstGeom prst="rect">
-            <a:avLst/>
-          </a:prstGeom>
-          <a:solidFill>
-            <a:schemeClr val="bg1"/>
-          </a:solidFill>
-        </p:spPr>
-        <p:txBody>
-          <a:bodyPr wrap="square" lIns="0" tIns="0" rIns="0" bIns="0" rtlCol="0">
-            <a:spAutoFit/>
-          </a:bodyPr>
-          <a:lstStyle/>
-          <a:p>
-            <a:r>
-              <a:rPr lang="en-NZ" sz="1200" dirty="0">
-                <a:solidFill>
-                  <a:srgbClr val="FF0000"/>
-                </a:solidFill>
-              </a:rPr>
-              <a:t>Even when we just have 1 patient different, the variables outputted by </a:t>
-            </a:r>
-            <a:r>
-              <a:rPr lang="en-NZ" sz="1200" dirty="0" err="1">
-                <a:solidFill>
-                  <a:srgbClr val="FF0000"/>
-                </a:solidFill>
-              </a:rPr>
-              <a:t>cPCA</a:t>
-            </a:r>
-            <a:r>
-              <a:rPr lang="en-NZ" sz="1200" dirty="0">
-                <a:solidFill>
-                  <a:srgbClr val="FF0000"/>
-                </a:solidFill>
-              </a:rPr>
-              <a:t> can change pretty significantly, refer to excel spreadsheet for comparison of individual variables sorted by their weighting</a:t>
-            </a:r>
-            <a:endParaRPr lang="en-GB" sz="1200" dirty="0">
-              <a:solidFill>
-                <a:srgbClr val="FF0000"/>
-              </a:solidFill>
-            </a:endParaRPr>
-          </a:p>
-        </p:txBody>
-      </p:sp>
     </p:spTree>
     <p:extLst>
       <p:ext uri="{BB962C8B-B14F-4D97-AF65-F5344CB8AC3E}">
-        <p14:creationId xmlns:p14="http://schemas.microsoft.com/office/powerpoint/2010/main" val="842150243"/>
+        <p14:creationId xmlns:p14="http://schemas.microsoft.com/office/powerpoint/2010/main" val="302987753"/>
       </p:ext>
     </p:extLst>
   </p:cSld>
@@ -14225,12 +14358,48 @@
           <a:chExt cx="0" cy="0"/>
         </a:xfrm>
       </p:grpSpPr>
+      <p:sp>
+        <p:nvSpPr>
+          <p:cNvPr id="4" name="TextBox 3">
+            <a:extLst>
+              <a:ext uri="{FF2B5EF4-FFF2-40B4-BE49-F238E27FC236}">
+                <a16:creationId xmlns:a16="http://schemas.microsoft.com/office/drawing/2014/main" id="{327B066D-B21D-4911-AF52-D1403D359AAD}"/>
+              </a:ext>
+            </a:extLst>
+          </p:cNvPr>
+          <p:cNvSpPr txBox="1"/>
+          <p:nvPr/>
+        </p:nvSpPr>
+        <p:spPr>
+          <a:xfrm>
+            <a:off x="0" y="0"/>
+            <a:ext cx="12191999" cy="523220"/>
+          </a:xfrm>
+          <a:prstGeom prst="rect">
+            <a:avLst/>
+          </a:prstGeom>
+          <a:noFill/>
+        </p:spPr>
+        <p:txBody>
+          <a:bodyPr wrap="square" rtlCol="0">
+            <a:spAutoFit/>
+          </a:bodyPr>
+          <a:lstStyle/>
+          <a:p>
+            <a:r>
+              <a:rPr lang="en-NZ" sz="2800" b="1" dirty="0"/>
+              <a:t>Testing subset 1:2800 vs 2:2802</a:t>
+            </a:r>
+            <a:endParaRPr lang="en-GB" sz="2800" b="1" dirty="0"/>
+          </a:p>
+        </p:txBody>
+      </p:sp>
       <p:pic>
         <p:nvPicPr>
-          <p:cNvPr id="5" name="Picture 4">
-            <a:extLst>
-              <a:ext uri="{FF2B5EF4-FFF2-40B4-BE49-F238E27FC236}">
-                <a16:creationId xmlns:a16="http://schemas.microsoft.com/office/drawing/2014/main" id="{A2D96899-916E-4667-967A-53C75DE0B124}"/>
+          <p:cNvPr id="2" name="Picture 1">
+            <a:extLst>
+              <a:ext uri="{FF2B5EF4-FFF2-40B4-BE49-F238E27FC236}">
+                <a16:creationId xmlns:a16="http://schemas.microsoft.com/office/drawing/2014/main" id="{7AF2B0FD-0BF1-43E4-ADCE-ED04868FD930}"/>
               </a:ext>
             </a:extLst>
           </p:cNvPr>
@@ -14239,22 +14408,160 @@
           </p:cNvPicPr>
           <p:nvPr/>
         </p:nvPicPr>
+        <p:blipFill rotWithShape="1">
+          <a:blip r:embed="rId2"/>
+          <a:srcRect t="4957" r="28177"/>
+          <a:stretch/>
+        </p:blipFill>
+        <p:spPr>
+          <a:xfrm>
+            <a:off x="156629" y="897830"/>
+            <a:ext cx="2605952" cy="4171604"/>
+          </a:xfrm>
+          <a:prstGeom prst="rect">
+            <a:avLst/>
+          </a:prstGeom>
+        </p:spPr>
+      </p:pic>
+      <p:pic>
+        <p:nvPicPr>
+          <p:cNvPr id="3" name="Picture 2">
+            <a:extLst>
+              <a:ext uri="{FF2B5EF4-FFF2-40B4-BE49-F238E27FC236}">
+                <a16:creationId xmlns:a16="http://schemas.microsoft.com/office/drawing/2014/main" id="{3028EAD8-2EEB-4838-8CA3-5DD5FAC0D37B}"/>
+              </a:ext>
+            </a:extLst>
+          </p:cNvPr>
+          <p:cNvPicPr>
+            <a:picLocks noChangeAspect="1"/>
+          </p:cNvPicPr>
+          <p:nvPr/>
+        </p:nvPicPr>
+        <p:blipFill rotWithShape="1">
+          <a:blip r:embed="rId3"/>
+          <a:srcRect t="4540" r="27009"/>
+          <a:stretch/>
+        </p:blipFill>
+        <p:spPr>
+          <a:xfrm>
+            <a:off x="2930830" y="897830"/>
+            <a:ext cx="2602184" cy="4156974"/>
+          </a:xfrm>
+          <a:prstGeom prst="rect">
+            <a:avLst/>
+          </a:prstGeom>
+        </p:spPr>
+      </p:pic>
+      <p:sp>
+        <p:nvSpPr>
+          <p:cNvPr id="5" name="TextBox 4">
+            <a:extLst>
+              <a:ext uri="{FF2B5EF4-FFF2-40B4-BE49-F238E27FC236}">
+                <a16:creationId xmlns:a16="http://schemas.microsoft.com/office/drawing/2014/main" id="{6F4D977B-615E-41A0-9D4F-CD40BC4ECCA4}"/>
+              </a:ext>
+            </a:extLst>
+          </p:cNvPr>
+          <p:cNvSpPr txBox="1"/>
+          <p:nvPr/>
+        </p:nvSpPr>
+        <p:spPr>
+          <a:xfrm>
+            <a:off x="156629" y="5094656"/>
+            <a:ext cx="2605952" cy="369332"/>
+          </a:xfrm>
+          <a:prstGeom prst="rect">
+            <a:avLst/>
+          </a:prstGeom>
+          <a:noFill/>
+        </p:spPr>
+        <p:txBody>
+          <a:bodyPr wrap="square" lIns="0" tIns="0" rIns="0" bIns="0" rtlCol="0">
+            <a:spAutoFit/>
+          </a:bodyPr>
+          <a:lstStyle/>
+          <a:p>
+            <a:pPr algn="ctr"/>
+            <a:r>
+              <a:rPr lang="en-NZ" sz="1200" b="1" dirty="0"/>
+              <a:t>Rows 1:2800</a:t>
+            </a:r>
+          </a:p>
+          <a:p>
+            <a:pPr algn="ctr"/>
+            <a:r>
+              <a:rPr lang="en-NZ" sz="1200" b="1" dirty="0"/>
+              <a:t>466 Variables Above Threshold</a:t>
+            </a:r>
+          </a:p>
+        </p:txBody>
+      </p:sp>
+      <p:sp>
+        <p:nvSpPr>
+          <p:cNvPr id="10" name="TextBox 9">
+            <a:extLst>
+              <a:ext uri="{FF2B5EF4-FFF2-40B4-BE49-F238E27FC236}">
+                <a16:creationId xmlns:a16="http://schemas.microsoft.com/office/drawing/2014/main" id="{A29BC89C-7380-4DAC-B053-8BC2AC9B7D18}"/>
+              </a:ext>
+            </a:extLst>
+          </p:cNvPr>
+          <p:cNvSpPr txBox="1"/>
+          <p:nvPr/>
+        </p:nvSpPr>
+        <p:spPr>
+          <a:xfrm>
+            <a:off x="2930830" y="5080026"/>
+            <a:ext cx="2605952" cy="369332"/>
+          </a:xfrm>
+          <a:prstGeom prst="rect">
+            <a:avLst/>
+          </a:prstGeom>
+          <a:noFill/>
+        </p:spPr>
+        <p:txBody>
+          <a:bodyPr wrap="square" lIns="0" tIns="0" rIns="0" bIns="0" rtlCol="0">
+            <a:spAutoFit/>
+          </a:bodyPr>
+          <a:lstStyle/>
+          <a:p>
+            <a:pPr algn="ctr"/>
+            <a:r>
+              <a:rPr lang="en-NZ" sz="1200" b="1" dirty="0"/>
+              <a:t>Rows 2:2801</a:t>
+            </a:r>
+          </a:p>
+          <a:p>
+            <a:pPr algn="ctr"/>
+            <a:r>
+              <a:rPr lang="en-NZ" sz="1200" b="1" dirty="0"/>
+              <a:t>464 Variables Above Threshold</a:t>
+            </a:r>
+          </a:p>
+        </p:txBody>
+      </p:sp>
+      <p:pic>
+        <p:nvPicPr>
+          <p:cNvPr id="11" name="Picture 10">
+            <a:extLst>
+              <a:ext uri="{FF2B5EF4-FFF2-40B4-BE49-F238E27FC236}">
+                <a16:creationId xmlns:a16="http://schemas.microsoft.com/office/drawing/2014/main" id="{683F6D36-64CE-4660-A2EB-E0C24B880E3A}"/>
+              </a:ext>
+            </a:extLst>
+          </p:cNvPr>
+          <p:cNvPicPr>
+            <a:picLocks noChangeAspect="1"/>
+          </p:cNvPicPr>
+          <p:nvPr/>
+        </p:nvPicPr>
         <p:blipFill>
-          <a:blip r:embed="rId2">
-            <a:extLst>
-              <a:ext uri="{28A0092B-C50C-407E-A947-70E740481C1C}">
-                <a14:useLocalDpi xmlns:a14="http://schemas.microsoft.com/office/drawing/2010/main" val="0"/>
-              </a:ext>
-            </a:extLst>
-          </a:blip>
+          <a:blip r:embed="rId4"/>
           <a:stretch>
             <a:fillRect/>
           </a:stretch>
         </p:blipFill>
         <p:spPr>
           <a:xfrm>
-            <a:off x="799707" y="2129363"/>
-            <a:ext cx="10097909" cy="3648584"/>
+            <a:off x="5779352" y="897831"/>
+            <a:ext cx="2577164" cy="4156974"/>
           </a:xfrm>
           <a:prstGeom prst="rect">
             <a:avLst/>
@@ -14263,10 +14570,10 @@
       </p:pic>
       <p:sp>
         <p:nvSpPr>
-          <p:cNvPr id="6" name="TextBox 5">
-            <a:extLst>
-              <a:ext uri="{FF2B5EF4-FFF2-40B4-BE49-F238E27FC236}">
-                <a16:creationId xmlns:a16="http://schemas.microsoft.com/office/drawing/2014/main" id="{7A53C59A-1A95-4FC7-AB43-C7A259FFA6C7}"/>
+          <p:cNvPr id="12" name="TextBox 11">
+            <a:extLst>
+              <a:ext uri="{FF2B5EF4-FFF2-40B4-BE49-F238E27FC236}">
+                <a16:creationId xmlns:a16="http://schemas.microsoft.com/office/drawing/2014/main" id="{C331A33F-BB94-4D46-BABC-48A3FE8AC753}"/>
               </a:ext>
             </a:extLst>
           </p:cNvPr>
@@ -14275,8 +14582,8 @@
         </p:nvSpPr>
         <p:spPr>
           <a:xfrm>
-            <a:off x="213989" y="493362"/>
-            <a:ext cx="10571201" cy="369332"/>
+            <a:off x="5779352" y="5054804"/>
+            <a:ext cx="2562770" cy="369332"/>
           </a:xfrm>
           <a:prstGeom prst="rect">
             <a:avLst/>
@@ -14284,31 +14591,93 @@
           <a:noFill/>
         </p:spPr>
         <p:txBody>
-          <a:bodyPr wrap="square" rtlCol="0">
+          <a:bodyPr wrap="square" lIns="0" tIns="0" rIns="0" bIns="0" rtlCol="0">
             <a:spAutoFit/>
           </a:bodyPr>
           <a:lstStyle/>
           <a:p>
-            <a:r>
-              <a:rPr lang="en-NZ" b="1" dirty="0"/>
-              <a:t>Runs on subsets of dataset (rows) when only using blood pressure (</a:t>
-            </a:r>
-            <a:r>
-              <a:rPr lang="en-NZ" b="1" dirty="0" err="1"/>
-              <a:t>dia</a:t>
-            </a:r>
-            <a:r>
-              <a:rPr lang="en-NZ" b="1" dirty="0"/>
-              <a:t> &amp; sys) as inputs into the model</a:t>
-            </a:r>
-            <a:endParaRPr lang="en-GB" b="1" dirty="0"/>
+            <a:pPr algn="ctr"/>
+            <a:r>
+              <a:rPr lang="en-NZ" sz="1200" b="1"/>
+              <a:t>Rows 3:2802</a:t>
+            </a:r>
+            <a:endParaRPr lang="en-NZ" sz="1200" b="1" dirty="0"/>
+          </a:p>
+          <a:p>
+            <a:pPr algn="ctr"/>
+            <a:r>
+              <a:rPr lang="en-NZ" sz="1200" b="1" dirty="0"/>
+              <a:t>464 Variables Above Threshold</a:t>
+            </a:r>
+          </a:p>
+        </p:txBody>
+      </p:sp>
+      <p:sp>
+        <p:nvSpPr>
+          <p:cNvPr id="13" name="TextBox 12">
+            <a:extLst>
+              <a:ext uri="{FF2B5EF4-FFF2-40B4-BE49-F238E27FC236}">
+                <a16:creationId xmlns:a16="http://schemas.microsoft.com/office/drawing/2014/main" id="{F5B0AF2A-C591-40C9-AB95-DC636B67E369}"/>
+              </a:ext>
+            </a:extLst>
+          </p:cNvPr>
+          <p:cNvSpPr txBox="1"/>
+          <p:nvPr/>
+        </p:nvSpPr>
+        <p:spPr>
+          <a:xfrm>
+            <a:off x="6307521" y="5960169"/>
+            <a:ext cx="4849418" cy="553998"/>
+          </a:xfrm>
+          <a:prstGeom prst="rect">
+            <a:avLst/>
+          </a:prstGeom>
+          <a:solidFill>
+            <a:schemeClr val="bg1"/>
+          </a:solidFill>
+        </p:spPr>
+        <p:txBody>
+          <a:bodyPr wrap="square" lIns="0" tIns="0" rIns="0" bIns="0" rtlCol="0">
+            <a:spAutoFit/>
+          </a:bodyPr>
+          <a:lstStyle/>
+          <a:p>
+            <a:r>
+              <a:rPr lang="en-NZ" sz="1200" dirty="0">
+                <a:solidFill>
+                  <a:srgbClr val="FF0000"/>
+                </a:solidFill>
+              </a:rPr>
+              <a:t>Even when we just have 1 patient different, the variables outputted by </a:t>
+            </a:r>
+            <a:r>
+              <a:rPr lang="en-NZ" sz="1200" dirty="0" err="1">
+                <a:solidFill>
+                  <a:srgbClr val="FF0000"/>
+                </a:solidFill>
+              </a:rPr>
+              <a:t>cPCA</a:t>
+            </a:r>
+            <a:r>
+              <a:rPr lang="en-NZ" sz="1200" dirty="0">
+                <a:solidFill>
+                  <a:srgbClr val="FF0000"/>
+                </a:solidFill>
+              </a:rPr>
+              <a:t> can change pretty significantly, refer to excel spreadsheet for comparison of individual variables sorted by their weighting</a:t>
+            </a:r>
+            <a:endParaRPr lang="en-GB" sz="1200" dirty="0">
+              <a:solidFill>
+                <a:srgbClr val="FF0000"/>
+              </a:solidFill>
+            </a:endParaRPr>
           </a:p>
         </p:txBody>
       </p:sp>
     </p:spTree>
     <p:extLst>
       <p:ext uri="{BB962C8B-B14F-4D97-AF65-F5344CB8AC3E}">
-        <p14:creationId xmlns:p14="http://schemas.microsoft.com/office/powerpoint/2010/main" val="65343148"/>
+        <p14:creationId xmlns:p14="http://schemas.microsoft.com/office/powerpoint/2010/main" val="842150243"/>
       </p:ext>
     </p:extLst>
   </p:cSld>
@@ -14553,6 +14922,116 @@
     <p:extLst>
       <p:ext uri="{BB962C8B-B14F-4D97-AF65-F5344CB8AC3E}">
         <p14:creationId xmlns:p14="http://schemas.microsoft.com/office/powerpoint/2010/main" val="437272149"/>
+      </p:ext>
+    </p:extLst>
+  </p:cSld>
+  <p:clrMapOvr>
+    <a:masterClrMapping/>
+  </p:clrMapOvr>
+</p:sld>
+</file>
+
+<file path=ppt/slides/slide30.xml><?xml version="1.0" encoding="utf-8"?>
+<p:sld xmlns:a="http://schemas.openxmlformats.org/drawingml/2006/main" xmlns:r="http://schemas.openxmlformats.org/officeDocument/2006/relationships" xmlns:p="http://schemas.openxmlformats.org/presentationml/2006/main">
+  <p:cSld>
+    <p:spTree>
+      <p:nvGrpSpPr>
+        <p:cNvPr id="1" name=""/>
+        <p:cNvGrpSpPr/>
+        <p:nvPr/>
+      </p:nvGrpSpPr>
+      <p:grpSpPr>
+        <a:xfrm>
+          <a:off x="0" y="0"/>
+          <a:ext cx="0" cy="0"/>
+          <a:chOff x="0" y="0"/>
+          <a:chExt cx="0" cy="0"/>
+        </a:xfrm>
+      </p:grpSpPr>
+      <p:pic>
+        <p:nvPicPr>
+          <p:cNvPr id="5" name="Picture 4">
+            <a:extLst>
+              <a:ext uri="{FF2B5EF4-FFF2-40B4-BE49-F238E27FC236}">
+                <a16:creationId xmlns:a16="http://schemas.microsoft.com/office/drawing/2014/main" id="{A2D96899-916E-4667-967A-53C75DE0B124}"/>
+              </a:ext>
+            </a:extLst>
+          </p:cNvPr>
+          <p:cNvPicPr>
+            <a:picLocks noChangeAspect="1"/>
+          </p:cNvPicPr>
+          <p:nvPr/>
+        </p:nvPicPr>
+        <p:blipFill>
+          <a:blip r:embed="rId2">
+            <a:extLst>
+              <a:ext uri="{28A0092B-C50C-407E-A947-70E740481C1C}">
+                <a14:useLocalDpi xmlns:a14="http://schemas.microsoft.com/office/drawing/2010/main" val="0"/>
+              </a:ext>
+            </a:extLst>
+          </a:blip>
+          <a:stretch>
+            <a:fillRect/>
+          </a:stretch>
+        </p:blipFill>
+        <p:spPr>
+          <a:xfrm>
+            <a:off x="799707" y="2129363"/>
+            <a:ext cx="10097909" cy="3648584"/>
+          </a:xfrm>
+          <a:prstGeom prst="rect">
+            <a:avLst/>
+          </a:prstGeom>
+        </p:spPr>
+      </p:pic>
+      <p:sp>
+        <p:nvSpPr>
+          <p:cNvPr id="6" name="TextBox 5">
+            <a:extLst>
+              <a:ext uri="{FF2B5EF4-FFF2-40B4-BE49-F238E27FC236}">
+                <a16:creationId xmlns:a16="http://schemas.microsoft.com/office/drawing/2014/main" id="{7A53C59A-1A95-4FC7-AB43-C7A259FFA6C7}"/>
+              </a:ext>
+            </a:extLst>
+          </p:cNvPr>
+          <p:cNvSpPr txBox="1"/>
+          <p:nvPr/>
+        </p:nvSpPr>
+        <p:spPr>
+          <a:xfrm>
+            <a:off x="213989" y="493362"/>
+            <a:ext cx="10571201" cy="369332"/>
+          </a:xfrm>
+          <a:prstGeom prst="rect">
+            <a:avLst/>
+          </a:prstGeom>
+          <a:noFill/>
+        </p:spPr>
+        <p:txBody>
+          <a:bodyPr wrap="square" rtlCol="0">
+            <a:spAutoFit/>
+          </a:bodyPr>
+          <a:lstStyle/>
+          <a:p>
+            <a:r>
+              <a:rPr lang="en-NZ" b="1" dirty="0"/>
+              <a:t>Runs on subsets of dataset (rows) when only using blood pressure (</a:t>
+            </a:r>
+            <a:r>
+              <a:rPr lang="en-NZ" b="1" dirty="0" err="1"/>
+              <a:t>dia</a:t>
+            </a:r>
+            <a:r>
+              <a:rPr lang="en-NZ" b="1" dirty="0"/>
+              <a:t> &amp; sys) as inputs into the model</a:t>
+            </a:r>
+            <a:endParaRPr lang="en-GB" b="1" dirty="0"/>
+          </a:p>
+        </p:txBody>
+      </p:sp>
+    </p:spTree>
+    <p:extLst>
+      <p:ext uri="{BB962C8B-B14F-4D97-AF65-F5344CB8AC3E}">
+        <p14:creationId xmlns:p14="http://schemas.microsoft.com/office/powerpoint/2010/main" val="65343148"/>
       </p:ext>
     </p:extLst>
   </p:cSld>

</xml_diff>

<commit_message>
updated ppt and improved plotting of AUC
</commit_message>
<xml_diff>
--- a/job_results.pptx
+++ b/job_results.pptx
@@ -2890,7 +2890,7 @@
   <pc:docChgLst>
     <pc:chgData name="zhaohan" userId="95e304e8ede71739" providerId="LiveId" clId="{740E24C1-5156-4599-B84F-B42CCA40E00D}"/>
     <pc:docChg chg="undo custSel addSld modSld">
-      <pc:chgData name="zhaohan" userId="95e304e8ede71739" providerId="LiveId" clId="{740E24C1-5156-4599-B84F-B42CCA40E00D}" dt="2022-07-02T11:29:42.984" v="538" actId="21"/>
+      <pc:chgData name="zhaohan" userId="95e304e8ede71739" providerId="LiveId" clId="{740E24C1-5156-4599-B84F-B42CCA40E00D}" dt="2022-07-02T12:05:40.694" v="543" actId="1076"/>
       <pc:docMkLst>
         <pc:docMk/>
       </pc:docMkLst>
@@ -3014,7 +3014,7 @@
         </pc:spChg>
       </pc:sldChg>
       <pc:sldChg chg="addSp delSp modSp add mod">
-        <pc:chgData name="zhaohan" userId="95e304e8ede71739" providerId="LiveId" clId="{740E24C1-5156-4599-B84F-B42CCA40E00D}" dt="2022-07-02T11:29:42.984" v="538" actId="21"/>
+        <pc:chgData name="zhaohan" userId="95e304e8ede71739" providerId="LiveId" clId="{740E24C1-5156-4599-B84F-B42CCA40E00D}" dt="2022-07-02T12:05:40.694" v="543" actId="1076"/>
         <pc:sldMkLst>
           <pc:docMk/>
           <pc:sldMk cId="2571968155" sldId="288"/>
@@ -3043,12 +3043,20 @@
             <ac:spMk id="11" creationId="{D5EE938A-5087-1500-A3FC-D359452A557E}"/>
           </ac:spMkLst>
         </pc:spChg>
-        <pc:graphicFrameChg chg="add mod">
-          <ac:chgData name="zhaohan" userId="95e304e8ede71739" providerId="LiveId" clId="{740E24C1-5156-4599-B84F-B42CCA40E00D}" dt="2022-07-02T11:27:05.248" v="480" actId="1076"/>
+        <pc:graphicFrameChg chg="add del mod">
+          <ac:chgData name="zhaohan" userId="95e304e8ede71739" providerId="LiveId" clId="{740E24C1-5156-4599-B84F-B42CCA40E00D}" dt="2022-07-02T12:05:34.997" v="539" actId="478"/>
           <ac:graphicFrameMkLst>
             <pc:docMk/>
             <pc:sldMk cId="2571968155" sldId="288"/>
             <ac:graphicFrameMk id="3" creationId="{15B3081A-8FFC-B7E9-69B2-81B32491C43D}"/>
+          </ac:graphicFrameMkLst>
+        </pc:graphicFrameChg>
+        <pc:graphicFrameChg chg="add mod">
+          <ac:chgData name="zhaohan" userId="95e304e8ede71739" providerId="LiveId" clId="{740E24C1-5156-4599-B84F-B42CCA40E00D}" dt="2022-07-02T12:05:40.694" v="543" actId="1076"/>
+          <ac:graphicFrameMkLst>
+            <pc:docMk/>
+            <pc:sldMk cId="2571968155" sldId="288"/>
+            <ac:graphicFrameMk id="5" creationId="{133753E1-EF0C-E3C4-817C-671BB9B86149}"/>
           </ac:graphicFrameMkLst>
         </pc:graphicFrameChg>
         <pc:graphicFrameChg chg="add del mod">
@@ -3202,7 +3210,7 @@
           <a:p>
             <a:fld id="{3F756EDF-0C8E-4F27-B2A4-7BBF4F0FD9CE}" type="datetimeFigureOut">
               <a:rPr lang="en-GB" smtClean="0"/>
-              <a:t>02/07/2022</a:t>
+              <a:t>03/07/2022</a:t>
             </a:fld>
             <a:endParaRPr lang="en-GB"/>
           </a:p>
@@ -3619,7 +3627,7 @@
           <a:p>
             <a:fld id="{B1B6DC73-6F54-48A7-AC0A-0EE4EE00B05A}" type="datetimeFigureOut">
               <a:rPr lang="en-GB" smtClean="0"/>
-              <a:t>02/07/2022</a:t>
+              <a:t>03/07/2022</a:t>
             </a:fld>
             <a:endParaRPr lang="en-GB"/>
           </a:p>
@@ -3819,7 +3827,7 @@
           <a:p>
             <a:fld id="{B1B6DC73-6F54-48A7-AC0A-0EE4EE00B05A}" type="datetimeFigureOut">
               <a:rPr lang="en-GB" smtClean="0"/>
-              <a:t>02/07/2022</a:t>
+              <a:t>03/07/2022</a:t>
             </a:fld>
             <a:endParaRPr lang="en-GB"/>
           </a:p>
@@ -4029,7 +4037,7 @@
           <a:p>
             <a:fld id="{B1B6DC73-6F54-48A7-AC0A-0EE4EE00B05A}" type="datetimeFigureOut">
               <a:rPr lang="en-GB" smtClean="0"/>
-              <a:t>02/07/2022</a:t>
+              <a:t>03/07/2022</a:t>
             </a:fld>
             <a:endParaRPr lang="en-GB"/>
           </a:p>
@@ -4229,7 +4237,7 @@
           <a:p>
             <a:fld id="{B1B6DC73-6F54-48A7-AC0A-0EE4EE00B05A}" type="datetimeFigureOut">
               <a:rPr lang="en-GB" smtClean="0"/>
-              <a:t>02/07/2022</a:t>
+              <a:t>03/07/2022</a:t>
             </a:fld>
             <a:endParaRPr lang="en-GB"/>
           </a:p>
@@ -4505,7 +4513,7 @@
           <a:p>
             <a:fld id="{B1B6DC73-6F54-48A7-AC0A-0EE4EE00B05A}" type="datetimeFigureOut">
               <a:rPr lang="en-GB" smtClean="0"/>
-              <a:t>02/07/2022</a:t>
+              <a:t>03/07/2022</a:t>
             </a:fld>
             <a:endParaRPr lang="en-GB"/>
           </a:p>
@@ -4773,7 +4781,7 @@
           <a:p>
             <a:fld id="{B1B6DC73-6F54-48A7-AC0A-0EE4EE00B05A}" type="datetimeFigureOut">
               <a:rPr lang="en-GB" smtClean="0"/>
-              <a:t>02/07/2022</a:t>
+              <a:t>03/07/2022</a:t>
             </a:fld>
             <a:endParaRPr lang="en-GB"/>
           </a:p>
@@ -5188,7 +5196,7 @@
           <a:p>
             <a:fld id="{B1B6DC73-6F54-48A7-AC0A-0EE4EE00B05A}" type="datetimeFigureOut">
               <a:rPr lang="en-GB" smtClean="0"/>
-              <a:t>02/07/2022</a:t>
+              <a:t>03/07/2022</a:t>
             </a:fld>
             <a:endParaRPr lang="en-GB"/>
           </a:p>
@@ -5330,7 +5338,7 @@
           <a:p>
             <a:fld id="{B1B6DC73-6F54-48A7-AC0A-0EE4EE00B05A}" type="datetimeFigureOut">
               <a:rPr lang="en-GB" smtClean="0"/>
-              <a:t>02/07/2022</a:t>
+              <a:t>03/07/2022</a:t>
             </a:fld>
             <a:endParaRPr lang="en-GB"/>
           </a:p>
@@ -5443,7 +5451,7 @@
           <a:p>
             <a:fld id="{B1B6DC73-6F54-48A7-AC0A-0EE4EE00B05A}" type="datetimeFigureOut">
               <a:rPr lang="en-GB" smtClean="0"/>
-              <a:t>02/07/2022</a:t>
+              <a:t>03/07/2022</a:t>
             </a:fld>
             <a:endParaRPr lang="en-GB"/>
           </a:p>
@@ -5756,7 +5764,7 @@
           <a:p>
             <a:fld id="{B1B6DC73-6F54-48A7-AC0A-0EE4EE00B05A}" type="datetimeFigureOut">
               <a:rPr lang="en-GB" smtClean="0"/>
-              <a:t>02/07/2022</a:t>
+              <a:t>03/07/2022</a:t>
             </a:fld>
             <a:endParaRPr lang="en-GB"/>
           </a:p>
@@ -6045,7 +6053,7 @@
           <a:p>
             <a:fld id="{B1B6DC73-6F54-48A7-AC0A-0EE4EE00B05A}" type="datetimeFigureOut">
               <a:rPr lang="en-GB" smtClean="0"/>
-              <a:t>02/07/2022</a:t>
+              <a:t>03/07/2022</a:t>
             </a:fld>
             <a:endParaRPr lang="en-GB"/>
           </a:p>
@@ -6288,7 +6296,7 @@
           <a:p>
             <a:fld id="{B1B6DC73-6F54-48A7-AC0A-0EE4EE00B05A}" type="datetimeFigureOut">
               <a:rPr lang="en-GB" smtClean="0"/>
-              <a:t>02/07/2022</a:t>
+              <a:t>03/07/2022</a:t>
             </a:fld>
             <a:endParaRPr lang="en-GB"/>
           </a:p>
@@ -14120,75 +14128,6 @@
           </a:p>
         </p:txBody>
       </p:sp>
-      <p:graphicFrame>
-        <p:nvGraphicFramePr>
-          <p:cNvPr id="3" name="Object 2">
-            <a:extLst>
-              <a:ext uri="{FF2B5EF4-FFF2-40B4-BE49-F238E27FC236}">
-                <a16:creationId xmlns:a16="http://schemas.microsoft.com/office/drawing/2014/main" id="{15B3081A-8FFC-B7E9-69B2-81B32491C43D}"/>
-              </a:ext>
-            </a:extLst>
-          </p:cNvPr>
-          <p:cNvGraphicFramePr>
-            <a:graphicFrameLocks noChangeAspect="1"/>
-          </p:cNvGraphicFramePr>
-          <p:nvPr>
-            <p:extLst>
-              <p:ext uri="{D42A27DB-BD31-4B8C-83A1-F6EECF244321}">
-                <p14:modId xmlns:p14="http://schemas.microsoft.com/office/powerpoint/2010/main" val="2576325961"/>
-              </p:ext>
-            </p:extLst>
-          </p:nvPr>
-        </p:nvGraphicFramePr>
-        <p:xfrm>
-          <a:off x="5313737" y="871350"/>
-          <a:ext cx="6761723" cy="5868512"/>
-        </p:xfrm>
-        <a:graphic>
-          <a:graphicData uri="http://schemas.openxmlformats.org/presentationml/2006/ole">
-            <mc:AlternateContent xmlns:mc="http://schemas.openxmlformats.org/markup-compatibility/2006">
-              <mc:Choice xmlns:v="urn:schemas-microsoft-com:vml" Requires="v">
-                <p:oleObj name="Bitmap Image" r:id="rId2" imgW="5311080" imgH="4610160" progId="Paint.Picture">
-                  <p:embed/>
-                </p:oleObj>
-              </mc:Choice>
-              <mc:Fallback>
-                <p:oleObj name="Bitmap Image" r:id="rId2" imgW="5311080" imgH="4610160" progId="Paint.Picture">
-                  <p:embed/>
-                  <p:pic>
-                    <p:nvPicPr>
-                      <p:cNvPr id="3" name="Object 2">
-                        <a:extLst>
-                          <a:ext uri="{FF2B5EF4-FFF2-40B4-BE49-F238E27FC236}">
-                            <a16:creationId xmlns:a16="http://schemas.microsoft.com/office/drawing/2014/main" id="{15B3081A-8FFC-B7E9-69B2-81B32491C43D}"/>
-                          </a:ext>
-                        </a:extLst>
-                      </p:cNvPr>
-                      <p:cNvPicPr/>
-                      <p:nvPr/>
-                    </p:nvPicPr>
-                    <p:blipFill>
-                      <a:blip r:embed="rId3"/>
-                      <a:stretch>
-                        <a:fillRect/>
-                      </a:stretch>
-                    </p:blipFill>
-                    <p:spPr>
-                      <a:xfrm>
-                        <a:off x="5313737" y="871350"/>
-                        <a:ext cx="6761723" cy="5868512"/>
-                      </a:xfrm>
-                      <a:prstGeom prst="rect">
-                        <a:avLst/>
-                      </a:prstGeom>
-                    </p:spPr>
-                  </p:pic>
-                </p:oleObj>
-              </mc:Fallback>
-            </mc:AlternateContent>
-          </a:graphicData>
-        </a:graphic>
-      </p:graphicFrame>
       <p:sp>
         <p:nvSpPr>
           <p:cNvPr id="4" name="TextBox 3">
@@ -14257,12 +14196,12 @@
           <a:graphicData uri="http://schemas.openxmlformats.org/presentationml/2006/ole">
             <mc:AlternateContent xmlns:mc="http://schemas.openxmlformats.org/markup-compatibility/2006">
               <mc:Choice xmlns:v="urn:schemas-microsoft-com:vml" Requires="v">
-                <p:oleObj name="Bitmap Image" r:id="rId4" imgW="3185280" imgH="4671000" progId="Paint.Picture">
+                <p:oleObj name="Bitmap Image" r:id="rId2" imgW="3185280" imgH="4671000" progId="Paint.Picture">
                   <p:embed/>
                 </p:oleObj>
               </mc:Choice>
               <mc:Fallback>
-                <p:oleObj name="Bitmap Image" r:id="rId4" imgW="3185280" imgH="4671000" progId="Paint.Picture">
+                <p:oleObj name="Bitmap Image" r:id="rId2" imgW="3185280" imgH="4671000" progId="Paint.Picture">
                   <p:embed/>
                   <p:pic>
                     <p:nvPicPr>
@@ -14277,7 +14216,7 @@
                       <p:nvPr/>
                     </p:nvPicPr>
                     <p:blipFill>
-                      <a:blip r:embed="rId5"/>
+                      <a:blip r:embed="rId3"/>
                       <a:stretch>
                         <a:fillRect/>
                       </a:stretch>
@@ -14286,6 +14225,75 @@
                       <a:xfrm>
                         <a:off x="405551" y="1091047"/>
                         <a:ext cx="3881305" cy="5311042"/>
+                      </a:xfrm>
+                      <a:prstGeom prst="rect">
+                        <a:avLst/>
+                      </a:prstGeom>
+                    </p:spPr>
+                  </p:pic>
+                </p:oleObj>
+              </mc:Fallback>
+            </mc:AlternateContent>
+          </a:graphicData>
+        </a:graphic>
+      </p:graphicFrame>
+      <p:graphicFrame>
+        <p:nvGraphicFramePr>
+          <p:cNvPr id="5" name="Object 4">
+            <a:extLst>
+              <a:ext uri="{FF2B5EF4-FFF2-40B4-BE49-F238E27FC236}">
+                <a16:creationId xmlns:a16="http://schemas.microsoft.com/office/drawing/2014/main" id="{133753E1-EF0C-E3C4-817C-671BB9B86149}"/>
+              </a:ext>
+            </a:extLst>
+          </p:cNvPr>
+          <p:cNvGraphicFramePr>
+            <a:graphicFrameLocks noChangeAspect="1"/>
+          </p:cNvGraphicFramePr>
+          <p:nvPr>
+            <p:extLst>
+              <p:ext uri="{D42A27DB-BD31-4B8C-83A1-F6EECF244321}">
+                <p14:modId xmlns:p14="http://schemas.microsoft.com/office/powerpoint/2010/main" val="4091596057"/>
+              </p:ext>
+            </p:extLst>
+          </p:nvPr>
+        </p:nvGraphicFramePr>
+        <p:xfrm>
+          <a:off x="5792788" y="976822"/>
+          <a:ext cx="5491642" cy="5425267"/>
+        </p:xfrm>
+        <a:graphic>
+          <a:graphicData uri="http://schemas.openxmlformats.org/presentationml/2006/ole">
+            <mc:AlternateContent xmlns:mc="http://schemas.openxmlformats.org/markup-compatibility/2006">
+              <mc:Choice xmlns:v="urn:schemas-microsoft-com:vml" Requires="v">
+                <p:oleObj name="Bitmap Image" r:id="rId4" imgW="4465440" imgH="4412160" progId="Paint.Picture">
+                  <p:embed/>
+                </p:oleObj>
+              </mc:Choice>
+              <mc:Fallback>
+                <p:oleObj name="Bitmap Image" r:id="rId4" imgW="4465440" imgH="4412160" progId="Paint.Picture">
+                  <p:embed/>
+                  <p:pic>
+                    <p:nvPicPr>
+                      <p:cNvPr id="5" name="Object 4">
+                        <a:extLst>
+                          <a:ext uri="{FF2B5EF4-FFF2-40B4-BE49-F238E27FC236}">
+                            <a16:creationId xmlns:a16="http://schemas.microsoft.com/office/drawing/2014/main" id="{133753E1-EF0C-E3C4-817C-671BB9B86149}"/>
+                          </a:ext>
+                        </a:extLst>
+                      </p:cNvPr>
+                      <p:cNvPicPr/>
+                      <p:nvPr/>
+                    </p:nvPicPr>
+                    <p:blipFill>
+                      <a:blip r:embed="rId5"/>
+                      <a:stretch>
+                        <a:fillRect/>
+                      </a:stretch>
+                    </p:blipFill>
+                    <p:spPr>
+                      <a:xfrm>
+                        <a:off x="5792788" y="976822"/>
+                        <a:ext cx="5491642" cy="5425267"/>
                       </a:xfrm>
                       <a:prstGeom prst="rect">
                         <a:avLst/>

</xml_diff>

<commit_message>
improved visualization of ROC and AUC
</commit_message>
<xml_diff>
--- a/job_results.pptx
+++ b/job_results.pptx
@@ -2890,7 +2890,7 @@
   <pc:docChgLst>
     <pc:chgData name="zhaohan" userId="95e304e8ede71739" providerId="LiveId" clId="{740E24C1-5156-4599-B84F-B42CCA40E00D}"/>
     <pc:docChg chg="undo custSel addSld modSld">
-      <pc:chgData name="zhaohan" userId="95e304e8ede71739" providerId="LiveId" clId="{740E24C1-5156-4599-B84F-B42CCA40E00D}" dt="2022-07-02T12:05:40.694" v="543" actId="1076"/>
+      <pc:chgData name="zhaohan" userId="95e304e8ede71739" providerId="LiveId" clId="{740E24C1-5156-4599-B84F-B42CCA40E00D}" dt="2022-07-02T23:03:20.669" v="699" actId="1076"/>
       <pc:docMkLst>
         <pc:docMk/>
       </pc:docMkLst>
@@ -3014,13 +3014,13 @@
         </pc:spChg>
       </pc:sldChg>
       <pc:sldChg chg="addSp delSp modSp add mod">
-        <pc:chgData name="zhaohan" userId="95e304e8ede71739" providerId="LiveId" clId="{740E24C1-5156-4599-B84F-B42CCA40E00D}" dt="2022-07-02T12:05:40.694" v="543" actId="1076"/>
+        <pc:chgData name="zhaohan" userId="95e304e8ede71739" providerId="LiveId" clId="{740E24C1-5156-4599-B84F-B42CCA40E00D}" dt="2022-07-02T23:03:20.669" v="699" actId="1076"/>
         <pc:sldMkLst>
           <pc:docMk/>
           <pc:sldMk cId="2571968155" sldId="288"/>
         </pc:sldMkLst>
         <pc:spChg chg="add mod">
-          <ac:chgData name="zhaohan" userId="95e304e8ede71739" providerId="LiveId" clId="{740E24C1-5156-4599-B84F-B42CCA40E00D}" dt="2022-07-02T11:24:08.100" v="473" actId="20577"/>
+          <ac:chgData name="zhaohan" userId="95e304e8ede71739" providerId="LiveId" clId="{740E24C1-5156-4599-B84F-B42CCA40E00D}" dt="2022-07-02T22:53:44.309" v="626" actId="20577"/>
           <ac:spMkLst>
             <pc:docMk/>
             <pc:sldMk cId="2571968155" sldId="288"/>
@@ -3028,11 +3028,19 @@
           </ac:spMkLst>
         </pc:spChg>
         <pc:spChg chg="add mod">
-          <ac:chgData name="zhaohan" userId="95e304e8ede71739" providerId="LiveId" clId="{740E24C1-5156-4599-B84F-B42CCA40E00D}" dt="2022-07-02T11:29:39.204" v="536" actId="207"/>
+          <ac:chgData name="zhaohan" userId="95e304e8ede71739" providerId="LiveId" clId="{740E24C1-5156-4599-B84F-B42CCA40E00D}" dt="2022-07-02T23:03:20.669" v="699" actId="1076"/>
           <ac:spMkLst>
             <pc:docMk/>
             <pc:sldMk cId="2571968155" sldId="288"/>
             <ac:spMk id="4" creationId="{456D4B22-AC02-8FC8-EC1B-4F18DB718833}"/>
+          </ac:spMkLst>
+        </pc:spChg>
+        <pc:spChg chg="add mod">
+          <ac:chgData name="zhaohan" userId="95e304e8ede71739" providerId="LiveId" clId="{740E24C1-5156-4599-B84F-B42CCA40E00D}" dt="2022-07-02T23:03:20.669" v="699" actId="1076"/>
+          <ac:spMkLst>
+            <pc:docMk/>
+            <pc:sldMk cId="2571968155" sldId="288"/>
+            <ac:spMk id="9" creationId="{18973AFC-CA44-BA44-AE46-E4D3C066BE65}"/>
           </ac:spMkLst>
         </pc:spChg>
         <pc:spChg chg="add mod">
@@ -3052,7 +3060,15 @@
           </ac:graphicFrameMkLst>
         </pc:graphicFrameChg>
         <pc:graphicFrameChg chg="add mod">
-          <ac:chgData name="zhaohan" userId="95e304e8ede71739" providerId="LiveId" clId="{740E24C1-5156-4599-B84F-B42CCA40E00D}" dt="2022-07-02T12:05:40.694" v="543" actId="1076"/>
+          <ac:chgData name="zhaohan" userId="95e304e8ede71739" providerId="LiveId" clId="{740E24C1-5156-4599-B84F-B42CCA40E00D}" dt="2022-07-02T23:03:14.140" v="697" actId="1076"/>
+          <ac:graphicFrameMkLst>
+            <pc:docMk/>
+            <pc:sldMk cId="2571968155" sldId="288"/>
+            <ac:graphicFrameMk id="3" creationId="{F728502B-C327-73E7-1653-4EF04C6AE157}"/>
+          </ac:graphicFrameMkLst>
+        </pc:graphicFrameChg>
+        <pc:graphicFrameChg chg="add del mod">
+          <ac:chgData name="zhaohan" userId="95e304e8ede71739" providerId="LiveId" clId="{740E24C1-5156-4599-B84F-B42CCA40E00D}" dt="2022-07-02T22:53:10.103" v="549" actId="478"/>
           <ac:graphicFrameMkLst>
             <pc:docMk/>
             <pc:sldMk cId="2571968155" sldId="288"/>
@@ -3068,11 +3084,27 @@
           </ac:graphicFrameMkLst>
         </pc:graphicFrameChg>
         <pc:graphicFrameChg chg="add del mod">
+          <ac:chgData name="zhaohan" userId="95e304e8ede71739" providerId="LiveId" clId="{740E24C1-5156-4599-B84F-B42CCA40E00D}" dt="2022-07-02T22:59:42.416" v="628" actId="478"/>
+          <ac:graphicFrameMkLst>
+            <pc:docMk/>
+            <pc:sldMk cId="2571968155" sldId="288"/>
+            <ac:graphicFrameMk id="6" creationId="{01F78BC0-834F-9F22-ABA3-6EFD573A2D51}"/>
+          </ac:graphicFrameMkLst>
+        </pc:graphicFrameChg>
+        <pc:graphicFrameChg chg="add del mod">
           <ac:chgData name="zhaohan" userId="95e304e8ede71739" providerId="LiveId" clId="{740E24C1-5156-4599-B84F-B42CCA40E00D}" dt="2022-07-02T11:29:41.862" v="537" actId="21"/>
           <ac:graphicFrameMkLst>
             <pc:docMk/>
             <pc:sldMk cId="2571968155" sldId="288"/>
             <ac:graphicFrameMk id="6" creationId="{643654B8-228E-86C7-2622-C4BF55EC438F}"/>
+          </ac:graphicFrameMkLst>
+        </pc:graphicFrameChg>
+        <pc:graphicFrameChg chg="add mod ord">
+          <ac:chgData name="zhaohan" userId="95e304e8ede71739" providerId="LiveId" clId="{740E24C1-5156-4599-B84F-B42CCA40E00D}" dt="2022-07-02T23:03:20.669" v="699" actId="1076"/>
+          <ac:graphicFrameMkLst>
+            <pc:docMk/>
+            <pc:sldMk cId="2571968155" sldId="288"/>
+            <ac:graphicFrameMk id="7" creationId="{3C531904-F410-0A70-8CA4-6D09593519A8}"/>
           </ac:graphicFrameMkLst>
         </pc:graphicFrameChg>
         <pc:graphicFrameChg chg="add del mod">
@@ -3099,8 +3131,8 @@
             <ac:graphicFrameMk id="9" creationId="{71CAA50A-CB68-5C8D-5FCF-4CFA55EB395D}"/>
           </ac:graphicFrameMkLst>
         </pc:graphicFrameChg>
-        <pc:graphicFrameChg chg="add mod">
-          <ac:chgData name="zhaohan" userId="95e304e8ede71739" providerId="LiveId" clId="{740E24C1-5156-4599-B84F-B42CCA40E00D}" dt="2022-07-02T11:29:23.153" v="535" actId="1076"/>
+        <pc:graphicFrameChg chg="add del mod">
+          <ac:chgData name="zhaohan" userId="95e304e8ede71739" providerId="LiveId" clId="{740E24C1-5156-4599-B84F-B42CCA40E00D}" dt="2022-07-02T22:52:49.649" v="544" actId="478"/>
           <ac:graphicFrameMkLst>
             <pc:docMk/>
             <pc:sldMk cId="2571968155" sldId="288"/>
@@ -14092,88 +14124,12 @@
           <a:chExt cx="0" cy="0"/>
         </a:xfrm>
       </p:grpSpPr>
-      <p:sp>
-        <p:nvSpPr>
-          <p:cNvPr id="2" name="TextBox 1">
-            <a:extLst>
-              <a:ext uri="{FF2B5EF4-FFF2-40B4-BE49-F238E27FC236}">
-                <a16:creationId xmlns:a16="http://schemas.microsoft.com/office/drawing/2014/main" id="{0DC165B2-DA56-875D-2DA4-E53105F93824}"/>
-              </a:ext>
-            </a:extLst>
-          </p:cNvPr>
-          <p:cNvSpPr txBox="1"/>
-          <p:nvPr/>
-        </p:nvSpPr>
-        <p:spPr>
-          <a:xfrm>
-            <a:off x="0" y="0"/>
-            <a:ext cx="12192000" cy="461665"/>
-          </a:xfrm>
-          <a:prstGeom prst="rect">
-            <a:avLst/>
-          </a:prstGeom>
-          <a:noFill/>
-        </p:spPr>
-        <p:txBody>
-          <a:bodyPr wrap="square" rtlCol="0">
-            <a:spAutoFit/>
-          </a:bodyPr>
-          <a:lstStyle/>
-          <a:p>
-            <a:r>
-              <a:rPr lang="en-NZ" sz="2400" b="1" dirty="0"/>
-              <a:t>AUC</a:t>
-            </a:r>
-            <a:endParaRPr lang="en-GB" sz="2400" b="1" dirty="0"/>
-          </a:p>
-        </p:txBody>
-      </p:sp>
-      <p:sp>
-        <p:nvSpPr>
-          <p:cNvPr id="4" name="TextBox 3">
-            <a:extLst>
-              <a:ext uri="{FF2B5EF4-FFF2-40B4-BE49-F238E27FC236}">
-                <a16:creationId xmlns:a16="http://schemas.microsoft.com/office/drawing/2014/main" id="{456D4B22-AC02-8FC8-EC1B-4F18DB718833}"/>
-              </a:ext>
-            </a:extLst>
-          </p:cNvPr>
-          <p:cNvSpPr txBox="1"/>
-          <p:nvPr/>
-        </p:nvSpPr>
-        <p:spPr>
-          <a:xfrm>
-            <a:off x="405551" y="638268"/>
-            <a:ext cx="3881305" cy="338554"/>
-          </a:xfrm>
-          <a:prstGeom prst="rect">
-            <a:avLst/>
-          </a:prstGeom>
-          <a:noFill/>
-        </p:spPr>
-        <p:txBody>
-          <a:bodyPr wrap="square">
-            <a:spAutoFit/>
-          </a:bodyPr>
-          <a:lstStyle/>
-          <a:p>
-            <a:pPr algn="ctr"/>
-            <a:r>
-              <a:rPr lang="en-US" sz="1600" b="1" dirty="0">
-                <a:solidFill>
-                  <a:srgbClr val="FF0000"/>
-                </a:solidFill>
-              </a:rPr>
-              <a:t>AUC = 0.99885</a:t>
-            </a:r>
-          </a:p>
-        </p:txBody>
-      </p:sp>
       <p:graphicFrame>
         <p:nvGraphicFramePr>
-          <p:cNvPr id="10" name="Object 9">
-            <a:extLst>
-              <a:ext uri="{FF2B5EF4-FFF2-40B4-BE49-F238E27FC236}">
-                <a16:creationId xmlns:a16="http://schemas.microsoft.com/office/drawing/2014/main" id="{32A9EF0F-4E36-C8E2-7947-307E30508C79}"/>
+          <p:cNvPr id="7" name="Object 6">
+            <a:extLst>
+              <a:ext uri="{FF2B5EF4-FFF2-40B4-BE49-F238E27FC236}">
+                <a16:creationId xmlns:a16="http://schemas.microsoft.com/office/drawing/2014/main" id="{3C531904-F410-0A70-8CA4-6D09593519A8}"/>
               </a:ext>
             </a:extLst>
           </p:cNvPr>
@@ -14183,32 +14139,32 @@
           <p:nvPr>
             <p:extLst>
               <p:ext uri="{D42A27DB-BD31-4B8C-83A1-F6EECF244321}">
-                <p14:modId xmlns:p14="http://schemas.microsoft.com/office/powerpoint/2010/main" val="4220727880"/>
+                <p14:modId xmlns:p14="http://schemas.microsoft.com/office/powerpoint/2010/main" val="2849166951"/>
               </p:ext>
             </p:extLst>
           </p:nvPr>
         </p:nvGraphicFramePr>
         <p:xfrm>
-          <a:off x="405551" y="1091047"/>
-          <a:ext cx="3881305" cy="5311042"/>
+          <a:off x="3784600" y="1489322"/>
+          <a:ext cx="8068733" cy="4558274"/>
         </p:xfrm>
         <a:graphic>
           <a:graphicData uri="http://schemas.openxmlformats.org/presentationml/2006/ole">
             <mc:AlternateContent xmlns:mc="http://schemas.openxmlformats.org/markup-compatibility/2006">
               <mc:Choice xmlns:v="urn:schemas-microsoft-com:vml" Requires="v">
-                <p:oleObj name="Bitmap Image" r:id="rId2" imgW="3185280" imgH="4671000" progId="Paint.Picture">
+                <p:oleObj name="Bitmap Image" r:id="rId2" imgW="9387720" imgH="5303520" progId="Paint.Picture">
                   <p:embed/>
                 </p:oleObj>
               </mc:Choice>
               <mc:Fallback>
-                <p:oleObj name="Bitmap Image" r:id="rId2" imgW="3185280" imgH="4671000" progId="Paint.Picture">
+                <p:oleObj name="Bitmap Image" r:id="rId2" imgW="9387720" imgH="5303520" progId="Paint.Picture">
                   <p:embed/>
                   <p:pic>
                     <p:nvPicPr>
-                      <p:cNvPr id="10" name="Object 9">
+                      <p:cNvPr id="7" name="Object 6">
                         <a:extLst>
                           <a:ext uri="{FF2B5EF4-FFF2-40B4-BE49-F238E27FC236}">
-                            <a16:creationId xmlns:a16="http://schemas.microsoft.com/office/drawing/2014/main" id="{32A9EF0F-4E36-C8E2-7947-307E30508C79}"/>
+                            <a16:creationId xmlns:a16="http://schemas.microsoft.com/office/drawing/2014/main" id="{3C531904-F410-0A70-8CA4-6D09593519A8}"/>
                           </a:ext>
                         </a:extLst>
                       </p:cNvPr>
@@ -14223,8 +14179,8 @@
                     </p:blipFill>
                     <p:spPr>
                       <a:xfrm>
-                        <a:off x="405551" y="1091047"/>
-                        <a:ext cx="3881305" cy="5311042"/>
+                        <a:off x="3784600" y="1489322"/>
+                        <a:ext cx="8068733" cy="4558274"/>
                       </a:xfrm>
                       <a:prstGeom prst="rect">
                         <a:avLst/>
@@ -14237,12 +14193,88 @@
           </a:graphicData>
         </a:graphic>
       </p:graphicFrame>
+      <p:sp>
+        <p:nvSpPr>
+          <p:cNvPr id="2" name="TextBox 1">
+            <a:extLst>
+              <a:ext uri="{FF2B5EF4-FFF2-40B4-BE49-F238E27FC236}">
+                <a16:creationId xmlns:a16="http://schemas.microsoft.com/office/drawing/2014/main" id="{0DC165B2-DA56-875D-2DA4-E53105F93824}"/>
+              </a:ext>
+            </a:extLst>
+          </p:cNvPr>
+          <p:cNvSpPr txBox="1"/>
+          <p:nvPr/>
+        </p:nvSpPr>
+        <p:spPr>
+          <a:xfrm>
+            <a:off x="0" y="0"/>
+            <a:ext cx="12192000" cy="461665"/>
+          </a:xfrm>
+          <a:prstGeom prst="rect">
+            <a:avLst/>
+          </a:prstGeom>
+          <a:noFill/>
+        </p:spPr>
+        <p:txBody>
+          <a:bodyPr wrap="square" rtlCol="0">
+            <a:spAutoFit/>
+          </a:bodyPr>
+          <a:lstStyle/>
+          <a:p>
+            <a:r>
+              <a:rPr lang="en-NZ" sz="2400" b="1" dirty="0"/>
+              <a:t>AUROC (Area Under Receiver Operating Characteristic Curve)</a:t>
+            </a:r>
+            <a:endParaRPr lang="en-GB" sz="2400" b="1" dirty="0"/>
+          </a:p>
+        </p:txBody>
+      </p:sp>
+      <p:sp>
+        <p:nvSpPr>
+          <p:cNvPr id="4" name="TextBox 3">
+            <a:extLst>
+              <a:ext uri="{FF2B5EF4-FFF2-40B4-BE49-F238E27FC236}">
+                <a16:creationId xmlns:a16="http://schemas.microsoft.com/office/drawing/2014/main" id="{456D4B22-AC02-8FC8-EC1B-4F18DB718833}"/>
+              </a:ext>
+            </a:extLst>
+          </p:cNvPr>
+          <p:cNvSpPr txBox="1"/>
+          <p:nvPr/>
+        </p:nvSpPr>
+        <p:spPr>
+          <a:xfrm>
+            <a:off x="9030908" y="3441274"/>
+            <a:ext cx="2187425" cy="461665"/>
+          </a:xfrm>
+          <a:prstGeom prst="rect">
+            <a:avLst/>
+          </a:prstGeom>
+          <a:noFill/>
+        </p:spPr>
+        <p:txBody>
+          <a:bodyPr wrap="square">
+            <a:spAutoFit/>
+          </a:bodyPr>
+          <a:lstStyle/>
+          <a:p>
+            <a:pPr algn="ctr"/>
+            <a:r>
+              <a:rPr lang="en-US" sz="2400" b="1" dirty="0">
+                <a:solidFill>
+                  <a:srgbClr val="FF0000"/>
+                </a:solidFill>
+              </a:rPr>
+              <a:t>AUC = 0.99885</a:t>
+            </a:r>
+          </a:p>
+        </p:txBody>
+      </p:sp>
       <p:graphicFrame>
         <p:nvGraphicFramePr>
-          <p:cNvPr id="5" name="Object 4">
-            <a:extLst>
-              <a:ext uri="{FF2B5EF4-FFF2-40B4-BE49-F238E27FC236}">
-                <a16:creationId xmlns:a16="http://schemas.microsoft.com/office/drawing/2014/main" id="{133753E1-EF0C-E3C4-817C-671BB9B86149}"/>
+          <p:cNvPr id="3" name="Object 2">
+            <a:extLst>
+              <a:ext uri="{FF2B5EF4-FFF2-40B4-BE49-F238E27FC236}">
+                <a16:creationId xmlns:a16="http://schemas.microsoft.com/office/drawing/2014/main" id="{F728502B-C327-73E7-1653-4EF04C6AE157}"/>
               </a:ext>
             </a:extLst>
           </p:cNvPr>
@@ -14252,32 +14284,32 @@
           <p:nvPr>
             <p:extLst>
               <p:ext uri="{D42A27DB-BD31-4B8C-83A1-F6EECF244321}">
-                <p14:modId xmlns:p14="http://schemas.microsoft.com/office/powerpoint/2010/main" val="4091596057"/>
+                <p14:modId xmlns:p14="http://schemas.microsoft.com/office/powerpoint/2010/main" val="3521207477"/>
               </p:ext>
             </p:extLst>
           </p:nvPr>
         </p:nvGraphicFramePr>
         <p:xfrm>
-          <a:off x="5792788" y="976822"/>
-          <a:ext cx="5491642" cy="5425267"/>
+          <a:off x="270084" y="853951"/>
+          <a:ext cx="2947249" cy="5812085"/>
         </p:xfrm>
         <a:graphic>
           <a:graphicData uri="http://schemas.openxmlformats.org/presentationml/2006/ole">
             <mc:AlternateContent xmlns:mc="http://schemas.openxmlformats.org/markup-compatibility/2006">
               <mc:Choice xmlns:v="urn:schemas-microsoft-com:vml" Requires="v">
-                <p:oleObj name="Bitmap Image" r:id="rId4" imgW="4465440" imgH="4412160" progId="Paint.Picture">
+                <p:oleObj name="Bitmap Image" r:id="rId4" imgW="2385000" imgH="4701600" progId="Paint.Picture">
                   <p:embed/>
                 </p:oleObj>
               </mc:Choice>
               <mc:Fallback>
-                <p:oleObj name="Bitmap Image" r:id="rId4" imgW="4465440" imgH="4412160" progId="Paint.Picture">
+                <p:oleObj name="Bitmap Image" r:id="rId4" imgW="2385000" imgH="4701600" progId="Paint.Picture">
                   <p:embed/>
                   <p:pic>
                     <p:nvPicPr>
-                      <p:cNvPr id="5" name="Object 4">
+                      <p:cNvPr id="3" name="Object 2">
                         <a:extLst>
                           <a:ext uri="{FF2B5EF4-FFF2-40B4-BE49-F238E27FC236}">
-                            <a16:creationId xmlns:a16="http://schemas.microsoft.com/office/drawing/2014/main" id="{133753E1-EF0C-E3C4-817C-671BB9B86149}"/>
+                            <a16:creationId xmlns:a16="http://schemas.microsoft.com/office/drawing/2014/main" id="{F728502B-C327-73E7-1653-4EF04C6AE157}"/>
                           </a:ext>
                         </a:extLst>
                       </p:cNvPr>
@@ -14292,8 +14324,8 @@
                     </p:blipFill>
                     <p:spPr>
                       <a:xfrm>
-                        <a:off x="5792788" y="976822"/>
-                        <a:ext cx="5491642" cy="5425267"/>
+                        <a:off x="270084" y="853951"/>
+                        <a:ext cx="2947249" cy="5812085"/>
                       </a:xfrm>
                       <a:prstGeom prst="rect">
                         <a:avLst/>
@@ -14306,6 +14338,65 @@
           </a:graphicData>
         </a:graphic>
       </p:graphicFrame>
+      <p:sp>
+        <p:nvSpPr>
+          <p:cNvPr id="9" name="TextBox 8">
+            <a:extLst>
+              <a:ext uri="{FF2B5EF4-FFF2-40B4-BE49-F238E27FC236}">
+                <a16:creationId xmlns:a16="http://schemas.microsoft.com/office/drawing/2014/main" id="{18973AFC-CA44-BA44-AE46-E4D3C066BE65}"/>
+              </a:ext>
+            </a:extLst>
+          </p:cNvPr>
+          <p:cNvSpPr txBox="1"/>
+          <p:nvPr/>
+        </p:nvSpPr>
+        <p:spPr>
+          <a:xfrm>
+            <a:off x="7449420" y="4817747"/>
+            <a:ext cx="556855" cy="409023"/>
+          </a:xfrm>
+          <a:prstGeom prst="rect">
+            <a:avLst/>
+          </a:prstGeom>
+          <a:noFill/>
+        </p:spPr>
+        <p:txBody>
+          <a:bodyPr wrap="square">
+            <a:spAutoFit/>
+          </a:bodyPr>
+          <a:lstStyle/>
+          <a:p>
+            <a:pPr>
+              <a:lnSpc>
+                <a:spcPts val="1200"/>
+              </a:lnSpc>
+            </a:pPr>
+            <a:r>
+              <a:rPr lang="en-US" sz="1400" b="1" dirty="0">
+                <a:solidFill>
+                  <a:srgbClr val="FF0000"/>
+                </a:solidFill>
+              </a:rPr>
+              <a:t>0.09</a:t>
+            </a:r>
+          </a:p>
+          <a:p>
+            <a:pPr>
+              <a:lnSpc>
+                <a:spcPts val="1200"/>
+              </a:lnSpc>
+            </a:pPr>
+            <a:r>
+              <a:rPr lang="en-US" sz="1400" b="1" dirty="0">
+                <a:solidFill>
+                  <a:srgbClr val="FF0000"/>
+                </a:solidFill>
+              </a:rPr>
+              <a:t>0.05</a:t>
+            </a:r>
+          </a:p>
+        </p:txBody>
+      </p:sp>
     </p:spTree>
     <p:extLst>
       <p:ext uri="{BB962C8B-B14F-4D97-AF65-F5344CB8AC3E}">

</xml_diff>

<commit_message>
improved ppt for AUROC
</commit_message>
<xml_diff>
--- a/job_results.pptx
+++ b/job_results.pptx
@@ -2890,7 +2890,7 @@
   <pc:docChgLst>
     <pc:chgData name="zhaohan" userId="95e304e8ede71739" providerId="LiveId" clId="{740E24C1-5156-4599-B84F-B42CCA40E00D}"/>
     <pc:docChg chg="undo custSel addSld modSld">
-      <pc:chgData name="zhaohan" userId="95e304e8ede71739" providerId="LiveId" clId="{740E24C1-5156-4599-B84F-B42CCA40E00D}" dt="2022-07-02T23:03:20.669" v="699" actId="1076"/>
+      <pc:chgData name="zhaohan" userId="95e304e8ede71739" providerId="LiveId" clId="{740E24C1-5156-4599-B84F-B42CCA40E00D}" dt="2022-07-02T23:11:36.284" v="704" actId="14100"/>
       <pc:docMkLst>
         <pc:docMk/>
       </pc:docMkLst>
@@ -3014,7 +3014,7 @@
         </pc:spChg>
       </pc:sldChg>
       <pc:sldChg chg="addSp delSp modSp add mod">
-        <pc:chgData name="zhaohan" userId="95e304e8ede71739" providerId="LiveId" clId="{740E24C1-5156-4599-B84F-B42CCA40E00D}" dt="2022-07-02T23:03:20.669" v="699" actId="1076"/>
+        <pc:chgData name="zhaohan" userId="95e304e8ede71739" providerId="LiveId" clId="{740E24C1-5156-4599-B84F-B42CCA40E00D}" dt="2022-07-02T23:11:36.284" v="704" actId="14100"/>
         <pc:sldMkLst>
           <pc:docMk/>
           <pc:sldMk cId="2571968155" sldId="288"/>
@@ -3036,7 +3036,7 @@
           </ac:spMkLst>
         </pc:spChg>
         <pc:spChg chg="add mod">
-          <ac:chgData name="zhaohan" userId="95e304e8ede71739" providerId="LiveId" clId="{740E24C1-5156-4599-B84F-B42CCA40E00D}" dt="2022-07-02T23:03:20.669" v="699" actId="1076"/>
+          <ac:chgData name="zhaohan" userId="95e304e8ede71739" providerId="LiveId" clId="{740E24C1-5156-4599-B84F-B42CCA40E00D}" dt="2022-07-02T23:11:36.284" v="704" actId="14100"/>
           <ac:spMkLst>
             <pc:docMk/>
             <pc:sldMk cId="2571968155" sldId="288"/>
@@ -14353,7 +14353,7 @@
         <p:spPr>
           <a:xfrm>
             <a:off x="7449420" y="4817747"/>
-            <a:ext cx="556855" cy="409023"/>
+            <a:ext cx="670113" cy="409023"/>
           </a:xfrm>
           <a:prstGeom prst="rect">
             <a:avLst/>
@@ -14377,7 +14377,7 @@
                   <a:srgbClr val="FF0000"/>
                 </a:solidFill>
               </a:rPr>
-              <a:t>0.09</a:t>
+              <a:t>0.092</a:t>
             </a:r>
           </a:p>
           <a:p>
@@ -14392,7 +14392,7 @@
                   <a:srgbClr val="FF0000"/>
                 </a:solidFill>
               </a:rPr>
-              <a:t>0.05</a:t>
+              <a:t>0.049</a:t>
             </a:r>
           </a:p>
         </p:txBody>

</xml_diff>